<commit_message>
Finished formal def of LM
</commit_message>
<xml_diff>
--- a/Notes/RegressionModelOverview.pptx
+++ b/Notes/RegressionModelOverview.pptx
@@ -4,6 +4,9 @@
   <p:sldMasterIdLst>
     <p:sldMasterId id="2147483648" r:id="rId1"/>
   </p:sldMasterIdLst>
+  <p:notesMasterIdLst>
+    <p:notesMasterId r:id="rId9"/>
+  </p:notesMasterIdLst>
   <p:sldIdLst>
     <p:sldId id="256" r:id="rId2"/>
     <p:sldId id="257" r:id="rId3"/>
@@ -118,6 +121,448 @@
 </p:presentation>
 </file>
 
+<file path=ppt/notesMasters/notesMaster1.xml><?xml version="1.0" encoding="utf-8"?>
+<p:notesMaster xmlns:a="http://schemas.openxmlformats.org/drawingml/2006/main" xmlns:r="http://schemas.openxmlformats.org/officeDocument/2006/relationships" xmlns:p="http://schemas.openxmlformats.org/presentationml/2006/main">
+  <p:cSld>
+    <p:bg>
+      <p:bgRef idx="1001">
+        <a:schemeClr val="bg1"/>
+      </p:bgRef>
+    </p:bg>
+    <p:spTree>
+      <p:nvGrpSpPr>
+        <p:cNvPr id="1" name=""/>
+        <p:cNvGrpSpPr/>
+        <p:nvPr/>
+      </p:nvGrpSpPr>
+      <p:grpSpPr>
+        <a:xfrm>
+          <a:off x="0" y="0"/>
+          <a:ext cx="0" cy="0"/>
+          <a:chOff x="0" y="0"/>
+          <a:chExt cx="0" cy="0"/>
+        </a:xfrm>
+      </p:grpSpPr>
+      <p:sp>
+        <p:nvSpPr>
+          <p:cNvPr id="2" name="Header Placeholder 1"/>
+          <p:cNvSpPr>
+            <a:spLocks noGrp="1"/>
+          </p:cNvSpPr>
+          <p:nvPr>
+            <p:ph type="hdr" sz="quarter"/>
+          </p:nvPr>
+        </p:nvSpPr>
+        <p:spPr>
+          <a:xfrm>
+            <a:off x="0" y="0"/>
+            <a:ext cx="2971800" cy="458788"/>
+          </a:xfrm>
+          <a:prstGeom prst="rect">
+            <a:avLst/>
+          </a:prstGeom>
+        </p:spPr>
+        <p:txBody>
+          <a:bodyPr vert="horz" lIns="91440" tIns="45720" rIns="91440" bIns="45720" rtlCol="0"/>
+          <a:lstStyle>
+            <a:lvl1pPr algn="l">
+              <a:defRPr sz="1200"/>
+            </a:lvl1pPr>
+          </a:lstStyle>
+          <a:p>
+            <a:endParaRPr lang="en-US"/>
+          </a:p>
+        </p:txBody>
+      </p:sp>
+      <p:sp>
+        <p:nvSpPr>
+          <p:cNvPr id="3" name="Date Placeholder 2"/>
+          <p:cNvSpPr>
+            <a:spLocks noGrp="1"/>
+          </p:cNvSpPr>
+          <p:nvPr>
+            <p:ph type="dt" idx="1"/>
+          </p:nvPr>
+        </p:nvSpPr>
+        <p:spPr>
+          <a:xfrm>
+            <a:off x="3884613" y="0"/>
+            <a:ext cx="2971800" cy="458788"/>
+          </a:xfrm>
+          <a:prstGeom prst="rect">
+            <a:avLst/>
+          </a:prstGeom>
+        </p:spPr>
+        <p:txBody>
+          <a:bodyPr vert="horz" lIns="91440" tIns="45720" rIns="91440" bIns="45720" rtlCol="0"/>
+          <a:lstStyle>
+            <a:lvl1pPr algn="r">
+              <a:defRPr sz="1200"/>
+            </a:lvl1pPr>
+          </a:lstStyle>
+          <a:p>
+            <a:fld id="{0082532B-AEE1-4521-BED8-FA67A45A1A20}" type="datetimeFigureOut">
+              <a:rPr lang="en-US" smtClean="0"/>
+              <a:t>12/6/2021</a:t>
+            </a:fld>
+            <a:endParaRPr lang="en-US"/>
+          </a:p>
+        </p:txBody>
+      </p:sp>
+      <p:sp>
+        <p:nvSpPr>
+          <p:cNvPr id="4" name="Slide Image Placeholder 3"/>
+          <p:cNvSpPr>
+            <a:spLocks noGrp="1" noRot="1" noChangeAspect="1"/>
+          </p:cNvSpPr>
+          <p:nvPr>
+            <p:ph type="sldImg" idx="2"/>
+          </p:nvPr>
+        </p:nvSpPr>
+        <p:spPr>
+          <a:xfrm>
+            <a:off x="685800" y="1143000"/>
+            <a:ext cx="5486400" cy="3086100"/>
+          </a:xfrm>
+          <a:prstGeom prst="rect">
+            <a:avLst/>
+          </a:prstGeom>
+          <a:noFill/>
+          <a:ln w="12700">
+            <a:solidFill>
+              <a:prstClr val="black"/>
+            </a:solidFill>
+          </a:ln>
+        </p:spPr>
+        <p:txBody>
+          <a:bodyPr vert="horz" lIns="91440" tIns="45720" rIns="91440" bIns="45720" rtlCol="0" anchor="ctr"/>
+          <a:lstStyle/>
+          <a:p>
+            <a:endParaRPr lang="en-US"/>
+          </a:p>
+        </p:txBody>
+      </p:sp>
+      <p:sp>
+        <p:nvSpPr>
+          <p:cNvPr id="5" name="Notes Placeholder 4"/>
+          <p:cNvSpPr>
+            <a:spLocks noGrp="1"/>
+          </p:cNvSpPr>
+          <p:nvPr>
+            <p:ph type="body" sz="quarter" idx="3"/>
+          </p:nvPr>
+        </p:nvSpPr>
+        <p:spPr>
+          <a:xfrm>
+            <a:off x="685800" y="4400550"/>
+            <a:ext cx="5486400" cy="3600450"/>
+          </a:xfrm>
+          <a:prstGeom prst="rect">
+            <a:avLst/>
+          </a:prstGeom>
+        </p:spPr>
+        <p:txBody>
+          <a:bodyPr vert="horz" lIns="91440" tIns="45720" rIns="91440" bIns="45720" rtlCol="0"/>
+          <a:lstStyle/>
+          <a:p>
+            <a:pPr lvl="0"/>
+            <a:r>
+              <a:rPr lang="en-US" smtClean="0"/>
+              <a:t>Edit Master text styles</a:t>
+            </a:r>
+          </a:p>
+          <a:p>
+            <a:pPr lvl="1"/>
+            <a:r>
+              <a:rPr lang="en-US" smtClean="0"/>
+              <a:t>Second level</a:t>
+            </a:r>
+          </a:p>
+          <a:p>
+            <a:pPr lvl="2"/>
+            <a:r>
+              <a:rPr lang="en-US" smtClean="0"/>
+              <a:t>Third level</a:t>
+            </a:r>
+          </a:p>
+          <a:p>
+            <a:pPr lvl="3"/>
+            <a:r>
+              <a:rPr lang="en-US" smtClean="0"/>
+              <a:t>Fourth level</a:t>
+            </a:r>
+          </a:p>
+          <a:p>
+            <a:pPr lvl="4"/>
+            <a:r>
+              <a:rPr lang="en-US" smtClean="0"/>
+              <a:t>Fifth level</a:t>
+            </a:r>
+            <a:endParaRPr lang="en-US"/>
+          </a:p>
+        </p:txBody>
+      </p:sp>
+      <p:sp>
+        <p:nvSpPr>
+          <p:cNvPr id="6" name="Footer Placeholder 5"/>
+          <p:cNvSpPr>
+            <a:spLocks noGrp="1"/>
+          </p:cNvSpPr>
+          <p:nvPr>
+            <p:ph type="ftr" sz="quarter" idx="4"/>
+          </p:nvPr>
+        </p:nvSpPr>
+        <p:spPr>
+          <a:xfrm>
+            <a:off x="0" y="8685213"/>
+            <a:ext cx="2971800" cy="458787"/>
+          </a:xfrm>
+          <a:prstGeom prst="rect">
+            <a:avLst/>
+          </a:prstGeom>
+        </p:spPr>
+        <p:txBody>
+          <a:bodyPr vert="horz" lIns="91440" tIns="45720" rIns="91440" bIns="45720" rtlCol="0" anchor="b"/>
+          <a:lstStyle>
+            <a:lvl1pPr algn="l">
+              <a:defRPr sz="1200"/>
+            </a:lvl1pPr>
+          </a:lstStyle>
+          <a:p>
+            <a:endParaRPr lang="en-US"/>
+          </a:p>
+        </p:txBody>
+      </p:sp>
+      <p:sp>
+        <p:nvSpPr>
+          <p:cNvPr id="7" name="Slide Number Placeholder 6"/>
+          <p:cNvSpPr>
+            <a:spLocks noGrp="1"/>
+          </p:cNvSpPr>
+          <p:nvPr>
+            <p:ph type="sldNum" sz="quarter" idx="5"/>
+          </p:nvPr>
+        </p:nvSpPr>
+        <p:spPr>
+          <a:xfrm>
+            <a:off x="3884613" y="8685213"/>
+            <a:ext cx="2971800" cy="458787"/>
+          </a:xfrm>
+          <a:prstGeom prst="rect">
+            <a:avLst/>
+          </a:prstGeom>
+        </p:spPr>
+        <p:txBody>
+          <a:bodyPr vert="horz" lIns="91440" tIns="45720" rIns="91440" bIns="45720" rtlCol="0" anchor="b"/>
+          <a:lstStyle>
+            <a:lvl1pPr algn="r">
+              <a:defRPr sz="1200"/>
+            </a:lvl1pPr>
+          </a:lstStyle>
+          <a:p>
+            <a:fld id="{B8FD52FC-6FC7-4467-86D7-6099F586D432}" type="slidenum">
+              <a:rPr lang="en-US" smtClean="0"/>
+              <a:t>‹#›</a:t>
+            </a:fld>
+            <a:endParaRPr lang="en-US"/>
+          </a:p>
+        </p:txBody>
+      </p:sp>
+    </p:spTree>
+    <p:extLst>
+      <p:ext uri="{BB962C8B-B14F-4D97-AF65-F5344CB8AC3E}">
+        <p14:creationId xmlns:p14="http://schemas.microsoft.com/office/powerpoint/2010/main" val="3396111447"/>
+      </p:ext>
+    </p:extLst>
+  </p:cSld>
+  <p:clrMap bg1="lt1" tx1="dk1" bg2="lt2" tx2="dk2" accent1="accent1" accent2="accent2" accent3="accent3" accent4="accent4" accent5="accent5" accent6="accent6" hlink="hlink" folHlink="folHlink"/>
+  <p:notesStyle>
+    <a:lvl1pPr marL="0" algn="l" defTabSz="914400" rtl="0" eaLnBrk="1" latinLnBrk="0" hangingPunct="1">
+      <a:defRPr sz="1200" kern="1200">
+        <a:solidFill>
+          <a:schemeClr val="tx1"/>
+        </a:solidFill>
+        <a:latin typeface="+mn-lt"/>
+        <a:ea typeface="+mn-ea"/>
+        <a:cs typeface="+mn-cs"/>
+      </a:defRPr>
+    </a:lvl1pPr>
+    <a:lvl2pPr marL="457200" algn="l" defTabSz="914400" rtl="0" eaLnBrk="1" latinLnBrk="0" hangingPunct="1">
+      <a:defRPr sz="1200" kern="1200">
+        <a:solidFill>
+          <a:schemeClr val="tx1"/>
+        </a:solidFill>
+        <a:latin typeface="+mn-lt"/>
+        <a:ea typeface="+mn-ea"/>
+        <a:cs typeface="+mn-cs"/>
+      </a:defRPr>
+    </a:lvl2pPr>
+    <a:lvl3pPr marL="914400" algn="l" defTabSz="914400" rtl="0" eaLnBrk="1" latinLnBrk="0" hangingPunct="1">
+      <a:defRPr sz="1200" kern="1200">
+        <a:solidFill>
+          <a:schemeClr val="tx1"/>
+        </a:solidFill>
+        <a:latin typeface="+mn-lt"/>
+        <a:ea typeface="+mn-ea"/>
+        <a:cs typeface="+mn-cs"/>
+      </a:defRPr>
+    </a:lvl3pPr>
+    <a:lvl4pPr marL="1371600" algn="l" defTabSz="914400" rtl="0" eaLnBrk="1" latinLnBrk="0" hangingPunct="1">
+      <a:defRPr sz="1200" kern="1200">
+        <a:solidFill>
+          <a:schemeClr val="tx1"/>
+        </a:solidFill>
+        <a:latin typeface="+mn-lt"/>
+        <a:ea typeface="+mn-ea"/>
+        <a:cs typeface="+mn-cs"/>
+      </a:defRPr>
+    </a:lvl4pPr>
+    <a:lvl5pPr marL="1828800" algn="l" defTabSz="914400" rtl="0" eaLnBrk="1" latinLnBrk="0" hangingPunct="1">
+      <a:defRPr sz="1200" kern="1200">
+        <a:solidFill>
+          <a:schemeClr val="tx1"/>
+        </a:solidFill>
+        <a:latin typeface="+mn-lt"/>
+        <a:ea typeface="+mn-ea"/>
+        <a:cs typeface="+mn-cs"/>
+      </a:defRPr>
+    </a:lvl5pPr>
+    <a:lvl6pPr marL="2286000" algn="l" defTabSz="914400" rtl="0" eaLnBrk="1" latinLnBrk="0" hangingPunct="1">
+      <a:defRPr sz="1200" kern="1200">
+        <a:solidFill>
+          <a:schemeClr val="tx1"/>
+        </a:solidFill>
+        <a:latin typeface="+mn-lt"/>
+        <a:ea typeface="+mn-ea"/>
+        <a:cs typeface="+mn-cs"/>
+      </a:defRPr>
+    </a:lvl6pPr>
+    <a:lvl7pPr marL="2743200" algn="l" defTabSz="914400" rtl="0" eaLnBrk="1" latinLnBrk="0" hangingPunct="1">
+      <a:defRPr sz="1200" kern="1200">
+        <a:solidFill>
+          <a:schemeClr val="tx1"/>
+        </a:solidFill>
+        <a:latin typeface="+mn-lt"/>
+        <a:ea typeface="+mn-ea"/>
+        <a:cs typeface="+mn-cs"/>
+      </a:defRPr>
+    </a:lvl7pPr>
+    <a:lvl8pPr marL="3200400" algn="l" defTabSz="914400" rtl="0" eaLnBrk="1" latinLnBrk="0" hangingPunct="1">
+      <a:defRPr sz="1200" kern="1200">
+        <a:solidFill>
+          <a:schemeClr val="tx1"/>
+        </a:solidFill>
+        <a:latin typeface="+mn-lt"/>
+        <a:ea typeface="+mn-ea"/>
+        <a:cs typeface="+mn-cs"/>
+      </a:defRPr>
+    </a:lvl8pPr>
+    <a:lvl9pPr marL="3657600" algn="l" defTabSz="914400" rtl="0" eaLnBrk="1" latinLnBrk="0" hangingPunct="1">
+      <a:defRPr sz="1200" kern="1200">
+        <a:solidFill>
+          <a:schemeClr val="tx1"/>
+        </a:solidFill>
+        <a:latin typeface="+mn-lt"/>
+        <a:ea typeface="+mn-ea"/>
+        <a:cs typeface="+mn-cs"/>
+      </a:defRPr>
+    </a:lvl9pPr>
+  </p:notesStyle>
+</p:notesMaster>
+</file>
+
+<file path=ppt/notesSlides/notesSlide1.xml><?xml version="1.0" encoding="utf-8"?>
+<p:notes xmlns:a="http://schemas.openxmlformats.org/drawingml/2006/main" xmlns:r="http://schemas.openxmlformats.org/officeDocument/2006/relationships" xmlns:p="http://schemas.openxmlformats.org/presentationml/2006/main">
+  <p:cSld>
+    <p:spTree>
+      <p:nvGrpSpPr>
+        <p:cNvPr id="1" name=""/>
+        <p:cNvGrpSpPr/>
+        <p:nvPr/>
+      </p:nvGrpSpPr>
+      <p:grpSpPr>
+        <a:xfrm>
+          <a:off x="0" y="0"/>
+          <a:ext cx="0" cy="0"/>
+          <a:chOff x="0" y="0"/>
+          <a:chExt cx="0" cy="0"/>
+        </a:xfrm>
+      </p:grpSpPr>
+      <p:sp>
+        <p:nvSpPr>
+          <p:cNvPr id="2" name="Slide Image Placeholder 1"/>
+          <p:cNvSpPr>
+            <a:spLocks noGrp="1" noRot="1" noChangeAspect="1"/>
+          </p:cNvSpPr>
+          <p:nvPr>
+            <p:ph type="sldImg"/>
+          </p:nvPr>
+        </p:nvSpPr>
+        <p:spPr/>
+      </p:sp>
+      <p:sp>
+        <p:nvSpPr>
+          <p:cNvPr id="3" name="Notes Placeholder 2"/>
+          <p:cNvSpPr>
+            <a:spLocks noGrp="1"/>
+          </p:cNvSpPr>
+          <p:nvPr>
+            <p:ph type="body" idx="1"/>
+          </p:nvPr>
+        </p:nvSpPr>
+        <p:spPr/>
+        <p:txBody>
+          <a:bodyPr/>
+          <a:lstStyle/>
+          <a:p>
+            <a:r>
+              <a:rPr lang="en-US" dirty="0" smtClean="0"/>
+              <a:t>Wood 2006 = GAM</a:t>
+            </a:r>
+            <a:r>
+              <a:rPr lang="en-US" baseline="0" dirty="0" smtClean="0"/>
+              <a:t> book</a:t>
+            </a:r>
+            <a:endParaRPr lang="en-US" dirty="0"/>
+          </a:p>
+        </p:txBody>
+      </p:sp>
+      <p:sp>
+        <p:nvSpPr>
+          <p:cNvPr id="4" name="Slide Number Placeholder 3"/>
+          <p:cNvSpPr>
+            <a:spLocks noGrp="1"/>
+          </p:cNvSpPr>
+          <p:nvPr>
+            <p:ph type="sldNum" sz="quarter" idx="10"/>
+          </p:nvPr>
+        </p:nvSpPr>
+        <p:spPr/>
+        <p:txBody>
+          <a:bodyPr/>
+          <a:lstStyle/>
+          <a:p>
+            <a:fld id="{B8FD52FC-6FC7-4467-86D7-6099F586D432}" type="slidenum">
+              <a:rPr lang="en-US" smtClean="0"/>
+              <a:t>7</a:t>
+            </a:fld>
+            <a:endParaRPr lang="en-US"/>
+          </a:p>
+        </p:txBody>
+      </p:sp>
+    </p:spTree>
+    <p:extLst>
+      <p:ext uri="{BB962C8B-B14F-4D97-AF65-F5344CB8AC3E}">
+        <p14:creationId xmlns:p14="http://schemas.microsoft.com/office/powerpoint/2010/main" val="1865155953"/>
+      </p:ext>
+    </p:extLst>
+  </p:cSld>
+  <p:clrMapOvr>
+    <a:masterClrMapping/>
+  </p:clrMapOvr>
+</p:notes>
+</file>
+
 <file path=ppt/slideLayouts/slideLayout1.xml><?xml version="1.0" encoding="utf-8"?>
 <p:sldLayout xmlns:a="http://schemas.openxmlformats.org/drawingml/2006/main" xmlns:r="http://schemas.openxmlformats.org/officeDocument/2006/relationships" xmlns:p="http://schemas.openxmlformats.org/presentationml/2006/main" type="title" preserve="1">
   <p:cSld name="Title Slide">
@@ -249,7 +694,7 @@
           <a:p>
             <a:fld id="{DBB772DE-1C71-4C15-94E7-A563D3B8A110}" type="datetimeFigureOut">
               <a:rPr lang="en-US" smtClean="0"/>
-              <a:t>12/5/2021</a:t>
+              <a:t>12/6/2021</a:t>
             </a:fld>
             <a:endParaRPr lang="en-US"/>
           </a:p>
@@ -419,7 +864,7 @@
           <a:p>
             <a:fld id="{DBB772DE-1C71-4C15-94E7-A563D3B8A110}" type="datetimeFigureOut">
               <a:rPr lang="en-US" smtClean="0"/>
-              <a:t>12/5/2021</a:t>
+              <a:t>12/6/2021</a:t>
             </a:fld>
             <a:endParaRPr lang="en-US"/>
           </a:p>
@@ -599,7 +1044,7 @@
           <a:p>
             <a:fld id="{DBB772DE-1C71-4C15-94E7-A563D3B8A110}" type="datetimeFigureOut">
               <a:rPr lang="en-US" smtClean="0"/>
-              <a:t>12/5/2021</a:t>
+              <a:t>12/6/2021</a:t>
             </a:fld>
             <a:endParaRPr lang="en-US"/>
           </a:p>
@@ -769,7 +1214,7 @@
           <a:p>
             <a:fld id="{DBB772DE-1C71-4C15-94E7-A563D3B8A110}" type="datetimeFigureOut">
               <a:rPr lang="en-US" smtClean="0"/>
-              <a:t>12/5/2021</a:t>
+              <a:t>12/6/2021</a:t>
             </a:fld>
             <a:endParaRPr lang="en-US"/>
           </a:p>
@@ -1015,7 +1460,7 @@
           <a:p>
             <a:fld id="{DBB772DE-1C71-4C15-94E7-A563D3B8A110}" type="datetimeFigureOut">
               <a:rPr lang="en-US" smtClean="0"/>
-              <a:t>12/5/2021</a:t>
+              <a:t>12/6/2021</a:t>
             </a:fld>
             <a:endParaRPr lang="en-US"/>
           </a:p>
@@ -1247,7 +1692,7 @@
           <a:p>
             <a:fld id="{DBB772DE-1C71-4C15-94E7-A563D3B8A110}" type="datetimeFigureOut">
               <a:rPr lang="en-US" smtClean="0"/>
-              <a:t>12/5/2021</a:t>
+              <a:t>12/6/2021</a:t>
             </a:fld>
             <a:endParaRPr lang="en-US"/>
           </a:p>
@@ -1614,7 +2059,7 @@
           <a:p>
             <a:fld id="{DBB772DE-1C71-4C15-94E7-A563D3B8A110}" type="datetimeFigureOut">
               <a:rPr lang="en-US" smtClean="0"/>
-              <a:t>12/5/2021</a:t>
+              <a:t>12/6/2021</a:t>
             </a:fld>
             <a:endParaRPr lang="en-US"/>
           </a:p>
@@ -1732,7 +2177,7 @@
           <a:p>
             <a:fld id="{DBB772DE-1C71-4C15-94E7-A563D3B8A110}" type="datetimeFigureOut">
               <a:rPr lang="en-US" smtClean="0"/>
-              <a:t>12/5/2021</a:t>
+              <a:t>12/6/2021</a:t>
             </a:fld>
             <a:endParaRPr lang="en-US"/>
           </a:p>
@@ -1827,7 +2272,7 @@
           <a:p>
             <a:fld id="{DBB772DE-1C71-4C15-94E7-A563D3B8A110}" type="datetimeFigureOut">
               <a:rPr lang="en-US" smtClean="0"/>
-              <a:t>12/5/2021</a:t>
+              <a:t>12/6/2021</a:t>
             </a:fld>
             <a:endParaRPr lang="en-US"/>
           </a:p>
@@ -2104,7 +2549,7 @@
           <a:p>
             <a:fld id="{DBB772DE-1C71-4C15-94E7-A563D3B8A110}" type="datetimeFigureOut">
               <a:rPr lang="en-US" smtClean="0"/>
-              <a:t>12/5/2021</a:t>
+              <a:t>12/6/2021</a:t>
             </a:fld>
             <a:endParaRPr lang="en-US"/>
           </a:p>
@@ -2357,7 +2802,7 @@
           <a:p>
             <a:fld id="{DBB772DE-1C71-4C15-94E7-A563D3B8A110}" type="datetimeFigureOut">
               <a:rPr lang="en-US" smtClean="0"/>
-              <a:t>12/5/2021</a:t>
+              <a:t>12/6/2021</a:t>
             </a:fld>
             <a:endParaRPr lang="en-US"/>
           </a:p>
@@ -2570,7 +3015,7 @@
           <a:p>
             <a:fld id="{DBB772DE-1C71-4C15-94E7-A563D3B8A110}" type="datetimeFigureOut">
               <a:rPr lang="en-US" smtClean="0"/>
-              <a:t>12/5/2021</a:t>
+              <a:t>12/6/2021</a:t>
             </a:fld>
             <a:endParaRPr lang="en-US"/>
           </a:p>
@@ -2992,15 +3437,7 @@
           <a:p>
             <a:r>
               <a:rPr lang="en-US" dirty="0" smtClean="0"/>
-              <a:t>Overview of </a:t>
-            </a:r>
-            <a:r>
-              <a:rPr lang="en-US" dirty="0" smtClean="0"/>
-              <a:t>Regression </a:t>
-            </a:r>
-            <a:r>
-              <a:rPr lang="en-US" dirty="0" smtClean="0"/>
-              <a:t>Models</a:t>
+              <a:t>Overview of Regression Models</a:t>
             </a:r>
             <a:endParaRPr lang="en-US" dirty="0"/>
           </a:p>
@@ -3109,29 +3546,26 @@
             </a:r>
             <a:r>
               <a:rPr lang="en-US" dirty="0" smtClean="0"/>
-              <a:t>regression </a:t>
+              <a:t>different types of </a:t>
             </a:r>
             <a:r>
               <a:rPr lang="en-US" dirty="0" smtClean="0"/>
-              <a:t>models</a:t>
-            </a:r>
+              <a:t>regression models (LM, LMM, GLM, GLMM, GAM, GAMM)</a:t>
+            </a:r>
+            <a:endParaRPr lang="en-US" dirty="0" smtClean="0"/>
           </a:p>
           <a:p>
             <a:r>
               <a:rPr lang="en-US" dirty="0" smtClean="0"/>
-              <a:t>Develop intuition for determining when a </a:t>
+              <a:t>Develop intuition for determining when a regression model might help to provide insight into a </a:t>
             </a:r>
             <a:r>
               <a:rPr lang="en-US" dirty="0" smtClean="0"/>
-              <a:t>regression</a:t>
+              <a:t>specific question</a:t>
             </a:r>
             <a:r>
               <a:rPr lang="en-US" dirty="0" smtClean="0"/>
-              <a:t> </a:t>
-            </a:r>
-            <a:r>
-              <a:rPr lang="en-US" dirty="0" smtClean="0"/>
-              <a:t>model might help to provide insight into a question, given a particular dataset</a:t>
+              <a:t>, given a particular dataset</a:t>
             </a:r>
           </a:p>
           <a:p>
@@ -3143,16 +3577,13 @@
           <a:p>
             <a:r>
               <a:rPr lang="en-US" dirty="0" smtClean="0"/>
-              <a:t>Learn basic R programming for </a:t>
+              <a:t>Learn basic R programming for regression </a:t>
             </a:r>
             <a:r>
               <a:rPr lang="en-US" dirty="0" smtClean="0"/>
-              <a:t>regression </a:t>
-            </a:r>
-            <a:r>
-              <a:rPr lang="en-US" dirty="0" smtClean="0"/>
-              <a:t>models</a:t>
-            </a:r>
+              <a:t>models based on familiar case studies</a:t>
+            </a:r>
+            <a:endParaRPr lang="en-US" dirty="0" smtClean="0"/>
           </a:p>
           <a:p>
             <a:r>
@@ -3249,14 +3680,32 @@
           <a:p>
             <a:r>
               <a:rPr lang="en-US" dirty="0" smtClean="0"/>
-              <a:t>Model diagnostics (assessing model fit)</a:t>
-            </a:r>
-          </a:p>
-          <a:p>
+              <a:t>Model </a:t>
+            </a:r>
             <a:r>
               <a:rPr lang="en-US" dirty="0" smtClean="0"/>
-              <a:t>Model selection (choosing among a suite of similar models)</a:t>
-            </a:r>
+              <a:t>diagnostics: assessing a model’s fit to the data</a:t>
+            </a:r>
+            <a:endParaRPr lang="en-US" dirty="0" smtClean="0"/>
+          </a:p>
+          <a:p>
+            <a:r>
+              <a:rPr lang="en-US" dirty="0" smtClean="0"/>
+              <a:t>Model </a:t>
+            </a:r>
+            <a:r>
+              <a:rPr lang="en-US" dirty="0" smtClean="0"/>
+              <a:t>selection: comparing a </a:t>
+            </a:r>
+            <a:r>
+              <a:rPr lang="en-US" dirty="0" smtClean="0"/>
+              <a:t>suite of similar </a:t>
+            </a:r>
+            <a:r>
+              <a:rPr lang="en-US" dirty="0" smtClean="0"/>
+              <a:t>models fit to the data</a:t>
+            </a:r>
+            <a:endParaRPr lang="en-US" dirty="0" smtClean="0"/>
           </a:p>
           <a:p>
             <a:r>
@@ -3273,8 +3722,13 @@
           <a:p>
             <a:r>
               <a:rPr lang="en-US" dirty="0" smtClean="0"/>
-              <a:t>Maximum likelihood estimation </a:t>
-            </a:r>
+              <a:t>Maximum likelihood </a:t>
+            </a:r>
+            <a:r>
+              <a:rPr lang="en-US" dirty="0" smtClean="0"/>
+              <a:t>inference</a:t>
+            </a:r>
+            <a:endParaRPr lang="en-US" dirty="0" smtClean="0"/>
           </a:p>
           <a:p>
             <a:r>
@@ -3332,11 +3786,7 @@
           <a:p>
             <a:r>
               <a:rPr lang="en-US" dirty="0" smtClean="0"/>
-              <a:t>Types of </a:t>
-            </a:r>
-            <a:r>
-              <a:rPr lang="en-US" dirty="0" smtClean="0"/>
-              <a:t>Regression Models Covered</a:t>
+              <a:t>Types of Regression Models Covered</a:t>
             </a:r>
             <a:endParaRPr lang="en-US" dirty="0"/>
           </a:p>
@@ -3361,63 +3811,125 @@
           <a:p>
             <a:r>
               <a:rPr lang="en-US" dirty="0" smtClean="0"/>
-              <a:t>Linear model </a:t>
+              <a:t>Linear </a:t>
             </a:r>
             <a:r>
               <a:rPr lang="en-US" dirty="0" smtClean="0"/>
-              <a:t>(LM)</a:t>
-            </a:r>
+              <a:t>model: LM</a:t>
+            </a:r>
+            <a:endParaRPr lang="en-US" dirty="0" smtClean="0"/>
           </a:p>
           <a:p>
             <a:r>
               <a:rPr lang="en-US" dirty="0" smtClean="0"/>
-              <a:t>Linear mixed model (LMM)</a:t>
-            </a:r>
+              <a:t>Linear mixed </a:t>
+            </a:r>
+            <a:r>
+              <a:rPr lang="en-US" dirty="0" smtClean="0"/>
+              <a:t>model: LMM</a:t>
+            </a:r>
+            <a:endParaRPr lang="en-US" dirty="0"/>
           </a:p>
           <a:p>
             <a:pPr lvl="1"/>
             <a:r>
               <a:rPr lang="en-US" dirty="0" smtClean="0"/>
-              <a:t>Equivalently, “linear mixed effects model”</a:t>
-            </a:r>
-          </a:p>
-          <a:p>
+              <a:t>Sometimes called </a:t>
+            </a:r>
             <a:r>
               <a:rPr lang="en-US" dirty="0" smtClean="0"/>
-              <a:t>Generalized linear model (GLM)</a:t>
-            </a:r>
-          </a:p>
-          <a:p>
+              <a:t>“linear </a:t>
+            </a:r>
             <a:r>
               <a:rPr lang="en-US" dirty="0" smtClean="0"/>
-              <a:t>Generalized linear mixed model (GLMM)</a:t>
-            </a:r>
+              <a:t>mixed effects model”</a:t>
+            </a:r>
+          </a:p>
+          <a:p>
+            <a:r>
+              <a:rPr lang="en-US" dirty="0" smtClean="0"/>
+              <a:t>Generalized linear </a:t>
+            </a:r>
+            <a:r>
+              <a:rPr lang="en-US" dirty="0" smtClean="0"/>
+              <a:t>model: GLM</a:t>
+            </a:r>
+            <a:endParaRPr lang="en-US" dirty="0" smtClean="0"/>
+          </a:p>
+          <a:p>
+            <a:r>
+              <a:rPr lang="en-US" dirty="0" smtClean="0"/>
+              <a:t>Generalized linear mixed </a:t>
+            </a:r>
+            <a:r>
+              <a:rPr lang="en-US" dirty="0" smtClean="0"/>
+              <a:t>model: GLMM</a:t>
+            </a:r>
+            <a:endParaRPr lang="en-US" dirty="0"/>
           </a:p>
           <a:p>
             <a:pPr lvl="1"/>
             <a:r>
               <a:rPr lang="en-US" dirty="0" smtClean="0"/>
-              <a:t>Equivalently, “generalized linear mixed effects model” or “hierarchical generalized linear model” (HGLM)</a:t>
-            </a:r>
-          </a:p>
-          <a:p>
+              <a:t>Sometimes called </a:t>
+            </a:r>
             <a:r>
               <a:rPr lang="en-US" dirty="0" smtClean="0"/>
-              <a:t>Generalized additive model (GAM)</a:t>
-            </a:r>
-          </a:p>
-          <a:p>
+              <a:t>“generalized </a:t>
+            </a:r>
             <a:r>
               <a:rPr lang="en-US" dirty="0" smtClean="0"/>
-              <a:t>Generalized additive mixed model (GAMM)</a:t>
+              <a:t>linear mixed effects model</a:t>
+            </a:r>
+            <a:r>
+              <a:rPr lang="en-US" dirty="0" smtClean="0"/>
+              <a:t>” or “hierarchical </a:t>
+            </a:r>
+            <a:r>
+              <a:rPr lang="en-US" dirty="0" smtClean="0"/>
+              <a:t>generalized linear model” (HGLM)</a:t>
+            </a:r>
+          </a:p>
+          <a:p>
+            <a:r>
+              <a:rPr lang="en-US" dirty="0" smtClean="0"/>
+              <a:t>Generalized additive </a:t>
+            </a:r>
+            <a:r>
+              <a:rPr lang="en-US" dirty="0" smtClean="0"/>
+              <a:t>model: GAM</a:t>
+            </a:r>
+            <a:endParaRPr lang="en-US" dirty="0" smtClean="0"/>
+          </a:p>
+          <a:p>
+            <a:r>
+              <a:rPr lang="en-US" dirty="0" smtClean="0"/>
+              <a:t>Generalized additive mixed </a:t>
+            </a:r>
+            <a:r>
+              <a:rPr lang="en-US" dirty="0" smtClean="0"/>
+              <a:t>model: GAMM</a:t>
             </a:r>
           </a:p>
           <a:p>
             <a:pPr lvl="1"/>
             <a:r>
               <a:rPr lang="en-US" dirty="0" smtClean="0"/>
-              <a:t>Equivalently, “hierarchical generalized additive model” HGAM</a:t>
-            </a:r>
+              <a:t>Sometimes called </a:t>
+            </a:r>
+            <a:r>
+              <a:rPr lang="en-US" dirty="0" smtClean="0"/>
+              <a:t>“hierarchical </a:t>
+            </a:r>
+            <a:r>
+              <a:rPr lang="en-US" dirty="0" smtClean="0"/>
+              <a:t>generalized additive model” </a:t>
+            </a:r>
+            <a:r>
+              <a:rPr lang="en-US" dirty="0" smtClean="0"/>
+              <a:t>(HGAM)</a:t>
+            </a:r>
+            <a:endParaRPr lang="en-US" dirty="0" smtClean="0"/>
           </a:p>
           <a:p>
             <a:endParaRPr lang="en-US" dirty="0" smtClean="0"/>
@@ -3468,13 +3980,13 @@
               <p:nvPr>
                 <p:extLst>
                   <p:ext uri="{D42A27DB-BD31-4B8C-83A1-F6EECF244321}">
-                    <p14:modId xmlns:p14="http://schemas.microsoft.com/office/powerpoint/2010/main" val="76184395"/>
+                    <p14:modId xmlns:p14="http://schemas.microsoft.com/office/powerpoint/2010/main" val="4110584709"/>
                   </p:ext>
                 </p:extLst>
               </p:nvPr>
             </p:nvGraphicFramePr>
             <p:xfrm>
-              <a:off x="2032000" y="719666"/>
+              <a:off x="2032000" y="1703806"/>
               <a:ext cx="8128000" cy="3309239"/>
             </p:xfrm>
             <a:graphic>
@@ -4089,13 +4601,13 @@
               <p:nvPr>
                 <p:extLst>
                   <p:ext uri="{D42A27DB-BD31-4B8C-83A1-F6EECF244321}">
-                    <p14:modId xmlns:p14="http://schemas.microsoft.com/office/powerpoint/2010/main" val="76184395"/>
+                    <p14:modId xmlns:p14="http://schemas.microsoft.com/office/powerpoint/2010/main" val="4110584709"/>
                   </p:ext>
                 </p:extLst>
               </p:nvPr>
             </p:nvGraphicFramePr>
             <p:xfrm>
-              <a:off x="2032000" y="719666"/>
+              <a:off x="2032000" y="1703806"/>
               <a:ext cx="8128000" cy="3309239"/>
             </p:xfrm>
             <a:graphic>
@@ -4299,7 +4811,7 @@
                         <a:blipFill>
                           <a:blip r:embed="rId2"/>
                           <a:stretch>
-                            <a:fillRect l="-100601" t="-165333" r="-200901" b="-110667"/>
+                            <a:fillRect l="-100601" t="-164238" r="-200901" b="-109272"/>
                           </a:stretch>
                         </a:blipFill>
                       </a:tcPr>
@@ -4367,7 +4879,7 @@
                         <a:blipFill>
                           <a:blip r:embed="rId2"/>
                           <a:stretch>
-                            <a:fillRect l="-100601" t="-265333" r="-200901" b="-10667"/>
+                            <a:fillRect l="-100601" t="-266000" r="-200901" b="-10000"/>
                           </a:stretch>
                         </a:blipFill>
                       </a:tcPr>
@@ -4418,8 +4930,8 @@
           </p:graphicFrame>
         </mc:Fallback>
       </mc:AlternateContent>
-      <mc:AlternateContent xmlns:mc="http://schemas.openxmlformats.org/markup-compatibility/2006" xmlns:a14="http://schemas.microsoft.com/office/drawing/2010/main">
-        <mc:Choice Requires="a14">
+      <mc:AlternateContent xmlns:mc="http://schemas.openxmlformats.org/markup-compatibility/2006">
+        <mc:Choice xmlns:a14="http://schemas.microsoft.com/office/drawing/2010/main" Requires="a14">
           <p:sp>
             <p:nvSpPr>
               <p:cNvPr id="5" name="Rectangle 4"/>
@@ -4428,7 +4940,7 @@
             </p:nvSpPr>
             <p:spPr>
               <a:xfrm>
-                <a:off x="4069580" y="4476786"/>
+                <a:off x="4069580" y="5460926"/>
                 <a:ext cx="4052841" cy="646331"/>
               </a:xfrm>
               <a:prstGeom prst="rect">
@@ -4584,7 +5096,7 @@
             </p:txBody>
           </p:sp>
         </mc:Choice>
-        <mc:Fallback xmlns="">
+        <mc:Fallback>
           <p:sp>
             <p:nvSpPr>
               <p:cNvPr id="5" name="Rectangle 4"/>
@@ -4595,7 +5107,7 @@
             </p:nvSpPr>
             <p:spPr>
               <a:xfrm>
-                <a:off x="4069580" y="4476786"/>
+                <a:off x="4069580" y="5460926"/>
                 <a:ext cx="4052841" cy="646331"/>
               </a:xfrm>
               <a:prstGeom prst="rect">
@@ -4604,7 +5116,7 @@
               <a:blipFill>
                 <a:blip r:embed="rId3"/>
                 <a:stretch>
-                  <a:fillRect l="-452" t="-4717" b="-14151"/>
+                  <a:fillRect l="-452" t="-5660" b="-14151"/>
                 </a:stretch>
               </a:blipFill>
             </p:spPr>
@@ -4623,6 +5135,31 @@
           </p:sp>
         </mc:Fallback>
       </mc:AlternateContent>
+      <p:sp>
+        <p:nvSpPr>
+          <p:cNvPr id="2" name="Title 1"/>
+          <p:cNvSpPr>
+            <a:spLocks noGrp="1"/>
+          </p:cNvSpPr>
+          <p:nvPr>
+            <p:ph type="title"/>
+          </p:nvPr>
+        </p:nvSpPr>
+        <p:spPr/>
+        <p:txBody>
+          <a:bodyPr>
+            <a:normAutofit/>
+          </a:bodyPr>
+          <a:lstStyle/>
+          <a:p>
+            <a:r>
+              <a:rPr lang="en-US" sz="4000" dirty="0" smtClean="0"/>
+              <a:t>Regression Model Distinguishing Characteristics</a:t>
+            </a:r>
+            <a:endParaRPr lang="en-US" sz="4000" dirty="0"/>
+          </a:p>
+        </p:txBody>
+      </p:sp>
     </p:spTree>
     <p:extLst>
       <p:ext uri="{BB962C8B-B14F-4D97-AF65-F5344CB8AC3E}">
@@ -4894,11 +5431,7 @@
           <a:p>
             <a:r>
               <a:rPr lang="en-US" dirty="0" smtClean="0"/>
-              <a:t>Linear </a:t>
-            </a:r>
-            <a:r>
-              <a:rPr lang="en-US" dirty="0" smtClean="0"/>
-              <a:t>Model</a:t>
+              <a:t>Linear Model</a:t>
             </a:r>
             <a:endParaRPr lang="en-US" dirty="0"/>
           </a:p>
@@ -5060,8 +5593,8 @@
           </a:p>
         </p:txBody>
       </p:sp>
-      <mc:AlternateContent xmlns:mc="http://schemas.openxmlformats.org/markup-compatibility/2006">
-        <mc:Choice xmlns:a14="http://schemas.microsoft.com/office/drawing/2010/main" Requires="a14">
+      <mc:AlternateContent xmlns:mc="http://schemas.openxmlformats.org/markup-compatibility/2006" xmlns:a14="http://schemas.microsoft.com/office/drawing/2010/main">
+        <mc:Choice Requires="a14">
           <p:sp>
             <p:nvSpPr>
               <p:cNvPr id="11" name="TextBox 10"/>
@@ -5091,21 +5624,8 @@
                       <a:srgbClr val="7030A0"/>
                     </a:solidFill>
                   </a:rPr>
-                  <a:t>smooth functions in </a:t>
+                  <a:t>smooth functions in predictor</a:t>
                 </a:r>
-                <a:r>
-                  <a:rPr lang="en-US" sz="1400" dirty="0" smtClean="0">
-                    <a:solidFill>
-                      <a:srgbClr val="7030A0"/>
-                    </a:solidFill>
-                  </a:rPr>
-                  <a:t>predictor</a:t>
-                </a:r>
-                <a:endParaRPr lang="en-US" sz="1400" dirty="0" smtClean="0">
-                  <a:solidFill>
-                    <a:srgbClr val="7030A0"/>
-                  </a:solidFill>
-                </a:endParaRPr>
               </a:p>
               <a:p>
                 <a:pPr algn="ctr"/>
@@ -5261,7 +5781,7 @@
             </p:txBody>
           </p:sp>
         </mc:Choice>
-        <mc:Fallback>
+        <mc:Fallback xmlns="">
           <p:sp>
             <p:nvSpPr>
               <p:cNvPr id="11" name="TextBox 10"/>
@@ -5355,8 +5875,8 @@
           </a:p>
         </p:txBody>
       </p:sp>
-      <mc:AlternateContent xmlns:mc="http://schemas.openxmlformats.org/markup-compatibility/2006">
-        <mc:Choice xmlns:a14="http://schemas.microsoft.com/office/drawing/2010/main" Requires="a14">
+      <mc:AlternateContent xmlns:mc="http://schemas.openxmlformats.org/markup-compatibility/2006" xmlns:a14="http://schemas.microsoft.com/office/drawing/2010/main">
+        <mc:Choice Requires="a14">
           <p:sp>
             <p:nvSpPr>
               <p:cNvPr id="13" name="TextBox 12"/>
@@ -5386,21 +5906,8 @@
                       <a:srgbClr val="7030A0"/>
                     </a:solidFill>
                   </a:rPr>
-                  <a:t>smooth functions in </a:t>
+                  <a:t>smooth functions in predictor</a:t>
                 </a:r>
-                <a:r>
-                  <a:rPr lang="en-US" sz="1400" dirty="0" smtClean="0">
-                    <a:solidFill>
-                      <a:srgbClr val="7030A0"/>
-                    </a:solidFill>
-                  </a:rPr>
-                  <a:t>predictor</a:t>
-                </a:r>
-                <a:endParaRPr lang="en-US" sz="1400" dirty="0" smtClean="0">
-                  <a:solidFill>
-                    <a:srgbClr val="7030A0"/>
-                  </a:solidFill>
-                </a:endParaRPr>
               </a:p>
               <a:p>
                 <a:pPr algn="ctr"/>
@@ -5556,7 +6063,7 @@
             </p:txBody>
           </p:sp>
         </mc:Choice>
-        <mc:Fallback>
+        <mc:Fallback xmlns="">
           <p:sp>
             <p:nvSpPr>
               <p:cNvPr id="13" name="TextBox 12"/>
@@ -5994,32 +6501,820 @@
           <a:p>
             <a:r>
               <a:rPr lang="en-US" dirty="0" smtClean="0"/>
-              <a:t>Linear </a:t>
+              <a:t>Simple Linear </a:t>
             </a:r>
             <a:r>
               <a:rPr lang="en-US" dirty="0" smtClean="0"/>
-              <a:t>Model (LM)</a:t>
+              <a:t>Model (LM</a:t>
+            </a:r>
+            <a:r>
+              <a:rPr lang="en-US" dirty="0" smtClean="0"/>
+              <a:t>): Formal Definition</a:t>
             </a:r>
             <a:endParaRPr lang="en-US" dirty="0"/>
           </a:p>
         </p:txBody>
       </p:sp>
-      <p:sp>
-        <p:nvSpPr>
-          <p:cNvPr id="3" name="Content Placeholder 2"/>
-          <p:cNvSpPr>
-            <a:spLocks noGrp="1"/>
-          </p:cNvSpPr>
-          <p:nvPr>
-            <p:ph idx="1"/>
-          </p:nvPr>
-        </p:nvSpPr>
-        <p:spPr/>
-        <p:txBody>
-          <a:bodyPr/>
-          <a:lstStyle/>
-          <a:p>
-            <a:endParaRPr lang="en-US"/>
+      <mc:AlternateContent xmlns:mc="http://schemas.openxmlformats.org/markup-compatibility/2006">
+        <mc:Choice xmlns:a14="http://schemas.microsoft.com/office/drawing/2010/main" Requires="a14">
+          <p:sp>
+            <p:nvSpPr>
+              <p:cNvPr id="3" name="Content Placeholder 2"/>
+              <p:cNvSpPr>
+                <a:spLocks noGrp="1"/>
+              </p:cNvSpPr>
+              <p:nvPr>
+                <p:ph idx="1"/>
+              </p:nvPr>
+            </p:nvSpPr>
+            <p:spPr/>
+            <p:txBody>
+              <a:bodyPr/>
+              <a:lstStyle/>
+              <a:p>
+                <a:pPr marL="0" indent="0">
+                  <a:buNone/>
+                </a:pPr>
+                <a:r>
+                  <a:rPr lang="en-US" dirty="0" smtClean="0"/>
+                  <a:t>Formally, consider </a:t>
+                </a:r>
+                <a14:m>
+                  <m:oMath xmlns:m="http://schemas.openxmlformats.org/officeDocument/2006/math">
+                    <m:r>
+                      <a:rPr lang="en-US" b="0" i="1" smtClean="0">
+                        <a:latin typeface="Cambria Math" panose="02040503050406030204" pitchFamily="18" charset="0"/>
+                      </a:rPr>
+                      <m:t>𝑛</m:t>
+                    </m:r>
+                  </m:oMath>
+                </a14:m>
+                <a:r>
+                  <a:rPr lang="en-US" dirty="0" smtClean="0"/>
+                  <a:t> </a:t>
+                </a:r>
+                <a:r>
+                  <a:rPr lang="en-US" dirty="0" smtClean="0">
+                    <a:solidFill>
+                      <a:srgbClr val="0070C0"/>
+                    </a:solidFill>
+                  </a:rPr>
+                  <a:t>observations</a:t>
+                </a:r>
+                <a:r>
+                  <a:rPr lang="en-US" dirty="0" smtClean="0"/>
+                  <a:t>, </a:t>
+                </a:r>
+                <a14:m>
+                  <m:oMath xmlns:m="http://schemas.openxmlformats.org/officeDocument/2006/math">
+                    <m:sSub>
+                      <m:sSubPr>
+                        <m:ctrlPr>
+                          <a:rPr lang="en-US" i="1" smtClean="0">
+                            <a:latin typeface="Cambria Math" panose="02040503050406030204" pitchFamily="18" charset="0"/>
+                          </a:rPr>
+                        </m:ctrlPr>
+                      </m:sSubPr>
+                      <m:e>
+                        <m:r>
+                          <a:rPr lang="en-US" b="0" i="1" smtClean="0">
+                            <a:latin typeface="Cambria Math" panose="02040503050406030204" pitchFamily="18" charset="0"/>
+                          </a:rPr>
+                          <m:t>𝑥</m:t>
+                        </m:r>
+                      </m:e>
+                      <m:sub>
+                        <m:r>
+                          <a:rPr lang="en-US" b="0" i="1" smtClean="0">
+                            <a:latin typeface="Cambria Math" panose="02040503050406030204" pitchFamily="18" charset="0"/>
+                          </a:rPr>
+                          <m:t>𝑖</m:t>
+                        </m:r>
+                      </m:sub>
+                    </m:sSub>
+                  </m:oMath>
+                </a14:m>
+                <a:r>
+                  <a:rPr lang="en-US" dirty="0" smtClean="0"/>
+                  <a:t>, </a:t>
+                </a:r>
+                <a14:m>
+                  <m:oMath xmlns:m="http://schemas.openxmlformats.org/officeDocument/2006/math">
+                    <m:sSub>
+                      <m:sSubPr>
+                        <m:ctrlPr>
+                          <a:rPr lang="en-US" i="1">
+                            <a:latin typeface="Cambria Math" panose="02040503050406030204" pitchFamily="18" charset="0"/>
+                          </a:rPr>
+                        </m:ctrlPr>
+                      </m:sSubPr>
+                      <m:e>
+                        <m:r>
+                          <a:rPr lang="en-US" b="0" i="1" smtClean="0">
+                            <a:latin typeface="Cambria Math" panose="02040503050406030204" pitchFamily="18" charset="0"/>
+                          </a:rPr>
+                          <m:t>𝑦</m:t>
+                        </m:r>
+                      </m:e>
+                      <m:sub>
+                        <m:r>
+                          <a:rPr lang="en-US" i="1">
+                            <a:latin typeface="Cambria Math" panose="02040503050406030204" pitchFamily="18" charset="0"/>
+                          </a:rPr>
+                          <m:t>𝑖</m:t>
+                        </m:r>
+                      </m:sub>
+                    </m:sSub>
+                  </m:oMath>
+                </a14:m>
+                <a:r>
+                  <a:rPr lang="en-US" dirty="0" smtClean="0"/>
+                  <a:t>, where </a:t>
+                </a:r>
+                <a14:m>
+                  <m:oMath xmlns:m="http://schemas.openxmlformats.org/officeDocument/2006/math">
+                    <m:sSub>
+                      <m:sSubPr>
+                        <m:ctrlPr>
+                          <a:rPr lang="en-US" i="1">
+                            <a:latin typeface="Cambria Math" panose="02040503050406030204" pitchFamily="18" charset="0"/>
+                          </a:rPr>
+                        </m:ctrlPr>
+                      </m:sSubPr>
+                      <m:e>
+                        <m:r>
+                          <a:rPr lang="en-US" i="1">
+                            <a:latin typeface="Cambria Math" panose="02040503050406030204" pitchFamily="18" charset="0"/>
+                          </a:rPr>
+                          <m:t>𝑦</m:t>
+                        </m:r>
+                      </m:e>
+                      <m:sub>
+                        <m:r>
+                          <a:rPr lang="en-US" i="1">
+                            <a:latin typeface="Cambria Math" panose="02040503050406030204" pitchFamily="18" charset="0"/>
+                          </a:rPr>
+                          <m:t>𝑖</m:t>
+                        </m:r>
+                      </m:sub>
+                    </m:sSub>
+                  </m:oMath>
+                </a14:m>
+                <a:r>
+                  <a:rPr lang="en-US" dirty="0" smtClean="0"/>
+                  <a:t> is an observation on </a:t>
+                </a:r>
+                <a:r>
+                  <a:rPr lang="en-US" dirty="0" smtClean="0">
+                    <a:solidFill>
+                      <a:srgbClr val="0070C0"/>
+                    </a:solidFill>
+                  </a:rPr>
+                  <a:t>random variable</a:t>
+                </a:r>
+                <a:r>
+                  <a:rPr lang="en-US" dirty="0" smtClean="0"/>
+                  <a:t>, </a:t>
+                </a:r>
+                <a14:m>
+                  <m:oMath xmlns:m="http://schemas.openxmlformats.org/officeDocument/2006/math">
+                    <m:sSub>
+                      <m:sSubPr>
+                        <m:ctrlPr>
+                          <a:rPr lang="en-US" i="1">
+                            <a:latin typeface="Cambria Math" panose="02040503050406030204" pitchFamily="18" charset="0"/>
+                          </a:rPr>
+                        </m:ctrlPr>
+                      </m:sSubPr>
+                      <m:e>
+                        <m:r>
+                          <a:rPr lang="en-US" b="0" i="1" smtClean="0">
+                            <a:latin typeface="Cambria Math" panose="02040503050406030204" pitchFamily="18" charset="0"/>
+                          </a:rPr>
+                          <m:t>𝑌</m:t>
+                        </m:r>
+                      </m:e>
+                      <m:sub>
+                        <m:r>
+                          <a:rPr lang="en-US" i="1">
+                            <a:latin typeface="Cambria Math" panose="02040503050406030204" pitchFamily="18" charset="0"/>
+                          </a:rPr>
+                          <m:t>𝑖</m:t>
+                        </m:r>
+                      </m:sub>
+                    </m:sSub>
+                  </m:oMath>
+                </a14:m>
+                <a:r>
+                  <a:rPr lang="en-US" dirty="0" smtClean="0"/>
+                  <a:t>, with </a:t>
+                </a:r>
+                <a:r>
+                  <a:rPr lang="en-US" dirty="0" smtClean="0">
+                    <a:solidFill>
+                      <a:srgbClr val="0070C0"/>
+                    </a:solidFill>
+                  </a:rPr>
+                  <a:t>expectation</a:t>
+                </a:r>
+                <a:r>
+                  <a:rPr lang="en-US" dirty="0" smtClean="0"/>
+                  <a:t> </a:t>
+                </a:r>
+                <a14:m>
+                  <m:oMath xmlns:m="http://schemas.openxmlformats.org/officeDocument/2006/math">
+                    <m:sSub>
+                      <m:sSubPr>
+                        <m:ctrlPr>
+                          <a:rPr lang="en-US" i="1">
+                            <a:latin typeface="Cambria Math" panose="02040503050406030204" pitchFamily="18" charset="0"/>
+                          </a:rPr>
+                        </m:ctrlPr>
+                      </m:sSubPr>
+                      <m:e>
+                        <m:r>
+                          <a:rPr lang="en-US" i="1" smtClean="0">
+                            <a:latin typeface="Cambria Math" panose="02040503050406030204" pitchFamily="18" charset="0"/>
+                            <a:ea typeface="Cambria Math" panose="02040503050406030204" pitchFamily="18" charset="0"/>
+                          </a:rPr>
+                          <m:t>𝜇</m:t>
+                        </m:r>
+                      </m:e>
+                      <m:sub>
+                        <m:r>
+                          <a:rPr lang="en-US" i="1">
+                            <a:latin typeface="Cambria Math" panose="02040503050406030204" pitchFamily="18" charset="0"/>
+                          </a:rPr>
+                          <m:t>𝑖</m:t>
+                        </m:r>
+                      </m:sub>
+                    </m:sSub>
+                    <m:r>
+                      <a:rPr lang="en-US" i="1" smtClean="0">
+                        <a:latin typeface="Cambria Math" panose="02040503050406030204" pitchFamily="18" charset="0"/>
+                        <a:ea typeface="Cambria Math" panose="02040503050406030204" pitchFamily="18" charset="0"/>
+                      </a:rPr>
+                      <m:t>≡</m:t>
+                    </m:r>
+                    <m:r>
+                      <a:rPr lang="en-US" i="1" smtClean="0">
+                        <a:latin typeface="Cambria Math" panose="02040503050406030204" pitchFamily="18" charset="0"/>
+                        <a:ea typeface="Cambria Math" panose="02040503050406030204" pitchFamily="18" charset="0"/>
+                      </a:rPr>
+                      <m:t>𝔼</m:t>
+                    </m:r>
+                    <m:d>
+                      <m:dPr>
+                        <m:ctrlPr>
+                          <a:rPr lang="en-US" i="1" smtClean="0">
+                            <a:latin typeface="Cambria Math" panose="02040503050406030204" pitchFamily="18" charset="0"/>
+                            <a:ea typeface="Cambria Math" panose="02040503050406030204" pitchFamily="18" charset="0"/>
+                          </a:rPr>
+                        </m:ctrlPr>
+                      </m:dPr>
+                      <m:e>
+                        <m:sSub>
+                          <m:sSubPr>
+                            <m:ctrlPr>
+                              <a:rPr lang="en-US" i="1">
+                                <a:latin typeface="Cambria Math" panose="02040503050406030204" pitchFamily="18" charset="0"/>
+                              </a:rPr>
+                            </m:ctrlPr>
+                          </m:sSubPr>
+                          <m:e>
+                            <m:r>
+                              <a:rPr lang="en-US" b="0" i="1" smtClean="0">
+                                <a:latin typeface="Cambria Math" panose="02040503050406030204" pitchFamily="18" charset="0"/>
+                              </a:rPr>
+                              <m:t>𝑌</m:t>
+                            </m:r>
+                          </m:e>
+                          <m:sub>
+                            <m:r>
+                              <a:rPr lang="en-US" i="1">
+                                <a:latin typeface="Cambria Math" panose="02040503050406030204" pitchFamily="18" charset="0"/>
+                              </a:rPr>
+                              <m:t>𝑖</m:t>
+                            </m:r>
+                          </m:sub>
+                        </m:sSub>
+                      </m:e>
+                    </m:d>
+                  </m:oMath>
+                </a14:m>
+                <a:r>
+                  <a:rPr lang="en-US" dirty="0" smtClean="0"/>
+                  <a:t>. Suppose that an appropriate model for the relationship between </a:t>
+                </a:r>
+                <a14:m>
+                  <m:oMath xmlns:m="http://schemas.openxmlformats.org/officeDocument/2006/math">
+                    <m:r>
+                      <a:rPr lang="en-US" b="0" i="1" smtClean="0">
+                        <a:latin typeface="Cambria Math" panose="02040503050406030204" pitchFamily="18" charset="0"/>
+                      </a:rPr>
+                      <m:t>𝑥</m:t>
+                    </m:r>
+                  </m:oMath>
+                </a14:m>
+                <a:r>
+                  <a:rPr lang="en-US" dirty="0" smtClean="0"/>
+                  <a:t> and </a:t>
+                </a:r>
+                <a14:m>
+                  <m:oMath xmlns:m="http://schemas.openxmlformats.org/officeDocument/2006/math">
+                    <m:r>
+                      <a:rPr lang="en-US" b="0" i="1" smtClean="0">
+                        <a:latin typeface="Cambria Math" panose="02040503050406030204" pitchFamily="18" charset="0"/>
+                      </a:rPr>
+                      <m:t>𝑦</m:t>
+                    </m:r>
+                  </m:oMath>
+                </a14:m>
+                <a:r>
+                  <a:rPr lang="en-US" dirty="0" smtClean="0"/>
+                  <a:t> is: </a:t>
+                </a:r>
+              </a:p>
+              <a:p>
+                <a:pPr marL="0" indent="0" algn="ctr">
+                  <a:buNone/>
+                </a:pPr>
+                <a14:m>
+                  <m:oMath xmlns:m="http://schemas.openxmlformats.org/officeDocument/2006/math">
+                    <m:sSub>
+                      <m:sSubPr>
+                        <m:ctrlPr>
+                          <a:rPr lang="en-US" i="1" smtClean="0">
+                            <a:latin typeface="Cambria Math" panose="02040503050406030204" pitchFamily="18" charset="0"/>
+                          </a:rPr>
+                        </m:ctrlPr>
+                      </m:sSubPr>
+                      <m:e>
+                        <m:r>
+                          <a:rPr lang="en-US" b="0" i="1" smtClean="0">
+                            <a:latin typeface="Cambria Math" panose="02040503050406030204" pitchFamily="18" charset="0"/>
+                          </a:rPr>
+                          <m:t>𝑌</m:t>
+                        </m:r>
+                      </m:e>
+                      <m:sub>
+                        <m:r>
+                          <a:rPr lang="en-US" b="0" i="1" smtClean="0">
+                            <a:latin typeface="Cambria Math" panose="02040503050406030204" pitchFamily="18" charset="0"/>
+                          </a:rPr>
+                          <m:t>𝑖</m:t>
+                        </m:r>
+                      </m:sub>
+                    </m:sSub>
+                    <m:r>
+                      <a:rPr lang="en-US" b="0" i="1" smtClean="0">
+                        <a:latin typeface="Cambria Math" panose="02040503050406030204" pitchFamily="18" charset="0"/>
+                      </a:rPr>
+                      <m:t>=</m:t>
+                    </m:r>
+                    <m:sSub>
+                      <m:sSubPr>
+                        <m:ctrlPr>
+                          <a:rPr lang="en-US" b="0" i="1" smtClean="0">
+                            <a:latin typeface="Cambria Math" panose="02040503050406030204" pitchFamily="18" charset="0"/>
+                          </a:rPr>
+                        </m:ctrlPr>
+                      </m:sSubPr>
+                      <m:e>
+                        <m:r>
+                          <a:rPr lang="en-US" b="0" i="1" smtClean="0">
+                            <a:latin typeface="Cambria Math" panose="02040503050406030204" pitchFamily="18" charset="0"/>
+                            <a:ea typeface="Cambria Math" panose="02040503050406030204" pitchFamily="18" charset="0"/>
+                          </a:rPr>
+                          <m:t>𝜇</m:t>
+                        </m:r>
+                      </m:e>
+                      <m:sub>
+                        <m:r>
+                          <a:rPr lang="en-US" b="0" i="1" smtClean="0">
+                            <a:latin typeface="Cambria Math" panose="02040503050406030204" pitchFamily="18" charset="0"/>
+                          </a:rPr>
+                          <m:t>𝑖</m:t>
+                        </m:r>
+                      </m:sub>
+                    </m:sSub>
+                    <m:r>
+                      <a:rPr lang="en-US" b="0" i="1" smtClean="0">
+                        <a:latin typeface="Cambria Math" panose="02040503050406030204" pitchFamily="18" charset="0"/>
+                      </a:rPr>
+                      <m:t>+</m:t>
+                    </m:r>
+                    <m:sSub>
+                      <m:sSubPr>
+                        <m:ctrlPr>
+                          <a:rPr lang="en-US" b="0" i="1" smtClean="0">
+                            <a:latin typeface="Cambria Math" panose="02040503050406030204" pitchFamily="18" charset="0"/>
+                          </a:rPr>
+                        </m:ctrlPr>
+                      </m:sSubPr>
+                      <m:e>
+                        <m:r>
+                          <a:rPr lang="en-US" b="0" i="1" smtClean="0">
+                            <a:latin typeface="Cambria Math" panose="02040503050406030204" pitchFamily="18" charset="0"/>
+                            <a:ea typeface="Cambria Math" panose="02040503050406030204" pitchFamily="18" charset="0"/>
+                          </a:rPr>
+                          <m:t>𝜖</m:t>
+                        </m:r>
+                      </m:e>
+                      <m:sub>
+                        <m:r>
+                          <a:rPr lang="en-US" b="0" i="1" smtClean="0">
+                            <a:latin typeface="Cambria Math" panose="02040503050406030204" pitchFamily="18" charset="0"/>
+                          </a:rPr>
+                          <m:t>𝑖</m:t>
+                        </m:r>
+                      </m:sub>
+                    </m:sSub>
+                  </m:oMath>
+                </a14:m>
+                <a:r>
+                  <a:rPr lang="en-US" dirty="0" smtClean="0"/>
+                  <a:t> where </a:t>
+                </a:r>
+                <a14:m>
+                  <m:oMath xmlns:m="http://schemas.openxmlformats.org/officeDocument/2006/math">
+                    <m:sSub>
+                      <m:sSubPr>
+                        <m:ctrlPr>
+                          <a:rPr lang="en-US" i="1" smtClean="0">
+                            <a:latin typeface="Cambria Math" panose="02040503050406030204" pitchFamily="18" charset="0"/>
+                          </a:rPr>
+                        </m:ctrlPr>
+                      </m:sSubPr>
+                      <m:e>
+                        <m:r>
+                          <a:rPr lang="en-US" i="1" smtClean="0">
+                            <a:latin typeface="Cambria Math" panose="02040503050406030204" pitchFamily="18" charset="0"/>
+                            <a:ea typeface="Cambria Math" panose="02040503050406030204" pitchFamily="18" charset="0"/>
+                          </a:rPr>
+                          <m:t>𝜇</m:t>
+                        </m:r>
+                      </m:e>
+                      <m:sub>
+                        <m:r>
+                          <a:rPr lang="en-US" b="0" i="1" smtClean="0">
+                            <a:latin typeface="Cambria Math" panose="02040503050406030204" pitchFamily="18" charset="0"/>
+                          </a:rPr>
+                          <m:t>𝑖</m:t>
+                        </m:r>
+                      </m:sub>
+                    </m:sSub>
+                    <m:r>
+                      <a:rPr lang="en-US" b="0" i="1" smtClean="0">
+                        <a:latin typeface="Cambria Math" panose="02040503050406030204" pitchFamily="18" charset="0"/>
+                      </a:rPr>
+                      <m:t>=</m:t>
+                    </m:r>
+                    <m:sSub>
+                      <m:sSubPr>
+                        <m:ctrlPr>
+                          <a:rPr lang="en-US" b="0" i="1" smtClean="0">
+                            <a:latin typeface="Cambria Math" panose="02040503050406030204" pitchFamily="18" charset="0"/>
+                          </a:rPr>
+                        </m:ctrlPr>
+                      </m:sSubPr>
+                      <m:e>
+                        <m:r>
+                          <a:rPr lang="en-US" b="0" i="1" smtClean="0">
+                            <a:latin typeface="Cambria Math" panose="02040503050406030204" pitchFamily="18" charset="0"/>
+                          </a:rPr>
+                          <m:t>𝑥</m:t>
+                        </m:r>
+                      </m:e>
+                      <m:sub>
+                        <m:r>
+                          <a:rPr lang="en-US" b="0" i="1" smtClean="0">
+                            <a:latin typeface="Cambria Math" panose="02040503050406030204" pitchFamily="18" charset="0"/>
+                          </a:rPr>
+                          <m:t>𝑖</m:t>
+                        </m:r>
+                      </m:sub>
+                    </m:sSub>
+                    <m:sSub>
+                      <m:sSubPr>
+                        <m:ctrlPr>
+                          <a:rPr lang="en-US" b="0" i="1" smtClean="0">
+                            <a:latin typeface="Cambria Math" panose="02040503050406030204" pitchFamily="18" charset="0"/>
+                          </a:rPr>
+                        </m:ctrlPr>
+                      </m:sSubPr>
+                      <m:e>
+                        <m:r>
+                          <a:rPr lang="en-US" b="0" i="1" smtClean="0">
+                            <a:latin typeface="Cambria Math" panose="02040503050406030204" pitchFamily="18" charset="0"/>
+                            <a:ea typeface="Cambria Math" panose="02040503050406030204" pitchFamily="18" charset="0"/>
+                          </a:rPr>
+                          <m:t>𝛽</m:t>
+                        </m:r>
+                      </m:e>
+                      <m:sub>
+                        <m:r>
+                          <a:rPr lang="en-US" b="0" i="1" smtClean="0">
+                            <a:latin typeface="Cambria Math" panose="02040503050406030204" pitchFamily="18" charset="0"/>
+                          </a:rPr>
+                          <m:t>𝑖</m:t>
+                        </m:r>
+                      </m:sub>
+                    </m:sSub>
+                  </m:oMath>
+                </a14:m>
+                <a:r>
+                  <a:rPr lang="en-US" dirty="0" smtClean="0"/>
+                  <a:t>.</a:t>
+                </a:r>
+              </a:p>
+              <a:p>
+                <a:pPr marL="0" indent="0">
+                  <a:buNone/>
+                </a:pPr>
+                <a:r>
+                  <a:rPr lang="en-US" dirty="0" smtClean="0"/>
+                  <a:t>Here </a:t>
+                </a:r>
+                <a14:m>
+                  <m:oMath xmlns:m="http://schemas.openxmlformats.org/officeDocument/2006/math">
+                    <m:r>
+                      <a:rPr lang="en-US" i="1" smtClean="0">
+                        <a:latin typeface="Cambria Math" panose="02040503050406030204" pitchFamily="18" charset="0"/>
+                        <a:ea typeface="Cambria Math" panose="02040503050406030204" pitchFamily="18" charset="0"/>
+                      </a:rPr>
+                      <m:t>𝛽</m:t>
+                    </m:r>
+                  </m:oMath>
+                </a14:m>
+                <a:r>
+                  <a:rPr lang="en-US" dirty="0" smtClean="0"/>
+                  <a:t> is an unknown </a:t>
+                </a:r>
+                <a:r>
+                  <a:rPr lang="en-US" dirty="0" smtClean="0">
+                    <a:solidFill>
+                      <a:srgbClr val="0070C0"/>
+                    </a:solidFill>
+                  </a:rPr>
+                  <a:t>parameter</a:t>
+                </a:r>
+                <a:r>
+                  <a:rPr lang="en-US" dirty="0" smtClean="0"/>
+                  <a:t> and the </a:t>
+                </a:r>
+                <a14:m>
+                  <m:oMath xmlns:m="http://schemas.openxmlformats.org/officeDocument/2006/math">
+                    <m:sSub>
+                      <m:sSubPr>
+                        <m:ctrlPr>
+                          <a:rPr lang="en-US" i="1">
+                            <a:latin typeface="Cambria Math" panose="02040503050406030204" pitchFamily="18" charset="0"/>
+                          </a:rPr>
+                        </m:ctrlPr>
+                      </m:sSubPr>
+                      <m:e>
+                        <m:r>
+                          <a:rPr lang="en-US" i="1">
+                            <a:latin typeface="Cambria Math" panose="02040503050406030204" pitchFamily="18" charset="0"/>
+                            <a:ea typeface="Cambria Math" panose="02040503050406030204" pitchFamily="18" charset="0"/>
+                          </a:rPr>
+                          <m:t>𝜖</m:t>
+                        </m:r>
+                      </m:e>
+                      <m:sub>
+                        <m:r>
+                          <a:rPr lang="en-US" i="1">
+                            <a:latin typeface="Cambria Math" panose="02040503050406030204" pitchFamily="18" charset="0"/>
+                          </a:rPr>
+                          <m:t>𝑖</m:t>
+                        </m:r>
+                      </m:sub>
+                    </m:sSub>
+                  </m:oMath>
+                </a14:m>
+                <a:r>
+                  <a:rPr lang="en-US" dirty="0" smtClean="0"/>
+                  <a:t> are mutually independent zero mean random variables, each with the same </a:t>
+                </a:r>
+                <a:r>
+                  <a:rPr lang="en-US" dirty="0" smtClean="0">
+                    <a:solidFill>
+                      <a:srgbClr val="0070C0"/>
+                    </a:solidFill>
+                  </a:rPr>
+                  <a:t>variance</a:t>
+                </a:r>
+                <a:r>
+                  <a:rPr lang="en-US" dirty="0" smtClean="0"/>
+                  <a:t> </a:t>
+                </a:r>
+                <a14:m>
+                  <m:oMath xmlns:m="http://schemas.openxmlformats.org/officeDocument/2006/math">
+                    <m:sSup>
+                      <m:sSupPr>
+                        <m:ctrlPr>
+                          <a:rPr lang="en-US" i="1" smtClean="0">
+                            <a:latin typeface="Cambria Math" panose="02040503050406030204" pitchFamily="18" charset="0"/>
+                          </a:rPr>
+                        </m:ctrlPr>
+                      </m:sSupPr>
+                      <m:e>
+                        <m:r>
+                          <a:rPr lang="en-US" i="1" smtClean="0">
+                            <a:latin typeface="Cambria Math" panose="02040503050406030204" pitchFamily="18" charset="0"/>
+                            <a:ea typeface="Cambria Math" panose="02040503050406030204" pitchFamily="18" charset="0"/>
+                          </a:rPr>
+                          <m:t>𝜎</m:t>
+                        </m:r>
+                      </m:e>
+                      <m:sup>
+                        <m:r>
+                          <a:rPr lang="en-US" b="0" i="1" smtClean="0">
+                            <a:latin typeface="Cambria Math" panose="02040503050406030204" pitchFamily="18" charset="0"/>
+                          </a:rPr>
+                          <m:t>2</m:t>
+                        </m:r>
+                      </m:sup>
+                    </m:sSup>
+                  </m:oMath>
+                </a14:m>
+                <a:r>
+                  <a:rPr lang="en-US" dirty="0" smtClean="0"/>
+                  <a:t>. So the model says that </a:t>
+                </a:r>
+                <a14:m>
+                  <m:oMath xmlns:m="http://schemas.openxmlformats.org/officeDocument/2006/math">
+                    <m:r>
+                      <a:rPr lang="en-US" b="0" i="1" smtClean="0">
+                        <a:latin typeface="Cambria Math" panose="02040503050406030204" pitchFamily="18" charset="0"/>
+                      </a:rPr>
+                      <m:t>𝑌</m:t>
+                    </m:r>
+                  </m:oMath>
+                </a14:m>
+                <a:r>
+                  <a:rPr lang="en-US" dirty="0" smtClean="0"/>
+                  <a:t> is given by </a:t>
+                </a:r>
+                <a14:m>
+                  <m:oMath xmlns:m="http://schemas.openxmlformats.org/officeDocument/2006/math">
+                    <m:r>
+                      <a:rPr lang="en-US" i="1">
+                        <a:latin typeface="Cambria Math" panose="02040503050406030204" pitchFamily="18" charset="0"/>
+                      </a:rPr>
+                      <m:t>𝑥</m:t>
+                    </m:r>
+                  </m:oMath>
+                </a14:m>
+                <a:r>
+                  <a:rPr lang="en-US" dirty="0" smtClean="0"/>
+                  <a:t> multiplied by a </a:t>
+                </a:r>
+                <a:r>
+                  <a:rPr lang="en-US" dirty="0" smtClean="0">
+                    <a:solidFill>
+                      <a:srgbClr val="0070C0"/>
+                    </a:solidFill>
+                  </a:rPr>
+                  <a:t>constant</a:t>
+                </a:r>
+                <a:r>
+                  <a:rPr lang="en-US" dirty="0" smtClean="0"/>
+                  <a:t> plus a random term. </a:t>
+                </a:r>
+                <a14:m>
+                  <m:oMath xmlns:m="http://schemas.openxmlformats.org/officeDocument/2006/math">
+                    <m:r>
+                      <a:rPr lang="en-US" i="1">
+                        <a:latin typeface="Cambria Math" panose="02040503050406030204" pitchFamily="18" charset="0"/>
+                      </a:rPr>
+                      <m:t>𝑌</m:t>
+                    </m:r>
+                  </m:oMath>
+                </a14:m>
+                <a:r>
+                  <a:rPr lang="en-US" dirty="0" smtClean="0"/>
+                  <a:t> is an example of a </a:t>
+                </a:r>
+                <a:r>
+                  <a:rPr lang="en-US" i="1" dirty="0" smtClean="0">
+                    <a:solidFill>
+                      <a:srgbClr val="0070C0"/>
+                    </a:solidFill>
+                  </a:rPr>
+                  <a:t>response variable</a:t>
+                </a:r>
+                <a:r>
+                  <a:rPr lang="en-US" dirty="0" smtClean="0"/>
+                  <a:t>, while </a:t>
+                </a:r>
+                <a:r>
+                  <a:rPr lang="en-US" i="1" dirty="0" smtClean="0"/>
+                  <a:t>x</a:t>
+                </a:r>
+                <a:r>
+                  <a:rPr lang="en-US" dirty="0" smtClean="0"/>
+                  <a:t> is an example of a </a:t>
+                </a:r>
+                <a:r>
+                  <a:rPr lang="en-US" i="1" dirty="0" smtClean="0">
+                    <a:solidFill>
+                      <a:srgbClr val="0070C0"/>
+                    </a:solidFill>
+                  </a:rPr>
+                  <a:t>predictor variable</a:t>
+                </a:r>
+                <a:r>
+                  <a:rPr lang="en-US" dirty="0" smtClean="0"/>
+                  <a:t>.</a:t>
+                </a:r>
+                <a:endParaRPr lang="en-US" dirty="0"/>
+              </a:p>
+            </p:txBody>
+          </p:sp>
+        </mc:Choice>
+        <mc:Fallback>
+          <p:sp>
+            <p:nvSpPr>
+              <p:cNvPr id="3" name="Content Placeholder 2"/>
+              <p:cNvSpPr>
+                <a:spLocks noGrp="1" noRot="1" noChangeAspect="1" noMove="1" noResize="1" noEditPoints="1" noAdjustHandles="1" noChangeArrowheads="1" noChangeShapeType="1" noTextEdit="1"/>
+              </p:cNvSpPr>
+              <p:nvPr>
+                <p:ph idx="1"/>
+              </p:nvPr>
+            </p:nvSpPr>
+            <p:spPr>
+              <a:blipFill>
+                <a:blip r:embed="rId3"/>
+                <a:stretch>
+                  <a:fillRect l="-1217" t="-2241" r="-1043"/>
+                </a:stretch>
+              </a:blipFill>
+            </p:spPr>
+            <p:txBody>
+              <a:bodyPr/>
+              <a:lstStyle/>
+              <a:p>
+                <a:r>
+                  <a:rPr lang="en-US">
+                    <a:noFill/>
+                  </a:rPr>
+                  <a:t> </a:t>
+                </a:r>
+              </a:p>
+            </p:txBody>
+          </p:sp>
+        </mc:Fallback>
+      </mc:AlternateContent>
+      <p:sp>
+        <p:nvSpPr>
+          <p:cNvPr id="4" name="Rectangle 3"/>
+          <p:cNvSpPr/>
+          <p:nvPr/>
+        </p:nvSpPr>
+        <p:spPr>
+          <a:xfrm>
+            <a:off x="10623503" y="6176963"/>
+            <a:ext cx="1460593" cy="369332"/>
+          </a:xfrm>
+          <a:prstGeom prst="rect">
+            <a:avLst/>
+          </a:prstGeom>
+          <a:solidFill>
+            <a:schemeClr val="accent4">
+              <a:lumMod val="75000"/>
+            </a:schemeClr>
+          </a:solidFill>
+        </p:spPr>
+        <p:txBody>
+          <a:bodyPr wrap="none">
+            <a:spAutoFit/>
+          </a:bodyPr>
+          <a:lstStyle/>
+          <a:p>
+            <a:r>
+              <a:rPr lang="en-US" dirty="0">
+                <a:solidFill>
+                  <a:schemeClr val="bg1"/>
+                </a:solidFill>
+              </a:rPr>
+              <a:t>(Wood 2006</a:t>
+            </a:r>
+            <a:r>
+              <a:rPr lang="en-US" dirty="0" smtClean="0">
+                <a:solidFill>
+                  <a:schemeClr val="bg1"/>
+                </a:solidFill>
+              </a:rPr>
+              <a:t>) </a:t>
+            </a:r>
+            <a:endParaRPr lang="en-US" dirty="0">
+              <a:solidFill>
+                <a:schemeClr val="bg1"/>
+              </a:solidFill>
+            </a:endParaRPr>
           </a:p>
         </p:txBody>
       </p:sp>
@@ -6295,4 +7590,265 @@
     </a:ext>
   </a:extLst>
 </a:theme>
+</file>
+
+<file path=ppt/theme/theme2.xml><?xml version="1.0" encoding="utf-8"?>
+<a:theme xmlns:a="http://schemas.openxmlformats.org/drawingml/2006/main" name="Office Theme">
+  <a:themeElements>
+    <a:clrScheme name="Office">
+      <a:dk1>
+        <a:sysClr val="windowText" lastClr="000000"/>
+      </a:dk1>
+      <a:lt1>
+        <a:sysClr val="window" lastClr="FFFFFF"/>
+      </a:lt1>
+      <a:dk2>
+        <a:srgbClr val="44546A"/>
+      </a:dk2>
+      <a:lt2>
+        <a:srgbClr val="E7E6E6"/>
+      </a:lt2>
+      <a:accent1>
+        <a:srgbClr val="5B9BD5"/>
+      </a:accent1>
+      <a:accent2>
+        <a:srgbClr val="ED7D31"/>
+      </a:accent2>
+      <a:accent3>
+        <a:srgbClr val="A5A5A5"/>
+      </a:accent3>
+      <a:accent4>
+        <a:srgbClr val="FFC000"/>
+      </a:accent4>
+      <a:accent5>
+        <a:srgbClr val="4472C4"/>
+      </a:accent5>
+      <a:accent6>
+        <a:srgbClr val="70AD47"/>
+      </a:accent6>
+      <a:hlink>
+        <a:srgbClr val="0563C1"/>
+      </a:hlink>
+      <a:folHlink>
+        <a:srgbClr val="954F72"/>
+      </a:folHlink>
+    </a:clrScheme>
+    <a:fontScheme name="Office">
+      <a:majorFont>
+        <a:latin typeface="Calibri Light" panose="020F0302020204030204"/>
+        <a:ea typeface=""/>
+        <a:cs typeface=""/>
+        <a:font script="Jpan" typeface="游ゴシック Light"/>
+        <a:font script="Hang" typeface="맑은 고딕"/>
+        <a:font script="Hans" typeface="等线 Light"/>
+        <a:font script="Hant" typeface="新細明體"/>
+        <a:font script="Arab" typeface="Times New Roman"/>
+        <a:font script="Hebr" typeface="Times New Roman"/>
+        <a:font script="Thai" typeface="Angsana New"/>
+        <a:font script="Ethi" typeface="Nyala"/>
+        <a:font script="Beng" typeface="Vrinda"/>
+        <a:font script="Gujr" typeface="Shruti"/>
+        <a:font script="Khmr" typeface="MoolBoran"/>
+        <a:font script="Knda" typeface="Tunga"/>
+        <a:font script="Guru" typeface="Raavi"/>
+        <a:font script="Cans" typeface="Euphemia"/>
+        <a:font script="Cher" typeface="Plantagenet Cherokee"/>
+        <a:font script="Yiii" typeface="Microsoft Yi Baiti"/>
+        <a:font script="Tibt" typeface="Microsoft Himalaya"/>
+        <a:font script="Thaa" typeface="MV Boli"/>
+        <a:font script="Deva" typeface="Mangal"/>
+        <a:font script="Telu" typeface="Gautami"/>
+        <a:font script="Taml" typeface="Latha"/>
+        <a:font script="Syrc" typeface="Estrangelo Edessa"/>
+        <a:font script="Orya" typeface="Kalinga"/>
+        <a:font script="Mlym" typeface="Kartika"/>
+        <a:font script="Laoo" typeface="DokChampa"/>
+        <a:font script="Sinh" typeface="Iskoola Pota"/>
+        <a:font script="Mong" typeface="Mongolian Baiti"/>
+        <a:font script="Viet" typeface="Times New Roman"/>
+        <a:font script="Uigh" typeface="Microsoft Uighur"/>
+        <a:font script="Geor" typeface="Sylfaen"/>
+      </a:majorFont>
+      <a:minorFont>
+        <a:latin typeface="Calibri" panose="020F0502020204030204"/>
+        <a:ea typeface=""/>
+        <a:cs typeface=""/>
+        <a:font script="Jpan" typeface="游ゴシック"/>
+        <a:font script="Hang" typeface="맑은 고딕"/>
+        <a:font script="Hans" typeface="等线"/>
+        <a:font script="Hant" typeface="新細明體"/>
+        <a:font script="Arab" typeface="Arial"/>
+        <a:font script="Hebr" typeface="Arial"/>
+        <a:font script="Thai" typeface="Cordia New"/>
+        <a:font script="Ethi" typeface="Nyala"/>
+        <a:font script="Beng" typeface="Vrinda"/>
+        <a:font script="Gujr" typeface="Shruti"/>
+        <a:font script="Khmr" typeface="DaunPenh"/>
+        <a:font script="Knda" typeface="Tunga"/>
+        <a:font script="Guru" typeface="Raavi"/>
+        <a:font script="Cans" typeface="Euphemia"/>
+        <a:font script="Cher" typeface="Plantagenet Cherokee"/>
+        <a:font script="Yiii" typeface="Microsoft Yi Baiti"/>
+        <a:font script="Tibt" typeface="Microsoft Himalaya"/>
+        <a:font script="Thaa" typeface="MV Boli"/>
+        <a:font script="Deva" typeface="Mangal"/>
+        <a:font script="Telu" typeface="Gautami"/>
+        <a:font script="Taml" typeface="Latha"/>
+        <a:font script="Syrc" typeface="Estrangelo Edessa"/>
+        <a:font script="Orya" typeface="Kalinga"/>
+        <a:font script="Mlym" typeface="Kartika"/>
+        <a:font script="Laoo" typeface="DokChampa"/>
+        <a:font script="Sinh" typeface="Iskoola Pota"/>
+        <a:font script="Mong" typeface="Mongolian Baiti"/>
+        <a:font script="Viet" typeface="Arial"/>
+        <a:font script="Uigh" typeface="Microsoft Uighur"/>
+        <a:font script="Geor" typeface="Sylfaen"/>
+      </a:minorFont>
+    </a:fontScheme>
+    <a:fmtScheme name="Office">
+      <a:fillStyleLst>
+        <a:solidFill>
+          <a:schemeClr val="phClr"/>
+        </a:solidFill>
+        <a:gradFill rotWithShape="1">
+          <a:gsLst>
+            <a:gs pos="0">
+              <a:schemeClr val="phClr">
+                <a:lumMod val="110000"/>
+                <a:satMod val="105000"/>
+                <a:tint val="67000"/>
+              </a:schemeClr>
+            </a:gs>
+            <a:gs pos="50000">
+              <a:schemeClr val="phClr">
+                <a:lumMod val="105000"/>
+                <a:satMod val="103000"/>
+                <a:tint val="73000"/>
+              </a:schemeClr>
+            </a:gs>
+            <a:gs pos="100000">
+              <a:schemeClr val="phClr">
+                <a:lumMod val="105000"/>
+                <a:satMod val="109000"/>
+                <a:tint val="81000"/>
+              </a:schemeClr>
+            </a:gs>
+          </a:gsLst>
+          <a:lin ang="5400000" scaled="0"/>
+        </a:gradFill>
+        <a:gradFill rotWithShape="1">
+          <a:gsLst>
+            <a:gs pos="0">
+              <a:schemeClr val="phClr">
+                <a:satMod val="103000"/>
+                <a:lumMod val="102000"/>
+                <a:tint val="94000"/>
+              </a:schemeClr>
+            </a:gs>
+            <a:gs pos="50000">
+              <a:schemeClr val="phClr">
+                <a:satMod val="110000"/>
+                <a:lumMod val="100000"/>
+                <a:shade val="100000"/>
+              </a:schemeClr>
+            </a:gs>
+            <a:gs pos="100000">
+              <a:schemeClr val="phClr">
+                <a:lumMod val="99000"/>
+                <a:satMod val="120000"/>
+                <a:shade val="78000"/>
+              </a:schemeClr>
+            </a:gs>
+          </a:gsLst>
+          <a:lin ang="5400000" scaled="0"/>
+        </a:gradFill>
+      </a:fillStyleLst>
+      <a:lnStyleLst>
+        <a:ln w="6350" cap="flat" cmpd="sng" algn="ctr">
+          <a:solidFill>
+            <a:schemeClr val="phClr"/>
+          </a:solidFill>
+          <a:prstDash val="solid"/>
+          <a:miter lim="800000"/>
+        </a:ln>
+        <a:ln w="12700" cap="flat" cmpd="sng" algn="ctr">
+          <a:solidFill>
+            <a:schemeClr val="phClr"/>
+          </a:solidFill>
+          <a:prstDash val="solid"/>
+          <a:miter lim="800000"/>
+        </a:ln>
+        <a:ln w="19050" cap="flat" cmpd="sng" algn="ctr">
+          <a:solidFill>
+            <a:schemeClr val="phClr"/>
+          </a:solidFill>
+          <a:prstDash val="solid"/>
+          <a:miter lim="800000"/>
+        </a:ln>
+      </a:lnStyleLst>
+      <a:effectStyleLst>
+        <a:effectStyle>
+          <a:effectLst/>
+        </a:effectStyle>
+        <a:effectStyle>
+          <a:effectLst/>
+        </a:effectStyle>
+        <a:effectStyle>
+          <a:effectLst>
+            <a:outerShdw blurRad="57150" dist="19050" dir="5400000" algn="ctr" rotWithShape="0">
+              <a:srgbClr val="000000">
+                <a:alpha val="63000"/>
+              </a:srgbClr>
+            </a:outerShdw>
+          </a:effectLst>
+        </a:effectStyle>
+      </a:effectStyleLst>
+      <a:bgFillStyleLst>
+        <a:solidFill>
+          <a:schemeClr val="phClr"/>
+        </a:solidFill>
+        <a:solidFill>
+          <a:schemeClr val="phClr">
+            <a:tint val="95000"/>
+            <a:satMod val="170000"/>
+          </a:schemeClr>
+        </a:solidFill>
+        <a:gradFill rotWithShape="1">
+          <a:gsLst>
+            <a:gs pos="0">
+              <a:schemeClr val="phClr">
+                <a:tint val="93000"/>
+                <a:satMod val="150000"/>
+                <a:shade val="98000"/>
+                <a:lumMod val="102000"/>
+              </a:schemeClr>
+            </a:gs>
+            <a:gs pos="50000">
+              <a:schemeClr val="phClr">
+                <a:tint val="98000"/>
+                <a:satMod val="130000"/>
+                <a:shade val="90000"/>
+                <a:lumMod val="103000"/>
+              </a:schemeClr>
+            </a:gs>
+            <a:gs pos="100000">
+              <a:schemeClr val="phClr">
+                <a:shade val="63000"/>
+                <a:satMod val="120000"/>
+              </a:schemeClr>
+            </a:gs>
+          </a:gsLst>
+          <a:lin ang="5400000" scaled="0"/>
+        </a:gradFill>
+      </a:bgFillStyleLst>
+    </a:fmtScheme>
+  </a:themeElements>
+  <a:objectDefaults/>
+  <a:extraClrSchemeLst/>
+  <a:extLst>
+    <a:ext uri="{05A4C25C-085E-4340-85A3-A5531E510DB2}">
+      <thm15:themeFamily xmlns:thm15="http://schemas.microsoft.com/office/thememl/2012/main" name="Office Theme" id="{62F939B6-93AF-4DB8-9C6B-D6C7DFDC589F}" vid="{4A3C46E8-61CC-4603-A589-7422A47A8E4A}"/>
+    </a:ext>
+  </a:extLst>
+</a:theme>
 </file>
</xml_diff>

<commit_message>
Finished text for LM; starting on text for LMM
</commit_message>
<xml_diff>
--- a/Notes/RegressionModelOverview.pptx
+++ b/Notes/RegressionModelOverview.pptx
@@ -5,7 +5,7 @@
     <p:sldMasterId id="2147483648" r:id="rId1"/>
   </p:sldMasterIdLst>
   <p:notesMasterIdLst>
-    <p:notesMasterId r:id="rId9"/>
+    <p:notesMasterId r:id="rId13"/>
   </p:notesMasterIdLst>
   <p:sldIdLst>
     <p:sldId id="256" r:id="rId2"/>
@@ -15,6 +15,10 @@
     <p:sldId id="260" r:id="rId6"/>
     <p:sldId id="261" r:id="rId7"/>
     <p:sldId id="262" r:id="rId8"/>
+    <p:sldId id="263" r:id="rId9"/>
+    <p:sldId id="264" r:id="rId10"/>
+    <p:sldId id="265" r:id="rId11"/>
+    <p:sldId id="266" r:id="rId12"/>
   </p:sldIdLst>
   <p:sldSz cx="12192000" cy="6858000"/>
   <p:notesSz cx="6858000" cy="9144000"/>
@@ -3485,6 +3489,310 @@
 </p:sld>
 </file>
 
+<file path=ppt/slides/slide10.xml><?xml version="1.0" encoding="utf-8"?>
+<p:sld xmlns:a="http://schemas.openxmlformats.org/drawingml/2006/main" xmlns:r="http://schemas.openxmlformats.org/officeDocument/2006/relationships" xmlns:p="http://schemas.openxmlformats.org/presentationml/2006/main">
+  <p:cSld>
+    <p:spTree>
+      <p:nvGrpSpPr>
+        <p:cNvPr id="1" name=""/>
+        <p:cNvGrpSpPr/>
+        <p:nvPr/>
+      </p:nvGrpSpPr>
+      <p:grpSpPr>
+        <a:xfrm>
+          <a:off x="0" y="0"/>
+          <a:ext cx="0" cy="0"/>
+          <a:chOff x="0" y="0"/>
+          <a:chExt cx="0" cy="0"/>
+        </a:xfrm>
+      </p:grpSpPr>
+      <p:sp>
+        <p:nvSpPr>
+          <p:cNvPr id="2" name="Title 1"/>
+          <p:cNvSpPr>
+            <a:spLocks noGrp="1"/>
+          </p:cNvSpPr>
+          <p:nvPr>
+            <p:ph type="title"/>
+          </p:nvPr>
+        </p:nvSpPr>
+        <p:spPr/>
+        <p:txBody>
+          <a:bodyPr/>
+          <a:lstStyle/>
+          <a:p>
+            <a:r>
+              <a:rPr lang="en-US" dirty="0" smtClean="0"/>
+              <a:t>LM Matrix Notation</a:t>
+            </a:r>
+            <a:endParaRPr lang="en-US" dirty="0"/>
+          </a:p>
+        </p:txBody>
+      </p:sp>
+      <p:pic>
+        <p:nvPicPr>
+          <p:cNvPr id="7" name="image2.png"/>
+          <p:cNvPicPr>
+            <a:picLocks noChangeAspect="1"/>
+          </p:cNvPicPr>
+          <p:nvPr/>
+        </p:nvPicPr>
+        <p:blipFill>
+          <a:blip r:embed="rId2"/>
+          <a:srcRect/>
+          <a:stretch>
+            <a:fillRect/>
+          </a:stretch>
+        </p:blipFill>
+        <p:spPr>
+          <a:xfrm>
+            <a:off x="2183624" y="1568281"/>
+            <a:ext cx="7824751" cy="4025695"/>
+          </a:xfrm>
+          <a:prstGeom prst="rect">
+            <a:avLst/>
+          </a:prstGeom>
+          <a:ln/>
+        </p:spPr>
+      </p:pic>
+      <p:sp>
+        <p:nvSpPr>
+          <p:cNvPr id="8" name="Right Brace 7"/>
+          <p:cNvSpPr/>
+          <p:nvPr/>
+        </p:nvSpPr>
+        <p:spPr>
+          <a:xfrm rot="5400000">
+            <a:off x="6795244" y="4706471"/>
+            <a:ext cx="313767" cy="2088779"/>
+          </a:xfrm>
+          <a:prstGeom prst="rightBrace">
+            <a:avLst/>
+          </a:prstGeom>
+          <a:ln w="38100"/>
+        </p:spPr>
+        <p:style>
+          <a:lnRef idx="1">
+            <a:schemeClr val="accent1"/>
+          </a:lnRef>
+          <a:fillRef idx="0">
+            <a:schemeClr val="accent1"/>
+          </a:fillRef>
+          <a:effectRef idx="0">
+            <a:schemeClr val="accent1"/>
+          </a:effectRef>
+          <a:fontRef idx="minor">
+            <a:schemeClr val="tx1"/>
+          </a:fontRef>
+        </p:style>
+        <p:txBody>
+          <a:bodyPr rtlCol="0" anchor="ctr"/>
+          <a:lstStyle/>
+          <a:p>
+            <a:pPr algn="ctr"/>
+            <a:endParaRPr lang="en-US"/>
+          </a:p>
+        </p:txBody>
+      </p:sp>
+      <p:sp>
+        <p:nvSpPr>
+          <p:cNvPr id="9" name="TextBox 8"/>
+          <p:cNvSpPr txBox="1"/>
+          <p:nvPr/>
+        </p:nvSpPr>
+        <p:spPr>
+          <a:xfrm>
+            <a:off x="6212542" y="6078070"/>
+            <a:ext cx="1484189" cy="369332"/>
+          </a:xfrm>
+          <a:prstGeom prst="rect">
+            <a:avLst/>
+          </a:prstGeom>
+          <a:noFill/>
+        </p:spPr>
+        <p:txBody>
+          <a:bodyPr wrap="none" rtlCol="0">
+            <a:spAutoFit/>
+          </a:bodyPr>
+          <a:lstStyle/>
+          <a:p>
+            <a:r>
+              <a:rPr lang="en-US" dirty="0" smtClean="0">
+                <a:solidFill>
+                  <a:srgbClr val="0070C0"/>
+                </a:solidFill>
+              </a:rPr>
+              <a:t>Design Matrix</a:t>
+            </a:r>
+            <a:endParaRPr lang="en-US" dirty="0">
+              <a:solidFill>
+                <a:srgbClr val="0070C0"/>
+              </a:solidFill>
+            </a:endParaRPr>
+          </a:p>
+        </p:txBody>
+      </p:sp>
+      <p:sp>
+        <p:nvSpPr>
+          <p:cNvPr id="10" name="TextBox 9"/>
+          <p:cNvSpPr txBox="1"/>
+          <p:nvPr/>
+        </p:nvSpPr>
+        <p:spPr>
+          <a:xfrm>
+            <a:off x="8130987" y="4177552"/>
+            <a:ext cx="1249316" cy="369332"/>
+          </a:xfrm>
+          <a:prstGeom prst="rect">
+            <a:avLst/>
+          </a:prstGeom>
+          <a:noFill/>
+        </p:spPr>
+        <p:txBody>
+          <a:bodyPr wrap="none" rtlCol="0">
+            <a:spAutoFit/>
+          </a:bodyPr>
+          <a:lstStyle/>
+          <a:p>
+            <a:r>
+              <a:rPr lang="en-US" dirty="0" smtClean="0">
+                <a:solidFill>
+                  <a:srgbClr val="0070C0"/>
+                </a:solidFill>
+              </a:rPr>
+              <a:t>Parameters</a:t>
+            </a:r>
+            <a:endParaRPr lang="en-US" dirty="0">
+              <a:solidFill>
+                <a:srgbClr val="0070C0"/>
+              </a:solidFill>
+            </a:endParaRPr>
+          </a:p>
+        </p:txBody>
+      </p:sp>
+      <p:sp>
+        <p:nvSpPr>
+          <p:cNvPr id="11" name="TextBox 10"/>
+          <p:cNvSpPr txBox="1"/>
+          <p:nvPr/>
+        </p:nvSpPr>
+        <p:spPr>
+          <a:xfrm>
+            <a:off x="9161929" y="5409311"/>
+            <a:ext cx="741229" cy="369332"/>
+          </a:xfrm>
+          <a:prstGeom prst="rect">
+            <a:avLst/>
+          </a:prstGeom>
+          <a:noFill/>
+        </p:spPr>
+        <p:txBody>
+          <a:bodyPr wrap="none" rtlCol="0">
+            <a:spAutoFit/>
+          </a:bodyPr>
+          <a:lstStyle/>
+          <a:p>
+            <a:r>
+              <a:rPr lang="en-US" dirty="0" smtClean="0">
+                <a:solidFill>
+                  <a:srgbClr val="0070C0"/>
+                </a:solidFill>
+              </a:rPr>
+              <a:t>Errors</a:t>
+            </a:r>
+            <a:endParaRPr lang="en-US" dirty="0">
+              <a:solidFill>
+                <a:srgbClr val="0070C0"/>
+              </a:solidFill>
+            </a:endParaRPr>
+          </a:p>
+        </p:txBody>
+      </p:sp>
+    </p:spTree>
+    <p:extLst>
+      <p:ext uri="{BB962C8B-B14F-4D97-AF65-F5344CB8AC3E}">
+        <p14:creationId xmlns:p14="http://schemas.microsoft.com/office/powerpoint/2010/main" val="1957884043"/>
+      </p:ext>
+    </p:extLst>
+  </p:cSld>
+  <p:clrMapOvr>
+    <a:masterClrMapping/>
+  </p:clrMapOvr>
+</p:sld>
+</file>
+
+<file path=ppt/slides/slide11.xml><?xml version="1.0" encoding="utf-8"?>
+<p:sld xmlns:a="http://schemas.openxmlformats.org/drawingml/2006/main" xmlns:r="http://schemas.openxmlformats.org/officeDocument/2006/relationships" xmlns:p="http://schemas.openxmlformats.org/presentationml/2006/main">
+  <p:cSld>
+    <p:spTree>
+      <p:nvGrpSpPr>
+        <p:cNvPr id="1" name=""/>
+        <p:cNvGrpSpPr/>
+        <p:nvPr/>
+      </p:nvGrpSpPr>
+      <p:grpSpPr>
+        <a:xfrm>
+          <a:off x="0" y="0"/>
+          <a:ext cx="0" cy="0"/>
+          <a:chOff x="0" y="0"/>
+          <a:chExt cx="0" cy="0"/>
+        </a:xfrm>
+      </p:grpSpPr>
+      <p:sp>
+        <p:nvSpPr>
+          <p:cNvPr id="2" name="Title 1"/>
+          <p:cNvSpPr>
+            <a:spLocks noGrp="1"/>
+          </p:cNvSpPr>
+          <p:nvPr>
+            <p:ph type="title"/>
+          </p:nvPr>
+        </p:nvSpPr>
+        <p:spPr/>
+        <p:txBody>
+          <a:bodyPr/>
+          <a:lstStyle/>
+          <a:p>
+            <a:r>
+              <a:rPr lang="en-US" dirty="0" smtClean="0"/>
+              <a:t>Linear Mixed Model (LMM)</a:t>
+            </a:r>
+            <a:endParaRPr lang="en-US" dirty="0"/>
+          </a:p>
+        </p:txBody>
+      </p:sp>
+      <p:sp>
+        <p:nvSpPr>
+          <p:cNvPr id="3" name="Content Placeholder 2"/>
+          <p:cNvSpPr>
+            <a:spLocks noGrp="1"/>
+          </p:cNvSpPr>
+          <p:nvPr>
+            <p:ph idx="1"/>
+          </p:nvPr>
+        </p:nvSpPr>
+        <p:spPr/>
+        <p:txBody>
+          <a:bodyPr/>
+          <a:lstStyle/>
+          <a:p>
+            <a:endParaRPr lang="en-US"/>
+          </a:p>
+        </p:txBody>
+      </p:sp>
+    </p:spTree>
+    <p:extLst>
+      <p:ext uri="{BB962C8B-B14F-4D97-AF65-F5344CB8AC3E}">
+        <p14:creationId xmlns:p14="http://schemas.microsoft.com/office/powerpoint/2010/main" val="3049580291"/>
+      </p:ext>
+    </p:extLst>
+  </p:cSld>
+  <p:clrMapOvr>
+    <a:masterClrMapping/>
+  </p:clrMapOvr>
+</p:sld>
+</file>
+
 <file path=ppt/slides/slide2.xml><?xml version="1.0" encoding="utf-8"?>
 <p:sld xmlns:a="http://schemas.openxmlformats.org/drawingml/2006/main" xmlns:r="http://schemas.openxmlformats.org/officeDocument/2006/relationships" xmlns:p="http://schemas.openxmlformats.org/presentationml/2006/main">
   <p:cSld>
@@ -3542,30 +3850,13 @@
           <a:p>
             <a:r>
               <a:rPr lang="en-US" dirty="0" smtClean="0"/>
-              <a:t>Understand the basic structure and differences among </a:t>
-            </a:r>
+              <a:t>Understand the basic structure and differences among different types of regression models (LM, LMM, GLM, GLMM, GAM, GAMM)</a:t>
+            </a:r>
+          </a:p>
+          <a:p>
             <a:r>
               <a:rPr lang="en-US" dirty="0" smtClean="0"/>
-              <a:t>different types of </a:t>
-            </a:r>
-            <a:r>
-              <a:rPr lang="en-US" dirty="0" smtClean="0"/>
-              <a:t>regression models (LM, LMM, GLM, GLMM, GAM, GAMM)</a:t>
-            </a:r>
-            <a:endParaRPr lang="en-US" dirty="0" smtClean="0"/>
-          </a:p>
-          <a:p>
-            <a:r>
-              <a:rPr lang="en-US" dirty="0" smtClean="0"/>
-              <a:t>Develop intuition for determining when a regression model might help to provide insight into a </a:t>
-            </a:r>
-            <a:r>
-              <a:rPr lang="en-US" dirty="0" smtClean="0"/>
-              <a:t>specific question</a:t>
-            </a:r>
-            <a:r>
-              <a:rPr lang="en-US" dirty="0" smtClean="0"/>
-              <a:t>, given a particular dataset</a:t>
+              <a:t>Develop intuition for determining when a regression model might help to provide insight into a specific question, given a particular dataset</a:t>
             </a:r>
           </a:p>
           <a:p>
@@ -3577,13 +3868,8 @@
           <a:p>
             <a:r>
               <a:rPr lang="en-US" dirty="0" smtClean="0"/>
-              <a:t>Learn basic R programming for regression </a:t>
-            </a:r>
-            <a:r>
-              <a:rPr lang="en-US" dirty="0" smtClean="0"/>
-              <a:t>models based on familiar case studies</a:t>
-            </a:r>
-            <a:endParaRPr lang="en-US" dirty="0" smtClean="0"/>
+              <a:t>Learn basic R programming for regression models based on familiar case studies</a:t>
+            </a:r>
           </a:p>
           <a:p>
             <a:r>
@@ -3680,32 +3966,14 @@
           <a:p>
             <a:r>
               <a:rPr lang="en-US" dirty="0" smtClean="0"/>
-              <a:t>Model </a:t>
-            </a:r>
+              <a:t>Model diagnostics: assessing a model’s fit to the data</a:t>
+            </a:r>
+          </a:p>
+          <a:p>
             <a:r>
               <a:rPr lang="en-US" dirty="0" smtClean="0"/>
-              <a:t>diagnostics: assessing a model’s fit to the data</a:t>
-            </a:r>
-            <a:endParaRPr lang="en-US" dirty="0" smtClean="0"/>
-          </a:p>
-          <a:p>
-            <a:r>
-              <a:rPr lang="en-US" dirty="0" smtClean="0"/>
-              <a:t>Model </a:t>
-            </a:r>
-            <a:r>
-              <a:rPr lang="en-US" dirty="0" smtClean="0"/>
-              <a:t>selection: comparing a </a:t>
-            </a:r>
-            <a:r>
-              <a:rPr lang="en-US" dirty="0" smtClean="0"/>
-              <a:t>suite of similar </a:t>
-            </a:r>
-            <a:r>
-              <a:rPr lang="en-US" dirty="0" smtClean="0"/>
-              <a:t>models fit to the data</a:t>
-            </a:r>
-            <a:endParaRPr lang="en-US" dirty="0" smtClean="0"/>
+              <a:t>Model selection: comparing a suite of similar models fit to the data</a:t>
+            </a:r>
           </a:p>
           <a:p>
             <a:r>
@@ -3722,13 +3990,8 @@
           <a:p>
             <a:r>
               <a:rPr lang="en-US" dirty="0" smtClean="0"/>
-              <a:t>Maximum likelihood </a:t>
-            </a:r>
-            <a:r>
-              <a:rPr lang="en-US" dirty="0" smtClean="0"/>
-              <a:t>inference</a:t>
-            </a:r>
-            <a:endParaRPr lang="en-US" dirty="0" smtClean="0"/>
+              <a:t>Maximum likelihood inference</a:t>
+            </a:r>
           </a:p>
           <a:p>
             <a:r>
@@ -3811,22 +4074,33 @@
           <a:p>
             <a:r>
               <a:rPr lang="en-US" dirty="0" smtClean="0"/>
-              <a:t>Linear </a:t>
-            </a:r>
+              <a:t>Linear model: LM</a:t>
+            </a:r>
+          </a:p>
+          <a:p>
             <a:r>
               <a:rPr lang="en-US" dirty="0" smtClean="0"/>
-              <a:t>model: LM</a:t>
-            </a:r>
-            <a:endParaRPr lang="en-US" dirty="0" smtClean="0"/>
-          </a:p>
-          <a:p>
+              <a:t>Linear mixed model: LMM</a:t>
+            </a:r>
+            <a:endParaRPr lang="en-US" dirty="0"/>
+          </a:p>
+          <a:p>
+            <a:pPr lvl="1"/>
             <a:r>
               <a:rPr lang="en-US" dirty="0" smtClean="0"/>
-              <a:t>Linear mixed </a:t>
-            </a:r>
+              <a:t>Sometimes called “linear mixed effects model”</a:t>
+            </a:r>
+          </a:p>
+          <a:p>
             <a:r>
               <a:rPr lang="en-US" dirty="0" smtClean="0"/>
-              <a:t>model: LMM</a:t>
+              <a:t>Generalized linear model: GLM</a:t>
+            </a:r>
+          </a:p>
+          <a:p>
+            <a:r>
+              <a:rPr lang="en-US" dirty="0" smtClean="0"/>
+              <a:t>Generalized linear mixed model: GLMM</a:t>
             </a:r>
             <a:endParaRPr lang="en-US" dirty="0"/>
           </a:p>
@@ -3834,102 +4108,27 @@
             <a:pPr lvl="1"/>
             <a:r>
               <a:rPr lang="en-US" dirty="0" smtClean="0"/>
-              <a:t>Sometimes called </a:t>
-            </a:r>
+              <a:t>Sometimes called “generalized linear mixed effects model” or “hierarchical generalized linear model” (HGLM)</a:t>
+            </a:r>
+          </a:p>
+          <a:p>
             <a:r>
               <a:rPr lang="en-US" dirty="0" smtClean="0"/>
-              <a:t>“linear </a:t>
-            </a:r>
+              <a:t>Generalized additive model: GAM</a:t>
+            </a:r>
+          </a:p>
+          <a:p>
             <a:r>
               <a:rPr lang="en-US" dirty="0" smtClean="0"/>
-              <a:t>mixed effects model”</a:t>
-            </a:r>
-          </a:p>
-          <a:p>
+              <a:t>Generalized additive mixed model: GAMM</a:t>
+            </a:r>
+          </a:p>
+          <a:p>
+            <a:pPr lvl="1"/>
             <a:r>
               <a:rPr lang="en-US" dirty="0" smtClean="0"/>
-              <a:t>Generalized linear </a:t>
-            </a:r>
-            <a:r>
-              <a:rPr lang="en-US" dirty="0" smtClean="0"/>
-              <a:t>model: GLM</a:t>
-            </a:r>
-            <a:endParaRPr lang="en-US" dirty="0" smtClean="0"/>
-          </a:p>
-          <a:p>
-            <a:r>
-              <a:rPr lang="en-US" dirty="0" smtClean="0"/>
-              <a:t>Generalized linear mixed </a:t>
-            </a:r>
-            <a:r>
-              <a:rPr lang="en-US" dirty="0" smtClean="0"/>
-              <a:t>model: GLMM</a:t>
-            </a:r>
-            <a:endParaRPr lang="en-US" dirty="0"/>
-          </a:p>
-          <a:p>
-            <a:pPr lvl="1"/>
-            <a:r>
-              <a:rPr lang="en-US" dirty="0" smtClean="0"/>
-              <a:t>Sometimes called </a:t>
-            </a:r>
-            <a:r>
-              <a:rPr lang="en-US" dirty="0" smtClean="0"/>
-              <a:t>“generalized </a:t>
-            </a:r>
-            <a:r>
-              <a:rPr lang="en-US" dirty="0" smtClean="0"/>
-              <a:t>linear mixed effects model</a:t>
-            </a:r>
-            <a:r>
-              <a:rPr lang="en-US" dirty="0" smtClean="0"/>
-              <a:t>” or “hierarchical </a:t>
-            </a:r>
-            <a:r>
-              <a:rPr lang="en-US" dirty="0" smtClean="0"/>
-              <a:t>generalized linear model” (HGLM)</a:t>
-            </a:r>
-          </a:p>
-          <a:p>
-            <a:r>
-              <a:rPr lang="en-US" dirty="0" smtClean="0"/>
-              <a:t>Generalized additive </a:t>
-            </a:r>
-            <a:r>
-              <a:rPr lang="en-US" dirty="0" smtClean="0"/>
-              <a:t>model: GAM</a:t>
-            </a:r>
-            <a:endParaRPr lang="en-US" dirty="0" smtClean="0"/>
-          </a:p>
-          <a:p>
-            <a:r>
-              <a:rPr lang="en-US" dirty="0" smtClean="0"/>
-              <a:t>Generalized additive mixed </a:t>
-            </a:r>
-            <a:r>
-              <a:rPr lang="en-US" dirty="0" smtClean="0"/>
-              <a:t>model: GAMM</a:t>
-            </a:r>
-          </a:p>
-          <a:p>
-            <a:pPr lvl="1"/>
-            <a:r>
-              <a:rPr lang="en-US" dirty="0" smtClean="0"/>
-              <a:t>Sometimes called </a:t>
-            </a:r>
-            <a:r>
-              <a:rPr lang="en-US" dirty="0" smtClean="0"/>
-              <a:t>“hierarchical </a:t>
-            </a:r>
-            <a:r>
-              <a:rPr lang="en-US" dirty="0" smtClean="0"/>
-              <a:t>generalized additive model” </a:t>
-            </a:r>
-            <a:r>
-              <a:rPr lang="en-US" dirty="0" smtClean="0"/>
-              <a:t>(HGAM)</a:t>
-            </a:r>
-            <a:endParaRPr lang="en-US" dirty="0" smtClean="0"/>
+              <a:t>Sometimes called “hierarchical generalized additive model” (HGAM)</a:t>
+            </a:r>
           </a:p>
           <a:p>
             <a:endParaRPr lang="en-US" dirty="0" smtClean="0"/>
@@ -3969,8 +4168,8 @@
           <a:chExt cx="0" cy="0"/>
         </a:xfrm>
       </p:grpSpPr>
-      <mc:AlternateContent xmlns:mc="http://schemas.openxmlformats.org/markup-compatibility/2006">
-        <mc:Choice xmlns:a14="http://schemas.microsoft.com/office/drawing/2010/main" Requires="a14">
+      <mc:AlternateContent xmlns:mc="http://schemas.openxmlformats.org/markup-compatibility/2006" xmlns:a14="http://schemas.microsoft.com/office/drawing/2010/main">
+        <mc:Choice Requires="a14">
           <p:graphicFrame>
             <p:nvGraphicFramePr>
               <p:cNvPr id="4" name="Table 3"/>
@@ -4591,7 +4790,7 @@
             </a:graphic>
           </p:graphicFrame>
         </mc:Choice>
-        <mc:Fallback>
+        <mc:Fallback xmlns="">
           <p:graphicFrame>
             <p:nvGraphicFramePr>
               <p:cNvPr id="4" name="Table 3"/>
@@ -4930,8 +5129,8 @@
           </p:graphicFrame>
         </mc:Fallback>
       </mc:AlternateContent>
-      <mc:AlternateContent xmlns:mc="http://schemas.openxmlformats.org/markup-compatibility/2006">
-        <mc:Choice xmlns:a14="http://schemas.microsoft.com/office/drawing/2010/main" Requires="a14">
+      <mc:AlternateContent xmlns:mc="http://schemas.openxmlformats.org/markup-compatibility/2006" xmlns:a14="http://schemas.microsoft.com/office/drawing/2010/main">
+        <mc:Choice Requires="a14">
           <p:sp>
             <p:nvSpPr>
               <p:cNvPr id="5" name="Rectangle 4"/>
@@ -5096,7 +5295,7 @@
             </p:txBody>
           </p:sp>
         </mc:Choice>
-        <mc:Fallback>
+        <mc:Fallback xmlns="">
           <p:sp>
             <p:nvSpPr>
               <p:cNvPr id="5" name="Rectangle 4"/>
@@ -6501,15 +6700,7 @@
           <a:p>
             <a:r>
               <a:rPr lang="en-US" dirty="0" smtClean="0"/>
-              <a:t>Simple Linear </a:t>
-            </a:r>
-            <a:r>
-              <a:rPr lang="en-US" dirty="0" smtClean="0"/>
-              <a:t>Model (LM</a:t>
-            </a:r>
-            <a:r>
-              <a:rPr lang="en-US" dirty="0" smtClean="0"/>
-              <a:t>): Formal Definition</a:t>
+              <a:t>Simple Linear Model (LM): Formal Definition</a:t>
             </a:r>
             <a:endParaRPr lang="en-US" dirty="0"/>
           </a:p>
@@ -6529,7 +6720,9 @@
             </p:nvSpPr>
             <p:spPr/>
             <p:txBody>
-              <a:bodyPr/>
+              <a:bodyPr>
+                <a:normAutofit/>
+              </a:bodyPr>
               <a:lstStyle/>
               <a:p>
                 <a:pPr marL="0" indent="0">
@@ -7229,7 +7422,6 @@
                   <a:rPr lang="en-US" dirty="0" smtClean="0"/>
                   <a:t>.</a:t>
                 </a:r>
-                <a:endParaRPr lang="en-US" dirty="0"/>
               </a:p>
             </p:txBody>
           </p:sp>
@@ -7270,26 +7462,1623 @@
       </mc:AlternateContent>
       <p:sp>
         <p:nvSpPr>
-          <p:cNvPr id="4" name="Rectangle 3"/>
+          <p:cNvPr id="5" name="TextBox 4"/>
+          <p:cNvSpPr txBox="1"/>
+          <p:nvPr/>
+        </p:nvSpPr>
+        <p:spPr>
+          <a:xfrm>
+            <a:off x="1657798" y="6244281"/>
+            <a:ext cx="8876404" cy="369332"/>
+          </a:xfrm>
+          <a:prstGeom prst="rect">
+            <a:avLst/>
+          </a:prstGeom>
+          <a:noFill/>
+        </p:spPr>
+        <p:txBody>
+          <a:bodyPr wrap="none" rtlCol="0">
+            <a:spAutoFit/>
+          </a:bodyPr>
+          <a:lstStyle/>
+          <a:p>
+            <a:r>
+              <a:rPr lang="en-US" dirty="0" smtClean="0"/>
+              <a:t>Wood, S.N. 2006. Generalized Additive Models: An introduction with R. Chapman &amp; Hall/CRC.</a:t>
+            </a:r>
+            <a:endParaRPr lang="en-US" dirty="0"/>
+          </a:p>
+        </p:txBody>
+      </p:sp>
+    </p:spTree>
+    <p:extLst>
+      <p:ext uri="{BB962C8B-B14F-4D97-AF65-F5344CB8AC3E}">
+        <p14:creationId xmlns:p14="http://schemas.microsoft.com/office/powerpoint/2010/main" val="2079366915"/>
+      </p:ext>
+    </p:extLst>
+  </p:cSld>
+  <p:clrMapOvr>
+    <a:masterClrMapping/>
+  </p:clrMapOvr>
+</p:sld>
+</file>
+
+<file path=ppt/slides/slide8.xml><?xml version="1.0" encoding="utf-8"?>
+<p:sld xmlns:a="http://schemas.openxmlformats.org/drawingml/2006/main" xmlns:r="http://schemas.openxmlformats.org/officeDocument/2006/relationships" xmlns:p="http://schemas.openxmlformats.org/presentationml/2006/main">
+  <p:cSld>
+    <p:spTree>
+      <p:nvGrpSpPr>
+        <p:cNvPr id="1" name=""/>
+        <p:cNvGrpSpPr/>
+        <p:nvPr/>
+      </p:nvGrpSpPr>
+      <p:grpSpPr>
+        <a:xfrm>
+          <a:off x="0" y="0"/>
+          <a:ext cx="0" cy="0"/>
+          <a:chOff x="0" y="0"/>
+          <a:chExt cx="0" cy="0"/>
+        </a:xfrm>
+      </p:grpSpPr>
+      <p:sp>
+        <p:nvSpPr>
+          <p:cNvPr id="2" name="Title 1"/>
+          <p:cNvSpPr>
+            <a:spLocks noGrp="1"/>
+          </p:cNvSpPr>
+          <p:nvPr>
+            <p:ph type="title"/>
+          </p:nvPr>
+        </p:nvSpPr>
+        <p:spPr/>
+        <p:txBody>
+          <a:bodyPr/>
+          <a:lstStyle/>
+          <a:p>
+            <a:r>
+              <a:rPr lang="en-US" dirty="0" smtClean="0"/>
+              <a:t>LM: Equivalent Terminology</a:t>
+            </a:r>
+            <a:endParaRPr lang="en-US" dirty="0"/>
+          </a:p>
+        </p:txBody>
+      </p:sp>
+      <mc:AlternateContent xmlns:mc="http://schemas.openxmlformats.org/markup-compatibility/2006">
+        <mc:Choice xmlns:a14="http://schemas.microsoft.com/office/drawing/2010/main" Requires="a14">
+          <p:sp>
+            <p:nvSpPr>
+              <p:cNvPr id="4" name="Text Placeholder 3"/>
+              <p:cNvSpPr>
+                <a:spLocks noGrp="1"/>
+              </p:cNvSpPr>
+              <p:nvPr>
+                <p:ph type="body" idx="1"/>
+              </p:nvPr>
+            </p:nvSpPr>
+            <p:spPr/>
+            <p:txBody>
+              <a:bodyPr/>
+              <a:lstStyle/>
+              <a:p>
+                <a:r>
+                  <a:rPr lang="en-US" dirty="0" smtClean="0"/>
+                  <a:t>Response Variable, </a:t>
+                </a:r>
+                <a14:m>
+                  <m:oMath xmlns:m="http://schemas.openxmlformats.org/officeDocument/2006/math">
+                    <m:r>
+                      <a:rPr lang="en-US" b="1" i="1" smtClean="0">
+                        <a:latin typeface="Cambria Math" panose="02040503050406030204" pitchFamily="18" charset="0"/>
+                      </a:rPr>
+                      <m:t>𝒀</m:t>
+                    </m:r>
+                  </m:oMath>
+                </a14:m>
+                <a:endParaRPr lang="en-US" dirty="0"/>
+              </a:p>
+            </p:txBody>
+          </p:sp>
+        </mc:Choice>
+        <mc:Fallback>
+          <p:sp>
+            <p:nvSpPr>
+              <p:cNvPr id="4" name="Text Placeholder 3"/>
+              <p:cNvSpPr>
+                <a:spLocks noGrp="1" noRot="1" noChangeAspect="1" noMove="1" noResize="1" noEditPoints="1" noAdjustHandles="1" noChangeArrowheads="1" noChangeShapeType="1" noTextEdit="1"/>
+              </p:cNvSpPr>
+              <p:nvPr>
+                <p:ph type="body" idx="1"/>
+              </p:nvPr>
+            </p:nvSpPr>
+            <p:spPr>
+              <a:blipFill>
+                <a:blip r:embed="rId2"/>
+                <a:stretch>
+                  <a:fillRect l="-1891" b="-17037"/>
+                </a:stretch>
+              </a:blipFill>
+            </p:spPr>
+            <p:txBody>
+              <a:bodyPr/>
+              <a:lstStyle/>
+              <a:p>
+                <a:r>
+                  <a:rPr lang="en-US">
+                    <a:noFill/>
+                  </a:rPr>
+                  <a:t> </a:t>
+                </a:r>
+              </a:p>
+            </p:txBody>
+          </p:sp>
+        </mc:Fallback>
+      </mc:AlternateContent>
+      <p:sp>
+        <p:nvSpPr>
+          <p:cNvPr id="5" name="Content Placeholder 4"/>
+          <p:cNvSpPr>
+            <a:spLocks noGrp="1"/>
+          </p:cNvSpPr>
+          <p:nvPr>
+            <p:ph sz="half" idx="2"/>
+          </p:nvPr>
+        </p:nvSpPr>
+        <p:spPr/>
+        <p:txBody>
+          <a:bodyPr/>
+          <a:lstStyle/>
+          <a:p>
+            <a:r>
+              <a:rPr lang="en-US" dirty="0" smtClean="0"/>
+              <a:t>Dependent variable			</a:t>
+            </a:r>
+            <a:endParaRPr lang="en-US" dirty="0"/>
+          </a:p>
+        </p:txBody>
+      </p:sp>
+      <mc:AlternateContent xmlns:mc="http://schemas.openxmlformats.org/markup-compatibility/2006">
+        <mc:Choice xmlns:a14="http://schemas.microsoft.com/office/drawing/2010/main" Requires="a14">
+          <p:sp>
+            <p:nvSpPr>
+              <p:cNvPr id="6" name="Text Placeholder 5"/>
+              <p:cNvSpPr>
+                <a:spLocks noGrp="1"/>
+              </p:cNvSpPr>
+              <p:nvPr>
+                <p:ph type="body" sz="quarter" idx="3"/>
+              </p:nvPr>
+            </p:nvSpPr>
+            <p:spPr/>
+            <p:txBody>
+              <a:bodyPr/>
+              <a:lstStyle/>
+              <a:p>
+                <a:r>
+                  <a:rPr lang="en-US" dirty="0" smtClean="0"/>
+                  <a:t>Predictor Variable, </a:t>
+                </a:r>
+                <a14:m>
+                  <m:oMath xmlns:m="http://schemas.openxmlformats.org/officeDocument/2006/math">
+                    <m:r>
+                      <a:rPr lang="en-US" b="1" i="1" smtClean="0">
+                        <a:latin typeface="Cambria Math" panose="02040503050406030204" pitchFamily="18" charset="0"/>
+                      </a:rPr>
+                      <m:t>𝒙</m:t>
+                    </m:r>
+                  </m:oMath>
+                </a14:m>
+                <a:endParaRPr lang="en-US" dirty="0"/>
+              </a:p>
+            </p:txBody>
+          </p:sp>
+        </mc:Choice>
+        <mc:Fallback>
+          <p:sp>
+            <p:nvSpPr>
+              <p:cNvPr id="6" name="Text Placeholder 5"/>
+              <p:cNvSpPr>
+                <a:spLocks noGrp="1" noRot="1" noChangeAspect="1" noMove="1" noResize="1" noEditPoints="1" noAdjustHandles="1" noChangeArrowheads="1" noChangeShapeType="1" noTextEdit="1"/>
+              </p:cNvSpPr>
+              <p:nvPr>
+                <p:ph type="body" sz="quarter" idx="3"/>
+              </p:nvPr>
+            </p:nvSpPr>
+            <p:spPr>
+              <a:blipFill>
+                <a:blip r:embed="rId3"/>
+                <a:stretch>
+                  <a:fillRect l="-1882" b="-17037"/>
+                </a:stretch>
+              </a:blipFill>
+            </p:spPr>
+            <p:txBody>
+              <a:bodyPr/>
+              <a:lstStyle/>
+              <a:p>
+                <a:r>
+                  <a:rPr lang="en-US">
+                    <a:noFill/>
+                  </a:rPr>
+                  <a:t> </a:t>
+                </a:r>
+              </a:p>
+            </p:txBody>
+          </p:sp>
+        </mc:Fallback>
+      </mc:AlternateContent>
+      <p:sp>
+        <p:nvSpPr>
+          <p:cNvPr id="7" name="Content Placeholder 6"/>
+          <p:cNvSpPr>
+            <a:spLocks noGrp="1"/>
+          </p:cNvSpPr>
+          <p:nvPr>
+            <p:ph sz="quarter" idx="4"/>
+          </p:nvPr>
+        </p:nvSpPr>
+        <p:spPr/>
+        <p:txBody>
+          <a:bodyPr/>
+          <a:lstStyle/>
+          <a:p>
+            <a:r>
+              <a:rPr lang="en-US" dirty="0" smtClean="0"/>
+              <a:t>Independent variable</a:t>
+            </a:r>
+          </a:p>
+          <a:p>
+            <a:r>
+              <a:rPr lang="en-US" dirty="0" smtClean="0"/>
+              <a:t>Driver</a:t>
+            </a:r>
+          </a:p>
+          <a:p>
+            <a:r>
+              <a:rPr lang="en-US" dirty="0" smtClean="0"/>
+              <a:t>Covariate</a:t>
+            </a:r>
+            <a:endParaRPr lang="en-US" dirty="0"/>
+          </a:p>
+        </p:txBody>
+      </p:sp>
+    </p:spTree>
+    <p:extLst>
+      <p:ext uri="{BB962C8B-B14F-4D97-AF65-F5344CB8AC3E}">
+        <p14:creationId xmlns:p14="http://schemas.microsoft.com/office/powerpoint/2010/main" val="807197629"/>
+      </p:ext>
+    </p:extLst>
+  </p:cSld>
+  <p:clrMapOvr>
+    <a:masterClrMapping/>
+  </p:clrMapOvr>
+</p:sld>
+</file>
+
+<file path=ppt/slides/slide9.xml><?xml version="1.0" encoding="utf-8"?>
+<p:sld xmlns:a="http://schemas.openxmlformats.org/drawingml/2006/main" xmlns:r="http://schemas.openxmlformats.org/officeDocument/2006/relationships" xmlns:p="http://schemas.openxmlformats.org/presentationml/2006/main">
+  <p:cSld>
+    <p:spTree>
+      <p:nvGrpSpPr>
+        <p:cNvPr id="1" name=""/>
+        <p:cNvGrpSpPr/>
+        <p:nvPr/>
+      </p:nvGrpSpPr>
+      <p:grpSpPr>
+        <a:xfrm>
+          <a:off x="0" y="0"/>
+          <a:ext cx="0" cy="0"/>
+          <a:chOff x="0" y="0"/>
+          <a:chExt cx="0" cy="0"/>
+        </a:xfrm>
+      </p:grpSpPr>
+      <p:sp>
+        <p:nvSpPr>
+          <p:cNvPr id="2" name="Title 1"/>
+          <p:cNvSpPr>
+            <a:spLocks noGrp="1"/>
+          </p:cNvSpPr>
+          <p:nvPr>
+            <p:ph type="title"/>
+          </p:nvPr>
+        </p:nvSpPr>
+        <p:spPr/>
+        <p:txBody>
+          <a:bodyPr/>
+          <a:lstStyle/>
+          <a:p>
+            <a:r>
+              <a:rPr lang="en-US" dirty="0" smtClean="0"/>
+              <a:t>LM Examples</a:t>
+            </a:r>
+            <a:endParaRPr lang="en-US" dirty="0"/>
+          </a:p>
+        </p:txBody>
+      </p:sp>
+      <p:sp>
+        <p:nvSpPr>
+          <p:cNvPr id="9" name="Text Placeholder 8"/>
+          <p:cNvSpPr>
+            <a:spLocks noGrp="1"/>
+          </p:cNvSpPr>
+          <p:nvPr>
+            <p:ph type="body" idx="1"/>
+          </p:nvPr>
+        </p:nvSpPr>
+        <p:spPr/>
+        <p:txBody>
+          <a:bodyPr/>
+          <a:lstStyle/>
+          <a:p>
+            <a:pPr algn="ctr"/>
+            <a:r>
+              <a:rPr lang="en-US" dirty="0" smtClean="0"/>
+              <a:t>Linear Models</a:t>
+            </a:r>
+            <a:endParaRPr lang="en-US" dirty="0"/>
+          </a:p>
+        </p:txBody>
+      </p:sp>
+      <mc:AlternateContent xmlns:mc="http://schemas.openxmlformats.org/markup-compatibility/2006">
+        <mc:Choice xmlns:a14="http://schemas.microsoft.com/office/drawing/2010/main" Requires="a14">
+          <p:sp>
+            <p:nvSpPr>
+              <p:cNvPr id="10" name="Content Placeholder 9"/>
+              <p:cNvSpPr>
+                <a:spLocks noGrp="1"/>
+              </p:cNvSpPr>
+              <p:nvPr>
+                <p:ph sz="half" idx="2"/>
+              </p:nvPr>
+            </p:nvSpPr>
+            <p:spPr/>
+            <p:txBody>
+              <a:bodyPr>
+                <a:normAutofit/>
+              </a:bodyPr>
+              <a:lstStyle/>
+              <a:p>
+                <a:pPr marL="0" indent="0">
+                  <a:buNone/>
+                </a:pPr>
+                <a14:m>
+                  <m:oMathPara xmlns:m="http://schemas.openxmlformats.org/officeDocument/2006/math">
+                    <m:oMathParaPr>
+                      <m:jc m:val="centerGroup"/>
+                    </m:oMathParaPr>
+                    <m:oMath xmlns:m="http://schemas.openxmlformats.org/officeDocument/2006/math">
+                      <m:r>
+                        <a:rPr lang="en-US" b="0" i="1" smtClean="0">
+                          <a:latin typeface="Cambria Math" panose="02040503050406030204" pitchFamily="18" charset="0"/>
+                        </a:rPr>
+                        <m:t>𝑦</m:t>
+                      </m:r>
+                      <m:r>
+                        <a:rPr lang="en-US" b="0" i="1" smtClean="0">
+                          <a:latin typeface="Cambria Math" panose="02040503050406030204" pitchFamily="18" charset="0"/>
+                        </a:rPr>
+                        <m:t>=</m:t>
+                      </m:r>
+                      <m:sSub>
+                        <m:sSubPr>
+                          <m:ctrlPr>
+                            <a:rPr lang="en-US" b="0" i="1" smtClean="0">
+                              <a:latin typeface="Cambria Math" panose="02040503050406030204" pitchFamily="18" charset="0"/>
+                            </a:rPr>
+                          </m:ctrlPr>
+                        </m:sSubPr>
+                        <m:e>
+                          <m:r>
+                            <a:rPr lang="en-US" b="0" i="1" smtClean="0">
+                              <a:latin typeface="Cambria Math" panose="02040503050406030204" pitchFamily="18" charset="0"/>
+                              <a:ea typeface="Cambria Math" panose="02040503050406030204" pitchFamily="18" charset="0"/>
+                            </a:rPr>
+                            <m:t>𝛽</m:t>
+                          </m:r>
+                        </m:e>
+                        <m:sub>
+                          <m:r>
+                            <a:rPr lang="en-US" b="0" i="1" smtClean="0">
+                              <a:latin typeface="Cambria Math" panose="02040503050406030204" pitchFamily="18" charset="0"/>
+                            </a:rPr>
+                            <m:t>0</m:t>
+                          </m:r>
+                        </m:sub>
+                      </m:sSub>
+                      <m:r>
+                        <a:rPr lang="en-US" b="0" i="1" smtClean="0">
+                          <a:latin typeface="Cambria Math" panose="02040503050406030204" pitchFamily="18" charset="0"/>
+                        </a:rPr>
+                        <m:t>+</m:t>
+                      </m:r>
+                      <m:sSub>
+                        <m:sSubPr>
+                          <m:ctrlPr>
+                            <a:rPr lang="en-US" i="1">
+                              <a:latin typeface="Cambria Math" panose="02040503050406030204" pitchFamily="18" charset="0"/>
+                            </a:rPr>
+                          </m:ctrlPr>
+                        </m:sSubPr>
+                        <m:e>
+                          <m:r>
+                            <a:rPr lang="en-US" i="1">
+                              <a:latin typeface="Cambria Math" panose="02040503050406030204" pitchFamily="18" charset="0"/>
+                              <a:ea typeface="Cambria Math" panose="02040503050406030204" pitchFamily="18" charset="0"/>
+                            </a:rPr>
+                            <m:t>𝛽</m:t>
+                          </m:r>
+                        </m:e>
+                        <m:sub>
+                          <m:r>
+                            <a:rPr lang="en-US" b="0" i="1" smtClean="0">
+                              <a:latin typeface="Cambria Math" panose="02040503050406030204" pitchFamily="18" charset="0"/>
+                              <a:ea typeface="Cambria Math" panose="02040503050406030204" pitchFamily="18" charset="0"/>
+                            </a:rPr>
+                            <m:t>1</m:t>
+                          </m:r>
+                        </m:sub>
+                      </m:sSub>
+                      <m:r>
+                        <a:rPr lang="en-US" b="0" i="1" smtClean="0">
+                          <a:latin typeface="Cambria Math" panose="02040503050406030204" pitchFamily="18" charset="0"/>
+                        </a:rPr>
+                        <m:t>𝑥</m:t>
+                      </m:r>
+                    </m:oMath>
+                  </m:oMathPara>
+                </a14:m>
+                <a:endParaRPr lang="en-US" dirty="0" smtClean="0"/>
+              </a:p>
+              <a:p>
+                <a:pPr marL="0" indent="0">
+                  <a:buNone/>
+                </a:pPr>
+                <a:endParaRPr lang="en-US" sz="1400" dirty="0" smtClean="0"/>
+              </a:p>
+              <a:p>
+                <a:pPr marL="0" indent="0">
+                  <a:buNone/>
+                </a:pPr>
+                <a14:m>
+                  <m:oMathPara xmlns:m="http://schemas.openxmlformats.org/officeDocument/2006/math">
+                    <m:oMathParaPr>
+                      <m:jc m:val="centerGroup"/>
+                    </m:oMathParaPr>
+                    <m:oMath xmlns:m="http://schemas.openxmlformats.org/officeDocument/2006/math">
+                      <m:r>
+                        <a:rPr lang="en-US" i="1">
+                          <a:latin typeface="Cambria Math" panose="02040503050406030204" pitchFamily="18" charset="0"/>
+                        </a:rPr>
+                        <m:t>𝑦</m:t>
+                      </m:r>
+                      <m:r>
+                        <a:rPr lang="en-US" i="1">
+                          <a:latin typeface="Cambria Math" panose="02040503050406030204" pitchFamily="18" charset="0"/>
+                        </a:rPr>
+                        <m:t>=</m:t>
+                      </m:r>
+                      <m:sSub>
+                        <m:sSubPr>
+                          <m:ctrlPr>
+                            <a:rPr lang="en-US" i="1" smtClean="0">
+                              <a:latin typeface="Cambria Math" panose="02040503050406030204" pitchFamily="18" charset="0"/>
+                            </a:rPr>
+                          </m:ctrlPr>
+                        </m:sSubPr>
+                        <m:e>
+                          <m:r>
+                            <a:rPr lang="en-US" i="1">
+                              <a:latin typeface="Cambria Math" panose="02040503050406030204" pitchFamily="18" charset="0"/>
+                              <a:ea typeface="Cambria Math" panose="02040503050406030204" pitchFamily="18" charset="0"/>
+                            </a:rPr>
+                            <m:t>𝛽</m:t>
+                          </m:r>
+                        </m:e>
+                        <m:sub>
+                          <m:r>
+                            <a:rPr lang="en-US" i="1">
+                              <a:latin typeface="Cambria Math" panose="02040503050406030204" pitchFamily="18" charset="0"/>
+                              <a:ea typeface="Cambria Math" panose="02040503050406030204" pitchFamily="18" charset="0"/>
+                            </a:rPr>
+                            <m:t>1</m:t>
+                          </m:r>
+                        </m:sub>
+                      </m:sSub>
+                      <m:r>
+                        <a:rPr lang="en-US" i="1">
+                          <a:latin typeface="Cambria Math" panose="02040503050406030204" pitchFamily="18" charset="0"/>
+                        </a:rPr>
+                        <m:t>𝑥</m:t>
+                      </m:r>
+                    </m:oMath>
+                  </m:oMathPara>
+                </a14:m>
+                <a:endParaRPr lang="en-US" dirty="0" smtClean="0"/>
+              </a:p>
+              <a:p>
+                <a:pPr marL="0" indent="0">
+                  <a:buNone/>
+                </a:pPr>
+                <a:endParaRPr lang="en-US" sz="1400" dirty="0" smtClean="0"/>
+              </a:p>
+              <a:p>
+                <a:pPr marL="0" indent="0">
+                  <a:buNone/>
+                </a:pPr>
+                <a14:m>
+                  <m:oMathPara xmlns:m="http://schemas.openxmlformats.org/officeDocument/2006/math">
+                    <m:oMathParaPr>
+                      <m:jc m:val="centerGroup"/>
+                    </m:oMathParaPr>
+                    <m:oMath xmlns:m="http://schemas.openxmlformats.org/officeDocument/2006/math">
+                      <m:r>
+                        <a:rPr lang="en-US" i="1">
+                          <a:latin typeface="Cambria Math" panose="02040503050406030204" pitchFamily="18" charset="0"/>
+                        </a:rPr>
+                        <m:t>𝑦</m:t>
+                      </m:r>
+                      <m:r>
+                        <a:rPr lang="en-US" i="1">
+                          <a:latin typeface="Cambria Math" panose="02040503050406030204" pitchFamily="18" charset="0"/>
+                        </a:rPr>
+                        <m:t>=</m:t>
+                      </m:r>
+                      <m:sSub>
+                        <m:sSubPr>
+                          <m:ctrlPr>
+                            <a:rPr lang="en-US" i="1">
+                              <a:latin typeface="Cambria Math" panose="02040503050406030204" pitchFamily="18" charset="0"/>
+                            </a:rPr>
+                          </m:ctrlPr>
+                        </m:sSubPr>
+                        <m:e>
+                          <m:r>
+                            <a:rPr lang="en-US" i="1">
+                              <a:latin typeface="Cambria Math" panose="02040503050406030204" pitchFamily="18" charset="0"/>
+                              <a:ea typeface="Cambria Math" panose="02040503050406030204" pitchFamily="18" charset="0"/>
+                            </a:rPr>
+                            <m:t>𝛽</m:t>
+                          </m:r>
+                        </m:e>
+                        <m:sub>
+                          <m:r>
+                            <a:rPr lang="en-US" i="1">
+                              <a:latin typeface="Cambria Math" panose="02040503050406030204" pitchFamily="18" charset="0"/>
+                            </a:rPr>
+                            <m:t>0</m:t>
+                          </m:r>
+                        </m:sub>
+                      </m:sSub>
+                      <m:r>
+                        <a:rPr lang="en-US" i="1">
+                          <a:latin typeface="Cambria Math" panose="02040503050406030204" pitchFamily="18" charset="0"/>
+                        </a:rPr>
+                        <m:t>+</m:t>
+                      </m:r>
+                      <m:sSub>
+                        <m:sSubPr>
+                          <m:ctrlPr>
+                            <a:rPr lang="en-US" i="1">
+                              <a:latin typeface="Cambria Math" panose="02040503050406030204" pitchFamily="18" charset="0"/>
+                            </a:rPr>
+                          </m:ctrlPr>
+                        </m:sSubPr>
+                        <m:e>
+                          <m:r>
+                            <a:rPr lang="en-US" i="1">
+                              <a:latin typeface="Cambria Math" panose="02040503050406030204" pitchFamily="18" charset="0"/>
+                              <a:ea typeface="Cambria Math" panose="02040503050406030204" pitchFamily="18" charset="0"/>
+                            </a:rPr>
+                            <m:t>𝛽</m:t>
+                          </m:r>
+                        </m:e>
+                        <m:sub>
+                          <m:r>
+                            <a:rPr lang="en-US" i="1">
+                              <a:latin typeface="Cambria Math" panose="02040503050406030204" pitchFamily="18" charset="0"/>
+                              <a:ea typeface="Cambria Math" panose="02040503050406030204" pitchFamily="18" charset="0"/>
+                            </a:rPr>
+                            <m:t>1</m:t>
+                          </m:r>
+                        </m:sub>
+                      </m:sSub>
+                      <m:r>
+                        <a:rPr lang="en-US" i="1">
+                          <a:latin typeface="Cambria Math" panose="02040503050406030204" pitchFamily="18" charset="0"/>
+                        </a:rPr>
+                        <m:t>𝑥</m:t>
+                      </m:r>
+                      <m:r>
+                        <a:rPr lang="en-US" b="0" i="1" smtClean="0">
+                          <a:latin typeface="Cambria Math" panose="02040503050406030204" pitchFamily="18" charset="0"/>
+                        </a:rPr>
+                        <m:t>+</m:t>
+                      </m:r>
+                      <m:sSub>
+                        <m:sSubPr>
+                          <m:ctrlPr>
+                            <a:rPr lang="en-US" b="0" i="1" smtClean="0">
+                              <a:latin typeface="Cambria Math" panose="02040503050406030204" pitchFamily="18" charset="0"/>
+                            </a:rPr>
+                          </m:ctrlPr>
+                        </m:sSubPr>
+                        <m:e>
+                          <m:r>
+                            <a:rPr lang="en-US" b="0" i="1" smtClean="0">
+                              <a:latin typeface="Cambria Math" panose="02040503050406030204" pitchFamily="18" charset="0"/>
+                              <a:ea typeface="Cambria Math" panose="02040503050406030204" pitchFamily="18" charset="0"/>
+                            </a:rPr>
+                            <m:t>𝛽</m:t>
+                          </m:r>
+                        </m:e>
+                        <m:sub>
+                          <m:r>
+                            <a:rPr lang="en-US" b="0" i="1" smtClean="0">
+                              <a:latin typeface="Cambria Math" panose="02040503050406030204" pitchFamily="18" charset="0"/>
+                            </a:rPr>
+                            <m:t>2</m:t>
+                          </m:r>
+                        </m:sub>
+                      </m:sSub>
+                      <m:sSup>
+                        <m:sSupPr>
+                          <m:ctrlPr>
+                            <a:rPr lang="en-US" b="0" i="1" smtClean="0">
+                              <a:latin typeface="Cambria Math" panose="02040503050406030204" pitchFamily="18" charset="0"/>
+                            </a:rPr>
+                          </m:ctrlPr>
+                        </m:sSupPr>
+                        <m:e>
+                          <m:r>
+                            <a:rPr lang="en-US" b="0" i="1" smtClean="0">
+                              <a:latin typeface="Cambria Math" panose="02040503050406030204" pitchFamily="18" charset="0"/>
+                            </a:rPr>
+                            <m:t>𝑥</m:t>
+                          </m:r>
+                        </m:e>
+                        <m:sup>
+                          <m:r>
+                            <a:rPr lang="en-US" b="0" i="1" smtClean="0">
+                              <a:latin typeface="Cambria Math" panose="02040503050406030204" pitchFamily="18" charset="0"/>
+                            </a:rPr>
+                            <m:t>2</m:t>
+                          </m:r>
+                        </m:sup>
+                      </m:sSup>
+                      <m:r>
+                        <a:rPr lang="en-US" b="0" i="1" smtClean="0">
+                          <a:latin typeface="Cambria Math" panose="02040503050406030204" pitchFamily="18" charset="0"/>
+                        </a:rPr>
+                        <m:t>+</m:t>
+                      </m:r>
+                      <m:sSub>
+                        <m:sSubPr>
+                          <m:ctrlPr>
+                            <a:rPr lang="en-US" i="1">
+                              <a:latin typeface="Cambria Math" panose="02040503050406030204" pitchFamily="18" charset="0"/>
+                            </a:rPr>
+                          </m:ctrlPr>
+                        </m:sSubPr>
+                        <m:e>
+                          <m:r>
+                            <a:rPr lang="en-US" i="1">
+                              <a:latin typeface="Cambria Math" panose="02040503050406030204" pitchFamily="18" charset="0"/>
+                              <a:ea typeface="Cambria Math" panose="02040503050406030204" pitchFamily="18" charset="0"/>
+                            </a:rPr>
+                            <m:t>𝛽</m:t>
+                          </m:r>
+                        </m:e>
+                        <m:sub>
+                          <m:r>
+                            <a:rPr lang="en-US" b="0" i="1" smtClean="0">
+                              <a:latin typeface="Cambria Math" panose="02040503050406030204" pitchFamily="18" charset="0"/>
+                              <a:ea typeface="Cambria Math" panose="02040503050406030204" pitchFamily="18" charset="0"/>
+                            </a:rPr>
+                            <m:t>3</m:t>
+                          </m:r>
+                        </m:sub>
+                      </m:sSub>
+                      <m:sSup>
+                        <m:sSupPr>
+                          <m:ctrlPr>
+                            <a:rPr lang="en-US" i="1">
+                              <a:latin typeface="Cambria Math" panose="02040503050406030204" pitchFamily="18" charset="0"/>
+                            </a:rPr>
+                          </m:ctrlPr>
+                        </m:sSupPr>
+                        <m:e>
+                          <m:r>
+                            <a:rPr lang="en-US" i="1">
+                              <a:latin typeface="Cambria Math" panose="02040503050406030204" pitchFamily="18" charset="0"/>
+                            </a:rPr>
+                            <m:t>𝑥</m:t>
+                          </m:r>
+                        </m:e>
+                        <m:sup>
+                          <m:r>
+                            <a:rPr lang="en-US" b="0" i="1" smtClean="0">
+                              <a:latin typeface="Cambria Math" panose="02040503050406030204" pitchFamily="18" charset="0"/>
+                            </a:rPr>
+                            <m:t>3</m:t>
+                          </m:r>
+                        </m:sup>
+                      </m:sSup>
+                    </m:oMath>
+                  </m:oMathPara>
+                </a14:m>
+                <a:endParaRPr lang="en-US" dirty="0" smtClean="0"/>
+              </a:p>
+              <a:p>
+                <a:pPr marL="0" indent="0">
+                  <a:buNone/>
+                </a:pPr>
+                <a:endParaRPr lang="en-US" sz="1400" dirty="0" smtClean="0"/>
+              </a:p>
+              <a:p>
+                <a:pPr marL="0" indent="0">
+                  <a:buNone/>
+                </a:pPr>
+                <a14:m>
+                  <m:oMathPara xmlns:m="http://schemas.openxmlformats.org/officeDocument/2006/math">
+                    <m:oMathParaPr>
+                      <m:jc m:val="centerGroup"/>
+                    </m:oMathParaPr>
+                    <m:oMath xmlns:m="http://schemas.openxmlformats.org/officeDocument/2006/math">
+                      <m:r>
+                        <a:rPr lang="en-US" i="1">
+                          <a:latin typeface="Cambria Math" panose="02040503050406030204" pitchFamily="18" charset="0"/>
+                        </a:rPr>
+                        <m:t>𝑦</m:t>
+                      </m:r>
+                      <m:r>
+                        <a:rPr lang="en-US" i="1">
+                          <a:latin typeface="Cambria Math" panose="02040503050406030204" pitchFamily="18" charset="0"/>
+                        </a:rPr>
+                        <m:t>=</m:t>
+                      </m:r>
+                      <m:sSub>
+                        <m:sSubPr>
+                          <m:ctrlPr>
+                            <a:rPr lang="en-US" i="1">
+                              <a:latin typeface="Cambria Math" panose="02040503050406030204" pitchFamily="18" charset="0"/>
+                            </a:rPr>
+                          </m:ctrlPr>
+                        </m:sSubPr>
+                        <m:e>
+                          <m:r>
+                            <a:rPr lang="en-US" i="1">
+                              <a:latin typeface="Cambria Math" panose="02040503050406030204" pitchFamily="18" charset="0"/>
+                              <a:ea typeface="Cambria Math" panose="02040503050406030204" pitchFamily="18" charset="0"/>
+                            </a:rPr>
+                            <m:t>𝛽</m:t>
+                          </m:r>
+                        </m:e>
+                        <m:sub>
+                          <m:r>
+                            <a:rPr lang="en-US" i="1">
+                              <a:latin typeface="Cambria Math" panose="02040503050406030204" pitchFamily="18" charset="0"/>
+                            </a:rPr>
+                            <m:t>0</m:t>
+                          </m:r>
+                        </m:sub>
+                      </m:sSub>
+                      <m:r>
+                        <a:rPr lang="en-US" i="1">
+                          <a:latin typeface="Cambria Math" panose="02040503050406030204" pitchFamily="18" charset="0"/>
+                        </a:rPr>
+                        <m:t>+</m:t>
+                      </m:r>
+                      <m:sSub>
+                        <m:sSubPr>
+                          <m:ctrlPr>
+                            <a:rPr lang="en-US" i="1">
+                              <a:latin typeface="Cambria Math" panose="02040503050406030204" pitchFamily="18" charset="0"/>
+                            </a:rPr>
+                          </m:ctrlPr>
+                        </m:sSubPr>
+                        <m:e>
+                          <m:r>
+                            <a:rPr lang="en-US" i="1">
+                              <a:latin typeface="Cambria Math" panose="02040503050406030204" pitchFamily="18" charset="0"/>
+                              <a:ea typeface="Cambria Math" panose="02040503050406030204" pitchFamily="18" charset="0"/>
+                            </a:rPr>
+                            <m:t>𝛽</m:t>
+                          </m:r>
+                        </m:e>
+                        <m:sub>
+                          <m:r>
+                            <a:rPr lang="en-US" i="1">
+                              <a:latin typeface="Cambria Math" panose="02040503050406030204" pitchFamily="18" charset="0"/>
+                              <a:ea typeface="Cambria Math" panose="02040503050406030204" pitchFamily="18" charset="0"/>
+                            </a:rPr>
+                            <m:t>1</m:t>
+                          </m:r>
+                        </m:sub>
+                      </m:sSub>
+                      <m:r>
+                        <a:rPr lang="en-US" i="1">
+                          <a:latin typeface="Cambria Math" panose="02040503050406030204" pitchFamily="18" charset="0"/>
+                        </a:rPr>
+                        <m:t>𝑥</m:t>
+                      </m:r>
+                      <m:r>
+                        <a:rPr lang="en-US" i="1">
+                          <a:latin typeface="Cambria Math" panose="02040503050406030204" pitchFamily="18" charset="0"/>
+                        </a:rPr>
+                        <m:t>+</m:t>
+                      </m:r>
+                      <m:sSub>
+                        <m:sSubPr>
+                          <m:ctrlPr>
+                            <a:rPr lang="en-US" i="1">
+                              <a:latin typeface="Cambria Math" panose="02040503050406030204" pitchFamily="18" charset="0"/>
+                            </a:rPr>
+                          </m:ctrlPr>
+                        </m:sSubPr>
+                        <m:e>
+                          <m:r>
+                            <a:rPr lang="en-US" i="1">
+                              <a:latin typeface="Cambria Math" panose="02040503050406030204" pitchFamily="18" charset="0"/>
+                              <a:ea typeface="Cambria Math" panose="02040503050406030204" pitchFamily="18" charset="0"/>
+                            </a:rPr>
+                            <m:t>𝛽</m:t>
+                          </m:r>
+                        </m:e>
+                        <m:sub>
+                          <m:r>
+                            <a:rPr lang="en-US" i="1">
+                              <a:latin typeface="Cambria Math" panose="02040503050406030204" pitchFamily="18" charset="0"/>
+                            </a:rPr>
+                            <m:t>2</m:t>
+                          </m:r>
+                        </m:sub>
+                      </m:sSub>
+                      <m:r>
+                        <a:rPr lang="en-US" b="0" i="1" smtClean="0">
+                          <a:latin typeface="Cambria Math" panose="02040503050406030204" pitchFamily="18" charset="0"/>
+                        </a:rPr>
+                        <m:t>𝑧</m:t>
+                      </m:r>
+                      <m:r>
+                        <a:rPr lang="en-US" i="1">
+                          <a:latin typeface="Cambria Math" panose="02040503050406030204" pitchFamily="18" charset="0"/>
+                        </a:rPr>
+                        <m:t>+</m:t>
+                      </m:r>
+                      <m:sSub>
+                        <m:sSubPr>
+                          <m:ctrlPr>
+                            <a:rPr lang="en-US" i="1">
+                              <a:latin typeface="Cambria Math" panose="02040503050406030204" pitchFamily="18" charset="0"/>
+                            </a:rPr>
+                          </m:ctrlPr>
+                        </m:sSubPr>
+                        <m:e>
+                          <m:r>
+                            <a:rPr lang="en-US" i="1">
+                              <a:latin typeface="Cambria Math" panose="02040503050406030204" pitchFamily="18" charset="0"/>
+                              <a:ea typeface="Cambria Math" panose="02040503050406030204" pitchFamily="18" charset="0"/>
+                            </a:rPr>
+                            <m:t>𝛽</m:t>
+                          </m:r>
+                        </m:e>
+                        <m:sub>
+                          <m:r>
+                            <a:rPr lang="en-US" i="1">
+                              <a:latin typeface="Cambria Math" panose="02040503050406030204" pitchFamily="18" charset="0"/>
+                              <a:ea typeface="Cambria Math" panose="02040503050406030204" pitchFamily="18" charset="0"/>
+                            </a:rPr>
+                            <m:t>3</m:t>
+                          </m:r>
+                        </m:sub>
+                      </m:sSub>
+                      <m:r>
+                        <a:rPr lang="en-US" b="0" i="1" smtClean="0">
+                          <a:latin typeface="Cambria Math" panose="02040503050406030204" pitchFamily="18" charset="0"/>
+                          <a:ea typeface="Cambria Math" panose="02040503050406030204" pitchFamily="18" charset="0"/>
+                        </a:rPr>
+                        <m:t>𝑙𝑜𝑔</m:t>
+                      </m:r>
+                      <m:d>
+                        <m:dPr>
+                          <m:ctrlPr>
+                            <a:rPr lang="en-US" b="0" i="1" smtClean="0">
+                              <a:latin typeface="Cambria Math" panose="02040503050406030204" pitchFamily="18" charset="0"/>
+                              <a:ea typeface="Cambria Math" panose="02040503050406030204" pitchFamily="18" charset="0"/>
+                            </a:rPr>
+                          </m:ctrlPr>
+                        </m:dPr>
+                        <m:e>
+                          <m:r>
+                            <a:rPr lang="en-US" b="0" i="1" smtClean="0">
+                              <a:latin typeface="Cambria Math" panose="02040503050406030204" pitchFamily="18" charset="0"/>
+                              <a:ea typeface="Cambria Math" panose="02040503050406030204" pitchFamily="18" charset="0"/>
+                            </a:rPr>
+                            <m:t>𝑥𝑧</m:t>
+                          </m:r>
+                        </m:e>
+                      </m:d>
+                    </m:oMath>
+                  </m:oMathPara>
+                </a14:m>
+                <a:endParaRPr lang="en-US" dirty="0" smtClean="0"/>
+              </a:p>
+              <a:p>
+                <a:pPr marL="0" indent="0">
+                  <a:buNone/>
+                </a:pPr>
+                <a:endParaRPr lang="en-US" sz="1500" dirty="0" smtClean="0"/>
+              </a:p>
+              <a:p>
+                <a:pPr marL="0" indent="0">
+                  <a:buNone/>
+                </a:pPr>
+                <a14:m>
+                  <m:oMathPara xmlns:m="http://schemas.openxmlformats.org/officeDocument/2006/math">
+                    <m:oMathParaPr>
+                      <m:jc m:val="centerGroup"/>
+                    </m:oMathParaPr>
+                    <m:oMath xmlns:m="http://schemas.openxmlformats.org/officeDocument/2006/math">
+                      <m:r>
+                        <a:rPr lang="en-US" i="1">
+                          <a:latin typeface="Cambria Math" panose="02040503050406030204" pitchFamily="18" charset="0"/>
+                        </a:rPr>
+                        <m:t>𝑦</m:t>
+                      </m:r>
+                      <m:r>
+                        <a:rPr lang="en-US" i="1">
+                          <a:latin typeface="Cambria Math" panose="02040503050406030204" pitchFamily="18" charset="0"/>
+                        </a:rPr>
+                        <m:t>=</m:t>
+                      </m:r>
+                      <m:sSub>
+                        <m:sSubPr>
+                          <m:ctrlPr>
+                            <a:rPr lang="en-US" i="1">
+                              <a:latin typeface="Cambria Math" panose="02040503050406030204" pitchFamily="18" charset="0"/>
+                            </a:rPr>
+                          </m:ctrlPr>
+                        </m:sSubPr>
+                        <m:e>
+                          <m:r>
+                            <a:rPr lang="en-US" i="1">
+                              <a:latin typeface="Cambria Math" panose="02040503050406030204" pitchFamily="18" charset="0"/>
+                              <a:ea typeface="Cambria Math" panose="02040503050406030204" pitchFamily="18" charset="0"/>
+                            </a:rPr>
+                            <m:t>𝛽</m:t>
+                          </m:r>
+                        </m:e>
+                        <m:sub>
+                          <m:r>
+                            <a:rPr lang="en-US" i="1">
+                              <a:latin typeface="Cambria Math" panose="02040503050406030204" pitchFamily="18" charset="0"/>
+                            </a:rPr>
+                            <m:t>0</m:t>
+                          </m:r>
+                        </m:sub>
+                      </m:sSub>
+                      <m:r>
+                        <a:rPr lang="en-US" i="1">
+                          <a:latin typeface="Cambria Math" panose="02040503050406030204" pitchFamily="18" charset="0"/>
+                        </a:rPr>
+                        <m:t>+</m:t>
+                      </m:r>
+                      <m:f>
+                        <m:fPr>
+                          <m:ctrlPr>
+                            <a:rPr lang="en-US" i="1" smtClean="0">
+                              <a:latin typeface="Cambria Math" panose="02040503050406030204" pitchFamily="18" charset="0"/>
+                            </a:rPr>
+                          </m:ctrlPr>
+                        </m:fPr>
+                        <m:num>
+                          <m:sSub>
+                            <m:sSubPr>
+                              <m:ctrlPr>
+                                <a:rPr lang="en-US" i="1" smtClean="0">
+                                  <a:latin typeface="Cambria Math" panose="02040503050406030204" pitchFamily="18" charset="0"/>
+                                </a:rPr>
+                              </m:ctrlPr>
+                            </m:sSubPr>
+                            <m:e>
+                              <m:r>
+                                <a:rPr lang="en-US" i="1" smtClean="0">
+                                  <a:latin typeface="Cambria Math" panose="02040503050406030204" pitchFamily="18" charset="0"/>
+                                  <a:ea typeface="Cambria Math" panose="02040503050406030204" pitchFamily="18" charset="0"/>
+                                </a:rPr>
+                                <m:t>𝛽</m:t>
+                              </m:r>
+                            </m:e>
+                            <m:sub>
+                              <m:r>
+                                <a:rPr lang="en-US" b="0" i="1" smtClean="0">
+                                  <a:latin typeface="Cambria Math" panose="02040503050406030204" pitchFamily="18" charset="0"/>
+                                </a:rPr>
+                                <m:t>1</m:t>
+                              </m:r>
+                            </m:sub>
+                          </m:sSub>
+                        </m:num>
+                        <m:den>
+                          <m:r>
+                            <a:rPr lang="en-US" b="0" i="1" smtClean="0">
+                              <a:latin typeface="Cambria Math" panose="02040503050406030204" pitchFamily="18" charset="0"/>
+                            </a:rPr>
+                            <m:t>𝑥</m:t>
+                          </m:r>
+                        </m:den>
+                      </m:f>
+                    </m:oMath>
+                  </m:oMathPara>
+                </a14:m>
+                <a:endParaRPr lang="en-US" dirty="0"/>
+              </a:p>
+              <a:p>
+                <a:pPr marL="0" indent="0">
+                  <a:buNone/>
+                </a:pPr>
+                <a:endParaRPr lang="en-US" dirty="0"/>
+              </a:p>
+              <a:p>
+                <a:pPr marL="0" indent="0">
+                  <a:buNone/>
+                </a:pPr>
+                <a:endParaRPr lang="en-US" dirty="0"/>
+              </a:p>
+              <a:p>
+                <a:pPr marL="0" indent="0">
+                  <a:buNone/>
+                </a:pPr>
+                <a:endParaRPr lang="en-US" dirty="0"/>
+              </a:p>
+            </p:txBody>
+          </p:sp>
+        </mc:Choice>
+        <mc:Fallback>
+          <p:sp>
+            <p:nvSpPr>
+              <p:cNvPr id="10" name="Content Placeholder 9"/>
+              <p:cNvSpPr>
+                <a:spLocks noGrp="1" noRot="1" noChangeAspect="1" noMove="1" noResize="1" noEditPoints="1" noAdjustHandles="1" noChangeArrowheads="1" noChangeShapeType="1" noTextEdit="1"/>
+              </p:cNvSpPr>
+              <p:nvPr>
+                <p:ph sz="half" idx="2"/>
+              </p:nvPr>
+            </p:nvSpPr>
+            <p:spPr>
+              <a:blipFill>
+                <a:blip r:embed="rId2"/>
+                <a:stretch>
+                  <a:fillRect l="-236"/>
+                </a:stretch>
+              </a:blipFill>
+            </p:spPr>
+            <p:txBody>
+              <a:bodyPr/>
+              <a:lstStyle/>
+              <a:p>
+                <a:r>
+                  <a:rPr lang="en-US">
+                    <a:noFill/>
+                  </a:rPr>
+                  <a:t> </a:t>
+                </a:r>
+              </a:p>
+            </p:txBody>
+          </p:sp>
+        </mc:Fallback>
+      </mc:AlternateContent>
+      <p:sp>
+        <p:nvSpPr>
+          <p:cNvPr id="11" name="Text Placeholder 10"/>
+          <p:cNvSpPr>
+            <a:spLocks noGrp="1"/>
+          </p:cNvSpPr>
+          <p:nvPr>
+            <p:ph type="body" sz="quarter" idx="3"/>
+          </p:nvPr>
+        </p:nvSpPr>
+        <p:spPr/>
+        <p:txBody>
+          <a:bodyPr/>
+          <a:lstStyle/>
+          <a:p>
+            <a:pPr algn="ctr"/>
+            <a:r>
+              <a:rPr lang="en-US" dirty="0" smtClean="0"/>
+              <a:t>Non-linear Models</a:t>
+            </a:r>
+            <a:endParaRPr lang="en-US" dirty="0"/>
+          </a:p>
+        </p:txBody>
+      </p:sp>
+      <mc:AlternateContent xmlns:mc="http://schemas.openxmlformats.org/markup-compatibility/2006">
+        <mc:Choice xmlns:a14="http://schemas.microsoft.com/office/drawing/2010/main" Requires="a14">
+          <p:sp>
+            <p:nvSpPr>
+              <p:cNvPr id="12" name="Content Placeholder 11"/>
+              <p:cNvSpPr>
+                <a:spLocks noGrp="1"/>
+              </p:cNvSpPr>
+              <p:nvPr>
+                <p:ph sz="quarter" idx="4"/>
+              </p:nvPr>
+            </p:nvSpPr>
+            <p:spPr/>
+            <p:txBody>
+              <a:bodyPr/>
+              <a:lstStyle/>
+              <a:p>
+                <a:pPr marL="0" indent="0">
+                  <a:buNone/>
+                </a:pPr>
+                <a14:m>
+                  <m:oMathPara xmlns:m="http://schemas.openxmlformats.org/officeDocument/2006/math">
+                    <m:oMathParaPr>
+                      <m:jc m:val="centerGroup"/>
+                    </m:oMathParaPr>
+                    <m:oMath xmlns:m="http://schemas.openxmlformats.org/officeDocument/2006/math">
+                      <m:r>
+                        <a:rPr lang="en-US" i="1" smtClean="0">
+                          <a:latin typeface="Cambria Math" panose="02040503050406030204" pitchFamily="18" charset="0"/>
+                        </a:rPr>
+                        <m:t>𝑦</m:t>
+                      </m:r>
+                      <m:r>
+                        <a:rPr lang="en-US" i="1" smtClean="0">
+                          <a:latin typeface="Cambria Math" panose="02040503050406030204" pitchFamily="18" charset="0"/>
+                        </a:rPr>
+                        <m:t>=</m:t>
+                      </m:r>
+                      <m:sSubSup>
+                        <m:sSubSupPr>
+                          <m:ctrlPr>
+                            <a:rPr lang="en-US" i="1">
+                              <a:latin typeface="Cambria Math" panose="02040503050406030204" pitchFamily="18" charset="0"/>
+                            </a:rPr>
+                          </m:ctrlPr>
+                        </m:sSubSupPr>
+                        <m:e>
+                          <m:r>
+                            <a:rPr lang="en-US" i="1">
+                              <a:latin typeface="Cambria Math" panose="02040503050406030204" pitchFamily="18" charset="0"/>
+                              <a:ea typeface="Cambria Math" panose="02040503050406030204" pitchFamily="18" charset="0"/>
+                            </a:rPr>
+                            <m:t>𝛽</m:t>
+                          </m:r>
+                        </m:e>
+                        <m:sub>
+                          <m:r>
+                            <a:rPr lang="en-US" i="1">
+                              <a:latin typeface="Cambria Math" panose="02040503050406030204" pitchFamily="18" charset="0"/>
+                            </a:rPr>
+                            <m:t>0</m:t>
+                          </m:r>
+                        </m:sub>
+                        <m:sup>
+                          <m:sSub>
+                            <m:sSubPr>
+                              <m:ctrlPr>
+                                <a:rPr lang="en-US" i="1">
+                                  <a:latin typeface="Cambria Math" panose="02040503050406030204" pitchFamily="18" charset="0"/>
+                                </a:rPr>
+                              </m:ctrlPr>
+                            </m:sSubPr>
+                            <m:e>
+                              <m:r>
+                                <a:rPr lang="en-US" i="1">
+                                  <a:latin typeface="Cambria Math" panose="02040503050406030204" pitchFamily="18" charset="0"/>
+                                  <a:ea typeface="Cambria Math" panose="02040503050406030204" pitchFamily="18" charset="0"/>
+                                </a:rPr>
+                                <m:t>𝛽</m:t>
+                              </m:r>
+                            </m:e>
+                            <m:sub>
+                              <m:r>
+                                <a:rPr lang="en-US" i="1">
+                                  <a:latin typeface="Cambria Math" panose="02040503050406030204" pitchFamily="18" charset="0"/>
+                                </a:rPr>
+                                <m:t>1</m:t>
+                              </m:r>
+                            </m:sub>
+                          </m:sSub>
+                          <m:r>
+                            <a:rPr lang="en-US" i="1">
+                              <a:latin typeface="Cambria Math" panose="02040503050406030204" pitchFamily="18" charset="0"/>
+                            </a:rPr>
+                            <m:t>𝑥</m:t>
+                          </m:r>
+                        </m:sup>
+                      </m:sSubSup>
+                    </m:oMath>
+                  </m:oMathPara>
+                </a14:m>
+                <a:endParaRPr lang="en-US" dirty="0" smtClean="0"/>
+              </a:p>
+              <a:p>
+                <a:pPr marL="0" indent="0">
+                  <a:buNone/>
+                </a:pPr>
+                <a:endParaRPr lang="en-US" sz="1400" dirty="0" smtClean="0"/>
+              </a:p>
+              <a:p>
+                <a:pPr marL="0" indent="0">
+                  <a:buNone/>
+                </a:pPr>
+                <a14:m>
+                  <m:oMathPara xmlns:m="http://schemas.openxmlformats.org/officeDocument/2006/math">
+                    <m:oMathParaPr>
+                      <m:jc m:val="centerGroup"/>
+                    </m:oMathParaPr>
+                    <m:oMath xmlns:m="http://schemas.openxmlformats.org/officeDocument/2006/math">
+                      <m:r>
+                        <a:rPr lang="en-US" i="1">
+                          <a:latin typeface="Cambria Math" panose="02040503050406030204" pitchFamily="18" charset="0"/>
+                        </a:rPr>
+                        <m:t>𝑦</m:t>
+                      </m:r>
+                      <m:r>
+                        <a:rPr lang="en-US" i="1">
+                          <a:latin typeface="Cambria Math" panose="02040503050406030204" pitchFamily="18" charset="0"/>
+                        </a:rPr>
+                        <m:t>=</m:t>
+                      </m:r>
+                      <m:f>
+                        <m:fPr>
+                          <m:ctrlPr>
+                            <a:rPr lang="en-US" i="1">
+                              <a:latin typeface="Cambria Math" panose="02040503050406030204" pitchFamily="18" charset="0"/>
+                            </a:rPr>
+                          </m:ctrlPr>
+                        </m:fPr>
+                        <m:num>
+                          <m:sSub>
+                            <m:sSubPr>
+                              <m:ctrlPr>
+                                <a:rPr lang="en-US" i="1">
+                                  <a:latin typeface="Cambria Math" panose="02040503050406030204" pitchFamily="18" charset="0"/>
+                                </a:rPr>
+                              </m:ctrlPr>
+                            </m:sSubPr>
+                            <m:e>
+                              <m:r>
+                                <a:rPr lang="en-US" i="1">
+                                  <a:latin typeface="Cambria Math" panose="02040503050406030204" pitchFamily="18" charset="0"/>
+                                  <a:ea typeface="Cambria Math" panose="02040503050406030204" pitchFamily="18" charset="0"/>
+                                </a:rPr>
+                                <m:t>𝛽</m:t>
+                              </m:r>
+                            </m:e>
+                            <m:sub>
+                              <m:r>
+                                <a:rPr lang="en-US" b="0" i="1" smtClean="0">
+                                  <a:latin typeface="Cambria Math" panose="02040503050406030204" pitchFamily="18" charset="0"/>
+                                  <a:ea typeface="Cambria Math" panose="02040503050406030204" pitchFamily="18" charset="0"/>
+                                </a:rPr>
+                                <m:t>0</m:t>
+                              </m:r>
+                            </m:sub>
+                          </m:sSub>
+                        </m:num>
+                        <m:den>
+                          <m:sSub>
+                            <m:sSubPr>
+                              <m:ctrlPr>
+                                <a:rPr lang="en-US" i="1" smtClean="0">
+                                  <a:latin typeface="Cambria Math" panose="02040503050406030204" pitchFamily="18" charset="0"/>
+                                </a:rPr>
+                              </m:ctrlPr>
+                            </m:sSubPr>
+                            <m:e>
+                              <m:r>
+                                <a:rPr lang="en-US" i="1" smtClean="0">
+                                  <a:latin typeface="Cambria Math" panose="02040503050406030204" pitchFamily="18" charset="0"/>
+                                  <a:ea typeface="Cambria Math" panose="02040503050406030204" pitchFamily="18" charset="0"/>
+                                </a:rPr>
+                                <m:t>𝛽</m:t>
+                              </m:r>
+                            </m:e>
+                            <m:sub>
+                              <m:r>
+                                <a:rPr lang="en-US" b="0" i="1" smtClean="0">
+                                  <a:latin typeface="Cambria Math" panose="02040503050406030204" pitchFamily="18" charset="0"/>
+                                </a:rPr>
+                                <m:t>1</m:t>
+                              </m:r>
+                            </m:sub>
+                          </m:sSub>
+                        </m:den>
+                      </m:f>
+                      <m:r>
+                        <a:rPr lang="en-US" b="0" i="1" smtClean="0">
+                          <a:latin typeface="Cambria Math" panose="02040503050406030204" pitchFamily="18" charset="0"/>
+                        </a:rPr>
+                        <m:t>𝑥</m:t>
+                      </m:r>
+                    </m:oMath>
+                  </m:oMathPara>
+                </a14:m>
+                <a:endParaRPr lang="en-US" dirty="0" smtClean="0"/>
+              </a:p>
+              <a:p>
+                <a:pPr marL="0" indent="0">
+                  <a:buNone/>
+                </a:pPr>
+                <a:endParaRPr lang="en-US" sz="1400" dirty="0"/>
+              </a:p>
+              <a:p>
+                <a:pPr marL="0" indent="0">
+                  <a:buNone/>
+                </a:pPr>
+                <a14:m>
+                  <m:oMathPara xmlns:m="http://schemas.openxmlformats.org/officeDocument/2006/math">
+                    <m:oMathParaPr>
+                      <m:jc m:val="centerGroup"/>
+                    </m:oMathParaPr>
+                    <m:oMath xmlns:m="http://schemas.openxmlformats.org/officeDocument/2006/math">
+                      <m:r>
+                        <a:rPr lang="en-US" i="1">
+                          <a:latin typeface="Cambria Math" panose="02040503050406030204" pitchFamily="18" charset="0"/>
+                        </a:rPr>
+                        <m:t>𝑦</m:t>
+                      </m:r>
+                      <m:r>
+                        <a:rPr lang="en-US" i="1">
+                          <a:latin typeface="Cambria Math" panose="02040503050406030204" pitchFamily="18" charset="0"/>
+                        </a:rPr>
+                        <m:t>=</m:t>
+                      </m:r>
+                      <m:sSub>
+                        <m:sSubPr>
+                          <m:ctrlPr>
+                            <a:rPr lang="en-US" i="1">
+                              <a:latin typeface="Cambria Math" panose="02040503050406030204" pitchFamily="18" charset="0"/>
+                            </a:rPr>
+                          </m:ctrlPr>
+                        </m:sSubPr>
+                        <m:e>
+                          <m:sSub>
+                            <m:sSubPr>
+                              <m:ctrlPr>
+                                <a:rPr lang="en-US" i="1" smtClean="0">
+                                  <a:latin typeface="Cambria Math" panose="02040503050406030204" pitchFamily="18" charset="0"/>
+                                </a:rPr>
+                              </m:ctrlPr>
+                            </m:sSubPr>
+                            <m:e>
+                              <m:r>
+                                <a:rPr lang="en-US" i="1" smtClean="0">
+                                  <a:latin typeface="Cambria Math" panose="02040503050406030204" pitchFamily="18" charset="0"/>
+                                  <a:ea typeface="Cambria Math" panose="02040503050406030204" pitchFamily="18" charset="0"/>
+                                </a:rPr>
+                                <m:t>𝛽</m:t>
+                              </m:r>
+                            </m:e>
+                            <m:sub>
+                              <m:r>
+                                <a:rPr lang="en-US" b="0" i="1" smtClean="0">
+                                  <a:latin typeface="Cambria Math" panose="02040503050406030204" pitchFamily="18" charset="0"/>
+                                </a:rPr>
+                                <m:t>0</m:t>
+                              </m:r>
+                            </m:sub>
+                          </m:sSub>
+                          <m:r>
+                            <a:rPr lang="en-US" i="1" smtClean="0">
+                              <a:latin typeface="Cambria Math" panose="02040503050406030204" pitchFamily="18" charset="0"/>
+                              <a:ea typeface="Cambria Math" panose="02040503050406030204" pitchFamily="18" charset="0"/>
+                            </a:rPr>
+                            <m:t>∗</m:t>
+                          </m:r>
+                          <m:r>
+                            <a:rPr lang="en-US" i="1">
+                              <a:latin typeface="Cambria Math" panose="02040503050406030204" pitchFamily="18" charset="0"/>
+                              <a:ea typeface="Cambria Math" panose="02040503050406030204" pitchFamily="18" charset="0"/>
+                            </a:rPr>
+                            <m:t>𝛽</m:t>
+                          </m:r>
+                        </m:e>
+                        <m:sub>
+                          <m:r>
+                            <a:rPr lang="en-US" i="1">
+                              <a:latin typeface="Cambria Math" panose="02040503050406030204" pitchFamily="18" charset="0"/>
+                              <a:ea typeface="Cambria Math" panose="02040503050406030204" pitchFamily="18" charset="0"/>
+                            </a:rPr>
+                            <m:t>1</m:t>
+                          </m:r>
+                        </m:sub>
+                      </m:sSub>
+                      <m:r>
+                        <a:rPr lang="en-US" i="1">
+                          <a:latin typeface="Cambria Math" panose="02040503050406030204" pitchFamily="18" charset="0"/>
+                        </a:rPr>
+                        <m:t>𝑥</m:t>
+                      </m:r>
+                    </m:oMath>
+                  </m:oMathPara>
+                </a14:m>
+                <a:endParaRPr lang="en-US" dirty="0" smtClean="0"/>
+              </a:p>
+              <a:p>
+                <a:pPr marL="0" indent="0">
+                  <a:buNone/>
+                </a:pPr>
+                <a:endParaRPr lang="en-US" sz="1400" dirty="0" smtClean="0"/>
+              </a:p>
+              <a:p>
+                <a:pPr marL="0" indent="0">
+                  <a:buNone/>
+                </a:pPr>
+                <a14:m>
+                  <m:oMathPara xmlns:m="http://schemas.openxmlformats.org/officeDocument/2006/math">
+                    <m:oMathParaPr>
+                      <m:jc m:val="centerGroup"/>
+                    </m:oMathParaPr>
+                    <m:oMath xmlns:m="http://schemas.openxmlformats.org/officeDocument/2006/math">
+                      <m:r>
+                        <a:rPr lang="en-US" i="1">
+                          <a:latin typeface="Cambria Math" panose="02040503050406030204" pitchFamily="18" charset="0"/>
+                        </a:rPr>
+                        <m:t>𝑦</m:t>
+                      </m:r>
+                      <m:r>
+                        <a:rPr lang="en-US" i="1">
+                          <a:latin typeface="Cambria Math" panose="02040503050406030204" pitchFamily="18" charset="0"/>
+                        </a:rPr>
+                        <m:t>=</m:t>
+                      </m:r>
+                      <m:sSub>
+                        <m:sSubPr>
+                          <m:ctrlPr>
+                            <a:rPr lang="en-US" i="1" smtClean="0">
+                              <a:latin typeface="Cambria Math" panose="02040503050406030204" pitchFamily="18" charset="0"/>
+                            </a:rPr>
+                          </m:ctrlPr>
+                        </m:sSubPr>
+                        <m:e>
+                          <m:r>
+                            <a:rPr lang="en-US" i="1" smtClean="0">
+                              <a:latin typeface="Cambria Math" panose="02040503050406030204" pitchFamily="18" charset="0"/>
+                              <a:ea typeface="Cambria Math" panose="02040503050406030204" pitchFamily="18" charset="0"/>
+                            </a:rPr>
+                            <m:t>𝛽</m:t>
+                          </m:r>
+                        </m:e>
+                        <m:sub>
+                          <m:r>
+                            <a:rPr lang="en-US" b="0" i="1" smtClean="0">
+                              <a:latin typeface="Cambria Math" panose="02040503050406030204" pitchFamily="18" charset="0"/>
+                            </a:rPr>
+                            <m:t>0</m:t>
+                          </m:r>
+                        </m:sub>
+                      </m:sSub>
+                      <m:r>
+                        <a:rPr lang="en-US" i="1" smtClean="0">
+                          <a:latin typeface="Cambria Math" panose="02040503050406030204" pitchFamily="18" charset="0"/>
+                          <a:ea typeface="Cambria Math" panose="02040503050406030204" pitchFamily="18" charset="0"/>
+                        </a:rPr>
+                        <m:t>∗</m:t>
+                      </m:r>
+                      <m:sSup>
+                        <m:sSupPr>
+                          <m:ctrlPr>
+                            <a:rPr lang="en-US" i="1" smtClean="0">
+                              <a:latin typeface="Cambria Math" panose="02040503050406030204" pitchFamily="18" charset="0"/>
+                              <a:ea typeface="Cambria Math" panose="02040503050406030204" pitchFamily="18" charset="0"/>
+                            </a:rPr>
+                          </m:ctrlPr>
+                        </m:sSupPr>
+                        <m:e>
+                          <m:r>
+                            <a:rPr lang="en-US" b="0" i="1" smtClean="0">
+                              <a:latin typeface="Cambria Math" panose="02040503050406030204" pitchFamily="18" charset="0"/>
+                              <a:ea typeface="Cambria Math" panose="02040503050406030204" pitchFamily="18" charset="0"/>
+                            </a:rPr>
+                            <m:t>𝑥</m:t>
+                          </m:r>
+                        </m:e>
+                        <m:sup>
+                          <m:sSub>
+                            <m:sSubPr>
+                              <m:ctrlPr>
+                                <a:rPr lang="en-US" i="1" smtClean="0">
+                                  <a:latin typeface="Cambria Math" panose="02040503050406030204" pitchFamily="18" charset="0"/>
+                                  <a:ea typeface="Cambria Math" panose="02040503050406030204" pitchFamily="18" charset="0"/>
+                                </a:rPr>
+                              </m:ctrlPr>
+                            </m:sSubPr>
+                            <m:e>
+                              <m:r>
+                                <a:rPr lang="en-US" i="1" smtClean="0">
+                                  <a:latin typeface="Cambria Math" panose="02040503050406030204" pitchFamily="18" charset="0"/>
+                                  <a:ea typeface="Cambria Math" panose="02040503050406030204" pitchFamily="18" charset="0"/>
+                                </a:rPr>
+                                <m:t>𝛽</m:t>
+                              </m:r>
+                            </m:e>
+                            <m:sub>
+                              <m:r>
+                                <a:rPr lang="en-US" b="0" i="1" smtClean="0">
+                                  <a:latin typeface="Cambria Math" panose="02040503050406030204" pitchFamily="18" charset="0"/>
+                                  <a:ea typeface="Cambria Math" panose="02040503050406030204" pitchFamily="18" charset="0"/>
+                                </a:rPr>
+                                <m:t>1</m:t>
+                              </m:r>
+                            </m:sub>
+                          </m:sSub>
+                        </m:sup>
+                      </m:sSup>
+                    </m:oMath>
+                  </m:oMathPara>
+                </a14:m>
+                <a:endParaRPr lang="en-US" dirty="0"/>
+              </a:p>
+              <a:p>
+                <a:pPr marL="0" indent="0">
+                  <a:buNone/>
+                </a:pPr>
+                <a:endParaRPr lang="en-US" dirty="0"/>
+              </a:p>
+            </p:txBody>
+          </p:sp>
+        </mc:Choice>
+        <mc:Fallback>
+          <p:sp>
+            <p:nvSpPr>
+              <p:cNvPr id="12" name="Content Placeholder 11"/>
+              <p:cNvSpPr>
+                <a:spLocks noGrp="1" noRot="1" noChangeAspect="1" noMove="1" noResize="1" noEditPoints="1" noAdjustHandles="1" noChangeArrowheads="1" noChangeShapeType="1" noTextEdit="1"/>
+              </p:cNvSpPr>
+              <p:nvPr>
+                <p:ph sz="quarter" idx="4"/>
+              </p:nvPr>
+            </p:nvSpPr>
+            <p:spPr>
+              <a:blipFill>
+                <a:blip r:embed="rId3"/>
+                <a:stretch>
+                  <a:fillRect/>
+                </a:stretch>
+              </a:blipFill>
+            </p:spPr>
+            <p:txBody>
+              <a:bodyPr/>
+              <a:lstStyle/>
+              <a:p>
+                <a:r>
+                  <a:rPr lang="en-US">
+                    <a:noFill/>
+                  </a:rPr>
+                  <a:t> </a:t>
+                </a:r>
+              </a:p>
+            </p:txBody>
+          </p:sp>
+        </mc:Fallback>
+      </mc:AlternateContent>
+      <p:sp>
+        <p:nvSpPr>
+          <p:cNvPr id="8" name="Rectangle 7"/>
           <p:cNvSpPr/>
           <p:nvPr/>
         </p:nvSpPr>
         <p:spPr>
           <a:xfrm>
-            <a:off x="10623503" y="6176963"/>
-            <a:ext cx="1460593" cy="369332"/>
+            <a:off x="4604951" y="266611"/>
+            <a:ext cx="7331676" cy="1200329"/>
           </a:xfrm>
           <a:prstGeom prst="rect">
             <a:avLst/>
           </a:prstGeom>
           <a:solidFill>
-            <a:schemeClr val="accent4">
-              <a:lumMod val="75000"/>
-            </a:schemeClr>
+            <a:srgbClr val="0070C0"/>
           </a:solidFill>
+          <a:ln>
+            <a:noFill/>
+          </a:ln>
         </p:spPr>
         <p:txBody>
-          <a:bodyPr wrap="none">
+          <a:bodyPr wrap="square">
             <a:spAutoFit/>
           </a:bodyPr>
           <a:lstStyle/>
@@ -7300,15 +9089,7 @@
                   <a:schemeClr val="bg1"/>
                 </a:solidFill>
               </a:rPr>
-              <a:t>(Wood 2006</a:t>
-            </a:r>
-            <a:r>
-              <a:rPr lang="en-US" dirty="0" smtClean="0">
-                <a:solidFill>
-                  <a:schemeClr val="bg1"/>
-                </a:solidFill>
-              </a:rPr>
-              <a:t>) </a:t>
+              <a:t>The simple linear model, introduced above, can be generalized by allowing the response variable to depend on multiple predictor variables (plus an additive constant). These extra predictor variables can themselves be transformations of the original predictors. (Wood 2006)</a:t>
             </a:r>
             <a:endParaRPr lang="en-US" dirty="0">
               <a:solidFill>
@@ -7321,7 +9102,7 @@
     </p:spTree>
     <p:extLst>
       <p:ext uri="{BB962C8B-B14F-4D97-AF65-F5344CB8AC3E}">
-        <p14:creationId xmlns:p14="http://schemas.microsoft.com/office/powerpoint/2010/main" val="2079366915"/>
+        <p14:creationId xmlns:p14="http://schemas.microsoft.com/office/powerpoint/2010/main" val="1404036782"/>
       </p:ext>
     </p:extLst>
   </p:cSld>

</xml_diff>

<commit_message>
Adding Figures folder. Finished text for LMM. Moved all mixed model stuff to the end. Began intro slide for GLM.
</commit_message>
<xml_diff>
--- a/Notes/RegressionModelOverview.pptx
+++ b/Notes/RegressionModelOverview.pptx
@@ -5,7 +5,7 @@
     <p:sldMasterId id="2147483648" r:id="rId1"/>
   </p:sldMasterIdLst>
   <p:notesMasterIdLst>
-    <p:notesMasterId r:id="rId13"/>
+    <p:notesMasterId r:id="rId18"/>
   </p:notesMasterIdLst>
   <p:sldIdLst>
     <p:sldId id="256" r:id="rId2"/>
@@ -18,7 +18,12 @@
     <p:sldId id="263" r:id="rId9"/>
     <p:sldId id="264" r:id="rId10"/>
     <p:sldId id="265" r:id="rId11"/>
-    <p:sldId id="266" r:id="rId12"/>
+    <p:sldId id="271" r:id="rId12"/>
+    <p:sldId id="266" r:id="rId13"/>
+    <p:sldId id="267" r:id="rId14"/>
+    <p:sldId id="270" r:id="rId15"/>
+    <p:sldId id="268" r:id="rId16"/>
+    <p:sldId id="269" r:id="rId17"/>
   </p:sldIdLst>
   <p:sldSz cx="12192000" cy="6858000"/>
   <p:notesSz cx="6858000" cy="9144000"/>
@@ -3755,15 +3760,459 @@
           <a:p>
             <a:r>
               <a:rPr lang="en-US" dirty="0" smtClean="0"/>
-              <a:t>Linear Mixed Model (LMM)</a:t>
+              <a:t>Generalized Linear Model (GLM)</a:t>
             </a:r>
             <a:endParaRPr lang="en-US" dirty="0"/>
           </a:p>
         </p:txBody>
       </p:sp>
+    </p:spTree>
+    <p:extLst>
+      <p:ext uri="{BB962C8B-B14F-4D97-AF65-F5344CB8AC3E}">
+        <p14:creationId xmlns:p14="http://schemas.microsoft.com/office/powerpoint/2010/main" val="3573669838"/>
+      </p:ext>
+    </p:extLst>
+  </p:cSld>
+  <p:clrMapOvr>
+    <a:masterClrMapping/>
+  </p:clrMapOvr>
+</p:sld>
+</file>
+
+<file path=ppt/slides/slide12.xml><?xml version="1.0" encoding="utf-8"?>
+<p:sld xmlns:a="http://schemas.openxmlformats.org/drawingml/2006/main" xmlns:r="http://schemas.openxmlformats.org/officeDocument/2006/relationships" xmlns:p="http://schemas.openxmlformats.org/presentationml/2006/main">
+  <p:cSld>
+    <p:spTree>
+      <p:nvGrpSpPr>
+        <p:cNvPr id="1" name=""/>
+        <p:cNvGrpSpPr/>
+        <p:nvPr/>
+      </p:nvGrpSpPr>
+      <p:grpSpPr>
+        <a:xfrm>
+          <a:off x="0" y="0"/>
+          <a:ext cx="0" cy="0"/>
+          <a:chOff x="0" y="0"/>
+          <a:chExt cx="0" cy="0"/>
+        </a:xfrm>
+      </p:grpSpPr>
+      <p:sp>
+        <p:nvSpPr>
+          <p:cNvPr id="2" name="Title 1"/>
+          <p:cNvSpPr>
+            <a:spLocks noGrp="1"/>
+          </p:cNvSpPr>
+          <p:nvPr>
+            <p:ph type="title"/>
+          </p:nvPr>
+        </p:nvSpPr>
+        <p:spPr/>
+        <p:txBody>
+          <a:bodyPr/>
+          <a:lstStyle/>
+          <a:p>
+            <a:r>
+              <a:rPr lang="en-US" dirty="0" smtClean="0"/>
+              <a:t>Intro to the Linear </a:t>
+            </a:r>
+            <a:r>
+              <a:rPr lang="en-US" dirty="0" smtClean="0"/>
+              <a:t>Mixed Model (</a:t>
+            </a:r>
+            <a:r>
+              <a:rPr lang="en-US" dirty="0" smtClean="0"/>
+              <a:t>LMM) </a:t>
+            </a:r>
+            <a:endParaRPr lang="en-US" dirty="0"/>
+          </a:p>
+        </p:txBody>
+      </p:sp>
+      <p:pic>
+        <p:nvPicPr>
+          <p:cNvPr id="4" name="Content Placeholder 3"/>
+          <p:cNvPicPr>
+            <a:picLocks noGrp="1" noChangeAspect="1"/>
+          </p:cNvPicPr>
+          <p:nvPr>
+            <p:ph idx="1"/>
+          </p:nvPr>
+        </p:nvPicPr>
+        <p:blipFill rotWithShape="1">
+          <a:blip r:embed="rId2" cstate="print">
+            <a:extLst>
+              <a:ext uri="{28A0092B-C50C-407E-A947-70E740481C1C}">
+                <a14:useLocalDpi xmlns:a14="http://schemas.microsoft.com/office/drawing/2010/main" val="0"/>
+              </a:ext>
+            </a:extLst>
+          </a:blip>
+          <a:srcRect l="3350" r="11195"/>
+          <a:stretch/>
+        </p:blipFill>
+        <p:spPr>
+          <a:xfrm>
+            <a:off x="3863546" y="3919023"/>
+            <a:ext cx="4464909" cy="2938977"/>
+          </a:xfrm>
+        </p:spPr>
+      </p:pic>
+      <p:sp>
+        <p:nvSpPr>
+          <p:cNvPr id="5" name="TextBox 4"/>
+          <p:cNvSpPr txBox="1"/>
+          <p:nvPr/>
+        </p:nvSpPr>
+        <p:spPr>
+          <a:xfrm>
+            <a:off x="930876" y="1771135"/>
+            <a:ext cx="10338486" cy="369332"/>
+          </a:xfrm>
+          <a:prstGeom prst="rect">
+            <a:avLst/>
+          </a:prstGeom>
+          <a:noFill/>
+        </p:spPr>
+        <p:txBody>
+          <a:bodyPr wrap="square" rtlCol="0">
+            <a:spAutoFit/>
+          </a:bodyPr>
+          <a:lstStyle/>
+          <a:p>
+            <a:r>
+              <a:rPr lang="en-US" dirty="0" smtClean="0"/>
+              <a:t>A linear mixed model accommodates multiple random processes by adding random effects</a:t>
+            </a:r>
+            <a:endParaRPr lang="en-US" dirty="0"/>
+          </a:p>
+        </p:txBody>
+      </p:sp>
+      <p:sp>
+        <p:nvSpPr>
+          <p:cNvPr id="6" name="TextBox 5"/>
+          <p:cNvSpPr txBox="1"/>
+          <p:nvPr/>
+        </p:nvSpPr>
+        <p:spPr>
+          <a:xfrm>
+            <a:off x="926757" y="2441695"/>
+            <a:ext cx="10338486" cy="1477328"/>
+          </a:xfrm>
+          <a:prstGeom prst="rect">
+            <a:avLst/>
+          </a:prstGeom>
+          <a:noFill/>
+        </p:spPr>
+        <p:txBody>
+          <a:bodyPr wrap="square" rtlCol="0">
+            <a:spAutoFit/>
+          </a:bodyPr>
+          <a:lstStyle/>
+          <a:p>
+            <a:r>
+              <a:rPr lang="en-US" dirty="0" smtClean="0"/>
+              <a:t>Why would you want to incorporate multiple random effects?</a:t>
+            </a:r>
+          </a:p>
+          <a:p>
+            <a:pPr marL="741363" indent="-285750">
+              <a:buFont typeface="Arial" panose="020B0604020202020204" pitchFamily="34" charset="0"/>
+              <a:buChar char="•"/>
+            </a:pPr>
+            <a:r>
+              <a:rPr lang="en-US" dirty="0"/>
+              <a:t>A</a:t>
+            </a:r>
+            <a:r>
+              <a:rPr lang="en-US" dirty="0" smtClean="0"/>
+              <a:t>ccount for variation across a population and make inference to that larger population</a:t>
+            </a:r>
+          </a:p>
+          <a:p>
+            <a:pPr marL="741363" indent="-285750">
+              <a:buFont typeface="Arial" panose="020B0604020202020204" pitchFamily="34" charset="0"/>
+              <a:buChar char="•"/>
+            </a:pPr>
+            <a:r>
+              <a:rPr lang="en-US" dirty="0" smtClean="0"/>
+              <a:t>Use the population mean to strengthen estimates for groups in the population with poor or limited data </a:t>
+            </a:r>
+          </a:p>
+          <a:p>
+            <a:pPr marL="741363" indent="-285750">
+              <a:buFont typeface="Arial" panose="020B0604020202020204" pitchFamily="34" charset="0"/>
+              <a:buChar char="•"/>
+            </a:pPr>
+            <a:r>
+              <a:rPr lang="en-US" dirty="0" smtClean="0"/>
+              <a:t>Account for within-sample correlation when observations are grouped (repeated measures)</a:t>
+            </a:r>
+            <a:endParaRPr lang="en-US" dirty="0"/>
+          </a:p>
+        </p:txBody>
+      </p:sp>
+    </p:spTree>
+    <p:extLst>
+      <p:ext uri="{BB962C8B-B14F-4D97-AF65-F5344CB8AC3E}">
+        <p14:creationId xmlns:p14="http://schemas.microsoft.com/office/powerpoint/2010/main" val="3049580291"/>
+      </p:ext>
+    </p:extLst>
+  </p:cSld>
+  <p:clrMapOvr>
+    <a:masterClrMapping/>
+  </p:clrMapOvr>
+</p:sld>
+</file>
+
+<file path=ppt/slides/slide13.xml><?xml version="1.0" encoding="utf-8"?>
+<p:sld xmlns:a="http://schemas.openxmlformats.org/drawingml/2006/main" xmlns:r="http://schemas.openxmlformats.org/officeDocument/2006/relationships" xmlns:p="http://schemas.openxmlformats.org/presentationml/2006/main">
+  <p:cSld>
+    <p:spTree>
+      <p:nvGrpSpPr>
+        <p:cNvPr id="1" name=""/>
+        <p:cNvGrpSpPr/>
+        <p:nvPr/>
+      </p:nvGrpSpPr>
+      <p:grpSpPr>
+        <a:xfrm>
+          <a:off x="0" y="0"/>
+          <a:ext cx="0" cy="0"/>
+          <a:chOff x="0" y="0"/>
+          <a:chExt cx="0" cy="0"/>
+        </a:xfrm>
+      </p:grpSpPr>
+      <p:sp>
+        <p:nvSpPr>
+          <p:cNvPr id="2" name="Title 1"/>
+          <p:cNvSpPr>
+            <a:spLocks noGrp="1"/>
+          </p:cNvSpPr>
+          <p:nvPr>
+            <p:ph type="title"/>
+          </p:nvPr>
+        </p:nvSpPr>
+        <p:spPr/>
+        <p:txBody>
+          <a:bodyPr/>
+          <a:lstStyle/>
+          <a:p>
+            <a:r>
+              <a:rPr lang="en-US" dirty="0" smtClean="0"/>
+              <a:t>Fixed vs. Random Effects</a:t>
+            </a:r>
+            <a:endParaRPr lang="en-US" dirty="0"/>
+          </a:p>
+        </p:txBody>
+      </p:sp>
       <p:sp>
         <p:nvSpPr>
           <p:cNvPr id="3" name="Content Placeholder 2"/>
+          <p:cNvSpPr>
+            <a:spLocks noGrp="1"/>
+          </p:cNvSpPr>
+          <p:nvPr>
+            <p:ph type="body" idx="1"/>
+          </p:nvPr>
+        </p:nvSpPr>
+        <p:spPr/>
+        <p:txBody>
+          <a:bodyPr/>
+          <a:lstStyle/>
+          <a:p>
+            <a:r>
+              <a:rPr lang="en-US" dirty="0" smtClean="0"/>
+              <a:t>Fixed Effects</a:t>
+            </a:r>
+          </a:p>
+        </p:txBody>
+      </p:sp>
+      <p:sp>
+        <p:nvSpPr>
+          <p:cNvPr id="4" name="Content Placeholder 3"/>
+          <p:cNvSpPr>
+            <a:spLocks noGrp="1"/>
+          </p:cNvSpPr>
+          <p:nvPr>
+            <p:ph sz="half" idx="2"/>
+          </p:nvPr>
+        </p:nvSpPr>
+        <p:spPr/>
+        <p:txBody>
+          <a:bodyPr/>
+          <a:lstStyle/>
+          <a:p>
+            <a:r>
+              <a:rPr lang="en-US" dirty="0" smtClean="0"/>
+              <a:t>Interest in specific levels of </a:t>
+            </a:r>
+            <a:r>
+              <a:rPr lang="en-US" i="1" dirty="0" smtClean="0"/>
+              <a:t>these</a:t>
+            </a:r>
+            <a:r>
+              <a:rPr lang="en-US" dirty="0" smtClean="0"/>
+              <a:t> factors</a:t>
+            </a:r>
+          </a:p>
+          <a:p>
+            <a:r>
+              <a:rPr lang="en-US" dirty="0" smtClean="0"/>
+              <a:t>Not interpreted as coming from a larger population</a:t>
+            </a:r>
+            <a:endParaRPr lang="en-US" dirty="0"/>
+          </a:p>
+        </p:txBody>
+      </p:sp>
+      <p:sp>
+        <p:nvSpPr>
+          <p:cNvPr id="5" name="Text Placeholder 4"/>
+          <p:cNvSpPr>
+            <a:spLocks noGrp="1"/>
+          </p:cNvSpPr>
+          <p:nvPr>
+            <p:ph type="body" sz="quarter" idx="3"/>
+          </p:nvPr>
+        </p:nvSpPr>
+        <p:spPr/>
+        <p:txBody>
+          <a:bodyPr/>
+          <a:lstStyle/>
+          <a:p>
+            <a:r>
+              <a:rPr lang="en-US" dirty="0" smtClean="0"/>
+              <a:t>Random Effects</a:t>
+            </a:r>
+            <a:endParaRPr lang="en-US" dirty="0"/>
+          </a:p>
+        </p:txBody>
+      </p:sp>
+      <p:sp>
+        <p:nvSpPr>
+          <p:cNvPr id="6" name="Content Placeholder 5"/>
+          <p:cNvSpPr>
+            <a:spLocks noGrp="1"/>
+          </p:cNvSpPr>
+          <p:nvPr>
+            <p:ph sz="quarter" idx="4"/>
+          </p:nvPr>
+        </p:nvSpPr>
+        <p:spPr/>
+        <p:txBody>
+          <a:bodyPr>
+            <a:normAutofit fontScale="92500" lnSpcReduction="20000"/>
+          </a:bodyPr>
+          <a:lstStyle/>
+          <a:p>
+            <a:r>
+              <a:rPr lang="en-US" dirty="0" smtClean="0"/>
+              <a:t>Factor levels sampled from a distribution</a:t>
+            </a:r>
+          </a:p>
+          <a:p>
+            <a:r>
+              <a:rPr lang="en-US" dirty="0" smtClean="0"/>
+              <a:t>Recognition of correlation structure in data because data are:</a:t>
+            </a:r>
+          </a:p>
+          <a:p>
+            <a:pPr lvl="1"/>
+            <a:r>
+              <a:rPr lang="en-US" dirty="0" smtClean="0"/>
+              <a:t>Nested</a:t>
+            </a:r>
+          </a:p>
+          <a:p>
+            <a:pPr lvl="2"/>
+            <a:r>
+              <a:rPr lang="en-US" dirty="0" smtClean="0"/>
+              <a:t>Fish within schools, multiple schools measured</a:t>
+            </a:r>
+          </a:p>
+          <a:p>
+            <a:pPr lvl="1"/>
+            <a:r>
+              <a:rPr lang="en-US" dirty="0" smtClean="0"/>
+              <a:t>Longitudinal</a:t>
+            </a:r>
+          </a:p>
+          <a:p>
+            <a:pPr lvl="2"/>
+            <a:r>
+              <a:rPr lang="en-US" dirty="0" smtClean="0"/>
+              <a:t>Repeated observations on individual objects through time</a:t>
+            </a:r>
+          </a:p>
+          <a:p>
+            <a:pPr lvl="1"/>
+            <a:r>
+              <a:rPr lang="en-US" dirty="0" smtClean="0"/>
+              <a:t>Spatial</a:t>
+            </a:r>
+          </a:p>
+          <a:p>
+            <a:pPr lvl="2"/>
+            <a:r>
+              <a:rPr lang="en-US" dirty="0" smtClean="0"/>
+              <a:t>Locations closer in space are more similar than distant locations</a:t>
+            </a:r>
+            <a:endParaRPr lang="en-US" dirty="0"/>
+          </a:p>
+        </p:txBody>
+      </p:sp>
+    </p:spTree>
+    <p:extLst>
+      <p:ext uri="{BB962C8B-B14F-4D97-AF65-F5344CB8AC3E}">
+        <p14:creationId xmlns:p14="http://schemas.microsoft.com/office/powerpoint/2010/main" val="336623527"/>
+      </p:ext>
+    </p:extLst>
+  </p:cSld>
+  <p:clrMapOvr>
+    <a:masterClrMapping/>
+  </p:clrMapOvr>
+</p:sld>
+</file>
+
+<file path=ppt/slides/slide14.xml><?xml version="1.0" encoding="utf-8"?>
+<p:sld xmlns:a="http://schemas.openxmlformats.org/drawingml/2006/main" xmlns:r="http://schemas.openxmlformats.org/officeDocument/2006/relationships" xmlns:p="http://schemas.openxmlformats.org/presentationml/2006/main">
+  <p:cSld>
+    <p:spTree>
+      <p:nvGrpSpPr>
+        <p:cNvPr id="1" name=""/>
+        <p:cNvGrpSpPr/>
+        <p:nvPr/>
+      </p:nvGrpSpPr>
+      <p:grpSpPr>
+        <a:xfrm>
+          <a:off x="0" y="0"/>
+          <a:ext cx="0" cy="0"/>
+          <a:chOff x="0" y="0"/>
+          <a:chExt cx="0" cy="0"/>
+        </a:xfrm>
+      </p:grpSpPr>
+      <p:sp>
+        <p:nvSpPr>
+          <p:cNvPr id="2" name="Title 1"/>
+          <p:cNvSpPr>
+            <a:spLocks noGrp="1"/>
+          </p:cNvSpPr>
+          <p:nvPr>
+            <p:ph type="title"/>
+          </p:nvPr>
+        </p:nvSpPr>
+        <p:spPr/>
+        <p:txBody>
+          <a:bodyPr/>
+          <a:lstStyle/>
+          <a:p>
+            <a:r>
+              <a:rPr lang="en-US" dirty="0" smtClean="0"/>
+              <a:t>Random Effects Structures</a:t>
+            </a:r>
+            <a:endParaRPr lang="en-US" dirty="0"/>
+          </a:p>
+        </p:txBody>
+      </p:sp>
+      <p:sp>
+        <p:nvSpPr>
+          <p:cNvPr id="7" name="Content Placeholder 6"/>
           <p:cNvSpPr>
             <a:spLocks noGrp="1"/>
           </p:cNvSpPr>
@@ -3771,19 +4220,1580 @@
             <p:ph idx="1"/>
           </p:nvPr>
         </p:nvSpPr>
-        <p:spPr/>
+        <p:spPr>
+          <a:xfrm>
+            <a:off x="3450625" y="1562009"/>
+            <a:ext cx="5290751" cy="3117078"/>
+          </a:xfrm>
+        </p:spPr>
         <p:txBody>
           <a:bodyPr/>
           <a:lstStyle/>
           <a:p>
-            <a:endParaRPr lang="en-US"/>
+            <a:r>
+              <a:rPr lang="en-US" dirty="0" smtClean="0"/>
+              <a:t>Random intercepts</a:t>
+            </a:r>
+          </a:p>
+          <a:p>
+            <a:r>
+              <a:rPr lang="en-US" dirty="0" smtClean="0"/>
+              <a:t>Random slopes</a:t>
+            </a:r>
+          </a:p>
+          <a:p>
+            <a:r>
+              <a:rPr lang="en-US" dirty="0" smtClean="0"/>
+              <a:t>Random intercepts and slopes</a:t>
+            </a:r>
+          </a:p>
+          <a:p>
+            <a:r>
+              <a:rPr lang="en-US" dirty="0" smtClean="0"/>
+              <a:t>Nested effects</a:t>
+            </a:r>
+          </a:p>
+          <a:p>
+            <a:r>
+              <a:rPr lang="en-US" dirty="0" smtClean="0"/>
+              <a:t>Crossed effects</a:t>
+            </a:r>
+            <a:endParaRPr lang="en-US" dirty="0"/>
+          </a:p>
+        </p:txBody>
+      </p:sp>
+      <p:sp>
+        <p:nvSpPr>
+          <p:cNvPr id="8" name="Rectangle 7"/>
+          <p:cNvSpPr/>
+          <p:nvPr/>
+        </p:nvSpPr>
+        <p:spPr>
+          <a:xfrm>
+            <a:off x="1672796" y="4385268"/>
+            <a:ext cx="8846408" cy="2031325"/>
+          </a:xfrm>
+          <a:prstGeom prst="rect">
+            <a:avLst/>
+          </a:prstGeom>
+          <a:solidFill>
+            <a:srgbClr val="0070C0"/>
+          </a:solidFill>
+        </p:spPr>
+        <p:txBody>
+          <a:bodyPr wrap="square">
+            <a:spAutoFit/>
+          </a:bodyPr>
+          <a:lstStyle/>
+          <a:p>
+            <a:r>
+              <a:rPr lang="en-US" dirty="0">
+                <a:solidFill>
+                  <a:schemeClr val="bg1"/>
+                </a:solidFill>
+              </a:rPr>
+              <a:t>Harrison, X. A., Donaldson, L., Correa-Cano, M. E., Evans, J., Fisher, D. N., Goodwin, C. E. D., . . . </a:t>
+            </a:r>
+            <a:r>
+              <a:rPr lang="en-US" dirty="0" err="1">
+                <a:solidFill>
+                  <a:schemeClr val="bg1"/>
+                </a:solidFill>
+              </a:rPr>
+              <a:t>Inger</a:t>
+            </a:r>
+            <a:r>
+              <a:rPr lang="en-US" dirty="0">
+                <a:solidFill>
+                  <a:schemeClr val="bg1"/>
+                </a:solidFill>
+              </a:rPr>
+              <a:t>, R. (2018). A brief introduction to mixed effects modelling and multi-model inference in ecology. </a:t>
+            </a:r>
+            <a:r>
+              <a:rPr lang="en-US" dirty="0" err="1">
+                <a:solidFill>
+                  <a:schemeClr val="bg1"/>
+                </a:solidFill>
+              </a:rPr>
+              <a:t>PeerJ</a:t>
+            </a:r>
+            <a:r>
+              <a:rPr lang="en-US" dirty="0">
+                <a:solidFill>
+                  <a:schemeClr val="bg1"/>
+                </a:solidFill>
+              </a:rPr>
+              <a:t>, 6, e4794. doi:10.7717/peerj.4794</a:t>
+            </a:r>
+          </a:p>
+          <a:p>
+            <a:endParaRPr lang="en-US" dirty="0">
+              <a:solidFill>
+                <a:schemeClr val="bg1"/>
+              </a:solidFill>
+            </a:endParaRPr>
+          </a:p>
+          <a:p>
+            <a:r>
+              <a:rPr lang="en-US" dirty="0" err="1">
+                <a:solidFill>
+                  <a:schemeClr val="bg1"/>
+                </a:solidFill>
+              </a:rPr>
+              <a:t>Schielzeth</a:t>
+            </a:r>
+            <a:r>
+              <a:rPr lang="en-US" dirty="0">
+                <a:solidFill>
+                  <a:schemeClr val="bg1"/>
+                </a:solidFill>
+              </a:rPr>
+              <a:t>, H., &amp; Nakagawa, S. (2013). Nested by design: model fitting and interpretation in a mixed model era. Methods in Ecology and Evolution, 4(1), 14-24. doi:10.1111/j.2041-210x.2012.00251.x</a:t>
+            </a:r>
           </a:p>
         </p:txBody>
       </p:sp>
     </p:spTree>
     <p:extLst>
       <p:ext uri="{BB962C8B-B14F-4D97-AF65-F5344CB8AC3E}">
-        <p14:creationId xmlns:p14="http://schemas.microsoft.com/office/powerpoint/2010/main" val="3049580291"/>
+        <p14:creationId xmlns:p14="http://schemas.microsoft.com/office/powerpoint/2010/main" val="676521109"/>
+      </p:ext>
+    </p:extLst>
+  </p:cSld>
+  <p:clrMapOvr>
+    <a:masterClrMapping/>
+  </p:clrMapOvr>
+</p:sld>
+</file>
+
+<file path=ppt/slides/slide15.xml><?xml version="1.0" encoding="utf-8"?>
+<p:sld xmlns:a="http://schemas.openxmlformats.org/drawingml/2006/main" xmlns:r="http://schemas.openxmlformats.org/officeDocument/2006/relationships" xmlns:p="http://schemas.openxmlformats.org/presentationml/2006/main">
+  <p:cSld>
+    <p:spTree>
+      <p:nvGrpSpPr>
+        <p:cNvPr id="1" name=""/>
+        <p:cNvGrpSpPr/>
+        <p:nvPr/>
+      </p:nvGrpSpPr>
+      <p:grpSpPr>
+        <a:xfrm>
+          <a:off x="0" y="0"/>
+          <a:ext cx="0" cy="0"/>
+          <a:chOff x="0" y="0"/>
+          <a:chExt cx="0" cy="0"/>
+        </a:xfrm>
+      </p:grpSpPr>
+      <p:sp>
+        <p:nvSpPr>
+          <p:cNvPr id="8" name="Title 7"/>
+          <p:cNvSpPr>
+            <a:spLocks noGrp="1"/>
+          </p:cNvSpPr>
+          <p:nvPr>
+            <p:ph type="title"/>
+          </p:nvPr>
+        </p:nvSpPr>
+        <p:spPr/>
+        <p:txBody>
+          <a:bodyPr anchor="t"/>
+          <a:lstStyle/>
+          <a:p>
+            <a:r>
+              <a:rPr lang="en-US" dirty="0" smtClean="0"/>
+              <a:t>LMM Mathematical Notation</a:t>
+            </a:r>
+            <a:endParaRPr lang="en-US" dirty="0"/>
+          </a:p>
+        </p:txBody>
+      </p:sp>
+      <mc:AlternateContent xmlns:mc="http://schemas.openxmlformats.org/markup-compatibility/2006">
+        <mc:Choice xmlns:a14="http://schemas.microsoft.com/office/drawing/2010/main" Requires="a14">
+          <p:sp>
+            <p:nvSpPr>
+              <p:cNvPr id="9" name="Content Placeholder 8"/>
+              <p:cNvSpPr>
+                <a:spLocks noGrp="1"/>
+              </p:cNvSpPr>
+              <p:nvPr>
+                <p:ph idx="1"/>
+              </p:nvPr>
+            </p:nvSpPr>
+            <p:spPr>
+              <a:xfrm>
+                <a:off x="838200" y="1301578"/>
+                <a:ext cx="10515600" cy="5379308"/>
+              </a:xfrm>
+            </p:spPr>
+            <p:txBody>
+              <a:bodyPr>
+                <a:normAutofit/>
+              </a:bodyPr>
+              <a:lstStyle/>
+              <a:p>
+                <a:pPr marL="0" indent="0">
+                  <a:buNone/>
+                </a:pPr>
+                <a:r>
+                  <a:rPr lang="en-US" dirty="0" smtClean="0"/>
+                  <a:t>The LM had one source of random variation:</a:t>
+                </a:r>
+              </a:p>
+              <a:p>
+                <a:pPr marL="0" indent="0">
+                  <a:buNone/>
+                </a:pPr>
+                <a14:m>
+                  <m:oMathPara xmlns:m="http://schemas.openxmlformats.org/officeDocument/2006/math">
+                    <m:oMathParaPr>
+                      <m:jc m:val="centerGroup"/>
+                    </m:oMathParaPr>
+                    <m:oMath xmlns:m="http://schemas.openxmlformats.org/officeDocument/2006/math">
+                      <m:sSub>
+                        <m:sSubPr>
+                          <m:ctrlPr>
+                            <a:rPr lang="en-US" i="1" smtClean="0">
+                              <a:latin typeface="Cambria Math" panose="02040503050406030204" pitchFamily="18" charset="0"/>
+                            </a:rPr>
+                          </m:ctrlPr>
+                        </m:sSubPr>
+                        <m:e>
+                          <m:r>
+                            <a:rPr lang="en-US" b="0" i="1" smtClean="0">
+                              <a:latin typeface="Cambria Math" panose="02040503050406030204" pitchFamily="18" charset="0"/>
+                            </a:rPr>
+                            <m:t>𝑦</m:t>
+                          </m:r>
+                        </m:e>
+                        <m:sub>
+                          <m:r>
+                            <a:rPr lang="en-US" b="0" i="1" smtClean="0">
+                              <a:latin typeface="Cambria Math" panose="02040503050406030204" pitchFamily="18" charset="0"/>
+                            </a:rPr>
+                            <m:t>𝑖</m:t>
+                          </m:r>
+                        </m:sub>
+                      </m:sSub>
+                      <m:r>
+                        <a:rPr lang="en-US" b="0" i="1" smtClean="0">
+                          <a:latin typeface="Cambria Math" panose="02040503050406030204" pitchFamily="18" charset="0"/>
+                        </a:rPr>
+                        <m:t>=</m:t>
+                      </m:r>
+                      <m:r>
+                        <a:rPr lang="en-US" b="0" i="1" smtClean="0">
+                          <a:latin typeface="Cambria Math" panose="02040503050406030204" pitchFamily="18" charset="0"/>
+                        </a:rPr>
+                        <m:t>𝑋</m:t>
+                      </m:r>
+                      <m:r>
+                        <a:rPr lang="en-US" b="0" i="1" smtClean="0">
+                          <a:latin typeface="Cambria Math" panose="02040503050406030204" pitchFamily="18" charset="0"/>
+                          <a:ea typeface="Cambria Math" panose="02040503050406030204" pitchFamily="18" charset="0"/>
+                        </a:rPr>
+                        <m:t>𝛽</m:t>
+                      </m:r>
+                      <m:r>
+                        <a:rPr lang="en-US" b="0" i="1" smtClean="0">
+                          <a:latin typeface="Cambria Math" panose="02040503050406030204" pitchFamily="18" charset="0"/>
+                          <a:ea typeface="Cambria Math" panose="02040503050406030204" pitchFamily="18" charset="0"/>
+                        </a:rPr>
+                        <m:t>+</m:t>
+                      </m:r>
+                      <m:sSub>
+                        <m:sSubPr>
+                          <m:ctrlPr>
+                            <a:rPr lang="en-US" b="0" i="1" smtClean="0">
+                              <a:latin typeface="Cambria Math" panose="02040503050406030204" pitchFamily="18" charset="0"/>
+                              <a:ea typeface="Cambria Math" panose="02040503050406030204" pitchFamily="18" charset="0"/>
+                            </a:rPr>
+                          </m:ctrlPr>
+                        </m:sSubPr>
+                        <m:e>
+                          <m:r>
+                            <a:rPr lang="en-US" b="0" i="1" smtClean="0">
+                              <a:latin typeface="Cambria Math" panose="02040503050406030204" pitchFamily="18" charset="0"/>
+                              <a:ea typeface="Cambria Math" panose="02040503050406030204" pitchFamily="18" charset="0"/>
+                            </a:rPr>
+                            <m:t>𝜀</m:t>
+                          </m:r>
+                        </m:e>
+                        <m:sub>
+                          <m:r>
+                            <a:rPr lang="en-US" b="0" i="1" smtClean="0">
+                              <a:latin typeface="Cambria Math" panose="02040503050406030204" pitchFamily="18" charset="0"/>
+                              <a:ea typeface="Cambria Math" panose="02040503050406030204" pitchFamily="18" charset="0"/>
+                            </a:rPr>
+                            <m:t>𝑖</m:t>
+                          </m:r>
+                        </m:sub>
+                      </m:sSub>
+                    </m:oMath>
+                  </m:oMathPara>
+                </a14:m>
+                <a:endParaRPr lang="en-US" dirty="0" smtClean="0"/>
+              </a:p>
+              <a:p>
+                <a:pPr marL="0" indent="0" algn="ctr">
+                  <a:buNone/>
+                </a:pPr>
+                <a14:m>
+                  <m:oMath xmlns:m="http://schemas.openxmlformats.org/officeDocument/2006/math">
+                    <m:sSub>
+                      <m:sSubPr>
+                        <m:ctrlPr>
+                          <a:rPr lang="en-US" i="1" smtClean="0">
+                            <a:latin typeface="Cambria Math" panose="02040503050406030204" pitchFamily="18" charset="0"/>
+                          </a:rPr>
+                        </m:ctrlPr>
+                      </m:sSubPr>
+                      <m:e>
+                        <m:r>
+                          <a:rPr lang="en-US" i="1" smtClean="0">
+                            <a:latin typeface="Cambria Math" panose="02040503050406030204" pitchFamily="18" charset="0"/>
+                            <a:ea typeface="Cambria Math" panose="02040503050406030204" pitchFamily="18" charset="0"/>
+                          </a:rPr>
+                          <m:t>𝜀</m:t>
+                        </m:r>
+                      </m:e>
+                      <m:sub>
+                        <m:r>
+                          <a:rPr lang="en-US" b="0" i="1" smtClean="0">
+                            <a:latin typeface="Cambria Math" panose="02040503050406030204" pitchFamily="18" charset="0"/>
+                          </a:rPr>
+                          <m:t>𝑖</m:t>
+                        </m:r>
+                      </m:sub>
+                    </m:sSub>
+                    <m:r>
+                      <a:rPr lang="en-US" b="0" i="1" smtClean="0">
+                        <a:latin typeface="Cambria Math" panose="02040503050406030204" pitchFamily="18" charset="0"/>
+                      </a:rPr>
+                      <m:t>~</m:t>
+                    </m:r>
+                    <m:r>
+                      <a:rPr lang="en-US" b="0" i="1" smtClean="0">
+                        <a:latin typeface="Cambria Math" panose="02040503050406030204" pitchFamily="18" charset="0"/>
+                        <a:ea typeface="Cambria Math" panose="02040503050406030204" pitchFamily="18" charset="0"/>
+                      </a:rPr>
+                      <m:t>𝒩</m:t>
+                    </m:r>
+                    <m:d>
+                      <m:dPr>
+                        <m:ctrlPr>
+                          <a:rPr lang="en-US" b="0" i="1" smtClean="0">
+                            <a:latin typeface="Cambria Math" panose="02040503050406030204" pitchFamily="18" charset="0"/>
+                            <a:ea typeface="Cambria Math" panose="02040503050406030204" pitchFamily="18" charset="0"/>
+                          </a:rPr>
+                        </m:ctrlPr>
+                      </m:dPr>
+                      <m:e>
+                        <m:r>
+                          <a:rPr lang="en-US" b="0" i="1" smtClean="0">
+                            <a:latin typeface="Cambria Math" panose="02040503050406030204" pitchFamily="18" charset="0"/>
+                            <a:ea typeface="Cambria Math" panose="02040503050406030204" pitchFamily="18" charset="0"/>
+                          </a:rPr>
+                          <m:t>0,</m:t>
+                        </m:r>
+                        <m:sSup>
+                          <m:sSupPr>
+                            <m:ctrlPr>
+                              <a:rPr lang="en-US" i="1">
+                                <a:latin typeface="Cambria Math" panose="02040503050406030204" pitchFamily="18" charset="0"/>
+                              </a:rPr>
+                            </m:ctrlPr>
+                          </m:sSupPr>
+                          <m:e>
+                            <m:r>
+                              <a:rPr lang="en-US" i="1">
+                                <a:latin typeface="Cambria Math" panose="02040503050406030204" pitchFamily="18" charset="0"/>
+                                <a:ea typeface="Cambria Math" panose="02040503050406030204" pitchFamily="18" charset="0"/>
+                              </a:rPr>
+                              <m:t>𝜎</m:t>
+                            </m:r>
+                          </m:e>
+                          <m:sup>
+                            <m:r>
+                              <a:rPr lang="en-US" i="1">
+                                <a:latin typeface="Cambria Math" panose="02040503050406030204" pitchFamily="18" charset="0"/>
+                              </a:rPr>
+                              <m:t>2</m:t>
+                            </m:r>
+                          </m:sup>
+                        </m:sSup>
+                      </m:e>
+                    </m:d>
+                  </m:oMath>
+                </a14:m>
+                <a:r>
+                  <a:rPr lang="en-US" dirty="0" smtClean="0"/>
+                  <a:t> .</a:t>
+                </a:r>
+              </a:p>
+              <a:p>
+                <a:pPr marL="0" indent="0">
+                  <a:buNone/>
+                </a:pPr>
+                <a:r>
+                  <a:rPr lang="en-US" dirty="0" smtClean="0"/>
+                  <a:t>We might want to build a model with multiple sources of random variation:</a:t>
+                </a:r>
+              </a:p>
+              <a:p>
+                <a:pPr marL="0" indent="0">
+                  <a:buNone/>
+                </a:pPr>
+                <a14:m>
+                  <m:oMathPara xmlns:m="http://schemas.openxmlformats.org/officeDocument/2006/math">
+                    <m:oMathParaPr>
+                      <m:jc m:val="centerGroup"/>
+                    </m:oMathParaPr>
+                    <m:oMath xmlns:m="http://schemas.openxmlformats.org/officeDocument/2006/math">
+                      <m:sSub>
+                        <m:sSubPr>
+                          <m:ctrlPr>
+                            <a:rPr lang="en-US" i="1">
+                              <a:latin typeface="Cambria Math" panose="02040503050406030204" pitchFamily="18" charset="0"/>
+                            </a:rPr>
+                          </m:ctrlPr>
+                        </m:sSubPr>
+                        <m:e>
+                          <m:r>
+                            <a:rPr lang="en-US" i="1">
+                              <a:latin typeface="Cambria Math" panose="02040503050406030204" pitchFamily="18" charset="0"/>
+                            </a:rPr>
+                            <m:t>𝑦</m:t>
+                          </m:r>
+                        </m:e>
+                        <m:sub>
+                          <m:r>
+                            <a:rPr lang="en-US" i="1">
+                              <a:latin typeface="Cambria Math" panose="02040503050406030204" pitchFamily="18" charset="0"/>
+                            </a:rPr>
+                            <m:t>𝑖</m:t>
+                          </m:r>
+                          <m:r>
+                            <a:rPr lang="en-US" b="0" i="1" smtClean="0">
+                              <a:latin typeface="Cambria Math" panose="02040503050406030204" pitchFamily="18" charset="0"/>
+                            </a:rPr>
+                            <m:t>𝑗</m:t>
+                          </m:r>
+                        </m:sub>
+                      </m:sSub>
+                      <m:r>
+                        <a:rPr lang="en-US" i="1">
+                          <a:latin typeface="Cambria Math" panose="02040503050406030204" pitchFamily="18" charset="0"/>
+                        </a:rPr>
+                        <m:t>=</m:t>
+                      </m:r>
+                      <m:sSub>
+                        <m:sSubPr>
+                          <m:ctrlPr>
+                            <a:rPr lang="en-US" i="1" smtClean="0">
+                              <a:latin typeface="Cambria Math" panose="02040503050406030204" pitchFamily="18" charset="0"/>
+                            </a:rPr>
+                          </m:ctrlPr>
+                        </m:sSubPr>
+                        <m:e>
+                          <m:r>
+                            <a:rPr lang="en-US" i="1" smtClean="0">
+                              <a:latin typeface="Cambria Math" panose="02040503050406030204" pitchFamily="18" charset="0"/>
+                              <a:ea typeface="Cambria Math" panose="02040503050406030204" pitchFamily="18" charset="0"/>
+                            </a:rPr>
+                            <m:t>𝛼</m:t>
+                          </m:r>
+                        </m:e>
+                        <m:sub>
+                          <m:r>
+                            <a:rPr lang="en-US" b="0" i="1" smtClean="0">
+                              <a:latin typeface="Cambria Math" panose="02040503050406030204" pitchFamily="18" charset="0"/>
+                            </a:rPr>
+                            <m:t>𝑗</m:t>
+                          </m:r>
+                        </m:sub>
+                      </m:sSub>
+                      <m:r>
+                        <a:rPr lang="en-US" i="1">
+                          <a:latin typeface="Cambria Math" panose="02040503050406030204" pitchFamily="18" charset="0"/>
+                          <a:ea typeface="Cambria Math" panose="02040503050406030204" pitchFamily="18" charset="0"/>
+                        </a:rPr>
+                        <m:t>+</m:t>
+                      </m:r>
+                      <m:sSub>
+                        <m:sSubPr>
+                          <m:ctrlPr>
+                            <a:rPr lang="en-US" i="1">
+                              <a:latin typeface="Cambria Math" panose="02040503050406030204" pitchFamily="18" charset="0"/>
+                              <a:ea typeface="Cambria Math" panose="02040503050406030204" pitchFamily="18" charset="0"/>
+                            </a:rPr>
+                          </m:ctrlPr>
+                        </m:sSubPr>
+                        <m:e>
+                          <m:r>
+                            <a:rPr lang="en-US" i="1">
+                              <a:latin typeface="Cambria Math" panose="02040503050406030204" pitchFamily="18" charset="0"/>
+                              <a:ea typeface="Cambria Math" panose="02040503050406030204" pitchFamily="18" charset="0"/>
+                            </a:rPr>
+                            <m:t>𝜀</m:t>
+                          </m:r>
+                        </m:e>
+                        <m:sub>
+                          <m:r>
+                            <a:rPr lang="en-US" i="1">
+                              <a:latin typeface="Cambria Math" panose="02040503050406030204" pitchFamily="18" charset="0"/>
+                              <a:ea typeface="Cambria Math" panose="02040503050406030204" pitchFamily="18" charset="0"/>
+                            </a:rPr>
+                            <m:t>𝑖</m:t>
+                          </m:r>
+                        </m:sub>
+                      </m:sSub>
+                    </m:oMath>
+                  </m:oMathPara>
+                </a14:m>
+                <a:endParaRPr lang="en-US" dirty="0" smtClean="0"/>
+              </a:p>
+              <a:p>
+                <a:pPr marL="0" indent="0">
+                  <a:buNone/>
+                </a:pPr>
+                <a14:m>
+                  <m:oMathPara xmlns:m="http://schemas.openxmlformats.org/officeDocument/2006/math">
+                    <m:oMathParaPr>
+                      <m:jc m:val="centerGroup"/>
+                    </m:oMathParaPr>
+                    <m:oMath xmlns:m="http://schemas.openxmlformats.org/officeDocument/2006/math">
+                      <m:sSub>
+                        <m:sSubPr>
+                          <m:ctrlPr>
+                            <a:rPr lang="en-US" i="1">
+                              <a:latin typeface="Cambria Math" panose="02040503050406030204" pitchFamily="18" charset="0"/>
+                            </a:rPr>
+                          </m:ctrlPr>
+                        </m:sSubPr>
+                        <m:e>
+                          <m:r>
+                            <a:rPr lang="en-US" i="1" smtClean="0">
+                              <a:latin typeface="Cambria Math" panose="02040503050406030204" pitchFamily="18" charset="0"/>
+                              <a:ea typeface="Cambria Math" panose="02040503050406030204" pitchFamily="18" charset="0"/>
+                            </a:rPr>
+                            <m:t>𝛼</m:t>
+                          </m:r>
+                        </m:e>
+                        <m:sub>
+                          <m:r>
+                            <a:rPr lang="en-US" b="0" i="1" smtClean="0">
+                              <a:latin typeface="Cambria Math" panose="02040503050406030204" pitchFamily="18" charset="0"/>
+                              <a:ea typeface="Cambria Math" panose="02040503050406030204" pitchFamily="18" charset="0"/>
+                            </a:rPr>
+                            <m:t>𝑗</m:t>
+                          </m:r>
+                        </m:sub>
+                      </m:sSub>
+                      <m:r>
+                        <a:rPr lang="en-US" i="1">
+                          <a:latin typeface="Cambria Math" panose="02040503050406030204" pitchFamily="18" charset="0"/>
+                        </a:rPr>
+                        <m:t>~</m:t>
+                      </m:r>
+                      <m:r>
+                        <a:rPr lang="en-US" i="1">
+                          <a:latin typeface="Cambria Math" panose="02040503050406030204" pitchFamily="18" charset="0"/>
+                          <a:ea typeface="Cambria Math" panose="02040503050406030204" pitchFamily="18" charset="0"/>
+                        </a:rPr>
+                        <m:t>𝒩</m:t>
+                      </m:r>
+                      <m:d>
+                        <m:dPr>
+                          <m:ctrlPr>
+                            <a:rPr lang="en-US" i="1">
+                              <a:latin typeface="Cambria Math" panose="02040503050406030204" pitchFamily="18" charset="0"/>
+                              <a:ea typeface="Cambria Math" panose="02040503050406030204" pitchFamily="18" charset="0"/>
+                            </a:rPr>
+                          </m:ctrlPr>
+                        </m:dPr>
+                        <m:e>
+                          <m:r>
+                            <a:rPr lang="en-US" i="1">
+                              <a:latin typeface="Cambria Math" panose="02040503050406030204" pitchFamily="18" charset="0"/>
+                              <a:ea typeface="Cambria Math" panose="02040503050406030204" pitchFamily="18" charset="0"/>
+                            </a:rPr>
+                            <m:t>0,</m:t>
+                          </m:r>
+                          <m:sSubSup>
+                            <m:sSubSupPr>
+                              <m:ctrlPr>
+                                <a:rPr lang="en-US" i="1" smtClean="0">
+                                  <a:latin typeface="Cambria Math" panose="02040503050406030204" pitchFamily="18" charset="0"/>
+                                  <a:ea typeface="Cambria Math" panose="02040503050406030204" pitchFamily="18" charset="0"/>
+                                </a:rPr>
+                              </m:ctrlPr>
+                            </m:sSubSupPr>
+                            <m:e>
+                              <m:r>
+                                <a:rPr lang="en-US" i="1" smtClean="0">
+                                  <a:latin typeface="Cambria Math" panose="02040503050406030204" pitchFamily="18" charset="0"/>
+                                  <a:ea typeface="Cambria Math" panose="02040503050406030204" pitchFamily="18" charset="0"/>
+                                </a:rPr>
+                                <m:t>𝜎</m:t>
+                              </m:r>
+                            </m:e>
+                            <m:sub>
+                              <m:r>
+                                <a:rPr lang="en-US" i="1" smtClean="0">
+                                  <a:latin typeface="Cambria Math" panose="02040503050406030204" pitchFamily="18" charset="0"/>
+                                  <a:ea typeface="Cambria Math" panose="02040503050406030204" pitchFamily="18" charset="0"/>
+                                </a:rPr>
+                                <m:t>𝛼</m:t>
+                              </m:r>
+                            </m:sub>
+                            <m:sup>
+                              <m:r>
+                                <a:rPr lang="en-US" b="0" i="1" smtClean="0">
+                                  <a:latin typeface="Cambria Math" panose="02040503050406030204" pitchFamily="18" charset="0"/>
+                                  <a:ea typeface="Cambria Math" panose="02040503050406030204" pitchFamily="18" charset="0"/>
+                                </a:rPr>
+                                <m:t>2</m:t>
+                              </m:r>
+                            </m:sup>
+                          </m:sSubSup>
+                        </m:e>
+                      </m:d>
+                    </m:oMath>
+                  </m:oMathPara>
+                </a14:m>
+                <a:endParaRPr lang="en-US" dirty="0" smtClean="0"/>
+              </a:p>
+              <a:p>
+                <a:pPr marL="0" indent="0">
+                  <a:buNone/>
+                </a:pPr>
+                <a14:m>
+                  <m:oMathPara xmlns:m="http://schemas.openxmlformats.org/officeDocument/2006/math">
+                    <m:oMathParaPr>
+                      <m:jc m:val="centerGroup"/>
+                    </m:oMathParaPr>
+                    <m:oMath xmlns:m="http://schemas.openxmlformats.org/officeDocument/2006/math">
+                      <m:sSub>
+                        <m:sSubPr>
+                          <m:ctrlPr>
+                            <a:rPr lang="en-US" i="1">
+                              <a:latin typeface="Cambria Math" panose="02040503050406030204" pitchFamily="18" charset="0"/>
+                            </a:rPr>
+                          </m:ctrlPr>
+                        </m:sSubPr>
+                        <m:e>
+                          <m:r>
+                            <a:rPr lang="en-US" i="1">
+                              <a:latin typeface="Cambria Math" panose="02040503050406030204" pitchFamily="18" charset="0"/>
+                              <a:ea typeface="Cambria Math" panose="02040503050406030204" pitchFamily="18" charset="0"/>
+                            </a:rPr>
+                            <m:t>𝜀</m:t>
+                          </m:r>
+                        </m:e>
+                        <m:sub>
+                          <m:r>
+                            <a:rPr lang="en-US" i="1">
+                              <a:latin typeface="Cambria Math" panose="02040503050406030204" pitchFamily="18" charset="0"/>
+                            </a:rPr>
+                            <m:t>𝑖</m:t>
+                          </m:r>
+                        </m:sub>
+                      </m:sSub>
+                      <m:r>
+                        <a:rPr lang="en-US" i="1">
+                          <a:latin typeface="Cambria Math" panose="02040503050406030204" pitchFamily="18" charset="0"/>
+                        </a:rPr>
+                        <m:t>~</m:t>
+                      </m:r>
+                      <m:r>
+                        <a:rPr lang="en-US" i="1">
+                          <a:latin typeface="Cambria Math" panose="02040503050406030204" pitchFamily="18" charset="0"/>
+                          <a:ea typeface="Cambria Math" panose="02040503050406030204" pitchFamily="18" charset="0"/>
+                        </a:rPr>
+                        <m:t>𝒩</m:t>
+                      </m:r>
+                      <m:d>
+                        <m:dPr>
+                          <m:ctrlPr>
+                            <a:rPr lang="en-US" i="1">
+                              <a:latin typeface="Cambria Math" panose="02040503050406030204" pitchFamily="18" charset="0"/>
+                              <a:ea typeface="Cambria Math" panose="02040503050406030204" pitchFamily="18" charset="0"/>
+                            </a:rPr>
+                          </m:ctrlPr>
+                        </m:dPr>
+                        <m:e>
+                          <m:r>
+                            <a:rPr lang="en-US" i="1">
+                              <a:latin typeface="Cambria Math" panose="02040503050406030204" pitchFamily="18" charset="0"/>
+                              <a:ea typeface="Cambria Math" panose="02040503050406030204" pitchFamily="18" charset="0"/>
+                            </a:rPr>
+                            <m:t>0,</m:t>
+                          </m:r>
+                          <m:sSubSup>
+                            <m:sSubSupPr>
+                              <m:ctrlPr>
+                                <a:rPr lang="en-US" i="1">
+                                  <a:latin typeface="Cambria Math" panose="02040503050406030204" pitchFamily="18" charset="0"/>
+                                  <a:ea typeface="Cambria Math" panose="02040503050406030204" pitchFamily="18" charset="0"/>
+                                </a:rPr>
+                              </m:ctrlPr>
+                            </m:sSubSupPr>
+                            <m:e>
+                              <m:r>
+                                <a:rPr lang="en-US" i="1">
+                                  <a:latin typeface="Cambria Math" panose="02040503050406030204" pitchFamily="18" charset="0"/>
+                                  <a:ea typeface="Cambria Math" panose="02040503050406030204" pitchFamily="18" charset="0"/>
+                                </a:rPr>
+                                <m:t>𝜎</m:t>
+                              </m:r>
+                            </m:e>
+                            <m:sub>
+                              <m:r>
+                                <a:rPr lang="en-US" i="1" smtClean="0">
+                                  <a:latin typeface="Cambria Math" panose="02040503050406030204" pitchFamily="18" charset="0"/>
+                                  <a:ea typeface="Cambria Math" panose="02040503050406030204" pitchFamily="18" charset="0"/>
+                                </a:rPr>
+                                <m:t>𝜀</m:t>
+                              </m:r>
+                            </m:sub>
+                            <m:sup>
+                              <m:r>
+                                <a:rPr lang="en-US" i="1">
+                                  <a:latin typeface="Cambria Math" panose="02040503050406030204" pitchFamily="18" charset="0"/>
+                                  <a:ea typeface="Cambria Math" panose="02040503050406030204" pitchFamily="18" charset="0"/>
+                                </a:rPr>
+                                <m:t>2</m:t>
+                              </m:r>
+                            </m:sup>
+                          </m:sSubSup>
+                        </m:e>
+                      </m:d>
+                    </m:oMath>
+                  </m:oMathPara>
+                </a14:m>
+                <a:endParaRPr lang="en-US" dirty="0" smtClean="0"/>
+              </a:p>
+              <a:p>
+                <a:pPr marL="0" indent="0">
+                  <a:buNone/>
+                </a:pPr>
+                <a:r>
+                  <a:rPr lang="en-US" dirty="0" smtClean="0"/>
+                  <a:t>More generally:</a:t>
+                </a:r>
+              </a:p>
+              <a:p>
+                <a:pPr marL="0" indent="0">
+                  <a:buNone/>
+                </a:pPr>
+                <a14:m>
+                  <m:oMathPara xmlns:m="http://schemas.openxmlformats.org/officeDocument/2006/math">
+                    <m:oMathParaPr>
+                      <m:jc m:val="centerGroup"/>
+                    </m:oMathParaPr>
+                    <m:oMath xmlns:m="http://schemas.openxmlformats.org/officeDocument/2006/math">
+                      <m:sSub>
+                        <m:sSubPr>
+                          <m:ctrlPr>
+                            <a:rPr lang="en-US" i="1">
+                              <a:latin typeface="Cambria Math" panose="02040503050406030204" pitchFamily="18" charset="0"/>
+                            </a:rPr>
+                          </m:ctrlPr>
+                        </m:sSubPr>
+                        <m:e>
+                          <m:r>
+                            <a:rPr lang="en-US" i="1">
+                              <a:latin typeface="Cambria Math" panose="02040503050406030204" pitchFamily="18" charset="0"/>
+                            </a:rPr>
+                            <m:t>𝑦</m:t>
+                          </m:r>
+                        </m:e>
+                        <m:sub>
+                          <m:r>
+                            <a:rPr lang="en-US" i="1">
+                              <a:latin typeface="Cambria Math" panose="02040503050406030204" pitchFamily="18" charset="0"/>
+                            </a:rPr>
+                            <m:t>𝑖</m:t>
+                          </m:r>
+                          <m:r>
+                            <a:rPr lang="en-US" b="0" i="1" smtClean="0">
+                              <a:latin typeface="Cambria Math" panose="02040503050406030204" pitchFamily="18" charset="0"/>
+                            </a:rPr>
+                            <m:t>𝑗</m:t>
+                          </m:r>
+                        </m:sub>
+                      </m:sSub>
+                      <m:r>
+                        <a:rPr lang="en-US" i="1">
+                          <a:latin typeface="Cambria Math" panose="02040503050406030204" pitchFamily="18" charset="0"/>
+                        </a:rPr>
+                        <m:t>=</m:t>
+                      </m:r>
+                      <m:r>
+                        <a:rPr lang="en-US" i="1">
+                          <a:latin typeface="Cambria Math" panose="02040503050406030204" pitchFamily="18" charset="0"/>
+                        </a:rPr>
+                        <m:t>𝑋</m:t>
+                      </m:r>
+                      <m:r>
+                        <a:rPr lang="en-US" i="1">
+                          <a:latin typeface="Cambria Math" panose="02040503050406030204" pitchFamily="18" charset="0"/>
+                          <a:ea typeface="Cambria Math" panose="02040503050406030204" pitchFamily="18" charset="0"/>
+                        </a:rPr>
+                        <m:t>𝛽</m:t>
+                      </m:r>
+                      <m:r>
+                        <a:rPr lang="en-US" i="1">
+                          <a:latin typeface="Cambria Math" panose="02040503050406030204" pitchFamily="18" charset="0"/>
+                          <a:ea typeface="Cambria Math" panose="02040503050406030204" pitchFamily="18" charset="0"/>
+                        </a:rPr>
+                        <m:t>+</m:t>
+                      </m:r>
+                      <m:r>
+                        <a:rPr lang="en-US" b="0" i="1" smtClean="0">
+                          <a:latin typeface="Cambria Math" panose="02040503050406030204" pitchFamily="18" charset="0"/>
+                          <a:ea typeface="Cambria Math" panose="02040503050406030204" pitchFamily="18" charset="0"/>
+                        </a:rPr>
+                        <m:t>𝑍</m:t>
+                      </m:r>
+                      <m:r>
+                        <a:rPr lang="en-US" b="0" i="1" smtClean="0">
+                          <a:latin typeface="Cambria Math" panose="02040503050406030204" pitchFamily="18" charset="0"/>
+                          <a:ea typeface="Cambria Math" panose="02040503050406030204" pitchFamily="18" charset="0"/>
+                        </a:rPr>
+                        <m:t>𝛼</m:t>
+                      </m:r>
+                      <m:r>
+                        <a:rPr lang="en-US" b="0" i="1" smtClean="0">
+                          <a:latin typeface="Cambria Math" panose="02040503050406030204" pitchFamily="18" charset="0"/>
+                          <a:ea typeface="Cambria Math" panose="02040503050406030204" pitchFamily="18" charset="0"/>
+                        </a:rPr>
+                        <m:t>+</m:t>
+                      </m:r>
+                      <m:sSub>
+                        <m:sSubPr>
+                          <m:ctrlPr>
+                            <a:rPr lang="en-US" i="1">
+                              <a:latin typeface="Cambria Math" panose="02040503050406030204" pitchFamily="18" charset="0"/>
+                              <a:ea typeface="Cambria Math" panose="02040503050406030204" pitchFamily="18" charset="0"/>
+                            </a:rPr>
+                          </m:ctrlPr>
+                        </m:sSubPr>
+                        <m:e>
+                          <m:r>
+                            <a:rPr lang="en-US" i="1">
+                              <a:latin typeface="Cambria Math" panose="02040503050406030204" pitchFamily="18" charset="0"/>
+                              <a:ea typeface="Cambria Math" panose="02040503050406030204" pitchFamily="18" charset="0"/>
+                            </a:rPr>
+                            <m:t>𝜀</m:t>
+                          </m:r>
+                        </m:e>
+                        <m:sub>
+                          <m:r>
+                            <a:rPr lang="en-US" i="1">
+                              <a:latin typeface="Cambria Math" panose="02040503050406030204" pitchFamily="18" charset="0"/>
+                              <a:ea typeface="Cambria Math" panose="02040503050406030204" pitchFamily="18" charset="0"/>
+                            </a:rPr>
+                            <m:t>𝑖</m:t>
+                          </m:r>
+                          <m:r>
+                            <a:rPr lang="en-US" b="0" i="1" smtClean="0">
+                              <a:latin typeface="Cambria Math" panose="02040503050406030204" pitchFamily="18" charset="0"/>
+                              <a:ea typeface="Cambria Math" panose="02040503050406030204" pitchFamily="18" charset="0"/>
+                            </a:rPr>
+                            <m:t>𝑗</m:t>
+                          </m:r>
+                        </m:sub>
+                      </m:sSub>
+                    </m:oMath>
+                  </m:oMathPara>
+                </a14:m>
+                <a:endParaRPr lang="en-US" dirty="0" smtClean="0"/>
+              </a:p>
+              <a:p>
+                <a:pPr marL="0" indent="0">
+                  <a:buNone/>
+                </a:pPr>
+                <a14:m>
+                  <m:oMathPara xmlns:m="http://schemas.openxmlformats.org/officeDocument/2006/math">
+                    <m:oMathParaPr>
+                      <m:jc m:val="centerGroup"/>
+                    </m:oMathParaPr>
+                    <m:oMath xmlns:m="http://schemas.openxmlformats.org/officeDocument/2006/math">
+                      <m:sSub>
+                        <m:sSubPr>
+                          <m:ctrlPr>
+                            <a:rPr lang="en-US" i="1">
+                              <a:latin typeface="Cambria Math" panose="02040503050406030204" pitchFamily="18" charset="0"/>
+                            </a:rPr>
+                          </m:ctrlPr>
+                        </m:sSubPr>
+                        <m:e>
+                          <m:r>
+                            <a:rPr lang="en-US" i="1">
+                              <a:latin typeface="Cambria Math" panose="02040503050406030204" pitchFamily="18" charset="0"/>
+                              <a:ea typeface="Cambria Math" panose="02040503050406030204" pitchFamily="18" charset="0"/>
+                            </a:rPr>
+                            <m:t>𝛼</m:t>
+                          </m:r>
+                        </m:e>
+                        <m:sub>
+                          <m:r>
+                            <a:rPr lang="en-US" i="1">
+                              <a:latin typeface="Cambria Math" panose="02040503050406030204" pitchFamily="18" charset="0"/>
+                              <a:ea typeface="Cambria Math" panose="02040503050406030204" pitchFamily="18" charset="0"/>
+                            </a:rPr>
+                            <m:t>𝑗</m:t>
+                          </m:r>
+                        </m:sub>
+                      </m:sSub>
+                      <m:r>
+                        <a:rPr lang="en-US" i="1">
+                          <a:latin typeface="Cambria Math" panose="02040503050406030204" pitchFamily="18" charset="0"/>
+                        </a:rPr>
+                        <m:t>~</m:t>
+                      </m:r>
+                      <m:r>
+                        <a:rPr lang="en-US" i="1">
+                          <a:latin typeface="Cambria Math" panose="02040503050406030204" pitchFamily="18" charset="0"/>
+                          <a:ea typeface="Cambria Math" panose="02040503050406030204" pitchFamily="18" charset="0"/>
+                        </a:rPr>
+                        <m:t>𝒩</m:t>
+                      </m:r>
+                      <m:d>
+                        <m:dPr>
+                          <m:ctrlPr>
+                            <a:rPr lang="en-US" i="1">
+                              <a:latin typeface="Cambria Math" panose="02040503050406030204" pitchFamily="18" charset="0"/>
+                              <a:ea typeface="Cambria Math" panose="02040503050406030204" pitchFamily="18" charset="0"/>
+                            </a:rPr>
+                          </m:ctrlPr>
+                        </m:dPr>
+                        <m:e>
+                          <m:r>
+                            <a:rPr lang="en-US" i="1">
+                              <a:latin typeface="Cambria Math" panose="02040503050406030204" pitchFamily="18" charset="0"/>
+                              <a:ea typeface="Cambria Math" panose="02040503050406030204" pitchFamily="18" charset="0"/>
+                            </a:rPr>
+                            <m:t>0,</m:t>
+                          </m:r>
+                          <m:sSup>
+                            <m:sSupPr>
+                              <m:ctrlPr>
+                                <a:rPr lang="en-US" i="1">
+                                  <a:latin typeface="Cambria Math" panose="02040503050406030204" pitchFamily="18" charset="0"/>
+                                </a:rPr>
+                              </m:ctrlPr>
+                            </m:sSupPr>
+                            <m:e>
+                              <m:r>
+                                <a:rPr lang="en-US" b="0" i="1" smtClean="0">
+                                  <a:latin typeface="Cambria Math" panose="02040503050406030204" pitchFamily="18" charset="0"/>
+                                </a:rPr>
+                                <m:t>𝐷</m:t>
+                              </m:r>
+                              <m:r>
+                                <a:rPr lang="en-US" i="1">
+                                  <a:latin typeface="Cambria Math" panose="02040503050406030204" pitchFamily="18" charset="0"/>
+                                  <a:ea typeface="Cambria Math" panose="02040503050406030204" pitchFamily="18" charset="0"/>
+                                </a:rPr>
+                                <m:t>𝜎</m:t>
+                              </m:r>
+                            </m:e>
+                            <m:sup>
+                              <m:r>
+                                <a:rPr lang="en-US" i="1">
+                                  <a:latin typeface="Cambria Math" panose="02040503050406030204" pitchFamily="18" charset="0"/>
+                                </a:rPr>
+                                <m:t>2</m:t>
+                              </m:r>
+                            </m:sup>
+                          </m:sSup>
+                        </m:e>
+                      </m:d>
+                    </m:oMath>
+                  </m:oMathPara>
+                </a14:m>
+                <a:endParaRPr lang="en-US" dirty="0"/>
+              </a:p>
+              <a:p>
+                <a:pPr marL="0" indent="0">
+                  <a:buNone/>
+                </a:pPr>
+                <a14:m>
+                  <m:oMathPara xmlns:m="http://schemas.openxmlformats.org/officeDocument/2006/math">
+                    <m:oMathParaPr>
+                      <m:jc m:val="centerGroup"/>
+                    </m:oMathParaPr>
+                    <m:oMath xmlns:m="http://schemas.openxmlformats.org/officeDocument/2006/math">
+                      <m:sSub>
+                        <m:sSubPr>
+                          <m:ctrlPr>
+                            <a:rPr lang="en-US" i="1">
+                              <a:latin typeface="Cambria Math" panose="02040503050406030204" pitchFamily="18" charset="0"/>
+                            </a:rPr>
+                          </m:ctrlPr>
+                        </m:sSubPr>
+                        <m:e>
+                          <m:r>
+                            <a:rPr lang="en-US" i="1">
+                              <a:latin typeface="Cambria Math" panose="02040503050406030204" pitchFamily="18" charset="0"/>
+                              <a:ea typeface="Cambria Math" panose="02040503050406030204" pitchFamily="18" charset="0"/>
+                            </a:rPr>
+                            <m:t>𝜀</m:t>
+                          </m:r>
+                        </m:e>
+                        <m:sub>
+                          <m:r>
+                            <a:rPr lang="en-US" i="1">
+                              <a:latin typeface="Cambria Math" panose="02040503050406030204" pitchFamily="18" charset="0"/>
+                            </a:rPr>
+                            <m:t>𝑖</m:t>
+                          </m:r>
+                          <m:r>
+                            <a:rPr lang="en-US" b="0" i="1" smtClean="0">
+                              <a:latin typeface="Cambria Math" panose="02040503050406030204" pitchFamily="18" charset="0"/>
+                            </a:rPr>
+                            <m:t>𝑗</m:t>
+                          </m:r>
+                        </m:sub>
+                      </m:sSub>
+                      <m:r>
+                        <a:rPr lang="en-US" i="1">
+                          <a:latin typeface="Cambria Math" panose="02040503050406030204" pitchFamily="18" charset="0"/>
+                        </a:rPr>
+                        <m:t>~</m:t>
+                      </m:r>
+                      <m:r>
+                        <a:rPr lang="en-US" i="1">
+                          <a:latin typeface="Cambria Math" panose="02040503050406030204" pitchFamily="18" charset="0"/>
+                          <a:ea typeface="Cambria Math" panose="02040503050406030204" pitchFamily="18" charset="0"/>
+                        </a:rPr>
+                        <m:t>𝒩</m:t>
+                      </m:r>
+                      <m:d>
+                        <m:dPr>
+                          <m:ctrlPr>
+                            <a:rPr lang="en-US" i="1">
+                              <a:latin typeface="Cambria Math" panose="02040503050406030204" pitchFamily="18" charset="0"/>
+                              <a:ea typeface="Cambria Math" panose="02040503050406030204" pitchFamily="18" charset="0"/>
+                            </a:rPr>
+                          </m:ctrlPr>
+                        </m:dPr>
+                        <m:e>
+                          <m:r>
+                            <a:rPr lang="en-US" i="1">
+                              <a:latin typeface="Cambria Math" panose="02040503050406030204" pitchFamily="18" charset="0"/>
+                              <a:ea typeface="Cambria Math" panose="02040503050406030204" pitchFamily="18" charset="0"/>
+                            </a:rPr>
+                            <m:t>0,</m:t>
+                          </m:r>
+                          <m:sSup>
+                            <m:sSupPr>
+                              <m:ctrlPr>
+                                <a:rPr lang="en-US" i="1">
+                                  <a:latin typeface="Cambria Math" panose="02040503050406030204" pitchFamily="18" charset="0"/>
+                                </a:rPr>
+                              </m:ctrlPr>
+                            </m:sSupPr>
+                            <m:e>
+                              <m:r>
+                                <a:rPr lang="en-US" i="1">
+                                  <a:latin typeface="Cambria Math" panose="02040503050406030204" pitchFamily="18" charset="0"/>
+                                  <a:ea typeface="Cambria Math" panose="02040503050406030204" pitchFamily="18" charset="0"/>
+                                </a:rPr>
+                                <m:t>𝜎</m:t>
+                              </m:r>
+                            </m:e>
+                            <m:sup>
+                              <m:r>
+                                <a:rPr lang="en-US" i="1">
+                                  <a:latin typeface="Cambria Math" panose="02040503050406030204" pitchFamily="18" charset="0"/>
+                                </a:rPr>
+                                <m:t>2</m:t>
+                              </m:r>
+                            </m:sup>
+                          </m:sSup>
+                        </m:e>
+                      </m:d>
+                    </m:oMath>
+                  </m:oMathPara>
+                </a14:m>
+                <a:endParaRPr lang="en-US" dirty="0"/>
+              </a:p>
+            </p:txBody>
+          </p:sp>
+        </mc:Choice>
+        <mc:Fallback>
+          <p:sp>
+            <p:nvSpPr>
+              <p:cNvPr id="9" name="Content Placeholder 8"/>
+              <p:cNvSpPr>
+                <a:spLocks noGrp="1" noRot="1" noChangeAspect="1" noMove="1" noResize="1" noEditPoints="1" noAdjustHandles="1" noChangeArrowheads="1" noChangeShapeType="1" noTextEdit="1"/>
+              </p:cNvSpPr>
+              <p:nvPr>
+                <p:ph idx="1"/>
+              </p:nvPr>
+            </p:nvSpPr>
+            <p:spPr>
+              <a:xfrm>
+                <a:off x="838200" y="1301578"/>
+                <a:ext cx="10515600" cy="5379308"/>
+              </a:xfrm>
+              <a:blipFill>
+                <a:blip r:embed="rId2"/>
+                <a:stretch>
+                  <a:fillRect l="-1217" t="-1927"/>
+                </a:stretch>
+              </a:blipFill>
+            </p:spPr>
+            <p:txBody>
+              <a:bodyPr/>
+              <a:lstStyle/>
+              <a:p>
+                <a:r>
+                  <a:rPr lang="en-US">
+                    <a:noFill/>
+                  </a:rPr>
+                  <a:t> </a:t>
+                </a:r>
+              </a:p>
+            </p:txBody>
+          </p:sp>
+        </mc:Fallback>
+      </mc:AlternateContent>
+      <p:cxnSp>
+        <p:nvCxnSpPr>
+          <p:cNvPr id="11" name="Straight Arrow Connector 10"/>
+          <p:cNvCxnSpPr/>
+          <p:nvPr/>
+        </p:nvCxnSpPr>
+        <p:spPr>
+          <a:xfrm flipV="1">
+            <a:off x="6474941" y="4448432"/>
+            <a:ext cx="2257167" cy="823784"/>
+          </a:xfrm>
+          <a:prstGeom prst="straightConnector1">
+            <a:avLst/>
+          </a:prstGeom>
+          <a:ln w="38100">
+            <a:tailEnd type="triangle"/>
+          </a:ln>
+        </p:spPr>
+        <p:style>
+          <a:lnRef idx="1">
+            <a:schemeClr val="accent1"/>
+          </a:lnRef>
+          <a:fillRef idx="0">
+            <a:schemeClr val="accent1"/>
+          </a:fillRef>
+          <a:effectRef idx="0">
+            <a:schemeClr val="accent1"/>
+          </a:effectRef>
+          <a:fontRef idx="minor">
+            <a:schemeClr val="tx1"/>
+          </a:fontRef>
+        </p:style>
+      </p:cxnSp>
+      <mc:AlternateContent xmlns:mc="http://schemas.openxmlformats.org/markup-compatibility/2006">
+        <mc:Choice xmlns:a14="http://schemas.microsoft.com/office/drawing/2010/main" Requires="a14">
+          <p:sp>
+            <p:nvSpPr>
+              <p:cNvPr id="12" name="TextBox 11"/>
+              <p:cNvSpPr txBox="1"/>
+              <p:nvPr/>
+            </p:nvSpPr>
+            <p:spPr>
+              <a:xfrm>
+                <a:off x="8732108" y="4184821"/>
+                <a:ext cx="3160930" cy="369332"/>
+              </a:xfrm>
+              <a:prstGeom prst="rect">
+                <a:avLst/>
+              </a:prstGeom>
+              <a:noFill/>
+            </p:spPr>
+            <p:txBody>
+              <a:bodyPr wrap="none" rtlCol="0">
+                <a:spAutoFit/>
+              </a:bodyPr>
+              <a:lstStyle/>
+              <a:p>
+                <a14:m>
+                  <m:oMath xmlns:m="http://schemas.openxmlformats.org/officeDocument/2006/math">
+                    <m:r>
+                      <a:rPr lang="en-US" b="0" i="1" smtClean="0">
+                        <a:solidFill>
+                          <a:srgbClr val="0070C0"/>
+                        </a:solidFill>
+                        <a:latin typeface="Cambria Math" panose="02040503050406030204" pitchFamily="18" charset="0"/>
+                      </a:rPr>
+                      <m:t>𝑍</m:t>
+                    </m:r>
+                  </m:oMath>
+                </a14:m>
+                <a:r>
+                  <a:rPr lang="en-US" dirty="0" smtClean="0">
+                    <a:solidFill>
+                      <a:srgbClr val="0070C0"/>
+                    </a:solidFill>
+                  </a:rPr>
+                  <a:t>: Random Effect Design Matrix</a:t>
+                </a:r>
+                <a:endParaRPr lang="en-US" dirty="0">
+                  <a:solidFill>
+                    <a:srgbClr val="0070C0"/>
+                  </a:solidFill>
+                </a:endParaRPr>
+              </a:p>
+            </p:txBody>
+          </p:sp>
+        </mc:Choice>
+        <mc:Fallback>
+          <p:sp>
+            <p:nvSpPr>
+              <p:cNvPr id="12" name="TextBox 11"/>
+              <p:cNvSpPr txBox="1">
+                <a:spLocks noRot="1" noChangeAspect="1" noMove="1" noResize="1" noEditPoints="1" noAdjustHandles="1" noChangeArrowheads="1" noChangeShapeType="1" noTextEdit="1"/>
+              </p:cNvSpPr>
+              <p:nvPr/>
+            </p:nvSpPr>
+            <p:spPr>
+              <a:xfrm>
+                <a:off x="8732108" y="4184821"/>
+                <a:ext cx="3160930" cy="369332"/>
+              </a:xfrm>
+              <a:prstGeom prst="rect">
+                <a:avLst/>
+              </a:prstGeom>
+              <a:blipFill>
+                <a:blip r:embed="rId3"/>
+                <a:stretch>
+                  <a:fillRect t="-8197" r="-963" b="-24590"/>
+                </a:stretch>
+              </a:blipFill>
+            </p:spPr>
+            <p:txBody>
+              <a:bodyPr/>
+              <a:lstStyle/>
+              <a:p>
+                <a:r>
+                  <a:rPr lang="en-US">
+                    <a:noFill/>
+                  </a:rPr>
+                  <a:t> </a:t>
+                </a:r>
+              </a:p>
+            </p:txBody>
+          </p:sp>
+        </mc:Fallback>
+      </mc:AlternateContent>
+      <mc:AlternateContent xmlns:mc="http://schemas.openxmlformats.org/markup-compatibility/2006">
+        <mc:Choice xmlns:a14="http://schemas.microsoft.com/office/drawing/2010/main" Requires="a14">
+          <p:sp>
+            <p:nvSpPr>
+              <p:cNvPr id="15" name="TextBox 14"/>
+              <p:cNvSpPr txBox="1"/>
+              <p:nvPr/>
+            </p:nvSpPr>
+            <p:spPr>
+              <a:xfrm>
+                <a:off x="7491837" y="5686336"/>
+                <a:ext cx="4467249" cy="369332"/>
+              </a:xfrm>
+              <a:prstGeom prst="rect">
+                <a:avLst/>
+              </a:prstGeom>
+              <a:noFill/>
+            </p:spPr>
+            <p:txBody>
+              <a:bodyPr wrap="none" rtlCol="0">
+                <a:spAutoFit/>
+              </a:bodyPr>
+              <a:lstStyle/>
+              <a:p>
+                <a:pPr marL="346075" indent="-346075"/>
+                <a14:m>
+                  <m:oMath xmlns:m="http://schemas.openxmlformats.org/officeDocument/2006/math">
+                    <m:r>
+                      <a:rPr lang="en-US" b="0" i="1" smtClean="0">
+                        <a:solidFill>
+                          <a:srgbClr val="0070C0"/>
+                        </a:solidFill>
+                        <a:latin typeface="Cambria Math" panose="02040503050406030204" pitchFamily="18" charset="0"/>
+                      </a:rPr>
+                      <m:t>𝐷</m:t>
+                    </m:r>
+                  </m:oMath>
+                </a14:m>
+                <a:r>
+                  <a:rPr lang="en-US" dirty="0" smtClean="0">
+                    <a:solidFill>
+                      <a:srgbClr val="0070C0"/>
+                    </a:solidFill>
+                  </a:rPr>
+                  <a:t>: Random Effect Variance-Covariance Matrix</a:t>
+                </a:r>
+                <a:endParaRPr lang="en-US" dirty="0">
+                  <a:solidFill>
+                    <a:srgbClr val="0070C0"/>
+                  </a:solidFill>
+                </a:endParaRPr>
+              </a:p>
+            </p:txBody>
+          </p:sp>
+        </mc:Choice>
+        <mc:Fallback>
+          <p:sp>
+            <p:nvSpPr>
+              <p:cNvPr id="15" name="TextBox 14"/>
+              <p:cNvSpPr txBox="1">
+                <a:spLocks noRot="1" noChangeAspect="1" noMove="1" noResize="1" noEditPoints="1" noAdjustHandles="1" noChangeArrowheads="1" noChangeShapeType="1" noTextEdit="1"/>
+              </p:cNvSpPr>
+              <p:nvPr/>
+            </p:nvSpPr>
+            <p:spPr>
+              <a:xfrm>
+                <a:off x="7491837" y="5686336"/>
+                <a:ext cx="4467249" cy="369332"/>
+              </a:xfrm>
+              <a:prstGeom prst="rect">
+                <a:avLst/>
+              </a:prstGeom>
+              <a:blipFill>
+                <a:blip r:embed="rId4"/>
+                <a:stretch>
+                  <a:fillRect t="-10000" r="-273" b="-26667"/>
+                </a:stretch>
+              </a:blipFill>
+            </p:spPr>
+            <p:txBody>
+              <a:bodyPr/>
+              <a:lstStyle/>
+              <a:p>
+                <a:r>
+                  <a:rPr lang="en-US">
+                    <a:noFill/>
+                  </a:rPr>
+                  <a:t> </a:t>
+                </a:r>
+              </a:p>
+            </p:txBody>
+          </p:sp>
+        </mc:Fallback>
+      </mc:AlternateContent>
+    </p:spTree>
+    <p:extLst>
+      <p:ext uri="{BB962C8B-B14F-4D97-AF65-F5344CB8AC3E}">
+        <p14:creationId xmlns:p14="http://schemas.microsoft.com/office/powerpoint/2010/main" val="14012690"/>
+      </p:ext>
+    </p:extLst>
+  </p:cSld>
+  <p:clrMapOvr>
+    <a:masterClrMapping/>
+  </p:clrMapOvr>
+</p:sld>
+</file>
+
+<file path=ppt/slides/slide16.xml><?xml version="1.0" encoding="utf-8"?>
+<p:sld xmlns:a="http://schemas.openxmlformats.org/drawingml/2006/main" xmlns:r="http://schemas.openxmlformats.org/officeDocument/2006/relationships" xmlns:p="http://schemas.openxmlformats.org/presentationml/2006/main">
+  <p:cSld>
+    <p:spTree>
+      <p:nvGrpSpPr>
+        <p:cNvPr id="1" name=""/>
+        <p:cNvGrpSpPr/>
+        <p:nvPr/>
+      </p:nvGrpSpPr>
+      <p:grpSpPr>
+        <a:xfrm>
+          <a:off x="0" y="0"/>
+          <a:ext cx="0" cy="0"/>
+          <a:chOff x="0" y="0"/>
+          <a:chExt cx="0" cy="0"/>
+        </a:xfrm>
+      </p:grpSpPr>
+      <p:sp>
+        <p:nvSpPr>
+          <p:cNvPr id="2" name="Title 1"/>
+          <p:cNvSpPr>
+            <a:spLocks noGrp="1"/>
+          </p:cNvSpPr>
+          <p:nvPr>
+            <p:ph type="title"/>
+          </p:nvPr>
+        </p:nvSpPr>
+        <p:spPr/>
+        <p:txBody>
+          <a:bodyPr anchor="t"/>
+          <a:lstStyle/>
+          <a:p>
+            <a:r>
+              <a:rPr lang="en-US" dirty="0" smtClean="0"/>
+              <a:t>Random Effects: Advantages &amp; Challenges</a:t>
+            </a:r>
+            <a:endParaRPr lang="en-US" dirty="0"/>
+          </a:p>
+        </p:txBody>
+      </p:sp>
+      <p:sp>
+        <p:nvSpPr>
+          <p:cNvPr id="4" name="Text Placeholder 3"/>
+          <p:cNvSpPr>
+            <a:spLocks noGrp="1"/>
+          </p:cNvSpPr>
+          <p:nvPr>
+            <p:ph type="body" idx="1"/>
+          </p:nvPr>
+        </p:nvSpPr>
+        <p:spPr>
+          <a:xfrm>
+            <a:off x="839788" y="1104511"/>
+            <a:ext cx="5157787" cy="823912"/>
+          </a:xfrm>
+        </p:spPr>
+        <p:txBody>
+          <a:bodyPr/>
+          <a:lstStyle/>
+          <a:p>
+            <a:r>
+              <a:rPr lang="en-US" dirty="0" smtClean="0"/>
+              <a:t>Advantages</a:t>
+            </a:r>
+            <a:endParaRPr lang="en-US" dirty="0"/>
+          </a:p>
+        </p:txBody>
+      </p:sp>
+      <p:sp>
+        <p:nvSpPr>
+          <p:cNvPr id="5" name="Content Placeholder 4"/>
+          <p:cNvSpPr>
+            <a:spLocks noGrp="1"/>
+          </p:cNvSpPr>
+          <p:nvPr>
+            <p:ph sz="half" idx="2"/>
+          </p:nvPr>
+        </p:nvSpPr>
+        <p:spPr>
+          <a:xfrm>
+            <a:off x="839788" y="1993557"/>
+            <a:ext cx="5157787" cy="4196106"/>
+          </a:xfrm>
+        </p:spPr>
+        <p:txBody>
+          <a:bodyPr>
+            <a:normAutofit fontScale="92500" lnSpcReduction="10000"/>
+          </a:bodyPr>
+          <a:lstStyle/>
+          <a:p>
+            <a:r>
+              <a:rPr lang="en-US" dirty="0" smtClean="0"/>
+              <a:t>Broadens inference to a larger population</a:t>
+            </a:r>
+          </a:p>
+          <a:p>
+            <a:r>
+              <a:rPr lang="en-US" dirty="0" smtClean="0"/>
+              <a:t>Represents a “compromise” in terms of information used</a:t>
+            </a:r>
+          </a:p>
+          <a:p>
+            <a:pPr lvl="1"/>
+            <a:r>
+              <a:rPr lang="en-US" dirty="0" smtClean="0"/>
+              <a:t>Ignore factor levels: pool all levels of the factor</a:t>
+            </a:r>
+          </a:p>
+          <a:p>
+            <a:pPr lvl="1"/>
+            <a:r>
+              <a:rPr lang="en-US" dirty="0" smtClean="0"/>
+              <a:t>Fixed effects: no pooling</a:t>
+            </a:r>
+          </a:p>
+          <a:p>
+            <a:pPr lvl="1"/>
+            <a:r>
+              <a:rPr lang="en-US" dirty="0" smtClean="0"/>
+              <a:t>Random effects: partial pooling, with degree of pooling dependent on relative size of among-group and within-group variation, and on sample size</a:t>
+            </a:r>
+            <a:endParaRPr lang="en-US" dirty="0"/>
+          </a:p>
+        </p:txBody>
+      </p:sp>
+      <p:sp>
+        <p:nvSpPr>
+          <p:cNvPr id="6" name="Text Placeholder 5"/>
+          <p:cNvSpPr>
+            <a:spLocks noGrp="1"/>
+          </p:cNvSpPr>
+          <p:nvPr>
+            <p:ph type="body" sz="quarter" idx="3"/>
+          </p:nvPr>
+        </p:nvSpPr>
+        <p:spPr>
+          <a:xfrm>
+            <a:off x="6172200" y="1104511"/>
+            <a:ext cx="5183188" cy="823912"/>
+          </a:xfrm>
+        </p:spPr>
+        <p:txBody>
+          <a:bodyPr/>
+          <a:lstStyle/>
+          <a:p>
+            <a:r>
+              <a:rPr lang="en-US" dirty="0" smtClean="0"/>
+              <a:t>Challenges</a:t>
+            </a:r>
+            <a:endParaRPr lang="en-US" dirty="0"/>
+          </a:p>
+        </p:txBody>
+      </p:sp>
+      <p:sp>
+        <p:nvSpPr>
+          <p:cNvPr id="7" name="Content Placeholder 6"/>
+          <p:cNvSpPr>
+            <a:spLocks noGrp="1"/>
+          </p:cNvSpPr>
+          <p:nvPr>
+            <p:ph sz="quarter" idx="4"/>
+          </p:nvPr>
+        </p:nvSpPr>
+        <p:spPr>
+          <a:xfrm>
+            <a:off x="6172200" y="2075935"/>
+            <a:ext cx="5183188" cy="4113728"/>
+          </a:xfrm>
+        </p:spPr>
+        <p:txBody>
+          <a:bodyPr/>
+          <a:lstStyle/>
+          <a:p>
+            <a:r>
+              <a:rPr lang="en-US" dirty="0" smtClean="0"/>
+              <a:t>With too few levels, estimates are imprecise</a:t>
+            </a:r>
+          </a:p>
+          <a:p>
+            <a:pPr lvl="1"/>
+            <a:r>
+              <a:rPr lang="en-US" dirty="0" smtClean="0"/>
+              <a:t>Factors with less than 5-10 levels are typically treated as fixed effects</a:t>
+            </a:r>
+          </a:p>
+          <a:p>
+            <a:pPr lvl="1"/>
+            <a:r>
+              <a:rPr lang="en-US" dirty="0" smtClean="0"/>
+              <a:t>Random effects are often more difficult to understand or explain</a:t>
+            </a:r>
+            <a:endParaRPr lang="en-US" dirty="0"/>
+          </a:p>
+        </p:txBody>
+      </p:sp>
+    </p:spTree>
+    <p:extLst>
+      <p:ext uri="{BB962C8B-B14F-4D97-AF65-F5344CB8AC3E}">
+        <p14:creationId xmlns:p14="http://schemas.microsoft.com/office/powerpoint/2010/main" val="2350228935"/>
       </p:ext>
     </p:extLst>
   </p:cSld>
@@ -3850,7 +5860,35 @@
           <a:p>
             <a:r>
               <a:rPr lang="en-US" dirty="0" smtClean="0"/>
-              <a:t>Understand the basic structure and differences among different types of regression models (LM, LMM, GLM, GLMM, GAM, GAMM)</a:t>
+              <a:t>Understand the basic structure and differences among different types of regression models (LM, </a:t>
+            </a:r>
+            <a:r>
+              <a:rPr lang="en-US" dirty="0" smtClean="0"/>
+              <a:t>GLM</a:t>
+            </a:r>
+            <a:r>
+              <a:rPr lang="en-US" dirty="0" smtClean="0"/>
+              <a:t>, </a:t>
+            </a:r>
+            <a:r>
+              <a:rPr lang="en-US" dirty="0" smtClean="0"/>
+              <a:t>GAM</a:t>
+            </a:r>
+            <a:r>
+              <a:rPr lang="en-US" dirty="0" smtClean="0"/>
+              <a:t>, </a:t>
+            </a:r>
+            <a:r>
+              <a:rPr lang="en-US" dirty="0"/>
+              <a:t>LMM, GLMM, </a:t>
+            </a:r>
+            <a:r>
+              <a:rPr lang="en-US" dirty="0" smtClean="0"/>
+              <a:t>GAMM</a:t>
+            </a:r>
+            <a:r>
+              <a:rPr lang="en-US" dirty="0" smtClean="0"/>
+              <a:t>)</a:t>
             </a:r>
           </a:p>
           <a:p>
@@ -4080,42 +6118,61 @@
           <a:p>
             <a:r>
               <a:rPr lang="en-US" dirty="0" smtClean="0"/>
+              <a:t>Generalized </a:t>
+            </a:r>
+            <a:r>
+              <a:rPr lang="en-US" dirty="0" smtClean="0"/>
+              <a:t>linear model: GLM</a:t>
+            </a:r>
+          </a:p>
+          <a:p>
+            <a:r>
+              <a:rPr lang="en-US" dirty="0" smtClean="0"/>
+              <a:t>Generalized </a:t>
+            </a:r>
+            <a:r>
+              <a:rPr lang="en-US" dirty="0" smtClean="0"/>
+              <a:t>additive model: </a:t>
+            </a:r>
+            <a:r>
+              <a:rPr lang="en-US" dirty="0" smtClean="0"/>
+              <a:t>GAM</a:t>
+            </a:r>
+          </a:p>
+          <a:p>
+            <a:r>
+              <a:rPr lang="en-US" dirty="0"/>
               <a:t>Linear mixed model: LMM</a:t>
             </a:r>
-            <a:endParaRPr lang="en-US" dirty="0"/>
           </a:p>
           <a:p>
             <a:pPr lvl="1"/>
             <a:r>
+              <a:rPr lang="en-US" dirty="0"/>
+              <a:t>Sometimes called “linear mixed effects model</a:t>
+            </a:r>
+            <a:r>
               <a:rPr lang="en-US" dirty="0" smtClean="0"/>
-              <a:t>Sometimes called “linear mixed effects model”</a:t>
-            </a:r>
-          </a:p>
-          <a:p>
+              <a:t>”</a:t>
+            </a:r>
+          </a:p>
+          <a:p>
+            <a:r>
+              <a:rPr lang="en-US" dirty="0"/>
+              <a:t>Generalized linear mixed model: GLMM</a:t>
+            </a:r>
+          </a:p>
+          <a:p>
+            <a:pPr lvl="1"/>
+            <a:r>
+              <a:rPr lang="en-US" dirty="0"/>
+              <a:t>Sometimes called “generalized linear mixed effects model” or “hierarchical generalized linear model” (HGLM</a:t>
+            </a:r>
             <a:r>
               <a:rPr lang="en-US" dirty="0" smtClean="0"/>
-              <a:t>Generalized linear model: GLM</a:t>
-            </a:r>
-          </a:p>
-          <a:p>
-            <a:r>
-              <a:rPr lang="en-US" dirty="0" smtClean="0"/>
-              <a:t>Generalized linear mixed model: GLMM</a:t>
-            </a:r>
-            <a:endParaRPr lang="en-US" dirty="0"/>
-          </a:p>
-          <a:p>
-            <a:pPr lvl="1"/>
-            <a:r>
-              <a:rPr lang="en-US" dirty="0" smtClean="0"/>
-              <a:t>Sometimes called “generalized linear mixed effects model” or “hierarchical generalized linear model” (HGLM)</a:t>
-            </a:r>
-          </a:p>
-          <a:p>
-            <a:r>
-              <a:rPr lang="en-US" dirty="0" smtClean="0"/>
-              <a:t>Generalized additive model: GAM</a:t>
-            </a:r>
+              <a:t>)</a:t>
+            </a:r>
+            <a:endParaRPr lang="en-US" dirty="0" smtClean="0"/>
           </a:p>
           <a:p>
             <a:r>
@@ -7111,7 +9168,7 @@
                             <a:latin typeface="Cambria Math" panose="02040503050406030204" pitchFamily="18" charset="0"/>
                             <a:ea typeface="Cambria Math" panose="02040503050406030204" pitchFamily="18" charset="0"/>
                           </a:rPr>
-                          <m:t>𝜖</m:t>
+                          <m:t>𝜀</m:t>
                         </m:r>
                       </m:e>
                       <m:sub>
@@ -7474,7 +9531,9 @@
           <a:prstGeom prst="rect">
             <a:avLst/>
           </a:prstGeom>
-          <a:noFill/>
+          <a:solidFill>
+            <a:srgbClr val="0070C0"/>
+          </a:solidFill>
         </p:spPr>
         <p:txBody>
           <a:bodyPr wrap="none" rtlCol="0">
@@ -7483,10 +9542,18 @@
           <a:lstStyle/>
           <a:p>
             <a:r>
-              <a:rPr lang="en-US" dirty="0" smtClean="0"/>
+              <a:rPr lang="en-US" dirty="0" smtClean="0">
+                <a:solidFill>
+                  <a:schemeClr val="bg1"/>
+                </a:solidFill>
+              </a:rPr>
               <a:t>Wood, S.N. 2006. Generalized Additive Models: An introduction with R. Chapman &amp; Hall/CRC.</a:t>
             </a:r>
-            <a:endParaRPr lang="en-US" dirty="0"/>
+            <a:endParaRPr lang="en-US" dirty="0">
+              <a:solidFill>
+                <a:schemeClr val="bg1"/>
+              </a:solidFill>
+            </a:endParaRPr>
           </a:p>
         </p:txBody>
       </p:sp>
@@ -7543,8 +9610,8 @@
           </a:p>
         </p:txBody>
       </p:sp>
-      <mc:AlternateContent xmlns:mc="http://schemas.openxmlformats.org/markup-compatibility/2006">
-        <mc:Choice xmlns:a14="http://schemas.microsoft.com/office/drawing/2010/main" Requires="a14">
+      <mc:AlternateContent xmlns:mc="http://schemas.openxmlformats.org/markup-compatibility/2006" xmlns:a14="http://schemas.microsoft.com/office/drawing/2010/main">
+        <mc:Choice Requires="a14">
           <p:sp>
             <p:nvSpPr>
               <p:cNvPr id="4" name="Text Placeholder 3"/>
@@ -7579,7 +9646,7 @@
             </p:txBody>
           </p:sp>
         </mc:Choice>
-        <mc:Fallback>
+        <mc:Fallback xmlns="">
           <p:sp>
             <p:nvSpPr>
               <p:cNvPr id="4" name="Text Placeholder 3"/>
@@ -7636,8 +9703,8 @@
           </a:p>
         </p:txBody>
       </p:sp>
-      <mc:AlternateContent xmlns:mc="http://schemas.openxmlformats.org/markup-compatibility/2006">
-        <mc:Choice xmlns:a14="http://schemas.microsoft.com/office/drawing/2010/main" Requires="a14">
+      <mc:AlternateContent xmlns:mc="http://schemas.openxmlformats.org/markup-compatibility/2006" xmlns:a14="http://schemas.microsoft.com/office/drawing/2010/main">
+        <mc:Choice Requires="a14">
           <p:sp>
             <p:nvSpPr>
               <p:cNvPr id="6" name="Text Placeholder 5"/>
@@ -7672,7 +9739,7 @@
             </p:txBody>
           </p:sp>
         </mc:Choice>
-        <mc:Fallback>
+        <mc:Fallback xmlns="">
           <p:sp>
             <p:nvSpPr>
               <p:cNvPr id="6" name="Text Placeholder 5"/>
@@ -7818,8 +9885,8 @@
           </a:p>
         </p:txBody>
       </p:sp>
-      <mc:AlternateContent xmlns:mc="http://schemas.openxmlformats.org/markup-compatibility/2006">
-        <mc:Choice xmlns:a14="http://schemas.microsoft.com/office/drawing/2010/main" Requires="a14">
+      <mc:AlternateContent xmlns:mc="http://schemas.openxmlformats.org/markup-compatibility/2006" xmlns:a14="http://schemas.microsoft.com/office/drawing/2010/main">
+        <mc:Choice Requires="a14">
           <p:sp>
             <p:nvSpPr>
               <p:cNvPr id="10" name="Content Placeholder 9"/>
@@ -8533,7 +10600,7 @@
             </p:txBody>
           </p:sp>
         </mc:Choice>
-        <mc:Fallback>
+        <mc:Fallback xmlns="">
           <p:sp>
             <p:nvSpPr>
               <p:cNvPr id="10" name="Content Placeholder 9"/>
@@ -8591,8 +10658,8 @@
           </a:p>
         </p:txBody>
       </p:sp>
-      <mc:AlternateContent xmlns:mc="http://schemas.openxmlformats.org/markup-compatibility/2006">
-        <mc:Choice xmlns:a14="http://schemas.microsoft.com/office/drawing/2010/main" Requires="a14">
+      <mc:AlternateContent xmlns:mc="http://schemas.openxmlformats.org/markup-compatibility/2006" xmlns:a14="http://schemas.microsoft.com/office/drawing/2010/main">
+        <mc:Choice Requires="a14">
           <p:sp>
             <p:nvSpPr>
               <p:cNvPr id="12" name="Content Placeholder 11"/>
@@ -9022,7 +11089,7 @@
             </p:txBody>
           </p:sp>
         </mc:Choice>
-        <mc:Fallback>
+        <mc:Fallback xmlns="">
           <p:sp>
             <p:nvSpPr>
               <p:cNvPr id="12" name="Content Placeholder 11"/>
@@ -9091,11 +11158,6 @@
               </a:rPr>
               <a:t>The simple linear model, introduced above, can be generalized by allowing the response variable to depend on multiple predictor variables (plus an additive constant). These extra predictor variables can themselves be transformations of the original predictors. (Wood 2006)</a:t>
             </a:r>
-            <a:endParaRPr lang="en-US" dirty="0">
-              <a:solidFill>
-                <a:schemeClr val="bg1"/>
-              </a:solidFill>
-            </a:endParaRPr>
           </a:p>
         </p:txBody>
       </p:sp>

</xml_diff>

<commit_message>
Began GLM stuff; left off on 3 key components slide.
</commit_message>
<xml_diff>
--- a/Notes/RegressionModelOverview.pptx
+++ b/Notes/RegressionModelOverview.pptx
@@ -5,7 +5,7 @@
     <p:sldMasterId id="2147483648" r:id="rId1"/>
   </p:sldMasterIdLst>
   <p:notesMasterIdLst>
-    <p:notesMasterId r:id="rId18"/>
+    <p:notesMasterId r:id="rId20"/>
   </p:notesMasterIdLst>
   <p:sldIdLst>
     <p:sldId id="256" r:id="rId2"/>
@@ -19,11 +19,13 @@
     <p:sldId id="264" r:id="rId10"/>
     <p:sldId id="265" r:id="rId11"/>
     <p:sldId id="271" r:id="rId12"/>
-    <p:sldId id="266" r:id="rId13"/>
-    <p:sldId id="267" r:id="rId14"/>
-    <p:sldId id="270" r:id="rId15"/>
-    <p:sldId id="268" r:id="rId16"/>
-    <p:sldId id="269" r:id="rId17"/>
+    <p:sldId id="272" r:id="rId13"/>
+    <p:sldId id="273" r:id="rId14"/>
+    <p:sldId id="266" r:id="rId15"/>
+    <p:sldId id="267" r:id="rId16"/>
+    <p:sldId id="270" r:id="rId17"/>
+    <p:sldId id="268" r:id="rId18"/>
+    <p:sldId id="269" r:id="rId19"/>
   </p:sldIdLst>
   <p:sldSz cx="12192000" cy="6858000"/>
   <p:notesSz cx="6858000" cy="9144000"/>
@@ -3766,6 +3768,99 @@
           </a:p>
         </p:txBody>
       </p:sp>
+      <p:sp>
+        <p:nvSpPr>
+          <p:cNvPr id="5" name="Content Placeholder 4"/>
+          <p:cNvSpPr>
+            <a:spLocks noGrp="1"/>
+          </p:cNvSpPr>
+          <p:nvPr>
+            <p:ph idx="1"/>
+          </p:nvPr>
+        </p:nvSpPr>
+        <p:spPr/>
+        <p:txBody>
+          <a:bodyPr/>
+          <a:lstStyle/>
+          <a:p>
+            <a:pPr marL="282575" lvl="1"/>
+            <a:r>
+              <a:rPr lang="en-US" dirty="0" smtClean="0"/>
+              <a:t>Common </a:t>
+            </a:r>
+            <a:r>
+              <a:rPr lang="en-US" dirty="0"/>
+              <a:t>approach for a class of regression models with single response variables</a:t>
+            </a:r>
+          </a:p>
+          <a:p>
+            <a:pPr marL="282575" lvl="2"/>
+            <a:r>
+              <a:rPr lang="en-US" sz="2400" dirty="0" smtClean="0"/>
+              <a:t>Examples: </a:t>
+            </a:r>
+            <a:r>
+              <a:rPr lang="en-US" sz="2400" dirty="0"/>
+              <a:t>linear, logistic, Poisson regression</a:t>
+            </a:r>
+          </a:p>
+          <a:p>
+            <a:pPr marL="282575" lvl="2"/>
+            <a:r>
+              <a:rPr lang="en-US" sz="2400" dirty="0"/>
+              <a:t>General applicability to distributions in the </a:t>
+            </a:r>
+            <a:r>
+              <a:rPr lang="en-US" sz="2400" b="1" dirty="0">
+                <a:solidFill>
+                  <a:srgbClr val="0070C0"/>
+                </a:solidFill>
+              </a:rPr>
+              <a:t>exponential family</a:t>
+            </a:r>
+            <a:endParaRPr lang="en-US" sz="2400" dirty="0">
+              <a:solidFill>
+                <a:srgbClr val="0070C0"/>
+              </a:solidFill>
+            </a:endParaRPr>
+          </a:p>
+          <a:p>
+            <a:pPr marL="0" indent="0">
+              <a:buNone/>
+            </a:pPr>
+            <a:endParaRPr lang="en-US" dirty="0"/>
+          </a:p>
+        </p:txBody>
+      </p:sp>
+      <p:pic>
+        <p:nvPicPr>
+          <p:cNvPr id="6" name="Content Placeholder 3"/>
+          <p:cNvPicPr>
+            <a:picLocks noChangeAspect="1"/>
+          </p:cNvPicPr>
+          <p:nvPr/>
+        </p:nvPicPr>
+        <p:blipFill rotWithShape="1">
+          <a:blip r:embed="rId2" cstate="print">
+            <a:extLst>
+              <a:ext uri="{28A0092B-C50C-407E-A947-70E740481C1C}">
+                <a14:useLocalDpi xmlns:a14="http://schemas.microsoft.com/office/drawing/2010/main" val="0"/>
+              </a:ext>
+            </a:extLst>
+          </a:blip>
+          <a:srcRect l="3350" r="11195"/>
+          <a:stretch/>
+        </p:blipFill>
+        <p:spPr>
+          <a:xfrm>
+            <a:off x="3863546" y="3919023"/>
+            <a:ext cx="4464909" cy="2938977"/>
+          </a:xfrm>
+          <a:prstGeom prst="rect">
+            <a:avLst/>
+          </a:prstGeom>
+        </p:spPr>
+      </p:pic>
     </p:spTree>
     <p:extLst>
       <p:ext uri="{BB962C8B-B14F-4D97-AF65-F5344CB8AC3E}">
@@ -3813,15 +3908,822 @@
           <a:p>
             <a:r>
               <a:rPr lang="en-US" dirty="0" smtClean="0"/>
-              <a:t>Intro to the Linear </a:t>
-            </a:r>
+              <a:t>Mathematical form of Distributions in the Exponential Family</a:t>
+            </a:r>
+            <a:endParaRPr lang="en-US" dirty="0"/>
+          </a:p>
+        </p:txBody>
+      </p:sp>
+      <mc:AlternateContent xmlns:mc="http://schemas.openxmlformats.org/markup-compatibility/2006">
+        <mc:Choice xmlns:a14="http://schemas.microsoft.com/office/drawing/2010/main" Requires="a14">
+          <p:sp>
+            <p:nvSpPr>
+              <p:cNvPr id="3" name="Content Placeholder 2"/>
+              <p:cNvSpPr>
+                <a:spLocks noGrp="1"/>
+              </p:cNvSpPr>
+              <p:nvPr>
+                <p:ph idx="1"/>
+              </p:nvPr>
+            </p:nvSpPr>
+            <p:spPr/>
+            <p:txBody>
+              <a:bodyPr>
+                <a:normAutofit lnSpcReduction="10000"/>
+              </a:bodyPr>
+              <a:lstStyle/>
+              <a:p>
+                <a:pPr marL="0" indent="0">
+                  <a:buNone/>
+                </a:pPr>
+                <a:r>
+                  <a:rPr lang="en-US" dirty="0" smtClean="0">
+                    <a:solidFill>
+                      <a:schemeClr val="accent4">
+                        <a:lumMod val="75000"/>
+                      </a:schemeClr>
+                    </a:solidFill>
+                  </a:rPr>
+                  <a:t>Probability density function</a:t>
+                </a:r>
+                <a:r>
+                  <a:rPr lang="en-US" dirty="0" smtClean="0"/>
+                  <a:t> of a random variable </a:t>
+                </a:r>
+                <a14:m>
+                  <m:oMath xmlns:m="http://schemas.openxmlformats.org/officeDocument/2006/math">
+                    <m:r>
+                      <a:rPr lang="en-US" b="0" i="1" smtClean="0">
+                        <a:latin typeface="Cambria Math" panose="02040503050406030204" pitchFamily="18" charset="0"/>
+                      </a:rPr>
+                      <m:t>𝑌</m:t>
+                    </m:r>
+                  </m:oMath>
+                </a14:m>
+                <a:r>
+                  <a:rPr lang="en-US" dirty="0" smtClean="0"/>
+                  <a:t> from an exponential family:</a:t>
+                </a:r>
+              </a:p>
+              <a:p>
+                <a:pPr marL="0" indent="0">
+                  <a:buNone/>
+                </a:pPr>
+                <a14:m>
+                  <m:oMathPara xmlns:m="http://schemas.openxmlformats.org/officeDocument/2006/math">
+                    <m:oMathParaPr>
+                      <m:jc m:val="centerGroup"/>
+                    </m:oMathParaPr>
+                    <m:oMath xmlns:m="http://schemas.openxmlformats.org/officeDocument/2006/math">
+                      <m:sSub>
+                        <m:sSubPr>
+                          <m:ctrlPr>
+                            <a:rPr lang="en-US" i="1" smtClean="0">
+                              <a:latin typeface="Cambria Math" panose="02040503050406030204" pitchFamily="18" charset="0"/>
+                            </a:rPr>
+                          </m:ctrlPr>
+                        </m:sSubPr>
+                        <m:e>
+                          <m:r>
+                            <a:rPr lang="en-US" b="0" i="1" smtClean="0">
+                              <a:latin typeface="Cambria Math" panose="02040503050406030204" pitchFamily="18" charset="0"/>
+                            </a:rPr>
+                            <m:t>𝑓</m:t>
+                          </m:r>
+                        </m:e>
+                        <m:sub>
+                          <m:r>
+                            <a:rPr lang="en-US" b="0" i="1" smtClean="0">
+                              <a:latin typeface="Cambria Math" panose="02040503050406030204" pitchFamily="18" charset="0"/>
+                            </a:rPr>
+                            <m:t>𝑌</m:t>
+                          </m:r>
+                        </m:sub>
+                      </m:sSub>
+                      <m:d>
+                        <m:dPr>
+                          <m:ctrlPr>
+                            <a:rPr lang="en-US" i="1" smtClean="0">
+                              <a:latin typeface="Cambria Math" panose="02040503050406030204" pitchFamily="18" charset="0"/>
+                            </a:rPr>
+                          </m:ctrlPr>
+                        </m:dPr>
+                        <m:e>
+                          <m:r>
+                            <a:rPr lang="en-US" b="0" i="1" smtClean="0">
+                              <a:latin typeface="Cambria Math" panose="02040503050406030204" pitchFamily="18" charset="0"/>
+                            </a:rPr>
+                            <m:t>𝑦</m:t>
+                          </m:r>
+                          <m:r>
+                            <a:rPr lang="en-US" b="0" i="1" smtClean="0">
+                              <a:latin typeface="Cambria Math" panose="02040503050406030204" pitchFamily="18" charset="0"/>
+                            </a:rPr>
+                            <m:t>;</m:t>
+                          </m:r>
+                          <m:r>
+                            <a:rPr lang="en-US" b="0" i="1" smtClean="0">
+                              <a:latin typeface="Cambria Math" panose="02040503050406030204" pitchFamily="18" charset="0"/>
+                              <a:ea typeface="Cambria Math" panose="02040503050406030204" pitchFamily="18" charset="0"/>
+                            </a:rPr>
+                            <m:t>𝜃</m:t>
+                          </m:r>
+                          <m:r>
+                            <a:rPr lang="en-US" b="0" i="1" smtClean="0">
+                              <a:latin typeface="Cambria Math" panose="02040503050406030204" pitchFamily="18" charset="0"/>
+                              <a:ea typeface="Cambria Math" panose="02040503050406030204" pitchFamily="18" charset="0"/>
+                            </a:rPr>
+                            <m:t>,</m:t>
+                          </m:r>
+                          <m:r>
+                            <a:rPr lang="en-US" b="0" i="1" smtClean="0">
+                              <a:latin typeface="Cambria Math" panose="02040503050406030204" pitchFamily="18" charset="0"/>
+                              <a:ea typeface="Cambria Math" panose="02040503050406030204" pitchFamily="18" charset="0"/>
+                            </a:rPr>
+                            <m:t>𝜑</m:t>
+                          </m:r>
+                        </m:e>
+                      </m:d>
+                      <m:r>
+                        <a:rPr lang="en-US" b="0" i="1" smtClean="0">
+                          <a:latin typeface="Cambria Math" panose="02040503050406030204" pitchFamily="18" charset="0"/>
+                        </a:rPr>
+                        <m:t>=</m:t>
+                      </m:r>
+                      <m:r>
+                        <a:rPr lang="en-US" b="0" i="1" smtClean="0">
+                          <a:latin typeface="Cambria Math" panose="02040503050406030204" pitchFamily="18" charset="0"/>
+                        </a:rPr>
+                        <m:t>𝑒𝑥𝑝</m:t>
+                      </m:r>
+                      <m:d>
+                        <m:dPr>
+                          <m:begChr m:val="{"/>
+                          <m:endChr m:val="}"/>
+                          <m:ctrlPr>
+                            <a:rPr lang="en-US" b="0" i="1" smtClean="0">
+                              <a:latin typeface="Cambria Math" panose="02040503050406030204" pitchFamily="18" charset="0"/>
+                            </a:rPr>
+                          </m:ctrlPr>
+                        </m:dPr>
+                        <m:e>
+                          <m:f>
+                            <m:fPr>
+                              <m:ctrlPr>
+                                <a:rPr lang="en-US" b="0" i="1" smtClean="0">
+                                  <a:latin typeface="Cambria Math" panose="02040503050406030204" pitchFamily="18" charset="0"/>
+                                </a:rPr>
+                              </m:ctrlPr>
+                            </m:fPr>
+                            <m:num>
+                              <m:d>
+                                <m:dPr>
+                                  <m:ctrlPr>
+                                    <a:rPr lang="en-US" b="0" i="1" smtClean="0">
+                                      <a:latin typeface="Cambria Math" panose="02040503050406030204" pitchFamily="18" charset="0"/>
+                                    </a:rPr>
+                                  </m:ctrlPr>
+                                </m:dPr>
+                                <m:e>
+                                  <m:r>
+                                    <a:rPr lang="en-US" b="0" i="1" smtClean="0">
+                                      <a:latin typeface="Cambria Math" panose="02040503050406030204" pitchFamily="18" charset="0"/>
+                                    </a:rPr>
+                                    <m:t>𝑦</m:t>
+                                  </m:r>
+                                  <m:r>
+                                    <a:rPr lang="en-US" b="0" i="1" smtClean="0">
+                                      <a:latin typeface="Cambria Math" panose="02040503050406030204" pitchFamily="18" charset="0"/>
+                                      <a:ea typeface="Cambria Math" panose="02040503050406030204" pitchFamily="18" charset="0"/>
+                                    </a:rPr>
+                                    <m:t>𝜃</m:t>
+                                  </m:r>
+                                  <m:r>
+                                    <a:rPr lang="en-US" b="0" i="1" smtClean="0">
+                                      <a:latin typeface="Cambria Math" panose="02040503050406030204" pitchFamily="18" charset="0"/>
+                                      <a:ea typeface="Cambria Math" panose="02040503050406030204" pitchFamily="18" charset="0"/>
+                                    </a:rPr>
+                                    <m:t>−</m:t>
+                                  </m:r>
+                                  <m:r>
+                                    <a:rPr lang="en-US" b="0" i="1" smtClean="0">
+                                      <a:latin typeface="Cambria Math" panose="02040503050406030204" pitchFamily="18" charset="0"/>
+                                      <a:ea typeface="Cambria Math" panose="02040503050406030204" pitchFamily="18" charset="0"/>
+                                    </a:rPr>
+                                    <m:t>𝑏</m:t>
+                                  </m:r>
+                                  <m:d>
+                                    <m:dPr>
+                                      <m:ctrlPr>
+                                        <a:rPr lang="en-US" b="0" i="1" smtClean="0">
+                                          <a:latin typeface="Cambria Math" panose="02040503050406030204" pitchFamily="18" charset="0"/>
+                                          <a:ea typeface="Cambria Math" panose="02040503050406030204" pitchFamily="18" charset="0"/>
+                                        </a:rPr>
+                                      </m:ctrlPr>
+                                    </m:dPr>
+                                    <m:e>
+                                      <m:r>
+                                        <a:rPr lang="en-US" b="0" i="1" smtClean="0">
+                                          <a:latin typeface="Cambria Math" panose="02040503050406030204" pitchFamily="18" charset="0"/>
+                                          <a:ea typeface="Cambria Math" panose="02040503050406030204" pitchFamily="18" charset="0"/>
+                                        </a:rPr>
+                                        <m:t>𝜃</m:t>
+                                      </m:r>
+                                    </m:e>
+                                  </m:d>
+                                </m:e>
+                              </m:d>
+                            </m:num>
+                            <m:den>
+                              <m:r>
+                                <a:rPr lang="en-US" b="0" i="1" smtClean="0">
+                                  <a:latin typeface="Cambria Math" panose="02040503050406030204" pitchFamily="18" charset="0"/>
+                                </a:rPr>
+                                <m:t>𝑎</m:t>
+                              </m:r>
+                              <m:d>
+                                <m:dPr>
+                                  <m:ctrlPr>
+                                    <a:rPr lang="en-US" b="0" i="1" smtClean="0">
+                                      <a:latin typeface="Cambria Math" panose="02040503050406030204" pitchFamily="18" charset="0"/>
+                                    </a:rPr>
+                                  </m:ctrlPr>
+                                </m:dPr>
+                                <m:e>
+                                  <m:r>
+                                    <a:rPr lang="en-US" b="0" i="1" smtClean="0">
+                                      <a:latin typeface="Cambria Math" panose="02040503050406030204" pitchFamily="18" charset="0"/>
+                                      <a:ea typeface="Cambria Math" panose="02040503050406030204" pitchFamily="18" charset="0"/>
+                                    </a:rPr>
+                                    <m:t>𝜑</m:t>
+                                  </m:r>
+                                </m:e>
+                              </m:d>
+                            </m:den>
+                          </m:f>
+                          <m:r>
+                            <a:rPr lang="en-US" b="0" i="1" smtClean="0">
+                              <a:latin typeface="Cambria Math" panose="02040503050406030204" pitchFamily="18" charset="0"/>
+                            </a:rPr>
+                            <m:t>+</m:t>
+                          </m:r>
+                          <m:r>
+                            <a:rPr lang="en-US" b="0" i="1" smtClean="0">
+                              <a:latin typeface="Cambria Math" panose="02040503050406030204" pitchFamily="18" charset="0"/>
+                            </a:rPr>
+                            <m:t>𝑐</m:t>
+                          </m:r>
+                          <m:d>
+                            <m:dPr>
+                              <m:ctrlPr>
+                                <a:rPr lang="en-US" b="0" i="1" smtClean="0">
+                                  <a:latin typeface="Cambria Math" panose="02040503050406030204" pitchFamily="18" charset="0"/>
+                                </a:rPr>
+                              </m:ctrlPr>
+                            </m:dPr>
+                            <m:e>
+                              <m:r>
+                                <a:rPr lang="en-US" b="0" i="1" smtClean="0">
+                                  <a:latin typeface="Cambria Math" panose="02040503050406030204" pitchFamily="18" charset="0"/>
+                                </a:rPr>
+                                <m:t>𝑦</m:t>
+                              </m:r>
+                              <m:r>
+                                <a:rPr lang="en-US" b="0" i="1" smtClean="0">
+                                  <a:latin typeface="Cambria Math" panose="02040503050406030204" pitchFamily="18" charset="0"/>
+                                </a:rPr>
+                                <m:t>,</m:t>
+                              </m:r>
+                              <m:r>
+                                <a:rPr lang="en-US" b="0" i="1" smtClean="0">
+                                  <a:latin typeface="Cambria Math" panose="02040503050406030204" pitchFamily="18" charset="0"/>
+                                  <a:ea typeface="Cambria Math" panose="02040503050406030204" pitchFamily="18" charset="0"/>
+                                </a:rPr>
+                                <m:t>𝜑</m:t>
+                              </m:r>
+                            </m:e>
+                          </m:d>
+                        </m:e>
+                      </m:d>
+                    </m:oMath>
+                  </m:oMathPara>
+                </a14:m>
+                <a:endParaRPr lang="en-US" dirty="0" smtClean="0"/>
+              </a:p>
+              <a:p>
+                <a:pPr marL="0" indent="0">
+                  <a:buNone/>
+                </a:pPr>
+                <a:r>
+                  <a:rPr lang="en-US" dirty="0" smtClean="0"/>
+                  <a:t>Variance of </a:t>
+                </a:r>
+                <a14:m>
+                  <m:oMath xmlns:m="http://schemas.openxmlformats.org/officeDocument/2006/math">
+                    <m:r>
+                      <a:rPr lang="en-US" i="1">
+                        <a:latin typeface="Cambria Math" panose="02040503050406030204" pitchFamily="18" charset="0"/>
+                      </a:rPr>
+                      <m:t>𝑌</m:t>
+                    </m:r>
+                  </m:oMath>
+                </a14:m>
+                <a:r>
+                  <a:rPr lang="en-US" dirty="0" smtClean="0"/>
+                  <a:t>:</a:t>
+                </a:r>
+              </a:p>
+              <a:p>
+                <a:pPr marL="0" indent="0" algn="ctr">
+                  <a:buNone/>
+                </a:pPr>
+                <a14:m>
+                  <m:oMathPara xmlns:m="http://schemas.openxmlformats.org/officeDocument/2006/math">
+                    <m:oMathParaPr>
+                      <m:jc m:val="centerGroup"/>
+                    </m:oMathParaPr>
+                    <m:oMath xmlns:m="http://schemas.openxmlformats.org/officeDocument/2006/math">
+                      <m:r>
+                        <a:rPr lang="en-US" b="0" i="1" smtClean="0">
+                          <a:latin typeface="Cambria Math" panose="02040503050406030204" pitchFamily="18" charset="0"/>
+                        </a:rPr>
+                        <m:t>𝑣𝑎𝑟</m:t>
+                      </m:r>
+                      <m:d>
+                        <m:dPr>
+                          <m:ctrlPr>
+                            <a:rPr lang="en-US" b="0" i="1" smtClean="0">
+                              <a:latin typeface="Cambria Math" panose="02040503050406030204" pitchFamily="18" charset="0"/>
+                            </a:rPr>
+                          </m:ctrlPr>
+                        </m:dPr>
+                        <m:e>
+                          <m:r>
+                            <a:rPr lang="en-US" b="0" i="1" smtClean="0">
+                              <a:latin typeface="Cambria Math" panose="02040503050406030204" pitchFamily="18" charset="0"/>
+                            </a:rPr>
+                            <m:t>𝑌</m:t>
+                          </m:r>
+                        </m:e>
+                      </m:d>
+                      <m:r>
+                        <a:rPr lang="en-US" b="0" i="1" smtClean="0">
+                          <a:latin typeface="Cambria Math" panose="02040503050406030204" pitchFamily="18" charset="0"/>
+                        </a:rPr>
+                        <m:t>=</m:t>
+                      </m:r>
+                      <m:r>
+                        <a:rPr lang="en-US" b="0" i="1" smtClean="0">
+                          <a:latin typeface="Cambria Math" panose="02040503050406030204" pitchFamily="18" charset="0"/>
+                        </a:rPr>
+                        <m:t>𝑏</m:t>
+                      </m:r>
+                      <m:r>
+                        <a:rPr lang="en-US" b="0" i="1" smtClean="0">
+                          <a:latin typeface="Cambria Math" panose="02040503050406030204" pitchFamily="18" charset="0"/>
+                        </a:rPr>
+                        <m:t>"</m:t>
+                      </m:r>
+                      <m:d>
+                        <m:dPr>
+                          <m:ctrlPr>
+                            <a:rPr lang="en-US" b="0" i="1" smtClean="0">
+                              <a:latin typeface="Cambria Math" panose="02040503050406030204" pitchFamily="18" charset="0"/>
+                            </a:rPr>
+                          </m:ctrlPr>
+                        </m:dPr>
+                        <m:e>
+                          <m:r>
+                            <a:rPr lang="en-US" b="0" i="1" smtClean="0">
+                              <a:latin typeface="Cambria Math" panose="02040503050406030204" pitchFamily="18" charset="0"/>
+                              <a:ea typeface="Cambria Math" panose="02040503050406030204" pitchFamily="18" charset="0"/>
+                            </a:rPr>
+                            <m:t>𝜃</m:t>
+                          </m:r>
+                        </m:e>
+                      </m:d>
+                      <m:r>
+                        <a:rPr lang="en-US" b="0" i="1" smtClean="0">
+                          <a:latin typeface="Cambria Math" panose="02040503050406030204" pitchFamily="18" charset="0"/>
+                        </a:rPr>
+                        <m:t>𝑎</m:t>
+                      </m:r>
+                      <m:d>
+                        <m:dPr>
+                          <m:ctrlPr>
+                            <a:rPr lang="en-US" b="0" i="1" smtClean="0">
+                              <a:latin typeface="Cambria Math" panose="02040503050406030204" pitchFamily="18" charset="0"/>
+                            </a:rPr>
+                          </m:ctrlPr>
+                        </m:dPr>
+                        <m:e>
+                          <m:r>
+                            <a:rPr lang="en-US" b="0" i="1" smtClean="0">
+                              <a:latin typeface="Cambria Math" panose="02040503050406030204" pitchFamily="18" charset="0"/>
+                              <a:ea typeface="Cambria Math" panose="02040503050406030204" pitchFamily="18" charset="0"/>
+                            </a:rPr>
+                            <m:t>𝜑</m:t>
+                          </m:r>
+                        </m:e>
+                      </m:d>
+                    </m:oMath>
+                  </m:oMathPara>
+                </a14:m>
+                <a:endParaRPr lang="en-US" dirty="0" smtClean="0"/>
+              </a:p>
+              <a:p>
+                <a:pPr marL="0" indent="0">
+                  <a:buNone/>
+                </a:pPr>
+                <a14:m>
+                  <m:oMath xmlns:m="http://schemas.openxmlformats.org/officeDocument/2006/math">
+                    <m:r>
+                      <a:rPr lang="en-US" i="1">
+                        <a:latin typeface="Cambria Math" panose="02040503050406030204" pitchFamily="18" charset="0"/>
+                        <a:ea typeface="Cambria Math" panose="02040503050406030204" pitchFamily="18" charset="0"/>
+                      </a:rPr>
+                      <m:t>𝜃</m:t>
+                    </m:r>
+                  </m:oMath>
+                </a14:m>
+                <a:r>
+                  <a:rPr lang="en-US" dirty="0" smtClean="0"/>
+                  <a:t>: Canonical parameter</a:t>
+                </a:r>
+              </a:p>
+              <a:p>
+                <a:pPr marL="2111375" indent="-2111375">
+                  <a:buNone/>
+                </a:pPr>
+                <a14:m>
+                  <m:oMath xmlns:m="http://schemas.openxmlformats.org/officeDocument/2006/math">
+                    <m:r>
+                      <a:rPr lang="en-US" i="1">
+                        <a:latin typeface="Cambria Math" panose="02040503050406030204" pitchFamily="18" charset="0"/>
+                      </a:rPr>
+                      <m:t>𝑎</m:t>
+                    </m:r>
+                    <m:d>
+                      <m:dPr>
+                        <m:ctrlPr>
+                          <a:rPr lang="en-US" i="1">
+                            <a:latin typeface="Cambria Math" panose="02040503050406030204" pitchFamily="18" charset="0"/>
+                          </a:rPr>
+                        </m:ctrlPr>
+                      </m:dPr>
+                      <m:e>
+                        <m:r>
+                          <a:rPr lang="en-US" i="1">
+                            <a:latin typeface="Cambria Math" panose="02040503050406030204" pitchFamily="18" charset="0"/>
+                            <a:ea typeface="Cambria Math" panose="02040503050406030204" pitchFamily="18" charset="0"/>
+                          </a:rPr>
+                          <m:t>𝜑</m:t>
+                        </m:r>
+                      </m:e>
+                    </m:d>
+                  </m:oMath>
+                </a14:m>
+                <a:r>
+                  <a:rPr lang="en-US" dirty="0" smtClean="0"/>
+                  <a:t>, </a:t>
+                </a:r>
+                <a14:m>
+                  <m:oMath xmlns:m="http://schemas.openxmlformats.org/officeDocument/2006/math">
+                    <m:r>
+                      <a:rPr lang="en-US" i="1">
+                        <a:latin typeface="Cambria Math" panose="02040503050406030204" pitchFamily="18" charset="0"/>
+                      </a:rPr>
+                      <m:t>𝑎</m:t>
+                    </m:r>
+                    <m:d>
+                      <m:dPr>
+                        <m:ctrlPr>
+                          <a:rPr lang="en-US" i="1">
+                            <a:latin typeface="Cambria Math" panose="02040503050406030204" pitchFamily="18" charset="0"/>
+                          </a:rPr>
+                        </m:ctrlPr>
+                      </m:dPr>
+                      <m:e>
+                        <m:r>
+                          <a:rPr lang="en-US" i="1" smtClean="0">
+                            <a:latin typeface="Cambria Math" panose="02040503050406030204" pitchFamily="18" charset="0"/>
+                            <a:ea typeface="Cambria Math" panose="02040503050406030204" pitchFamily="18" charset="0"/>
+                          </a:rPr>
+                          <m:t>∙</m:t>
+                        </m:r>
+                      </m:e>
+                    </m:d>
+                  </m:oMath>
+                </a14:m>
+                <a:r>
+                  <a:rPr lang="en-US" dirty="0" smtClean="0"/>
+                  <a:t>, </a:t>
+                </a:r>
+                <a14:m>
+                  <m:oMath xmlns:m="http://schemas.openxmlformats.org/officeDocument/2006/math">
+                    <m:r>
+                      <a:rPr lang="en-US" i="1">
+                        <a:latin typeface="Cambria Math" panose="02040503050406030204" pitchFamily="18" charset="0"/>
+                        <a:ea typeface="Cambria Math" panose="02040503050406030204" pitchFamily="18" charset="0"/>
+                      </a:rPr>
+                      <m:t>𝜑</m:t>
+                    </m:r>
+                  </m:oMath>
+                </a14:m>
+                <a:r>
+                  <a:rPr lang="en-US" dirty="0" smtClean="0"/>
+                  <a:t>: Nomenclature is not consistent in </a:t>
+                </a:r>
+                <a:r>
+                  <a:rPr lang="en-US" dirty="0"/>
+                  <a:t>the literature. </a:t>
+                </a:r>
+                <a:r>
+                  <a:rPr lang="en-US" dirty="0" smtClean="0"/>
+                  <a:t>Associated terms include scale factor, scale parameter, dispersion parameter. </a:t>
+                </a:r>
+                <a:r>
+                  <a:rPr lang="en-US" sz="1600" dirty="0" smtClean="0"/>
+                  <a:t>(See “r </a:t>
+                </a:r>
+                <a:r>
+                  <a:rPr lang="en-US" sz="1600" dirty="0"/>
+                  <a:t>- In GLMs are the Scale and Dispersion parameters the same_ - Cross </a:t>
+                </a:r>
+                <a:r>
+                  <a:rPr lang="en-US" sz="1600" dirty="0" smtClean="0"/>
+                  <a:t>Validated.pdf”)</a:t>
+                </a:r>
+                <a:endParaRPr lang="en-US" sz="1600" dirty="0"/>
+              </a:p>
+            </p:txBody>
+          </p:sp>
+        </mc:Choice>
+        <mc:Fallback>
+          <p:sp>
+            <p:nvSpPr>
+              <p:cNvPr id="3" name="Content Placeholder 2"/>
+              <p:cNvSpPr>
+                <a:spLocks noGrp="1" noRot="1" noChangeAspect="1" noMove="1" noResize="1" noEditPoints="1" noAdjustHandles="1" noChangeArrowheads="1" noChangeShapeType="1" noTextEdit="1"/>
+              </p:cNvSpPr>
+              <p:nvPr>
+                <p:ph idx="1"/>
+              </p:nvPr>
+            </p:nvSpPr>
+            <p:spPr>
+              <a:blipFill>
+                <a:blip r:embed="rId2"/>
+                <a:stretch>
+                  <a:fillRect l="-1217" t="-3081" b="-1401"/>
+                </a:stretch>
+              </a:blipFill>
+            </p:spPr>
+            <p:txBody>
+              <a:bodyPr/>
+              <a:lstStyle/>
+              <a:p>
+                <a:r>
+                  <a:rPr lang="en-US">
+                    <a:noFill/>
+                  </a:rPr>
+                  <a:t> </a:t>
+                </a:r>
+              </a:p>
+            </p:txBody>
+          </p:sp>
+        </mc:Fallback>
+      </mc:AlternateContent>
+    </p:spTree>
+    <p:extLst>
+      <p:ext uri="{BB962C8B-B14F-4D97-AF65-F5344CB8AC3E}">
+        <p14:creationId xmlns:p14="http://schemas.microsoft.com/office/powerpoint/2010/main" val="2651190104"/>
+      </p:ext>
+    </p:extLst>
+  </p:cSld>
+  <p:clrMapOvr>
+    <a:masterClrMapping/>
+  </p:clrMapOvr>
+</p:sld>
+</file>
+
+<file path=ppt/slides/slide13.xml><?xml version="1.0" encoding="utf-8"?>
+<p:sld xmlns:a="http://schemas.openxmlformats.org/drawingml/2006/main" xmlns:r="http://schemas.openxmlformats.org/officeDocument/2006/relationships" xmlns:p="http://schemas.openxmlformats.org/presentationml/2006/main">
+  <p:cSld>
+    <p:spTree>
+      <p:nvGrpSpPr>
+        <p:cNvPr id="1" name=""/>
+        <p:cNvGrpSpPr/>
+        <p:nvPr/>
+      </p:nvGrpSpPr>
+      <p:grpSpPr>
+        <a:xfrm>
+          <a:off x="0" y="0"/>
+          <a:ext cx="0" cy="0"/>
+          <a:chOff x="0" y="0"/>
+          <a:chExt cx="0" cy="0"/>
+        </a:xfrm>
+      </p:grpSpPr>
+      <p:sp>
+        <p:nvSpPr>
+          <p:cNvPr id="2" name="Title 1"/>
+          <p:cNvSpPr>
+            <a:spLocks noGrp="1"/>
+          </p:cNvSpPr>
+          <p:nvPr>
+            <p:ph type="title"/>
+          </p:nvPr>
+        </p:nvSpPr>
+        <p:spPr/>
+        <p:txBody>
+          <a:bodyPr/>
+          <a:lstStyle/>
+          <a:p>
             <a:r>
               <a:rPr lang="en-US" dirty="0" smtClean="0"/>
-              <a:t>Mixed Model (</a:t>
-            </a:r>
+              <a:t>3 Key Components of a GLM</a:t>
+            </a:r>
+            <a:endParaRPr lang="en-US" dirty="0"/>
+          </a:p>
+        </p:txBody>
+      </p:sp>
+      <p:sp>
+        <p:nvSpPr>
+          <p:cNvPr id="3" name="Content Placeholder 2"/>
+          <p:cNvSpPr>
+            <a:spLocks noGrp="1"/>
+          </p:cNvSpPr>
+          <p:nvPr>
+            <p:ph idx="1"/>
+          </p:nvPr>
+        </p:nvSpPr>
+        <p:spPr/>
+        <p:txBody>
+          <a:bodyPr>
+            <a:normAutofit/>
+          </a:bodyPr>
+          <a:lstStyle/>
+          <a:p>
+            <a:pPr marL="228600" lvl="2"/>
+            <a:r>
+              <a:rPr lang="en-US" b="1" dirty="0" smtClean="0"/>
+              <a:t>Random </a:t>
+            </a:r>
+            <a:r>
+              <a:rPr lang="en-US" b="1" dirty="0"/>
+              <a:t>Component</a:t>
+            </a:r>
+            <a:endParaRPr lang="en-US" dirty="0"/>
+          </a:p>
+          <a:p>
+            <a:pPr marL="685800" lvl="4"/>
             <a:r>
               <a:rPr lang="en-US" dirty="0" smtClean="0"/>
-              <a:t>LMM) </a:t>
+              <a:t>Other names: sampling distribution, error distribution</a:t>
+            </a:r>
+            <a:endParaRPr lang="en-US" dirty="0"/>
+          </a:p>
+          <a:p>
+            <a:pPr marL="685800" lvl="4"/>
+            <a:r>
+              <a:rPr lang="en-US" dirty="0"/>
+              <a:t>Relationship to likelihood function </a:t>
+            </a:r>
+            <a:r>
+              <a:rPr lang="en-US" dirty="0">
+                <a:solidFill>
+                  <a:schemeClr val="accent4">
+                    <a:lumMod val="75000"/>
+                  </a:schemeClr>
+                </a:solidFill>
+              </a:rPr>
+              <a:t>(QERM L11; M&amp;N p. 28)</a:t>
+            </a:r>
+          </a:p>
+          <a:p>
+            <a:pPr marL="228600" lvl="2"/>
+            <a:r>
+              <a:rPr lang="en-US" b="1" dirty="0"/>
+              <a:t>Systematic Component</a:t>
+            </a:r>
+            <a:endParaRPr lang="en-US" dirty="0"/>
+          </a:p>
+          <a:p>
+            <a:pPr marL="685800" lvl="4"/>
+            <a:r>
+              <a:rPr lang="en-US" dirty="0" smtClean="0"/>
+              <a:t>Also called the </a:t>
+            </a:r>
+            <a:r>
+              <a:rPr lang="en-US" dirty="0"/>
+              <a:t>linear model</a:t>
+            </a:r>
+          </a:p>
+          <a:p>
+            <a:pPr marL="228600" lvl="2"/>
+            <a:r>
+              <a:rPr lang="en-US" b="1" dirty="0"/>
+              <a:t>Link function</a:t>
+            </a:r>
+            <a:endParaRPr lang="en-US" dirty="0"/>
+          </a:p>
+          <a:p>
+            <a:pPr marL="685800" lvl="4"/>
+            <a:r>
+              <a:rPr lang="en-US" dirty="0"/>
+              <a:t>Mathematical notation</a:t>
+            </a:r>
+          </a:p>
+          <a:p>
+            <a:pPr marL="685800" lvl="4"/>
+            <a:r>
+              <a:rPr lang="en-US" dirty="0"/>
+              <a:t>Purpose (in English)</a:t>
+            </a:r>
+          </a:p>
+          <a:p>
+            <a:pPr marL="1143000" lvl="6"/>
+            <a:r>
+              <a:rPr lang="en-US" dirty="0"/>
+              <a:t>Relates the expected value of the response variable (E(</a:t>
+            </a:r>
+            <a:r>
+              <a:rPr lang="en-US" dirty="0" err="1"/>
+              <a:t>y_i</a:t>
+            </a:r>
+            <a:r>
+              <a:rPr lang="en-US" dirty="0"/>
+              <a:t>)) to the data</a:t>
+            </a:r>
+          </a:p>
+          <a:p>
+            <a:pPr marL="1143000" lvl="6"/>
+            <a:r>
+              <a:rPr lang="en-US" dirty="0"/>
+              <a:t>Note that the purpose of the link function is to tame the response variable to restrict it to the correct scale when it is a function of X*beta</a:t>
+            </a:r>
+          </a:p>
+          <a:p>
+            <a:pPr marL="685800" lvl="4"/>
+            <a:r>
+              <a:rPr lang="en-US" dirty="0"/>
+              <a:t>Canonical link </a:t>
+            </a:r>
+            <a:r>
+              <a:rPr lang="en-US" dirty="0" smtClean="0"/>
+              <a:t>function</a:t>
+            </a:r>
+            <a:endParaRPr lang="en-US" dirty="0"/>
+          </a:p>
+        </p:txBody>
+      </p:sp>
+    </p:spTree>
+    <p:extLst>
+      <p:ext uri="{BB962C8B-B14F-4D97-AF65-F5344CB8AC3E}">
+        <p14:creationId xmlns:p14="http://schemas.microsoft.com/office/powerpoint/2010/main" val="3656133834"/>
+      </p:ext>
+    </p:extLst>
+  </p:cSld>
+  <p:clrMapOvr>
+    <a:masterClrMapping/>
+  </p:clrMapOvr>
+</p:sld>
+</file>
+
+<file path=ppt/slides/slide14.xml><?xml version="1.0" encoding="utf-8"?>
+<p:sld xmlns:a="http://schemas.openxmlformats.org/drawingml/2006/main" xmlns:r="http://schemas.openxmlformats.org/officeDocument/2006/relationships" xmlns:p="http://schemas.openxmlformats.org/presentationml/2006/main">
+  <p:cSld>
+    <p:spTree>
+      <p:nvGrpSpPr>
+        <p:cNvPr id="1" name=""/>
+        <p:cNvGrpSpPr/>
+        <p:nvPr/>
+      </p:nvGrpSpPr>
+      <p:grpSpPr>
+        <a:xfrm>
+          <a:off x="0" y="0"/>
+          <a:ext cx="0" cy="0"/>
+          <a:chOff x="0" y="0"/>
+          <a:chExt cx="0" cy="0"/>
+        </a:xfrm>
+      </p:grpSpPr>
+      <p:sp>
+        <p:nvSpPr>
+          <p:cNvPr id="2" name="Title 1"/>
+          <p:cNvSpPr>
+            <a:spLocks noGrp="1"/>
+          </p:cNvSpPr>
+          <p:nvPr>
+            <p:ph type="title"/>
+          </p:nvPr>
+        </p:nvSpPr>
+        <p:spPr/>
+        <p:txBody>
+          <a:bodyPr/>
+          <a:lstStyle/>
+          <a:p>
+            <a:r>
+              <a:rPr lang="en-US" dirty="0" smtClean="0"/>
+              <a:t>Intro to the Linear Mixed Model (LMM) </a:t>
             </a:r>
             <a:endParaRPr lang="en-US" dirty="0"/>
           </a:p>
@@ -3962,411 +4864,6 @@
 </p:sld>
 </file>
 
-<file path=ppt/slides/slide13.xml><?xml version="1.0" encoding="utf-8"?>
-<p:sld xmlns:a="http://schemas.openxmlformats.org/drawingml/2006/main" xmlns:r="http://schemas.openxmlformats.org/officeDocument/2006/relationships" xmlns:p="http://schemas.openxmlformats.org/presentationml/2006/main">
-  <p:cSld>
-    <p:spTree>
-      <p:nvGrpSpPr>
-        <p:cNvPr id="1" name=""/>
-        <p:cNvGrpSpPr/>
-        <p:nvPr/>
-      </p:nvGrpSpPr>
-      <p:grpSpPr>
-        <a:xfrm>
-          <a:off x="0" y="0"/>
-          <a:ext cx="0" cy="0"/>
-          <a:chOff x="0" y="0"/>
-          <a:chExt cx="0" cy="0"/>
-        </a:xfrm>
-      </p:grpSpPr>
-      <p:sp>
-        <p:nvSpPr>
-          <p:cNvPr id="2" name="Title 1"/>
-          <p:cNvSpPr>
-            <a:spLocks noGrp="1"/>
-          </p:cNvSpPr>
-          <p:nvPr>
-            <p:ph type="title"/>
-          </p:nvPr>
-        </p:nvSpPr>
-        <p:spPr/>
-        <p:txBody>
-          <a:bodyPr/>
-          <a:lstStyle/>
-          <a:p>
-            <a:r>
-              <a:rPr lang="en-US" dirty="0" smtClean="0"/>
-              <a:t>Fixed vs. Random Effects</a:t>
-            </a:r>
-            <a:endParaRPr lang="en-US" dirty="0"/>
-          </a:p>
-        </p:txBody>
-      </p:sp>
-      <p:sp>
-        <p:nvSpPr>
-          <p:cNvPr id="3" name="Content Placeholder 2"/>
-          <p:cNvSpPr>
-            <a:spLocks noGrp="1"/>
-          </p:cNvSpPr>
-          <p:nvPr>
-            <p:ph type="body" idx="1"/>
-          </p:nvPr>
-        </p:nvSpPr>
-        <p:spPr/>
-        <p:txBody>
-          <a:bodyPr/>
-          <a:lstStyle/>
-          <a:p>
-            <a:r>
-              <a:rPr lang="en-US" dirty="0" smtClean="0"/>
-              <a:t>Fixed Effects</a:t>
-            </a:r>
-          </a:p>
-        </p:txBody>
-      </p:sp>
-      <p:sp>
-        <p:nvSpPr>
-          <p:cNvPr id="4" name="Content Placeholder 3"/>
-          <p:cNvSpPr>
-            <a:spLocks noGrp="1"/>
-          </p:cNvSpPr>
-          <p:nvPr>
-            <p:ph sz="half" idx="2"/>
-          </p:nvPr>
-        </p:nvSpPr>
-        <p:spPr/>
-        <p:txBody>
-          <a:bodyPr/>
-          <a:lstStyle/>
-          <a:p>
-            <a:r>
-              <a:rPr lang="en-US" dirty="0" smtClean="0"/>
-              <a:t>Interest in specific levels of </a:t>
-            </a:r>
-            <a:r>
-              <a:rPr lang="en-US" i="1" dirty="0" smtClean="0"/>
-              <a:t>these</a:t>
-            </a:r>
-            <a:r>
-              <a:rPr lang="en-US" dirty="0" smtClean="0"/>
-              <a:t> factors</a:t>
-            </a:r>
-          </a:p>
-          <a:p>
-            <a:r>
-              <a:rPr lang="en-US" dirty="0" smtClean="0"/>
-              <a:t>Not interpreted as coming from a larger population</a:t>
-            </a:r>
-            <a:endParaRPr lang="en-US" dirty="0"/>
-          </a:p>
-        </p:txBody>
-      </p:sp>
-      <p:sp>
-        <p:nvSpPr>
-          <p:cNvPr id="5" name="Text Placeholder 4"/>
-          <p:cNvSpPr>
-            <a:spLocks noGrp="1"/>
-          </p:cNvSpPr>
-          <p:nvPr>
-            <p:ph type="body" sz="quarter" idx="3"/>
-          </p:nvPr>
-        </p:nvSpPr>
-        <p:spPr/>
-        <p:txBody>
-          <a:bodyPr/>
-          <a:lstStyle/>
-          <a:p>
-            <a:r>
-              <a:rPr lang="en-US" dirty="0" smtClean="0"/>
-              <a:t>Random Effects</a:t>
-            </a:r>
-            <a:endParaRPr lang="en-US" dirty="0"/>
-          </a:p>
-        </p:txBody>
-      </p:sp>
-      <p:sp>
-        <p:nvSpPr>
-          <p:cNvPr id="6" name="Content Placeholder 5"/>
-          <p:cNvSpPr>
-            <a:spLocks noGrp="1"/>
-          </p:cNvSpPr>
-          <p:nvPr>
-            <p:ph sz="quarter" idx="4"/>
-          </p:nvPr>
-        </p:nvSpPr>
-        <p:spPr/>
-        <p:txBody>
-          <a:bodyPr>
-            <a:normAutofit fontScale="92500" lnSpcReduction="20000"/>
-          </a:bodyPr>
-          <a:lstStyle/>
-          <a:p>
-            <a:r>
-              <a:rPr lang="en-US" dirty="0" smtClean="0"/>
-              <a:t>Factor levels sampled from a distribution</a:t>
-            </a:r>
-          </a:p>
-          <a:p>
-            <a:r>
-              <a:rPr lang="en-US" dirty="0" smtClean="0"/>
-              <a:t>Recognition of correlation structure in data because data are:</a:t>
-            </a:r>
-          </a:p>
-          <a:p>
-            <a:pPr lvl="1"/>
-            <a:r>
-              <a:rPr lang="en-US" dirty="0" smtClean="0"/>
-              <a:t>Nested</a:t>
-            </a:r>
-          </a:p>
-          <a:p>
-            <a:pPr lvl="2"/>
-            <a:r>
-              <a:rPr lang="en-US" dirty="0" smtClean="0"/>
-              <a:t>Fish within schools, multiple schools measured</a:t>
-            </a:r>
-          </a:p>
-          <a:p>
-            <a:pPr lvl="1"/>
-            <a:r>
-              <a:rPr lang="en-US" dirty="0" smtClean="0"/>
-              <a:t>Longitudinal</a:t>
-            </a:r>
-          </a:p>
-          <a:p>
-            <a:pPr lvl="2"/>
-            <a:r>
-              <a:rPr lang="en-US" dirty="0" smtClean="0"/>
-              <a:t>Repeated observations on individual objects through time</a:t>
-            </a:r>
-          </a:p>
-          <a:p>
-            <a:pPr lvl="1"/>
-            <a:r>
-              <a:rPr lang="en-US" dirty="0" smtClean="0"/>
-              <a:t>Spatial</a:t>
-            </a:r>
-          </a:p>
-          <a:p>
-            <a:pPr lvl="2"/>
-            <a:r>
-              <a:rPr lang="en-US" dirty="0" smtClean="0"/>
-              <a:t>Locations closer in space are more similar than distant locations</a:t>
-            </a:r>
-            <a:endParaRPr lang="en-US" dirty="0"/>
-          </a:p>
-        </p:txBody>
-      </p:sp>
-    </p:spTree>
-    <p:extLst>
-      <p:ext uri="{BB962C8B-B14F-4D97-AF65-F5344CB8AC3E}">
-        <p14:creationId xmlns:p14="http://schemas.microsoft.com/office/powerpoint/2010/main" val="336623527"/>
-      </p:ext>
-    </p:extLst>
-  </p:cSld>
-  <p:clrMapOvr>
-    <a:masterClrMapping/>
-  </p:clrMapOvr>
-</p:sld>
-</file>
-
-<file path=ppt/slides/slide14.xml><?xml version="1.0" encoding="utf-8"?>
-<p:sld xmlns:a="http://schemas.openxmlformats.org/drawingml/2006/main" xmlns:r="http://schemas.openxmlformats.org/officeDocument/2006/relationships" xmlns:p="http://schemas.openxmlformats.org/presentationml/2006/main">
-  <p:cSld>
-    <p:spTree>
-      <p:nvGrpSpPr>
-        <p:cNvPr id="1" name=""/>
-        <p:cNvGrpSpPr/>
-        <p:nvPr/>
-      </p:nvGrpSpPr>
-      <p:grpSpPr>
-        <a:xfrm>
-          <a:off x="0" y="0"/>
-          <a:ext cx="0" cy="0"/>
-          <a:chOff x="0" y="0"/>
-          <a:chExt cx="0" cy="0"/>
-        </a:xfrm>
-      </p:grpSpPr>
-      <p:sp>
-        <p:nvSpPr>
-          <p:cNvPr id="2" name="Title 1"/>
-          <p:cNvSpPr>
-            <a:spLocks noGrp="1"/>
-          </p:cNvSpPr>
-          <p:nvPr>
-            <p:ph type="title"/>
-          </p:nvPr>
-        </p:nvSpPr>
-        <p:spPr/>
-        <p:txBody>
-          <a:bodyPr/>
-          <a:lstStyle/>
-          <a:p>
-            <a:r>
-              <a:rPr lang="en-US" dirty="0" smtClean="0"/>
-              <a:t>Random Effects Structures</a:t>
-            </a:r>
-            <a:endParaRPr lang="en-US" dirty="0"/>
-          </a:p>
-        </p:txBody>
-      </p:sp>
-      <p:sp>
-        <p:nvSpPr>
-          <p:cNvPr id="7" name="Content Placeholder 6"/>
-          <p:cNvSpPr>
-            <a:spLocks noGrp="1"/>
-          </p:cNvSpPr>
-          <p:nvPr>
-            <p:ph idx="1"/>
-          </p:nvPr>
-        </p:nvSpPr>
-        <p:spPr>
-          <a:xfrm>
-            <a:off x="3450625" y="1562009"/>
-            <a:ext cx="5290751" cy="3117078"/>
-          </a:xfrm>
-        </p:spPr>
-        <p:txBody>
-          <a:bodyPr/>
-          <a:lstStyle/>
-          <a:p>
-            <a:r>
-              <a:rPr lang="en-US" dirty="0" smtClean="0"/>
-              <a:t>Random intercepts</a:t>
-            </a:r>
-          </a:p>
-          <a:p>
-            <a:r>
-              <a:rPr lang="en-US" dirty="0" smtClean="0"/>
-              <a:t>Random slopes</a:t>
-            </a:r>
-          </a:p>
-          <a:p>
-            <a:r>
-              <a:rPr lang="en-US" dirty="0" smtClean="0"/>
-              <a:t>Random intercepts and slopes</a:t>
-            </a:r>
-          </a:p>
-          <a:p>
-            <a:r>
-              <a:rPr lang="en-US" dirty="0" smtClean="0"/>
-              <a:t>Nested effects</a:t>
-            </a:r>
-          </a:p>
-          <a:p>
-            <a:r>
-              <a:rPr lang="en-US" dirty="0" smtClean="0"/>
-              <a:t>Crossed effects</a:t>
-            </a:r>
-            <a:endParaRPr lang="en-US" dirty="0"/>
-          </a:p>
-        </p:txBody>
-      </p:sp>
-      <p:sp>
-        <p:nvSpPr>
-          <p:cNvPr id="8" name="Rectangle 7"/>
-          <p:cNvSpPr/>
-          <p:nvPr/>
-        </p:nvSpPr>
-        <p:spPr>
-          <a:xfrm>
-            <a:off x="1672796" y="4385268"/>
-            <a:ext cx="8846408" cy="2031325"/>
-          </a:xfrm>
-          <a:prstGeom prst="rect">
-            <a:avLst/>
-          </a:prstGeom>
-          <a:solidFill>
-            <a:srgbClr val="0070C0"/>
-          </a:solidFill>
-        </p:spPr>
-        <p:txBody>
-          <a:bodyPr wrap="square">
-            <a:spAutoFit/>
-          </a:bodyPr>
-          <a:lstStyle/>
-          <a:p>
-            <a:r>
-              <a:rPr lang="en-US" dirty="0">
-                <a:solidFill>
-                  <a:schemeClr val="bg1"/>
-                </a:solidFill>
-              </a:rPr>
-              <a:t>Harrison, X. A., Donaldson, L., Correa-Cano, M. E., Evans, J., Fisher, D. N., Goodwin, C. E. D., . . . </a:t>
-            </a:r>
-            <a:r>
-              <a:rPr lang="en-US" dirty="0" err="1">
-                <a:solidFill>
-                  <a:schemeClr val="bg1"/>
-                </a:solidFill>
-              </a:rPr>
-              <a:t>Inger</a:t>
-            </a:r>
-            <a:r>
-              <a:rPr lang="en-US" dirty="0">
-                <a:solidFill>
-                  <a:schemeClr val="bg1"/>
-                </a:solidFill>
-              </a:rPr>
-              <a:t>, R. (2018). A brief introduction to mixed effects modelling and multi-model inference in ecology. </a:t>
-            </a:r>
-            <a:r>
-              <a:rPr lang="en-US" dirty="0" err="1">
-                <a:solidFill>
-                  <a:schemeClr val="bg1"/>
-                </a:solidFill>
-              </a:rPr>
-              <a:t>PeerJ</a:t>
-            </a:r>
-            <a:r>
-              <a:rPr lang="en-US" dirty="0">
-                <a:solidFill>
-                  <a:schemeClr val="bg1"/>
-                </a:solidFill>
-              </a:rPr>
-              <a:t>, 6, e4794. doi:10.7717/peerj.4794</a:t>
-            </a:r>
-          </a:p>
-          <a:p>
-            <a:endParaRPr lang="en-US" dirty="0">
-              <a:solidFill>
-                <a:schemeClr val="bg1"/>
-              </a:solidFill>
-            </a:endParaRPr>
-          </a:p>
-          <a:p>
-            <a:r>
-              <a:rPr lang="en-US" dirty="0" err="1">
-                <a:solidFill>
-                  <a:schemeClr val="bg1"/>
-                </a:solidFill>
-              </a:rPr>
-              <a:t>Schielzeth</a:t>
-            </a:r>
-            <a:r>
-              <a:rPr lang="en-US" dirty="0">
-                <a:solidFill>
-                  <a:schemeClr val="bg1"/>
-                </a:solidFill>
-              </a:rPr>
-              <a:t>, H., &amp; Nakagawa, S. (2013). Nested by design: model fitting and interpretation in a mixed model era. Methods in Ecology and Evolution, 4(1), 14-24. doi:10.1111/j.2041-210x.2012.00251.x</a:t>
-            </a:r>
-          </a:p>
-        </p:txBody>
-      </p:sp>
-    </p:spTree>
-    <p:extLst>
-      <p:ext uri="{BB962C8B-B14F-4D97-AF65-F5344CB8AC3E}">
-        <p14:creationId xmlns:p14="http://schemas.microsoft.com/office/powerpoint/2010/main" val="676521109"/>
-      </p:ext>
-    </p:extLst>
-  </p:cSld>
-  <p:clrMapOvr>
-    <a:masterClrMapping/>
-  </p:clrMapOvr>
-</p:sld>
-</file>
-
 <file path=ppt/slides/slide15.xml><?xml version="1.0" encoding="utf-8"?>
 <p:sld xmlns:a="http://schemas.openxmlformats.org/drawingml/2006/main" xmlns:r="http://schemas.openxmlformats.org/officeDocument/2006/relationships" xmlns:p="http://schemas.openxmlformats.org/presentationml/2006/main">
   <p:cSld>
@@ -4386,6 +4883,411 @@
       </p:grpSpPr>
       <p:sp>
         <p:nvSpPr>
+          <p:cNvPr id="2" name="Title 1"/>
+          <p:cNvSpPr>
+            <a:spLocks noGrp="1"/>
+          </p:cNvSpPr>
+          <p:nvPr>
+            <p:ph type="title"/>
+          </p:nvPr>
+        </p:nvSpPr>
+        <p:spPr/>
+        <p:txBody>
+          <a:bodyPr/>
+          <a:lstStyle/>
+          <a:p>
+            <a:r>
+              <a:rPr lang="en-US" dirty="0" smtClean="0"/>
+              <a:t>Fixed vs. Random Effects</a:t>
+            </a:r>
+            <a:endParaRPr lang="en-US" dirty="0"/>
+          </a:p>
+        </p:txBody>
+      </p:sp>
+      <p:sp>
+        <p:nvSpPr>
+          <p:cNvPr id="3" name="Content Placeholder 2"/>
+          <p:cNvSpPr>
+            <a:spLocks noGrp="1"/>
+          </p:cNvSpPr>
+          <p:nvPr>
+            <p:ph type="body" idx="1"/>
+          </p:nvPr>
+        </p:nvSpPr>
+        <p:spPr/>
+        <p:txBody>
+          <a:bodyPr/>
+          <a:lstStyle/>
+          <a:p>
+            <a:r>
+              <a:rPr lang="en-US" dirty="0" smtClean="0"/>
+              <a:t>Fixed Effects</a:t>
+            </a:r>
+          </a:p>
+        </p:txBody>
+      </p:sp>
+      <p:sp>
+        <p:nvSpPr>
+          <p:cNvPr id="4" name="Content Placeholder 3"/>
+          <p:cNvSpPr>
+            <a:spLocks noGrp="1"/>
+          </p:cNvSpPr>
+          <p:nvPr>
+            <p:ph sz="half" idx="2"/>
+          </p:nvPr>
+        </p:nvSpPr>
+        <p:spPr/>
+        <p:txBody>
+          <a:bodyPr/>
+          <a:lstStyle/>
+          <a:p>
+            <a:r>
+              <a:rPr lang="en-US" dirty="0" smtClean="0"/>
+              <a:t>Interest in specific levels of </a:t>
+            </a:r>
+            <a:r>
+              <a:rPr lang="en-US" i="1" dirty="0" smtClean="0"/>
+              <a:t>these</a:t>
+            </a:r>
+            <a:r>
+              <a:rPr lang="en-US" dirty="0" smtClean="0"/>
+              <a:t> factors</a:t>
+            </a:r>
+          </a:p>
+          <a:p>
+            <a:r>
+              <a:rPr lang="en-US" dirty="0" smtClean="0"/>
+              <a:t>Not interpreted as coming from a larger population</a:t>
+            </a:r>
+            <a:endParaRPr lang="en-US" dirty="0"/>
+          </a:p>
+        </p:txBody>
+      </p:sp>
+      <p:sp>
+        <p:nvSpPr>
+          <p:cNvPr id="5" name="Text Placeholder 4"/>
+          <p:cNvSpPr>
+            <a:spLocks noGrp="1"/>
+          </p:cNvSpPr>
+          <p:nvPr>
+            <p:ph type="body" sz="quarter" idx="3"/>
+          </p:nvPr>
+        </p:nvSpPr>
+        <p:spPr/>
+        <p:txBody>
+          <a:bodyPr/>
+          <a:lstStyle/>
+          <a:p>
+            <a:r>
+              <a:rPr lang="en-US" dirty="0" smtClean="0"/>
+              <a:t>Random Effects</a:t>
+            </a:r>
+            <a:endParaRPr lang="en-US" dirty="0"/>
+          </a:p>
+        </p:txBody>
+      </p:sp>
+      <p:sp>
+        <p:nvSpPr>
+          <p:cNvPr id="6" name="Content Placeholder 5"/>
+          <p:cNvSpPr>
+            <a:spLocks noGrp="1"/>
+          </p:cNvSpPr>
+          <p:nvPr>
+            <p:ph sz="quarter" idx="4"/>
+          </p:nvPr>
+        </p:nvSpPr>
+        <p:spPr/>
+        <p:txBody>
+          <a:bodyPr>
+            <a:normAutofit fontScale="92500" lnSpcReduction="20000"/>
+          </a:bodyPr>
+          <a:lstStyle/>
+          <a:p>
+            <a:r>
+              <a:rPr lang="en-US" dirty="0" smtClean="0"/>
+              <a:t>Factor levels sampled from a distribution</a:t>
+            </a:r>
+          </a:p>
+          <a:p>
+            <a:r>
+              <a:rPr lang="en-US" dirty="0" smtClean="0"/>
+              <a:t>Recognition of correlation structure in data because data are:</a:t>
+            </a:r>
+          </a:p>
+          <a:p>
+            <a:pPr lvl="1"/>
+            <a:r>
+              <a:rPr lang="en-US" dirty="0" smtClean="0"/>
+              <a:t>Nested</a:t>
+            </a:r>
+          </a:p>
+          <a:p>
+            <a:pPr lvl="2"/>
+            <a:r>
+              <a:rPr lang="en-US" dirty="0" smtClean="0"/>
+              <a:t>Fish within schools, multiple schools measured</a:t>
+            </a:r>
+          </a:p>
+          <a:p>
+            <a:pPr lvl="1"/>
+            <a:r>
+              <a:rPr lang="en-US" dirty="0" smtClean="0"/>
+              <a:t>Longitudinal</a:t>
+            </a:r>
+          </a:p>
+          <a:p>
+            <a:pPr lvl="2"/>
+            <a:r>
+              <a:rPr lang="en-US" dirty="0" smtClean="0"/>
+              <a:t>Repeated observations on individual objects through time</a:t>
+            </a:r>
+          </a:p>
+          <a:p>
+            <a:pPr lvl="1"/>
+            <a:r>
+              <a:rPr lang="en-US" dirty="0" smtClean="0"/>
+              <a:t>Spatial</a:t>
+            </a:r>
+          </a:p>
+          <a:p>
+            <a:pPr lvl="2"/>
+            <a:r>
+              <a:rPr lang="en-US" dirty="0" smtClean="0"/>
+              <a:t>Locations closer in space are more similar than distant locations</a:t>
+            </a:r>
+            <a:endParaRPr lang="en-US" dirty="0"/>
+          </a:p>
+        </p:txBody>
+      </p:sp>
+    </p:spTree>
+    <p:extLst>
+      <p:ext uri="{BB962C8B-B14F-4D97-AF65-F5344CB8AC3E}">
+        <p14:creationId xmlns:p14="http://schemas.microsoft.com/office/powerpoint/2010/main" val="336623527"/>
+      </p:ext>
+    </p:extLst>
+  </p:cSld>
+  <p:clrMapOvr>
+    <a:masterClrMapping/>
+  </p:clrMapOvr>
+</p:sld>
+</file>
+
+<file path=ppt/slides/slide16.xml><?xml version="1.0" encoding="utf-8"?>
+<p:sld xmlns:a="http://schemas.openxmlformats.org/drawingml/2006/main" xmlns:r="http://schemas.openxmlformats.org/officeDocument/2006/relationships" xmlns:p="http://schemas.openxmlformats.org/presentationml/2006/main">
+  <p:cSld>
+    <p:spTree>
+      <p:nvGrpSpPr>
+        <p:cNvPr id="1" name=""/>
+        <p:cNvGrpSpPr/>
+        <p:nvPr/>
+      </p:nvGrpSpPr>
+      <p:grpSpPr>
+        <a:xfrm>
+          <a:off x="0" y="0"/>
+          <a:ext cx="0" cy="0"/>
+          <a:chOff x="0" y="0"/>
+          <a:chExt cx="0" cy="0"/>
+        </a:xfrm>
+      </p:grpSpPr>
+      <p:sp>
+        <p:nvSpPr>
+          <p:cNvPr id="2" name="Title 1"/>
+          <p:cNvSpPr>
+            <a:spLocks noGrp="1"/>
+          </p:cNvSpPr>
+          <p:nvPr>
+            <p:ph type="title"/>
+          </p:nvPr>
+        </p:nvSpPr>
+        <p:spPr/>
+        <p:txBody>
+          <a:bodyPr/>
+          <a:lstStyle/>
+          <a:p>
+            <a:r>
+              <a:rPr lang="en-US" dirty="0" smtClean="0"/>
+              <a:t>Random Effects Structures</a:t>
+            </a:r>
+            <a:endParaRPr lang="en-US" dirty="0"/>
+          </a:p>
+        </p:txBody>
+      </p:sp>
+      <p:sp>
+        <p:nvSpPr>
+          <p:cNvPr id="7" name="Content Placeholder 6"/>
+          <p:cNvSpPr>
+            <a:spLocks noGrp="1"/>
+          </p:cNvSpPr>
+          <p:nvPr>
+            <p:ph idx="1"/>
+          </p:nvPr>
+        </p:nvSpPr>
+        <p:spPr>
+          <a:xfrm>
+            <a:off x="3450625" y="1562009"/>
+            <a:ext cx="5290751" cy="3117078"/>
+          </a:xfrm>
+        </p:spPr>
+        <p:txBody>
+          <a:bodyPr/>
+          <a:lstStyle/>
+          <a:p>
+            <a:r>
+              <a:rPr lang="en-US" dirty="0" smtClean="0"/>
+              <a:t>Random intercepts</a:t>
+            </a:r>
+          </a:p>
+          <a:p>
+            <a:r>
+              <a:rPr lang="en-US" dirty="0" smtClean="0"/>
+              <a:t>Random slopes</a:t>
+            </a:r>
+          </a:p>
+          <a:p>
+            <a:r>
+              <a:rPr lang="en-US" dirty="0" smtClean="0"/>
+              <a:t>Random intercepts and slopes</a:t>
+            </a:r>
+          </a:p>
+          <a:p>
+            <a:r>
+              <a:rPr lang="en-US" dirty="0" smtClean="0"/>
+              <a:t>Nested effects</a:t>
+            </a:r>
+          </a:p>
+          <a:p>
+            <a:r>
+              <a:rPr lang="en-US" dirty="0" smtClean="0"/>
+              <a:t>Crossed effects</a:t>
+            </a:r>
+            <a:endParaRPr lang="en-US" dirty="0"/>
+          </a:p>
+        </p:txBody>
+      </p:sp>
+      <p:sp>
+        <p:nvSpPr>
+          <p:cNvPr id="8" name="Rectangle 7"/>
+          <p:cNvSpPr/>
+          <p:nvPr/>
+        </p:nvSpPr>
+        <p:spPr>
+          <a:xfrm>
+            <a:off x="1672796" y="4385268"/>
+            <a:ext cx="8846408" cy="2031325"/>
+          </a:xfrm>
+          <a:prstGeom prst="rect">
+            <a:avLst/>
+          </a:prstGeom>
+          <a:solidFill>
+            <a:srgbClr val="0070C0"/>
+          </a:solidFill>
+        </p:spPr>
+        <p:txBody>
+          <a:bodyPr wrap="square">
+            <a:spAutoFit/>
+          </a:bodyPr>
+          <a:lstStyle/>
+          <a:p>
+            <a:r>
+              <a:rPr lang="en-US" dirty="0">
+                <a:solidFill>
+                  <a:schemeClr val="bg1"/>
+                </a:solidFill>
+              </a:rPr>
+              <a:t>Harrison, X. A., Donaldson, L., Correa-Cano, M. E., Evans, J., Fisher, D. N., Goodwin, C. E. D., . . . </a:t>
+            </a:r>
+            <a:r>
+              <a:rPr lang="en-US" dirty="0" err="1">
+                <a:solidFill>
+                  <a:schemeClr val="bg1"/>
+                </a:solidFill>
+              </a:rPr>
+              <a:t>Inger</a:t>
+            </a:r>
+            <a:r>
+              <a:rPr lang="en-US" dirty="0">
+                <a:solidFill>
+                  <a:schemeClr val="bg1"/>
+                </a:solidFill>
+              </a:rPr>
+              <a:t>, R. (2018). A brief introduction to mixed effects modelling and multi-model inference in ecology. </a:t>
+            </a:r>
+            <a:r>
+              <a:rPr lang="en-US" dirty="0" err="1">
+                <a:solidFill>
+                  <a:schemeClr val="bg1"/>
+                </a:solidFill>
+              </a:rPr>
+              <a:t>PeerJ</a:t>
+            </a:r>
+            <a:r>
+              <a:rPr lang="en-US" dirty="0">
+                <a:solidFill>
+                  <a:schemeClr val="bg1"/>
+                </a:solidFill>
+              </a:rPr>
+              <a:t>, 6, e4794. doi:10.7717/peerj.4794</a:t>
+            </a:r>
+          </a:p>
+          <a:p>
+            <a:endParaRPr lang="en-US" dirty="0">
+              <a:solidFill>
+                <a:schemeClr val="bg1"/>
+              </a:solidFill>
+            </a:endParaRPr>
+          </a:p>
+          <a:p>
+            <a:r>
+              <a:rPr lang="en-US" dirty="0" err="1">
+                <a:solidFill>
+                  <a:schemeClr val="bg1"/>
+                </a:solidFill>
+              </a:rPr>
+              <a:t>Schielzeth</a:t>
+            </a:r>
+            <a:r>
+              <a:rPr lang="en-US" dirty="0">
+                <a:solidFill>
+                  <a:schemeClr val="bg1"/>
+                </a:solidFill>
+              </a:rPr>
+              <a:t>, H., &amp; Nakagawa, S. (2013). Nested by design: model fitting and interpretation in a mixed model era. Methods in Ecology and Evolution, 4(1), 14-24. doi:10.1111/j.2041-210x.2012.00251.x</a:t>
+            </a:r>
+          </a:p>
+        </p:txBody>
+      </p:sp>
+    </p:spTree>
+    <p:extLst>
+      <p:ext uri="{BB962C8B-B14F-4D97-AF65-F5344CB8AC3E}">
+        <p14:creationId xmlns:p14="http://schemas.microsoft.com/office/powerpoint/2010/main" val="676521109"/>
+      </p:ext>
+    </p:extLst>
+  </p:cSld>
+  <p:clrMapOvr>
+    <a:masterClrMapping/>
+  </p:clrMapOvr>
+</p:sld>
+</file>
+
+<file path=ppt/slides/slide17.xml><?xml version="1.0" encoding="utf-8"?>
+<p:sld xmlns:a="http://schemas.openxmlformats.org/drawingml/2006/main" xmlns:r="http://schemas.openxmlformats.org/officeDocument/2006/relationships" xmlns:p="http://schemas.openxmlformats.org/presentationml/2006/main">
+  <p:cSld>
+    <p:spTree>
+      <p:nvGrpSpPr>
+        <p:cNvPr id="1" name=""/>
+        <p:cNvGrpSpPr/>
+        <p:nvPr/>
+      </p:nvGrpSpPr>
+      <p:grpSpPr>
+        <a:xfrm>
+          <a:off x="0" y="0"/>
+          <a:ext cx="0" cy="0"/>
+          <a:chOff x="0" y="0"/>
+          <a:chExt cx="0" cy="0"/>
+        </a:xfrm>
+      </p:grpSpPr>
+      <p:sp>
+        <p:nvSpPr>
           <p:cNvPr id="8" name="Title 7"/>
           <p:cNvSpPr>
             <a:spLocks noGrp="1"/>
@@ -4407,8 +5309,8 @@
           </a:p>
         </p:txBody>
       </p:sp>
-      <mc:AlternateContent xmlns:mc="http://schemas.openxmlformats.org/markup-compatibility/2006">
-        <mc:Choice xmlns:a14="http://schemas.microsoft.com/office/drawing/2010/main" Requires="a14">
+      <mc:AlternateContent xmlns:mc="http://schemas.openxmlformats.org/markup-compatibility/2006" xmlns:a14="http://schemas.microsoft.com/office/drawing/2010/main">
+        <mc:Choice Requires="a14">
           <p:sp>
             <p:nvSpPr>
               <p:cNvPr id="9" name="Content Placeholder 8"/>
@@ -5324,7 +6226,7 @@
             </p:txBody>
           </p:sp>
         </mc:Choice>
-        <mc:Fallback>
+        <mc:Fallback xmlns="">
           <p:sp>
             <p:nvSpPr>
               <p:cNvPr id="9" name="Content Placeholder 8"/>
@@ -5395,8 +6297,8 @@
           </a:fontRef>
         </p:style>
       </p:cxnSp>
-      <mc:AlternateContent xmlns:mc="http://schemas.openxmlformats.org/markup-compatibility/2006">
-        <mc:Choice xmlns:a14="http://schemas.microsoft.com/office/drawing/2010/main" Requires="a14">
+      <mc:AlternateContent xmlns:mc="http://schemas.openxmlformats.org/markup-compatibility/2006" xmlns:a14="http://schemas.microsoft.com/office/drawing/2010/main">
+        <mc:Choice Requires="a14">
           <p:sp>
             <p:nvSpPr>
               <p:cNvPr id="12" name="TextBox 11"/>
@@ -5449,7 +6351,7 @@
             </p:txBody>
           </p:sp>
         </mc:Choice>
-        <mc:Fallback>
+        <mc:Fallback xmlns="">
           <p:sp>
             <p:nvSpPr>
               <p:cNvPr id="12" name="TextBox 11"/>
@@ -5488,8 +6390,8 @@
           </p:sp>
         </mc:Fallback>
       </mc:AlternateContent>
-      <mc:AlternateContent xmlns:mc="http://schemas.openxmlformats.org/markup-compatibility/2006">
-        <mc:Choice xmlns:a14="http://schemas.microsoft.com/office/drawing/2010/main" Requires="a14">
+      <mc:AlternateContent xmlns:mc="http://schemas.openxmlformats.org/markup-compatibility/2006" xmlns:a14="http://schemas.microsoft.com/office/drawing/2010/main">
+        <mc:Choice Requires="a14">
           <p:sp>
             <p:nvSpPr>
               <p:cNvPr id="15" name="TextBox 14"/>
@@ -5543,7 +6445,7 @@
             </p:txBody>
           </p:sp>
         </mc:Choice>
-        <mc:Fallback>
+        <mc:Fallback xmlns="">
           <p:sp>
             <p:nvSpPr>
               <p:cNvPr id="15" name="TextBox 14"/>
@@ -5595,7 +6497,7 @@
 </p:sld>
 </file>
 
-<file path=ppt/slides/slide16.xml><?xml version="1.0" encoding="utf-8"?>
+<file path=ppt/slides/slide18.xml><?xml version="1.0" encoding="utf-8"?>
 <p:sld xmlns:a="http://schemas.openxmlformats.org/drawingml/2006/main" xmlns:r="http://schemas.openxmlformats.org/officeDocument/2006/relationships" xmlns:p="http://schemas.openxmlformats.org/presentationml/2006/main">
   <p:cSld>
     <p:spTree>
@@ -5860,23 +6762,7 @@
           <a:p>
             <a:r>
               <a:rPr lang="en-US" dirty="0" smtClean="0"/>
-              <a:t>Understand the basic structure and differences among different types of regression models (LM, </a:t>
-            </a:r>
-            <a:r>
-              <a:rPr lang="en-US" dirty="0" smtClean="0"/>
-              <a:t>GLM</a:t>
-            </a:r>
-            <a:r>
-              <a:rPr lang="en-US" dirty="0" smtClean="0"/>
-              <a:t>, </a:t>
-            </a:r>
-            <a:r>
-              <a:rPr lang="en-US" dirty="0" smtClean="0"/>
-              <a:t>GAM</a:t>
-            </a:r>
-            <a:r>
-              <a:rPr lang="en-US" dirty="0" smtClean="0"/>
-              <a:t>, </a:t>
+              <a:t>Understand the basic structure and differences among different types of regression models (LM, GLM, GAM, </a:t>
             </a:r>
             <a:r>
               <a:rPr lang="en-US" dirty="0"/>
@@ -5884,11 +6770,7 @@
             </a:r>
             <a:r>
               <a:rPr lang="en-US" dirty="0" smtClean="0"/>
-              <a:t>GAMM</a:t>
-            </a:r>
-            <a:r>
-              <a:rPr lang="en-US" dirty="0" smtClean="0"/>
-              <a:t>)</a:t>
+              <a:t>GAMM)</a:t>
             </a:r>
           </a:p>
           <a:p>
@@ -6118,25 +7000,13 @@
           <a:p>
             <a:r>
               <a:rPr lang="en-US" dirty="0" smtClean="0"/>
-              <a:t>Generalized </a:t>
-            </a:r>
+              <a:t>Generalized linear model: GLM</a:t>
+            </a:r>
+          </a:p>
+          <a:p>
             <a:r>
               <a:rPr lang="en-US" dirty="0" smtClean="0"/>
-              <a:t>linear model: GLM</a:t>
-            </a:r>
-          </a:p>
-          <a:p>
-            <a:r>
-              <a:rPr lang="en-US" dirty="0" smtClean="0"/>
-              <a:t>Generalized </a:t>
-            </a:r>
-            <a:r>
-              <a:rPr lang="en-US" dirty="0" smtClean="0"/>
-              <a:t>additive model: </a:t>
-            </a:r>
-            <a:r>
-              <a:rPr lang="en-US" dirty="0" smtClean="0"/>
-              <a:t>GAM</a:t>
+              <a:t>Generalized additive model: GAM</a:t>
             </a:r>
           </a:p>
           <a:p>
@@ -6172,7 +7042,6 @@
               <a:rPr lang="en-US" dirty="0" smtClean="0"/>
               <a:t>)</a:t>
             </a:r>
-            <a:endParaRPr lang="en-US" dirty="0" smtClean="0"/>
           </a:p>
           <a:p>
             <a:r>
@@ -8763,8 +9632,8 @@
           </a:p>
         </p:txBody>
       </p:sp>
-      <mc:AlternateContent xmlns:mc="http://schemas.openxmlformats.org/markup-compatibility/2006">
-        <mc:Choice xmlns:a14="http://schemas.microsoft.com/office/drawing/2010/main" Requires="a14">
+      <mc:AlternateContent xmlns:mc="http://schemas.openxmlformats.org/markup-compatibility/2006" xmlns:a14="http://schemas.microsoft.com/office/drawing/2010/main">
+        <mc:Choice Requires="a14">
           <p:sp>
             <p:nvSpPr>
               <p:cNvPr id="3" name="Content Placeholder 2"/>
@@ -9483,7 +10352,7 @@
             </p:txBody>
           </p:sp>
         </mc:Choice>
-        <mc:Fallback>
+        <mc:Fallback xmlns="">
           <p:sp>
             <p:nvSpPr>
               <p:cNvPr id="3" name="Content Placeholder 2"/>

</xml_diff>

<commit_message>
Revised GLM, 3 components slide.
</commit_message>
<xml_diff>
--- a/Notes/RegressionModelOverview.pptx
+++ b/Notes/RegressionModelOverview.pptx
@@ -3939,16 +3939,34 @@
                 <a:r>
                   <a:rPr lang="en-US" dirty="0" smtClean="0">
                     <a:solidFill>
-                      <a:schemeClr val="accent4">
-                        <a:lumMod val="75000"/>
-                      </a:schemeClr>
+                      <a:srgbClr val="0070C0"/>
                     </a:solidFill>
                   </a:rPr>
-                  <a:t>Probability density function</a:t>
+                  <a:t>Probability </a:t>
+                </a:r>
+                <a:r>
+                  <a:rPr lang="en-US" dirty="0" smtClean="0">
+                    <a:solidFill>
+                      <a:srgbClr val="0070C0"/>
+                    </a:solidFill>
+                  </a:rPr>
+                  <a:t>distribution</a:t>
+                </a:r>
+                <a:r>
+                  <a:rPr lang="en-US" dirty="0" smtClean="0">
+                    <a:solidFill>
+                      <a:srgbClr val="0070C0"/>
+                    </a:solidFill>
+                  </a:rPr>
+                  <a:t> function </a:t>
                 </a:r>
                 <a:r>
                   <a:rPr lang="en-US" dirty="0" smtClean="0"/>
-                  <a:t> of a random variable </a:t>
+                  <a:t>for a </a:t>
+                </a:r>
+                <a:r>
+                  <a:rPr lang="en-US" dirty="0" smtClean="0"/>
+                  <a:t>random variable </a:t>
                 </a:r>
                 <a14:m>
                   <m:oMath xmlns:m="http://schemas.openxmlformats.org/officeDocument/2006/math">
@@ -4215,8 +4233,16 @@
                   <a:buNone/>
                 </a:pPr>
                 <a:r>
+                  <a:rPr lang="en-US" dirty="0" smtClean="0">
+                    <a:solidFill>
+                      <a:srgbClr val="0070C0"/>
+                    </a:solidFill>
+                  </a:rPr>
+                  <a:t>Variance</a:t>
+                </a:r>
+                <a:r>
                   <a:rPr lang="en-US" dirty="0" smtClean="0"/>
-                  <a:t>Variance of </a:t>
+                  <a:t> of </a:t>
                 </a:r>
                 <a14:m>
                   <m:oMath xmlns:m="http://schemas.openxmlformats.org/officeDocument/2006/math">
@@ -4348,7 +4374,15 @@
                 </a14:m>
                 <a:r>
                   <a:rPr lang="en-US" dirty="0" smtClean="0"/>
-                  <a:t>: Canonical parameter</a:t>
+                  <a:t>: </a:t>
+                </a:r>
+                <a:r>
+                  <a:rPr lang="en-US" dirty="0" smtClean="0">
+                    <a:solidFill>
+                      <a:srgbClr val="0070C0"/>
+                    </a:solidFill>
+                  </a:rPr>
+                  <a:t>Canonical parameter</a:t>
                 </a:r>
               </a:p>
               <a:p>
@@ -4440,7 +4474,43 @@
                 </a:r>
                 <a:r>
                   <a:rPr lang="en-US" dirty="0" smtClean="0"/>
-                  <a:t>Associated terms include scale factor, scale parameter, dispersion parameter. </a:t>
+                  <a:t>Associated terms include </a:t>
+                </a:r>
+                <a:r>
+                  <a:rPr lang="en-US" dirty="0" smtClean="0">
+                    <a:solidFill>
+                      <a:srgbClr val="0070C0"/>
+                    </a:solidFill>
+                  </a:rPr>
+                  <a:t>scale factor</a:t>
+                </a:r>
+                <a:r>
+                  <a:rPr lang="en-US" dirty="0" smtClean="0"/>
+                  <a:t>, </a:t>
+                </a:r>
+                <a:r>
+                  <a:rPr lang="en-US" dirty="0" smtClean="0">
+                    <a:solidFill>
+                      <a:srgbClr val="0070C0"/>
+                    </a:solidFill>
+                  </a:rPr>
+                  <a:t>scale parameter</a:t>
+                </a:r>
+                <a:r>
+                  <a:rPr lang="en-US" dirty="0" smtClean="0"/>
+                  <a:t>, </a:t>
+                </a:r>
+                <a:r>
+                  <a:rPr lang="en-US" dirty="0" smtClean="0">
+                    <a:solidFill>
+                      <a:srgbClr val="0070C0"/>
+                    </a:solidFill>
+                  </a:rPr>
+                  <a:t>dispersion parameter</a:t>
+                </a:r>
+                <a:r>
+                  <a:rPr lang="en-US" dirty="0" smtClean="0"/>
+                  <a:t>. </a:t>
                 </a:r>
                 <a:r>
                   <a:rPr lang="en-US" sz="1600" dirty="0" smtClean="0"/>

</xml_diff>

<commit_message>
Made a lot of additions to the GLM section
</commit_message>
<xml_diff>
--- a/Notes/RegressionModelOverview.pptx
+++ b/Notes/RegressionModelOverview.pptx
@@ -5,7 +5,7 @@
     <p:sldMasterId id="2147483648" r:id="rId1"/>
   </p:sldMasterIdLst>
   <p:notesMasterIdLst>
-    <p:notesMasterId r:id="rId20"/>
+    <p:notesMasterId r:id="rId23"/>
   </p:notesMasterIdLst>
   <p:sldIdLst>
     <p:sldId id="256" r:id="rId2"/>
@@ -21,11 +21,14 @@
     <p:sldId id="271" r:id="rId12"/>
     <p:sldId id="272" r:id="rId13"/>
     <p:sldId id="273" r:id="rId14"/>
-    <p:sldId id="266" r:id="rId15"/>
-    <p:sldId id="267" r:id="rId16"/>
-    <p:sldId id="270" r:id="rId17"/>
-    <p:sldId id="268" r:id="rId18"/>
-    <p:sldId id="269" r:id="rId19"/>
+    <p:sldId id="274" r:id="rId15"/>
+    <p:sldId id="275" r:id="rId16"/>
+    <p:sldId id="276" r:id="rId17"/>
+    <p:sldId id="266" r:id="rId18"/>
+    <p:sldId id="267" r:id="rId19"/>
+    <p:sldId id="270" r:id="rId20"/>
+    <p:sldId id="268" r:id="rId21"/>
+    <p:sldId id="269" r:id="rId22"/>
   </p:sldIdLst>
   <p:sldSz cx="12192000" cy="6858000"/>
   <p:notesSz cx="6858000" cy="9144000"/>
@@ -3757,7 +3760,7 @@
         </p:nvSpPr>
         <p:spPr/>
         <p:txBody>
-          <a:bodyPr/>
+          <a:bodyPr anchor="t"/>
           <a:lstStyle/>
           <a:p>
             <a:r>
@@ -3778,7 +3781,12 @@
             <p:ph idx="1"/>
           </p:nvPr>
         </p:nvSpPr>
-        <p:spPr/>
+        <p:spPr>
+          <a:xfrm>
+            <a:off x="838200" y="1265447"/>
+            <a:ext cx="10515600" cy="4351338"/>
+          </a:xfrm>
+        </p:spPr>
         <p:txBody>
           <a:bodyPr/>
           <a:lstStyle/>
@@ -3811,18 +3819,13 @@
               <a:t>General applicability to distributions in the </a:t>
             </a:r>
             <a:r>
-              <a:rPr lang="en-US" sz="2400" b="1" dirty="0">
+              <a:rPr lang="en-US" sz="2400" dirty="0">
                 <a:solidFill>
                   <a:srgbClr val="0070C0"/>
                 </a:solidFill>
               </a:rPr>
               <a:t>exponential family</a:t>
             </a:r>
-            <a:endParaRPr lang="en-US" sz="2400" dirty="0">
-              <a:solidFill>
-                <a:srgbClr val="0070C0"/>
-              </a:solidFill>
-            </a:endParaRPr>
           </a:p>
           <a:p>
             <a:pPr marL="0" indent="0">
@@ -3853,8 +3856,8 @@
         </p:blipFill>
         <p:spPr>
           <a:xfrm>
-            <a:off x="3863546" y="3919023"/>
-            <a:ext cx="4464909" cy="2938977"/>
+            <a:off x="2963562" y="2734215"/>
+            <a:ext cx="6264876" cy="4123785"/>
           </a:xfrm>
           <a:prstGeom prst="rect">
             <a:avLst/>
@@ -3942,31 +3945,11 @@
                       <a:srgbClr val="0070C0"/>
                     </a:solidFill>
                   </a:rPr>
-                  <a:t>Probability </a:t>
-                </a:r>
-                <a:r>
-                  <a:rPr lang="en-US" dirty="0" smtClean="0">
-                    <a:solidFill>
-                      <a:srgbClr val="0070C0"/>
-                    </a:solidFill>
-                  </a:rPr>
-                  <a:t>distribution</a:t>
-                </a:r>
-                <a:r>
-                  <a:rPr lang="en-US" dirty="0" smtClean="0">
-                    <a:solidFill>
-                      <a:srgbClr val="0070C0"/>
-                    </a:solidFill>
-                  </a:rPr>
-                  <a:t> function </a:t>
+                  <a:t>Probability distribution function </a:t>
                 </a:r>
                 <a:r>
                   <a:rPr lang="en-US" dirty="0" smtClean="0"/>
-                  <a:t>for a </a:t>
-                </a:r>
-                <a:r>
-                  <a:rPr lang="en-US" dirty="0" smtClean="0"/>
-                  <a:t>random variable </a:t>
+                  <a:t>for a random variable </a:t>
                 </a:r>
                 <a14:m>
                   <m:oMath xmlns:m="http://schemas.openxmlformats.org/officeDocument/2006/math">
@@ -4382,8 +4365,25 @@
                       <a:srgbClr val="0070C0"/>
                     </a:solidFill>
                   </a:rPr>
-                  <a:t>Canonical parameter</a:t>
+                  <a:t>Canonical </a:t>
                 </a:r>
+                <a:r>
+                  <a:rPr lang="en-US" dirty="0" smtClean="0">
+                    <a:solidFill>
+                      <a:srgbClr val="0070C0"/>
+                    </a:solidFill>
+                  </a:rPr>
+                  <a:t>parameter </a:t>
+                </a:r>
+                <a:r>
+                  <a:rPr lang="en-US" dirty="0" smtClean="0"/>
+                  <a:t>(relates to the mean)</a:t>
+                </a:r>
+                <a:endParaRPr lang="en-US" dirty="0" smtClean="0">
+                  <a:solidFill>
+                    <a:srgbClr val="0070C0"/>
+                  </a:solidFill>
+                </a:endParaRPr>
               </a:p>
               <a:p>
                 <a:pPr marL="2111375" indent="-2111375">
@@ -4626,7 +4626,12 @@
             <p:ph idx="1"/>
           </p:nvPr>
         </p:nvSpPr>
-        <p:spPr/>
+        <p:spPr>
+          <a:xfrm>
+            <a:off x="2700981" y="1825625"/>
+            <a:ext cx="6790038" cy="2482764"/>
+          </a:xfrm>
+        </p:spPr>
         <p:txBody>
           <a:bodyPr>
             <a:normAutofit/>
@@ -4635,114 +4640,145 @@
           <a:p>
             <a:pPr marL="228600" lvl="2"/>
             <a:r>
-              <a:rPr lang="en-US" b="1" dirty="0" smtClean="0"/>
-              <a:t>Random </a:t>
-            </a:r>
-            <a:r>
-              <a:rPr lang="en-US" b="1" dirty="0"/>
-              <a:t>Component</a:t>
-            </a:r>
-            <a:endParaRPr lang="en-US" dirty="0"/>
-          </a:p>
-          <a:p>
-            <a:pPr marL="685800" lvl="4"/>
-            <a:r>
-              <a:rPr lang="en-US" dirty="0" smtClean="0"/>
-              <a:t>Other names: sampling distribution, error distribution</a:t>
-            </a:r>
-            <a:endParaRPr lang="en-US" dirty="0"/>
-          </a:p>
-          <a:p>
-            <a:pPr marL="685800" lvl="4"/>
-            <a:r>
-              <a:rPr lang="en-US" dirty="0"/>
-              <a:t>Relationship to likelihood function </a:t>
-            </a:r>
-            <a:r>
-              <a:rPr lang="en-US" dirty="0">
+              <a:rPr lang="en-US" b="1" dirty="0" smtClean="0">
                 <a:solidFill>
-                  <a:schemeClr val="accent4">
-                    <a:lumMod val="75000"/>
-                  </a:schemeClr>
+                  <a:srgbClr val="0070C0"/>
                 </a:solidFill>
               </a:rPr>
-              <a:t>(QERM L11; M&amp;N p. 28)</a:t>
+              <a:t>Random </a:t>
+            </a:r>
+            <a:r>
+              <a:rPr lang="en-US" b="1" dirty="0">
+                <a:solidFill>
+                  <a:srgbClr val="0070C0"/>
+                </a:solidFill>
+              </a:rPr>
+              <a:t>Component</a:t>
+            </a:r>
+            <a:endParaRPr lang="en-US" dirty="0">
+              <a:solidFill>
+                <a:srgbClr val="0070C0"/>
+              </a:solidFill>
+            </a:endParaRPr>
+          </a:p>
+          <a:p>
+            <a:pPr marL="685800" lvl="4"/>
+            <a:r>
+              <a:rPr lang="en-US" dirty="0" smtClean="0"/>
+              <a:t>Also referred to as:</a:t>
+            </a:r>
+            <a:r>
+              <a:rPr lang="en-US" dirty="0" smtClean="0"/>
+              <a:t> </a:t>
+            </a:r>
+            <a:r>
+              <a:rPr lang="en-US" dirty="0" smtClean="0">
+                <a:solidFill>
+                  <a:srgbClr val="0070C0"/>
+                </a:solidFill>
+              </a:rPr>
+              <a:t>sampling distribution</a:t>
+            </a:r>
+            <a:r>
+              <a:rPr lang="en-US" dirty="0" smtClean="0"/>
+              <a:t>, </a:t>
+            </a:r>
+            <a:r>
+              <a:rPr lang="en-US" dirty="0" smtClean="0">
+                <a:solidFill>
+                  <a:srgbClr val="0070C0"/>
+                </a:solidFill>
+              </a:rPr>
+              <a:t>error </a:t>
+            </a:r>
+            <a:r>
+              <a:rPr lang="en-US" dirty="0" smtClean="0">
+                <a:solidFill>
+                  <a:srgbClr val="0070C0"/>
+                </a:solidFill>
+              </a:rPr>
+              <a:t>distribution</a:t>
             </a:r>
           </a:p>
           <a:p>
             <a:pPr marL="228600" lvl="2"/>
             <a:r>
-              <a:rPr lang="en-US" b="1" dirty="0"/>
-              <a:t>Systematic Component</a:t>
-            </a:r>
-            <a:endParaRPr lang="en-US" dirty="0"/>
+              <a:rPr lang="en-US" b="1" dirty="0" smtClean="0">
+                <a:solidFill>
+                  <a:srgbClr val="0070C0"/>
+                </a:solidFill>
+              </a:rPr>
+              <a:t>Systematic </a:t>
+            </a:r>
+            <a:r>
+              <a:rPr lang="en-US" b="1" dirty="0">
+                <a:solidFill>
+                  <a:srgbClr val="0070C0"/>
+                </a:solidFill>
+              </a:rPr>
+              <a:t>Component</a:t>
+            </a:r>
+            <a:endParaRPr lang="en-US" dirty="0">
+              <a:solidFill>
+                <a:srgbClr val="0070C0"/>
+              </a:solidFill>
+            </a:endParaRPr>
           </a:p>
           <a:p>
             <a:pPr marL="685800" lvl="4"/>
             <a:r>
               <a:rPr lang="en-US" dirty="0" smtClean="0"/>
-              <a:t>Also called the </a:t>
-            </a:r>
-            <a:r>
-              <a:rPr lang="en-US" dirty="0"/>
+              <a:t>Also referred to as: </a:t>
+            </a:r>
+            <a:r>
+              <a:rPr lang="en-US" dirty="0" smtClean="0">
+                <a:solidFill>
+                  <a:srgbClr val="0070C0"/>
+                </a:solidFill>
+              </a:rPr>
               <a:t>linear model</a:t>
             </a:r>
+            <a:r>
+              <a:rPr lang="en-US" dirty="0" smtClean="0"/>
+              <a:t>, </a:t>
+            </a:r>
+            <a:r>
+              <a:rPr lang="en-US" dirty="0" smtClean="0">
+                <a:solidFill>
+                  <a:srgbClr val="0070C0"/>
+                </a:solidFill>
+              </a:rPr>
+              <a:t>linear predictor</a:t>
+            </a:r>
+            <a:endParaRPr lang="en-US" dirty="0">
+              <a:solidFill>
+                <a:srgbClr val="0070C0"/>
+              </a:solidFill>
+            </a:endParaRPr>
           </a:p>
           <a:p>
             <a:pPr marL="228600" lvl="2"/>
             <a:r>
-              <a:rPr lang="en-US" b="1" dirty="0"/>
-              <a:t>Link function</a:t>
-            </a:r>
-            <a:endParaRPr lang="en-US" dirty="0"/>
-          </a:p>
-          <a:p>
-            <a:pPr marL="685800" lvl="4"/>
-            <a:r>
-              <a:rPr lang="en-US" dirty="0"/>
-              <a:t>Mathematical notation</a:t>
-            </a:r>
-          </a:p>
-          <a:p>
-            <a:pPr marL="685800" lvl="4"/>
-            <a:r>
-              <a:rPr lang="en-US" dirty="0"/>
-              <a:t>Purpose (in English)</a:t>
-            </a:r>
-          </a:p>
-          <a:p>
-            <a:pPr marL="1143000" lvl="6"/>
-            <a:r>
-              <a:rPr lang="en-US" dirty="0"/>
-              <a:t>Relates the expected value of the response variable (E(</a:t>
-            </a:r>
-            <a:r>
-              <a:rPr lang="en-US" dirty="0" err="1"/>
-              <a:t>y_i</a:t>
-            </a:r>
-            <a:r>
-              <a:rPr lang="en-US" dirty="0"/>
-              <a:t>)) to the data</a:t>
-            </a:r>
-          </a:p>
-          <a:p>
-            <a:pPr marL="1143000" lvl="6"/>
-            <a:r>
-              <a:rPr lang="en-US" dirty="0"/>
-              <a:t>Note that the purpose of the link function is to tame the response variable to restrict it to the correct scale when it is a function of X*beta</a:t>
-            </a:r>
-          </a:p>
-          <a:p>
-            <a:pPr marL="685800" lvl="4"/>
-            <a:r>
-              <a:rPr lang="en-US" dirty="0"/>
-              <a:t>Canonical link </a:t>
-            </a:r>
-            <a:r>
-              <a:rPr lang="en-US" dirty="0" smtClean="0"/>
+              <a:rPr lang="en-US" b="1" dirty="0">
+                <a:solidFill>
+                  <a:srgbClr val="0070C0"/>
+                </a:solidFill>
+              </a:rPr>
+              <a:t>Link </a:t>
+            </a:r>
+            <a:r>
+              <a:rPr lang="en-US" b="1" dirty="0" smtClean="0">
+                <a:solidFill>
+                  <a:srgbClr val="0070C0"/>
+                </a:solidFill>
+              </a:rPr>
               <a:t>function</a:t>
             </a:r>
-            <a:endParaRPr lang="en-US" dirty="0"/>
+            <a:endParaRPr lang="en-US" dirty="0">
+              <a:solidFill>
+                <a:srgbClr val="0070C0"/>
+              </a:solidFill>
+            </a:endParaRPr>
           </a:p>
         </p:txBody>
       </p:sp>
@@ -4760,6 +4796,2825 @@
 </file>
 
 <file path=ppt/slides/slide14.xml><?xml version="1.0" encoding="utf-8"?>
+<p:sld xmlns:a="http://schemas.openxmlformats.org/drawingml/2006/main" xmlns:r="http://schemas.openxmlformats.org/officeDocument/2006/relationships" xmlns:p="http://schemas.openxmlformats.org/presentationml/2006/main">
+  <p:cSld>
+    <p:spTree>
+      <p:nvGrpSpPr>
+        <p:cNvPr id="1" name=""/>
+        <p:cNvGrpSpPr/>
+        <p:nvPr/>
+      </p:nvGrpSpPr>
+      <p:grpSpPr>
+        <a:xfrm>
+          <a:off x="0" y="0"/>
+          <a:ext cx="0" cy="0"/>
+          <a:chOff x="0" y="0"/>
+          <a:chExt cx="0" cy="0"/>
+        </a:xfrm>
+      </p:grpSpPr>
+      <p:sp>
+        <p:nvSpPr>
+          <p:cNvPr id="2" name="Title 1"/>
+          <p:cNvSpPr>
+            <a:spLocks noGrp="1"/>
+          </p:cNvSpPr>
+          <p:nvPr>
+            <p:ph type="title" idx="4294967295"/>
+          </p:nvPr>
+        </p:nvSpPr>
+        <p:spPr>
+          <a:xfrm>
+            <a:off x="838200" y="365125"/>
+            <a:ext cx="10515600" cy="1325563"/>
+          </a:xfrm>
+        </p:spPr>
+        <p:txBody>
+          <a:bodyPr/>
+          <a:lstStyle/>
+          <a:p>
+            <a:r>
+              <a:rPr lang="en-US" dirty="0" smtClean="0"/>
+              <a:t>Random Component</a:t>
+            </a:r>
+            <a:endParaRPr lang="en-US" dirty="0"/>
+          </a:p>
+        </p:txBody>
+      </p:sp>
+      <p:sp>
+        <p:nvSpPr>
+          <p:cNvPr id="4" name="TextBox 3"/>
+          <p:cNvSpPr txBox="1"/>
+          <p:nvPr/>
+        </p:nvSpPr>
+        <p:spPr>
+          <a:xfrm>
+            <a:off x="708454" y="1456293"/>
+            <a:ext cx="9766263" cy="369332"/>
+          </a:xfrm>
+          <a:prstGeom prst="rect">
+            <a:avLst/>
+          </a:prstGeom>
+          <a:noFill/>
+        </p:spPr>
+        <p:txBody>
+          <a:bodyPr wrap="none" rtlCol="0">
+            <a:spAutoFit/>
+          </a:bodyPr>
+          <a:lstStyle/>
+          <a:p>
+            <a:pPr marL="285750" indent="-285750">
+              <a:buFont typeface="Arial" panose="020B0604020202020204" pitchFamily="34" charset="0"/>
+              <a:buChar char="•"/>
+            </a:pPr>
+            <a:r>
+              <a:rPr lang="en-US" dirty="0" smtClean="0"/>
+              <a:t>Examples of sampling distributions from the exponential family of probability distribution functions</a:t>
+            </a:r>
+            <a:endParaRPr lang="en-US" dirty="0"/>
+          </a:p>
+        </p:txBody>
+      </p:sp>
+      <p:sp>
+        <p:nvSpPr>
+          <p:cNvPr id="5" name="TextBox 4"/>
+          <p:cNvSpPr txBox="1"/>
+          <p:nvPr/>
+        </p:nvSpPr>
+        <p:spPr>
+          <a:xfrm>
+            <a:off x="1103870" y="1825625"/>
+            <a:ext cx="2509148" cy="2308324"/>
+          </a:xfrm>
+          <a:prstGeom prst="rect">
+            <a:avLst/>
+          </a:prstGeom>
+          <a:noFill/>
+          <a:ln>
+            <a:solidFill>
+              <a:schemeClr val="tx1"/>
+            </a:solidFill>
+          </a:ln>
+        </p:spPr>
+        <p:txBody>
+          <a:bodyPr wrap="none" rtlCol="0">
+            <a:spAutoFit/>
+          </a:bodyPr>
+          <a:lstStyle/>
+          <a:p>
+            <a:pPr marL="0" lvl="4"/>
+            <a:r>
+              <a:rPr lang="en-US" u="sng" dirty="0"/>
+              <a:t>Continuous </a:t>
+            </a:r>
+            <a:r>
+              <a:rPr lang="en-US" u="sng" dirty="0" smtClean="0"/>
+              <a:t>Distributions</a:t>
+            </a:r>
+            <a:endParaRPr lang="en-US" u="sng" dirty="0"/>
+          </a:p>
+          <a:p>
+            <a:pPr marL="457200" lvl="3"/>
+            <a:r>
+              <a:rPr lang="en-US" dirty="0">
+                <a:solidFill>
+                  <a:srgbClr val="0070C0"/>
+                </a:solidFill>
+              </a:rPr>
+              <a:t>Normal (Gaussian)</a:t>
+            </a:r>
+          </a:p>
+          <a:p>
+            <a:pPr marL="457200" lvl="3"/>
+            <a:r>
+              <a:rPr lang="en-US" dirty="0">
+                <a:solidFill>
+                  <a:srgbClr val="0070C0"/>
+                </a:solidFill>
+              </a:rPr>
+              <a:t>Gamma</a:t>
+            </a:r>
+          </a:p>
+          <a:p>
+            <a:pPr marL="457200" lvl="3"/>
+            <a:r>
+              <a:rPr lang="en-US" dirty="0">
+                <a:solidFill>
+                  <a:srgbClr val="0070C0"/>
+                </a:solidFill>
+              </a:rPr>
+              <a:t>Beta</a:t>
+            </a:r>
+          </a:p>
+          <a:p>
+            <a:pPr marL="457200" lvl="3"/>
+            <a:r>
+              <a:rPr lang="en-US" dirty="0">
+                <a:solidFill>
+                  <a:srgbClr val="0070C0"/>
+                </a:solidFill>
+              </a:rPr>
+              <a:t>Inverse Normal</a:t>
+            </a:r>
+          </a:p>
+          <a:p>
+            <a:pPr marL="457200" lvl="3"/>
+            <a:r>
+              <a:rPr lang="en-US" dirty="0">
+                <a:solidFill>
+                  <a:srgbClr val="0070C0"/>
+                </a:solidFill>
+              </a:rPr>
+              <a:t>Exponential</a:t>
+            </a:r>
+          </a:p>
+          <a:p>
+            <a:pPr marL="457200" lvl="3"/>
+            <a:r>
+              <a:rPr lang="en-US" dirty="0">
+                <a:solidFill>
+                  <a:srgbClr val="0070C0"/>
+                </a:solidFill>
+              </a:rPr>
+              <a:t>Chi-Square</a:t>
+            </a:r>
+          </a:p>
+          <a:p>
+            <a:pPr marL="457200" lvl="3"/>
+            <a:r>
+              <a:rPr lang="en-US" dirty="0" err="1" smtClean="0">
+                <a:solidFill>
+                  <a:srgbClr val="0070C0"/>
+                </a:solidFill>
+              </a:rPr>
+              <a:t>Dirichlet</a:t>
+            </a:r>
+            <a:endParaRPr lang="en-US" dirty="0">
+              <a:solidFill>
+                <a:srgbClr val="0070C0"/>
+              </a:solidFill>
+            </a:endParaRPr>
+          </a:p>
+        </p:txBody>
+      </p:sp>
+      <p:sp>
+        <p:nvSpPr>
+          <p:cNvPr id="6" name="TextBox 5"/>
+          <p:cNvSpPr txBox="1"/>
+          <p:nvPr/>
+        </p:nvSpPr>
+        <p:spPr>
+          <a:xfrm>
+            <a:off x="3856857" y="1825625"/>
+            <a:ext cx="2343270" cy="2308324"/>
+          </a:xfrm>
+          <a:prstGeom prst="rect">
+            <a:avLst/>
+          </a:prstGeom>
+          <a:noFill/>
+          <a:ln>
+            <a:solidFill>
+              <a:schemeClr val="tx1"/>
+            </a:solidFill>
+          </a:ln>
+        </p:spPr>
+        <p:txBody>
+          <a:bodyPr wrap="none" rtlCol="0">
+            <a:spAutoFit/>
+          </a:bodyPr>
+          <a:lstStyle/>
+          <a:p>
+            <a:pPr marL="0" lvl="4"/>
+            <a:r>
+              <a:rPr lang="en-US" u="sng" dirty="0" smtClean="0"/>
+              <a:t>Discrete Distributions</a:t>
+            </a:r>
+            <a:endParaRPr lang="en-US" u="sng" dirty="0"/>
+          </a:p>
+          <a:p>
+            <a:pPr marL="457200" lvl="3"/>
+            <a:r>
+              <a:rPr lang="en-US" dirty="0">
+                <a:solidFill>
+                  <a:srgbClr val="0070C0"/>
+                </a:solidFill>
+              </a:rPr>
+              <a:t>Bernoulli</a:t>
+            </a:r>
+          </a:p>
+          <a:p>
+            <a:pPr marL="457200" lvl="3"/>
+            <a:r>
+              <a:rPr lang="en-US" dirty="0">
+                <a:solidFill>
+                  <a:srgbClr val="0070C0"/>
+                </a:solidFill>
+              </a:rPr>
+              <a:t>Binomial</a:t>
+            </a:r>
+          </a:p>
+          <a:p>
+            <a:pPr marL="457200" lvl="3"/>
+            <a:r>
+              <a:rPr lang="en-US" dirty="0">
+                <a:solidFill>
+                  <a:srgbClr val="0070C0"/>
+                </a:solidFill>
+              </a:rPr>
+              <a:t>Poisson</a:t>
+            </a:r>
+          </a:p>
+          <a:p>
+            <a:pPr marL="457200" lvl="3"/>
+            <a:r>
+              <a:rPr lang="en-US" dirty="0">
+                <a:solidFill>
+                  <a:srgbClr val="0070C0"/>
+                </a:solidFill>
+              </a:rPr>
+              <a:t>Negative binomial</a:t>
+            </a:r>
+          </a:p>
+          <a:p>
+            <a:pPr marL="457200" lvl="3"/>
+            <a:r>
+              <a:rPr lang="en-US" dirty="0">
+                <a:solidFill>
+                  <a:srgbClr val="0070C0"/>
+                </a:solidFill>
+              </a:rPr>
+              <a:t>Multinomial</a:t>
+            </a:r>
+          </a:p>
+          <a:p>
+            <a:pPr marL="457200" lvl="3"/>
+            <a:r>
+              <a:rPr lang="en-US" dirty="0">
+                <a:solidFill>
+                  <a:srgbClr val="0070C0"/>
+                </a:solidFill>
+              </a:rPr>
+              <a:t>Geometric</a:t>
+            </a:r>
+          </a:p>
+          <a:p>
+            <a:pPr marL="457200" lvl="3"/>
+            <a:r>
+              <a:rPr lang="en-US" dirty="0" smtClean="0">
+                <a:solidFill>
+                  <a:srgbClr val="0070C0"/>
+                </a:solidFill>
+              </a:rPr>
+              <a:t>Zero-inflated…</a:t>
+            </a:r>
+            <a:endParaRPr lang="en-US" dirty="0">
+              <a:solidFill>
+                <a:srgbClr val="0070C0"/>
+              </a:solidFill>
+            </a:endParaRPr>
+          </a:p>
+        </p:txBody>
+      </p:sp>
+      <mc:AlternateContent xmlns:mc="http://schemas.openxmlformats.org/markup-compatibility/2006">
+        <mc:Choice xmlns:a14="http://schemas.microsoft.com/office/drawing/2010/main" Requires="a14">
+          <p:sp>
+            <p:nvSpPr>
+              <p:cNvPr id="8" name="TextBox 7"/>
+              <p:cNvSpPr txBox="1"/>
+              <p:nvPr/>
+            </p:nvSpPr>
+            <p:spPr>
+              <a:xfrm>
+                <a:off x="708454" y="4502790"/>
+                <a:ext cx="9801786" cy="1477328"/>
+              </a:xfrm>
+              <a:prstGeom prst="rect">
+                <a:avLst/>
+              </a:prstGeom>
+              <a:noFill/>
+            </p:spPr>
+            <p:txBody>
+              <a:bodyPr wrap="none" rtlCol="0">
+                <a:spAutoFit/>
+              </a:bodyPr>
+              <a:lstStyle/>
+              <a:p>
+                <a:pPr marL="285750" indent="-285750">
+                  <a:buFont typeface="Arial" panose="020B0604020202020204" pitchFamily="34" charset="0"/>
+                  <a:buChar char="•"/>
+                </a:pPr>
+                <a:r>
+                  <a:rPr lang="en-US" dirty="0" smtClean="0"/>
+                  <a:t>The </a:t>
+                </a:r>
+                <a:r>
+                  <a:rPr lang="en-US" dirty="0" smtClean="0">
+                    <a:solidFill>
+                      <a:srgbClr val="0070C0"/>
+                    </a:solidFill>
+                  </a:rPr>
+                  <a:t>likelihood function </a:t>
+                </a:r>
+                <a:r>
+                  <a:rPr lang="en-US" dirty="0" smtClean="0"/>
+                  <a:t>is the same as the sampling distribution but “read in the opposite direction”</a:t>
+                </a:r>
+              </a:p>
+              <a:p>
+                <a:pPr marL="742950" lvl="1" indent="-285750">
+                  <a:buFont typeface="Arial" panose="020B0604020202020204" pitchFamily="34" charset="0"/>
+                  <a:buChar char="•"/>
+                </a:pPr>
+                <a:r>
+                  <a:rPr lang="en-US" dirty="0" smtClean="0"/>
+                  <a:t>Sampling distribution provides the probability of observing </a:t>
+                </a:r>
+                <a14:m>
+                  <m:oMath xmlns:m="http://schemas.openxmlformats.org/officeDocument/2006/math">
+                    <m:sSub>
+                      <m:sSubPr>
+                        <m:ctrlPr>
+                          <a:rPr lang="en-US" i="1" smtClean="0">
+                            <a:latin typeface="Cambria Math" panose="02040503050406030204" pitchFamily="18" charset="0"/>
+                          </a:rPr>
+                        </m:ctrlPr>
+                      </m:sSubPr>
+                      <m:e>
+                        <m:r>
+                          <a:rPr lang="en-US" b="0" i="1" smtClean="0">
+                            <a:latin typeface="Cambria Math" panose="02040503050406030204" pitchFamily="18" charset="0"/>
+                          </a:rPr>
+                          <m:t>𝑦</m:t>
+                        </m:r>
+                      </m:e>
+                      <m:sub>
+                        <m:r>
+                          <a:rPr lang="en-US" b="0" i="1" smtClean="0">
+                            <a:latin typeface="Cambria Math" panose="02040503050406030204" pitchFamily="18" charset="0"/>
+                          </a:rPr>
+                          <m:t>𝑖</m:t>
+                        </m:r>
+                      </m:sub>
+                    </m:sSub>
+                  </m:oMath>
+                </a14:m>
+                <a:r>
+                  <a:rPr lang="en-US" dirty="0" smtClean="0"/>
+                  <a:t> given parameter </a:t>
+                </a:r>
+                <a14:m>
+                  <m:oMath xmlns:m="http://schemas.openxmlformats.org/officeDocument/2006/math">
+                    <m:r>
+                      <a:rPr lang="en-US" i="1" smtClean="0">
+                        <a:latin typeface="Cambria Math" panose="02040503050406030204" pitchFamily="18" charset="0"/>
+                        <a:ea typeface="Cambria Math" panose="02040503050406030204" pitchFamily="18" charset="0"/>
+                      </a:rPr>
+                      <m:t>𝜃</m:t>
+                    </m:r>
+                  </m:oMath>
+                </a14:m>
+                <a:endParaRPr lang="en-US" dirty="0" smtClean="0">
+                  <a:ea typeface="Cambria Math" panose="02040503050406030204" pitchFamily="18" charset="0"/>
+                </a:endParaRPr>
+              </a:p>
+              <a:p>
+                <a:pPr marL="0" lvl="2" algn="ctr"/>
+                <a14:m>
+                  <m:oMath xmlns:m="http://schemas.openxmlformats.org/officeDocument/2006/math">
+                    <m:r>
+                      <a:rPr lang="en-US" b="0" i="1" smtClean="0">
+                        <a:latin typeface="Cambria Math" panose="02040503050406030204" pitchFamily="18" charset="0"/>
+                      </a:rPr>
+                      <m:t>𝑝</m:t>
+                    </m:r>
+                    <m:d>
+                      <m:dPr>
+                        <m:ctrlPr>
+                          <a:rPr lang="en-US" b="0" i="1" smtClean="0">
+                            <a:latin typeface="Cambria Math" panose="02040503050406030204" pitchFamily="18" charset="0"/>
+                          </a:rPr>
+                        </m:ctrlPr>
+                      </m:dPr>
+                      <m:e>
+                        <m:sSub>
+                          <m:sSubPr>
+                            <m:ctrlPr>
+                              <a:rPr lang="en-US" b="0" i="1" smtClean="0">
+                                <a:latin typeface="Cambria Math" panose="02040503050406030204" pitchFamily="18" charset="0"/>
+                              </a:rPr>
+                            </m:ctrlPr>
+                          </m:sSubPr>
+                          <m:e>
+                            <m:r>
+                              <a:rPr lang="en-US" b="0" i="1" smtClean="0">
+                                <a:latin typeface="Cambria Math" panose="02040503050406030204" pitchFamily="18" charset="0"/>
+                              </a:rPr>
+                              <m:t>𝑦</m:t>
+                            </m:r>
+                          </m:e>
+                          <m:sub>
+                            <m:r>
+                              <a:rPr lang="en-US" b="0" i="1" smtClean="0">
+                                <a:latin typeface="Cambria Math" panose="02040503050406030204" pitchFamily="18" charset="0"/>
+                              </a:rPr>
+                              <m:t>𝑖</m:t>
+                            </m:r>
+                          </m:sub>
+                        </m:sSub>
+                        <m:r>
+                          <a:rPr lang="en-US" b="0" i="1" smtClean="0">
+                            <a:latin typeface="Cambria Math" panose="02040503050406030204" pitchFamily="18" charset="0"/>
+                          </a:rPr>
+                          <m:t>;</m:t>
+                        </m:r>
+                        <m:r>
+                          <a:rPr lang="en-US" b="0" i="1" smtClean="0">
+                            <a:latin typeface="Cambria Math" panose="02040503050406030204" pitchFamily="18" charset="0"/>
+                            <a:ea typeface="Cambria Math" panose="02040503050406030204" pitchFamily="18" charset="0"/>
+                          </a:rPr>
+                          <m:t>𝜃</m:t>
+                        </m:r>
+                      </m:e>
+                    </m:d>
+                  </m:oMath>
+                </a14:m>
+                <a:r>
+                  <a:rPr lang="en-US" dirty="0" smtClean="0"/>
+                  <a:t> </a:t>
+                </a:r>
+              </a:p>
+              <a:p>
+                <a:pPr marL="742950" lvl="1" indent="-285750">
+                  <a:buFont typeface="Arial" panose="020B0604020202020204" pitchFamily="34" charset="0"/>
+                  <a:buChar char="•"/>
+                </a:pPr>
+                <a:r>
+                  <a:rPr lang="en-US" dirty="0" smtClean="0"/>
+                  <a:t>Likelihood function addresses, “What is the likelihood of parameter </a:t>
+                </a:r>
+                <a14:m>
+                  <m:oMath xmlns:m="http://schemas.openxmlformats.org/officeDocument/2006/math">
+                    <m:r>
+                      <a:rPr lang="en-US" i="1">
+                        <a:latin typeface="Cambria Math" panose="02040503050406030204" pitchFamily="18" charset="0"/>
+                        <a:ea typeface="Cambria Math" panose="02040503050406030204" pitchFamily="18" charset="0"/>
+                      </a:rPr>
+                      <m:t>𝜃</m:t>
+                    </m:r>
+                  </m:oMath>
+                </a14:m>
+                <a:r>
+                  <a:rPr lang="en-US" dirty="0" smtClean="0"/>
+                  <a:t> given observation </a:t>
+                </a:r>
+                <a14:m>
+                  <m:oMath xmlns:m="http://schemas.openxmlformats.org/officeDocument/2006/math">
+                    <m:sSub>
+                      <m:sSubPr>
+                        <m:ctrlPr>
+                          <a:rPr lang="en-US" i="1">
+                            <a:latin typeface="Cambria Math" panose="02040503050406030204" pitchFamily="18" charset="0"/>
+                          </a:rPr>
+                        </m:ctrlPr>
+                      </m:sSubPr>
+                      <m:e>
+                        <m:r>
+                          <a:rPr lang="en-US" i="1">
+                            <a:latin typeface="Cambria Math" panose="02040503050406030204" pitchFamily="18" charset="0"/>
+                          </a:rPr>
+                          <m:t>𝑦</m:t>
+                        </m:r>
+                      </m:e>
+                      <m:sub>
+                        <m:r>
+                          <a:rPr lang="en-US" i="1">
+                            <a:latin typeface="Cambria Math" panose="02040503050406030204" pitchFamily="18" charset="0"/>
+                          </a:rPr>
+                          <m:t>𝑖</m:t>
+                        </m:r>
+                      </m:sub>
+                    </m:sSub>
+                  </m:oMath>
+                </a14:m>
+                <a:r>
+                  <a:rPr lang="en-US" dirty="0" smtClean="0"/>
+                  <a:t>”</a:t>
+                </a:r>
+              </a:p>
+              <a:p>
+                <a:pPr marL="0" lvl="2"/>
+                <a14:m>
+                  <m:oMathPara xmlns:m="http://schemas.openxmlformats.org/officeDocument/2006/math">
+                    <m:oMathParaPr>
+                      <m:jc m:val="centerGroup"/>
+                    </m:oMathParaPr>
+                    <m:oMath xmlns:m="http://schemas.openxmlformats.org/officeDocument/2006/math">
+                      <m:r>
+                        <a:rPr lang="en-US" i="1" smtClean="0">
+                          <a:latin typeface="Cambria Math" panose="02040503050406030204" pitchFamily="18" charset="0"/>
+                          <a:ea typeface="Cambria Math" panose="02040503050406030204" pitchFamily="18" charset="0"/>
+                        </a:rPr>
+                        <m:t>ℒ</m:t>
+                      </m:r>
+                      <m:d>
+                        <m:dPr>
+                          <m:ctrlPr>
+                            <a:rPr lang="en-US" i="1" smtClean="0">
+                              <a:latin typeface="Cambria Math" panose="02040503050406030204" pitchFamily="18" charset="0"/>
+                              <a:ea typeface="Cambria Math" panose="02040503050406030204" pitchFamily="18" charset="0"/>
+                            </a:rPr>
+                          </m:ctrlPr>
+                        </m:dPr>
+                        <m:e>
+                          <m:r>
+                            <a:rPr lang="en-US" i="1" smtClean="0">
+                              <a:latin typeface="Cambria Math" panose="02040503050406030204" pitchFamily="18" charset="0"/>
+                              <a:ea typeface="Cambria Math" panose="02040503050406030204" pitchFamily="18" charset="0"/>
+                            </a:rPr>
+                            <m:t>𝜃</m:t>
+                          </m:r>
+                          <m:r>
+                            <a:rPr lang="en-US" b="0" i="1" smtClean="0">
+                              <a:latin typeface="Cambria Math" panose="02040503050406030204" pitchFamily="18" charset="0"/>
+                              <a:ea typeface="Cambria Math" panose="02040503050406030204" pitchFamily="18" charset="0"/>
+                            </a:rPr>
+                            <m:t>;</m:t>
+                          </m:r>
+                          <m:sSub>
+                            <m:sSubPr>
+                              <m:ctrlPr>
+                                <a:rPr lang="en-US" b="0" i="1" smtClean="0">
+                                  <a:latin typeface="Cambria Math" panose="02040503050406030204" pitchFamily="18" charset="0"/>
+                                  <a:ea typeface="Cambria Math" panose="02040503050406030204" pitchFamily="18" charset="0"/>
+                                </a:rPr>
+                              </m:ctrlPr>
+                            </m:sSubPr>
+                            <m:e>
+                              <m:r>
+                                <a:rPr lang="en-US" b="0" i="1" smtClean="0">
+                                  <a:latin typeface="Cambria Math" panose="02040503050406030204" pitchFamily="18" charset="0"/>
+                                  <a:ea typeface="Cambria Math" panose="02040503050406030204" pitchFamily="18" charset="0"/>
+                                </a:rPr>
+                                <m:t>𝑦</m:t>
+                              </m:r>
+                            </m:e>
+                            <m:sub>
+                              <m:r>
+                                <a:rPr lang="en-US" b="0" i="1" smtClean="0">
+                                  <a:latin typeface="Cambria Math" panose="02040503050406030204" pitchFamily="18" charset="0"/>
+                                  <a:ea typeface="Cambria Math" panose="02040503050406030204" pitchFamily="18" charset="0"/>
+                                </a:rPr>
+                                <m:t>𝑖</m:t>
+                              </m:r>
+                            </m:sub>
+                          </m:sSub>
+                        </m:e>
+                      </m:d>
+                    </m:oMath>
+                  </m:oMathPara>
+                </a14:m>
+                <a:endParaRPr lang="en-US" dirty="0"/>
+              </a:p>
+            </p:txBody>
+          </p:sp>
+        </mc:Choice>
+        <mc:Fallback>
+          <p:sp>
+            <p:nvSpPr>
+              <p:cNvPr id="8" name="TextBox 7"/>
+              <p:cNvSpPr txBox="1">
+                <a:spLocks noRot="1" noChangeAspect="1" noMove="1" noResize="1" noEditPoints="1" noAdjustHandles="1" noChangeArrowheads="1" noChangeShapeType="1" noTextEdit="1"/>
+              </p:cNvSpPr>
+              <p:nvPr/>
+            </p:nvSpPr>
+            <p:spPr>
+              <a:xfrm>
+                <a:off x="708454" y="4502790"/>
+                <a:ext cx="9801786" cy="1477328"/>
+              </a:xfrm>
+              <a:prstGeom prst="rect">
+                <a:avLst/>
+              </a:prstGeom>
+              <a:blipFill>
+                <a:blip r:embed="rId2"/>
+                <a:stretch>
+                  <a:fillRect l="-373" t="-2479" b="-826"/>
+                </a:stretch>
+              </a:blipFill>
+            </p:spPr>
+            <p:txBody>
+              <a:bodyPr/>
+              <a:lstStyle/>
+              <a:p>
+                <a:r>
+                  <a:rPr lang="en-US">
+                    <a:noFill/>
+                  </a:rPr>
+                  <a:t> </a:t>
+                </a:r>
+              </a:p>
+            </p:txBody>
+          </p:sp>
+        </mc:Fallback>
+      </mc:AlternateContent>
+      <mc:AlternateContent xmlns:mc="http://schemas.openxmlformats.org/markup-compatibility/2006">
+        <mc:Choice xmlns:a14="http://schemas.microsoft.com/office/drawing/2010/main" Requires="a14">
+          <p:sp>
+            <p:nvSpPr>
+              <p:cNvPr id="9" name="TextBox 8"/>
+              <p:cNvSpPr txBox="1"/>
+              <p:nvPr/>
+            </p:nvSpPr>
+            <p:spPr>
+              <a:xfrm>
+                <a:off x="708454" y="5917351"/>
+                <a:ext cx="7873484" cy="369332"/>
+              </a:xfrm>
+              <a:prstGeom prst="rect">
+                <a:avLst/>
+              </a:prstGeom>
+              <a:noFill/>
+            </p:spPr>
+            <p:txBody>
+              <a:bodyPr wrap="square" rtlCol="0">
+                <a:spAutoFit/>
+              </a:bodyPr>
+              <a:lstStyle/>
+              <a:p>
+                <a:pPr marL="285750" indent="-285750">
+                  <a:buFont typeface="Arial" panose="020B0604020202020204" pitchFamily="34" charset="0"/>
+                  <a:buChar char="•"/>
+                </a:pPr>
+                <a:r>
+                  <a:rPr lang="en-US" dirty="0" smtClean="0"/>
+                  <a:t>Mathematical notation:</a:t>
+                </a:r>
+                <a14:m>
+                  <m:oMath xmlns:m="http://schemas.openxmlformats.org/officeDocument/2006/math">
+                    <m:r>
+                      <a:rPr lang="en-US" b="0" i="0" smtClean="0">
+                        <a:latin typeface="Cambria Math" panose="02040503050406030204" pitchFamily="18" charset="0"/>
+                      </a:rPr>
+                      <m:t> </m:t>
+                    </m:r>
+                    <m:sSub>
+                      <m:sSubPr>
+                        <m:ctrlPr>
+                          <a:rPr lang="en-US" i="1" smtClean="0">
+                            <a:latin typeface="Cambria Math" panose="02040503050406030204" pitchFamily="18" charset="0"/>
+                          </a:rPr>
+                        </m:ctrlPr>
+                      </m:sSubPr>
+                      <m:e>
+                        <m:r>
+                          <a:rPr lang="en-US" b="0" i="1" smtClean="0">
+                            <a:latin typeface="Cambria Math" panose="02040503050406030204" pitchFamily="18" charset="0"/>
+                          </a:rPr>
+                          <m:t>𝑌</m:t>
+                        </m:r>
+                      </m:e>
+                      <m:sub>
+                        <m:r>
+                          <a:rPr lang="en-US" b="0" i="1" smtClean="0">
+                            <a:latin typeface="Cambria Math" panose="02040503050406030204" pitchFamily="18" charset="0"/>
+                          </a:rPr>
+                          <m:t>𝑖</m:t>
+                        </m:r>
+                      </m:sub>
+                    </m:sSub>
+                    <m:r>
+                      <a:rPr lang="en-US" b="0" i="1" smtClean="0">
+                        <a:latin typeface="Cambria Math" panose="02040503050406030204" pitchFamily="18" charset="0"/>
+                      </a:rPr>
+                      <m:t>~</m:t>
+                    </m:r>
+                  </m:oMath>
+                </a14:m>
+                <a:r>
+                  <a:rPr lang="en-US" dirty="0" smtClean="0"/>
+                  <a:t> some exponential family distribution</a:t>
+                </a:r>
+                <a:endParaRPr lang="en-US" dirty="0"/>
+              </a:p>
+            </p:txBody>
+          </p:sp>
+        </mc:Choice>
+        <mc:Fallback>
+          <p:sp>
+            <p:nvSpPr>
+              <p:cNvPr id="9" name="TextBox 8"/>
+              <p:cNvSpPr txBox="1">
+                <a:spLocks noRot="1" noChangeAspect="1" noMove="1" noResize="1" noEditPoints="1" noAdjustHandles="1" noChangeArrowheads="1" noChangeShapeType="1" noTextEdit="1"/>
+              </p:cNvSpPr>
+              <p:nvPr/>
+            </p:nvSpPr>
+            <p:spPr>
+              <a:xfrm>
+                <a:off x="708454" y="5917351"/>
+                <a:ext cx="7873484" cy="369332"/>
+              </a:xfrm>
+              <a:prstGeom prst="rect">
+                <a:avLst/>
+              </a:prstGeom>
+              <a:blipFill>
+                <a:blip r:embed="rId3"/>
+                <a:stretch>
+                  <a:fillRect l="-464" t="-10000" b="-26667"/>
+                </a:stretch>
+              </a:blipFill>
+            </p:spPr>
+            <p:txBody>
+              <a:bodyPr/>
+              <a:lstStyle/>
+              <a:p>
+                <a:r>
+                  <a:rPr lang="en-US">
+                    <a:noFill/>
+                  </a:rPr>
+                  <a:t> </a:t>
+                </a:r>
+              </a:p>
+            </p:txBody>
+          </p:sp>
+        </mc:Fallback>
+      </mc:AlternateContent>
+    </p:spTree>
+    <p:extLst>
+      <p:ext uri="{BB962C8B-B14F-4D97-AF65-F5344CB8AC3E}">
+        <p14:creationId xmlns:p14="http://schemas.microsoft.com/office/powerpoint/2010/main" val="3765440892"/>
+      </p:ext>
+    </p:extLst>
+  </p:cSld>
+  <p:clrMapOvr>
+    <a:masterClrMapping/>
+  </p:clrMapOvr>
+</p:sld>
+</file>
+
+<file path=ppt/slides/slide15.xml><?xml version="1.0" encoding="utf-8"?>
+<p:sld xmlns:a="http://schemas.openxmlformats.org/drawingml/2006/main" xmlns:r="http://schemas.openxmlformats.org/officeDocument/2006/relationships" xmlns:p="http://schemas.openxmlformats.org/presentationml/2006/main">
+  <p:cSld>
+    <p:spTree>
+      <p:nvGrpSpPr>
+        <p:cNvPr id="1" name=""/>
+        <p:cNvGrpSpPr/>
+        <p:nvPr/>
+      </p:nvGrpSpPr>
+      <p:grpSpPr>
+        <a:xfrm>
+          <a:off x="0" y="0"/>
+          <a:ext cx="0" cy="0"/>
+          <a:chOff x="0" y="0"/>
+          <a:chExt cx="0" cy="0"/>
+        </a:xfrm>
+      </p:grpSpPr>
+      <p:sp>
+        <p:nvSpPr>
+          <p:cNvPr id="2" name="Title 1"/>
+          <p:cNvSpPr>
+            <a:spLocks noGrp="1"/>
+          </p:cNvSpPr>
+          <p:nvPr>
+            <p:ph type="title"/>
+          </p:nvPr>
+        </p:nvSpPr>
+        <p:spPr/>
+        <p:txBody>
+          <a:bodyPr/>
+          <a:lstStyle/>
+          <a:p>
+            <a:r>
+              <a:rPr lang="en-US" dirty="0" smtClean="0"/>
+              <a:t>Systematic Component</a:t>
+            </a:r>
+            <a:endParaRPr lang="en-US" dirty="0"/>
+          </a:p>
+        </p:txBody>
+      </p:sp>
+      <mc:AlternateContent xmlns:mc="http://schemas.openxmlformats.org/markup-compatibility/2006">
+        <mc:Choice xmlns:a14="http://schemas.microsoft.com/office/drawing/2010/main" Requires="a14">
+          <p:sp>
+            <p:nvSpPr>
+              <p:cNvPr id="3" name="Content Placeholder 2"/>
+              <p:cNvSpPr>
+                <a:spLocks noGrp="1"/>
+              </p:cNvSpPr>
+              <p:nvPr>
+                <p:ph idx="1"/>
+              </p:nvPr>
+            </p:nvSpPr>
+            <p:spPr/>
+            <p:txBody>
+              <a:bodyPr/>
+              <a:lstStyle/>
+              <a:p>
+                <a:pPr marL="0" indent="0">
+                  <a:buNone/>
+                </a:pPr>
+                <a:r>
+                  <a:rPr lang="en-US" dirty="0" smtClean="0"/>
+                  <a:t>Covariates </a:t>
+                </a:r>
+                <a14:m>
+                  <m:oMath xmlns:m="http://schemas.openxmlformats.org/officeDocument/2006/math">
+                    <m:sSub>
+                      <m:sSubPr>
+                        <m:ctrlPr>
+                          <a:rPr lang="en-US" i="1" smtClean="0">
+                            <a:latin typeface="Cambria Math" panose="02040503050406030204" pitchFamily="18" charset="0"/>
+                          </a:rPr>
+                        </m:ctrlPr>
+                      </m:sSubPr>
+                      <m:e>
+                        <m:r>
+                          <a:rPr lang="en-US" b="0" i="1" smtClean="0">
+                            <a:latin typeface="Cambria Math" panose="02040503050406030204" pitchFamily="18" charset="0"/>
+                          </a:rPr>
+                          <m:t>𝑥</m:t>
+                        </m:r>
+                      </m:e>
+                      <m:sub>
+                        <m:r>
+                          <a:rPr lang="en-US" b="0" i="1" smtClean="0">
+                            <a:latin typeface="Cambria Math" panose="02040503050406030204" pitchFamily="18" charset="0"/>
+                          </a:rPr>
+                          <m:t>1</m:t>
+                        </m:r>
+                      </m:sub>
+                    </m:sSub>
+                  </m:oMath>
+                </a14:m>
+                <a:r>
+                  <a:rPr lang="en-US" dirty="0" smtClean="0"/>
+                  <a:t>, </a:t>
+                </a:r>
+                <a14:m>
+                  <m:oMath xmlns:m="http://schemas.openxmlformats.org/officeDocument/2006/math">
+                    <m:sSub>
+                      <m:sSubPr>
+                        <m:ctrlPr>
+                          <a:rPr lang="en-US" i="1">
+                            <a:latin typeface="Cambria Math" panose="02040503050406030204" pitchFamily="18" charset="0"/>
+                          </a:rPr>
+                        </m:ctrlPr>
+                      </m:sSubPr>
+                      <m:e>
+                        <m:r>
+                          <a:rPr lang="en-US" i="1">
+                            <a:latin typeface="Cambria Math" panose="02040503050406030204" pitchFamily="18" charset="0"/>
+                          </a:rPr>
+                          <m:t>𝑥</m:t>
+                        </m:r>
+                      </m:e>
+                      <m:sub>
+                        <m:r>
+                          <a:rPr lang="en-US" b="0" i="1" smtClean="0">
+                            <a:latin typeface="Cambria Math" panose="02040503050406030204" pitchFamily="18" charset="0"/>
+                          </a:rPr>
+                          <m:t>2</m:t>
+                        </m:r>
+                      </m:sub>
+                    </m:sSub>
+                  </m:oMath>
+                </a14:m>
+                <a:r>
+                  <a:rPr lang="en-US" dirty="0" smtClean="0"/>
+                  <a:t>, </a:t>
+                </a:r>
+                <a14:m>
+                  <m:oMath xmlns:m="http://schemas.openxmlformats.org/officeDocument/2006/math">
+                    <m:sSub>
+                      <m:sSubPr>
+                        <m:ctrlPr>
+                          <a:rPr lang="en-US" i="1">
+                            <a:latin typeface="Cambria Math" panose="02040503050406030204" pitchFamily="18" charset="0"/>
+                          </a:rPr>
+                        </m:ctrlPr>
+                      </m:sSubPr>
+                      <m:e>
+                        <m:r>
+                          <a:rPr lang="en-US" i="1">
+                            <a:latin typeface="Cambria Math" panose="02040503050406030204" pitchFamily="18" charset="0"/>
+                          </a:rPr>
+                          <m:t>𝑥</m:t>
+                        </m:r>
+                      </m:e>
+                      <m:sub>
+                        <m:r>
+                          <a:rPr lang="en-US" b="0" i="1" smtClean="0">
+                            <a:latin typeface="Cambria Math" panose="02040503050406030204" pitchFamily="18" charset="0"/>
+                          </a:rPr>
+                          <m:t>3</m:t>
+                        </m:r>
+                      </m:sub>
+                    </m:sSub>
+                  </m:oMath>
+                </a14:m>
+                <a:r>
+                  <a:rPr lang="en-US" dirty="0" smtClean="0"/>
+                  <a:t>,…,</a:t>
+                </a:r>
+                <a:r>
+                  <a:rPr lang="en-US" dirty="0"/>
+                  <a:t> </a:t>
+                </a:r>
+                <a14:m>
+                  <m:oMath xmlns:m="http://schemas.openxmlformats.org/officeDocument/2006/math">
+                    <m:sSub>
+                      <m:sSubPr>
+                        <m:ctrlPr>
+                          <a:rPr lang="en-US" i="1">
+                            <a:latin typeface="Cambria Math" panose="02040503050406030204" pitchFamily="18" charset="0"/>
+                          </a:rPr>
+                        </m:ctrlPr>
+                      </m:sSubPr>
+                      <m:e>
+                        <m:r>
+                          <a:rPr lang="en-US" i="1">
+                            <a:latin typeface="Cambria Math" panose="02040503050406030204" pitchFamily="18" charset="0"/>
+                          </a:rPr>
+                          <m:t>𝑥</m:t>
+                        </m:r>
+                      </m:e>
+                      <m:sub>
+                        <m:r>
+                          <a:rPr lang="en-US" b="0" i="1" smtClean="0">
+                            <a:latin typeface="Cambria Math" panose="02040503050406030204" pitchFamily="18" charset="0"/>
+                          </a:rPr>
+                          <m:t>𝑝</m:t>
+                        </m:r>
+                      </m:sub>
+                    </m:sSub>
+                  </m:oMath>
+                </a14:m>
+                <a:r>
+                  <a:rPr lang="en-US" dirty="0" smtClean="0"/>
+                  <a:t> produce a linear predictor </a:t>
+                </a:r>
+                <a14:m>
+                  <m:oMath xmlns:m="http://schemas.openxmlformats.org/officeDocument/2006/math">
+                    <m:r>
+                      <a:rPr lang="en-US" i="1" smtClean="0">
+                        <a:latin typeface="Cambria Math" panose="02040503050406030204" pitchFamily="18" charset="0"/>
+                        <a:ea typeface="Cambria Math" panose="02040503050406030204" pitchFamily="18" charset="0"/>
+                      </a:rPr>
+                      <m:t>𝜂</m:t>
+                    </m:r>
+                  </m:oMath>
+                </a14:m>
+                <a:r>
+                  <a:rPr lang="en-US" dirty="0" smtClean="0"/>
+                  <a:t> given by:</a:t>
+                </a:r>
+              </a:p>
+              <a:p>
+                <a:pPr marL="0" indent="0" algn="ctr">
+                  <a:buNone/>
+                </a:pPr>
+                <a14:m>
+                  <m:oMath xmlns:m="http://schemas.openxmlformats.org/officeDocument/2006/math">
+                    <m:r>
+                      <a:rPr lang="en-US" i="1">
+                        <a:latin typeface="Cambria Math" panose="02040503050406030204" pitchFamily="18" charset="0"/>
+                        <a:ea typeface="Cambria Math" panose="02040503050406030204" pitchFamily="18" charset="0"/>
+                      </a:rPr>
+                      <m:t>𝜂</m:t>
+                    </m:r>
+                    <m:r>
+                      <a:rPr lang="en-US" i="1">
+                        <a:latin typeface="Cambria Math" panose="02040503050406030204" pitchFamily="18" charset="0"/>
+                        <a:ea typeface="Cambria Math" panose="02040503050406030204" pitchFamily="18" charset="0"/>
+                      </a:rPr>
+                      <m:t>=</m:t>
+                    </m:r>
+                    <m:sSub>
+                      <m:sSubPr>
+                        <m:ctrlPr>
+                          <a:rPr lang="en-US" i="1">
+                            <a:latin typeface="Cambria Math" panose="02040503050406030204" pitchFamily="18" charset="0"/>
+                            <a:ea typeface="Cambria Math" panose="02040503050406030204" pitchFamily="18" charset="0"/>
+                          </a:rPr>
+                        </m:ctrlPr>
+                      </m:sSubPr>
+                      <m:e>
+                        <m:r>
+                          <a:rPr lang="en-US" i="1">
+                            <a:latin typeface="Cambria Math" panose="02040503050406030204" pitchFamily="18" charset="0"/>
+                            <a:ea typeface="Cambria Math" panose="02040503050406030204" pitchFamily="18" charset="0"/>
+                          </a:rPr>
+                          <m:t>𝛽</m:t>
+                        </m:r>
+                      </m:e>
+                      <m:sub>
+                        <m:r>
+                          <a:rPr lang="en-US" b="0" i="1" smtClean="0">
+                            <a:latin typeface="Cambria Math" panose="02040503050406030204" pitchFamily="18" charset="0"/>
+                            <a:ea typeface="Cambria Math" panose="02040503050406030204" pitchFamily="18" charset="0"/>
+                          </a:rPr>
+                          <m:t>1</m:t>
+                        </m:r>
+                      </m:sub>
+                    </m:sSub>
+                    <m:sSub>
+                      <m:sSubPr>
+                        <m:ctrlPr>
+                          <a:rPr lang="en-US" i="1">
+                            <a:latin typeface="Cambria Math" panose="02040503050406030204" pitchFamily="18" charset="0"/>
+                            <a:ea typeface="Cambria Math" panose="02040503050406030204" pitchFamily="18" charset="0"/>
+                          </a:rPr>
+                        </m:ctrlPr>
+                      </m:sSubPr>
+                      <m:e>
+                        <m:r>
+                          <a:rPr lang="en-US" i="1">
+                            <a:latin typeface="Cambria Math" panose="02040503050406030204" pitchFamily="18" charset="0"/>
+                            <a:ea typeface="Cambria Math" panose="02040503050406030204" pitchFamily="18" charset="0"/>
+                          </a:rPr>
+                          <m:t>𝑥</m:t>
+                        </m:r>
+                      </m:e>
+                      <m:sub>
+                        <m:r>
+                          <a:rPr lang="en-US" b="0" i="1" smtClean="0">
+                            <a:latin typeface="Cambria Math" panose="02040503050406030204" pitchFamily="18" charset="0"/>
+                            <a:ea typeface="Cambria Math" panose="02040503050406030204" pitchFamily="18" charset="0"/>
+                          </a:rPr>
+                          <m:t>1</m:t>
+                        </m:r>
+                      </m:sub>
+                    </m:sSub>
+                    <m:r>
+                      <a:rPr lang="en-US" b="0" i="1" smtClean="0">
+                        <a:latin typeface="Cambria Math" panose="02040503050406030204" pitchFamily="18" charset="0"/>
+                        <a:ea typeface="Cambria Math" panose="02040503050406030204" pitchFamily="18" charset="0"/>
+                      </a:rPr>
+                      <m:t>+</m:t>
+                    </m:r>
+                    <m:sSub>
+                      <m:sSubPr>
+                        <m:ctrlPr>
+                          <a:rPr lang="en-US" i="1">
+                            <a:latin typeface="Cambria Math" panose="02040503050406030204" pitchFamily="18" charset="0"/>
+                            <a:ea typeface="Cambria Math" panose="02040503050406030204" pitchFamily="18" charset="0"/>
+                          </a:rPr>
+                        </m:ctrlPr>
+                      </m:sSubPr>
+                      <m:e>
+                        <m:r>
+                          <a:rPr lang="en-US" i="1">
+                            <a:latin typeface="Cambria Math" panose="02040503050406030204" pitchFamily="18" charset="0"/>
+                            <a:ea typeface="Cambria Math" panose="02040503050406030204" pitchFamily="18" charset="0"/>
+                          </a:rPr>
+                          <m:t>𝛽</m:t>
+                        </m:r>
+                      </m:e>
+                      <m:sub>
+                        <m:r>
+                          <a:rPr lang="en-US" b="0" i="1" smtClean="0">
+                            <a:latin typeface="Cambria Math" panose="02040503050406030204" pitchFamily="18" charset="0"/>
+                            <a:ea typeface="Cambria Math" panose="02040503050406030204" pitchFamily="18" charset="0"/>
+                          </a:rPr>
+                          <m:t>2</m:t>
+                        </m:r>
+                      </m:sub>
+                    </m:sSub>
+                    <m:sSub>
+                      <m:sSubPr>
+                        <m:ctrlPr>
+                          <a:rPr lang="en-US" i="1">
+                            <a:latin typeface="Cambria Math" panose="02040503050406030204" pitchFamily="18" charset="0"/>
+                            <a:ea typeface="Cambria Math" panose="02040503050406030204" pitchFamily="18" charset="0"/>
+                          </a:rPr>
+                        </m:ctrlPr>
+                      </m:sSubPr>
+                      <m:e>
+                        <m:r>
+                          <a:rPr lang="en-US" i="1">
+                            <a:latin typeface="Cambria Math" panose="02040503050406030204" pitchFamily="18" charset="0"/>
+                            <a:ea typeface="Cambria Math" panose="02040503050406030204" pitchFamily="18" charset="0"/>
+                          </a:rPr>
+                          <m:t>𝑥</m:t>
+                        </m:r>
+                      </m:e>
+                      <m:sub>
+                        <m:r>
+                          <a:rPr lang="en-US" b="0" i="1" smtClean="0">
+                            <a:latin typeface="Cambria Math" panose="02040503050406030204" pitchFamily="18" charset="0"/>
+                            <a:ea typeface="Cambria Math" panose="02040503050406030204" pitchFamily="18" charset="0"/>
+                          </a:rPr>
+                          <m:t>2</m:t>
+                        </m:r>
+                      </m:sub>
+                    </m:sSub>
+                  </m:oMath>
+                </a14:m>
+                <a:r>
+                  <a:rPr lang="en-US" dirty="0" smtClean="0"/>
+                  <a:t>+</a:t>
+                </a:r>
+                <a14:m>
+                  <m:oMath xmlns:m="http://schemas.openxmlformats.org/officeDocument/2006/math">
+                    <m:sSub>
+                      <m:sSubPr>
+                        <m:ctrlPr>
+                          <a:rPr lang="en-US" i="1">
+                            <a:latin typeface="Cambria Math" panose="02040503050406030204" pitchFamily="18" charset="0"/>
+                            <a:ea typeface="Cambria Math" panose="02040503050406030204" pitchFamily="18" charset="0"/>
+                          </a:rPr>
+                        </m:ctrlPr>
+                      </m:sSubPr>
+                      <m:e>
+                        <m:r>
+                          <a:rPr lang="en-US" i="1">
+                            <a:latin typeface="Cambria Math" panose="02040503050406030204" pitchFamily="18" charset="0"/>
+                            <a:ea typeface="Cambria Math" panose="02040503050406030204" pitchFamily="18" charset="0"/>
+                          </a:rPr>
+                          <m:t>𝛽</m:t>
+                        </m:r>
+                      </m:e>
+                      <m:sub>
+                        <m:r>
+                          <a:rPr lang="en-US" b="0" i="1" smtClean="0">
+                            <a:latin typeface="Cambria Math" panose="02040503050406030204" pitchFamily="18" charset="0"/>
+                            <a:ea typeface="Cambria Math" panose="02040503050406030204" pitchFamily="18" charset="0"/>
+                          </a:rPr>
+                          <m:t>3</m:t>
+                        </m:r>
+                      </m:sub>
+                    </m:sSub>
+                    <m:sSub>
+                      <m:sSubPr>
+                        <m:ctrlPr>
+                          <a:rPr lang="en-US" i="1">
+                            <a:latin typeface="Cambria Math" panose="02040503050406030204" pitchFamily="18" charset="0"/>
+                            <a:ea typeface="Cambria Math" panose="02040503050406030204" pitchFamily="18" charset="0"/>
+                          </a:rPr>
+                        </m:ctrlPr>
+                      </m:sSubPr>
+                      <m:e>
+                        <m:r>
+                          <a:rPr lang="en-US" i="1">
+                            <a:latin typeface="Cambria Math" panose="02040503050406030204" pitchFamily="18" charset="0"/>
+                            <a:ea typeface="Cambria Math" panose="02040503050406030204" pitchFamily="18" charset="0"/>
+                          </a:rPr>
+                          <m:t>𝑥</m:t>
+                        </m:r>
+                      </m:e>
+                      <m:sub>
+                        <m:r>
+                          <a:rPr lang="en-US" b="0" i="1" smtClean="0">
+                            <a:latin typeface="Cambria Math" panose="02040503050406030204" pitchFamily="18" charset="0"/>
+                            <a:ea typeface="Cambria Math" panose="02040503050406030204" pitchFamily="18" charset="0"/>
+                          </a:rPr>
+                          <m:t>3</m:t>
+                        </m:r>
+                      </m:sub>
+                    </m:sSub>
+                  </m:oMath>
+                </a14:m>
+                <a:r>
+                  <a:rPr lang="en-US" dirty="0" smtClean="0"/>
+                  <a:t>+…+</a:t>
+                </a:r>
+                <a14:m>
+                  <m:oMath xmlns:m="http://schemas.openxmlformats.org/officeDocument/2006/math">
+                    <m:sSub>
+                      <m:sSubPr>
+                        <m:ctrlPr>
+                          <a:rPr lang="en-US" i="1">
+                            <a:latin typeface="Cambria Math" panose="02040503050406030204" pitchFamily="18" charset="0"/>
+                            <a:ea typeface="Cambria Math" panose="02040503050406030204" pitchFamily="18" charset="0"/>
+                          </a:rPr>
+                        </m:ctrlPr>
+                      </m:sSubPr>
+                      <m:e>
+                        <m:r>
+                          <a:rPr lang="en-US" i="1">
+                            <a:latin typeface="Cambria Math" panose="02040503050406030204" pitchFamily="18" charset="0"/>
+                            <a:ea typeface="Cambria Math" panose="02040503050406030204" pitchFamily="18" charset="0"/>
+                          </a:rPr>
+                          <m:t>𝛽</m:t>
+                        </m:r>
+                      </m:e>
+                      <m:sub>
+                        <m:r>
+                          <a:rPr lang="en-US" b="0" i="1" smtClean="0">
+                            <a:latin typeface="Cambria Math" panose="02040503050406030204" pitchFamily="18" charset="0"/>
+                            <a:ea typeface="Cambria Math" panose="02040503050406030204" pitchFamily="18" charset="0"/>
+                          </a:rPr>
+                          <m:t>𝑝</m:t>
+                        </m:r>
+                      </m:sub>
+                    </m:sSub>
+                    <m:sSub>
+                      <m:sSubPr>
+                        <m:ctrlPr>
+                          <a:rPr lang="en-US" i="1">
+                            <a:latin typeface="Cambria Math" panose="02040503050406030204" pitchFamily="18" charset="0"/>
+                            <a:ea typeface="Cambria Math" panose="02040503050406030204" pitchFamily="18" charset="0"/>
+                          </a:rPr>
+                        </m:ctrlPr>
+                      </m:sSubPr>
+                      <m:e>
+                        <m:r>
+                          <a:rPr lang="en-US" i="1">
+                            <a:latin typeface="Cambria Math" panose="02040503050406030204" pitchFamily="18" charset="0"/>
+                            <a:ea typeface="Cambria Math" panose="02040503050406030204" pitchFamily="18" charset="0"/>
+                          </a:rPr>
+                          <m:t>𝑥</m:t>
+                        </m:r>
+                      </m:e>
+                      <m:sub>
+                        <m:r>
+                          <a:rPr lang="en-US" b="0" i="1" smtClean="0">
+                            <a:latin typeface="Cambria Math" panose="02040503050406030204" pitchFamily="18" charset="0"/>
+                            <a:ea typeface="Cambria Math" panose="02040503050406030204" pitchFamily="18" charset="0"/>
+                          </a:rPr>
+                          <m:t>𝑝</m:t>
+                        </m:r>
+                      </m:sub>
+                    </m:sSub>
+                  </m:oMath>
+                </a14:m>
+                <a:endParaRPr lang="en-US" dirty="0" smtClean="0"/>
+              </a:p>
+              <a:p>
+                <a:pPr marL="0" indent="0">
+                  <a:buNone/>
+                </a:pPr>
+                <a:endParaRPr lang="en-US" dirty="0" smtClean="0"/>
+              </a:p>
+              <a:p>
+                <a:pPr marL="0" indent="0">
+                  <a:buNone/>
+                </a:pPr>
+                <a14:m>
+                  <m:oMathPara xmlns:m="http://schemas.openxmlformats.org/officeDocument/2006/math">
+                    <m:oMathParaPr>
+                      <m:jc m:val="centerGroup"/>
+                    </m:oMathParaPr>
+                    <m:oMath xmlns:m="http://schemas.openxmlformats.org/officeDocument/2006/math">
+                      <m:r>
+                        <a:rPr lang="en-US" i="1" smtClean="0">
+                          <a:latin typeface="Cambria Math" panose="02040503050406030204" pitchFamily="18" charset="0"/>
+                          <a:ea typeface="Cambria Math" panose="02040503050406030204" pitchFamily="18" charset="0"/>
+                        </a:rPr>
+                        <m:t>𝜂</m:t>
+                      </m:r>
+                      <m:r>
+                        <a:rPr lang="en-US" b="0" i="1" smtClean="0">
+                          <a:latin typeface="Cambria Math" panose="02040503050406030204" pitchFamily="18" charset="0"/>
+                          <a:ea typeface="Cambria Math" panose="02040503050406030204" pitchFamily="18" charset="0"/>
+                        </a:rPr>
+                        <m:t>=</m:t>
+                      </m:r>
+                      <m:nary>
+                        <m:naryPr>
+                          <m:chr m:val="∑"/>
+                          <m:ctrlPr>
+                            <a:rPr lang="en-US" b="0" i="1" smtClean="0">
+                              <a:latin typeface="Cambria Math" panose="02040503050406030204" pitchFamily="18" charset="0"/>
+                              <a:ea typeface="Cambria Math" panose="02040503050406030204" pitchFamily="18" charset="0"/>
+                            </a:rPr>
+                          </m:ctrlPr>
+                        </m:naryPr>
+                        <m:sub>
+                          <m:r>
+                            <m:rPr>
+                              <m:brk m:alnAt="23"/>
+                            </m:rPr>
+                            <a:rPr lang="en-US" b="0" i="1" smtClean="0">
+                              <a:latin typeface="Cambria Math" panose="02040503050406030204" pitchFamily="18" charset="0"/>
+                              <a:ea typeface="Cambria Math" panose="02040503050406030204" pitchFamily="18" charset="0"/>
+                            </a:rPr>
+                            <m:t>𝑗</m:t>
+                          </m:r>
+                          <m:r>
+                            <a:rPr lang="en-US" b="0" i="1" smtClean="0">
+                              <a:latin typeface="Cambria Math" panose="02040503050406030204" pitchFamily="18" charset="0"/>
+                              <a:ea typeface="Cambria Math" panose="02040503050406030204" pitchFamily="18" charset="0"/>
+                            </a:rPr>
+                            <m:t>=1</m:t>
+                          </m:r>
+                        </m:sub>
+                        <m:sup>
+                          <m:r>
+                            <a:rPr lang="en-US" b="0" i="1" smtClean="0">
+                              <a:latin typeface="Cambria Math" panose="02040503050406030204" pitchFamily="18" charset="0"/>
+                              <a:ea typeface="Cambria Math" panose="02040503050406030204" pitchFamily="18" charset="0"/>
+                            </a:rPr>
+                            <m:t>𝑝</m:t>
+                          </m:r>
+                        </m:sup>
+                        <m:e>
+                          <m:sSub>
+                            <m:sSubPr>
+                              <m:ctrlPr>
+                                <a:rPr lang="en-US" b="0" i="1" smtClean="0">
+                                  <a:latin typeface="Cambria Math" panose="02040503050406030204" pitchFamily="18" charset="0"/>
+                                  <a:ea typeface="Cambria Math" panose="02040503050406030204" pitchFamily="18" charset="0"/>
+                                </a:rPr>
+                              </m:ctrlPr>
+                            </m:sSubPr>
+                            <m:e>
+                              <m:r>
+                                <a:rPr lang="en-US" b="0" i="1" smtClean="0">
+                                  <a:latin typeface="Cambria Math" panose="02040503050406030204" pitchFamily="18" charset="0"/>
+                                  <a:ea typeface="Cambria Math" panose="02040503050406030204" pitchFamily="18" charset="0"/>
+                                </a:rPr>
+                                <m:t>𝛽</m:t>
+                              </m:r>
+                            </m:e>
+                            <m:sub>
+                              <m:r>
+                                <a:rPr lang="en-US" b="0" i="1" smtClean="0">
+                                  <a:latin typeface="Cambria Math" panose="02040503050406030204" pitchFamily="18" charset="0"/>
+                                  <a:ea typeface="Cambria Math" panose="02040503050406030204" pitchFamily="18" charset="0"/>
+                                </a:rPr>
+                                <m:t>𝑗</m:t>
+                              </m:r>
+                            </m:sub>
+                          </m:sSub>
+                          <m:sSub>
+                            <m:sSubPr>
+                              <m:ctrlPr>
+                                <a:rPr lang="en-US" b="0" i="1" smtClean="0">
+                                  <a:latin typeface="Cambria Math" panose="02040503050406030204" pitchFamily="18" charset="0"/>
+                                  <a:ea typeface="Cambria Math" panose="02040503050406030204" pitchFamily="18" charset="0"/>
+                                </a:rPr>
+                              </m:ctrlPr>
+                            </m:sSubPr>
+                            <m:e>
+                              <m:r>
+                                <a:rPr lang="en-US" b="0" i="1" smtClean="0">
+                                  <a:latin typeface="Cambria Math" panose="02040503050406030204" pitchFamily="18" charset="0"/>
+                                  <a:ea typeface="Cambria Math" panose="02040503050406030204" pitchFamily="18" charset="0"/>
+                                </a:rPr>
+                                <m:t>𝑥</m:t>
+                              </m:r>
+                            </m:e>
+                            <m:sub>
+                              <m:r>
+                                <a:rPr lang="en-US" b="0" i="1" smtClean="0">
+                                  <a:latin typeface="Cambria Math" panose="02040503050406030204" pitchFamily="18" charset="0"/>
+                                  <a:ea typeface="Cambria Math" panose="02040503050406030204" pitchFamily="18" charset="0"/>
+                                </a:rPr>
+                                <m:t>𝑗</m:t>
+                              </m:r>
+                            </m:sub>
+                          </m:sSub>
+                        </m:e>
+                      </m:nary>
+                    </m:oMath>
+                  </m:oMathPara>
+                </a14:m>
+                <a:endParaRPr lang="en-US" dirty="0"/>
+              </a:p>
+            </p:txBody>
+          </p:sp>
+        </mc:Choice>
+        <mc:Fallback>
+          <p:sp>
+            <p:nvSpPr>
+              <p:cNvPr id="3" name="Content Placeholder 2"/>
+              <p:cNvSpPr>
+                <a:spLocks noGrp="1" noRot="1" noChangeAspect="1" noMove="1" noResize="1" noEditPoints="1" noAdjustHandles="1" noChangeArrowheads="1" noChangeShapeType="1" noTextEdit="1"/>
+              </p:cNvSpPr>
+              <p:nvPr>
+                <p:ph idx="1"/>
+              </p:nvPr>
+            </p:nvSpPr>
+            <p:spPr>
+              <a:blipFill>
+                <a:blip r:embed="rId2"/>
+                <a:stretch>
+                  <a:fillRect l="-1217" t="-1961"/>
+                </a:stretch>
+              </a:blipFill>
+            </p:spPr>
+            <p:txBody>
+              <a:bodyPr/>
+              <a:lstStyle/>
+              <a:p>
+                <a:r>
+                  <a:rPr lang="en-US">
+                    <a:noFill/>
+                  </a:rPr>
+                  <a:t> </a:t>
+                </a:r>
+              </a:p>
+            </p:txBody>
+          </p:sp>
+        </mc:Fallback>
+      </mc:AlternateContent>
+    </p:spTree>
+    <p:extLst>
+      <p:ext uri="{BB962C8B-B14F-4D97-AF65-F5344CB8AC3E}">
+        <p14:creationId xmlns:p14="http://schemas.microsoft.com/office/powerpoint/2010/main" val="1028513449"/>
+      </p:ext>
+    </p:extLst>
+  </p:cSld>
+  <p:clrMapOvr>
+    <a:masterClrMapping/>
+  </p:clrMapOvr>
+</p:sld>
+</file>
+
+<file path=ppt/slides/slide16.xml><?xml version="1.0" encoding="utf-8"?>
+<p:sld xmlns:a="http://schemas.openxmlformats.org/drawingml/2006/main" xmlns:r="http://schemas.openxmlformats.org/officeDocument/2006/relationships" xmlns:p="http://schemas.openxmlformats.org/presentationml/2006/main">
+  <p:cSld>
+    <p:spTree>
+      <p:nvGrpSpPr>
+        <p:cNvPr id="1" name=""/>
+        <p:cNvGrpSpPr/>
+        <p:nvPr/>
+      </p:nvGrpSpPr>
+      <p:grpSpPr>
+        <a:xfrm>
+          <a:off x="0" y="0"/>
+          <a:ext cx="0" cy="0"/>
+          <a:chOff x="0" y="0"/>
+          <a:chExt cx="0" cy="0"/>
+        </a:xfrm>
+      </p:grpSpPr>
+      <p:sp>
+        <p:nvSpPr>
+          <p:cNvPr id="2" name="Title 1"/>
+          <p:cNvSpPr>
+            <a:spLocks noGrp="1"/>
+          </p:cNvSpPr>
+          <p:nvPr>
+            <p:ph type="title"/>
+          </p:nvPr>
+        </p:nvSpPr>
+        <p:spPr/>
+        <p:txBody>
+          <a:bodyPr/>
+          <a:lstStyle/>
+          <a:p>
+            <a:r>
+              <a:rPr lang="en-US" dirty="0" smtClean="0"/>
+              <a:t>Link Function</a:t>
+            </a:r>
+            <a:endParaRPr lang="en-US" dirty="0"/>
+          </a:p>
+        </p:txBody>
+      </p:sp>
+      <mc:AlternateContent xmlns:mc="http://schemas.openxmlformats.org/markup-compatibility/2006">
+        <mc:Choice xmlns:a14="http://schemas.microsoft.com/office/drawing/2010/main" Requires="a14">
+          <p:sp>
+            <p:nvSpPr>
+              <p:cNvPr id="3" name="Content Placeholder 2"/>
+              <p:cNvSpPr>
+                <a:spLocks noGrp="1"/>
+              </p:cNvSpPr>
+              <p:nvPr>
+                <p:ph idx="1"/>
+              </p:nvPr>
+            </p:nvSpPr>
+            <p:spPr>
+              <a:xfrm>
+                <a:off x="838200" y="1347829"/>
+                <a:ext cx="10515600" cy="4351338"/>
+              </a:xfrm>
+            </p:spPr>
+            <p:txBody>
+              <a:bodyPr/>
+              <a:lstStyle/>
+              <a:p>
+                <a:pPr marL="228600" lvl="3"/>
+                <a:r>
+                  <a:rPr lang="en-US" dirty="0" smtClean="0"/>
+                  <a:t>Purpose </a:t>
+                </a:r>
+                <a:r>
+                  <a:rPr lang="en-US" dirty="0"/>
+                  <a:t>(in English)</a:t>
+                </a:r>
+              </a:p>
+              <a:p>
+                <a:pPr marL="685800" lvl="5"/>
+                <a:r>
+                  <a:rPr lang="en-US" dirty="0"/>
+                  <a:t>Relates the expected value of the response </a:t>
+                </a:r>
+                <a:r>
+                  <a:rPr lang="en-US" dirty="0" smtClean="0"/>
+                  <a:t>variable, </a:t>
+                </a:r>
+                <a14:m>
+                  <m:oMath xmlns:m="http://schemas.openxmlformats.org/officeDocument/2006/math">
+                    <m:sSub>
+                      <m:sSubPr>
+                        <m:ctrlPr>
+                          <a:rPr lang="en-US" i="1">
+                            <a:latin typeface="Cambria Math" panose="02040503050406030204" pitchFamily="18" charset="0"/>
+                          </a:rPr>
+                        </m:ctrlPr>
+                      </m:sSubPr>
+                      <m:e>
+                        <m:r>
+                          <a:rPr lang="en-US" i="1">
+                            <a:latin typeface="Cambria Math" panose="02040503050406030204" pitchFamily="18" charset="0"/>
+                            <a:ea typeface="Cambria Math" panose="02040503050406030204" pitchFamily="18" charset="0"/>
+                          </a:rPr>
+                          <m:t>𝜇</m:t>
+                        </m:r>
+                      </m:e>
+                      <m:sub>
+                        <m:r>
+                          <a:rPr lang="en-US" i="1">
+                            <a:latin typeface="Cambria Math" panose="02040503050406030204" pitchFamily="18" charset="0"/>
+                          </a:rPr>
+                          <m:t>𝑖</m:t>
+                        </m:r>
+                      </m:sub>
+                    </m:sSub>
+                    <m:r>
+                      <a:rPr lang="en-US" i="1">
+                        <a:latin typeface="Cambria Math" panose="02040503050406030204" pitchFamily="18" charset="0"/>
+                        <a:ea typeface="Cambria Math" panose="02040503050406030204" pitchFamily="18" charset="0"/>
+                      </a:rPr>
+                      <m:t>≡</m:t>
+                    </m:r>
+                    <m:r>
+                      <a:rPr lang="en-US" i="1">
+                        <a:latin typeface="Cambria Math" panose="02040503050406030204" pitchFamily="18" charset="0"/>
+                        <a:ea typeface="Cambria Math" panose="02040503050406030204" pitchFamily="18" charset="0"/>
+                      </a:rPr>
+                      <m:t>𝔼</m:t>
+                    </m:r>
+                    <m:d>
+                      <m:dPr>
+                        <m:ctrlPr>
+                          <a:rPr lang="en-US" i="1">
+                            <a:latin typeface="Cambria Math" panose="02040503050406030204" pitchFamily="18" charset="0"/>
+                            <a:ea typeface="Cambria Math" panose="02040503050406030204" pitchFamily="18" charset="0"/>
+                          </a:rPr>
+                        </m:ctrlPr>
+                      </m:dPr>
+                      <m:e>
+                        <m:sSub>
+                          <m:sSubPr>
+                            <m:ctrlPr>
+                              <a:rPr lang="en-US" i="1">
+                                <a:latin typeface="Cambria Math" panose="02040503050406030204" pitchFamily="18" charset="0"/>
+                              </a:rPr>
+                            </m:ctrlPr>
+                          </m:sSubPr>
+                          <m:e>
+                            <m:r>
+                              <a:rPr lang="en-US" i="1">
+                                <a:latin typeface="Cambria Math" panose="02040503050406030204" pitchFamily="18" charset="0"/>
+                              </a:rPr>
+                              <m:t>𝑌</m:t>
+                            </m:r>
+                          </m:e>
+                          <m:sub>
+                            <m:r>
+                              <a:rPr lang="en-US" i="1">
+                                <a:latin typeface="Cambria Math" panose="02040503050406030204" pitchFamily="18" charset="0"/>
+                              </a:rPr>
+                              <m:t>𝑖</m:t>
+                            </m:r>
+                          </m:sub>
+                        </m:sSub>
+                      </m:e>
+                    </m:d>
+                  </m:oMath>
+                </a14:m>
+                <a:r>
+                  <a:rPr lang="en-US" dirty="0" smtClean="0"/>
+                  <a:t>, </a:t>
+                </a:r>
+                <a:r>
+                  <a:rPr lang="en-US" dirty="0"/>
+                  <a:t>to the </a:t>
+                </a:r>
+                <a:r>
+                  <a:rPr lang="en-US" dirty="0" smtClean="0"/>
+                  <a:t>data</a:t>
+                </a:r>
+              </a:p>
+              <a:p>
+                <a:pPr marL="457200" lvl="5" indent="0">
+                  <a:buNone/>
+                </a:pPr>
+                <a14:m>
+                  <m:oMathPara xmlns:m="http://schemas.openxmlformats.org/officeDocument/2006/math">
+                    <m:oMathParaPr>
+                      <m:jc m:val="centerGroup"/>
+                    </m:oMathParaPr>
+                    <m:oMath xmlns:m="http://schemas.openxmlformats.org/officeDocument/2006/math">
+                      <m:r>
+                        <a:rPr lang="en-US" b="0" i="1" smtClean="0">
+                          <a:latin typeface="Cambria Math" panose="02040503050406030204" pitchFamily="18" charset="0"/>
+                        </a:rPr>
+                        <m:t>𝑔</m:t>
+                      </m:r>
+                      <m:d>
+                        <m:dPr>
+                          <m:ctrlPr>
+                            <a:rPr lang="en-US" b="0" i="1" smtClean="0">
+                              <a:latin typeface="Cambria Math" panose="02040503050406030204" pitchFamily="18" charset="0"/>
+                            </a:rPr>
+                          </m:ctrlPr>
+                        </m:dPr>
+                        <m:e>
+                          <m:sSub>
+                            <m:sSubPr>
+                              <m:ctrlPr>
+                                <a:rPr lang="en-US" i="1">
+                                  <a:latin typeface="Cambria Math" panose="02040503050406030204" pitchFamily="18" charset="0"/>
+                                </a:rPr>
+                              </m:ctrlPr>
+                            </m:sSubPr>
+                            <m:e>
+                              <m:r>
+                                <a:rPr lang="en-US" i="1">
+                                  <a:latin typeface="Cambria Math" panose="02040503050406030204" pitchFamily="18" charset="0"/>
+                                  <a:ea typeface="Cambria Math" panose="02040503050406030204" pitchFamily="18" charset="0"/>
+                                </a:rPr>
+                                <m:t>𝜇</m:t>
+                              </m:r>
+                            </m:e>
+                            <m:sub>
+                              <m:r>
+                                <a:rPr lang="en-US" i="1">
+                                  <a:latin typeface="Cambria Math" panose="02040503050406030204" pitchFamily="18" charset="0"/>
+                                </a:rPr>
+                                <m:t>𝑖</m:t>
+                              </m:r>
+                            </m:sub>
+                          </m:sSub>
+                        </m:e>
+                      </m:d>
+                      <m:r>
+                        <a:rPr lang="en-US" b="0" i="1" smtClean="0">
+                          <a:latin typeface="Cambria Math" panose="02040503050406030204" pitchFamily="18" charset="0"/>
+                        </a:rPr>
+                        <m:t>=</m:t>
+                      </m:r>
+                      <m:sSub>
+                        <m:sSubPr>
+                          <m:ctrlPr>
+                            <a:rPr lang="en-US" b="0" i="1" smtClean="0">
+                              <a:latin typeface="Cambria Math" panose="02040503050406030204" pitchFamily="18" charset="0"/>
+                            </a:rPr>
+                          </m:ctrlPr>
+                        </m:sSubPr>
+                        <m:e>
+                          <m:r>
+                            <a:rPr lang="en-US" b="0" i="1" smtClean="0">
+                              <a:latin typeface="Cambria Math" panose="02040503050406030204" pitchFamily="18" charset="0"/>
+                              <a:ea typeface="Cambria Math" panose="02040503050406030204" pitchFamily="18" charset="0"/>
+                            </a:rPr>
+                            <m:t>𝜂</m:t>
+                          </m:r>
+                        </m:e>
+                        <m:sub>
+                          <m:r>
+                            <a:rPr lang="en-US" b="0" i="1" smtClean="0">
+                              <a:latin typeface="Cambria Math" panose="02040503050406030204" pitchFamily="18" charset="0"/>
+                            </a:rPr>
+                            <m:t>𝑖</m:t>
+                          </m:r>
+                        </m:sub>
+                      </m:sSub>
+                      <m:r>
+                        <a:rPr lang="en-US" b="0" i="1" smtClean="0">
+                          <a:latin typeface="Cambria Math" panose="02040503050406030204" pitchFamily="18" charset="0"/>
+                        </a:rPr>
+                        <m:t>=</m:t>
+                      </m:r>
+                      <m:sSub>
+                        <m:sSubPr>
+                          <m:ctrlPr>
+                            <a:rPr lang="en-US" i="1">
+                              <a:latin typeface="Cambria Math" panose="02040503050406030204" pitchFamily="18" charset="0"/>
+                              <a:ea typeface="Cambria Math" panose="02040503050406030204" pitchFamily="18" charset="0"/>
+                            </a:rPr>
+                          </m:ctrlPr>
+                        </m:sSubPr>
+                        <m:e>
+                          <m:r>
+                            <a:rPr lang="en-US" i="1">
+                              <a:latin typeface="Cambria Math" panose="02040503050406030204" pitchFamily="18" charset="0"/>
+                              <a:ea typeface="Cambria Math" panose="02040503050406030204" pitchFamily="18" charset="0"/>
+                            </a:rPr>
+                            <m:t>𝛽</m:t>
+                          </m:r>
+                        </m:e>
+                        <m:sub>
+                          <m:r>
+                            <a:rPr lang="en-US" i="1">
+                              <a:latin typeface="Cambria Math" panose="02040503050406030204" pitchFamily="18" charset="0"/>
+                              <a:ea typeface="Cambria Math" panose="02040503050406030204" pitchFamily="18" charset="0"/>
+                            </a:rPr>
+                            <m:t>1</m:t>
+                          </m:r>
+                        </m:sub>
+                      </m:sSub>
+                      <m:sSub>
+                        <m:sSubPr>
+                          <m:ctrlPr>
+                            <a:rPr lang="en-US" i="1">
+                              <a:latin typeface="Cambria Math" panose="02040503050406030204" pitchFamily="18" charset="0"/>
+                              <a:ea typeface="Cambria Math" panose="02040503050406030204" pitchFamily="18" charset="0"/>
+                            </a:rPr>
+                          </m:ctrlPr>
+                        </m:sSubPr>
+                        <m:e>
+                          <m:r>
+                            <a:rPr lang="en-US" i="1">
+                              <a:latin typeface="Cambria Math" panose="02040503050406030204" pitchFamily="18" charset="0"/>
+                              <a:ea typeface="Cambria Math" panose="02040503050406030204" pitchFamily="18" charset="0"/>
+                            </a:rPr>
+                            <m:t>𝑥</m:t>
+                          </m:r>
+                        </m:e>
+                        <m:sub>
+                          <m:r>
+                            <a:rPr lang="en-US" i="1">
+                              <a:latin typeface="Cambria Math" panose="02040503050406030204" pitchFamily="18" charset="0"/>
+                              <a:ea typeface="Cambria Math" panose="02040503050406030204" pitchFamily="18" charset="0"/>
+                            </a:rPr>
+                            <m:t>1</m:t>
+                          </m:r>
+                          <m:r>
+                            <a:rPr lang="en-US" b="0" i="1" smtClean="0">
+                              <a:latin typeface="Cambria Math" panose="02040503050406030204" pitchFamily="18" charset="0"/>
+                              <a:ea typeface="Cambria Math" panose="02040503050406030204" pitchFamily="18" charset="0"/>
+                            </a:rPr>
+                            <m:t>𝑖</m:t>
+                          </m:r>
+                        </m:sub>
+                      </m:sSub>
+                      <m:r>
+                        <a:rPr lang="en-US" i="1">
+                          <a:latin typeface="Cambria Math" panose="02040503050406030204" pitchFamily="18" charset="0"/>
+                          <a:ea typeface="Cambria Math" panose="02040503050406030204" pitchFamily="18" charset="0"/>
+                        </a:rPr>
+                        <m:t>+</m:t>
+                      </m:r>
+                      <m:sSub>
+                        <m:sSubPr>
+                          <m:ctrlPr>
+                            <a:rPr lang="en-US" i="1">
+                              <a:latin typeface="Cambria Math" panose="02040503050406030204" pitchFamily="18" charset="0"/>
+                              <a:ea typeface="Cambria Math" panose="02040503050406030204" pitchFamily="18" charset="0"/>
+                            </a:rPr>
+                          </m:ctrlPr>
+                        </m:sSubPr>
+                        <m:e>
+                          <m:r>
+                            <a:rPr lang="en-US" i="1">
+                              <a:latin typeface="Cambria Math" panose="02040503050406030204" pitchFamily="18" charset="0"/>
+                              <a:ea typeface="Cambria Math" panose="02040503050406030204" pitchFamily="18" charset="0"/>
+                            </a:rPr>
+                            <m:t>𝛽</m:t>
+                          </m:r>
+                        </m:e>
+                        <m:sub>
+                          <m:r>
+                            <a:rPr lang="en-US" i="1">
+                              <a:latin typeface="Cambria Math" panose="02040503050406030204" pitchFamily="18" charset="0"/>
+                              <a:ea typeface="Cambria Math" panose="02040503050406030204" pitchFamily="18" charset="0"/>
+                            </a:rPr>
+                            <m:t>2</m:t>
+                          </m:r>
+                        </m:sub>
+                      </m:sSub>
+                      <m:sSub>
+                        <m:sSubPr>
+                          <m:ctrlPr>
+                            <a:rPr lang="en-US" i="1">
+                              <a:latin typeface="Cambria Math" panose="02040503050406030204" pitchFamily="18" charset="0"/>
+                              <a:ea typeface="Cambria Math" panose="02040503050406030204" pitchFamily="18" charset="0"/>
+                            </a:rPr>
+                          </m:ctrlPr>
+                        </m:sSubPr>
+                        <m:e>
+                          <m:r>
+                            <a:rPr lang="en-US" i="1">
+                              <a:latin typeface="Cambria Math" panose="02040503050406030204" pitchFamily="18" charset="0"/>
+                              <a:ea typeface="Cambria Math" panose="02040503050406030204" pitchFamily="18" charset="0"/>
+                            </a:rPr>
+                            <m:t>𝑥</m:t>
+                          </m:r>
+                        </m:e>
+                        <m:sub>
+                          <m:r>
+                            <a:rPr lang="en-US" i="1">
+                              <a:latin typeface="Cambria Math" panose="02040503050406030204" pitchFamily="18" charset="0"/>
+                              <a:ea typeface="Cambria Math" panose="02040503050406030204" pitchFamily="18" charset="0"/>
+                            </a:rPr>
+                            <m:t>2</m:t>
+                          </m:r>
+                          <m:r>
+                            <a:rPr lang="en-US" b="0" i="1" smtClean="0">
+                              <a:latin typeface="Cambria Math" panose="02040503050406030204" pitchFamily="18" charset="0"/>
+                              <a:ea typeface="Cambria Math" panose="02040503050406030204" pitchFamily="18" charset="0"/>
+                            </a:rPr>
+                            <m:t>𝑖</m:t>
+                          </m:r>
+                        </m:sub>
+                      </m:sSub>
+                      <m:r>
+                        <m:rPr>
+                          <m:nor/>
+                        </m:rPr>
+                        <a:rPr lang="en-US" dirty="0"/>
+                        <m:t>+</m:t>
+                      </m:r>
+                      <m:sSub>
+                        <m:sSubPr>
+                          <m:ctrlPr>
+                            <a:rPr lang="en-US" i="1">
+                              <a:latin typeface="Cambria Math" panose="02040503050406030204" pitchFamily="18" charset="0"/>
+                              <a:ea typeface="Cambria Math" panose="02040503050406030204" pitchFamily="18" charset="0"/>
+                            </a:rPr>
+                          </m:ctrlPr>
+                        </m:sSubPr>
+                        <m:e>
+                          <m:r>
+                            <a:rPr lang="en-US" i="1">
+                              <a:latin typeface="Cambria Math" panose="02040503050406030204" pitchFamily="18" charset="0"/>
+                              <a:ea typeface="Cambria Math" panose="02040503050406030204" pitchFamily="18" charset="0"/>
+                            </a:rPr>
+                            <m:t>𝛽</m:t>
+                          </m:r>
+                        </m:e>
+                        <m:sub>
+                          <m:r>
+                            <a:rPr lang="en-US" i="1">
+                              <a:latin typeface="Cambria Math" panose="02040503050406030204" pitchFamily="18" charset="0"/>
+                              <a:ea typeface="Cambria Math" panose="02040503050406030204" pitchFamily="18" charset="0"/>
+                            </a:rPr>
+                            <m:t>3</m:t>
+                          </m:r>
+                        </m:sub>
+                      </m:sSub>
+                      <m:sSub>
+                        <m:sSubPr>
+                          <m:ctrlPr>
+                            <a:rPr lang="en-US" i="1">
+                              <a:latin typeface="Cambria Math" panose="02040503050406030204" pitchFamily="18" charset="0"/>
+                              <a:ea typeface="Cambria Math" panose="02040503050406030204" pitchFamily="18" charset="0"/>
+                            </a:rPr>
+                          </m:ctrlPr>
+                        </m:sSubPr>
+                        <m:e>
+                          <m:r>
+                            <a:rPr lang="en-US" i="1">
+                              <a:latin typeface="Cambria Math" panose="02040503050406030204" pitchFamily="18" charset="0"/>
+                              <a:ea typeface="Cambria Math" panose="02040503050406030204" pitchFamily="18" charset="0"/>
+                            </a:rPr>
+                            <m:t>𝑥</m:t>
+                          </m:r>
+                        </m:e>
+                        <m:sub>
+                          <m:r>
+                            <a:rPr lang="en-US" i="1">
+                              <a:latin typeface="Cambria Math" panose="02040503050406030204" pitchFamily="18" charset="0"/>
+                              <a:ea typeface="Cambria Math" panose="02040503050406030204" pitchFamily="18" charset="0"/>
+                            </a:rPr>
+                            <m:t>3</m:t>
+                          </m:r>
+                          <m:r>
+                            <a:rPr lang="en-US" b="0" i="1" smtClean="0">
+                              <a:latin typeface="Cambria Math" panose="02040503050406030204" pitchFamily="18" charset="0"/>
+                              <a:ea typeface="Cambria Math" panose="02040503050406030204" pitchFamily="18" charset="0"/>
+                            </a:rPr>
+                            <m:t>𝑖</m:t>
+                          </m:r>
+                        </m:sub>
+                      </m:sSub>
+                      <m:r>
+                        <m:rPr>
+                          <m:nor/>
+                        </m:rPr>
+                        <a:rPr lang="en-US" dirty="0"/>
+                        <m:t>+…+</m:t>
+                      </m:r>
+                      <m:sSub>
+                        <m:sSubPr>
+                          <m:ctrlPr>
+                            <a:rPr lang="en-US" i="1">
+                              <a:latin typeface="Cambria Math" panose="02040503050406030204" pitchFamily="18" charset="0"/>
+                              <a:ea typeface="Cambria Math" panose="02040503050406030204" pitchFamily="18" charset="0"/>
+                            </a:rPr>
+                          </m:ctrlPr>
+                        </m:sSubPr>
+                        <m:e>
+                          <m:r>
+                            <a:rPr lang="en-US" i="1">
+                              <a:latin typeface="Cambria Math" panose="02040503050406030204" pitchFamily="18" charset="0"/>
+                              <a:ea typeface="Cambria Math" panose="02040503050406030204" pitchFamily="18" charset="0"/>
+                            </a:rPr>
+                            <m:t>𝛽</m:t>
+                          </m:r>
+                        </m:e>
+                        <m:sub>
+                          <m:r>
+                            <a:rPr lang="en-US" i="1">
+                              <a:latin typeface="Cambria Math" panose="02040503050406030204" pitchFamily="18" charset="0"/>
+                              <a:ea typeface="Cambria Math" panose="02040503050406030204" pitchFamily="18" charset="0"/>
+                            </a:rPr>
+                            <m:t>𝑝</m:t>
+                          </m:r>
+                        </m:sub>
+                      </m:sSub>
+                      <m:sSub>
+                        <m:sSubPr>
+                          <m:ctrlPr>
+                            <a:rPr lang="en-US" i="1">
+                              <a:latin typeface="Cambria Math" panose="02040503050406030204" pitchFamily="18" charset="0"/>
+                              <a:ea typeface="Cambria Math" panose="02040503050406030204" pitchFamily="18" charset="0"/>
+                            </a:rPr>
+                          </m:ctrlPr>
+                        </m:sSubPr>
+                        <m:e>
+                          <m:r>
+                            <a:rPr lang="en-US" i="1">
+                              <a:latin typeface="Cambria Math" panose="02040503050406030204" pitchFamily="18" charset="0"/>
+                              <a:ea typeface="Cambria Math" panose="02040503050406030204" pitchFamily="18" charset="0"/>
+                            </a:rPr>
+                            <m:t>𝑥</m:t>
+                          </m:r>
+                        </m:e>
+                        <m:sub>
+                          <m:r>
+                            <a:rPr lang="en-US" i="1">
+                              <a:latin typeface="Cambria Math" panose="02040503050406030204" pitchFamily="18" charset="0"/>
+                              <a:ea typeface="Cambria Math" panose="02040503050406030204" pitchFamily="18" charset="0"/>
+                            </a:rPr>
+                            <m:t>𝑝</m:t>
+                          </m:r>
+                          <m:r>
+                            <a:rPr lang="en-US" b="0" i="1" smtClean="0">
+                              <a:latin typeface="Cambria Math" panose="02040503050406030204" pitchFamily="18" charset="0"/>
+                              <a:ea typeface="Cambria Math" panose="02040503050406030204" pitchFamily="18" charset="0"/>
+                            </a:rPr>
+                            <m:t>𝑖</m:t>
+                          </m:r>
+                        </m:sub>
+                      </m:sSub>
+                    </m:oMath>
+                  </m:oMathPara>
+                </a14:m>
+                <a:endParaRPr lang="en-US" dirty="0" smtClean="0"/>
+              </a:p>
+              <a:p>
+                <a:pPr marL="457200" lvl="5" indent="0">
+                  <a:buNone/>
+                </a:pPr>
+                <a:endParaRPr lang="en-US" dirty="0"/>
+              </a:p>
+              <a:p>
+                <a:pPr marL="685800" lvl="5"/>
+                <a:r>
+                  <a:rPr lang="en-US" dirty="0" smtClean="0"/>
+                  <a:t>In other words, the </a:t>
+                </a:r>
+                <a:r>
+                  <a:rPr lang="en-US" dirty="0"/>
+                  <a:t>purpose of the link function is to tame the response variable to restrict it to the correct scale when it is a function of </a:t>
+                </a:r>
+                <a:r>
+                  <a:rPr lang="en-US" dirty="0" smtClean="0"/>
+                  <a:t>the linear predictor</a:t>
+                </a:r>
+              </a:p>
+              <a:p>
+                <a:pPr marL="228600" lvl="4"/>
+                <a:r>
+                  <a:rPr lang="en-US" dirty="0"/>
+                  <a:t>Mathematical </a:t>
+                </a:r>
+                <a:r>
+                  <a:rPr lang="en-US" dirty="0" smtClean="0"/>
+                  <a:t>notation</a:t>
+                </a:r>
+              </a:p>
+              <a:p>
+                <a:pPr marL="0" lvl="4" indent="0">
+                  <a:buNone/>
+                </a:pPr>
+                <a14:m>
+                  <m:oMathPara xmlns:m="http://schemas.openxmlformats.org/officeDocument/2006/math">
+                    <m:oMathParaPr>
+                      <m:jc m:val="centerGroup"/>
+                    </m:oMathParaPr>
+                    <m:oMath xmlns:m="http://schemas.openxmlformats.org/officeDocument/2006/math">
+                      <m:r>
+                        <a:rPr lang="en-US" i="1">
+                          <a:latin typeface="Cambria Math" panose="02040503050406030204" pitchFamily="18" charset="0"/>
+                        </a:rPr>
+                        <m:t>𝑔</m:t>
+                      </m:r>
+                      <m:d>
+                        <m:dPr>
+                          <m:ctrlPr>
+                            <a:rPr lang="en-US" i="1">
+                              <a:latin typeface="Cambria Math" panose="02040503050406030204" pitchFamily="18" charset="0"/>
+                            </a:rPr>
+                          </m:ctrlPr>
+                        </m:dPr>
+                        <m:e>
+                          <m:sSub>
+                            <m:sSubPr>
+                              <m:ctrlPr>
+                                <a:rPr lang="en-US" i="1">
+                                  <a:latin typeface="Cambria Math" panose="02040503050406030204" pitchFamily="18" charset="0"/>
+                                </a:rPr>
+                              </m:ctrlPr>
+                            </m:sSubPr>
+                            <m:e>
+                              <m:r>
+                                <a:rPr lang="en-US" i="1">
+                                  <a:latin typeface="Cambria Math" panose="02040503050406030204" pitchFamily="18" charset="0"/>
+                                  <a:ea typeface="Cambria Math" panose="02040503050406030204" pitchFamily="18" charset="0"/>
+                                </a:rPr>
+                                <m:t>𝜇</m:t>
+                              </m:r>
+                            </m:e>
+                            <m:sub>
+                              <m:r>
+                                <a:rPr lang="en-US" i="1">
+                                  <a:latin typeface="Cambria Math" panose="02040503050406030204" pitchFamily="18" charset="0"/>
+                                </a:rPr>
+                                <m:t>𝑖</m:t>
+                              </m:r>
+                            </m:sub>
+                          </m:sSub>
+                        </m:e>
+                      </m:d>
+                      <m:r>
+                        <a:rPr lang="en-US" b="0" i="1" smtClean="0">
+                          <a:latin typeface="Cambria Math" panose="02040503050406030204" pitchFamily="18" charset="0"/>
+                        </a:rPr>
+                        <m:t>=</m:t>
+                      </m:r>
+                      <m:r>
+                        <a:rPr lang="en-US" b="0" i="1" smtClean="0">
+                          <a:latin typeface="Cambria Math" panose="02040503050406030204" pitchFamily="18" charset="0"/>
+                        </a:rPr>
+                        <m:t>𝑔</m:t>
+                      </m:r>
+                      <m:d>
+                        <m:dPr>
+                          <m:begChr m:val="["/>
+                          <m:endChr m:val="]"/>
+                          <m:ctrlPr>
+                            <a:rPr lang="en-US" b="0" i="1" smtClean="0">
+                              <a:latin typeface="Cambria Math" panose="02040503050406030204" pitchFamily="18" charset="0"/>
+                            </a:rPr>
+                          </m:ctrlPr>
+                        </m:dPr>
+                        <m:e>
+                          <m:r>
+                            <a:rPr lang="en-US" i="1">
+                              <a:latin typeface="Cambria Math" panose="02040503050406030204" pitchFamily="18" charset="0"/>
+                              <a:ea typeface="Cambria Math" panose="02040503050406030204" pitchFamily="18" charset="0"/>
+                            </a:rPr>
+                            <m:t>𝔼</m:t>
+                          </m:r>
+                          <m:d>
+                            <m:dPr>
+                              <m:ctrlPr>
+                                <a:rPr lang="en-US" i="1">
+                                  <a:latin typeface="Cambria Math" panose="02040503050406030204" pitchFamily="18" charset="0"/>
+                                  <a:ea typeface="Cambria Math" panose="02040503050406030204" pitchFamily="18" charset="0"/>
+                                </a:rPr>
+                              </m:ctrlPr>
+                            </m:dPr>
+                            <m:e>
+                              <m:sSub>
+                                <m:sSubPr>
+                                  <m:ctrlPr>
+                                    <a:rPr lang="en-US" i="1">
+                                      <a:latin typeface="Cambria Math" panose="02040503050406030204" pitchFamily="18" charset="0"/>
+                                    </a:rPr>
+                                  </m:ctrlPr>
+                                </m:sSubPr>
+                                <m:e>
+                                  <m:r>
+                                    <a:rPr lang="en-US" i="1">
+                                      <a:latin typeface="Cambria Math" panose="02040503050406030204" pitchFamily="18" charset="0"/>
+                                    </a:rPr>
+                                    <m:t>𝑌</m:t>
+                                  </m:r>
+                                </m:e>
+                                <m:sub>
+                                  <m:r>
+                                    <a:rPr lang="en-US" i="1">
+                                      <a:latin typeface="Cambria Math" panose="02040503050406030204" pitchFamily="18" charset="0"/>
+                                    </a:rPr>
+                                    <m:t>𝑖</m:t>
+                                  </m:r>
+                                </m:sub>
+                              </m:sSub>
+                            </m:e>
+                          </m:d>
+                        </m:e>
+                      </m:d>
+                      <m:r>
+                        <a:rPr lang="en-US" i="1">
+                          <a:latin typeface="Cambria Math" panose="02040503050406030204" pitchFamily="18" charset="0"/>
+                        </a:rPr>
+                        <m:t>=</m:t>
+                      </m:r>
+                      <m:sSub>
+                        <m:sSubPr>
+                          <m:ctrlPr>
+                            <a:rPr lang="en-US" i="1">
+                              <a:latin typeface="Cambria Math" panose="02040503050406030204" pitchFamily="18" charset="0"/>
+                            </a:rPr>
+                          </m:ctrlPr>
+                        </m:sSubPr>
+                        <m:e>
+                          <m:r>
+                            <a:rPr lang="en-US" i="1">
+                              <a:latin typeface="Cambria Math" panose="02040503050406030204" pitchFamily="18" charset="0"/>
+                              <a:ea typeface="Cambria Math" panose="02040503050406030204" pitchFamily="18" charset="0"/>
+                            </a:rPr>
+                            <m:t>𝜂</m:t>
+                          </m:r>
+                        </m:e>
+                        <m:sub>
+                          <m:r>
+                            <a:rPr lang="en-US" i="1">
+                              <a:latin typeface="Cambria Math" panose="02040503050406030204" pitchFamily="18" charset="0"/>
+                            </a:rPr>
+                            <m:t>𝑖</m:t>
+                          </m:r>
+                        </m:sub>
+                      </m:sSub>
+                      <m:r>
+                        <a:rPr lang="en-US" i="1">
+                          <a:latin typeface="Cambria Math" panose="02040503050406030204" pitchFamily="18" charset="0"/>
+                        </a:rPr>
+                        <m:t>=</m:t>
+                      </m:r>
+                      <m:sSub>
+                        <m:sSubPr>
+                          <m:ctrlPr>
+                            <a:rPr lang="en-US" i="1">
+                              <a:latin typeface="Cambria Math" panose="02040503050406030204" pitchFamily="18" charset="0"/>
+                              <a:ea typeface="Cambria Math" panose="02040503050406030204" pitchFamily="18" charset="0"/>
+                            </a:rPr>
+                          </m:ctrlPr>
+                        </m:sSubPr>
+                        <m:e>
+                          <m:r>
+                            <a:rPr lang="en-US" i="1">
+                              <a:latin typeface="Cambria Math" panose="02040503050406030204" pitchFamily="18" charset="0"/>
+                              <a:ea typeface="Cambria Math" panose="02040503050406030204" pitchFamily="18" charset="0"/>
+                            </a:rPr>
+                            <m:t>𝛽</m:t>
+                          </m:r>
+                        </m:e>
+                        <m:sub>
+                          <m:r>
+                            <a:rPr lang="en-US" i="1">
+                              <a:latin typeface="Cambria Math" panose="02040503050406030204" pitchFamily="18" charset="0"/>
+                              <a:ea typeface="Cambria Math" panose="02040503050406030204" pitchFamily="18" charset="0"/>
+                            </a:rPr>
+                            <m:t>1</m:t>
+                          </m:r>
+                        </m:sub>
+                      </m:sSub>
+                      <m:sSub>
+                        <m:sSubPr>
+                          <m:ctrlPr>
+                            <a:rPr lang="en-US" i="1">
+                              <a:latin typeface="Cambria Math" panose="02040503050406030204" pitchFamily="18" charset="0"/>
+                              <a:ea typeface="Cambria Math" panose="02040503050406030204" pitchFamily="18" charset="0"/>
+                            </a:rPr>
+                          </m:ctrlPr>
+                        </m:sSubPr>
+                        <m:e>
+                          <m:r>
+                            <a:rPr lang="en-US" i="1">
+                              <a:latin typeface="Cambria Math" panose="02040503050406030204" pitchFamily="18" charset="0"/>
+                              <a:ea typeface="Cambria Math" panose="02040503050406030204" pitchFamily="18" charset="0"/>
+                            </a:rPr>
+                            <m:t>𝑥</m:t>
+                          </m:r>
+                        </m:e>
+                        <m:sub>
+                          <m:r>
+                            <a:rPr lang="en-US" i="1">
+                              <a:latin typeface="Cambria Math" panose="02040503050406030204" pitchFamily="18" charset="0"/>
+                              <a:ea typeface="Cambria Math" panose="02040503050406030204" pitchFamily="18" charset="0"/>
+                            </a:rPr>
+                            <m:t>1</m:t>
+                          </m:r>
+                          <m:r>
+                            <a:rPr lang="en-US" i="1">
+                              <a:latin typeface="Cambria Math" panose="02040503050406030204" pitchFamily="18" charset="0"/>
+                              <a:ea typeface="Cambria Math" panose="02040503050406030204" pitchFamily="18" charset="0"/>
+                            </a:rPr>
+                            <m:t>𝑖</m:t>
+                          </m:r>
+                        </m:sub>
+                      </m:sSub>
+                      <m:r>
+                        <a:rPr lang="en-US" i="1">
+                          <a:latin typeface="Cambria Math" panose="02040503050406030204" pitchFamily="18" charset="0"/>
+                          <a:ea typeface="Cambria Math" panose="02040503050406030204" pitchFamily="18" charset="0"/>
+                        </a:rPr>
+                        <m:t>+</m:t>
+                      </m:r>
+                      <m:sSub>
+                        <m:sSubPr>
+                          <m:ctrlPr>
+                            <a:rPr lang="en-US" i="1">
+                              <a:latin typeface="Cambria Math" panose="02040503050406030204" pitchFamily="18" charset="0"/>
+                              <a:ea typeface="Cambria Math" panose="02040503050406030204" pitchFamily="18" charset="0"/>
+                            </a:rPr>
+                          </m:ctrlPr>
+                        </m:sSubPr>
+                        <m:e>
+                          <m:r>
+                            <a:rPr lang="en-US" i="1">
+                              <a:latin typeface="Cambria Math" panose="02040503050406030204" pitchFamily="18" charset="0"/>
+                              <a:ea typeface="Cambria Math" panose="02040503050406030204" pitchFamily="18" charset="0"/>
+                            </a:rPr>
+                            <m:t>𝛽</m:t>
+                          </m:r>
+                        </m:e>
+                        <m:sub>
+                          <m:r>
+                            <a:rPr lang="en-US" i="1">
+                              <a:latin typeface="Cambria Math" panose="02040503050406030204" pitchFamily="18" charset="0"/>
+                              <a:ea typeface="Cambria Math" panose="02040503050406030204" pitchFamily="18" charset="0"/>
+                            </a:rPr>
+                            <m:t>2</m:t>
+                          </m:r>
+                        </m:sub>
+                      </m:sSub>
+                      <m:sSub>
+                        <m:sSubPr>
+                          <m:ctrlPr>
+                            <a:rPr lang="en-US" i="1">
+                              <a:latin typeface="Cambria Math" panose="02040503050406030204" pitchFamily="18" charset="0"/>
+                              <a:ea typeface="Cambria Math" panose="02040503050406030204" pitchFamily="18" charset="0"/>
+                            </a:rPr>
+                          </m:ctrlPr>
+                        </m:sSubPr>
+                        <m:e>
+                          <m:r>
+                            <a:rPr lang="en-US" i="1">
+                              <a:latin typeface="Cambria Math" panose="02040503050406030204" pitchFamily="18" charset="0"/>
+                              <a:ea typeface="Cambria Math" panose="02040503050406030204" pitchFamily="18" charset="0"/>
+                            </a:rPr>
+                            <m:t>𝑥</m:t>
+                          </m:r>
+                        </m:e>
+                        <m:sub>
+                          <m:r>
+                            <a:rPr lang="en-US" i="1">
+                              <a:latin typeface="Cambria Math" panose="02040503050406030204" pitchFamily="18" charset="0"/>
+                              <a:ea typeface="Cambria Math" panose="02040503050406030204" pitchFamily="18" charset="0"/>
+                            </a:rPr>
+                            <m:t>2</m:t>
+                          </m:r>
+                          <m:r>
+                            <a:rPr lang="en-US" i="1">
+                              <a:latin typeface="Cambria Math" panose="02040503050406030204" pitchFamily="18" charset="0"/>
+                              <a:ea typeface="Cambria Math" panose="02040503050406030204" pitchFamily="18" charset="0"/>
+                            </a:rPr>
+                            <m:t>𝑖</m:t>
+                          </m:r>
+                        </m:sub>
+                      </m:sSub>
+                      <m:r>
+                        <m:rPr>
+                          <m:nor/>
+                        </m:rPr>
+                        <a:rPr lang="en-US" dirty="0"/>
+                        <m:t>+</m:t>
+                      </m:r>
+                      <m:sSub>
+                        <m:sSubPr>
+                          <m:ctrlPr>
+                            <a:rPr lang="en-US" i="1">
+                              <a:latin typeface="Cambria Math" panose="02040503050406030204" pitchFamily="18" charset="0"/>
+                              <a:ea typeface="Cambria Math" panose="02040503050406030204" pitchFamily="18" charset="0"/>
+                            </a:rPr>
+                          </m:ctrlPr>
+                        </m:sSubPr>
+                        <m:e>
+                          <m:r>
+                            <a:rPr lang="en-US" i="1">
+                              <a:latin typeface="Cambria Math" panose="02040503050406030204" pitchFamily="18" charset="0"/>
+                              <a:ea typeface="Cambria Math" panose="02040503050406030204" pitchFamily="18" charset="0"/>
+                            </a:rPr>
+                            <m:t>𝛽</m:t>
+                          </m:r>
+                        </m:e>
+                        <m:sub>
+                          <m:r>
+                            <a:rPr lang="en-US" i="1">
+                              <a:latin typeface="Cambria Math" panose="02040503050406030204" pitchFamily="18" charset="0"/>
+                              <a:ea typeface="Cambria Math" panose="02040503050406030204" pitchFamily="18" charset="0"/>
+                            </a:rPr>
+                            <m:t>3</m:t>
+                          </m:r>
+                        </m:sub>
+                      </m:sSub>
+                      <m:sSub>
+                        <m:sSubPr>
+                          <m:ctrlPr>
+                            <a:rPr lang="en-US" i="1">
+                              <a:latin typeface="Cambria Math" panose="02040503050406030204" pitchFamily="18" charset="0"/>
+                              <a:ea typeface="Cambria Math" panose="02040503050406030204" pitchFamily="18" charset="0"/>
+                            </a:rPr>
+                          </m:ctrlPr>
+                        </m:sSubPr>
+                        <m:e>
+                          <m:r>
+                            <a:rPr lang="en-US" i="1">
+                              <a:latin typeface="Cambria Math" panose="02040503050406030204" pitchFamily="18" charset="0"/>
+                              <a:ea typeface="Cambria Math" panose="02040503050406030204" pitchFamily="18" charset="0"/>
+                            </a:rPr>
+                            <m:t>𝑥</m:t>
+                          </m:r>
+                        </m:e>
+                        <m:sub>
+                          <m:r>
+                            <a:rPr lang="en-US" i="1">
+                              <a:latin typeface="Cambria Math" panose="02040503050406030204" pitchFamily="18" charset="0"/>
+                              <a:ea typeface="Cambria Math" panose="02040503050406030204" pitchFamily="18" charset="0"/>
+                            </a:rPr>
+                            <m:t>3</m:t>
+                          </m:r>
+                          <m:r>
+                            <a:rPr lang="en-US" i="1">
+                              <a:latin typeface="Cambria Math" panose="02040503050406030204" pitchFamily="18" charset="0"/>
+                              <a:ea typeface="Cambria Math" panose="02040503050406030204" pitchFamily="18" charset="0"/>
+                            </a:rPr>
+                            <m:t>𝑖</m:t>
+                          </m:r>
+                        </m:sub>
+                      </m:sSub>
+                      <m:r>
+                        <m:rPr>
+                          <m:nor/>
+                        </m:rPr>
+                        <a:rPr lang="en-US" dirty="0"/>
+                        <m:t>+…+</m:t>
+                      </m:r>
+                      <m:sSub>
+                        <m:sSubPr>
+                          <m:ctrlPr>
+                            <a:rPr lang="en-US" i="1">
+                              <a:latin typeface="Cambria Math" panose="02040503050406030204" pitchFamily="18" charset="0"/>
+                              <a:ea typeface="Cambria Math" panose="02040503050406030204" pitchFamily="18" charset="0"/>
+                            </a:rPr>
+                          </m:ctrlPr>
+                        </m:sSubPr>
+                        <m:e>
+                          <m:r>
+                            <a:rPr lang="en-US" i="1">
+                              <a:latin typeface="Cambria Math" panose="02040503050406030204" pitchFamily="18" charset="0"/>
+                              <a:ea typeface="Cambria Math" panose="02040503050406030204" pitchFamily="18" charset="0"/>
+                            </a:rPr>
+                            <m:t>𝛽</m:t>
+                          </m:r>
+                        </m:e>
+                        <m:sub>
+                          <m:r>
+                            <a:rPr lang="en-US" i="1">
+                              <a:latin typeface="Cambria Math" panose="02040503050406030204" pitchFamily="18" charset="0"/>
+                              <a:ea typeface="Cambria Math" panose="02040503050406030204" pitchFamily="18" charset="0"/>
+                            </a:rPr>
+                            <m:t>𝑝</m:t>
+                          </m:r>
+                        </m:sub>
+                      </m:sSub>
+                      <m:sSub>
+                        <m:sSubPr>
+                          <m:ctrlPr>
+                            <a:rPr lang="en-US" i="1">
+                              <a:latin typeface="Cambria Math" panose="02040503050406030204" pitchFamily="18" charset="0"/>
+                              <a:ea typeface="Cambria Math" panose="02040503050406030204" pitchFamily="18" charset="0"/>
+                            </a:rPr>
+                          </m:ctrlPr>
+                        </m:sSubPr>
+                        <m:e>
+                          <m:r>
+                            <a:rPr lang="en-US" i="1">
+                              <a:latin typeface="Cambria Math" panose="02040503050406030204" pitchFamily="18" charset="0"/>
+                              <a:ea typeface="Cambria Math" panose="02040503050406030204" pitchFamily="18" charset="0"/>
+                            </a:rPr>
+                            <m:t>𝑥</m:t>
+                          </m:r>
+                        </m:e>
+                        <m:sub>
+                          <m:r>
+                            <a:rPr lang="en-US" i="1">
+                              <a:latin typeface="Cambria Math" panose="02040503050406030204" pitchFamily="18" charset="0"/>
+                              <a:ea typeface="Cambria Math" panose="02040503050406030204" pitchFamily="18" charset="0"/>
+                            </a:rPr>
+                            <m:t>𝑝</m:t>
+                          </m:r>
+                          <m:r>
+                            <a:rPr lang="en-US" i="1">
+                              <a:latin typeface="Cambria Math" panose="02040503050406030204" pitchFamily="18" charset="0"/>
+                              <a:ea typeface="Cambria Math" panose="02040503050406030204" pitchFamily="18" charset="0"/>
+                            </a:rPr>
+                            <m:t>𝑖</m:t>
+                          </m:r>
+                        </m:sub>
+                      </m:sSub>
+                    </m:oMath>
+                  </m:oMathPara>
+                </a14:m>
+                <a:endParaRPr lang="en-US" dirty="0" smtClean="0"/>
+              </a:p>
+              <a:p>
+                <a:pPr marL="461963" lvl="4" indent="0">
+                  <a:buNone/>
+                </a:pPr>
+                <a:r>
+                  <a:rPr lang="en-US" dirty="0"/>
+                  <a:t>w</a:t>
+                </a:r>
+                <a:r>
+                  <a:rPr lang="en-US" dirty="0" smtClean="0"/>
+                  <a:t>here:</a:t>
+                </a:r>
+              </a:p>
+              <a:p>
+                <a:pPr marL="461963" lvl="4" indent="0">
+                  <a:buNone/>
+                </a:pPr>
+                <a14:m>
+                  <m:oMath xmlns:m="http://schemas.openxmlformats.org/officeDocument/2006/math">
+                    <m:r>
+                      <a:rPr lang="en-US" b="0" i="1" smtClean="0">
+                        <a:latin typeface="Cambria Math" panose="02040503050406030204" pitchFamily="18" charset="0"/>
+                      </a:rPr>
+                      <m:t>𝑔</m:t>
+                    </m:r>
+                    <m:d>
+                      <m:dPr>
+                        <m:ctrlPr>
+                          <a:rPr lang="en-US" b="0" i="1" smtClean="0">
+                            <a:latin typeface="Cambria Math" panose="02040503050406030204" pitchFamily="18" charset="0"/>
+                          </a:rPr>
+                        </m:ctrlPr>
+                      </m:dPr>
+                      <m:e>
+                        <m:r>
+                          <a:rPr lang="en-US" b="0" i="1" smtClean="0">
+                            <a:latin typeface="Cambria Math" panose="02040503050406030204" pitchFamily="18" charset="0"/>
+                            <a:ea typeface="Cambria Math" panose="02040503050406030204" pitchFamily="18" charset="0"/>
+                          </a:rPr>
+                          <m:t>∙</m:t>
+                        </m:r>
+                      </m:e>
+                    </m:d>
+                  </m:oMath>
+                </a14:m>
+                <a:r>
+                  <a:rPr lang="en-US" dirty="0" smtClean="0"/>
+                  <a:t>: link function</a:t>
+                </a:r>
+              </a:p>
+              <a:p>
+                <a:pPr marL="461963" lvl="4" indent="0">
+                  <a:buNone/>
+                </a:pPr>
+                <a14:m>
+                  <m:oMath xmlns:m="http://schemas.openxmlformats.org/officeDocument/2006/math">
+                    <m:sSub>
+                      <m:sSubPr>
+                        <m:ctrlPr>
+                          <a:rPr lang="en-US" i="1">
+                            <a:latin typeface="Cambria Math" panose="02040503050406030204" pitchFamily="18" charset="0"/>
+                          </a:rPr>
+                        </m:ctrlPr>
+                      </m:sSubPr>
+                      <m:e>
+                        <m:r>
+                          <a:rPr lang="en-US" i="1">
+                            <a:latin typeface="Cambria Math" panose="02040503050406030204" pitchFamily="18" charset="0"/>
+                            <a:ea typeface="Cambria Math" panose="02040503050406030204" pitchFamily="18" charset="0"/>
+                          </a:rPr>
+                          <m:t>𝜇</m:t>
+                        </m:r>
+                      </m:e>
+                      <m:sub>
+                        <m:r>
+                          <a:rPr lang="en-US" i="1">
+                            <a:latin typeface="Cambria Math" panose="02040503050406030204" pitchFamily="18" charset="0"/>
+                          </a:rPr>
+                          <m:t>𝑖</m:t>
+                        </m:r>
+                      </m:sub>
+                    </m:sSub>
+                    <m:r>
+                      <a:rPr lang="en-US" i="1">
+                        <a:latin typeface="Cambria Math" panose="02040503050406030204" pitchFamily="18" charset="0"/>
+                        <a:ea typeface="Cambria Math" panose="02040503050406030204" pitchFamily="18" charset="0"/>
+                      </a:rPr>
+                      <m:t>≡</m:t>
+                    </m:r>
+                    <m:r>
+                      <a:rPr lang="en-US" i="1">
+                        <a:latin typeface="Cambria Math" panose="02040503050406030204" pitchFamily="18" charset="0"/>
+                        <a:ea typeface="Cambria Math" panose="02040503050406030204" pitchFamily="18" charset="0"/>
+                      </a:rPr>
+                      <m:t>𝔼</m:t>
+                    </m:r>
+                    <m:d>
+                      <m:dPr>
+                        <m:ctrlPr>
+                          <a:rPr lang="en-US" i="1">
+                            <a:latin typeface="Cambria Math" panose="02040503050406030204" pitchFamily="18" charset="0"/>
+                            <a:ea typeface="Cambria Math" panose="02040503050406030204" pitchFamily="18" charset="0"/>
+                          </a:rPr>
+                        </m:ctrlPr>
+                      </m:dPr>
+                      <m:e>
+                        <m:sSub>
+                          <m:sSubPr>
+                            <m:ctrlPr>
+                              <a:rPr lang="en-US" i="1">
+                                <a:latin typeface="Cambria Math" panose="02040503050406030204" pitchFamily="18" charset="0"/>
+                              </a:rPr>
+                            </m:ctrlPr>
+                          </m:sSubPr>
+                          <m:e>
+                            <m:r>
+                              <a:rPr lang="en-US" i="1">
+                                <a:latin typeface="Cambria Math" panose="02040503050406030204" pitchFamily="18" charset="0"/>
+                              </a:rPr>
+                              <m:t>𝑌</m:t>
+                            </m:r>
+                          </m:e>
+                          <m:sub>
+                            <m:r>
+                              <a:rPr lang="en-US" i="1">
+                                <a:latin typeface="Cambria Math" panose="02040503050406030204" pitchFamily="18" charset="0"/>
+                              </a:rPr>
+                              <m:t>𝑖</m:t>
+                            </m:r>
+                          </m:sub>
+                        </m:sSub>
+                      </m:e>
+                    </m:d>
+                  </m:oMath>
+                </a14:m>
+                <a:r>
+                  <a:rPr lang="en-US" dirty="0" smtClean="0"/>
+                  <a:t>: “</a:t>
+                </a:r>
+                <a14:m>
+                  <m:oMath xmlns:m="http://schemas.openxmlformats.org/officeDocument/2006/math">
+                    <m:sSub>
+                      <m:sSubPr>
+                        <m:ctrlPr>
+                          <a:rPr lang="en-US" i="1">
+                            <a:latin typeface="Cambria Math" panose="02040503050406030204" pitchFamily="18" charset="0"/>
+                          </a:rPr>
+                        </m:ctrlPr>
+                      </m:sSubPr>
+                      <m:e>
+                        <m:r>
+                          <a:rPr lang="en-US" i="1">
+                            <a:latin typeface="Cambria Math" panose="02040503050406030204" pitchFamily="18" charset="0"/>
+                            <a:ea typeface="Cambria Math" panose="02040503050406030204" pitchFamily="18" charset="0"/>
+                          </a:rPr>
+                          <m:t>𝜇</m:t>
+                        </m:r>
+                      </m:e>
+                      <m:sub>
+                        <m:r>
+                          <a:rPr lang="en-US" i="1">
+                            <a:latin typeface="Cambria Math" panose="02040503050406030204" pitchFamily="18" charset="0"/>
+                          </a:rPr>
+                          <m:t>𝑖</m:t>
+                        </m:r>
+                      </m:sub>
+                    </m:sSub>
+                  </m:oMath>
+                </a14:m>
+                <a:r>
+                  <a:rPr lang="en-US" dirty="0" smtClean="0"/>
+                  <a:t> is defined as the expected value [</a:t>
+                </a:r>
+                <a14:m>
+                  <m:oMath xmlns:m="http://schemas.openxmlformats.org/officeDocument/2006/math">
+                    <m:r>
+                      <a:rPr lang="en-US" i="1">
+                        <a:latin typeface="Cambria Math" panose="02040503050406030204" pitchFamily="18" charset="0"/>
+                        <a:ea typeface="Cambria Math" panose="02040503050406030204" pitchFamily="18" charset="0"/>
+                      </a:rPr>
+                      <m:t>𝔼</m:t>
+                    </m:r>
+                    <m:d>
+                      <m:dPr>
+                        <m:ctrlPr>
+                          <a:rPr lang="en-US" i="1" smtClean="0">
+                            <a:latin typeface="Cambria Math" panose="02040503050406030204" pitchFamily="18" charset="0"/>
+                            <a:ea typeface="Cambria Math" panose="02040503050406030204" pitchFamily="18" charset="0"/>
+                          </a:rPr>
+                        </m:ctrlPr>
+                      </m:dPr>
+                      <m:e>
+                        <m:r>
+                          <a:rPr lang="en-US" i="1" smtClean="0">
+                            <a:latin typeface="Cambria Math" panose="02040503050406030204" pitchFamily="18" charset="0"/>
+                            <a:ea typeface="Cambria Math" panose="02040503050406030204" pitchFamily="18" charset="0"/>
+                          </a:rPr>
+                          <m:t>∙</m:t>
+                        </m:r>
+                      </m:e>
+                    </m:d>
+                    <m:r>
+                      <a:rPr lang="en-US" i="1">
+                        <a:latin typeface="Cambria Math" panose="02040503050406030204" pitchFamily="18" charset="0"/>
+                        <a:ea typeface="Cambria Math" panose="02040503050406030204" pitchFamily="18" charset="0"/>
+                      </a:rPr>
+                      <m:t> </m:t>
+                    </m:r>
+                  </m:oMath>
+                </a14:m>
+                <a:r>
+                  <a:rPr lang="en-US" dirty="0" smtClean="0"/>
+                  <a:t>] of the response variable </a:t>
+                </a:r>
+                <a14:m>
+                  <m:oMath xmlns:m="http://schemas.openxmlformats.org/officeDocument/2006/math">
+                    <m:sSub>
+                      <m:sSubPr>
+                        <m:ctrlPr>
+                          <a:rPr lang="en-US" i="1">
+                            <a:latin typeface="Cambria Math" panose="02040503050406030204" pitchFamily="18" charset="0"/>
+                          </a:rPr>
+                        </m:ctrlPr>
+                      </m:sSubPr>
+                      <m:e>
+                        <m:r>
+                          <a:rPr lang="en-US" i="1">
+                            <a:latin typeface="Cambria Math" panose="02040503050406030204" pitchFamily="18" charset="0"/>
+                          </a:rPr>
+                          <m:t>𝑌</m:t>
+                        </m:r>
+                      </m:e>
+                      <m:sub>
+                        <m:r>
+                          <a:rPr lang="en-US" i="1">
+                            <a:latin typeface="Cambria Math" panose="02040503050406030204" pitchFamily="18" charset="0"/>
+                          </a:rPr>
+                          <m:t>𝑖</m:t>
+                        </m:r>
+                      </m:sub>
+                    </m:sSub>
+                  </m:oMath>
+                </a14:m>
+                <a:r>
+                  <a:rPr lang="en-US" dirty="0" smtClean="0"/>
+                  <a:t>”</a:t>
+                </a:r>
+                <a:endParaRPr lang="en-US" dirty="0"/>
+              </a:p>
+              <a:p>
+                <a:pPr marL="228600" lvl="3"/>
+                <a:r>
+                  <a:rPr lang="en-US" dirty="0">
+                    <a:solidFill>
+                      <a:srgbClr val="0070C0"/>
+                    </a:solidFill>
+                  </a:rPr>
+                  <a:t>Canonical link </a:t>
+                </a:r>
+                <a:r>
+                  <a:rPr lang="en-US" dirty="0" smtClean="0">
+                    <a:solidFill>
+                      <a:srgbClr val="0070C0"/>
+                    </a:solidFill>
+                  </a:rPr>
+                  <a:t>function</a:t>
+                </a:r>
+              </a:p>
+              <a:p>
+                <a:pPr marL="685800" lvl="4"/>
+                <a:r>
+                  <a:rPr lang="en-US" dirty="0" smtClean="0"/>
+                  <a:t>Each exponential family distribution has a special link function called a canonical link function</a:t>
+                </a:r>
+              </a:p>
+              <a:p>
+                <a:pPr marL="685800" lvl="4"/>
+                <a:r>
+                  <a:rPr lang="en-US" dirty="0" smtClean="0"/>
+                  <a:t>Using the canonical link leads the model to have desirable statistical properties</a:t>
+                </a:r>
+                <a:endParaRPr lang="en-US" dirty="0"/>
+              </a:p>
+              <a:p>
+                <a:endParaRPr lang="en-US" dirty="0"/>
+              </a:p>
+            </p:txBody>
+          </p:sp>
+        </mc:Choice>
+        <mc:Fallback>
+          <p:sp>
+            <p:nvSpPr>
+              <p:cNvPr id="3" name="Content Placeholder 2"/>
+              <p:cNvSpPr>
+                <a:spLocks noGrp="1" noRot="1" noChangeAspect="1" noMove="1" noResize="1" noEditPoints="1" noAdjustHandles="1" noChangeArrowheads="1" noChangeShapeType="1" noTextEdit="1"/>
+              </p:cNvSpPr>
+              <p:nvPr>
+                <p:ph idx="1"/>
+              </p:nvPr>
+            </p:nvSpPr>
+            <p:spPr>
+              <a:xfrm>
+                <a:off x="838200" y="1347829"/>
+                <a:ext cx="10515600" cy="4351338"/>
+              </a:xfrm>
+              <a:blipFill>
+                <a:blip r:embed="rId2"/>
+                <a:stretch>
+                  <a:fillRect l="-406" t="-1261"/>
+                </a:stretch>
+              </a:blipFill>
+            </p:spPr>
+            <p:txBody>
+              <a:bodyPr/>
+              <a:lstStyle/>
+              <a:p>
+                <a:r>
+                  <a:rPr lang="en-US">
+                    <a:noFill/>
+                  </a:rPr>
+                  <a:t> </a:t>
+                </a:r>
+              </a:p>
+            </p:txBody>
+          </p:sp>
+        </mc:Fallback>
+      </mc:AlternateContent>
+    </p:spTree>
+    <p:extLst>
+      <p:ext uri="{BB962C8B-B14F-4D97-AF65-F5344CB8AC3E}">
+        <p14:creationId xmlns:p14="http://schemas.microsoft.com/office/powerpoint/2010/main" val="229250825"/>
+      </p:ext>
+    </p:extLst>
+  </p:cSld>
+  <p:clrMapOvr>
+    <a:masterClrMapping/>
+  </p:clrMapOvr>
+</p:sld>
+</file>
+
+<file path=ppt/slides/slide17.xml><?xml version="1.0" encoding="utf-8"?>
 <p:sld xmlns:a="http://schemas.openxmlformats.org/drawingml/2006/main" xmlns:r="http://schemas.openxmlformats.org/officeDocument/2006/relationships" xmlns:p="http://schemas.openxmlformats.org/presentationml/2006/main">
   <p:cSld>
     <p:spTree>
@@ -4934,7 +7789,7 @@
 </p:sld>
 </file>
 
-<file path=ppt/slides/slide15.xml><?xml version="1.0" encoding="utf-8"?>
+<file path=ppt/slides/slide18.xml><?xml version="1.0" encoding="utf-8"?>
 <p:sld xmlns:a="http://schemas.openxmlformats.org/drawingml/2006/main" xmlns:r="http://schemas.openxmlformats.org/officeDocument/2006/relationships" xmlns:p="http://schemas.openxmlformats.org/presentationml/2006/main">
   <p:cSld>
     <p:spTree>
@@ -5142,7 +7997,7 @@
 </p:sld>
 </file>
 
-<file path=ppt/slides/slide16.xml><?xml version="1.0" encoding="utf-8"?>
+<file path=ppt/slides/slide19.xml><?xml version="1.0" encoding="utf-8"?>
 <p:sld xmlns:a="http://schemas.openxmlformats.org/drawingml/2006/main" xmlns:r="http://schemas.openxmlformats.org/officeDocument/2006/relationships" xmlns:p="http://schemas.openxmlformats.org/presentationml/2006/main">
   <p:cSld>
     <p:spTree>
@@ -5339,7 +8194,117 @@
 </p:sld>
 </file>
 
-<file path=ppt/slides/slide17.xml><?xml version="1.0" encoding="utf-8"?>
+<file path=ppt/slides/slide2.xml><?xml version="1.0" encoding="utf-8"?>
+<p:sld xmlns:a="http://schemas.openxmlformats.org/drawingml/2006/main" xmlns:r="http://schemas.openxmlformats.org/officeDocument/2006/relationships" xmlns:p="http://schemas.openxmlformats.org/presentationml/2006/main">
+  <p:cSld>
+    <p:spTree>
+      <p:nvGrpSpPr>
+        <p:cNvPr id="1" name=""/>
+        <p:cNvGrpSpPr/>
+        <p:nvPr/>
+      </p:nvGrpSpPr>
+      <p:grpSpPr>
+        <a:xfrm>
+          <a:off x="0" y="0"/>
+          <a:ext cx="0" cy="0"/>
+          <a:chOff x="0" y="0"/>
+          <a:chExt cx="0" cy="0"/>
+        </a:xfrm>
+      </p:grpSpPr>
+      <p:sp>
+        <p:nvSpPr>
+          <p:cNvPr id="2" name="Title 1"/>
+          <p:cNvSpPr>
+            <a:spLocks noGrp="1"/>
+          </p:cNvSpPr>
+          <p:nvPr>
+            <p:ph type="title"/>
+          </p:nvPr>
+        </p:nvSpPr>
+        <p:spPr/>
+        <p:txBody>
+          <a:bodyPr/>
+          <a:lstStyle/>
+          <a:p>
+            <a:r>
+              <a:rPr lang="en-US" dirty="0" smtClean="0"/>
+              <a:t>Goals</a:t>
+            </a:r>
+            <a:endParaRPr lang="en-US" dirty="0"/>
+          </a:p>
+        </p:txBody>
+      </p:sp>
+      <p:sp>
+        <p:nvSpPr>
+          <p:cNvPr id="3" name="Content Placeholder 2"/>
+          <p:cNvSpPr>
+            <a:spLocks noGrp="1"/>
+          </p:cNvSpPr>
+          <p:nvPr>
+            <p:ph idx="1"/>
+          </p:nvPr>
+        </p:nvSpPr>
+        <p:spPr/>
+        <p:txBody>
+          <a:bodyPr/>
+          <a:lstStyle/>
+          <a:p>
+            <a:r>
+              <a:rPr lang="en-US" dirty="0" smtClean="0"/>
+              <a:t>Understand the basic structure and differences among different types of regression models (LM, GLM, GAM, </a:t>
+            </a:r>
+            <a:r>
+              <a:rPr lang="en-US" dirty="0"/>
+              <a:t>LMM, GLMM, </a:t>
+            </a:r>
+            <a:r>
+              <a:rPr lang="en-US" dirty="0" smtClean="0"/>
+              <a:t>GAMM)</a:t>
+            </a:r>
+          </a:p>
+          <a:p>
+            <a:r>
+              <a:rPr lang="en-US" dirty="0" smtClean="0"/>
+              <a:t>Develop intuition for determining when a regression model might help to provide insight into a specific question, given a particular dataset</a:t>
+            </a:r>
+          </a:p>
+          <a:p>
+            <a:r>
+              <a:rPr lang="en-US" dirty="0" smtClean="0"/>
+              <a:t>Understand when and how to add model complexity</a:t>
+            </a:r>
+          </a:p>
+          <a:p>
+            <a:r>
+              <a:rPr lang="en-US" dirty="0" smtClean="0"/>
+              <a:t>Learn basic R programming for regression models based on familiar case studies</a:t>
+            </a:r>
+          </a:p>
+          <a:p>
+            <a:r>
+              <a:rPr lang="en-US" dirty="0" smtClean="0"/>
+              <a:t>Know where to go for help!</a:t>
+            </a:r>
+          </a:p>
+          <a:p>
+            <a:endParaRPr lang="en-US" dirty="0"/>
+          </a:p>
+        </p:txBody>
+      </p:sp>
+    </p:spTree>
+    <p:extLst>
+      <p:ext uri="{BB962C8B-B14F-4D97-AF65-F5344CB8AC3E}">
+        <p14:creationId xmlns:p14="http://schemas.microsoft.com/office/powerpoint/2010/main" val="2818715363"/>
+      </p:ext>
+    </p:extLst>
+  </p:cSld>
+  <p:clrMapOvr>
+    <a:masterClrMapping/>
+  </p:clrMapOvr>
+</p:sld>
+</file>
+
+<file path=ppt/slides/slide20.xml><?xml version="1.0" encoding="utf-8"?>
 <p:sld xmlns:a="http://schemas.openxmlformats.org/drawingml/2006/main" xmlns:r="http://schemas.openxmlformats.org/officeDocument/2006/relationships" xmlns:p="http://schemas.openxmlformats.org/presentationml/2006/main">
   <p:cSld>
     <p:spTree>
@@ -6567,7 +9532,7 @@
 </p:sld>
 </file>
 
-<file path=ppt/slides/slide18.xml><?xml version="1.0" encoding="utf-8"?>
+<file path=ppt/slides/slide21.xml><?xml version="1.0" encoding="utf-8"?>
 <p:sld xmlns:a="http://schemas.openxmlformats.org/drawingml/2006/main" xmlns:r="http://schemas.openxmlformats.org/officeDocument/2006/relationships" xmlns:p="http://schemas.openxmlformats.org/presentationml/2006/main">
   <p:cSld>
     <p:spTree>
@@ -6766,116 +9731,6 @@
     <p:extLst>
       <p:ext uri="{BB962C8B-B14F-4D97-AF65-F5344CB8AC3E}">
         <p14:creationId xmlns:p14="http://schemas.microsoft.com/office/powerpoint/2010/main" val="2350228935"/>
-      </p:ext>
-    </p:extLst>
-  </p:cSld>
-  <p:clrMapOvr>
-    <a:masterClrMapping/>
-  </p:clrMapOvr>
-</p:sld>
-</file>
-
-<file path=ppt/slides/slide2.xml><?xml version="1.0" encoding="utf-8"?>
-<p:sld xmlns:a="http://schemas.openxmlformats.org/drawingml/2006/main" xmlns:r="http://schemas.openxmlformats.org/officeDocument/2006/relationships" xmlns:p="http://schemas.openxmlformats.org/presentationml/2006/main">
-  <p:cSld>
-    <p:spTree>
-      <p:nvGrpSpPr>
-        <p:cNvPr id="1" name=""/>
-        <p:cNvGrpSpPr/>
-        <p:nvPr/>
-      </p:nvGrpSpPr>
-      <p:grpSpPr>
-        <a:xfrm>
-          <a:off x="0" y="0"/>
-          <a:ext cx="0" cy="0"/>
-          <a:chOff x="0" y="0"/>
-          <a:chExt cx="0" cy="0"/>
-        </a:xfrm>
-      </p:grpSpPr>
-      <p:sp>
-        <p:nvSpPr>
-          <p:cNvPr id="2" name="Title 1"/>
-          <p:cNvSpPr>
-            <a:spLocks noGrp="1"/>
-          </p:cNvSpPr>
-          <p:nvPr>
-            <p:ph type="title"/>
-          </p:nvPr>
-        </p:nvSpPr>
-        <p:spPr/>
-        <p:txBody>
-          <a:bodyPr/>
-          <a:lstStyle/>
-          <a:p>
-            <a:r>
-              <a:rPr lang="en-US" dirty="0" smtClean="0"/>
-              <a:t>Goals</a:t>
-            </a:r>
-            <a:endParaRPr lang="en-US" dirty="0"/>
-          </a:p>
-        </p:txBody>
-      </p:sp>
-      <p:sp>
-        <p:nvSpPr>
-          <p:cNvPr id="3" name="Content Placeholder 2"/>
-          <p:cNvSpPr>
-            <a:spLocks noGrp="1"/>
-          </p:cNvSpPr>
-          <p:nvPr>
-            <p:ph idx="1"/>
-          </p:nvPr>
-        </p:nvSpPr>
-        <p:spPr/>
-        <p:txBody>
-          <a:bodyPr/>
-          <a:lstStyle/>
-          <a:p>
-            <a:r>
-              <a:rPr lang="en-US" dirty="0" smtClean="0"/>
-              <a:t>Understand the basic structure and differences among different types of regression models (LM, GLM, GAM, </a:t>
-            </a:r>
-            <a:r>
-              <a:rPr lang="en-US" dirty="0"/>
-              <a:t>LMM, GLMM, </a:t>
-            </a:r>
-            <a:r>
-              <a:rPr lang="en-US" dirty="0" smtClean="0"/>
-              <a:t>GAMM)</a:t>
-            </a:r>
-          </a:p>
-          <a:p>
-            <a:r>
-              <a:rPr lang="en-US" dirty="0" smtClean="0"/>
-              <a:t>Develop intuition for determining when a regression model might help to provide insight into a specific question, given a particular dataset</a:t>
-            </a:r>
-          </a:p>
-          <a:p>
-            <a:r>
-              <a:rPr lang="en-US" dirty="0" smtClean="0"/>
-              <a:t>Understand when and how to add model complexity</a:t>
-            </a:r>
-          </a:p>
-          <a:p>
-            <a:r>
-              <a:rPr lang="en-US" dirty="0" smtClean="0"/>
-              <a:t>Learn basic R programming for regression models based on familiar case studies</a:t>
-            </a:r>
-          </a:p>
-          <a:p>
-            <a:r>
-              <a:rPr lang="en-US" dirty="0" smtClean="0"/>
-              <a:t>Know where to go for help!</a:t>
-            </a:r>
-          </a:p>
-          <a:p>
-            <a:endParaRPr lang="en-US" dirty="0"/>
-          </a:p>
-        </p:txBody>
-      </p:sp>
-    </p:spTree>
-    <p:extLst>
-      <p:ext uri="{BB962C8B-B14F-4D97-AF65-F5344CB8AC3E}">
-        <p14:creationId xmlns:p14="http://schemas.microsoft.com/office/powerpoint/2010/main" val="2818715363"/>
       </p:ext>
     </p:extLst>
   </p:cSld>

</xml_diff>

<commit_message>
Added GAM slide to .pptx. Specified output size for the png in the script.
</commit_message>
<xml_diff>
--- a/Notes/RegressionModelOverview.pptx
+++ b/Notes/RegressionModelOverview.pptx
@@ -5,7 +5,7 @@
     <p:sldMasterId id="2147483648" r:id="rId1"/>
   </p:sldMasterIdLst>
   <p:notesMasterIdLst>
-    <p:notesMasterId r:id="rId26"/>
+    <p:notesMasterId r:id="rId28"/>
   </p:notesMasterIdLst>
   <p:sldIdLst>
     <p:sldId id="256" r:id="rId2"/>
@@ -13,25 +13,27 @@
     <p:sldId id="259" r:id="rId4"/>
     <p:sldId id="258" r:id="rId5"/>
     <p:sldId id="279" r:id="rId6"/>
-    <p:sldId id="260" r:id="rId7"/>
-    <p:sldId id="261" r:id="rId8"/>
-    <p:sldId id="262" r:id="rId9"/>
-    <p:sldId id="263" r:id="rId10"/>
-    <p:sldId id="264" r:id="rId11"/>
-    <p:sldId id="265" r:id="rId12"/>
-    <p:sldId id="271" r:id="rId13"/>
-    <p:sldId id="272" r:id="rId14"/>
-    <p:sldId id="273" r:id="rId15"/>
-    <p:sldId id="274" r:id="rId16"/>
-    <p:sldId id="275" r:id="rId17"/>
-    <p:sldId id="276" r:id="rId18"/>
-    <p:sldId id="278" r:id="rId19"/>
-    <p:sldId id="277" r:id="rId20"/>
-    <p:sldId id="266" r:id="rId21"/>
-    <p:sldId id="267" r:id="rId22"/>
-    <p:sldId id="270" r:id="rId23"/>
-    <p:sldId id="268" r:id="rId24"/>
-    <p:sldId id="269" r:id="rId25"/>
+    <p:sldId id="280" r:id="rId7"/>
+    <p:sldId id="260" r:id="rId8"/>
+    <p:sldId id="261" r:id="rId9"/>
+    <p:sldId id="262" r:id="rId10"/>
+    <p:sldId id="263" r:id="rId11"/>
+    <p:sldId id="264" r:id="rId12"/>
+    <p:sldId id="265" r:id="rId13"/>
+    <p:sldId id="271" r:id="rId14"/>
+    <p:sldId id="272" r:id="rId15"/>
+    <p:sldId id="273" r:id="rId16"/>
+    <p:sldId id="274" r:id="rId17"/>
+    <p:sldId id="275" r:id="rId18"/>
+    <p:sldId id="276" r:id="rId19"/>
+    <p:sldId id="278" r:id="rId20"/>
+    <p:sldId id="277" r:id="rId21"/>
+    <p:sldId id="281" r:id="rId22"/>
+    <p:sldId id="266" r:id="rId23"/>
+    <p:sldId id="267" r:id="rId24"/>
+    <p:sldId id="270" r:id="rId25"/>
+    <p:sldId id="268" r:id="rId26"/>
+    <p:sldId id="269" r:id="rId27"/>
   </p:sldIdLst>
   <p:sldSz cx="12192000" cy="6858000"/>
   <p:notesSz cx="6858000" cy="9144000"/>
@@ -561,7 +563,7 @@
           <a:p>
             <a:fld id="{B8FD52FC-6FC7-4467-86D7-6099F586D432}" type="slidenum">
               <a:rPr lang="en-US" smtClean="0"/>
-              <a:t>8</a:t>
+              <a:t>9</a:t>
             </a:fld>
             <a:endParaRPr lang="en-US"/>
           </a:p>
@@ -3536,6 +3538,257 @@
           <a:p>
             <a:r>
               <a:rPr lang="en-US" dirty="0" smtClean="0"/>
+              <a:t>LM: Equivalent Terminology</a:t>
+            </a:r>
+            <a:endParaRPr lang="en-US" dirty="0"/>
+          </a:p>
+        </p:txBody>
+      </p:sp>
+      <mc:AlternateContent xmlns:mc="http://schemas.openxmlformats.org/markup-compatibility/2006" xmlns:a14="http://schemas.microsoft.com/office/drawing/2010/main">
+        <mc:Choice Requires="a14">
+          <p:sp>
+            <p:nvSpPr>
+              <p:cNvPr id="4" name="Text Placeholder 3"/>
+              <p:cNvSpPr>
+                <a:spLocks noGrp="1"/>
+              </p:cNvSpPr>
+              <p:nvPr>
+                <p:ph type="body" idx="1"/>
+              </p:nvPr>
+            </p:nvSpPr>
+            <p:spPr/>
+            <p:txBody>
+              <a:bodyPr/>
+              <a:lstStyle/>
+              <a:p>
+                <a:r>
+                  <a:rPr lang="en-US" dirty="0" smtClean="0"/>
+                  <a:t>Response Variable, </a:t>
+                </a:r>
+                <a14:m>
+                  <m:oMath xmlns:m="http://schemas.openxmlformats.org/officeDocument/2006/math">
+                    <m:r>
+                      <a:rPr lang="en-US" b="1" i="1" smtClean="0">
+                        <a:latin typeface="Cambria Math" panose="02040503050406030204" pitchFamily="18" charset="0"/>
+                      </a:rPr>
+                      <m:t>𝒀</m:t>
+                    </m:r>
+                  </m:oMath>
+                </a14:m>
+                <a:endParaRPr lang="en-US" dirty="0"/>
+              </a:p>
+            </p:txBody>
+          </p:sp>
+        </mc:Choice>
+        <mc:Fallback xmlns="">
+          <p:sp>
+            <p:nvSpPr>
+              <p:cNvPr id="4" name="Text Placeholder 3"/>
+              <p:cNvSpPr>
+                <a:spLocks noGrp="1" noRot="1" noChangeAspect="1" noMove="1" noResize="1" noEditPoints="1" noAdjustHandles="1" noChangeArrowheads="1" noChangeShapeType="1" noTextEdit="1"/>
+              </p:cNvSpPr>
+              <p:nvPr>
+                <p:ph type="body" idx="1"/>
+              </p:nvPr>
+            </p:nvSpPr>
+            <p:spPr>
+              <a:blipFill>
+                <a:blip r:embed="rId2"/>
+                <a:stretch>
+                  <a:fillRect l="-1891" b="-17037"/>
+                </a:stretch>
+              </a:blipFill>
+            </p:spPr>
+            <p:txBody>
+              <a:bodyPr/>
+              <a:lstStyle/>
+              <a:p>
+                <a:r>
+                  <a:rPr lang="en-US">
+                    <a:noFill/>
+                  </a:rPr>
+                  <a:t> </a:t>
+                </a:r>
+              </a:p>
+            </p:txBody>
+          </p:sp>
+        </mc:Fallback>
+      </mc:AlternateContent>
+      <p:sp>
+        <p:nvSpPr>
+          <p:cNvPr id="5" name="Content Placeholder 4"/>
+          <p:cNvSpPr>
+            <a:spLocks noGrp="1"/>
+          </p:cNvSpPr>
+          <p:nvPr>
+            <p:ph sz="half" idx="2"/>
+          </p:nvPr>
+        </p:nvSpPr>
+        <p:spPr/>
+        <p:txBody>
+          <a:bodyPr/>
+          <a:lstStyle/>
+          <a:p>
+            <a:r>
+              <a:rPr lang="en-US" dirty="0" smtClean="0"/>
+              <a:t>Dependent variable			</a:t>
+            </a:r>
+            <a:endParaRPr lang="en-US" dirty="0"/>
+          </a:p>
+        </p:txBody>
+      </p:sp>
+      <mc:AlternateContent xmlns:mc="http://schemas.openxmlformats.org/markup-compatibility/2006" xmlns:a14="http://schemas.microsoft.com/office/drawing/2010/main">
+        <mc:Choice Requires="a14">
+          <p:sp>
+            <p:nvSpPr>
+              <p:cNvPr id="6" name="Text Placeholder 5"/>
+              <p:cNvSpPr>
+                <a:spLocks noGrp="1"/>
+              </p:cNvSpPr>
+              <p:nvPr>
+                <p:ph type="body" sz="quarter" idx="3"/>
+              </p:nvPr>
+            </p:nvSpPr>
+            <p:spPr/>
+            <p:txBody>
+              <a:bodyPr/>
+              <a:lstStyle/>
+              <a:p>
+                <a:r>
+                  <a:rPr lang="en-US" dirty="0" smtClean="0"/>
+                  <a:t>Predictor Variable, </a:t>
+                </a:r>
+                <a14:m>
+                  <m:oMath xmlns:m="http://schemas.openxmlformats.org/officeDocument/2006/math">
+                    <m:r>
+                      <a:rPr lang="en-US" b="1" i="1" smtClean="0">
+                        <a:latin typeface="Cambria Math" panose="02040503050406030204" pitchFamily="18" charset="0"/>
+                      </a:rPr>
+                      <m:t>𝒙</m:t>
+                    </m:r>
+                  </m:oMath>
+                </a14:m>
+                <a:endParaRPr lang="en-US" dirty="0"/>
+              </a:p>
+            </p:txBody>
+          </p:sp>
+        </mc:Choice>
+        <mc:Fallback xmlns="">
+          <p:sp>
+            <p:nvSpPr>
+              <p:cNvPr id="6" name="Text Placeholder 5"/>
+              <p:cNvSpPr>
+                <a:spLocks noGrp="1" noRot="1" noChangeAspect="1" noMove="1" noResize="1" noEditPoints="1" noAdjustHandles="1" noChangeArrowheads="1" noChangeShapeType="1" noTextEdit="1"/>
+              </p:cNvSpPr>
+              <p:nvPr>
+                <p:ph type="body" sz="quarter" idx="3"/>
+              </p:nvPr>
+            </p:nvSpPr>
+            <p:spPr>
+              <a:blipFill>
+                <a:blip r:embed="rId3"/>
+                <a:stretch>
+                  <a:fillRect l="-1882" b="-17037"/>
+                </a:stretch>
+              </a:blipFill>
+            </p:spPr>
+            <p:txBody>
+              <a:bodyPr/>
+              <a:lstStyle/>
+              <a:p>
+                <a:r>
+                  <a:rPr lang="en-US">
+                    <a:noFill/>
+                  </a:rPr>
+                  <a:t> </a:t>
+                </a:r>
+              </a:p>
+            </p:txBody>
+          </p:sp>
+        </mc:Fallback>
+      </mc:AlternateContent>
+      <p:sp>
+        <p:nvSpPr>
+          <p:cNvPr id="7" name="Content Placeholder 6"/>
+          <p:cNvSpPr>
+            <a:spLocks noGrp="1"/>
+          </p:cNvSpPr>
+          <p:nvPr>
+            <p:ph sz="quarter" idx="4"/>
+          </p:nvPr>
+        </p:nvSpPr>
+        <p:spPr/>
+        <p:txBody>
+          <a:bodyPr/>
+          <a:lstStyle/>
+          <a:p>
+            <a:r>
+              <a:rPr lang="en-US" dirty="0" smtClean="0"/>
+              <a:t>Independent variable</a:t>
+            </a:r>
+          </a:p>
+          <a:p>
+            <a:r>
+              <a:rPr lang="en-US" dirty="0" smtClean="0"/>
+              <a:t>Driver</a:t>
+            </a:r>
+          </a:p>
+          <a:p>
+            <a:r>
+              <a:rPr lang="en-US" dirty="0" smtClean="0"/>
+              <a:t>Covariate</a:t>
+            </a:r>
+            <a:endParaRPr lang="en-US" dirty="0"/>
+          </a:p>
+        </p:txBody>
+      </p:sp>
+    </p:spTree>
+    <p:extLst>
+      <p:ext uri="{BB962C8B-B14F-4D97-AF65-F5344CB8AC3E}">
+        <p14:creationId xmlns:p14="http://schemas.microsoft.com/office/powerpoint/2010/main" val="807197629"/>
+      </p:ext>
+    </p:extLst>
+  </p:cSld>
+  <p:clrMapOvr>
+    <a:masterClrMapping/>
+  </p:clrMapOvr>
+</p:sld>
+</file>
+
+<file path=ppt/slides/slide11.xml><?xml version="1.0" encoding="utf-8"?>
+<p:sld xmlns:a="http://schemas.openxmlformats.org/drawingml/2006/main" xmlns:r="http://schemas.openxmlformats.org/officeDocument/2006/relationships" xmlns:p="http://schemas.openxmlformats.org/presentationml/2006/main">
+  <p:cSld>
+    <p:spTree>
+      <p:nvGrpSpPr>
+        <p:cNvPr id="1" name=""/>
+        <p:cNvGrpSpPr/>
+        <p:nvPr/>
+      </p:nvGrpSpPr>
+      <p:grpSpPr>
+        <a:xfrm>
+          <a:off x="0" y="0"/>
+          <a:ext cx="0" cy="0"/>
+          <a:chOff x="0" y="0"/>
+          <a:chExt cx="0" cy="0"/>
+        </a:xfrm>
+      </p:grpSpPr>
+      <p:sp>
+        <p:nvSpPr>
+          <p:cNvPr id="2" name="Title 1"/>
+          <p:cNvSpPr>
+            <a:spLocks noGrp="1"/>
+          </p:cNvSpPr>
+          <p:nvPr>
+            <p:ph type="title"/>
+          </p:nvPr>
+        </p:nvSpPr>
+        <p:spPr/>
+        <p:txBody>
+          <a:bodyPr/>
+          <a:lstStyle/>
+          <a:p>
+            <a:r>
+              <a:rPr lang="en-US" dirty="0" smtClean="0"/>
               <a:t>LM Examples</a:t>
             </a:r>
             <a:endParaRPr lang="en-US" dirty="0"/>
@@ -4855,7 +5108,7 @@
 </p:sld>
 </file>
 
-<file path=ppt/slides/slide11.xml><?xml version="1.0" encoding="utf-8"?>
+<file path=ppt/slides/slide12.xml><?xml version="1.0" encoding="utf-8"?>
 <p:sld xmlns:a="http://schemas.openxmlformats.org/drawingml/2006/main" xmlns:r="http://schemas.openxmlformats.org/officeDocument/2006/relationships" xmlns:p="http://schemas.openxmlformats.org/presentationml/2006/main">
   <p:cSld>
     <p:spTree>
@@ -5087,7 +5340,7 @@
 </p:sld>
 </file>
 
-<file path=ppt/slides/slide12.xml><?xml version="1.0" encoding="utf-8"?>
+<file path=ppt/slides/slide13.xml><?xml version="1.0" encoding="utf-8"?>
 <p:sld xmlns:a="http://schemas.openxmlformats.org/drawingml/2006/main" xmlns:r="http://schemas.openxmlformats.org/officeDocument/2006/relationships" xmlns:p="http://schemas.openxmlformats.org/presentationml/2006/main">
   <p:cSld>
     <p:spTree>
@@ -5233,7 +5486,7 @@
 </p:sld>
 </file>
 
-<file path=ppt/slides/slide13.xml><?xml version="1.0" encoding="utf-8"?>
+<file path=ppt/slides/slide14.xml><?xml version="1.0" encoding="utf-8"?>
 <p:sld xmlns:a="http://schemas.openxmlformats.org/drawingml/2006/main" xmlns:r="http://schemas.openxmlformats.org/officeDocument/2006/relationships" xmlns:p="http://schemas.openxmlformats.org/presentationml/2006/main">
   <p:cSld>
     <p:spTree>
@@ -5267,15 +5520,7 @@
           <a:p>
             <a:r>
               <a:rPr lang="en-US" dirty="0" smtClean="0"/>
-              <a:t>Mathematical form of </a:t>
-            </a:r>
-            <a:r>
-              <a:rPr lang="en-US" dirty="0" smtClean="0"/>
-              <a:t>Probability Distributions </a:t>
-            </a:r>
-            <a:r>
-              <a:rPr lang="en-US" dirty="0" smtClean="0"/>
-              <a:t>in the Exponential Family</a:t>
+              <a:t>Mathematical form of Probability Distributions in the Exponential Family</a:t>
             </a:r>
             <a:endParaRPr lang="en-US" dirty="0"/>
           </a:p>
@@ -5932,7 +6177,7 @@
 </p:sld>
 </file>
 
-<file path=ppt/slides/slide14.xml><?xml version="1.0" encoding="utf-8"?>
+<file path=ppt/slides/slide15.xml><?xml version="1.0" encoding="utf-8"?>
 <p:sld xmlns:a="http://schemas.openxmlformats.org/drawingml/2006/main" xmlns:r="http://schemas.openxmlformats.org/officeDocument/2006/relationships" xmlns:p="http://schemas.openxmlformats.org/presentationml/2006/main">
   <p:cSld>
     <p:spTree>
@@ -6139,7 +6384,7 @@
 </p:sld>
 </file>
 
-<file path=ppt/slides/slide15.xml><?xml version="1.0" encoding="utf-8"?>
+<file path=ppt/slides/slide16.xml><?xml version="1.0" encoding="utf-8"?>
 <p:sld xmlns:a="http://schemas.openxmlformats.org/drawingml/2006/main" xmlns:r="http://schemas.openxmlformats.org/officeDocument/2006/relationships" xmlns:p="http://schemas.openxmlformats.org/presentationml/2006/main">
   <p:cSld>
     <p:spTree>
@@ -6458,8 +6703,8 @@
           </a:p>
         </p:txBody>
       </p:sp>
-      <mc:AlternateContent xmlns:mc="http://schemas.openxmlformats.org/markup-compatibility/2006">
-        <mc:Choice xmlns:a14="http://schemas.microsoft.com/office/drawing/2010/main" Requires="a14">
+      <mc:AlternateContent xmlns:mc="http://schemas.openxmlformats.org/markup-compatibility/2006" xmlns:a14="http://schemas.microsoft.com/office/drawing/2010/main">
+        <mc:Choice Requires="a14">
           <p:sp>
             <p:nvSpPr>
               <p:cNvPr id="8" name="TextBox 7"/>
@@ -6761,7 +7006,7 @@
             </p:txBody>
           </p:sp>
         </mc:Choice>
-        <mc:Fallback>
+        <mc:Fallback xmlns="">
           <p:sp>
             <p:nvSpPr>
               <p:cNvPr id="8" name="TextBox 7"/>
@@ -6800,8 +7045,8 @@
           </p:sp>
         </mc:Fallback>
       </mc:AlternateContent>
-      <mc:AlternateContent xmlns:mc="http://schemas.openxmlformats.org/markup-compatibility/2006">
-        <mc:Choice xmlns:a14="http://schemas.microsoft.com/office/drawing/2010/main" Requires="a14">
+      <mc:AlternateContent xmlns:mc="http://schemas.openxmlformats.org/markup-compatibility/2006" xmlns:a14="http://schemas.microsoft.com/office/drawing/2010/main">
+        <mc:Choice Requires="a14">
           <p:sp>
             <p:nvSpPr>
               <p:cNvPr id="9" name="TextBox 8"/>
@@ -6882,7 +7127,7 @@
             </p:txBody>
           </p:sp>
         </mc:Choice>
-        <mc:Fallback>
+        <mc:Fallback xmlns="">
           <p:sp>
             <p:nvSpPr>
               <p:cNvPr id="9" name="TextBox 8"/>
@@ -6973,11 +7218,7 @@
             </a:r>
             <a:r>
               <a:rPr lang="en-US" dirty="0" smtClean="0"/>
-              <a:t>).  </a:t>
-            </a:r>
-            <a:r>
-              <a:rPr lang="en-US" dirty="0" smtClean="0"/>
-              <a:t>The term for a discrete distribution is </a:t>
+              <a:t>).  The term for a discrete distribution is </a:t>
             </a:r>
             <a:r>
               <a:rPr lang="en-US" dirty="0" smtClean="0">
@@ -7020,7 +7261,7 @@
 </p:sld>
 </file>
 
-<file path=ppt/slides/slide16.xml><?xml version="1.0" encoding="utf-8"?>
+<file path=ppt/slides/slide17.xml><?xml version="1.0" encoding="utf-8"?>
 <p:sld xmlns:a="http://schemas.openxmlformats.org/drawingml/2006/main" xmlns:r="http://schemas.openxmlformats.org/officeDocument/2006/relationships" xmlns:p="http://schemas.openxmlformats.org/presentationml/2006/main">
   <p:cSld>
     <p:spTree>
@@ -7689,1317 +7930,6 @@
 </p:sld>
 </file>
 
-<file path=ppt/slides/slide17.xml><?xml version="1.0" encoding="utf-8"?>
-<p:sld xmlns:a="http://schemas.openxmlformats.org/drawingml/2006/main" xmlns:r="http://schemas.openxmlformats.org/officeDocument/2006/relationships" xmlns:p="http://schemas.openxmlformats.org/presentationml/2006/main">
-  <p:cSld>
-    <p:spTree>
-      <p:nvGrpSpPr>
-        <p:cNvPr id="1" name=""/>
-        <p:cNvGrpSpPr/>
-        <p:nvPr/>
-      </p:nvGrpSpPr>
-      <p:grpSpPr>
-        <a:xfrm>
-          <a:off x="0" y="0"/>
-          <a:ext cx="0" cy="0"/>
-          <a:chOff x="0" y="0"/>
-          <a:chExt cx="0" cy="0"/>
-        </a:xfrm>
-      </p:grpSpPr>
-      <p:sp>
-        <p:nvSpPr>
-          <p:cNvPr id="2" name="Title 1"/>
-          <p:cNvSpPr>
-            <a:spLocks noGrp="1"/>
-          </p:cNvSpPr>
-          <p:nvPr>
-            <p:ph type="title"/>
-          </p:nvPr>
-        </p:nvSpPr>
-        <p:spPr/>
-        <p:txBody>
-          <a:bodyPr/>
-          <a:lstStyle/>
-          <a:p>
-            <a:r>
-              <a:rPr lang="en-US" dirty="0" smtClean="0"/>
-              <a:t>Link Function</a:t>
-            </a:r>
-            <a:endParaRPr lang="en-US" dirty="0"/>
-          </a:p>
-        </p:txBody>
-      </p:sp>
-      <mc:AlternateContent xmlns:mc="http://schemas.openxmlformats.org/markup-compatibility/2006">
-        <mc:Choice xmlns:a14="http://schemas.microsoft.com/office/drawing/2010/main" Requires="a14">
-          <p:sp>
-            <p:nvSpPr>
-              <p:cNvPr id="3" name="Content Placeholder 2"/>
-              <p:cNvSpPr>
-                <a:spLocks noGrp="1"/>
-              </p:cNvSpPr>
-              <p:nvPr>
-                <p:ph idx="1"/>
-              </p:nvPr>
-            </p:nvSpPr>
-            <p:spPr>
-              <a:xfrm>
-                <a:off x="838200" y="1347829"/>
-                <a:ext cx="10515600" cy="4351338"/>
-              </a:xfrm>
-            </p:spPr>
-            <p:txBody>
-              <a:bodyPr/>
-              <a:lstStyle/>
-              <a:p>
-                <a:pPr marL="228600" lvl="3"/>
-                <a:r>
-                  <a:rPr lang="en-US" dirty="0" smtClean="0"/>
-                  <a:t>Purpose </a:t>
-                </a:r>
-                <a:r>
-                  <a:rPr lang="en-US" dirty="0"/>
-                  <a:t>(in English)</a:t>
-                </a:r>
-              </a:p>
-              <a:p>
-                <a:pPr marL="685800" lvl="5"/>
-                <a:r>
-                  <a:rPr lang="en-US" dirty="0"/>
-                  <a:t>Relates the expected value of the response </a:t>
-                </a:r>
-                <a:r>
-                  <a:rPr lang="en-US" dirty="0" smtClean="0"/>
-                  <a:t>variable, </a:t>
-                </a:r>
-                <a14:m>
-                  <m:oMath xmlns:m="http://schemas.openxmlformats.org/officeDocument/2006/math">
-                    <m:sSub>
-                      <m:sSubPr>
-                        <m:ctrlPr>
-                          <a:rPr lang="en-US" i="1">
-                            <a:latin typeface="Cambria Math" panose="02040503050406030204" pitchFamily="18" charset="0"/>
-                          </a:rPr>
-                        </m:ctrlPr>
-                      </m:sSubPr>
-                      <m:e>
-                        <m:r>
-                          <a:rPr lang="en-US" i="1">
-                            <a:latin typeface="Cambria Math" panose="02040503050406030204" pitchFamily="18" charset="0"/>
-                            <a:ea typeface="Cambria Math" panose="02040503050406030204" pitchFamily="18" charset="0"/>
-                          </a:rPr>
-                          <m:t>𝜇</m:t>
-                        </m:r>
-                      </m:e>
-                      <m:sub>
-                        <m:r>
-                          <a:rPr lang="en-US" i="1">
-                            <a:latin typeface="Cambria Math" panose="02040503050406030204" pitchFamily="18" charset="0"/>
-                          </a:rPr>
-                          <m:t>𝑖</m:t>
-                        </m:r>
-                      </m:sub>
-                    </m:sSub>
-                    <m:r>
-                      <a:rPr lang="en-US" i="1">
-                        <a:latin typeface="Cambria Math" panose="02040503050406030204" pitchFamily="18" charset="0"/>
-                        <a:ea typeface="Cambria Math" panose="02040503050406030204" pitchFamily="18" charset="0"/>
-                      </a:rPr>
-                      <m:t>≡</m:t>
-                    </m:r>
-                    <m:r>
-                      <a:rPr lang="en-US" i="1">
-                        <a:latin typeface="Cambria Math" panose="02040503050406030204" pitchFamily="18" charset="0"/>
-                        <a:ea typeface="Cambria Math" panose="02040503050406030204" pitchFamily="18" charset="0"/>
-                      </a:rPr>
-                      <m:t>𝔼</m:t>
-                    </m:r>
-                    <m:d>
-                      <m:dPr>
-                        <m:ctrlPr>
-                          <a:rPr lang="en-US" i="1">
-                            <a:latin typeface="Cambria Math" panose="02040503050406030204" pitchFamily="18" charset="0"/>
-                            <a:ea typeface="Cambria Math" panose="02040503050406030204" pitchFamily="18" charset="0"/>
-                          </a:rPr>
-                        </m:ctrlPr>
-                      </m:dPr>
-                      <m:e>
-                        <m:sSub>
-                          <m:sSubPr>
-                            <m:ctrlPr>
-                              <a:rPr lang="en-US" i="1">
-                                <a:latin typeface="Cambria Math" panose="02040503050406030204" pitchFamily="18" charset="0"/>
-                              </a:rPr>
-                            </m:ctrlPr>
-                          </m:sSubPr>
-                          <m:e>
-                            <m:r>
-                              <a:rPr lang="en-US" i="1">
-                                <a:latin typeface="Cambria Math" panose="02040503050406030204" pitchFamily="18" charset="0"/>
-                              </a:rPr>
-                              <m:t>𝑌</m:t>
-                            </m:r>
-                          </m:e>
-                          <m:sub>
-                            <m:r>
-                              <a:rPr lang="en-US" i="1">
-                                <a:latin typeface="Cambria Math" panose="02040503050406030204" pitchFamily="18" charset="0"/>
-                              </a:rPr>
-                              <m:t>𝑖</m:t>
-                            </m:r>
-                          </m:sub>
-                        </m:sSub>
-                      </m:e>
-                    </m:d>
-                  </m:oMath>
-                </a14:m>
-                <a:r>
-                  <a:rPr lang="en-US" dirty="0" smtClean="0"/>
-                  <a:t>, </a:t>
-                </a:r>
-                <a:r>
-                  <a:rPr lang="en-US" dirty="0"/>
-                  <a:t>to the </a:t>
-                </a:r>
-                <a:r>
-                  <a:rPr lang="en-US" dirty="0" smtClean="0"/>
-                  <a:t>data</a:t>
-                </a:r>
-              </a:p>
-              <a:p>
-                <a:pPr marL="457200" lvl="5" indent="0">
-                  <a:buNone/>
-                </a:pPr>
-                <a14:m>
-                  <m:oMathPara xmlns:m="http://schemas.openxmlformats.org/officeDocument/2006/math">
-                    <m:oMathParaPr>
-                      <m:jc m:val="centerGroup"/>
-                    </m:oMathParaPr>
-                    <m:oMath xmlns:m="http://schemas.openxmlformats.org/officeDocument/2006/math">
-                      <m:r>
-                        <a:rPr lang="en-US" b="0" i="1" smtClean="0">
-                          <a:latin typeface="Cambria Math" panose="02040503050406030204" pitchFamily="18" charset="0"/>
-                        </a:rPr>
-                        <m:t>𝑔</m:t>
-                      </m:r>
-                      <m:d>
-                        <m:dPr>
-                          <m:ctrlPr>
-                            <a:rPr lang="en-US" b="0" i="1" smtClean="0">
-                              <a:latin typeface="Cambria Math" panose="02040503050406030204" pitchFamily="18" charset="0"/>
-                            </a:rPr>
-                          </m:ctrlPr>
-                        </m:dPr>
-                        <m:e>
-                          <m:sSub>
-                            <m:sSubPr>
-                              <m:ctrlPr>
-                                <a:rPr lang="en-US" i="1">
-                                  <a:latin typeface="Cambria Math" panose="02040503050406030204" pitchFamily="18" charset="0"/>
-                                </a:rPr>
-                              </m:ctrlPr>
-                            </m:sSubPr>
-                            <m:e>
-                              <m:r>
-                                <a:rPr lang="en-US" i="1">
-                                  <a:latin typeface="Cambria Math" panose="02040503050406030204" pitchFamily="18" charset="0"/>
-                                  <a:ea typeface="Cambria Math" panose="02040503050406030204" pitchFamily="18" charset="0"/>
-                                </a:rPr>
-                                <m:t>𝜇</m:t>
-                              </m:r>
-                            </m:e>
-                            <m:sub>
-                              <m:r>
-                                <a:rPr lang="en-US" i="1">
-                                  <a:latin typeface="Cambria Math" panose="02040503050406030204" pitchFamily="18" charset="0"/>
-                                </a:rPr>
-                                <m:t>𝑖</m:t>
-                              </m:r>
-                            </m:sub>
-                          </m:sSub>
-                        </m:e>
-                      </m:d>
-                      <m:r>
-                        <a:rPr lang="en-US" b="0" i="1" smtClean="0">
-                          <a:latin typeface="Cambria Math" panose="02040503050406030204" pitchFamily="18" charset="0"/>
-                        </a:rPr>
-                        <m:t>=</m:t>
-                      </m:r>
-                      <m:sSub>
-                        <m:sSubPr>
-                          <m:ctrlPr>
-                            <a:rPr lang="en-US" b="0" i="1" smtClean="0">
-                              <a:latin typeface="Cambria Math" panose="02040503050406030204" pitchFamily="18" charset="0"/>
-                            </a:rPr>
-                          </m:ctrlPr>
-                        </m:sSubPr>
-                        <m:e>
-                          <m:r>
-                            <a:rPr lang="en-US" b="0" i="1" smtClean="0">
-                              <a:latin typeface="Cambria Math" panose="02040503050406030204" pitchFamily="18" charset="0"/>
-                              <a:ea typeface="Cambria Math" panose="02040503050406030204" pitchFamily="18" charset="0"/>
-                            </a:rPr>
-                            <m:t>𝜂</m:t>
-                          </m:r>
-                        </m:e>
-                        <m:sub>
-                          <m:r>
-                            <a:rPr lang="en-US" b="0" i="1" smtClean="0">
-                              <a:latin typeface="Cambria Math" panose="02040503050406030204" pitchFamily="18" charset="0"/>
-                            </a:rPr>
-                            <m:t>𝑖</m:t>
-                          </m:r>
-                        </m:sub>
-                      </m:sSub>
-                      <m:r>
-                        <a:rPr lang="en-US" b="0" i="1" smtClean="0">
-                          <a:latin typeface="Cambria Math" panose="02040503050406030204" pitchFamily="18" charset="0"/>
-                        </a:rPr>
-                        <m:t>=</m:t>
-                      </m:r>
-                      <m:sSub>
-                        <m:sSubPr>
-                          <m:ctrlPr>
-                            <a:rPr lang="en-US" i="1">
-                              <a:latin typeface="Cambria Math" panose="02040503050406030204" pitchFamily="18" charset="0"/>
-                              <a:ea typeface="Cambria Math" panose="02040503050406030204" pitchFamily="18" charset="0"/>
-                            </a:rPr>
-                          </m:ctrlPr>
-                        </m:sSubPr>
-                        <m:e>
-                          <m:r>
-                            <a:rPr lang="en-US" i="1">
-                              <a:latin typeface="Cambria Math" panose="02040503050406030204" pitchFamily="18" charset="0"/>
-                              <a:ea typeface="Cambria Math" panose="02040503050406030204" pitchFamily="18" charset="0"/>
-                            </a:rPr>
-                            <m:t>𝛽</m:t>
-                          </m:r>
-                        </m:e>
-                        <m:sub>
-                          <m:r>
-                            <a:rPr lang="en-US" i="1">
-                              <a:latin typeface="Cambria Math" panose="02040503050406030204" pitchFamily="18" charset="0"/>
-                              <a:ea typeface="Cambria Math" panose="02040503050406030204" pitchFamily="18" charset="0"/>
-                            </a:rPr>
-                            <m:t>1</m:t>
-                          </m:r>
-                        </m:sub>
-                      </m:sSub>
-                      <m:sSub>
-                        <m:sSubPr>
-                          <m:ctrlPr>
-                            <a:rPr lang="en-US" i="1">
-                              <a:latin typeface="Cambria Math" panose="02040503050406030204" pitchFamily="18" charset="0"/>
-                              <a:ea typeface="Cambria Math" panose="02040503050406030204" pitchFamily="18" charset="0"/>
-                            </a:rPr>
-                          </m:ctrlPr>
-                        </m:sSubPr>
-                        <m:e>
-                          <m:r>
-                            <a:rPr lang="en-US" i="1">
-                              <a:latin typeface="Cambria Math" panose="02040503050406030204" pitchFamily="18" charset="0"/>
-                              <a:ea typeface="Cambria Math" panose="02040503050406030204" pitchFamily="18" charset="0"/>
-                            </a:rPr>
-                            <m:t>𝑥</m:t>
-                          </m:r>
-                        </m:e>
-                        <m:sub>
-                          <m:r>
-                            <a:rPr lang="en-US" i="1">
-                              <a:latin typeface="Cambria Math" panose="02040503050406030204" pitchFamily="18" charset="0"/>
-                              <a:ea typeface="Cambria Math" panose="02040503050406030204" pitchFamily="18" charset="0"/>
-                            </a:rPr>
-                            <m:t>1</m:t>
-                          </m:r>
-                          <m:r>
-                            <a:rPr lang="en-US" b="0" i="1" smtClean="0">
-                              <a:latin typeface="Cambria Math" panose="02040503050406030204" pitchFamily="18" charset="0"/>
-                              <a:ea typeface="Cambria Math" panose="02040503050406030204" pitchFamily="18" charset="0"/>
-                            </a:rPr>
-                            <m:t>𝑖</m:t>
-                          </m:r>
-                        </m:sub>
-                      </m:sSub>
-                      <m:r>
-                        <a:rPr lang="en-US" i="1">
-                          <a:latin typeface="Cambria Math" panose="02040503050406030204" pitchFamily="18" charset="0"/>
-                          <a:ea typeface="Cambria Math" panose="02040503050406030204" pitchFamily="18" charset="0"/>
-                        </a:rPr>
-                        <m:t>+</m:t>
-                      </m:r>
-                      <m:sSub>
-                        <m:sSubPr>
-                          <m:ctrlPr>
-                            <a:rPr lang="en-US" i="1">
-                              <a:latin typeface="Cambria Math" panose="02040503050406030204" pitchFamily="18" charset="0"/>
-                              <a:ea typeface="Cambria Math" panose="02040503050406030204" pitchFamily="18" charset="0"/>
-                            </a:rPr>
-                          </m:ctrlPr>
-                        </m:sSubPr>
-                        <m:e>
-                          <m:r>
-                            <a:rPr lang="en-US" i="1">
-                              <a:latin typeface="Cambria Math" panose="02040503050406030204" pitchFamily="18" charset="0"/>
-                              <a:ea typeface="Cambria Math" panose="02040503050406030204" pitchFamily="18" charset="0"/>
-                            </a:rPr>
-                            <m:t>𝛽</m:t>
-                          </m:r>
-                        </m:e>
-                        <m:sub>
-                          <m:r>
-                            <a:rPr lang="en-US" i="1">
-                              <a:latin typeface="Cambria Math" panose="02040503050406030204" pitchFamily="18" charset="0"/>
-                              <a:ea typeface="Cambria Math" panose="02040503050406030204" pitchFamily="18" charset="0"/>
-                            </a:rPr>
-                            <m:t>2</m:t>
-                          </m:r>
-                        </m:sub>
-                      </m:sSub>
-                      <m:sSub>
-                        <m:sSubPr>
-                          <m:ctrlPr>
-                            <a:rPr lang="en-US" i="1">
-                              <a:latin typeface="Cambria Math" panose="02040503050406030204" pitchFamily="18" charset="0"/>
-                              <a:ea typeface="Cambria Math" panose="02040503050406030204" pitchFamily="18" charset="0"/>
-                            </a:rPr>
-                          </m:ctrlPr>
-                        </m:sSubPr>
-                        <m:e>
-                          <m:r>
-                            <a:rPr lang="en-US" i="1">
-                              <a:latin typeface="Cambria Math" panose="02040503050406030204" pitchFamily="18" charset="0"/>
-                              <a:ea typeface="Cambria Math" panose="02040503050406030204" pitchFamily="18" charset="0"/>
-                            </a:rPr>
-                            <m:t>𝑥</m:t>
-                          </m:r>
-                        </m:e>
-                        <m:sub>
-                          <m:r>
-                            <a:rPr lang="en-US" i="1">
-                              <a:latin typeface="Cambria Math" panose="02040503050406030204" pitchFamily="18" charset="0"/>
-                              <a:ea typeface="Cambria Math" panose="02040503050406030204" pitchFamily="18" charset="0"/>
-                            </a:rPr>
-                            <m:t>2</m:t>
-                          </m:r>
-                          <m:r>
-                            <a:rPr lang="en-US" b="0" i="1" smtClean="0">
-                              <a:latin typeface="Cambria Math" panose="02040503050406030204" pitchFamily="18" charset="0"/>
-                              <a:ea typeface="Cambria Math" panose="02040503050406030204" pitchFamily="18" charset="0"/>
-                            </a:rPr>
-                            <m:t>𝑖</m:t>
-                          </m:r>
-                        </m:sub>
-                      </m:sSub>
-                      <m:r>
-                        <m:rPr>
-                          <m:nor/>
-                        </m:rPr>
-                        <a:rPr lang="en-US" dirty="0"/>
-                        <m:t>+</m:t>
-                      </m:r>
-                      <m:sSub>
-                        <m:sSubPr>
-                          <m:ctrlPr>
-                            <a:rPr lang="en-US" i="1">
-                              <a:latin typeface="Cambria Math" panose="02040503050406030204" pitchFamily="18" charset="0"/>
-                              <a:ea typeface="Cambria Math" panose="02040503050406030204" pitchFamily="18" charset="0"/>
-                            </a:rPr>
-                          </m:ctrlPr>
-                        </m:sSubPr>
-                        <m:e>
-                          <m:r>
-                            <a:rPr lang="en-US" i="1">
-                              <a:latin typeface="Cambria Math" panose="02040503050406030204" pitchFamily="18" charset="0"/>
-                              <a:ea typeface="Cambria Math" panose="02040503050406030204" pitchFamily="18" charset="0"/>
-                            </a:rPr>
-                            <m:t>𝛽</m:t>
-                          </m:r>
-                        </m:e>
-                        <m:sub>
-                          <m:r>
-                            <a:rPr lang="en-US" i="1">
-                              <a:latin typeface="Cambria Math" panose="02040503050406030204" pitchFamily="18" charset="0"/>
-                              <a:ea typeface="Cambria Math" panose="02040503050406030204" pitchFamily="18" charset="0"/>
-                            </a:rPr>
-                            <m:t>3</m:t>
-                          </m:r>
-                        </m:sub>
-                      </m:sSub>
-                      <m:sSub>
-                        <m:sSubPr>
-                          <m:ctrlPr>
-                            <a:rPr lang="en-US" i="1">
-                              <a:latin typeface="Cambria Math" panose="02040503050406030204" pitchFamily="18" charset="0"/>
-                              <a:ea typeface="Cambria Math" panose="02040503050406030204" pitchFamily="18" charset="0"/>
-                            </a:rPr>
-                          </m:ctrlPr>
-                        </m:sSubPr>
-                        <m:e>
-                          <m:r>
-                            <a:rPr lang="en-US" i="1">
-                              <a:latin typeface="Cambria Math" panose="02040503050406030204" pitchFamily="18" charset="0"/>
-                              <a:ea typeface="Cambria Math" panose="02040503050406030204" pitchFamily="18" charset="0"/>
-                            </a:rPr>
-                            <m:t>𝑥</m:t>
-                          </m:r>
-                        </m:e>
-                        <m:sub>
-                          <m:r>
-                            <a:rPr lang="en-US" i="1">
-                              <a:latin typeface="Cambria Math" panose="02040503050406030204" pitchFamily="18" charset="0"/>
-                              <a:ea typeface="Cambria Math" panose="02040503050406030204" pitchFamily="18" charset="0"/>
-                            </a:rPr>
-                            <m:t>3</m:t>
-                          </m:r>
-                          <m:r>
-                            <a:rPr lang="en-US" b="0" i="1" smtClean="0">
-                              <a:latin typeface="Cambria Math" panose="02040503050406030204" pitchFamily="18" charset="0"/>
-                              <a:ea typeface="Cambria Math" panose="02040503050406030204" pitchFamily="18" charset="0"/>
-                            </a:rPr>
-                            <m:t>𝑖</m:t>
-                          </m:r>
-                        </m:sub>
-                      </m:sSub>
-                      <m:r>
-                        <m:rPr>
-                          <m:nor/>
-                        </m:rPr>
-                        <a:rPr lang="en-US" dirty="0"/>
-                        <m:t>+…+</m:t>
-                      </m:r>
-                      <m:sSub>
-                        <m:sSubPr>
-                          <m:ctrlPr>
-                            <a:rPr lang="en-US" i="1">
-                              <a:latin typeface="Cambria Math" panose="02040503050406030204" pitchFamily="18" charset="0"/>
-                              <a:ea typeface="Cambria Math" panose="02040503050406030204" pitchFamily="18" charset="0"/>
-                            </a:rPr>
-                          </m:ctrlPr>
-                        </m:sSubPr>
-                        <m:e>
-                          <m:r>
-                            <a:rPr lang="en-US" i="1">
-                              <a:latin typeface="Cambria Math" panose="02040503050406030204" pitchFamily="18" charset="0"/>
-                              <a:ea typeface="Cambria Math" panose="02040503050406030204" pitchFamily="18" charset="0"/>
-                            </a:rPr>
-                            <m:t>𝛽</m:t>
-                          </m:r>
-                        </m:e>
-                        <m:sub>
-                          <m:r>
-                            <a:rPr lang="en-US" i="1">
-                              <a:latin typeface="Cambria Math" panose="02040503050406030204" pitchFamily="18" charset="0"/>
-                              <a:ea typeface="Cambria Math" panose="02040503050406030204" pitchFamily="18" charset="0"/>
-                            </a:rPr>
-                            <m:t>𝑝</m:t>
-                          </m:r>
-                        </m:sub>
-                      </m:sSub>
-                      <m:sSub>
-                        <m:sSubPr>
-                          <m:ctrlPr>
-                            <a:rPr lang="en-US" i="1">
-                              <a:latin typeface="Cambria Math" panose="02040503050406030204" pitchFamily="18" charset="0"/>
-                              <a:ea typeface="Cambria Math" panose="02040503050406030204" pitchFamily="18" charset="0"/>
-                            </a:rPr>
-                          </m:ctrlPr>
-                        </m:sSubPr>
-                        <m:e>
-                          <m:r>
-                            <a:rPr lang="en-US" i="1">
-                              <a:latin typeface="Cambria Math" panose="02040503050406030204" pitchFamily="18" charset="0"/>
-                              <a:ea typeface="Cambria Math" panose="02040503050406030204" pitchFamily="18" charset="0"/>
-                            </a:rPr>
-                            <m:t>𝑥</m:t>
-                          </m:r>
-                        </m:e>
-                        <m:sub>
-                          <m:r>
-                            <a:rPr lang="en-US" i="1">
-                              <a:latin typeface="Cambria Math" panose="02040503050406030204" pitchFamily="18" charset="0"/>
-                              <a:ea typeface="Cambria Math" panose="02040503050406030204" pitchFamily="18" charset="0"/>
-                            </a:rPr>
-                            <m:t>𝑝</m:t>
-                          </m:r>
-                          <m:r>
-                            <a:rPr lang="en-US" b="0" i="1" smtClean="0">
-                              <a:latin typeface="Cambria Math" panose="02040503050406030204" pitchFamily="18" charset="0"/>
-                              <a:ea typeface="Cambria Math" panose="02040503050406030204" pitchFamily="18" charset="0"/>
-                            </a:rPr>
-                            <m:t>𝑖</m:t>
-                          </m:r>
-                        </m:sub>
-                      </m:sSub>
-                    </m:oMath>
-                  </m:oMathPara>
-                </a14:m>
-                <a:endParaRPr lang="en-US" dirty="0" smtClean="0"/>
-              </a:p>
-              <a:p>
-                <a:pPr marL="457200" lvl="5" indent="0">
-                  <a:buNone/>
-                </a:pPr>
-                <a:endParaRPr lang="en-US" dirty="0"/>
-              </a:p>
-              <a:p>
-                <a:pPr marL="685800" lvl="5"/>
-                <a:r>
-                  <a:rPr lang="en-US" dirty="0" smtClean="0"/>
-                  <a:t>In other words, the </a:t>
-                </a:r>
-                <a:r>
-                  <a:rPr lang="en-US" dirty="0"/>
-                  <a:t>purpose of the link function is to tame the response variable to restrict it to the correct scale when it is a function of </a:t>
-                </a:r>
-                <a:r>
-                  <a:rPr lang="en-US" dirty="0" smtClean="0"/>
-                  <a:t>the linear predictor</a:t>
-                </a:r>
-              </a:p>
-              <a:p>
-                <a:pPr marL="228600" lvl="4"/>
-                <a:r>
-                  <a:rPr lang="en-US" dirty="0"/>
-                  <a:t>Mathematical </a:t>
-                </a:r>
-                <a:r>
-                  <a:rPr lang="en-US" dirty="0" smtClean="0"/>
-                  <a:t>notation</a:t>
-                </a:r>
-              </a:p>
-              <a:p>
-                <a:pPr marL="0" lvl="4" indent="0">
-                  <a:buNone/>
-                </a:pPr>
-                <a14:m>
-                  <m:oMathPara xmlns:m="http://schemas.openxmlformats.org/officeDocument/2006/math">
-                    <m:oMathParaPr>
-                      <m:jc m:val="centerGroup"/>
-                    </m:oMathParaPr>
-                    <m:oMath xmlns:m="http://schemas.openxmlformats.org/officeDocument/2006/math">
-                      <m:r>
-                        <a:rPr lang="en-US" i="1">
-                          <a:latin typeface="Cambria Math" panose="02040503050406030204" pitchFamily="18" charset="0"/>
-                        </a:rPr>
-                        <m:t>𝑔</m:t>
-                      </m:r>
-                      <m:d>
-                        <m:dPr>
-                          <m:ctrlPr>
-                            <a:rPr lang="en-US" i="1">
-                              <a:latin typeface="Cambria Math" panose="02040503050406030204" pitchFamily="18" charset="0"/>
-                            </a:rPr>
-                          </m:ctrlPr>
-                        </m:dPr>
-                        <m:e>
-                          <m:sSub>
-                            <m:sSubPr>
-                              <m:ctrlPr>
-                                <a:rPr lang="en-US" i="1">
-                                  <a:latin typeface="Cambria Math" panose="02040503050406030204" pitchFamily="18" charset="0"/>
-                                </a:rPr>
-                              </m:ctrlPr>
-                            </m:sSubPr>
-                            <m:e>
-                              <m:r>
-                                <a:rPr lang="en-US" i="1">
-                                  <a:latin typeface="Cambria Math" panose="02040503050406030204" pitchFamily="18" charset="0"/>
-                                  <a:ea typeface="Cambria Math" panose="02040503050406030204" pitchFamily="18" charset="0"/>
-                                </a:rPr>
-                                <m:t>𝜇</m:t>
-                              </m:r>
-                            </m:e>
-                            <m:sub>
-                              <m:r>
-                                <a:rPr lang="en-US" i="1">
-                                  <a:latin typeface="Cambria Math" panose="02040503050406030204" pitchFamily="18" charset="0"/>
-                                </a:rPr>
-                                <m:t>𝑖</m:t>
-                              </m:r>
-                            </m:sub>
-                          </m:sSub>
-                        </m:e>
-                      </m:d>
-                      <m:r>
-                        <a:rPr lang="en-US" b="0" i="1" smtClean="0">
-                          <a:latin typeface="Cambria Math" panose="02040503050406030204" pitchFamily="18" charset="0"/>
-                        </a:rPr>
-                        <m:t>=</m:t>
-                      </m:r>
-                      <m:r>
-                        <a:rPr lang="en-US" b="0" i="1" smtClean="0">
-                          <a:latin typeface="Cambria Math" panose="02040503050406030204" pitchFamily="18" charset="0"/>
-                        </a:rPr>
-                        <m:t>𝑔</m:t>
-                      </m:r>
-                      <m:d>
-                        <m:dPr>
-                          <m:begChr m:val="["/>
-                          <m:endChr m:val="]"/>
-                          <m:ctrlPr>
-                            <a:rPr lang="en-US" b="0" i="1" smtClean="0">
-                              <a:latin typeface="Cambria Math" panose="02040503050406030204" pitchFamily="18" charset="0"/>
-                            </a:rPr>
-                          </m:ctrlPr>
-                        </m:dPr>
-                        <m:e>
-                          <m:r>
-                            <a:rPr lang="en-US" i="1">
-                              <a:latin typeface="Cambria Math" panose="02040503050406030204" pitchFamily="18" charset="0"/>
-                              <a:ea typeface="Cambria Math" panose="02040503050406030204" pitchFamily="18" charset="0"/>
-                            </a:rPr>
-                            <m:t>𝔼</m:t>
-                          </m:r>
-                          <m:d>
-                            <m:dPr>
-                              <m:ctrlPr>
-                                <a:rPr lang="en-US" i="1">
-                                  <a:latin typeface="Cambria Math" panose="02040503050406030204" pitchFamily="18" charset="0"/>
-                                  <a:ea typeface="Cambria Math" panose="02040503050406030204" pitchFamily="18" charset="0"/>
-                                </a:rPr>
-                              </m:ctrlPr>
-                            </m:dPr>
-                            <m:e>
-                              <m:sSub>
-                                <m:sSubPr>
-                                  <m:ctrlPr>
-                                    <a:rPr lang="en-US" i="1">
-                                      <a:latin typeface="Cambria Math" panose="02040503050406030204" pitchFamily="18" charset="0"/>
-                                    </a:rPr>
-                                  </m:ctrlPr>
-                                </m:sSubPr>
-                                <m:e>
-                                  <m:r>
-                                    <a:rPr lang="en-US" i="1">
-                                      <a:latin typeface="Cambria Math" panose="02040503050406030204" pitchFamily="18" charset="0"/>
-                                    </a:rPr>
-                                    <m:t>𝑌</m:t>
-                                  </m:r>
-                                </m:e>
-                                <m:sub>
-                                  <m:r>
-                                    <a:rPr lang="en-US" i="1">
-                                      <a:latin typeface="Cambria Math" panose="02040503050406030204" pitchFamily="18" charset="0"/>
-                                    </a:rPr>
-                                    <m:t>𝑖</m:t>
-                                  </m:r>
-                                </m:sub>
-                              </m:sSub>
-                            </m:e>
-                          </m:d>
-                        </m:e>
-                      </m:d>
-                      <m:r>
-                        <a:rPr lang="en-US" i="1">
-                          <a:latin typeface="Cambria Math" panose="02040503050406030204" pitchFamily="18" charset="0"/>
-                        </a:rPr>
-                        <m:t>=</m:t>
-                      </m:r>
-                      <m:sSub>
-                        <m:sSubPr>
-                          <m:ctrlPr>
-                            <a:rPr lang="en-US" i="1">
-                              <a:latin typeface="Cambria Math" panose="02040503050406030204" pitchFamily="18" charset="0"/>
-                            </a:rPr>
-                          </m:ctrlPr>
-                        </m:sSubPr>
-                        <m:e>
-                          <m:r>
-                            <a:rPr lang="en-US" i="1">
-                              <a:latin typeface="Cambria Math" panose="02040503050406030204" pitchFamily="18" charset="0"/>
-                              <a:ea typeface="Cambria Math" panose="02040503050406030204" pitchFamily="18" charset="0"/>
-                            </a:rPr>
-                            <m:t>𝜂</m:t>
-                          </m:r>
-                        </m:e>
-                        <m:sub>
-                          <m:r>
-                            <a:rPr lang="en-US" i="1">
-                              <a:latin typeface="Cambria Math" panose="02040503050406030204" pitchFamily="18" charset="0"/>
-                            </a:rPr>
-                            <m:t>𝑖</m:t>
-                          </m:r>
-                        </m:sub>
-                      </m:sSub>
-                      <m:r>
-                        <a:rPr lang="en-US" i="1">
-                          <a:latin typeface="Cambria Math" panose="02040503050406030204" pitchFamily="18" charset="0"/>
-                        </a:rPr>
-                        <m:t>=</m:t>
-                      </m:r>
-                      <m:sSub>
-                        <m:sSubPr>
-                          <m:ctrlPr>
-                            <a:rPr lang="en-US" i="1">
-                              <a:latin typeface="Cambria Math" panose="02040503050406030204" pitchFamily="18" charset="0"/>
-                              <a:ea typeface="Cambria Math" panose="02040503050406030204" pitchFamily="18" charset="0"/>
-                            </a:rPr>
-                          </m:ctrlPr>
-                        </m:sSubPr>
-                        <m:e>
-                          <m:r>
-                            <a:rPr lang="en-US" i="1">
-                              <a:latin typeface="Cambria Math" panose="02040503050406030204" pitchFamily="18" charset="0"/>
-                              <a:ea typeface="Cambria Math" panose="02040503050406030204" pitchFamily="18" charset="0"/>
-                            </a:rPr>
-                            <m:t>𝛽</m:t>
-                          </m:r>
-                        </m:e>
-                        <m:sub>
-                          <m:r>
-                            <a:rPr lang="en-US" i="1">
-                              <a:latin typeface="Cambria Math" panose="02040503050406030204" pitchFamily="18" charset="0"/>
-                              <a:ea typeface="Cambria Math" panose="02040503050406030204" pitchFamily="18" charset="0"/>
-                            </a:rPr>
-                            <m:t>1</m:t>
-                          </m:r>
-                        </m:sub>
-                      </m:sSub>
-                      <m:sSub>
-                        <m:sSubPr>
-                          <m:ctrlPr>
-                            <a:rPr lang="en-US" i="1">
-                              <a:latin typeface="Cambria Math" panose="02040503050406030204" pitchFamily="18" charset="0"/>
-                              <a:ea typeface="Cambria Math" panose="02040503050406030204" pitchFamily="18" charset="0"/>
-                            </a:rPr>
-                          </m:ctrlPr>
-                        </m:sSubPr>
-                        <m:e>
-                          <m:r>
-                            <a:rPr lang="en-US" i="1">
-                              <a:latin typeface="Cambria Math" panose="02040503050406030204" pitchFamily="18" charset="0"/>
-                              <a:ea typeface="Cambria Math" panose="02040503050406030204" pitchFamily="18" charset="0"/>
-                            </a:rPr>
-                            <m:t>𝑥</m:t>
-                          </m:r>
-                        </m:e>
-                        <m:sub>
-                          <m:r>
-                            <a:rPr lang="en-US" i="1">
-                              <a:latin typeface="Cambria Math" panose="02040503050406030204" pitchFamily="18" charset="0"/>
-                              <a:ea typeface="Cambria Math" panose="02040503050406030204" pitchFamily="18" charset="0"/>
-                            </a:rPr>
-                            <m:t>1</m:t>
-                          </m:r>
-                          <m:r>
-                            <a:rPr lang="en-US" i="1">
-                              <a:latin typeface="Cambria Math" panose="02040503050406030204" pitchFamily="18" charset="0"/>
-                              <a:ea typeface="Cambria Math" panose="02040503050406030204" pitchFamily="18" charset="0"/>
-                            </a:rPr>
-                            <m:t>𝑖</m:t>
-                          </m:r>
-                        </m:sub>
-                      </m:sSub>
-                      <m:r>
-                        <a:rPr lang="en-US" i="1">
-                          <a:latin typeface="Cambria Math" panose="02040503050406030204" pitchFamily="18" charset="0"/>
-                          <a:ea typeface="Cambria Math" panose="02040503050406030204" pitchFamily="18" charset="0"/>
-                        </a:rPr>
-                        <m:t>+</m:t>
-                      </m:r>
-                      <m:sSub>
-                        <m:sSubPr>
-                          <m:ctrlPr>
-                            <a:rPr lang="en-US" i="1">
-                              <a:latin typeface="Cambria Math" panose="02040503050406030204" pitchFamily="18" charset="0"/>
-                              <a:ea typeface="Cambria Math" panose="02040503050406030204" pitchFamily="18" charset="0"/>
-                            </a:rPr>
-                          </m:ctrlPr>
-                        </m:sSubPr>
-                        <m:e>
-                          <m:r>
-                            <a:rPr lang="en-US" i="1">
-                              <a:latin typeface="Cambria Math" panose="02040503050406030204" pitchFamily="18" charset="0"/>
-                              <a:ea typeface="Cambria Math" panose="02040503050406030204" pitchFamily="18" charset="0"/>
-                            </a:rPr>
-                            <m:t>𝛽</m:t>
-                          </m:r>
-                        </m:e>
-                        <m:sub>
-                          <m:r>
-                            <a:rPr lang="en-US" i="1">
-                              <a:latin typeface="Cambria Math" panose="02040503050406030204" pitchFamily="18" charset="0"/>
-                              <a:ea typeface="Cambria Math" panose="02040503050406030204" pitchFamily="18" charset="0"/>
-                            </a:rPr>
-                            <m:t>2</m:t>
-                          </m:r>
-                        </m:sub>
-                      </m:sSub>
-                      <m:sSub>
-                        <m:sSubPr>
-                          <m:ctrlPr>
-                            <a:rPr lang="en-US" i="1">
-                              <a:latin typeface="Cambria Math" panose="02040503050406030204" pitchFamily="18" charset="0"/>
-                              <a:ea typeface="Cambria Math" panose="02040503050406030204" pitchFamily="18" charset="0"/>
-                            </a:rPr>
-                          </m:ctrlPr>
-                        </m:sSubPr>
-                        <m:e>
-                          <m:r>
-                            <a:rPr lang="en-US" i="1">
-                              <a:latin typeface="Cambria Math" panose="02040503050406030204" pitchFamily="18" charset="0"/>
-                              <a:ea typeface="Cambria Math" panose="02040503050406030204" pitchFamily="18" charset="0"/>
-                            </a:rPr>
-                            <m:t>𝑥</m:t>
-                          </m:r>
-                        </m:e>
-                        <m:sub>
-                          <m:r>
-                            <a:rPr lang="en-US" i="1">
-                              <a:latin typeface="Cambria Math" panose="02040503050406030204" pitchFamily="18" charset="0"/>
-                              <a:ea typeface="Cambria Math" panose="02040503050406030204" pitchFamily="18" charset="0"/>
-                            </a:rPr>
-                            <m:t>2</m:t>
-                          </m:r>
-                          <m:r>
-                            <a:rPr lang="en-US" i="1">
-                              <a:latin typeface="Cambria Math" panose="02040503050406030204" pitchFamily="18" charset="0"/>
-                              <a:ea typeface="Cambria Math" panose="02040503050406030204" pitchFamily="18" charset="0"/>
-                            </a:rPr>
-                            <m:t>𝑖</m:t>
-                          </m:r>
-                        </m:sub>
-                      </m:sSub>
-                      <m:r>
-                        <m:rPr>
-                          <m:nor/>
-                        </m:rPr>
-                        <a:rPr lang="en-US" dirty="0"/>
-                        <m:t>+</m:t>
-                      </m:r>
-                      <m:sSub>
-                        <m:sSubPr>
-                          <m:ctrlPr>
-                            <a:rPr lang="en-US" i="1">
-                              <a:latin typeface="Cambria Math" panose="02040503050406030204" pitchFamily="18" charset="0"/>
-                              <a:ea typeface="Cambria Math" panose="02040503050406030204" pitchFamily="18" charset="0"/>
-                            </a:rPr>
-                          </m:ctrlPr>
-                        </m:sSubPr>
-                        <m:e>
-                          <m:r>
-                            <a:rPr lang="en-US" i="1">
-                              <a:latin typeface="Cambria Math" panose="02040503050406030204" pitchFamily="18" charset="0"/>
-                              <a:ea typeface="Cambria Math" panose="02040503050406030204" pitchFamily="18" charset="0"/>
-                            </a:rPr>
-                            <m:t>𝛽</m:t>
-                          </m:r>
-                        </m:e>
-                        <m:sub>
-                          <m:r>
-                            <a:rPr lang="en-US" i="1">
-                              <a:latin typeface="Cambria Math" panose="02040503050406030204" pitchFamily="18" charset="0"/>
-                              <a:ea typeface="Cambria Math" panose="02040503050406030204" pitchFamily="18" charset="0"/>
-                            </a:rPr>
-                            <m:t>3</m:t>
-                          </m:r>
-                        </m:sub>
-                      </m:sSub>
-                      <m:sSub>
-                        <m:sSubPr>
-                          <m:ctrlPr>
-                            <a:rPr lang="en-US" i="1">
-                              <a:latin typeface="Cambria Math" panose="02040503050406030204" pitchFamily="18" charset="0"/>
-                              <a:ea typeface="Cambria Math" panose="02040503050406030204" pitchFamily="18" charset="0"/>
-                            </a:rPr>
-                          </m:ctrlPr>
-                        </m:sSubPr>
-                        <m:e>
-                          <m:r>
-                            <a:rPr lang="en-US" i="1">
-                              <a:latin typeface="Cambria Math" panose="02040503050406030204" pitchFamily="18" charset="0"/>
-                              <a:ea typeface="Cambria Math" panose="02040503050406030204" pitchFamily="18" charset="0"/>
-                            </a:rPr>
-                            <m:t>𝑥</m:t>
-                          </m:r>
-                        </m:e>
-                        <m:sub>
-                          <m:r>
-                            <a:rPr lang="en-US" i="1">
-                              <a:latin typeface="Cambria Math" panose="02040503050406030204" pitchFamily="18" charset="0"/>
-                              <a:ea typeface="Cambria Math" panose="02040503050406030204" pitchFamily="18" charset="0"/>
-                            </a:rPr>
-                            <m:t>3</m:t>
-                          </m:r>
-                          <m:r>
-                            <a:rPr lang="en-US" i="1">
-                              <a:latin typeface="Cambria Math" panose="02040503050406030204" pitchFamily="18" charset="0"/>
-                              <a:ea typeface="Cambria Math" panose="02040503050406030204" pitchFamily="18" charset="0"/>
-                            </a:rPr>
-                            <m:t>𝑖</m:t>
-                          </m:r>
-                        </m:sub>
-                      </m:sSub>
-                      <m:r>
-                        <m:rPr>
-                          <m:nor/>
-                        </m:rPr>
-                        <a:rPr lang="en-US" dirty="0"/>
-                        <m:t>+…+</m:t>
-                      </m:r>
-                      <m:sSub>
-                        <m:sSubPr>
-                          <m:ctrlPr>
-                            <a:rPr lang="en-US" i="1">
-                              <a:latin typeface="Cambria Math" panose="02040503050406030204" pitchFamily="18" charset="0"/>
-                              <a:ea typeface="Cambria Math" panose="02040503050406030204" pitchFamily="18" charset="0"/>
-                            </a:rPr>
-                          </m:ctrlPr>
-                        </m:sSubPr>
-                        <m:e>
-                          <m:r>
-                            <a:rPr lang="en-US" i="1">
-                              <a:latin typeface="Cambria Math" panose="02040503050406030204" pitchFamily="18" charset="0"/>
-                              <a:ea typeface="Cambria Math" panose="02040503050406030204" pitchFamily="18" charset="0"/>
-                            </a:rPr>
-                            <m:t>𝛽</m:t>
-                          </m:r>
-                        </m:e>
-                        <m:sub>
-                          <m:r>
-                            <a:rPr lang="en-US" i="1">
-                              <a:latin typeface="Cambria Math" panose="02040503050406030204" pitchFamily="18" charset="0"/>
-                              <a:ea typeface="Cambria Math" panose="02040503050406030204" pitchFamily="18" charset="0"/>
-                            </a:rPr>
-                            <m:t>𝑝</m:t>
-                          </m:r>
-                        </m:sub>
-                      </m:sSub>
-                      <m:sSub>
-                        <m:sSubPr>
-                          <m:ctrlPr>
-                            <a:rPr lang="en-US" i="1">
-                              <a:latin typeface="Cambria Math" panose="02040503050406030204" pitchFamily="18" charset="0"/>
-                              <a:ea typeface="Cambria Math" panose="02040503050406030204" pitchFamily="18" charset="0"/>
-                            </a:rPr>
-                          </m:ctrlPr>
-                        </m:sSubPr>
-                        <m:e>
-                          <m:r>
-                            <a:rPr lang="en-US" i="1">
-                              <a:latin typeface="Cambria Math" panose="02040503050406030204" pitchFamily="18" charset="0"/>
-                              <a:ea typeface="Cambria Math" panose="02040503050406030204" pitchFamily="18" charset="0"/>
-                            </a:rPr>
-                            <m:t>𝑥</m:t>
-                          </m:r>
-                        </m:e>
-                        <m:sub>
-                          <m:r>
-                            <a:rPr lang="en-US" i="1">
-                              <a:latin typeface="Cambria Math" panose="02040503050406030204" pitchFamily="18" charset="0"/>
-                              <a:ea typeface="Cambria Math" panose="02040503050406030204" pitchFamily="18" charset="0"/>
-                            </a:rPr>
-                            <m:t>𝑝𝑖</m:t>
-                          </m:r>
-                        </m:sub>
-                      </m:sSub>
-                    </m:oMath>
-                  </m:oMathPara>
-                </a14:m>
-                <a:endParaRPr lang="en-US" dirty="0" smtClean="0"/>
-              </a:p>
-              <a:p>
-                <a:pPr marL="461963" lvl="4" indent="0">
-                  <a:buNone/>
-                </a:pPr>
-                <a:r>
-                  <a:rPr lang="en-US" dirty="0"/>
-                  <a:t>w</a:t>
-                </a:r>
-                <a:r>
-                  <a:rPr lang="en-US" dirty="0" smtClean="0"/>
-                  <a:t>here:</a:t>
-                </a:r>
-              </a:p>
-              <a:p>
-                <a:pPr marL="461963" lvl="4" indent="0">
-                  <a:buNone/>
-                </a:pPr>
-                <a14:m>
-                  <m:oMath xmlns:m="http://schemas.openxmlformats.org/officeDocument/2006/math">
-                    <m:r>
-                      <a:rPr lang="en-US" b="0" i="1" smtClean="0">
-                        <a:latin typeface="Cambria Math" panose="02040503050406030204" pitchFamily="18" charset="0"/>
-                      </a:rPr>
-                      <m:t>𝑔</m:t>
-                    </m:r>
-                    <m:d>
-                      <m:dPr>
-                        <m:ctrlPr>
-                          <a:rPr lang="en-US" b="0" i="1" smtClean="0">
-                            <a:latin typeface="Cambria Math" panose="02040503050406030204" pitchFamily="18" charset="0"/>
-                          </a:rPr>
-                        </m:ctrlPr>
-                      </m:dPr>
-                      <m:e>
-                        <m:r>
-                          <a:rPr lang="en-US" b="0" i="1" smtClean="0">
-                            <a:latin typeface="Cambria Math" panose="02040503050406030204" pitchFamily="18" charset="0"/>
-                            <a:ea typeface="Cambria Math" panose="02040503050406030204" pitchFamily="18" charset="0"/>
-                          </a:rPr>
-                          <m:t>∙</m:t>
-                        </m:r>
-                      </m:e>
-                    </m:d>
-                  </m:oMath>
-                </a14:m>
-                <a:r>
-                  <a:rPr lang="en-US" dirty="0" smtClean="0"/>
-                  <a:t>: link function</a:t>
-                </a:r>
-              </a:p>
-              <a:p>
-                <a:pPr marL="461963" lvl="4" indent="0">
-                  <a:buNone/>
-                </a:pPr>
-                <a14:m>
-                  <m:oMath xmlns:m="http://schemas.openxmlformats.org/officeDocument/2006/math">
-                    <m:sSub>
-                      <m:sSubPr>
-                        <m:ctrlPr>
-                          <a:rPr lang="en-US" i="1">
-                            <a:latin typeface="Cambria Math" panose="02040503050406030204" pitchFamily="18" charset="0"/>
-                          </a:rPr>
-                        </m:ctrlPr>
-                      </m:sSubPr>
-                      <m:e>
-                        <m:r>
-                          <a:rPr lang="en-US" i="1">
-                            <a:latin typeface="Cambria Math" panose="02040503050406030204" pitchFamily="18" charset="0"/>
-                            <a:ea typeface="Cambria Math" panose="02040503050406030204" pitchFamily="18" charset="0"/>
-                          </a:rPr>
-                          <m:t>𝜇</m:t>
-                        </m:r>
-                      </m:e>
-                      <m:sub>
-                        <m:r>
-                          <a:rPr lang="en-US" i="1">
-                            <a:latin typeface="Cambria Math" panose="02040503050406030204" pitchFamily="18" charset="0"/>
-                          </a:rPr>
-                          <m:t>𝑖</m:t>
-                        </m:r>
-                      </m:sub>
-                    </m:sSub>
-                    <m:r>
-                      <a:rPr lang="en-US" i="1">
-                        <a:latin typeface="Cambria Math" panose="02040503050406030204" pitchFamily="18" charset="0"/>
-                        <a:ea typeface="Cambria Math" panose="02040503050406030204" pitchFamily="18" charset="0"/>
-                      </a:rPr>
-                      <m:t>≡</m:t>
-                    </m:r>
-                    <m:r>
-                      <a:rPr lang="en-US" i="1">
-                        <a:latin typeface="Cambria Math" panose="02040503050406030204" pitchFamily="18" charset="0"/>
-                        <a:ea typeface="Cambria Math" panose="02040503050406030204" pitchFamily="18" charset="0"/>
-                      </a:rPr>
-                      <m:t>𝔼</m:t>
-                    </m:r>
-                    <m:d>
-                      <m:dPr>
-                        <m:ctrlPr>
-                          <a:rPr lang="en-US" i="1">
-                            <a:latin typeface="Cambria Math" panose="02040503050406030204" pitchFamily="18" charset="0"/>
-                            <a:ea typeface="Cambria Math" panose="02040503050406030204" pitchFamily="18" charset="0"/>
-                          </a:rPr>
-                        </m:ctrlPr>
-                      </m:dPr>
-                      <m:e>
-                        <m:sSub>
-                          <m:sSubPr>
-                            <m:ctrlPr>
-                              <a:rPr lang="en-US" i="1">
-                                <a:latin typeface="Cambria Math" panose="02040503050406030204" pitchFamily="18" charset="0"/>
-                              </a:rPr>
-                            </m:ctrlPr>
-                          </m:sSubPr>
-                          <m:e>
-                            <m:r>
-                              <a:rPr lang="en-US" i="1">
-                                <a:latin typeface="Cambria Math" panose="02040503050406030204" pitchFamily="18" charset="0"/>
-                              </a:rPr>
-                              <m:t>𝑌</m:t>
-                            </m:r>
-                          </m:e>
-                          <m:sub>
-                            <m:r>
-                              <a:rPr lang="en-US" i="1">
-                                <a:latin typeface="Cambria Math" panose="02040503050406030204" pitchFamily="18" charset="0"/>
-                              </a:rPr>
-                              <m:t>𝑖</m:t>
-                            </m:r>
-                          </m:sub>
-                        </m:sSub>
-                      </m:e>
-                    </m:d>
-                  </m:oMath>
-                </a14:m>
-                <a:r>
-                  <a:rPr lang="en-US" dirty="0" smtClean="0"/>
-                  <a:t>: “</a:t>
-                </a:r>
-                <a14:m>
-                  <m:oMath xmlns:m="http://schemas.openxmlformats.org/officeDocument/2006/math">
-                    <m:sSub>
-                      <m:sSubPr>
-                        <m:ctrlPr>
-                          <a:rPr lang="en-US" i="1">
-                            <a:latin typeface="Cambria Math" panose="02040503050406030204" pitchFamily="18" charset="0"/>
-                          </a:rPr>
-                        </m:ctrlPr>
-                      </m:sSubPr>
-                      <m:e>
-                        <m:r>
-                          <a:rPr lang="en-US" i="1">
-                            <a:latin typeface="Cambria Math" panose="02040503050406030204" pitchFamily="18" charset="0"/>
-                            <a:ea typeface="Cambria Math" panose="02040503050406030204" pitchFamily="18" charset="0"/>
-                          </a:rPr>
-                          <m:t>𝜇</m:t>
-                        </m:r>
-                      </m:e>
-                      <m:sub>
-                        <m:r>
-                          <a:rPr lang="en-US" i="1">
-                            <a:latin typeface="Cambria Math" panose="02040503050406030204" pitchFamily="18" charset="0"/>
-                          </a:rPr>
-                          <m:t>𝑖</m:t>
-                        </m:r>
-                      </m:sub>
-                    </m:sSub>
-                  </m:oMath>
-                </a14:m>
-                <a:r>
-                  <a:rPr lang="en-US" dirty="0" smtClean="0"/>
-                  <a:t> is defined as the expected value [</a:t>
-                </a:r>
-                <a14:m>
-                  <m:oMath xmlns:m="http://schemas.openxmlformats.org/officeDocument/2006/math">
-                    <m:r>
-                      <a:rPr lang="en-US" i="1">
-                        <a:latin typeface="Cambria Math" panose="02040503050406030204" pitchFamily="18" charset="0"/>
-                        <a:ea typeface="Cambria Math" panose="02040503050406030204" pitchFamily="18" charset="0"/>
-                      </a:rPr>
-                      <m:t>𝔼</m:t>
-                    </m:r>
-                    <m:d>
-                      <m:dPr>
-                        <m:ctrlPr>
-                          <a:rPr lang="en-US" i="1" smtClean="0">
-                            <a:latin typeface="Cambria Math" panose="02040503050406030204" pitchFamily="18" charset="0"/>
-                            <a:ea typeface="Cambria Math" panose="02040503050406030204" pitchFamily="18" charset="0"/>
-                          </a:rPr>
-                        </m:ctrlPr>
-                      </m:dPr>
-                      <m:e>
-                        <m:r>
-                          <a:rPr lang="en-US" i="1" smtClean="0">
-                            <a:latin typeface="Cambria Math" panose="02040503050406030204" pitchFamily="18" charset="0"/>
-                            <a:ea typeface="Cambria Math" panose="02040503050406030204" pitchFamily="18" charset="0"/>
-                          </a:rPr>
-                          <m:t>∙</m:t>
-                        </m:r>
-                      </m:e>
-                    </m:d>
-                    <m:r>
-                      <a:rPr lang="en-US" i="1">
-                        <a:latin typeface="Cambria Math" panose="02040503050406030204" pitchFamily="18" charset="0"/>
-                        <a:ea typeface="Cambria Math" panose="02040503050406030204" pitchFamily="18" charset="0"/>
-                      </a:rPr>
-                      <m:t> </m:t>
-                    </m:r>
-                  </m:oMath>
-                </a14:m>
-                <a:r>
-                  <a:rPr lang="en-US" dirty="0" smtClean="0"/>
-                  <a:t>] of the response variable </a:t>
-                </a:r>
-                <a14:m>
-                  <m:oMath xmlns:m="http://schemas.openxmlformats.org/officeDocument/2006/math">
-                    <m:sSub>
-                      <m:sSubPr>
-                        <m:ctrlPr>
-                          <a:rPr lang="en-US" i="1">
-                            <a:latin typeface="Cambria Math" panose="02040503050406030204" pitchFamily="18" charset="0"/>
-                          </a:rPr>
-                        </m:ctrlPr>
-                      </m:sSubPr>
-                      <m:e>
-                        <m:r>
-                          <a:rPr lang="en-US" i="1">
-                            <a:latin typeface="Cambria Math" panose="02040503050406030204" pitchFamily="18" charset="0"/>
-                          </a:rPr>
-                          <m:t>𝑌</m:t>
-                        </m:r>
-                      </m:e>
-                      <m:sub>
-                        <m:r>
-                          <a:rPr lang="en-US" i="1">
-                            <a:latin typeface="Cambria Math" panose="02040503050406030204" pitchFamily="18" charset="0"/>
-                          </a:rPr>
-                          <m:t>𝑖</m:t>
-                        </m:r>
-                      </m:sub>
-                    </m:sSub>
-                  </m:oMath>
-                </a14:m>
-                <a:r>
-                  <a:rPr lang="en-US" dirty="0" smtClean="0"/>
-                  <a:t>”</a:t>
-                </a:r>
-                <a:endParaRPr lang="en-US" dirty="0"/>
-              </a:p>
-            </p:txBody>
-          </p:sp>
-        </mc:Choice>
-        <mc:Fallback>
-          <p:sp>
-            <p:nvSpPr>
-              <p:cNvPr id="3" name="Content Placeholder 2"/>
-              <p:cNvSpPr>
-                <a:spLocks noGrp="1" noRot="1" noChangeAspect="1" noMove="1" noResize="1" noEditPoints="1" noAdjustHandles="1" noChangeArrowheads="1" noChangeShapeType="1" noTextEdit="1"/>
-              </p:cNvSpPr>
-              <p:nvPr>
-                <p:ph idx="1"/>
-              </p:nvPr>
-            </p:nvSpPr>
-            <p:spPr>
-              <a:xfrm>
-                <a:off x="838200" y="1347829"/>
-                <a:ext cx="10515600" cy="4351338"/>
-              </a:xfrm>
-              <a:blipFill>
-                <a:blip r:embed="rId2"/>
-                <a:stretch>
-                  <a:fillRect l="-406" t="-1261"/>
-                </a:stretch>
-              </a:blipFill>
-            </p:spPr>
-            <p:txBody>
-              <a:bodyPr/>
-              <a:lstStyle/>
-              <a:p>
-                <a:r>
-                  <a:rPr lang="en-US">
-                    <a:noFill/>
-                  </a:rPr>
-                  <a:t> </a:t>
-                </a:r>
-              </a:p>
-            </p:txBody>
-          </p:sp>
-        </mc:Fallback>
-      </mc:AlternateContent>
-    </p:spTree>
-    <p:extLst>
-      <p:ext uri="{BB962C8B-B14F-4D97-AF65-F5344CB8AC3E}">
-        <p14:creationId xmlns:p14="http://schemas.microsoft.com/office/powerpoint/2010/main" val="229250825"/>
-      </p:ext>
-    </p:extLst>
-  </p:cSld>
-  <p:clrMapOvr>
-    <a:masterClrMapping/>
-  </p:clrMapOvr>
-</p:sld>
-</file>
-
 <file path=ppt/slides/slide18.xml><?xml version="1.0" encoding="utf-8"?>
 <p:sld xmlns:a="http://schemas.openxmlformats.org/drawingml/2006/main" xmlns:r="http://schemas.openxmlformats.org/officeDocument/2006/relationships" xmlns:p="http://schemas.openxmlformats.org/presentationml/2006/main">
   <p:cSld>
@@ -9034,77 +7964,821 @@
           <a:p>
             <a:r>
               <a:rPr lang="en-US" dirty="0" smtClean="0"/>
-              <a:t>Canonical Link Function</a:t>
+              <a:t>Link Function</a:t>
             </a:r>
             <a:endParaRPr lang="en-US" dirty="0"/>
           </a:p>
         </p:txBody>
       </p:sp>
-      <p:sp>
-        <p:nvSpPr>
-          <p:cNvPr id="3" name="Content Placeholder 2"/>
-          <p:cNvSpPr>
-            <a:spLocks noGrp="1"/>
-          </p:cNvSpPr>
-          <p:nvPr>
-            <p:ph idx="1"/>
-          </p:nvPr>
-        </p:nvSpPr>
-        <p:spPr/>
-        <p:txBody>
-          <a:bodyPr/>
-          <a:lstStyle/>
-          <a:p>
-            <a:pPr marL="228600" lvl="3"/>
-            <a:r>
-              <a:rPr lang="en-US" dirty="0" smtClean="0"/>
-              <a:t>Each </a:t>
-            </a:r>
-            <a:r>
-              <a:rPr lang="en-US" dirty="0"/>
-              <a:t>exponential family distribution has a special link function called a canonical link function</a:t>
-            </a:r>
-          </a:p>
-          <a:p>
-            <a:pPr marL="228600" lvl="3"/>
-            <a:r>
-              <a:rPr lang="en-US" dirty="0"/>
-              <a:t>Using the canonical link leads the model to have desirable statistical properties</a:t>
-            </a:r>
-          </a:p>
-          <a:p>
-            <a:endParaRPr lang="en-US" dirty="0"/>
-          </a:p>
-        </p:txBody>
-      </p:sp>
-      <p:pic>
-        <p:nvPicPr>
-          <p:cNvPr id="4" name="Picture 3"/>
-          <p:cNvPicPr>
-            <a:picLocks noChangeAspect="1"/>
-          </p:cNvPicPr>
-          <p:nvPr/>
-        </p:nvPicPr>
-        <p:blipFill>
-          <a:blip r:embed="rId2"/>
-          <a:stretch>
-            <a:fillRect/>
-          </a:stretch>
-        </p:blipFill>
-        <p:spPr>
-          <a:xfrm>
-            <a:off x="3021487" y="2715732"/>
-            <a:ext cx="6149026" cy="3278509"/>
-          </a:xfrm>
-          <a:prstGeom prst="rect">
-            <a:avLst/>
-          </a:prstGeom>
-        </p:spPr>
-      </p:pic>
+      <mc:AlternateContent xmlns:mc="http://schemas.openxmlformats.org/markup-compatibility/2006">
+        <mc:Choice xmlns:a14="http://schemas.microsoft.com/office/drawing/2010/main" Requires="a14">
+          <p:sp>
+            <p:nvSpPr>
+              <p:cNvPr id="3" name="Content Placeholder 2"/>
+              <p:cNvSpPr>
+                <a:spLocks noGrp="1"/>
+              </p:cNvSpPr>
+              <p:nvPr>
+                <p:ph idx="1"/>
+              </p:nvPr>
+            </p:nvSpPr>
+            <p:spPr>
+              <a:xfrm>
+                <a:off x="838199" y="1347829"/>
+                <a:ext cx="10762129" cy="4351338"/>
+              </a:xfrm>
+            </p:spPr>
+            <p:txBody>
+              <a:bodyPr/>
+              <a:lstStyle/>
+              <a:p>
+                <a:pPr marL="228600" lvl="3"/>
+                <a:r>
+                  <a:rPr lang="en-US" sz="2400" dirty="0" smtClean="0"/>
+                  <a:t>Purpose </a:t>
+                </a:r>
+                <a:r>
+                  <a:rPr lang="en-US" sz="2400" dirty="0"/>
+                  <a:t>(in English)</a:t>
+                </a:r>
+              </a:p>
+              <a:p>
+                <a:pPr marL="685800" lvl="5"/>
+                <a:r>
+                  <a:rPr lang="en-US" sz="2400" dirty="0"/>
+                  <a:t>Relates the expected value of the response </a:t>
+                </a:r>
+                <a:r>
+                  <a:rPr lang="en-US" sz="2400" dirty="0" smtClean="0"/>
+                  <a:t>variable </a:t>
+                </a:r>
+                <a:r>
+                  <a:rPr lang="en-US" sz="2400" dirty="0"/>
+                  <a:t>to the </a:t>
+                </a:r>
+                <a:r>
+                  <a:rPr lang="en-US" sz="2400" dirty="0" smtClean="0"/>
+                  <a:t>data</a:t>
+                </a:r>
+                <a:endParaRPr lang="en-US" sz="2400" dirty="0"/>
+              </a:p>
+              <a:p>
+                <a:pPr marL="685800" lvl="5"/>
+                <a:r>
+                  <a:rPr lang="en-US" sz="2400" dirty="0" smtClean="0"/>
+                  <a:t>In other words, the </a:t>
+                </a:r>
+                <a:r>
+                  <a:rPr lang="en-US" sz="2400" dirty="0"/>
+                  <a:t>purpose of the link function is to tame the response variable to restrict it to the correct scale when it is a function of </a:t>
+                </a:r>
+                <a:r>
+                  <a:rPr lang="en-US" sz="2400" dirty="0" smtClean="0"/>
+                  <a:t>the linear </a:t>
+                </a:r>
+                <a:r>
+                  <a:rPr lang="en-US" sz="2400" dirty="0" smtClean="0"/>
+                  <a:t>predictor</a:t>
+                </a:r>
+              </a:p>
+              <a:p>
+                <a:pPr marL="457200" lvl="5" indent="0">
+                  <a:buNone/>
+                </a:pPr>
+                <a:endParaRPr lang="en-US" sz="2400" dirty="0" smtClean="0"/>
+              </a:p>
+              <a:p>
+                <a:pPr marL="228600" lvl="4"/>
+                <a:r>
+                  <a:rPr lang="en-US" sz="2400" dirty="0"/>
+                  <a:t>Mathematical </a:t>
+                </a:r>
+                <a:r>
+                  <a:rPr lang="en-US" sz="2400" dirty="0" smtClean="0"/>
+                  <a:t>notation</a:t>
+                </a:r>
+              </a:p>
+              <a:p>
+                <a:pPr marL="0" lvl="4" indent="0">
+                  <a:buNone/>
+                </a:pPr>
+                <a14:m>
+                  <m:oMathPara xmlns:m="http://schemas.openxmlformats.org/officeDocument/2006/math">
+                    <m:oMathParaPr>
+                      <m:jc m:val="centerGroup"/>
+                    </m:oMathParaPr>
+                    <m:oMath xmlns:m="http://schemas.openxmlformats.org/officeDocument/2006/math">
+                      <m:r>
+                        <a:rPr lang="en-US" sz="2400" i="1">
+                          <a:latin typeface="Cambria Math" panose="02040503050406030204" pitchFamily="18" charset="0"/>
+                        </a:rPr>
+                        <m:t>𝑔</m:t>
+                      </m:r>
+                      <m:d>
+                        <m:dPr>
+                          <m:ctrlPr>
+                            <a:rPr lang="en-US" sz="2400" i="1">
+                              <a:latin typeface="Cambria Math" panose="02040503050406030204" pitchFamily="18" charset="0"/>
+                            </a:rPr>
+                          </m:ctrlPr>
+                        </m:dPr>
+                        <m:e>
+                          <m:sSub>
+                            <m:sSubPr>
+                              <m:ctrlPr>
+                                <a:rPr lang="en-US" sz="2400" i="1">
+                                  <a:latin typeface="Cambria Math" panose="02040503050406030204" pitchFamily="18" charset="0"/>
+                                </a:rPr>
+                              </m:ctrlPr>
+                            </m:sSubPr>
+                            <m:e>
+                              <m:r>
+                                <a:rPr lang="en-US" sz="2400" i="1">
+                                  <a:latin typeface="Cambria Math" panose="02040503050406030204" pitchFamily="18" charset="0"/>
+                                  <a:ea typeface="Cambria Math" panose="02040503050406030204" pitchFamily="18" charset="0"/>
+                                </a:rPr>
+                                <m:t>𝜇</m:t>
+                              </m:r>
+                            </m:e>
+                            <m:sub>
+                              <m:r>
+                                <a:rPr lang="en-US" sz="2400" i="1">
+                                  <a:latin typeface="Cambria Math" panose="02040503050406030204" pitchFamily="18" charset="0"/>
+                                </a:rPr>
+                                <m:t>𝑖</m:t>
+                              </m:r>
+                            </m:sub>
+                          </m:sSub>
+                        </m:e>
+                      </m:d>
+                      <m:r>
+                        <a:rPr lang="en-US" sz="2400" b="0" i="1" smtClean="0">
+                          <a:latin typeface="Cambria Math" panose="02040503050406030204" pitchFamily="18" charset="0"/>
+                        </a:rPr>
+                        <m:t>=</m:t>
+                      </m:r>
+                      <m:r>
+                        <a:rPr lang="en-US" sz="2400" b="0" i="1" smtClean="0">
+                          <a:latin typeface="Cambria Math" panose="02040503050406030204" pitchFamily="18" charset="0"/>
+                        </a:rPr>
+                        <m:t>𝑔</m:t>
+                      </m:r>
+                      <m:d>
+                        <m:dPr>
+                          <m:begChr m:val="["/>
+                          <m:endChr m:val="]"/>
+                          <m:ctrlPr>
+                            <a:rPr lang="en-US" sz="2400" b="0" i="1" smtClean="0">
+                              <a:latin typeface="Cambria Math" panose="02040503050406030204" pitchFamily="18" charset="0"/>
+                            </a:rPr>
+                          </m:ctrlPr>
+                        </m:dPr>
+                        <m:e>
+                          <m:r>
+                            <a:rPr lang="en-US" sz="2400" i="1">
+                              <a:latin typeface="Cambria Math" panose="02040503050406030204" pitchFamily="18" charset="0"/>
+                              <a:ea typeface="Cambria Math" panose="02040503050406030204" pitchFamily="18" charset="0"/>
+                            </a:rPr>
+                            <m:t>𝔼</m:t>
+                          </m:r>
+                          <m:d>
+                            <m:dPr>
+                              <m:ctrlPr>
+                                <a:rPr lang="en-US" sz="2400" i="1">
+                                  <a:latin typeface="Cambria Math" panose="02040503050406030204" pitchFamily="18" charset="0"/>
+                                  <a:ea typeface="Cambria Math" panose="02040503050406030204" pitchFamily="18" charset="0"/>
+                                </a:rPr>
+                              </m:ctrlPr>
+                            </m:dPr>
+                            <m:e>
+                              <m:sSub>
+                                <m:sSubPr>
+                                  <m:ctrlPr>
+                                    <a:rPr lang="en-US" sz="2400" i="1">
+                                      <a:latin typeface="Cambria Math" panose="02040503050406030204" pitchFamily="18" charset="0"/>
+                                    </a:rPr>
+                                  </m:ctrlPr>
+                                </m:sSubPr>
+                                <m:e>
+                                  <m:r>
+                                    <a:rPr lang="en-US" sz="2400" i="1">
+                                      <a:latin typeface="Cambria Math" panose="02040503050406030204" pitchFamily="18" charset="0"/>
+                                    </a:rPr>
+                                    <m:t>𝑌</m:t>
+                                  </m:r>
+                                </m:e>
+                                <m:sub>
+                                  <m:r>
+                                    <a:rPr lang="en-US" sz="2400" i="1">
+                                      <a:latin typeface="Cambria Math" panose="02040503050406030204" pitchFamily="18" charset="0"/>
+                                    </a:rPr>
+                                    <m:t>𝑖</m:t>
+                                  </m:r>
+                                </m:sub>
+                              </m:sSub>
+                            </m:e>
+                          </m:d>
+                        </m:e>
+                      </m:d>
+                      <m:r>
+                        <a:rPr lang="en-US" sz="2400" i="1">
+                          <a:latin typeface="Cambria Math" panose="02040503050406030204" pitchFamily="18" charset="0"/>
+                        </a:rPr>
+                        <m:t>=</m:t>
+                      </m:r>
+                      <m:sSub>
+                        <m:sSubPr>
+                          <m:ctrlPr>
+                            <a:rPr lang="en-US" sz="2400" i="1">
+                              <a:latin typeface="Cambria Math" panose="02040503050406030204" pitchFamily="18" charset="0"/>
+                            </a:rPr>
+                          </m:ctrlPr>
+                        </m:sSubPr>
+                        <m:e>
+                          <m:r>
+                            <a:rPr lang="en-US" sz="2400" i="1">
+                              <a:latin typeface="Cambria Math" panose="02040503050406030204" pitchFamily="18" charset="0"/>
+                              <a:ea typeface="Cambria Math" panose="02040503050406030204" pitchFamily="18" charset="0"/>
+                            </a:rPr>
+                            <m:t>𝜂</m:t>
+                          </m:r>
+                        </m:e>
+                        <m:sub>
+                          <m:r>
+                            <a:rPr lang="en-US" sz="2400" i="1">
+                              <a:latin typeface="Cambria Math" panose="02040503050406030204" pitchFamily="18" charset="0"/>
+                            </a:rPr>
+                            <m:t>𝑖</m:t>
+                          </m:r>
+                        </m:sub>
+                      </m:sSub>
+                      <m:r>
+                        <a:rPr lang="en-US" sz="2400" i="1">
+                          <a:latin typeface="Cambria Math" panose="02040503050406030204" pitchFamily="18" charset="0"/>
+                        </a:rPr>
+                        <m:t>=</m:t>
+                      </m:r>
+                      <m:sSub>
+                        <m:sSubPr>
+                          <m:ctrlPr>
+                            <a:rPr lang="en-US" sz="2400" i="1">
+                              <a:latin typeface="Cambria Math" panose="02040503050406030204" pitchFamily="18" charset="0"/>
+                              <a:ea typeface="Cambria Math" panose="02040503050406030204" pitchFamily="18" charset="0"/>
+                            </a:rPr>
+                          </m:ctrlPr>
+                        </m:sSubPr>
+                        <m:e>
+                          <m:r>
+                            <a:rPr lang="en-US" sz="2400" i="1">
+                              <a:latin typeface="Cambria Math" panose="02040503050406030204" pitchFamily="18" charset="0"/>
+                              <a:ea typeface="Cambria Math" panose="02040503050406030204" pitchFamily="18" charset="0"/>
+                            </a:rPr>
+                            <m:t>𝛽</m:t>
+                          </m:r>
+                        </m:e>
+                        <m:sub>
+                          <m:r>
+                            <a:rPr lang="en-US" sz="2400" i="1">
+                              <a:latin typeface="Cambria Math" panose="02040503050406030204" pitchFamily="18" charset="0"/>
+                              <a:ea typeface="Cambria Math" panose="02040503050406030204" pitchFamily="18" charset="0"/>
+                            </a:rPr>
+                            <m:t>1</m:t>
+                          </m:r>
+                        </m:sub>
+                      </m:sSub>
+                      <m:sSub>
+                        <m:sSubPr>
+                          <m:ctrlPr>
+                            <a:rPr lang="en-US" sz="2400" i="1">
+                              <a:latin typeface="Cambria Math" panose="02040503050406030204" pitchFamily="18" charset="0"/>
+                              <a:ea typeface="Cambria Math" panose="02040503050406030204" pitchFamily="18" charset="0"/>
+                            </a:rPr>
+                          </m:ctrlPr>
+                        </m:sSubPr>
+                        <m:e>
+                          <m:r>
+                            <a:rPr lang="en-US" sz="2400" i="1">
+                              <a:latin typeface="Cambria Math" panose="02040503050406030204" pitchFamily="18" charset="0"/>
+                              <a:ea typeface="Cambria Math" panose="02040503050406030204" pitchFamily="18" charset="0"/>
+                            </a:rPr>
+                            <m:t>𝑥</m:t>
+                          </m:r>
+                        </m:e>
+                        <m:sub>
+                          <m:r>
+                            <a:rPr lang="en-US" sz="2400" i="1">
+                              <a:latin typeface="Cambria Math" panose="02040503050406030204" pitchFamily="18" charset="0"/>
+                              <a:ea typeface="Cambria Math" panose="02040503050406030204" pitchFamily="18" charset="0"/>
+                            </a:rPr>
+                            <m:t>1</m:t>
+                          </m:r>
+                          <m:r>
+                            <a:rPr lang="en-US" sz="2400" i="1">
+                              <a:latin typeface="Cambria Math" panose="02040503050406030204" pitchFamily="18" charset="0"/>
+                              <a:ea typeface="Cambria Math" panose="02040503050406030204" pitchFamily="18" charset="0"/>
+                            </a:rPr>
+                            <m:t>𝑖</m:t>
+                          </m:r>
+                        </m:sub>
+                      </m:sSub>
+                      <m:r>
+                        <a:rPr lang="en-US" sz="2400" i="1">
+                          <a:latin typeface="Cambria Math" panose="02040503050406030204" pitchFamily="18" charset="0"/>
+                          <a:ea typeface="Cambria Math" panose="02040503050406030204" pitchFamily="18" charset="0"/>
+                        </a:rPr>
+                        <m:t>+</m:t>
+                      </m:r>
+                      <m:sSub>
+                        <m:sSubPr>
+                          <m:ctrlPr>
+                            <a:rPr lang="en-US" sz="2400" i="1">
+                              <a:latin typeface="Cambria Math" panose="02040503050406030204" pitchFamily="18" charset="0"/>
+                              <a:ea typeface="Cambria Math" panose="02040503050406030204" pitchFamily="18" charset="0"/>
+                            </a:rPr>
+                          </m:ctrlPr>
+                        </m:sSubPr>
+                        <m:e>
+                          <m:r>
+                            <a:rPr lang="en-US" sz="2400" i="1">
+                              <a:latin typeface="Cambria Math" panose="02040503050406030204" pitchFamily="18" charset="0"/>
+                              <a:ea typeface="Cambria Math" panose="02040503050406030204" pitchFamily="18" charset="0"/>
+                            </a:rPr>
+                            <m:t>𝛽</m:t>
+                          </m:r>
+                        </m:e>
+                        <m:sub>
+                          <m:r>
+                            <a:rPr lang="en-US" sz="2400" i="1">
+                              <a:latin typeface="Cambria Math" panose="02040503050406030204" pitchFamily="18" charset="0"/>
+                              <a:ea typeface="Cambria Math" panose="02040503050406030204" pitchFamily="18" charset="0"/>
+                            </a:rPr>
+                            <m:t>2</m:t>
+                          </m:r>
+                        </m:sub>
+                      </m:sSub>
+                      <m:sSub>
+                        <m:sSubPr>
+                          <m:ctrlPr>
+                            <a:rPr lang="en-US" sz="2400" i="1">
+                              <a:latin typeface="Cambria Math" panose="02040503050406030204" pitchFamily="18" charset="0"/>
+                              <a:ea typeface="Cambria Math" panose="02040503050406030204" pitchFamily="18" charset="0"/>
+                            </a:rPr>
+                          </m:ctrlPr>
+                        </m:sSubPr>
+                        <m:e>
+                          <m:r>
+                            <a:rPr lang="en-US" sz="2400" i="1">
+                              <a:latin typeface="Cambria Math" panose="02040503050406030204" pitchFamily="18" charset="0"/>
+                              <a:ea typeface="Cambria Math" panose="02040503050406030204" pitchFamily="18" charset="0"/>
+                            </a:rPr>
+                            <m:t>𝑥</m:t>
+                          </m:r>
+                        </m:e>
+                        <m:sub>
+                          <m:r>
+                            <a:rPr lang="en-US" sz="2400" i="1">
+                              <a:latin typeface="Cambria Math" panose="02040503050406030204" pitchFamily="18" charset="0"/>
+                              <a:ea typeface="Cambria Math" panose="02040503050406030204" pitchFamily="18" charset="0"/>
+                            </a:rPr>
+                            <m:t>2</m:t>
+                          </m:r>
+                          <m:r>
+                            <a:rPr lang="en-US" sz="2400" i="1">
+                              <a:latin typeface="Cambria Math" panose="02040503050406030204" pitchFamily="18" charset="0"/>
+                              <a:ea typeface="Cambria Math" panose="02040503050406030204" pitchFamily="18" charset="0"/>
+                            </a:rPr>
+                            <m:t>𝑖</m:t>
+                          </m:r>
+                        </m:sub>
+                      </m:sSub>
+                      <m:r>
+                        <m:rPr>
+                          <m:nor/>
+                        </m:rPr>
+                        <a:rPr lang="en-US" sz="2400" dirty="0"/>
+                        <m:t>+</m:t>
+                      </m:r>
+                      <m:sSub>
+                        <m:sSubPr>
+                          <m:ctrlPr>
+                            <a:rPr lang="en-US" sz="2400" i="1">
+                              <a:latin typeface="Cambria Math" panose="02040503050406030204" pitchFamily="18" charset="0"/>
+                              <a:ea typeface="Cambria Math" panose="02040503050406030204" pitchFamily="18" charset="0"/>
+                            </a:rPr>
+                          </m:ctrlPr>
+                        </m:sSubPr>
+                        <m:e>
+                          <m:r>
+                            <a:rPr lang="en-US" sz="2400" i="1">
+                              <a:latin typeface="Cambria Math" panose="02040503050406030204" pitchFamily="18" charset="0"/>
+                              <a:ea typeface="Cambria Math" panose="02040503050406030204" pitchFamily="18" charset="0"/>
+                            </a:rPr>
+                            <m:t>𝛽</m:t>
+                          </m:r>
+                        </m:e>
+                        <m:sub>
+                          <m:r>
+                            <a:rPr lang="en-US" sz="2400" i="1">
+                              <a:latin typeface="Cambria Math" panose="02040503050406030204" pitchFamily="18" charset="0"/>
+                              <a:ea typeface="Cambria Math" panose="02040503050406030204" pitchFamily="18" charset="0"/>
+                            </a:rPr>
+                            <m:t>3</m:t>
+                          </m:r>
+                        </m:sub>
+                      </m:sSub>
+                      <m:sSub>
+                        <m:sSubPr>
+                          <m:ctrlPr>
+                            <a:rPr lang="en-US" sz="2400" i="1">
+                              <a:latin typeface="Cambria Math" panose="02040503050406030204" pitchFamily="18" charset="0"/>
+                              <a:ea typeface="Cambria Math" panose="02040503050406030204" pitchFamily="18" charset="0"/>
+                            </a:rPr>
+                          </m:ctrlPr>
+                        </m:sSubPr>
+                        <m:e>
+                          <m:r>
+                            <a:rPr lang="en-US" sz="2400" i="1">
+                              <a:latin typeface="Cambria Math" panose="02040503050406030204" pitchFamily="18" charset="0"/>
+                              <a:ea typeface="Cambria Math" panose="02040503050406030204" pitchFamily="18" charset="0"/>
+                            </a:rPr>
+                            <m:t>𝑥</m:t>
+                          </m:r>
+                        </m:e>
+                        <m:sub>
+                          <m:r>
+                            <a:rPr lang="en-US" sz="2400" i="1">
+                              <a:latin typeface="Cambria Math" panose="02040503050406030204" pitchFamily="18" charset="0"/>
+                              <a:ea typeface="Cambria Math" panose="02040503050406030204" pitchFamily="18" charset="0"/>
+                            </a:rPr>
+                            <m:t>3</m:t>
+                          </m:r>
+                          <m:r>
+                            <a:rPr lang="en-US" sz="2400" i="1">
+                              <a:latin typeface="Cambria Math" panose="02040503050406030204" pitchFamily="18" charset="0"/>
+                              <a:ea typeface="Cambria Math" panose="02040503050406030204" pitchFamily="18" charset="0"/>
+                            </a:rPr>
+                            <m:t>𝑖</m:t>
+                          </m:r>
+                        </m:sub>
+                      </m:sSub>
+                      <m:r>
+                        <m:rPr>
+                          <m:nor/>
+                        </m:rPr>
+                        <a:rPr lang="en-US" sz="2400" dirty="0"/>
+                        <m:t>+…+</m:t>
+                      </m:r>
+                      <m:sSub>
+                        <m:sSubPr>
+                          <m:ctrlPr>
+                            <a:rPr lang="en-US" sz="2400" i="1">
+                              <a:latin typeface="Cambria Math" panose="02040503050406030204" pitchFamily="18" charset="0"/>
+                              <a:ea typeface="Cambria Math" panose="02040503050406030204" pitchFamily="18" charset="0"/>
+                            </a:rPr>
+                          </m:ctrlPr>
+                        </m:sSubPr>
+                        <m:e>
+                          <m:r>
+                            <a:rPr lang="en-US" sz="2400" i="1">
+                              <a:latin typeface="Cambria Math" panose="02040503050406030204" pitchFamily="18" charset="0"/>
+                              <a:ea typeface="Cambria Math" panose="02040503050406030204" pitchFamily="18" charset="0"/>
+                            </a:rPr>
+                            <m:t>𝛽</m:t>
+                          </m:r>
+                        </m:e>
+                        <m:sub>
+                          <m:r>
+                            <a:rPr lang="en-US" sz="2400" i="1">
+                              <a:latin typeface="Cambria Math" panose="02040503050406030204" pitchFamily="18" charset="0"/>
+                              <a:ea typeface="Cambria Math" panose="02040503050406030204" pitchFamily="18" charset="0"/>
+                            </a:rPr>
+                            <m:t>𝑝</m:t>
+                          </m:r>
+                        </m:sub>
+                      </m:sSub>
+                      <m:sSub>
+                        <m:sSubPr>
+                          <m:ctrlPr>
+                            <a:rPr lang="en-US" sz="2400" i="1">
+                              <a:latin typeface="Cambria Math" panose="02040503050406030204" pitchFamily="18" charset="0"/>
+                              <a:ea typeface="Cambria Math" panose="02040503050406030204" pitchFamily="18" charset="0"/>
+                            </a:rPr>
+                          </m:ctrlPr>
+                        </m:sSubPr>
+                        <m:e>
+                          <m:r>
+                            <a:rPr lang="en-US" sz="2400" i="1">
+                              <a:latin typeface="Cambria Math" panose="02040503050406030204" pitchFamily="18" charset="0"/>
+                              <a:ea typeface="Cambria Math" panose="02040503050406030204" pitchFamily="18" charset="0"/>
+                            </a:rPr>
+                            <m:t>𝑥</m:t>
+                          </m:r>
+                        </m:e>
+                        <m:sub>
+                          <m:r>
+                            <a:rPr lang="en-US" sz="2400" i="1">
+                              <a:latin typeface="Cambria Math" panose="02040503050406030204" pitchFamily="18" charset="0"/>
+                              <a:ea typeface="Cambria Math" panose="02040503050406030204" pitchFamily="18" charset="0"/>
+                            </a:rPr>
+                            <m:t>𝑝𝑖</m:t>
+                          </m:r>
+                        </m:sub>
+                      </m:sSub>
+                    </m:oMath>
+                  </m:oMathPara>
+                </a14:m>
+                <a:endParaRPr lang="en-US" sz="2400" dirty="0" smtClean="0"/>
+              </a:p>
+              <a:p>
+                <a:pPr marL="461963" lvl="4" indent="0">
+                  <a:buNone/>
+                </a:pPr>
+                <a:r>
+                  <a:rPr lang="en-US" sz="2400" dirty="0"/>
+                  <a:t>w</a:t>
+                </a:r>
+                <a:r>
+                  <a:rPr lang="en-US" sz="2400" dirty="0" smtClean="0"/>
+                  <a:t>here:</a:t>
+                </a:r>
+              </a:p>
+              <a:p>
+                <a:pPr marL="461963" lvl="4" indent="0">
+                  <a:buNone/>
+                </a:pPr>
+                <a14:m>
+                  <m:oMath xmlns:m="http://schemas.openxmlformats.org/officeDocument/2006/math">
+                    <m:r>
+                      <a:rPr lang="en-US" sz="2400" b="0" i="1" smtClean="0">
+                        <a:latin typeface="Cambria Math" panose="02040503050406030204" pitchFamily="18" charset="0"/>
+                      </a:rPr>
+                      <m:t>𝑔</m:t>
+                    </m:r>
+                    <m:d>
+                      <m:dPr>
+                        <m:ctrlPr>
+                          <a:rPr lang="en-US" sz="2400" b="0" i="1" smtClean="0">
+                            <a:latin typeface="Cambria Math" panose="02040503050406030204" pitchFamily="18" charset="0"/>
+                          </a:rPr>
+                        </m:ctrlPr>
+                      </m:dPr>
+                      <m:e>
+                        <m:r>
+                          <a:rPr lang="en-US" sz="2400" b="0" i="1" smtClean="0">
+                            <a:latin typeface="Cambria Math" panose="02040503050406030204" pitchFamily="18" charset="0"/>
+                            <a:ea typeface="Cambria Math" panose="02040503050406030204" pitchFamily="18" charset="0"/>
+                          </a:rPr>
+                          <m:t>∙</m:t>
+                        </m:r>
+                      </m:e>
+                    </m:d>
+                  </m:oMath>
+                </a14:m>
+                <a:r>
+                  <a:rPr lang="en-US" sz="2400" dirty="0" smtClean="0"/>
+                  <a:t>: link function</a:t>
+                </a:r>
+              </a:p>
+              <a:p>
+                <a:pPr marL="1944688" lvl="4" indent="-1487488">
+                  <a:buNone/>
+                </a:pPr>
+                <a14:m>
+                  <m:oMath xmlns:m="http://schemas.openxmlformats.org/officeDocument/2006/math">
+                    <m:sSub>
+                      <m:sSubPr>
+                        <m:ctrlPr>
+                          <a:rPr lang="en-US" sz="2400" i="1">
+                            <a:latin typeface="Cambria Math" panose="02040503050406030204" pitchFamily="18" charset="0"/>
+                          </a:rPr>
+                        </m:ctrlPr>
+                      </m:sSubPr>
+                      <m:e>
+                        <m:r>
+                          <a:rPr lang="en-US" sz="2400" i="1">
+                            <a:latin typeface="Cambria Math" panose="02040503050406030204" pitchFamily="18" charset="0"/>
+                            <a:ea typeface="Cambria Math" panose="02040503050406030204" pitchFamily="18" charset="0"/>
+                          </a:rPr>
+                          <m:t>𝜇</m:t>
+                        </m:r>
+                      </m:e>
+                      <m:sub>
+                        <m:r>
+                          <a:rPr lang="en-US" sz="2400" i="1">
+                            <a:latin typeface="Cambria Math" panose="02040503050406030204" pitchFamily="18" charset="0"/>
+                          </a:rPr>
+                          <m:t>𝑖</m:t>
+                        </m:r>
+                      </m:sub>
+                    </m:sSub>
+                    <m:r>
+                      <a:rPr lang="en-US" sz="2400" i="1">
+                        <a:latin typeface="Cambria Math" panose="02040503050406030204" pitchFamily="18" charset="0"/>
+                        <a:ea typeface="Cambria Math" panose="02040503050406030204" pitchFamily="18" charset="0"/>
+                      </a:rPr>
+                      <m:t>≡</m:t>
+                    </m:r>
+                    <m:r>
+                      <a:rPr lang="en-US" sz="2400" i="1">
+                        <a:latin typeface="Cambria Math" panose="02040503050406030204" pitchFamily="18" charset="0"/>
+                        <a:ea typeface="Cambria Math" panose="02040503050406030204" pitchFamily="18" charset="0"/>
+                      </a:rPr>
+                      <m:t>𝔼</m:t>
+                    </m:r>
+                    <m:d>
+                      <m:dPr>
+                        <m:ctrlPr>
+                          <a:rPr lang="en-US" sz="2400" i="1">
+                            <a:latin typeface="Cambria Math" panose="02040503050406030204" pitchFamily="18" charset="0"/>
+                            <a:ea typeface="Cambria Math" panose="02040503050406030204" pitchFamily="18" charset="0"/>
+                          </a:rPr>
+                        </m:ctrlPr>
+                      </m:dPr>
+                      <m:e>
+                        <m:sSub>
+                          <m:sSubPr>
+                            <m:ctrlPr>
+                              <a:rPr lang="en-US" sz="2400" i="1">
+                                <a:latin typeface="Cambria Math" panose="02040503050406030204" pitchFamily="18" charset="0"/>
+                              </a:rPr>
+                            </m:ctrlPr>
+                          </m:sSubPr>
+                          <m:e>
+                            <m:r>
+                              <a:rPr lang="en-US" sz="2400" i="1">
+                                <a:latin typeface="Cambria Math" panose="02040503050406030204" pitchFamily="18" charset="0"/>
+                              </a:rPr>
+                              <m:t>𝑌</m:t>
+                            </m:r>
+                          </m:e>
+                          <m:sub>
+                            <m:r>
+                              <a:rPr lang="en-US" sz="2400" i="1">
+                                <a:latin typeface="Cambria Math" panose="02040503050406030204" pitchFamily="18" charset="0"/>
+                              </a:rPr>
+                              <m:t>𝑖</m:t>
+                            </m:r>
+                          </m:sub>
+                        </m:sSub>
+                      </m:e>
+                    </m:d>
+                  </m:oMath>
+                </a14:m>
+                <a:r>
+                  <a:rPr lang="en-US" sz="2400" dirty="0" smtClean="0"/>
+                  <a:t>: </a:t>
+                </a:r>
+                <a14:m>
+                  <m:oMath xmlns:m="http://schemas.openxmlformats.org/officeDocument/2006/math">
+                    <m:sSub>
+                      <m:sSubPr>
+                        <m:ctrlPr>
+                          <a:rPr lang="en-US" sz="2400" i="1">
+                            <a:latin typeface="Cambria Math" panose="02040503050406030204" pitchFamily="18" charset="0"/>
+                          </a:rPr>
+                        </m:ctrlPr>
+                      </m:sSubPr>
+                      <m:e>
+                        <m:r>
+                          <a:rPr lang="en-US" sz="2400" i="1">
+                            <a:latin typeface="Cambria Math" panose="02040503050406030204" pitchFamily="18" charset="0"/>
+                            <a:ea typeface="Cambria Math" panose="02040503050406030204" pitchFamily="18" charset="0"/>
+                          </a:rPr>
+                          <m:t>𝜇</m:t>
+                        </m:r>
+                      </m:e>
+                      <m:sub>
+                        <m:r>
+                          <a:rPr lang="en-US" sz="2400" i="1">
+                            <a:latin typeface="Cambria Math" panose="02040503050406030204" pitchFamily="18" charset="0"/>
+                          </a:rPr>
+                          <m:t>𝑖</m:t>
+                        </m:r>
+                      </m:sub>
+                    </m:sSub>
+                  </m:oMath>
+                </a14:m>
+                <a:r>
+                  <a:rPr lang="en-US" sz="2400" dirty="0" smtClean="0"/>
+                  <a:t> is defined as the expected value [</a:t>
+                </a:r>
+                <a14:m>
+                  <m:oMath xmlns:m="http://schemas.openxmlformats.org/officeDocument/2006/math">
+                    <m:r>
+                      <a:rPr lang="en-US" sz="2400" i="1">
+                        <a:latin typeface="Cambria Math" panose="02040503050406030204" pitchFamily="18" charset="0"/>
+                        <a:ea typeface="Cambria Math" panose="02040503050406030204" pitchFamily="18" charset="0"/>
+                      </a:rPr>
+                      <m:t>𝔼</m:t>
+                    </m:r>
+                    <m:d>
+                      <m:dPr>
+                        <m:ctrlPr>
+                          <a:rPr lang="en-US" sz="2400" i="1" smtClean="0">
+                            <a:latin typeface="Cambria Math" panose="02040503050406030204" pitchFamily="18" charset="0"/>
+                            <a:ea typeface="Cambria Math" panose="02040503050406030204" pitchFamily="18" charset="0"/>
+                          </a:rPr>
+                        </m:ctrlPr>
+                      </m:dPr>
+                      <m:e>
+                        <m:r>
+                          <a:rPr lang="en-US" sz="2400" i="1" smtClean="0">
+                            <a:latin typeface="Cambria Math" panose="02040503050406030204" pitchFamily="18" charset="0"/>
+                            <a:ea typeface="Cambria Math" panose="02040503050406030204" pitchFamily="18" charset="0"/>
+                          </a:rPr>
+                          <m:t>∙</m:t>
+                        </m:r>
+                      </m:e>
+                    </m:d>
+                    <m:r>
+                      <a:rPr lang="en-US" sz="2400" i="1">
+                        <a:latin typeface="Cambria Math" panose="02040503050406030204" pitchFamily="18" charset="0"/>
+                        <a:ea typeface="Cambria Math" panose="02040503050406030204" pitchFamily="18" charset="0"/>
+                      </a:rPr>
+                      <m:t> </m:t>
+                    </m:r>
+                  </m:oMath>
+                </a14:m>
+                <a:r>
+                  <a:rPr lang="en-US" sz="2400" dirty="0" smtClean="0"/>
+                  <a:t>] of the response variable </a:t>
+                </a:r>
+                <a14:m>
+                  <m:oMath xmlns:m="http://schemas.openxmlformats.org/officeDocument/2006/math">
+                    <m:sSub>
+                      <m:sSubPr>
+                        <m:ctrlPr>
+                          <a:rPr lang="en-US" sz="2400" i="1">
+                            <a:latin typeface="Cambria Math" panose="02040503050406030204" pitchFamily="18" charset="0"/>
+                          </a:rPr>
+                        </m:ctrlPr>
+                      </m:sSubPr>
+                      <m:e>
+                        <m:r>
+                          <a:rPr lang="en-US" sz="2400" i="1">
+                            <a:latin typeface="Cambria Math" panose="02040503050406030204" pitchFamily="18" charset="0"/>
+                          </a:rPr>
+                          <m:t>𝑌</m:t>
+                        </m:r>
+                      </m:e>
+                      <m:sub>
+                        <m:r>
+                          <a:rPr lang="en-US" sz="2400" i="1">
+                            <a:latin typeface="Cambria Math" panose="02040503050406030204" pitchFamily="18" charset="0"/>
+                          </a:rPr>
+                          <m:t>𝑖</m:t>
+                        </m:r>
+                      </m:sub>
+                    </m:sSub>
+                  </m:oMath>
+                </a14:m>
+                <a:endParaRPr lang="en-US" sz="2400" dirty="0"/>
+              </a:p>
+            </p:txBody>
+          </p:sp>
+        </mc:Choice>
+        <mc:Fallback>
+          <p:sp>
+            <p:nvSpPr>
+              <p:cNvPr id="3" name="Content Placeholder 2"/>
+              <p:cNvSpPr>
+                <a:spLocks noGrp="1" noRot="1" noChangeAspect="1" noMove="1" noResize="1" noEditPoints="1" noAdjustHandles="1" noChangeArrowheads="1" noChangeShapeType="1" noTextEdit="1"/>
+              </p:cNvSpPr>
+              <p:nvPr>
+                <p:ph idx="1"/>
+              </p:nvPr>
+            </p:nvSpPr>
+            <p:spPr>
+              <a:xfrm>
+                <a:off x="838199" y="1347829"/>
+                <a:ext cx="10762129" cy="4351338"/>
+              </a:xfrm>
+              <a:blipFill>
+                <a:blip r:embed="rId2"/>
+                <a:stretch>
+                  <a:fillRect l="-736" t="-1961" r="-1529"/>
+                </a:stretch>
+              </a:blipFill>
+            </p:spPr>
+            <p:txBody>
+              <a:bodyPr/>
+              <a:lstStyle/>
+              <a:p>
+                <a:r>
+                  <a:rPr lang="en-US">
+                    <a:noFill/>
+                  </a:rPr>
+                  <a:t> </a:t>
+                </a:r>
+              </a:p>
+            </p:txBody>
+          </p:sp>
+        </mc:Fallback>
+      </mc:AlternateContent>
     </p:spTree>
     <p:extLst>
       <p:ext uri="{BB962C8B-B14F-4D97-AF65-F5344CB8AC3E}">
-        <p14:creationId xmlns:p14="http://schemas.microsoft.com/office/powerpoint/2010/main" val="2250021784"/>
+        <p14:creationId xmlns:p14="http://schemas.microsoft.com/office/powerpoint/2010/main" val="229250825"/>
       </p:ext>
     </p:extLst>
   </p:cSld>
@@ -9148,7 +8822,7 @@
           <a:p>
             <a:r>
               <a:rPr lang="en-US" dirty="0" smtClean="0"/>
-              <a:t>A few GLM References</a:t>
+              <a:t>Canonical Link Function</a:t>
             </a:r>
             <a:endParaRPr lang="en-US" dirty="0"/>
           </a:p>
@@ -9166,125 +8840,24 @@
         </p:nvSpPr>
         <p:spPr/>
         <p:txBody>
-          <a:bodyPr>
-            <a:normAutofit fontScale="85000" lnSpcReduction="20000"/>
-          </a:bodyPr>
+          <a:bodyPr/>
           <a:lstStyle/>
           <a:p>
+            <a:pPr marL="228600" lvl="3"/>
             <a:r>
               <a:rPr lang="en-US" dirty="0" smtClean="0"/>
-              <a:t>“Module11_Generalized </a:t>
+              <a:t>Each </a:t>
             </a:r>
             <a:r>
               <a:rPr lang="en-US" dirty="0"/>
-              <a:t>Linear </a:t>
-            </a:r>
-            <a:r>
-              <a:rPr lang="en-US" dirty="0" err="1"/>
-              <a:t>Models_TL</a:t>
-            </a:r>
+              <a:t>exponential family distribution has a special link function called a canonical link function</a:t>
+            </a:r>
+          </a:p>
+          <a:p>
+            <a:pPr marL="228600" lvl="3"/>
             <a:r>
               <a:rPr lang="en-US" dirty="0"/>
-              <a:t> </a:t>
-            </a:r>
-            <a:r>
-              <a:rPr lang="en-US" dirty="0" smtClean="0"/>
-              <a:t>Zhang.pdf”</a:t>
-            </a:r>
-          </a:p>
-          <a:p>
-            <a:r>
-              <a:rPr lang="en-US" dirty="0" smtClean="0"/>
-              <a:t>Barry</a:t>
-            </a:r>
-            <a:r>
-              <a:rPr lang="en-US" dirty="0"/>
-              <a:t>, S. C. and A. H. Welsh (2002). "Generalized additive modelling and zero inflated count data." Ecological Modelling 157: 179-188</a:t>
-            </a:r>
-            <a:r>
-              <a:rPr lang="en-US" dirty="0" smtClean="0"/>
-              <a:t>.</a:t>
-            </a:r>
-            <a:endParaRPr lang="en-US" dirty="0"/>
-          </a:p>
-          <a:p>
-            <a:r>
-              <a:rPr lang="en-US" dirty="0"/>
-              <a:t>Ghosh, S. K., P. </a:t>
-            </a:r>
-            <a:r>
-              <a:rPr lang="en-US" dirty="0" err="1"/>
-              <a:t>Mukhopadhyay</a:t>
-            </a:r>
-            <a:r>
-              <a:rPr lang="en-US" dirty="0"/>
-              <a:t>, et al. (2006). "Bayesian analysis of zero-inflated regression models." Journal of Statistical Planning and Inference 136(4): 1360-1375</a:t>
-            </a:r>
-            <a:r>
-              <a:rPr lang="en-US" dirty="0" smtClean="0"/>
-              <a:t>.</a:t>
-            </a:r>
-          </a:p>
-          <a:p>
-            <a:r>
-              <a:rPr lang="en-US" dirty="0" err="1" smtClean="0"/>
-              <a:t>McCullagh</a:t>
-            </a:r>
-            <a:r>
-              <a:rPr lang="en-US" dirty="0" smtClean="0"/>
-              <a:t>, P. and J.A. </a:t>
-            </a:r>
-            <a:r>
-              <a:rPr lang="en-US" dirty="0" err="1" smtClean="0"/>
-              <a:t>Nelder</a:t>
-            </a:r>
-            <a:r>
-              <a:rPr lang="en-US" dirty="0" smtClean="0"/>
-              <a:t>. 1999. Generalized linear models. Chapman &amp; Hall/CRC.</a:t>
-            </a:r>
-          </a:p>
-          <a:p>
-            <a:r>
-              <a:rPr lang="en-US" dirty="0" err="1"/>
-              <a:t>Ver</a:t>
-            </a:r>
-            <a:r>
-              <a:rPr lang="en-US" dirty="0"/>
-              <a:t> </a:t>
-            </a:r>
-            <a:r>
-              <a:rPr lang="en-US" dirty="0" err="1"/>
-              <a:t>Hoef</a:t>
-            </a:r>
-            <a:r>
-              <a:rPr lang="en-US" dirty="0"/>
-              <a:t>, J. M., &amp; </a:t>
-            </a:r>
-            <a:r>
-              <a:rPr lang="en-US" dirty="0" err="1"/>
-              <a:t>Boveng</a:t>
-            </a:r>
-            <a:r>
-              <a:rPr lang="en-US" dirty="0"/>
-              <a:t>, P. L. (2007). QUASI-POISSON VS. NEGATIVE BINOMIAL REGRESSION: HOW SHOULD WE MODEL OVERDISPERSED COUNT DATA? Ecology, 88(11), 2766-2772. </a:t>
-            </a:r>
-            <a:r>
-              <a:rPr lang="en-US" dirty="0" smtClean="0"/>
-              <a:t>doi:10.1890/07-0043.1</a:t>
-            </a:r>
-          </a:p>
-          <a:p>
-            <a:r>
-              <a:rPr lang="en-US" dirty="0"/>
-              <a:t>Warton, D. I. (2005). "Many zeros does not mean zero inflation: comparing the goodness-of-fit of parametric models to multivariate abundance data." </a:t>
-            </a:r>
-            <a:r>
-              <a:rPr lang="en-US" dirty="0" err="1"/>
-              <a:t>Environmetrics</a:t>
-            </a:r>
-            <a:r>
-              <a:rPr lang="en-US" dirty="0"/>
-              <a:t> 16: 275-289.</a:t>
+              <a:t>Using the canonical link leads the model to have desirable statistical properties</a:t>
             </a:r>
           </a:p>
           <a:p>
@@ -9292,10 +8865,34 @@
           </a:p>
         </p:txBody>
       </p:sp>
+      <p:pic>
+        <p:nvPicPr>
+          <p:cNvPr id="4" name="Picture 3"/>
+          <p:cNvPicPr>
+            <a:picLocks noChangeAspect="1"/>
+          </p:cNvPicPr>
+          <p:nvPr/>
+        </p:nvPicPr>
+        <p:blipFill>
+          <a:blip r:embed="rId2"/>
+          <a:stretch>
+            <a:fillRect/>
+          </a:stretch>
+        </p:blipFill>
+        <p:spPr>
+          <a:xfrm>
+            <a:off x="3021487" y="2715732"/>
+            <a:ext cx="6149026" cy="3278509"/>
+          </a:xfrm>
+          <a:prstGeom prst="rect">
+            <a:avLst/>
+          </a:prstGeom>
+        </p:spPr>
+      </p:pic>
     </p:spTree>
     <p:extLst>
       <p:ext uri="{BB962C8B-B14F-4D97-AF65-F5344CB8AC3E}">
-        <p14:creationId xmlns:p14="http://schemas.microsoft.com/office/powerpoint/2010/main" val="354624192"/>
+        <p14:creationId xmlns:p14="http://schemas.microsoft.com/office/powerpoint/2010/main" val="2250021784"/>
       </p:ext>
     </p:extLst>
   </p:cSld>
@@ -9416,6 +9013,1100 @@
 </file>
 
 <file path=ppt/slides/slide20.xml><?xml version="1.0" encoding="utf-8"?>
+<p:sld xmlns:a="http://schemas.openxmlformats.org/drawingml/2006/main" xmlns:r="http://schemas.openxmlformats.org/officeDocument/2006/relationships" xmlns:p="http://schemas.openxmlformats.org/presentationml/2006/main">
+  <p:cSld>
+    <p:spTree>
+      <p:nvGrpSpPr>
+        <p:cNvPr id="1" name=""/>
+        <p:cNvGrpSpPr/>
+        <p:nvPr/>
+      </p:nvGrpSpPr>
+      <p:grpSpPr>
+        <a:xfrm>
+          <a:off x="0" y="0"/>
+          <a:ext cx="0" cy="0"/>
+          <a:chOff x="0" y="0"/>
+          <a:chExt cx="0" cy="0"/>
+        </a:xfrm>
+      </p:grpSpPr>
+      <p:sp>
+        <p:nvSpPr>
+          <p:cNvPr id="2" name="Title 1"/>
+          <p:cNvSpPr>
+            <a:spLocks noGrp="1"/>
+          </p:cNvSpPr>
+          <p:nvPr>
+            <p:ph type="title"/>
+          </p:nvPr>
+        </p:nvSpPr>
+        <p:spPr/>
+        <p:txBody>
+          <a:bodyPr/>
+          <a:lstStyle/>
+          <a:p>
+            <a:r>
+              <a:rPr lang="en-US" dirty="0" smtClean="0"/>
+              <a:t>A few GLM References</a:t>
+            </a:r>
+            <a:endParaRPr lang="en-US" dirty="0"/>
+          </a:p>
+        </p:txBody>
+      </p:sp>
+      <p:sp>
+        <p:nvSpPr>
+          <p:cNvPr id="3" name="Content Placeholder 2"/>
+          <p:cNvSpPr>
+            <a:spLocks noGrp="1"/>
+          </p:cNvSpPr>
+          <p:nvPr>
+            <p:ph idx="1"/>
+          </p:nvPr>
+        </p:nvSpPr>
+        <p:spPr/>
+        <p:txBody>
+          <a:bodyPr>
+            <a:normAutofit fontScale="85000" lnSpcReduction="20000"/>
+          </a:bodyPr>
+          <a:lstStyle/>
+          <a:p>
+            <a:r>
+              <a:rPr lang="en-US" dirty="0" smtClean="0"/>
+              <a:t>“Module11_Generalized </a:t>
+            </a:r>
+            <a:r>
+              <a:rPr lang="en-US" dirty="0"/>
+              <a:t>Linear </a:t>
+            </a:r>
+            <a:r>
+              <a:rPr lang="en-US" dirty="0" err="1"/>
+              <a:t>Models_TL</a:t>
+            </a:r>
+            <a:r>
+              <a:rPr lang="en-US" dirty="0"/>
+              <a:t> </a:t>
+            </a:r>
+            <a:r>
+              <a:rPr lang="en-US" dirty="0" smtClean="0"/>
+              <a:t>Zhang.pdf”</a:t>
+            </a:r>
+          </a:p>
+          <a:p>
+            <a:r>
+              <a:rPr lang="en-US" dirty="0" smtClean="0"/>
+              <a:t>Barry</a:t>
+            </a:r>
+            <a:r>
+              <a:rPr lang="en-US" dirty="0"/>
+              <a:t>, S. C. and A. H. Welsh (2002). "Generalized additive modelling and zero inflated count data." Ecological Modelling 157: 179-188</a:t>
+            </a:r>
+            <a:r>
+              <a:rPr lang="en-US" dirty="0" smtClean="0"/>
+              <a:t>.</a:t>
+            </a:r>
+            <a:endParaRPr lang="en-US" dirty="0"/>
+          </a:p>
+          <a:p>
+            <a:r>
+              <a:rPr lang="en-US" dirty="0"/>
+              <a:t>Ghosh, S. K., P. </a:t>
+            </a:r>
+            <a:r>
+              <a:rPr lang="en-US" dirty="0" err="1"/>
+              <a:t>Mukhopadhyay</a:t>
+            </a:r>
+            <a:r>
+              <a:rPr lang="en-US" dirty="0"/>
+              <a:t>, et al. (2006). "Bayesian analysis of zero-inflated regression models." Journal of Statistical Planning and Inference 136(4): 1360-1375</a:t>
+            </a:r>
+            <a:r>
+              <a:rPr lang="en-US" dirty="0" smtClean="0"/>
+              <a:t>.</a:t>
+            </a:r>
+          </a:p>
+          <a:p>
+            <a:r>
+              <a:rPr lang="en-US" dirty="0" err="1" smtClean="0"/>
+              <a:t>McCullagh</a:t>
+            </a:r>
+            <a:r>
+              <a:rPr lang="en-US" dirty="0" smtClean="0"/>
+              <a:t>, P. and J.A. </a:t>
+            </a:r>
+            <a:r>
+              <a:rPr lang="en-US" dirty="0" err="1" smtClean="0"/>
+              <a:t>Nelder</a:t>
+            </a:r>
+            <a:r>
+              <a:rPr lang="en-US" dirty="0" smtClean="0"/>
+              <a:t>. 1999. Generalized linear models. Chapman &amp; Hall/CRC.</a:t>
+            </a:r>
+          </a:p>
+          <a:p>
+            <a:r>
+              <a:rPr lang="en-US" dirty="0" err="1"/>
+              <a:t>Ver</a:t>
+            </a:r>
+            <a:r>
+              <a:rPr lang="en-US" dirty="0"/>
+              <a:t> </a:t>
+            </a:r>
+            <a:r>
+              <a:rPr lang="en-US" dirty="0" err="1"/>
+              <a:t>Hoef</a:t>
+            </a:r>
+            <a:r>
+              <a:rPr lang="en-US" dirty="0"/>
+              <a:t>, J. M., &amp; </a:t>
+            </a:r>
+            <a:r>
+              <a:rPr lang="en-US" dirty="0" err="1"/>
+              <a:t>Boveng</a:t>
+            </a:r>
+            <a:r>
+              <a:rPr lang="en-US" dirty="0"/>
+              <a:t>, P. L. (2007). QUASI-POISSON VS. NEGATIVE BINOMIAL REGRESSION: HOW SHOULD WE MODEL OVERDISPERSED COUNT DATA? Ecology, 88(11), 2766-2772. </a:t>
+            </a:r>
+            <a:r>
+              <a:rPr lang="en-US" dirty="0" smtClean="0"/>
+              <a:t>doi:10.1890/07-0043.1</a:t>
+            </a:r>
+          </a:p>
+          <a:p>
+            <a:r>
+              <a:rPr lang="en-US" dirty="0"/>
+              <a:t>Warton, D. I. (2005). "Many zeros does not mean zero inflation: comparing the goodness-of-fit of parametric models to multivariate abundance data." </a:t>
+            </a:r>
+            <a:r>
+              <a:rPr lang="en-US" dirty="0" err="1"/>
+              <a:t>Environmetrics</a:t>
+            </a:r>
+            <a:r>
+              <a:rPr lang="en-US" dirty="0"/>
+              <a:t> 16: 275-289.</a:t>
+            </a:r>
+          </a:p>
+          <a:p>
+            <a:endParaRPr lang="en-US" dirty="0"/>
+          </a:p>
+        </p:txBody>
+      </p:sp>
+    </p:spTree>
+    <p:extLst>
+      <p:ext uri="{BB962C8B-B14F-4D97-AF65-F5344CB8AC3E}">
+        <p14:creationId xmlns:p14="http://schemas.microsoft.com/office/powerpoint/2010/main" val="354624192"/>
+      </p:ext>
+    </p:extLst>
+  </p:cSld>
+  <p:clrMapOvr>
+    <a:masterClrMapping/>
+  </p:clrMapOvr>
+</p:sld>
+</file>
+
+<file path=ppt/slides/slide21.xml><?xml version="1.0" encoding="utf-8"?>
+<p:sld xmlns:a="http://schemas.openxmlformats.org/drawingml/2006/main" xmlns:r="http://schemas.openxmlformats.org/officeDocument/2006/relationships" xmlns:p="http://schemas.openxmlformats.org/presentationml/2006/main">
+  <p:cSld>
+    <p:spTree>
+      <p:nvGrpSpPr>
+        <p:cNvPr id="1" name=""/>
+        <p:cNvGrpSpPr/>
+        <p:nvPr/>
+      </p:nvGrpSpPr>
+      <p:grpSpPr>
+        <a:xfrm>
+          <a:off x="0" y="0"/>
+          <a:ext cx="0" cy="0"/>
+          <a:chOff x="0" y="0"/>
+          <a:chExt cx="0" cy="0"/>
+        </a:xfrm>
+      </p:grpSpPr>
+      <p:sp>
+        <p:nvSpPr>
+          <p:cNvPr id="2" name="Title 1"/>
+          <p:cNvSpPr>
+            <a:spLocks noGrp="1"/>
+          </p:cNvSpPr>
+          <p:nvPr>
+            <p:ph type="title"/>
+          </p:nvPr>
+        </p:nvSpPr>
+        <p:spPr/>
+        <p:txBody>
+          <a:bodyPr/>
+          <a:lstStyle/>
+          <a:p>
+            <a:r>
+              <a:rPr lang="en-US" dirty="0" smtClean="0"/>
+              <a:t>Generalized Additive Model (GAM)</a:t>
+            </a:r>
+            <a:endParaRPr lang="en-US" dirty="0"/>
+          </a:p>
+        </p:txBody>
+      </p:sp>
+      <mc:AlternateContent xmlns:mc="http://schemas.openxmlformats.org/markup-compatibility/2006">
+        <mc:Choice xmlns:a14="http://schemas.microsoft.com/office/drawing/2010/main" Requires="a14">
+          <p:sp>
+            <p:nvSpPr>
+              <p:cNvPr id="3" name="Content Placeholder 2"/>
+              <p:cNvSpPr>
+                <a:spLocks noGrp="1"/>
+              </p:cNvSpPr>
+              <p:nvPr>
+                <p:ph idx="1"/>
+              </p:nvPr>
+            </p:nvSpPr>
+            <p:spPr/>
+            <p:txBody>
+              <a:bodyPr/>
+              <a:lstStyle/>
+              <a:p>
+                <a:r>
+                  <a:rPr lang="en-US" dirty="0" smtClean="0"/>
+                  <a:t>Similar to a GLM, but the linear predictor may include a sum of </a:t>
+                </a:r>
+                <a:r>
+                  <a:rPr lang="en-US" dirty="0" smtClean="0">
+                    <a:solidFill>
+                      <a:srgbClr val="7030A0"/>
+                    </a:solidFill>
+                  </a:rPr>
+                  <a:t>smooth functions of covariates</a:t>
+                </a:r>
+              </a:p>
+              <a:p>
+                <a:r>
+                  <a:rPr lang="en-US" dirty="0" smtClean="0"/>
+                  <a:t>Mathematical notation</a:t>
+                </a:r>
+              </a:p>
+              <a:p>
+                <a:pPr marL="0" indent="0">
+                  <a:buNone/>
+                </a:pPr>
+                <a14:m>
+                  <m:oMathPara xmlns:m="http://schemas.openxmlformats.org/officeDocument/2006/math">
+                    <m:oMathParaPr>
+                      <m:jc m:val="centerGroup"/>
+                    </m:oMathParaPr>
+                    <m:oMath xmlns:m="http://schemas.openxmlformats.org/officeDocument/2006/math">
+                      <m:r>
+                        <a:rPr lang="en-US" b="0" i="1" smtClean="0">
+                          <a:latin typeface="Cambria Math" panose="02040503050406030204" pitchFamily="18" charset="0"/>
+                        </a:rPr>
+                        <m:t>𝑔</m:t>
+                      </m:r>
+                      <m:d>
+                        <m:dPr>
+                          <m:ctrlPr>
+                            <a:rPr lang="en-US" b="0" i="1" smtClean="0">
+                              <a:latin typeface="Cambria Math" panose="02040503050406030204" pitchFamily="18" charset="0"/>
+                            </a:rPr>
+                          </m:ctrlPr>
+                        </m:dPr>
+                        <m:e>
+                          <m:sSub>
+                            <m:sSubPr>
+                              <m:ctrlPr>
+                                <a:rPr lang="en-US" b="0" i="1" smtClean="0">
+                                  <a:latin typeface="Cambria Math" panose="02040503050406030204" pitchFamily="18" charset="0"/>
+                                </a:rPr>
+                              </m:ctrlPr>
+                            </m:sSubPr>
+                            <m:e>
+                              <m:r>
+                                <a:rPr lang="en-US" b="0" i="1" smtClean="0">
+                                  <a:latin typeface="Cambria Math" panose="02040503050406030204" pitchFamily="18" charset="0"/>
+                                  <a:ea typeface="Cambria Math" panose="02040503050406030204" pitchFamily="18" charset="0"/>
+                                </a:rPr>
+                                <m:t>𝜇</m:t>
+                              </m:r>
+                            </m:e>
+                            <m:sub>
+                              <m:r>
+                                <a:rPr lang="en-US" b="0" i="1" smtClean="0">
+                                  <a:latin typeface="Cambria Math" panose="02040503050406030204" pitchFamily="18" charset="0"/>
+                                </a:rPr>
+                                <m:t>𝑖</m:t>
+                              </m:r>
+                            </m:sub>
+                          </m:sSub>
+                        </m:e>
+                      </m:d>
+                      <m:r>
+                        <a:rPr lang="en-US" b="0" i="1" smtClean="0">
+                          <a:latin typeface="Cambria Math" panose="02040503050406030204" pitchFamily="18" charset="0"/>
+                        </a:rPr>
+                        <m:t>=</m:t>
+                      </m:r>
+                      <m:sSubSup>
+                        <m:sSubSupPr>
+                          <m:ctrlPr>
+                            <a:rPr lang="en-US" b="0" i="1" smtClean="0">
+                              <a:latin typeface="Cambria Math" panose="02040503050406030204" pitchFamily="18" charset="0"/>
+                            </a:rPr>
+                          </m:ctrlPr>
+                        </m:sSubSupPr>
+                        <m:e>
+                          <m:r>
+                            <a:rPr lang="en-US" b="0" i="1" smtClean="0">
+                              <a:latin typeface="Cambria Math" panose="02040503050406030204" pitchFamily="18" charset="0"/>
+                            </a:rPr>
+                            <m:t>𝑋</m:t>
+                          </m:r>
+                        </m:e>
+                        <m:sub>
+                          <m:r>
+                            <a:rPr lang="en-US" b="0" i="1" smtClean="0">
+                              <a:latin typeface="Cambria Math" panose="02040503050406030204" pitchFamily="18" charset="0"/>
+                            </a:rPr>
+                            <m:t>𝑖</m:t>
+                          </m:r>
+                        </m:sub>
+                        <m:sup>
+                          <m:r>
+                            <a:rPr lang="en-US" b="0" i="1" smtClean="0">
+                              <a:latin typeface="Cambria Math" panose="02040503050406030204" pitchFamily="18" charset="0"/>
+                            </a:rPr>
+                            <m:t>∗</m:t>
+                          </m:r>
+                        </m:sup>
+                      </m:sSubSup>
+                      <m:r>
+                        <a:rPr lang="en-US" b="0" i="1" smtClean="0">
+                          <a:latin typeface="Cambria Math" panose="02040503050406030204" pitchFamily="18" charset="0"/>
+                          <a:ea typeface="Cambria Math" panose="02040503050406030204" pitchFamily="18" charset="0"/>
+                        </a:rPr>
+                        <m:t>𝛽</m:t>
+                      </m:r>
+                      <m:r>
+                        <a:rPr lang="en-US" b="0" i="1" smtClean="0">
+                          <a:latin typeface="Cambria Math" panose="02040503050406030204" pitchFamily="18" charset="0"/>
+                          <a:ea typeface="Cambria Math" panose="02040503050406030204" pitchFamily="18" charset="0"/>
+                        </a:rPr>
+                        <m:t>+</m:t>
+                      </m:r>
+                      <m:sSub>
+                        <m:sSubPr>
+                          <m:ctrlPr>
+                            <a:rPr lang="en-US" b="0" i="1" smtClean="0">
+                              <a:latin typeface="Cambria Math" panose="02040503050406030204" pitchFamily="18" charset="0"/>
+                              <a:ea typeface="Cambria Math" panose="02040503050406030204" pitchFamily="18" charset="0"/>
+                            </a:rPr>
+                          </m:ctrlPr>
+                        </m:sSubPr>
+                        <m:e>
+                          <m:r>
+                            <a:rPr lang="en-US" b="0" i="1" smtClean="0">
+                              <a:latin typeface="Cambria Math" panose="02040503050406030204" pitchFamily="18" charset="0"/>
+                              <a:ea typeface="Cambria Math" panose="02040503050406030204" pitchFamily="18" charset="0"/>
+                            </a:rPr>
+                            <m:t>𝑓</m:t>
+                          </m:r>
+                        </m:e>
+                        <m:sub>
+                          <m:r>
+                            <a:rPr lang="en-US" b="0" i="1" smtClean="0">
+                              <a:latin typeface="Cambria Math" panose="02040503050406030204" pitchFamily="18" charset="0"/>
+                              <a:ea typeface="Cambria Math" panose="02040503050406030204" pitchFamily="18" charset="0"/>
+                            </a:rPr>
+                            <m:t>1</m:t>
+                          </m:r>
+                        </m:sub>
+                      </m:sSub>
+                      <m:d>
+                        <m:dPr>
+                          <m:ctrlPr>
+                            <a:rPr lang="en-US" b="0" i="1" smtClean="0">
+                              <a:latin typeface="Cambria Math" panose="02040503050406030204" pitchFamily="18" charset="0"/>
+                              <a:ea typeface="Cambria Math" panose="02040503050406030204" pitchFamily="18" charset="0"/>
+                            </a:rPr>
+                          </m:ctrlPr>
+                        </m:dPr>
+                        <m:e>
+                          <m:sSub>
+                            <m:sSubPr>
+                              <m:ctrlPr>
+                                <a:rPr lang="en-US" b="0" i="1" smtClean="0">
+                                  <a:latin typeface="Cambria Math" panose="02040503050406030204" pitchFamily="18" charset="0"/>
+                                  <a:ea typeface="Cambria Math" panose="02040503050406030204" pitchFamily="18" charset="0"/>
+                                </a:rPr>
+                              </m:ctrlPr>
+                            </m:sSubPr>
+                            <m:e>
+                              <m:r>
+                                <a:rPr lang="en-US" b="0" i="1" smtClean="0">
+                                  <a:latin typeface="Cambria Math" panose="02040503050406030204" pitchFamily="18" charset="0"/>
+                                  <a:ea typeface="Cambria Math" panose="02040503050406030204" pitchFamily="18" charset="0"/>
+                                </a:rPr>
+                                <m:t>𝑥</m:t>
+                              </m:r>
+                            </m:e>
+                            <m:sub>
+                              <m:r>
+                                <a:rPr lang="en-US" b="0" i="1" smtClean="0">
+                                  <a:latin typeface="Cambria Math" panose="02040503050406030204" pitchFamily="18" charset="0"/>
+                                  <a:ea typeface="Cambria Math" panose="02040503050406030204" pitchFamily="18" charset="0"/>
+                                </a:rPr>
+                                <m:t>1</m:t>
+                              </m:r>
+                              <m:r>
+                                <a:rPr lang="en-US" b="0" i="1" smtClean="0">
+                                  <a:latin typeface="Cambria Math" panose="02040503050406030204" pitchFamily="18" charset="0"/>
+                                  <a:ea typeface="Cambria Math" panose="02040503050406030204" pitchFamily="18" charset="0"/>
+                                </a:rPr>
+                                <m:t>𝑖</m:t>
+                              </m:r>
+                            </m:sub>
+                          </m:sSub>
+                        </m:e>
+                      </m:d>
+                      <m:r>
+                        <a:rPr lang="en-US" b="0" i="1" smtClean="0">
+                          <a:latin typeface="Cambria Math" panose="02040503050406030204" pitchFamily="18" charset="0"/>
+                          <a:ea typeface="Cambria Math" panose="02040503050406030204" pitchFamily="18" charset="0"/>
+                        </a:rPr>
+                        <m:t>+</m:t>
+                      </m:r>
+                      <m:sSub>
+                        <m:sSubPr>
+                          <m:ctrlPr>
+                            <a:rPr lang="en-US" i="1">
+                              <a:latin typeface="Cambria Math" panose="02040503050406030204" pitchFamily="18" charset="0"/>
+                              <a:ea typeface="Cambria Math" panose="02040503050406030204" pitchFamily="18" charset="0"/>
+                            </a:rPr>
+                          </m:ctrlPr>
+                        </m:sSubPr>
+                        <m:e>
+                          <m:r>
+                            <a:rPr lang="en-US" i="1">
+                              <a:latin typeface="Cambria Math" panose="02040503050406030204" pitchFamily="18" charset="0"/>
+                              <a:ea typeface="Cambria Math" panose="02040503050406030204" pitchFamily="18" charset="0"/>
+                            </a:rPr>
+                            <m:t>𝑓</m:t>
+                          </m:r>
+                        </m:e>
+                        <m:sub>
+                          <m:r>
+                            <a:rPr lang="en-US" b="0" i="1" smtClean="0">
+                              <a:latin typeface="Cambria Math" panose="02040503050406030204" pitchFamily="18" charset="0"/>
+                              <a:ea typeface="Cambria Math" panose="02040503050406030204" pitchFamily="18" charset="0"/>
+                            </a:rPr>
+                            <m:t>2</m:t>
+                          </m:r>
+                        </m:sub>
+                      </m:sSub>
+                      <m:d>
+                        <m:dPr>
+                          <m:ctrlPr>
+                            <a:rPr lang="en-US" i="1">
+                              <a:latin typeface="Cambria Math" panose="02040503050406030204" pitchFamily="18" charset="0"/>
+                              <a:ea typeface="Cambria Math" panose="02040503050406030204" pitchFamily="18" charset="0"/>
+                            </a:rPr>
+                          </m:ctrlPr>
+                        </m:dPr>
+                        <m:e>
+                          <m:sSub>
+                            <m:sSubPr>
+                              <m:ctrlPr>
+                                <a:rPr lang="en-US" i="1">
+                                  <a:latin typeface="Cambria Math" panose="02040503050406030204" pitchFamily="18" charset="0"/>
+                                  <a:ea typeface="Cambria Math" panose="02040503050406030204" pitchFamily="18" charset="0"/>
+                                </a:rPr>
+                              </m:ctrlPr>
+                            </m:sSubPr>
+                            <m:e>
+                              <m:r>
+                                <a:rPr lang="en-US" i="1">
+                                  <a:latin typeface="Cambria Math" panose="02040503050406030204" pitchFamily="18" charset="0"/>
+                                  <a:ea typeface="Cambria Math" panose="02040503050406030204" pitchFamily="18" charset="0"/>
+                                </a:rPr>
+                                <m:t>𝑥</m:t>
+                              </m:r>
+                            </m:e>
+                            <m:sub>
+                              <m:r>
+                                <a:rPr lang="en-US" b="0" i="1" smtClean="0">
+                                  <a:latin typeface="Cambria Math" panose="02040503050406030204" pitchFamily="18" charset="0"/>
+                                  <a:ea typeface="Cambria Math" panose="02040503050406030204" pitchFamily="18" charset="0"/>
+                                </a:rPr>
+                                <m:t>2</m:t>
+                              </m:r>
+                              <m:r>
+                                <a:rPr lang="en-US" i="1">
+                                  <a:latin typeface="Cambria Math" panose="02040503050406030204" pitchFamily="18" charset="0"/>
+                                  <a:ea typeface="Cambria Math" panose="02040503050406030204" pitchFamily="18" charset="0"/>
+                                </a:rPr>
+                                <m:t>𝑖</m:t>
+                              </m:r>
+                            </m:sub>
+                          </m:sSub>
+                        </m:e>
+                      </m:d>
+                      <m:r>
+                        <a:rPr lang="en-US" b="0" i="1" smtClean="0">
+                          <a:latin typeface="Cambria Math" panose="02040503050406030204" pitchFamily="18" charset="0"/>
+                          <a:ea typeface="Cambria Math" panose="02040503050406030204" pitchFamily="18" charset="0"/>
+                        </a:rPr>
+                        <m:t>+</m:t>
+                      </m:r>
+                      <m:sSub>
+                        <m:sSubPr>
+                          <m:ctrlPr>
+                            <a:rPr lang="en-US" i="1">
+                              <a:latin typeface="Cambria Math" panose="02040503050406030204" pitchFamily="18" charset="0"/>
+                              <a:ea typeface="Cambria Math" panose="02040503050406030204" pitchFamily="18" charset="0"/>
+                            </a:rPr>
+                          </m:ctrlPr>
+                        </m:sSubPr>
+                        <m:e>
+                          <m:r>
+                            <a:rPr lang="en-US" i="1">
+                              <a:latin typeface="Cambria Math" panose="02040503050406030204" pitchFamily="18" charset="0"/>
+                              <a:ea typeface="Cambria Math" panose="02040503050406030204" pitchFamily="18" charset="0"/>
+                            </a:rPr>
+                            <m:t>𝑓</m:t>
+                          </m:r>
+                        </m:e>
+                        <m:sub>
+                          <m:r>
+                            <a:rPr lang="en-US" b="0" i="1" smtClean="0">
+                              <a:latin typeface="Cambria Math" panose="02040503050406030204" pitchFamily="18" charset="0"/>
+                              <a:ea typeface="Cambria Math" panose="02040503050406030204" pitchFamily="18" charset="0"/>
+                            </a:rPr>
+                            <m:t>3</m:t>
+                          </m:r>
+                        </m:sub>
+                      </m:sSub>
+                      <m:d>
+                        <m:dPr>
+                          <m:ctrlPr>
+                            <a:rPr lang="en-US" i="1">
+                              <a:latin typeface="Cambria Math" panose="02040503050406030204" pitchFamily="18" charset="0"/>
+                              <a:ea typeface="Cambria Math" panose="02040503050406030204" pitchFamily="18" charset="0"/>
+                            </a:rPr>
+                          </m:ctrlPr>
+                        </m:dPr>
+                        <m:e>
+                          <m:sSub>
+                            <m:sSubPr>
+                              <m:ctrlPr>
+                                <a:rPr lang="en-US" i="1">
+                                  <a:latin typeface="Cambria Math" panose="02040503050406030204" pitchFamily="18" charset="0"/>
+                                  <a:ea typeface="Cambria Math" panose="02040503050406030204" pitchFamily="18" charset="0"/>
+                                </a:rPr>
+                              </m:ctrlPr>
+                            </m:sSubPr>
+                            <m:e>
+                              <m:r>
+                                <a:rPr lang="en-US" i="1">
+                                  <a:latin typeface="Cambria Math" panose="02040503050406030204" pitchFamily="18" charset="0"/>
+                                  <a:ea typeface="Cambria Math" panose="02040503050406030204" pitchFamily="18" charset="0"/>
+                                </a:rPr>
+                                <m:t>𝑥</m:t>
+                              </m:r>
+                            </m:e>
+                            <m:sub>
+                              <m:r>
+                                <a:rPr lang="en-US" b="0" i="1" smtClean="0">
+                                  <a:latin typeface="Cambria Math" panose="02040503050406030204" pitchFamily="18" charset="0"/>
+                                  <a:ea typeface="Cambria Math" panose="02040503050406030204" pitchFamily="18" charset="0"/>
+                                </a:rPr>
+                                <m:t>3</m:t>
+                              </m:r>
+                              <m:r>
+                                <a:rPr lang="en-US" i="1">
+                                  <a:latin typeface="Cambria Math" panose="02040503050406030204" pitchFamily="18" charset="0"/>
+                                  <a:ea typeface="Cambria Math" panose="02040503050406030204" pitchFamily="18" charset="0"/>
+                                </a:rPr>
+                                <m:t>𝑖</m:t>
+                              </m:r>
+                            </m:sub>
+                          </m:sSub>
+                          <m:r>
+                            <a:rPr lang="en-US" b="0" i="1" smtClean="0">
+                              <a:latin typeface="Cambria Math" panose="02040503050406030204" pitchFamily="18" charset="0"/>
+                              <a:ea typeface="Cambria Math" panose="02040503050406030204" pitchFamily="18" charset="0"/>
+                            </a:rPr>
+                            <m:t>,</m:t>
+                          </m:r>
+                          <m:sSub>
+                            <m:sSubPr>
+                              <m:ctrlPr>
+                                <a:rPr lang="en-US" i="1">
+                                  <a:latin typeface="Cambria Math" panose="02040503050406030204" pitchFamily="18" charset="0"/>
+                                  <a:ea typeface="Cambria Math" panose="02040503050406030204" pitchFamily="18" charset="0"/>
+                                </a:rPr>
+                              </m:ctrlPr>
+                            </m:sSubPr>
+                            <m:e>
+                              <m:r>
+                                <a:rPr lang="en-US" i="1">
+                                  <a:latin typeface="Cambria Math" panose="02040503050406030204" pitchFamily="18" charset="0"/>
+                                  <a:ea typeface="Cambria Math" panose="02040503050406030204" pitchFamily="18" charset="0"/>
+                                </a:rPr>
+                                <m:t>𝑥</m:t>
+                              </m:r>
+                            </m:e>
+                            <m:sub>
+                              <m:r>
+                                <a:rPr lang="en-US" b="0" i="1" smtClean="0">
+                                  <a:latin typeface="Cambria Math" panose="02040503050406030204" pitchFamily="18" charset="0"/>
+                                  <a:ea typeface="Cambria Math" panose="02040503050406030204" pitchFamily="18" charset="0"/>
+                                </a:rPr>
+                                <m:t>4</m:t>
+                              </m:r>
+                              <m:r>
+                                <a:rPr lang="en-US" i="1">
+                                  <a:latin typeface="Cambria Math" panose="02040503050406030204" pitchFamily="18" charset="0"/>
+                                  <a:ea typeface="Cambria Math" panose="02040503050406030204" pitchFamily="18" charset="0"/>
+                                </a:rPr>
+                                <m:t>𝑖</m:t>
+                              </m:r>
+                            </m:sub>
+                          </m:sSub>
+                        </m:e>
+                      </m:d>
+                      <m:r>
+                        <a:rPr lang="en-US" b="0" i="1" smtClean="0">
+                          <a:latin typeface="Cambria Math" panose="02040503050406030204" pitchFamily="18" charset="0"/>
+                          <a:ea typeface="Cambria Math" panose="02040503050406030204" pitchFamily="18" charset="0"/>
+                        </a:rPr>
+                        <m:t>+…</m:t>
+                      </m:r>
+                    </m:oMath>
+                  </m:oMathPara>
+                </a14:m>
+                <a:endParaRPr lang="en-US" dirty="0" smtClean="0"/>
+              </a:p>
+              <a:p>
+                <a:pPr marL="0" indent="0">
+                  <a:buNone/>
+                </a:pPr>
+                <a:r>
+                  <a:rPr lang="en-US" dirty="0" smtClean="0"/>
+                  <a:t>where:</a:t>
+                </a:r>
+              </a:p>
+              <a:p>
+                <a:pPr marL="0" indent="0">
+                  <a:buNone/>
+                </a:pPr>
+                <a14:m>
+                  <m:oMathPara xmlns:m="http://schemas.openxmlformats.org/officeDocument/2006/math">
+                    <m:oMathParaPr>
+                      <m:jc m:val="left"/>
+                    </m:oMathParaPr>
+                    <m:oMath xmlns:m="http://schemas.openxmlformats.org/officeDocument/2006/math">
+                      <m:sSub>
+                        <m:sSubPr>
+                          <m:ctrlPr>
+                            <a:rPr lang="en-US" i="1">
+                              <a:latin typeface="Cambria Math" panose="02040503050406030204" pitchFamily="18" charset="0"/>
+                            </a:rPr>
+                          </m:ctrlPr>
+                        </m:sSubPr>
+                        <m:e>
+                          <m:r>
+                            <a:rPr lang="en-US" i="1">
+                              <a:latin typeface="Cambria Math" panose="02040503050406030204" pitchFamily="18" charset="0"/>
+                              <a:ea typeface="Cambria Math" panose="02040503050406030204" pitchFamily="18" charset="0"/>
+                            </a:rPr>
+                            <m:t>𝜇</m:t>
+                          </m:r>
+                        </m:e>
+                        <m:sub>
+                          <m:r>
+                            <a:rPr lang="en-US" i="1">
+                              <a:latin typeface="Cambria Math" panose="02040503050406030204" pitchFamily="18" charset="0"/>
+                            </a:rPr>
+                            <m:t>𝑖</m:t>
+                          </m:r>
+                        </m:sub>
+                      </m:sSub>
+                      <m:r>
+                        <a:rPr lang="en-US" i="1">
+                          <a:latin typeface="Cambria Math" panose="02040503050406030204" pitchFamily="18" charset="0"/>
+                          <a:ea typeface="Cambria Math" panose="02040503050406030204" pitchFamily="18" charset="0"/>
+                        </a:rPr>
+                        <m:t>≡</m:t>
+                      </m:r>
+                      <m:r>
+                        <a:rPr lang="en-US" i="1">
+                          <a:latin typeface="Cambria Math" panose="02040503050406030204" pitchFamily="18" charset="0"/>
+                          <a:ea typeface="Cambria Math" panose="02040503050406030204" pitchFamily="18" charset="0"/>
+                        </a:rPr>
+                        <m:t>𝔼</m:t>
+                      </m:r>
+                      <m:d>
+                        <m:dPr>
+                          <m:ctrlPr>
+                            <a:rPr lang="en-US" i="1">
+                              <a:latin typeface="Cambria Math" panose="02040503050406030204" pitchFamily="18" charset="0"/>
+                              <a:ea typeface="Cambria Math" panose="02040503050406030204" pitchFamily="18" charset="0"/>
+                            </a:rPr>
+                          </m:ctrlPr>
+                        </m:dPr>
+                        <m:e>
+                          <m:sSub>
+                            <m:sSubPr>
+                              <m:ctrlPr>
+                                <a:rPr lang="en-US" i="1">
+                                  <a:latin typeface="Cambria Math" panose="02040503050406030204" pitchFamily="18" charset="0"/>
+                                </a:rPr>
+                              </m:ctrlPr>
+                            </m:sSubPr>
+                            <m:e>
+                              <m:r>
+                                <a:rPr lang="en-US" i="1">
+                                  <a:latin typeface="Cambria Math" panose="02040503050406030204" pitchFamily="18" charset="0"/>
+                                </a:rPr>
+                                <m:t>𝑌</m:t>
+                              </m:r>
+                            </m:e>
+                            <m:sub>
+                              <m:r>
+                                <a:rPr lang="en-US" i="1">
+                                  <a:latin typeface="Cambria Math" panose="02040503050406030204" pitchFamily="18" charset="0"/>
+                                </a:rPr>
+                                <m:t>𝑖</m:t>
+                              </m:r>
+                            </m:sub>
+                          </m:sSub>
+                        </m:e>
+                      </m:d>
+                    </m:oMath>
+                  </m:oMathPara>
+                </a14:m>
+                <a:endParaRPr lang="en-US" dirty="0" smtClean="0"/>
+              </a:p>
+              <a:p>
+                <a:pPr marL="0" indent="0">
+                  <a:buNone/>
+                </a:pPr>
+                <a14:m>
+                  <m:oMath xmlns:m="http://schemas.openxmlformats.org/officeDocument/2006/math">
+                    <m:sSub>
+                      <m:sSubPr>
+                        <m:ctrlPr>
+                          <a:rPr lang="en-US" i="1">
+                            <a:latin typeface="Cambria Math" panose="02040503050406030204" pitchFamily="18" charset="0"/>
+                          </a:rPr>
+                        </m:ctrlPr>
+                      </m:sSubPr>
+                      <m:e>
+                        <m:r>
+                          <a:rPr lang="en-US" i="1">
+                            <a:latin typeface="Cambria Math" panose="02040503050406030204" pitchFamily="18" charset="0"/>
+                          </a:rPr>
+                          <m:t>𝑌</m:t>
+                        </m:r>
+                      </m:e>
+                      <m:sub>
+                        <m:r>
+                          <a:rPr lang="en-US" i="1">
+                            <a:latin typeface="Cambria Math" panose="02040503050406030204" pitchFamily="18" charset="0"/>
+                          </a:rPr>
+                          <m:t>𝑖</m:t>
+                        </m:r>
+                      </m:sub>
+                    </m:sSub>
+                    <m:r>
+                      <a:rPr lang="en-US" i="1">
+                        <a:latin typeface="Cambria Math" panose="02040503050406030204" pitchFamily="18" charset="0"/>
+                      </a:rPr>
+                      <m:t>~</m:t>
+                    </m:r>
+                  </m:oMath>
+                </a14:m>
+                <a:r>
+                  <a:rPr lang="en-US" dirty="0"/>
+                  <a:t> some exponential family distribution</a:t>
+                </a:r>
+                <a:endParaRPr lang="en-US" dirty="0"/>
+              </a:p>
+            </p:txBody>
+          </p:sp>
+        </mc:Choice>
+        <mc:Fallback>
+          <p:sp>
+            <p:nvSpPr>
+              <p:cNvPr id="3" name="Content Placeholder 2"/>
+              <p:cNvSpPr>
+                <a:spLocks noGrp="1" noRot="1" noChangeAspect="1" noMove="1" noResize="1" noEditPoints="1" noAdjustHandles="1" noChangeArrowheads="1" noChangeShapeType="1" noTextEdit="1"/>
+              </p:cNvSpPr>
+              <p:nvPr>
+                <p:ph idx="1"/>
+              </p:nvPr>
+            </p:nvSpPr>
+            <p:spPr>
+              <a:blipFill>
+                <a:blip r:embed="rId2"/>
+                <a:stretch>
+                  <a:fillRect l="-1217" t="-2241"/>
+                </a:stretch>
+              </a:blipFill>
+            </p:spPr>
+            <p:txBody>
+              <a:bodyPr/>
+              <a:lstStyle/>
+              <a:p>
+                <a:r>
+                  <a:rPr lang="en-US">
+                    <a:noFill/>
+                  </a:rPr>
+                  <a:t> </a:t>
+                </a:r>
+              </a:p>
+            </p:txBody>
+          </p:sp>
+        </mc:Fallback>
+      </mc:AlternateContent>
+      <p:grpSp>
+        <p:nvGrpSpPr>
+          <p:cNvPr id="7" name="Group 6"/>
+          <p:cNvGrpSpPr/>
+          <p:nvPr/>
+        </p:nvGrpSpPr>
+        <p:grpSpPr>
+          <a:xfrm>
+            <a:off x="3505200" y="3074894"/>
+            <a:ext cx="3128145" cy="1320768"/>
+            <a:chOff x="3505200" y="3074894"/>
+            <a:chExt cx="3128145" cy="1320768"/>
+          </a:xfrm>
+        </p:grpSpPr>
+        <p:sp>
+          <p:nvSpPr>
+            <p:cNvPr id="4" name="Down Arrow 3"/>
+            <p:cNvSpPr/>
+            <p:nvPr/>
+          </p:nvSpPr>
+          <p:spPr>
+            <a:xfrm rot="9508212">
+              <a:off x="3758577" y="3676635"/>
+              <a:ext cx="484632" cy="649320"/>
+            </a:xfrm>
+            <a:prstGeom prst="downArrow">
+              <a:avLst/>
+            </a:prstGeom>
+            <a:solidFill>
+              <a:schemeClr val="bg2">
+                <a:lumMod val="50000"/>
+              </a:schemeClr>
+            </a:solidFill>
+            <a:ln>
+              <a:solidFill>
+                <a:schemeClr val="bg2">
+                  <a:lumMod val="50000"/>
+                </a:schemeClr>
+              </a:solidFill>
+            </a:ln>
+          </p:spPr>
+          <p:style>
+            <a:lnRef idx="2">
+              <a:schemeClr val="accent1">
+                <a:shade val="50000"/>
+              </a:schemeClr>
+            </a:lnRef>
+            <a:fillRef idx="1">
+              <a:schemeClr val="accent1"/>
+            </a:fillRef>
+            <a:effectRef idx="0">
+              <a:schemeClr val="accent1"/>
+            </a:effectRef>
+            <a:fontRef idx="minor">
+              <a:schemeClr val="lt1"/>
+            </a:fontRef>
+          </p:style>
+          <p:txBody>
+            <a:bodyPr rtlCol="0" anchor="ctr"/>
+            <a:lstStyle/>
+            <a:p>
+              <a:pPr algn="ctr"/>
+              <a:endParaRPr lang="en-US"/>
+            </a:p>
+          </p:txBody>
+        </p:sp>
+        <p:sp>
+          <p:nvSpPr>
+            <p:cNvPr id="5" name="Rectangle 4"/>
+            <p:cNvSpPr/>
+            <p:nvPr/>
+          </p:nvSpPr>
+          <p:spPr>
+            <a:xfrm>
+              <a:off x="3505200" y="3074894"/>
+              <a:ext cx="726141" cy="600635"/>
+            </a:xfrm>
+            <a:prstGeom prst="rect">
+              <a:avLst/>
+            </a:prstGeom>
+            <a:noFill/>
+            <a:ln w="38100">
+              <a:solidFill>
+                <a:schemeClr val="bg2">
+                  <a:lumMod val="50000"/>
+                </a:schemeClr>
+              </a:solidFill>
+            </a:ln>
+          </p:spPr>
+          <p:style>
+            <a:lnRef idx="2">
+              <a:schemeClr val="accent1">
+                <a:shade val="50000"/>
+              </a:schemeClr>
+            </a:lnRef>
+            <a:fillRef idx="1">
+              <a:schemeClr val="accent1"/>
+            </a:fillRef>
+            <a:effectRef idx="0">
+              <a:schemeClr val="accent1"/>
+            </a:effectRef>
+            <a:fontRef idx="minor">
+              <a:schemeClr val="lt1"/>
+            </a:fontRef>
+          </p:style>
+          <p:txBody>
+            <a:bodyPr rtlCol="0" anchor="ctr"/>
+            <a:lstStyle/>
+            <a:p>
+              <a:pPr algn="ctr"/>
+              <a:endParaRPr lang="en-US"/>
+            </a:p>
+          </p:txBody>
+        </p:sp>
+        <p:sp>
+          <p:nvSpPr>
+            <p:cNvPr id="6" name="TextBox 5"/>
+            <p:cNvSpPr txBox="1"/>
+            <p:nvPr/>
+          </p:nvSpPr>
+          <p:spPr>
+            <a:xfrm>
+              <a:off x="4231341" y="4026330"/>
+              <a:ext cx="2402004" cy="369332"/>
+            </a:xfrm>
+            <a:prstGeom prst="rect">
+              <a:avLst/>
+            </a:prstGeom>
+            <a:noFill/>
+          </p:spPr>
+          <p:txBody>
+            <a:bodyPr wrap="none" rtlCol="0">
+              <a:spAutoFit/>
+            </a:bodyPr>
+            <a:lstStyle/>
+            <a:p>
+              <a:r>
+                <a:rPr lang="en-US" dirty="0" smtClean="0">
+                  <a:solidFill>
+                    <a:schemeClr val="bg2">
+                      <a:lumMod val="50000"/>
+                    </a:schemeClr>
+                  </a:solidFill>
+                </a:rPr>
+                <a:t>We’ve seen this before!</a:t>
+              </a:r>
+              <a:endParaRPr lang="en-US" dirty="0">
+                <a:solidFill>
+                  <a:schemeClr val="bg2">
+                    <a:lumMod val="50000"/>
+                  </a:schemeClr>
+                </a:solidFill>
+              </a:endParaRPr>
+            </a:p>
+          </p:txBody>
+        </p:sp>
+      </p:grpSp>
+      <p:sp>
+        <p:nvSpPr>
+          <p:cNvPr id="10" name="Rectangle 9"/>
+          <p:cNvSpPr/>
+          <p:nvPr/>
+        </p:nvSpPr>
+        <p:spPr>
+          <a:xfrm>
+            <a:off x="4579748" y="3077450"/>
+            <a:ext cx="5371075" cy="517044"/>
+          </a:xfrm>
+          <a:prstGeom prst="rect">
+            <a:avLst/>
+          </a:prstGeom>
+          <a:noFill/>
+          <a:ln w="38100">
+            <a:solidFill>
+              <a:srgbClr val="7030A0"/>
+            </a:solidFill>
+          </a:ln>
+        </p:spPr>
+        <p:style>
+          <a:lnRef idx="2">
+            <a:schemeClr val="accent1">
+              <a:shade val="50000"/>
+            </a:schemeClr>
+          </a:lnRef>
+          <a:fillRef idx="1">
+            <a:schemeClr val="accent1"/>
+          </a:fillRef>
+          <a:effectRef idx="0">
+            <a:schemeClr val="accent1"/>
+          </a:effectRef>
+          <a:fontRef idx="minor">
+            <a:schemeClr val="lt1"/>
+          </a:fontRef>
+        </p:style>
+        <p:txBody>
+          <a:bodyPr rtlCol="0" anchor="ctr"/>
+          <a:lstStyle/>
+          <a:p>
+            <a:pPr algn="ctr"/>
+            <a:endParaRPr lang="en-US"/>
+          </a:p>
+        </p:txBody>
+      </p:sp>
+      <p:pic>
+        <p:nvPicPr>
+          <p:cNvPr id="11" name="Content Placeholder 3"/>
+          <p:cNvPicPr>
+            <a:picLocks noChangeAspect="1"/>
+          </p:cNvPicPr>
+          <p:nvPr/>
+        </p:nvPicPr>
+        <p:blipFill rotWithShape="1">
+          <a:blip r:embed="rId3" cstate="print">
+            <a:extLst>
+              <a:ext uri="{28A0092B-C50C-407E-A947-70E740481C1C}">
+                <a14:useLocalDpi xmlns:a14="http://schemas.microsoft.com/office/drawing/2010/main" val="0"/>
+              </a:ext>
+            </a:extLst>
+          </a:blip>
+          <a:srcRect l="3350" r="11195"/>
+          <a:stretch/>
+        </p:blipFill>
+        <p:spPr>
+          <a:xfrm>
+            <a:off x="7389507" y="3837164"/>
+            <a:ext cx="4384372" cy="2885964"/>
+          </a:xfrm>
+          <a:prstGeom prst="rect">
+            <a:avLst/>
+          </a:prstGeom>
+        </p:spPr>
+      </p:pic>
+    </p:spTree>
+    <p:extLst>
+      <p:ext uri="{BB962C8B-B14F-4D97-AF65-F5344CB8AC3E}">
+        <p14:creationId xmlns:p14="http://schemas.microsoft.com/office/powerpoint/2010/main" val="3923740245"/>
+      </p:ext>
+    </p:extLst>
+  </p:cSld>
+  <p:clrMapOvr>
+    <a:masterClrMapping/>
+  </p:clrMapOvr>
+</p:sld>
+</file>
+
+<file path=ppt/slides/slide22.xml><?xml version="1.0" encoding="utf-8"?>
 <p:sld xmlns:a="http://schemas.openxmlformats.org/drawingml/2006/main" xmlns:r="http://schemas.openxmlformats.org/officeDocument/2006/relationships" xmlns:p="http://schemas.openxmlformats.org/presentationml/2006/main">
   <p:cSld>
     <p:spTree>
@@ -9590,7 +10281,7 @@
 </p:sld>
 </file>
 
-<file path=ppt/slides/slide21.xml><?xml version="1.0" encoding="utf-8"?>
+<file path=ppt/slides/slide23.xml><?xml version="1.0" encoding="utf-8"?>
 <p:sld xmlns:a="http://schemas.openxmlformats.org/drawingml/2006/main" xmlns:r="http://schemas.openxmlformats.org/officeDocument/2006/relationships" xmlns:p="http://schemas.openxmlformats.org/presentationml/2006/main">
   <p:cSld>
     <p:spTree>
@@ -9798,7 +10489,7 @@
 </p:sld>
 </file>
 
-<file path=ppt/slides/slide22.xml><?xml version="1.0" encoding="utf-8"?>
+<file path=ppt/slides/slide24.xml><?xml version="1.0" encoding="utf-8"?>
 <p:sld xmlns:a="http://schemas.openxmlformats.org/drawingml/2006/main" xmlns:r="http://schemas.openxmlformats.org/officeDocument/2006/relationships" xmlns:p="http://schemas.openxmlformats.org/presentationml/2006/main">
   <p:cSld>
     <p:spTree>
@@ -9995,7 +10686,7 @@
 </p:sld>
 </file>
 
-<file path=ppt/slides/slide23.xml><?xml version="1.0" encoding="utf-8"?>
+<file path=ppt/slides/slide25.xml><?xml version="1.0" encoding="utf-8"?>
 <p:sld xmlns:a="http://schemas.openxmlformats.org/drawingml/2006/main" xmlns:r="http://schemas.openxmlformats.org/officeDocument/2006/relationships" xmlns:p="http://schemas.openxmlformats.org/presentationml/2006/main">
   <p:cSld>
     <p:spTree>
@@ -11223,7 +11914,7 @@
 </p:sld>
 </file>
 
-<file path=ppt/slides/slide24.xml><?xml version="1.0" encoding="utf-8"?>
+<file path=ppt/slides/slide26.xml><?xml version="1.0" encoding="utf-8"?>
 <p:sld xmlns:a="http://schemas.openxmlformats.org/drawingml/2006/main" xmlns:r="http://schemas.openxmlformats.org/officeDocument/2006/relationships" xmlns:p="http://schemas.openxmlformats.org/presentationml/2006/main">
   <p:cSld>
     <p:spTree>
@@ -11733,6 +12424,441 @@
           </a:p>
         </p:txBody>
       </p:sp>
+      <mc:AlternateContent xmlns:mc="http://schemas.openxmlformats.org/markup-compatibility/2006">
+        <mc:Choice xmlns:a14="http://schemas.microsoft.com/office/drawing/2010/main" Requires="a14">
+          <p:sp>
+            <p:nvSpPr>
+              <p:cNvPr id="7" name="Content Placeholder 6"/>
+              <p:cNvSpPr>
+                <a:spLocks noGrp="1"/>
+              </p:cNvSpPr>
+              <p:nvPr>
+                <p:ph sz="half" idx="1"/>
+              </p:nvPr>
+            </p:nvSpPr>
+            <p:spPr>
+              <a:xfrm>
+                <a:off x="138946" y="1583577"/>
+                <a:ext cx="5181600" cy="4906875"/>
+              </a:xfrm>
+            </p:spPr>
+            <p:txBody>
+              <a:bodyPr>
+                <a:normAutofit lnSpcReduction="10000"/>
+              </a:bodyPr>
+              <a:lstStyle/>
+              <a:p>
+                <a:r>
+                  <a:rPr lang="en-US" dirty="0" smtClean="0"/>
+                  <a:t>Probability density function (pdf) for a random variable, </a:t>
+                </a:r>
+                <a14:m>
+                  <m:oMath xmlns:m="http://schemas.openxmlformats.org/officeDocument/2006/math">
+                    <m:r>
+                      <a:rPr lang="en-US" i="1" dirty="0" smtClean="0">
+                        <a:latin typeface="Cambria Math" panose="02040503050406030204" pitchFamily="18" charset="0"/>
+                      </a:rPr>
+                      <m:t>𝑌</m:t>
+                    </m:r>
+                  </m:oMath>
+                </a14:m>
+                <a:r>
+                  <a:rPr lang="en-US" dirty="0" smtClean="0"/>
+                  <a:t> in this case</a:t>
+                </a:r>
+              </a:p>
+              <a:p>
+                <a:r>
+                  <a:rPr lang="en-US" dirty="0" smtClean="0"/>
+                  <a:t>Also referred to as a Gaussian distribution</a:t>
+                </a:r>
+              </a:p>
+              <a:p>
+                <a14:m>
+                  <m:oMath xmlns:m="http://schemas.openxmlformats.org/officeDocument/2006/math">
+                    <m:r>
+                      <a:rPr lang="en-US" i="1" dirty="0">
+                        <a:latin typeface="Cambria Math" panose="02040503050406030204" pitchFamily="18" charset="0"/>
+                      </a:rPr>
+                      <m:t>𝑌</m:t>
+                    </m:r>
+                  </m:oMath>
+                </a14:m>
+                <a:r>
+                  <a:rPr lang="en-US" dirty="0" smtClean="0"/>
+                  <a:t> can take on any value from </a:t>
+                </a:r>
+                <a14:m>
+                  <m:oMath xmlns:m="http://schemas.openxmlformats.org/officeDocument/2006/math">
+                    <m:r>
+                      <a:rPr lang="en-US" b="0" i="1" smtClean="0">
+                        <a:latin typeface="Cambria Math" panose="02040503050406030204" pitchFamily="18" charset="0"/>
+                      </a:rPr>
+                      <m:t>−</m:t>
+                    </m:r>
+                    <m:r>
+                      <a:rPr lang="en-US" b="0" i="1" smtClean="0">
+                        <a:latin typeface="Cambria Math" panose="02040503050406030204" pitchFamily="18" charset="0"/>
+                        <a:ea typeface="Cambria Math" panose="02040503050406030204" pitchFamily="18" charset="0"/>
+                      </a:rPr>
+                      <m:t>∞</m:t>
+                    </m:r>
+                  </m:oMath>
+                </a14:m>
+                <a:r>
+                  <a:rPr lang="en-US" dirty="0" smtClean="0"/>
+                  <a:t> to </a:t>
+                </a:r>
+                <a14:m>
+                  <m:oMath xmlns:m="http://schemas.openxmlformats.org/officeDocument/2006/math">
+                    <m:r>
+                      <a:rPr lang="en-US" b="0" i="1" smtClean="0">
+                        <a:latin typeface="Cambria Math" panose="02040503050406030204" pitchFamily="18" charset="0"/>
+                      </a:rPr>
+                      <m:t>+</m:t>
+                    </m:r>
+                    <m:r>
+                      <a:rPr lang="en-US" b="0" i="1" smtClean="0">
+                        <a:latin typeface="Cambria Math" panose="02040503050406030204" pitchFamily="18" charset="0"/>
+                        <a:ea typeface="Cambria Math" panose="02040503050406030204" pitchFamily="18" charset="0"/>
+                      </a:rPr>
+                      <m:t>∞</m:t>
+                    </m:r>
+                  </m:oMath>
+                </a14:m>
+                <a:endParaRPr lang="en-US" dirty="0" smtClean="0"/>
+              </a:p>
+              <a:p>
+                <a:r>
+                  <a:rPr lang="en-US" dirty="0" smtClean="0"/>
+                  <a:t>The pdf is defined by two parameters</a:t>
+                </a:r>
+              </a:p>
+              <a:p>
+                <a:pPr lvl="1"/>
+                <a14:m>
+                  <m:oMath xmlns:m="http://schemas.openxmlformats.org/officeDocument/2006/math">
+                    <m:r>
+                      <a:rPr lang="en-US" i="1" smtClean="0">
+                        <a:latin typeface="Cambria Math" panose="02040503050406030204" pitchFamily="18" charset="0"/>
+                        <a:ea typeface="Cambria Math" panose="02040503050406030204" pitchFamily="18" charset="0"/>
+                      </a:rPr>
+                      <m:t>𝜇</m:t>
+                    </m:r>
+                  </m:oMath>
+                </a14:m>
+                <a:r>
+                  <a:rPr lang="en-US" dirty="0" smtClean="0"/>
+                  <a:t>: mean</a:t>
+                </a:r>
+              </a:p>
+              <a:p>
+                <a:pPr lvl="1"/>
+                <a14:m>
+                  <m:oMath xmlns:m="http://schemas.openxmlformats.org/officeDocument/2006/math">
+                    <m:r>
+                      <a:rPr lang="en-US" i="1" smtClean="0">
+                        <a:latin typeface="Cambria Math" panose="02040503050406030204" pitchFamily="18" charset="0"/>
+                        <a:ea typeface="Cambria Math" panose="02040503050406030204" pitchFamily="18" charset="0"/>
+                      </a:rPr>
+                      <m:t>𝜎</m:t>
+                    </m:r>
+                  </m:oMath>
+                </a14:m>
+                <a:r>
+                  <a:rPr lang="en-US" dirty="0" smtClean="0"/>
+                  <a:t>: standard deviation</a:t>
+                </a:r>
+              </a:p>
+              <a:p>
+                <a:r>
+                  <a:rPr lang="en-US" dirty="0" smtClean="0"/>
+                  <a:t>The pdf is symmetric about </a:t>
+                </a:r>
+                <a14:m>
+                  <m:oMath xmlns:m="http://schemas.openxmlformats.org/officeDocument/2006/math">
+                    <m:r>
+                      <a:rPr lang="en-US" i="1">
+                        <a:latin typeface="Cambria Math" panose="02040503050406030204" pitchFamily="18" charset="0"/>
+                        <a:ea typeface="Cambria Math" panose="02040503050406030204" pitchFamily="18" charset="0"/>
+                      </a:rPr>
+                      <m:t>𝜇</m:t>
+                    </m:r>
+                  </m:oMath>
+                </a14:m>
+                <a:endParaRPr lang="en-US" dirty="0"/>
+              </a:p>
+            </p:txBody>
+          </p:sp>
+        </mc:Choice>
+        <mc:Fallback>
+          <p:sp>
+            <p:nvSpPr>
+              <p:cNvPr id="7" name="Content Placeholder 6"/>
+              <p:cNvSpPr>
+                <a:spLocks noGrp="1" noRot="1" noChangeAspect="1" noMove="1" noResize="1" noEditPoints="1" noAdjustHandles="1" noChangeArrowheads="1" noChangeShapeType="1" noTextEdit="1"/>
+              </p:cNvSpPr>
+              <p:nvPr>
+                <p:ph sz="half" idx="1"/>
+              </p:nvPr>
+            </p:nvSpPr>
+            <p:spPr>
+              <a:xfrm>
+                <a:off x="138946" y="1583577"/>
+                <a:ext cx="5181600" cy="4906875"/>
+              </a:xfrm>
+              <a:blipFill>
+                <a:blip r:embed="rId2"/>
+                <a:stretch>
+                  <a:fillRect l="-2118" t="-2857" r="-3765"/>
+                </a:stretch>
+              </a:blipFill>
+            </p:spPr>
+            <p:txBody>
+              <a:bodyPr/>
+              <a:lstStyle/>
+              <a:p>
+                <a:r>
+                  <a:rPr lang="en-US">
+                    <a:noFill/>
+                  </a:rPr>
+                  <a:t> </a:t>
+                </a:r>
+              </a:p>
+            </p:txBody>
+          </p:sp>
+        </mc:Fallback>
+      </mc:AlternateContent>
+      <p:pic>
+        <p:nvPicPr>
+          <p:cNvPr id="4" name="Picture 3"/>
+          <p:cNvPicPr>
+            <a:picLocks noChangeAspect="1"/>
+          </p:cNvPicPr>
+          <p:nvPr/>
+        </p:nvPicPr>
+        <p:blipFill>
+          <a:blip r:embed="rId3" cstate="print">
+            <a:extLst>
+              <a:ext uri="{28A0092B-C50C-407E-A947-70E740481C1C}">
+                <a14:useLocalDpi xmlns:a14="http://schemas.microsoft.com/office/drawing/2010/main" val="0"/>
+              </a:ext>
+            </a:extLst>
+          </a:blip>
+          <a:stretch>
+            <a:fillRect/>
+          </a:stretch>
+        </p:blipFill>
+        <p:spPr>
+          <a:xfrm>
+            <a:off x="5320546" y="1459753"/>
+            <a:ext cx="5804654" cy="5030700"/>
+          </a:xfrm>
+          <a:prstGeom prst="rect">
+            <a:avLst/>
+          </a:prstGeom>
+        </p:spPr>
+      </p:pic>
+      <mc:AlternateContent xmlns:mc="http://schemas.openxmlformats.org/markup-compatibility/2006">
+        <mc:Choice xmlns:a14="http://schemas.microsoft.com/office/drawing/2010/main" Requires="a14">
+          <p:sp>
+            <p:nvSpPr>
+              <p:cNvPr id="5" name="TextBox 4"/>
+              <p:cNvSpPr txBox="1"/>
+              <p:nvPr/>
+            </p:nvSpPr>
+            <p:spPr>
+              <a:xfrm>
+                <a:off x="9070769" y="3489636"/>
+                <a:ext cx="732123" cy="646331"/>
+              </a:xfrm>
+              <a:prstGeom prst="rect">
+                <a:avLst/>
+              </a:prstGeom>
+              <a:noFill/>
+            </p:spPr>
+            <p:txBody>
+              <a:bodyPr wrap="none" rtlCol="0">
+                <a:spAutoFit/>
+              </a:bodyPr>
+              <a:lstStyle/>
+              <a:p>
+                <a14:m>
+                  <m:oMath xmlns:m="http://schemas.openxmlformats.org/officeDocument/2006/math">
+                    <m:r>
+                      <a:rPr lang="en-US" i="1" smtClean="0">
+                        <a:latin typeface="Cambria Math" panose="02040503050406030204" pitchFamily="18" charset="0"/>
+                        <a:ea typeface="Cambria Math" panose="02040503050406030204" pitchFamily="18" charset="0"/>
+                      </a:rPr>
+                      <m:t>𝜇</m:t>
+                    </m:r>
+                  </m:oMath>
+                </a14:m>
+                <a:r>
+                  <a:rPr lang="en-US" dirty="0" smtClean="0"/>
+                  <a:t>=3</a:t>
+                </a:r>
+              </a:p>
+              <a:p>
+                <a14:m>
+                  <m:oMath xmlns:m="http://schemas.openxmlformats.org/officeDocument/2006/math">
+                    <m:r>
+                      <a:rPr lang="en-US" i="1" dirty="0" smtClean="0">
+                        <a:latin typeface="Cambria Math" panose="02040503050406030204" pitchFamily="18" charset="0"/>
+                        <a:ea typeface="Cambria Math" panose="02040503050406030204" pitchFamily="18" charset="0"/>
+                      </a:rPr>
+                      <m:t>𝜎</m:t>
+                    </m:r>
+                  </m:oMath>
+                </a14:m>
+                <a:r>
+                  <a:rPr lang="en-US" dirty="0" smtClean="0"/>
+                  <a:t>=0.6</a:t>
+                </a:r>
+                <a:endParaRPr lang="en-US" dirty="0"/>
+              </a:p>
+            </p:txBody>
+          </p:sp>
+        </mc:Choice>
+        <mc:Fallback>
+          <p:sp>
+            <p:nvSpPr>
+              <p:cNvPr id="5" name="TextBox 4"/>
+              <p:cNvSpPr txBox="1">
+                <a:spLocks noRot="1" noChangeAspect="1" noMove="1" noResize="1" noEditPoints="1" noAdjustHandles="1" noChangeArrowheads="1" noChangeShapeType="1" noTextEdit="1"/>
+              </p:cNvSpPr>
+              <p:nvPr/>
+            </p:nvSpPr>
+            <p:spPr>
+              <a:xfrm>
+                <a:off x="9070769" y="3489636"/>
+                <a:ext cx="732123" cy="646331"/>
+              </a:xfrm>
+              <a:prstGeom prst="rect">
+                <a:avLst/>
+              </a:prstGeom>
+              <a:blipFill>
+                <a:blip r:embed="rId4"/>
+                <a:stretch>
+                  <a:fillRect t="-4717" r="-6667" b="-14151"/>
+                </a:stretch>
+              </a:blipFill>
+            </p:spPr>
+            <p:txBody>
+              <a:bodyPr/>
+              <a:lstStyle/>
+              <a:p>
+                <a:r>
+                  <a:rPr lang="en-US">
+                    <a:noFill/>
+                  </a:rPr>
+                  <a:t> </a:t>
+                </a:r>
+              </a:p>
+            </p:txBody>
+          </p:sp>
+        </mc:Fallback>
+      </mc:AlternateContent>
+      <mc:AlternateContent xmlns:mc="http://schemas.openxmlformats.org/markup-compatibility/2006">
+        <mc:Choice xmlns:a14="http://schemas.microsoft.com/office/drawing/2010/main" Requires="a14">
+          <p:sp>
+            <p:nvSpPr>
+              <p:cNvPr id="9" name="TextBox 8"/>
+              <p:cNvSpPr txBox="1"/>
+              <p:nvPr/>
+            </p:nvSpPr>
+            <p:spPr>
+              <a:xfrm>
+                <a:off x="7562467" y="3847166"/>
+                <a:ext cx="732123" cy="646331"/>
+              </a:xfrm>
+              <a:prstGeom prst="rect">
+                <a:avLst/>
+              </a:prstGeom>
+              <a:noFill/>
+            </p:spPr>
+            <p:txBody>
+              <a:bodyPr wrap="none" rtlCol="0">
+                <a:spAutoFit/>
+              </a:bodyPr>
+              <a:lstStyle/>
+              <a:p>
+                <a14:m>
+                  <m:oMath xmlns:m="http://schemas.openxmlformats.org/officeDocument/2006/math">
+                    <m:r>
+                      <a:rPr lang="en-US" i="1" smtClean="0">
+                        <a:latin typeface="Cambria Math" panose="02040503050406030204" pitchFamily="18" charset="0"/>
+                        <a:ea typeface="Cambria Math" panose="02040503050406030204" pitchFamily="18" charset="0"/>
+                      </a:rPr>
+                      <m:t>𝜇</m:t>
+                    </m:r>
+                  </m:oMath>
+                </a14:m>
+                <a:r>
+                  <a:rPr lang="en-US" dirty="0" smtClean="0"/>
+                  <a:t>=0</a:t>
+                </a:r>
+              </a:p>
+              <a:p>
+                <a14:m>
+                  <m:oMath xmlns:m="http://schemas.openxmlformats.org/officeDocument/2006/math">
+                    <m:r>
+                      <a:rPr lang="en-US" i="1" dirty="0" smtClean="0">
+                        <a:latin typeface="Cambria Math" panose="02040503050406030204" pitchFamily="18" charset="0"/>
+                        <a:ea typeface="Cambria Math" panose="02040503050406030204" pitchFamily="18" charset="0"/>
+                      </a:rPr>
+                      <m:t>𝜎</m:t>
+                    </m:r>
+                  </m:oMath>
+                </a14:m>
+                <a:r>
+                  <a:rPr lang="en-US" dirty="0" smtClean="0"/>
+                  <a:t>=1.0</a:t>
+                </a:r>
+                <a:endParaRPr lang="en-US" dirty="0"/>
+              </a:p>
+            </p:txBody>
+          </p:sp>
+        </mc:Choice>
+        <mc:Fallback>
+          <p:sp>
+            <p:nvSpPr>
+              <p:cNvPr id="9" name="TextBox 8"/>
+              <p:cNvSpPr txBox="1">
+                <a:spLocks noRot="1" noChangeAspect="1" noMove="1" noResize="1" noEditPoints="1" noAdjustHandles="1" noChangeArrowheads="1" noChangeShapeType="1" noTextEdit="1"/>
+              </p:cNvSpPr>
+              <p:nvPr/>
+            </p:nvSpPr>
+            <p:spPr>
+              <a:xfrm>
+                <a:off x="7562467" y="3847166"/>
+                <a:ext cx="732123" cy="646331"/>
+              </a:xfrm>
+              <a:prstGeom prst="rect">
+                <a:avLst/>
+              </a:prstGeom>
+              <a:blipFill>
+                <a:blip r:embed="rId5"/>
+                <a:stretch>
+                  <a:fillRect t="-4717" r="-6667" b="-14151"/>
+                </a:stretch>
+              </a:blipFill>
+            </p:spPr>
+            <p:txBody>
+              <a:bodyPr/>
+              <a:lstStyle/>
+              <a:p>
+                <a:r>
+                  <a:rPr lang="en-US">
+                    <a:noFill/>
+                  </a:rPr>
+                  <a:t> </a:t>
+                </a:r>
+              </a:p>
+            </p:txBody>
+          </p:sp>
+        </mc:Fallback>
+      </mc:AlternateContent>
     </p:spTree>
     <p:extLst>
       <p:ext uri="{BB962C8B-B14F-4D97-AF65-F5344CB8AC3E}">
@@ -11747,6 +12873,198 @@
 </file>
 
 <file path=ppt/slides/slide6.xml><?xml version="1.0" encoding="utf-8"?>
+<p:sld xmlns:a="http://schemas.openxmlformats.org/drawingml/2006/main" xmlns:r="http://schemas.openxmlformats.org/officeDocument/2006/relationships" xmlns:p="http://schemas.openxmlformats.org/presentationml/2006/main">
+  <p:cSld>
+    <p:spTree>
+      <p:nvGrpSpPr>
+        <p:cNvPr id="1" name=""/>
+        <p:cNvGrpSpPr/>
+        <p:nvPr/>
+      </p:nvGrpSpPr>
+      <p:grpSpPr>
+        <a:xfrm>
+          <a:off x="0" y="0"/>
+          <a:ext cx="0" cy="0"/>
+          <a:chOff x="0" y="0"/>
+          <a:chExt cx="0" cy="0"/>
+        </a:xfrm>
+      </p:grpSpPr>
+      <p:sp>
+        <p:nvSpPr>
+          <p:cNvPr id="2" name="Title 1"/>
+          <p:cNvSpPr>
+            <a:spLocks noGrp="1"/>
+          </p:cNvSpPr>
+          <p:nvPr>
+            <p:ph type="title"/>
+          </p:nvPr>
+        </p:nvSpPr>
+        <p:spPr/>
+        <p:txBody>
+          <a:bodyPr anchor="t"/>
+          <a:lstStyle/>
+          <a:p>
+            <a:r>
+              <a:rPr lang="en-US" dirty="0" smtClean="0"/>
+              <a:t>Examples of </a:t>
+            </a:r>
+            <a:r>
+              <a:rPr lang="en-US" dirty="0"/>
+              <a:t>N</a:t>
+            </a:r>
+            <a:r>
+              <a:rPr lang="en-US" dirty="0" smtClean="0"/>
+              <a:t>on-normal Distributions </a:t>
+            </a:r>
+            <a:endParaRPr lang="en-US" dirty="0"/>
+          </a:p>
+        </p:txBody>
+      </p:sp>
+      <p:grpSp>
+        <p:nvGrpSpPr>
+          <p:cNvPr id="11" name="Group 10"/>
+          <p:cNvGrpSpPr/>
+          <p:nvPr/>
+        </p:nvGrpSpPr>
+        <p:grpSpPr>
+          <a:xfrm>
+            <a:off x="2458303" y="1269347"/>
+            <a:ext cx="7275395" cy="5152624"/>
+            <a:chOff x="2323629" y="1260382"/>
+            <a:chExt cx="7275395" cy="5152624"/>
+          </a:xfrm>
+        </p:grpSpPr>
+        <p:pic>
+          <p:nvPicPr>
+            <p:cNvPr id="7" name="Picture 6"/>
+            <p:cNvPicPr>
+              <a:picLocks noChangeAspect="1"/>
+            </p:cNvPicPr>
+            <p:nvPr/>
+          </p:nvPicPr>
+          <p:blipFill>
+            <a:blip r:embed="rId2"/>
+            <a:stretch>
+              <a:fillRect/>
+            </a:stretch>
+          </p:blipFill>
+          <p:spPr>
+            <a:xfrm>
+              <a:off x="6315513" y="1260382"/>
+              <a:ext cx="3237186" cy="2514600"/>
+            </a:xfrm>
+            <a:prstGeom prst="rect">
+              <a:avLst/>
+            </a:prstGeom>
+            <a:ln>
+              <a:solidFill>
+                <a:schemeClr val="tx1"/>
+              </a:solidFill>
+            </a:ln>
+          </p:spPr>
+        </p:pic>
+        <p:pic>
+          <p:nvPicPr>
+            <p:cNvPr id="8" name="Picture 7"/>
+            <p:cNvPicPr>
+              <a:picLocks noChangeAspect="1"/>
+            </p:cNvPicPr>
+            <p:nvPr/>
+          </p:nvPicPr>
+          <p:blipFill>
+            <a:blip r:embed="rId3"/>
+            <a:stretch>
+              <a:fillRect/>
+            </a:stretch>
+          </p:blipFill>
+          <p:spPr>
+            <a:xfrm>
+              <a:off x="6269188" y="3898406"/>
+              <a:ext cx="3329836" cy="2514600"/>
+            </a:xfrm>
+            <a:prstGeom prst="rect">
+              <a:avLst/>
+            </a:prstGeom>
+            <a:ln>
+              <a:solidFill>
+                <a:schemeClr val="tx1"/>
+              </a:solidFill>
+            </a:ln>
+          </p:spPr>
+        </p:pic>
+        <p:pic>
+          <p:nvPicPr>
+            <p:cNvPr id="9" name="Picture 8"/>
+            <p:cNvPicPr>
+              <a:picLocks noChangeAspect="1"/>
+            </p:cNvPicPr>
+            <p:nvPr/>
+          </p:nvPicPr>
+          <p:blipFill>
+            <a:blip r:embed="rId4"/>
+            <a:stretch>
+              <a:fillRect/>
+            </a:stretch>
+          </p:blipFill>
+          <p:spPr>
+            <a:xfrm>
+              <a:off x="2502494" y="3898406"/>
+              <a:ext cx="3210605" cy="2514600"/>
+            </a:xfrm>
+            <a:prstGeom prst="rect">
+              <a:avLst/>
+            </a:prstGeom>
+            <a:ln>
+              <a:solidFill>
+                <a:schemeClr val="tx1"/>
+              </a:solidFill>
+            </a:ln>
+          </p:spPr>
+        </p:pic>
+        <p:pic>
+          <p:nvPicPr>
+            <p:cNvPr id="10" name="Picture 9"/>
+            <p:cNvPicPr>
+              <a:picLocks noChangeAspect="1"/>
+            </p:cNvPicPr>
+            <p:nvPr/>
+          </p:nvPicPr>
+          <p:blipFill>
+            <a:blip r:embed="rId5"/>
+            <a:stretch>
+              <a:fillRect/>
+            </a:stretch>
+          </p:blipFill>
+          <p:spPr>
+            <a:xfrm>
+              <a:off x="2323629" y="1260382"/>
+              <a:ext cx="3568337" cy="2514600"/>
+            </a:xfrm>
+            <a:prstGeom prst="rect">
+              <a:avLst/>
+            </a:prstGeom>
+            <a:ln>
+              <a:solidFill>
+                <a:schemeClr val="tx1"/>
+              </a:solidFill>
+            </a:ln>
+          </p:spPr>
+        </p:pic>
+      </p:grpSp>
+    </p:spTree>
+    <p:extLst>
+      <p:ext uri="{BB962C8B-B14F-4D97-AF65-F5344CB8AC3E}">
+        <p14:creationId xmlns:p14="http://schemas.microsoft.com/office/powerpoint/2010/main" val="4254621891"/>
+      </p:ext>
+    </p:extLst>
+  </p:cSld>
+  <p:clrMapOvr>
+    <a:masterClrMapping/>
+  </p:clrMapOvr>
+</p:sld>
+</file>
+
+<file path=ppt/slides/slide7.xml><?xml version="1.0" encoding="utf-8"?>
 <p:sld xmlns:a="http://schemas.openxmlformats.org/drawingml/2006/main" xmlns:r="http://schemas.openxmlformats.org/officeDocument/2006/relationships" xmlns:p="http://schemas.openxmlformats.org/presentationml/2006/main">
   <p:cSld>
     <p:spTree>
@@ -12967,7 +14285,7 @@
 </p:sld>
 </file>
 
-<file path=ppt/slides/slide7.xml><?xml version="1.0" encoding="utf-8"?>
+<file path=ppt/slides/slide8.xml><?xml version="1.0" encoding="utf-8"?>
 <p:sld xmlns:a="http://schemas.openxmlformats.org/drawingml/2006/main" xmlns:r="http://schemas.openxmlformats.org/officeDocument/2006/relationships" xmlns:p="http://schemas.openxmlformats.org/presentationml/2006/main">
   <p:cSld>
     <p:spTree>
@@ -14261,7 +15579,7 @@
 </p:sld>
 </file>
 
-<file path=ppt/slides/slide8.xml><?xml version="1.0" encoding="utf-8"?>
+<file path=ppt/slides/slide9.xml><?xml version="1.0" encoding="utf-8"?>
 <p:sld xmlns:a="http://schemas.openxmlformats.org/drawingml/2006/main" xmlns:r="http://schemas.openxmlformats.org/officeDocument/2006/relationships" xmlns:p="http://schemas.openxmlformats.org/presentationml/2006/main">
   <p:cSld>
     <p:spTree>
@@ -15108,257 +16426,6 @@
 </p:sld>
 </file>
 
-<file path=ppt/slides/slide9.xml><?xml version="1.0" encoding="utf-8"?>
-<p:sld xmlns:a="http://schemas.openxmlformats.org/drawingml/2006/main" xmlns:r="http://schemas.openxmlformats.org/officeDocument/2006/relationships" xmlns:p="http://schemas.openxmlformats.org/presentationml/2006/main">
-  <p:cSld>
-    <p:spTree>
-      <p:nvGrpSpPr>
-        <p:cNvPr id="1" name=""/>
-        <p:cNvGrpSpPr/>
-        <p:nvPr/>
-      </p:nvGrpSpPr>
-      <p:grpSpPr>
-        <a:xfrm>
-          <a:off x="0" y="0"/>
-          <a:ext cx="0" cy="0"/>
-          <a:chOff x="0" y="0"/>
-          <a:chExt cx="0" cy="0"/>
-        </a:xfrm>
-      </p:grpSpPr>
-      <p:sp>
-        <p:nvSpPr>
-          <p:cNvPr id="2" name="Title 1"/>
-          <p:cNvSpPr>
-            <a:spLocks noGrp="1"/>
-          </p:cNvSpPr>
-          <p:nvPr>
-            <p:ph type="title"/>
-          </p:nvPr>
-        </p:nvSpPr>
-        <p:spPr/>
-        <p:txBody>
-          <a:bodyPr/>
-          <a:lstStyle/>
-          <a:p>
-            <a:r>
-              <a:rPr lang="en-US" dirty="0" smtClean="0"/>
-              <a:t>LM: Equivalent Terminology</a:t>
-            </a:r>
-            <a:endParaRPr lang="en-US" dirty="0"/>
-          </a:p>
-        </p:txBody>
-      </p:sp>
-      <mc:AlternateContent xmlns:mc="http://schemas.openxmlformats.org/markup-compatibility/2006" xmlns:a14="http://schemas.microsoft.com/office/drawing/2010/main">
-        <mc:Choice Requires="a14">
-          <p:sp>
-            <p:nvSpPr>
-              <p:cNvPr id="4" name="Text Placeholder 3"/>
-              <p:cNvSpPr>
-                <a:spLocks noGrp="1"/>
-              </p:cNvSpPr>
-              <p:nvPr>
-                <p:ph type="body" idx="1"/>
-              </p:nvPr>
-            </p:nvSpPr>
-            <p:spPr/>
-            <p:txBody>
-              <a:bodyPr/>
-              <a:lstStyle/>
-              <a:p>
-                <a:r>
-                  <a:rPr lang="en-US" dirty="0" smtClean="0"/>
-                  <a:t>Response Variable, </a:t>
-                </a:r>
-                <a14:m>
-                  <m:oMath xmlns:m="http://schemas.openxmlformats.org/officeDocument/2006/math">
-                    <m:r>
-                      <a:rPr lang="en-US" b="1" i="1" smtClean="0">
-                        <a:latin typeface="Cambria Math" panose="02040503050406030204" pitchFamily="18" charset="0"/>
-                      </a:rPr>
-                      <m:t>𝒀</m:t>
-                    </m:r>
-                  </m:oMath>
-                </a14:m>
-                <a:endParaRPr lang="en-US" dirty="0"/>
-              </a:p>
-            </p:txBody>
-          </p:sp>
-        </mc:Choice>
-        <mc:Fallback xmlns="">
-          <p:sp>
-            <p:nvSpPr>
-              <p:cNvPr id="4" name="Text Placeholder 3"/>
-              <p:cNvSpPr>
-                <a:spLocks noGrp="1" noRot="1" noChangeAspect="1" noMove="1" noResize="1" noEditPoints="1" noAdjustHandles="1" noChangeArrowheads="1" noChangeShapeType="1" noTextEdit="1"/>
-              </p:cNvSpPr>
-              <p:nvPr>
-                <p:ph type="body" idx="1"/>
-              </p:nvPr>
-            </p:nvSpPr>
-            <p:spPr>
-              <a:blipFill>
-                <a:blip r:embed="rId2"/>
-                <a:stretch>
-                  <a:fillRect l="-1891" b="-17037"/>
-                </a:stretch>
-              </a:blipFill>
-            </p:spPr>
-            <p:txBody>
-              <a:bodyPr/>
-              <a:lstStyle/>
-              <a:p>
-                <a:r>
-                  <a:rPr lang="en-US">
-                    <a:noFill/>
-                  </a:rPr>
-                  <a:t> </a:t>
-                </a:r>
-              </a:p>
-            </p:txBody>
-          </p:sp>
-        </mc:Fallback>
-      </mc:AlternateContent>
-      <p:sp>
-        <p:nvSpPr>
-          <p:cNvPr id="5" name="Content Placeholder 4"/>
-          <p:cNvSpPr>
-            <a:spLocks noGrp="1"/>
-          </p:cNvSpPr>
-          <p:nvPr>
-            <p:ph sz="half" idx="2"/>
-          </p:nvPr>
-        </p:nvSpPr>
-        <p:spPr/>
-        <p:txBody>
-          <a:bodyPr/>
-          <a:lstStyle/>
-          <a:p>
-            <a:r>
-              <a:rPr lang="en-US" dirty="0" smtClean="0"/>
-              <a:t>Dependent variable			</a:t>
-            </a:r>
-            <a:endParaRPr lang="en-US" dirty="0"/>
-          </a:p>
-        </p:txBody>
-      </p:sp>
-      <mc:AlternateContent xmlns:mc="http://schemas.openxmlformats.org/markup-compatibility/2006" xmlns:a14="http://schemas.microsoft.com/office/drawing/2010/main">
-        <mc:Choice Requires="a14">
-          <p:sp>
-            <p:nvSpPr>
-              <p:cNvPr id="6" name="Text Placeholder 5"/>
-              <p:cNvSpPr>
-                <a:spLocks noGrp="1"/>
-              </p:cNvSpPr>
-              <p:nvPr>
-                <p:ph type="body" sz="quarter" idx="3"/>
-              </p:nvPr>
-            </p:nvSpPr>
-            <p:spPr/>
-            <p:txBody>
-              <a:bodyPr/>
-              <a:lstStyle/>
-              <a:p>
-                <a:r>
-                  <a:rPr lang="en-US" dirty="0" smtClean="0"/>
-                  <a:t>Predictor Variable, </a:t>
-                </a:r>
-                <a14:m>
-                  <m:oMath xmlns:m="http://schemas.openxmlformats.org/officeDocument/2006/math">
-                    <m:r>
-                      <a:rPr lang="en-US" b="1" i="1" smtClean="0">
-                        <a:latin typeface="Cambria Math" panose="02040503050406030204" pitchFamily="18" charset="0"/>
-                      </a:rPr>
-                      <m:t>𝒙</m:t>
-                    </m:r>
-                  </m:oMath>
-                </a14:m>
-                <a:endParaRPr lang="en-US" dirty="0"/>
-              </a:p>
-            </p:txBody>
-          </p:sp>
-        </mc:Choice>
-        <mc:Fallback xmlns="">
-          <p:sp>
-            <p:nvSpPr>
-              <p:cNvPr id="6" name="Text Placeholder 5"/>
-              <p:cNvSpPr>
-                <a:spLocks noGrp="1" noRot="1" noChangeAspect="1" noMove="1" noResize="1" noEditPoints="1" noAdjustHandles="1" noChangeArrowheads="1" noChangeShapeType="1" noTextEdit="1"/>
-              </p:cNvSpPr>
-              <p:nvPr>
-                <p:ph type="body" sz="quarter" idx="3"/>
-              </p:nvPr>
-            </p:nvSpPr>
-            <p:spPr>
-              <a:blipFill>
-                <a:blip r:embed="rId3"/>
-                <a:stretch>
-                  <a:fillRect l="-1882" b="-17037"/>
-                </a:stretch>
-              </a:blipFill>
-            </p:spPr>
-            <p:txBody>
-              <a:bodyPr/>
-              <a:lstStyle/>
-              <a:p>
-                <a:r>
-                  <a:rPr lang="en-US">
-                    <a:noFill/>
-                  </a:rPr>
-                  <a:t> </a:t>
-                </a:r>
-              </a:p>
-            </p:txBody>
-          </p:sp>
-        </mc:Fallback>
-      </mc:AlternateContent>
-      <p:sp>
-        <p:nvSpPr>
-          <p:cNvPr id="7" name="Content Placeholder 6"/>
-          <p:cNvSpPr>
-            <a:spLocks noGrp="1"/>
-          </p:cNvSpPr>
-          <p:nvPr>
-            <p:ph sz="quarter" idx="4"/>
-          </p:nvPr>
-        </p:nvSpPr>
-        <p:spPr/>
-        <p:txBody>
-          <a:bodyPr/>
-          <a:lstStyle/>
-          <a:p>
-            <a:r>
-              <a:rPr lang="en-US" dirty="0" smtClean="0"/>
-              <a:t>Independent variable</a:t>
-            </a:r>
-          </a:p>
-          <a:p>
-            <a:r>
-              <a:rPr lang="en-US" dirty="0" smtClean="0"/>
-              <a:t>Driver</a:t>
-            </a:r>
-          </a:p>
-          <a:p>
-            <a:r>
-              <a:rPr lang="en-US" dirty="0" smtClean="0"/>
-              <a:t>Covariate</a:t>
-            </a:r>
-            <a:endParaRPr lang="en-US" dirty="0"/>
-          </a:p>
-        </p:txBody>
-      </p:sp>
-    </p:spTree>
-    <p:extLst>
-      <p:ext uri="{BB962C8B-B14F-4D97-AF65-F5344CB8AC3E}">
-        <p14:creationId xmlns:p14="http://schemas.microsoft.com/office/powerpoint/2010/main" val="807197629"/>
-      </p:ext>
-    </p:extLst>
-  </p:cSld>
-  <p:clrMapOvr>
-    <a:masterClrMapping/>
-  </p:clrMapOvr>
-</p:sld>
-</file>
-
 <file path=ppt/theme/theme1.xml><?xml version="1.0" encoding="utf-8"?>
 <a:theme xmlns:a="http://schemas.openxmlformats.org/drawingml/2006/main" name="Office Theme">
   <a:themeElements>

</xml_diff>

<commit_message>
Added example logistic regression code from mgcv helpfile, crawley_cap16.pdf, and revised .pptx with a note about crawley_cap16.pdf.
</commit_message>
<xml_diff>
--- a/Notes/RegressionModelOverview.pptx
+++ b/Notes/RegressionModelOverview.pptx
@@ -573,6 +573,98 @@
     <p:extLst>
       <p:ext uri="{BB962C8B-B14F-4D97-AF65-F5344CB8AC3E}">
         <p14:creationId xmlns:p14="http://schemas.microsoft.com/office/powerpoint/2010/main" val="1865155953"/>
+      </p:ext>
+    </p:extLst>
+  </p:cSld>
+  <p:clrMapOvr>
+    <a:masterClrMapping/>
+  </p:clrMapOvr>
+</p:notes>
+</file>
+
+<file path=ppt/notesSlides/notesSlide2.xml><?xml version="1.0" encoding="utf-8"?>
+<p:notes xmlns:a="http://schemas.openxmlformats.org/drawingml/2006/main" xmlns:r="http://schemas.openxmlformats.org/officeDocument/2006/relationships" xmlns:p="http://schemas.openxmlformats.org/presentationml/2006/main">
+  <p:cSld>
+    <p:spTree>
+      <p:nvGrpSpPr>
+        <p:cNvPr id="1" name=""/>
+        <p:cNvGrpSpPr/>
+        <p:nvPr/>
+      </p:nvGrpSpPr>
+      <p:grpSpPr>
+        <a:xfrm>
+          <a:off x="0" y="0"/>
+          <a:ext cx="0" cy="0"/>
+          <a:chOff x="0" y="0"/>
+          <a:chExt cx="0" cy="0"/>
+        </a:xfrm>
+      </p:grpSpPr>
+      <p:sp>
+        <p:nvSpPr>
+          <p:cNvPr id="2" name="Slide Image Placeholder 1"/>
+          <p:cNvSpPr>
+            <a:spLocks noGrp="1" noRot="1" noChangeAspect="1"/>
+          </p:cNvSpPr>
+          <p:nvPr>
+            <p:ph type="sldImg"/>
+          </p:nvPr>
+        </p:nvSpPr>
+        <p:spPr/>
+      </p:sp>
+      <p:sp>
+        <p:nvSpPr>
+          <p:cNvPr id="3" name="Notes Placeholder 2"/>
+          <p:cNvSpPr>
+            <a:spLocks noGrp="1"/>
+          </p:cNvSpPr>
+          <p:nvPr>
+            <p:ph type="body" idx="1"/>
+          </p:nvPr>
+        </p:nvSpPr>
+        <p:spPr/>
+        <p:txBody>
+          <a:bodyPr/>
+          <a:lstStyle/>
+          <a:p>
+            <a:r>
+              <a:rPr lang="en-US" dirty="0" smtClean="0"/>
+              <a:t>See crawley_cap16.pdf</a:t>
+            </a:r>
+            <a:r>
+              <a:rPr lang="en-US" baseline="0" dirty="0" smtClean="0"/>
+              <a:t> p. 3 for derivation of the logit and its relationship to parameter p of the binomial distribution.</a:t>
+            </a:r>
+            <a:endParaRPr lang="en-US" dirty="0"/>
+          </a:p>
+        </p:txBody>
+      </p:sp>
+      <p:sp>
+        <p:nvSpPr>
+          <p:cNvPr id="4" name="Slide Number Placeholder 3"/>
+          <p:cNvSpPr>
+            <a:spLocks noGrp="1"/>
+          </p:cNvSpPr>
+          <p:nvPr>
+            <p:ph type="sldNum" sz="quarter" idx="10"/>
+          </p:nvPr>
+        </p:nvSpPr>
+        <p:spPr/>
+        <p:txBody>
+          <a:bodyPr/>
+          <a:lstStyle/>
+          <a:p>
+            <a:fld id="{B8FD52FC-6FC7-4467-86D7-6099F586D432}" type="slidenum">
+              <a:rPr lang="en-US" smtClean="0"/>
+              <a:t>19</a:t>
+            </a:fld>
+            <a:endParaRPr lang="en-US"/>
+          </a:p>
+        </p:txBody>
+      </p:sp>
+    </p:spTree>
+    <p:extLst>
+      <p:ext uri="{BB962C8B-B14F-4D97-AF65-F5344CB8AC3E}">
+        <p14:creationId xmlns:p14="http://schemas.microsoft.com/office/powerpoint/2010/main" val="3381430414"/>
       </p:ext>
     </p:extLst>
   </p:cSld>
@@ -7970,8 +8062,8 @@
           </a:p>
         </p:txBody>
       </p:sp>
-      <mc:AlternateContent xmlns:mc="http://schemas.openxmlformats.org/markup-compatibility/2006">
-        <mc:Choice xmlns:a14="http://schemas.microsoft.com/office/drawing/2010/main" Requires="a14">
+      <mc:AlternateContent xmlns:mc="http://schemas.openxmlformats.org/markup-compatibility/2006" xmlns:a14="http://schemas.microsoft.com/office/drawing/2010/main">
+        <mc:Choice Requires="a14">
           <p:sp>
             <p:nvSpPr>
               <p:cNvPr id="3" name="Content Placeholder 2"/>
@@ -8034,11 +8126,7 @@
                 </a:r>
                 <a:r>
                   <a:rPr lang="en-US" sz="2400" dirty="0" smtClean="0"/>
-                  <a:t>the linear </a:t>
-                </a:r>
-                <a:r>
-                  <a:rPr lang="en-US" sz="2400" dirty="0" smtClean="0"/>
-                  <a:t>predictor</a:t>
+                  <a:t>the linear predictor</a:t>
                 </a:r>
               </a:p>
               <a:p>
@@ -8737,7 +8825,7 @@
             </p:txBody>
           </p:sp>
         </mc:Choice>
-        <mc:Fallback>
+        <mc:Fallback xmlns="">
           <p:sp>
             <p:nvSpPr>
               <p:cNvPr id="3" name="Content Placeholder 2"/>
@@ -8874,7 +8962,7 @@
           <p:nvPr/>
         </p:nvPicPr>
         <p:blipFill>
-          <a:blip r:embed="rId2"/>
+          <a:blip r:embed="rId3"/>
           <a:stretch>
             <a:fillRect/>
           </a:stretch>
@@ -9243,8 +9331,8 @@
           </a:p>
         </p:txBody>
       </p:sp>
-      <mc:AlternateContent xmlns:mc="http://schemas.openxmlformats.org/markup-compatibility/2006">
-        <mc:Choice xmlns:a14="http://schemas.microsoft.com/office/drawing/2010/main" Requires="a14">
+      <mc:AlternateContent xmlns:mc="http://schemas.openxmlformats.org/markup-compatibility/2006" xmlns:a14="http://schemas.microsoft.com/office/drawing/2010/main">
+        <mc:Choice Requires="a14">
           <p:sp>
             <p:nvSpPr>
               <p:cNvPr id="3" name="Content Placeholder 2"/>
@@ -9822,12 +9910,11 @@
                   <a:rPr lang="en-US" dirty="0"/>
                   <a:t> some exponential family distribution</a:t>
                 </a:r>
-                <a:endParaRPr lang="en-US" dirty="0"/>
               </a:p>
             </p:txBody>
           </p:sp>
         </mc:Choice>
-        <mc:Fallback>
+        <mc:Fallback xmlns="">
           <p:sp>
             <p:nvSpPr>
               <p:cNvPr id="3" name="Content Placeholder 2"/>
@@ -12424,8 +12511,8 @@
           </a:p>
         </p:txBody>
       </p:sp>
-      <mc:AlternateContent xmlns:mc="http://schemas.openxmlformats.org/markup-compatibility/2006">
-        <mc:Choice xmlns:a14="http://schemas.microsoft.com/office/drawing/2010/main" Requires="a14">
+      <mc:AlternateContent xmlns:mc="http://schemas.openxmlformats.org/markup-compatibility/2006" xmlns:a14="http://schemas.microsoft.com/office/drawing/2010/main">
+        <mc:Choice Requires="a14">
           <p:sp>
             <p:nvSpPr>
               <p:cNvPr id="7" name="Content Placeholder 6"/>
@@ -12591,7 +12678,7 @@
             </p:txBody>
           </p:sp>
         </mc:Choice>
-        <mc:Fallback>
+        <mc:Fallback xmlns="">
           <p:sp>
             <p:nvSpPr>
               <p:cNvPr id="7" name="Content Placeholder 6"/>
@@ -12659,8 +12746,8 @@
           </a:prstGeom>
         </p:spPr>
       </p:pic>
-      <mc:AlternateContent xmlns:mc="http://schemas.openxmlformats.org/markup-compatibility/2006">
-        <mc:Choice xmlns:a14="http://schemas.microsoft.com/office/drawing/2010/main" Requires="a14">
+      <mc:AlternateContent xmlns:mc="http://schemas.openxmlformats.org/markup-compatibility/2006" xmlns:a14="http://schemas.microsoft.com/office/drawing/2010/main">
+        <mc:Choice Requires="a14">
           <p:sp>
             <p:nvSpPr>
               <p:cNvPr id="5" name="TextBox 4"/>
@@ -12720,7 +12807,7 @@
             </p:txBody>
           </p:sp>
         </mc:Choice>
-        <mc:Fallback>
+        <mc:Fallback xmlns="">
           <p:sp>
             <p:nvSpPr>
               <p:cNvPr id="5" name="TextBox 4"/>
@@ -12759,8 +12846,8 @@
           </p:sp>
         </mc:Fallback>
       </mc:AlternateContent>
-      <mc:AlternateContent xmlns:mc="http://schemas.openxmlformats.org/markup-compatibility/2006">
-        <mc:Choice xmlns:a14="http://schemas.microsoft.com/office/drawing/2010/main" Requires="a14">
+      <mc:AlternateContent xmlns:mc="http://schemas.openxmlformats.org/markup-compatibility/2006" xmlns:a14="http://schemas.microsoft.com/office/drawing/2010/main">
+        <mc:Choice Requires="a14">
           <p:sp>
             <p:nvSpPr>
               <p:cNvPr id="9" name="TextBox 8"/>
@@ -12820,7 +12907,7 @@
             </p:txBody>
           </p:sp>
         </mc:Choice>
-        <mc:Fallback>
+        <mc:Fallback xmlns="">
           <p:sp>
             <p:nvSpPr>
               <p:cNvPr id="9" name="TextBox 8"/>

</xml_diff>

<commit_message>
Finally figured out how to change legend labels.
</commit_message>
<xml_diff>
--- a/Notes/RegressionModelOverview.pptx
+++ b/Notes/RegressionModelOverview.pptx
@@ -10073,7 +10073,7 @@
         </p:nvSpPr>
         <p:spPr/>
         <p:txBody>
-          <a:bodyPr/>
+          <a:bodyPr anchor="t"/>
           <a:lstStyle/>
           <a:p>
             <a:r>
@@ -10214,11 +10214,6 @@
                   </a:rPr>
                   <a:t>-</a:t>
                 </a:r>
-                <a:endParaRPr lang="en-US" dirty="0">
-                  <a:solidFill>
-                    <a:schemeClr val="tx1"/>
-                  </a:solidFill>
-                </a:endParaRPr>
               </a:p>
             </p:txBody>
           </p:sp>
@@ -10339,11 +10334,6 @@
                   </a:rPr>
                   <a:t>-</a:t>
                 </a:r>
-                <a:endParaRPr lang="en-US" dirty="0">
-                  <a:solidFill>
-                    <a:schemeClr val="tx1"/>
-                  </a:solidFill>
-                </a:endParaRPr>
               </a:p>
             </p:txBody>
           </p:sp>
@@ -10397,11 +10387,6 @@
                   </a:rPr>
                   <a:t>-</a:t>
                 </a:r>
-                <a:endParaRPr lang="en-US" dirty="0">
-                  <a:solidFill>
-                    <a:schemeClr val="tx1"/>
-                  </a:solidFill>
-                </a:endParaRPr>
               </a:p>
             </p:txBody>
           </p:sp>
@@ -10455,11 +10440,6 @@
                   </a:rPr>
                   <a:t>-</a:t>
                 </a:r>
-                <a:endParaRPr lang="en-US" dirty="0">
-                  <a:solidFill>
-                    <a:schemeClr val="tx1"/>
-                  </a:solidFill>
-                </a:endParaRPr>
               </a:p>
             </p:txBody>
           </p:sp>
@@ -10877,11 +10857,6 @@
                   </a:rPr>
                   <a:t>-</a:t>
                 </a:r>
-                <a:endParaRPr lang="en-US" dirty="0">
-                  <a:solidFill>
-                    <a:schemeClr val="tx1"/>
-                  </a:solidFill>
-                </a:endParaRPr>
               </a:p>
             </p:txBody>
           </p:sp>
@@ -11378,11 +11353,6 @@
               </a:rPr>
               <a:t>-</a:t>
             </a:r>
-            <a:endParaRPr lang="en-US" dirty="0">
-              <a:solidFill>
-                <a:schemeClr val="tx1"/>
-              </a:solidFill>
-            </a:endParaRPr>
           </a:p>
         </p:txBody>
       </p:sp>
@@ -17073,8 +17043,8 @@
           </a:p>
         </p:txBody>
       </p:sp>
-      <mc:AlternateContent xmlns:mc="http://schemas.openxmlformats.org/markup-compatibility/2006">
-        <mc:Choice xmlns:a14="http://schemas.microsoft.com/office/drawing/2010/main" Requires="a14">
+      <mc:AlternateContent xmlns:mc="http://schemas.openxmlformats.org/markup-compatibility/2006" xmlns:a14="http://schemas.microsoft.com/office/drawing/2010/main">
+        <mc:Choice Requires="a14">
           <p:sp>
             <p:nvSpPr>
               <p:cNvPr id="3" name="TextBox 2"/>
@@ -17176,7 +17146,7 @@
             </p:txBody>
           </p:sp>
         </mc:Choice>
-        <mc:Fallback>
+        <mc:Fallback xmlns="">
           <p:sp>
             <p:nvSpPr>
               <p:cNvPr id="3" name="TextBox 2"/>
@@ -17279,11 +17249,6 @@
                 </a:rPr>
                 <a:t>-</a:t>
               </a:r>
-              <a:endParaRPr lang="en-US" dirty="0">
-                <a:solidFill>
-                  <a:schemeClr val="tx1"/>
-                </a:solidFill>
-              </a:endParaRPr>
             </a:p>
           </p:txBody>
         </p:sp>
@@ -17400,8 +17365,8 @@
           </p:txBody>
         </p:sp>
       </p:grpSp>
-      <mc:AlternateContent xmlns:mc="http://schemas.openxmlformats.org/markup-compatibility/2006">
-        <mc:Choice xmlns:a14="http://schemas.microsoft.com/office/drawing/2010/main" Requires="a14">
+      <mc:AlternateContent xmlns:mc="http://schemas.openxmlformats.org/markup-compatibility/2006" xmlns:a14="http://schemas.microsoft.com/office/drawing/2010/main">
+        <mc:Choice Requires="a14">
           <p:sp>
             <p:nvSpPr>
               <p:cNvPr id="9" name="TextBox 8"/>
@@ -17455,7 +17420,7 @@
             </p:txBody>
           </p:sp>
         </mc:Choice>
-        <mc:Fallback>
+        <mc:Fallback xmlns="">
           <p:sp>
             <p:nvSpPr>
               <p:cNvPr id="9" name="TextBox 8"/>
@@ -17536,8 +17501,8 @@
           </a:p>
         </p:txBody>
       </p:sp>
-      <mc:AlternateContent xmlns:mc="http://schemas.openxmlformats.org/markup-compatibility/2006">
-        <mc:Choice xmlns:a14="http://schemas.microsoft.com/office/drawing/2010/main" Requires="a14">
+      <mc:AlternateContent xmlns:mc="http://schemas.openxmlformats.org/markup-compatibility/2006" xmlns:a14="http://schemas.microsoft.com/office/drawing/2010/main">
+        <mc:Choice Requires="a14">
           <p:sp>
             <p:nvSpPr>
               <p:cNvPr id="11" name="TextBox 10"/>
@@ -17656,7 +17621,7 @@
             </p:txBody>
           </p:sp>
         </mc:Choice>
-        <mc:Fallback>
+        <mc:Fallback xmlns="">
           <p:sp>
             <p:nvSpPr>
               <p:cNvPr id="11" name="TextBox 10"/>
@@ -17695,8 +17660,8 @@
           </p:sp>
         </mc:Fallback>
       </mc:AlternateContent>
-      <mc:AlternateContent xmlns:mc="http://schemas.openxmlformats.org/markup-compatibility/2006">
-        <mc:Choice xmlns:a14="http://schemas.microsoft.com/office/drawing/2010/main" Requires="a14">
+      <mc:AlternateContent xmlns:mc="http://schemas.openxmlformats.org/markup-compatibility/2006" xmlns:a14="http://schemas.microsoft.com/office/drawing/2010/main">
+        <mc:Choice Requires="a14">
           <p:sp>
             <p:nvSpPr>
               <p:cNvPr id="12" name="TextBox 11"/>
@@ -17767,7 +17732,7 @@
             </p:txBody>
           </p:sp>
         </mc:Choice>
-        <mc:Fallback>
+        <mc:Fallback xmlns="">
           <p:sp>
             <p:nvSpPr>
               <p:cNvPr id="12" name="TextBox 11"/>
@@ -17806,8 +17771,8 @@
           </p:sp>
         </mc:Fallback>
       </mc:AlternateContent>
-      <mc:AlternateContent xmlns:mc="http://schemas.openxmlformats.org/markup-compatibility/2006">
-        <mc:Choice xmlns:a14="http://schemas.microsoft.com/office/drawing/2010/main" Requires="a14">
+      <mc:AlternateContent xmlns:mc="http://schemas.openxmlformats.org/markup-compatibility/2006" xmlns:a14="http://schemas.microsoft.com/office/drawing/2010/main">
+        <mc:Choice Requires="a14">
           <p:sp>
             <p:nvSpPr>
               <p:cNvPr id="13" name="Rectangle 12"/>
@@ -17859,12 +17824,11 @@
                   <a:rPr lang="en-US" dirty="0"/>
                   <a:t>. </a:t>
                 </a:r>
-                <a:endParaRPr lang="en-US" dirty="0"/>
               </a:p>
             </p:txBody>
           </p:sp>
         </mc:Choice>
-        <mc:Fallback>
+        <mc:Fallback xmlns="">
           <p:sp>
             <p:nvSpPr>
               <p:cNvPr id="13" name="Rectangle 12"/>
@@ -17912,7 +17876,7 @@
         <p:spPr>
           <a:xfrm>
             <a:off x="766482" y="5515234"/>
-            <a:ext cx="3303597" cy="369332"/>
+            <a:ext cx="3144900" cy="369332"/>
           </a:xfrm>
           <a:prstGeom prst="rect">
             <a:avLst/>
@@ -17938,7 +17902,11 @@
             </a:r>
             <a:r>
               <a:rPr lang="en-US" dirty="0" smtClean="0"/>
-              <a:t> problem…. </a:t>
+              <a:t> </a:t>
+            </a:r>
+            <a:r>
+              <a:rPr lang="en-US" dirty="0" smtClean="0"/>
+              <a:t>problem. </a:t>
             </a:r>
             <a:endParaRPr lang="en-US" dirty="0"/>
           </a:p>
@@ -18194,7 +18162,7 @@
         </p:nvSpPr>
         <p:spPr/>
         <p:txBody>
-          <a:bodyPr/>
+          <a:bodyPr anchor="t"/>
           <a:lstStyle/>
           <a:p>
             <a:r>
@@ -18205,6 +18173,36 @@
           </a:p>
         </p:txBody>
       </p:sp>
+      <p:pic>
+        <p:nvPicPr>
+          <p:cNvPr id="5" name="Picture 4"/>
+          <p:cNvPicPr>
+            <a:picLocks noChangeAspect="1"/>
+          </p:cNvPicPr>
+          <p:nvPr/>
+        </p:nvPicPr>
+        <p:blipFill>
+          <a:blip r:embed="rId2" cstate="print">
+            <a:extLst>
+              <a:ext uri="{28A0092B-C50C-407E-A947-70E740481C1C}">
+                <a14:useLocalDpi xmlns:a14="http://schemas.microsoft.com/office/drawing/2010/main" val="0"/>
+              </a:ext>
+            </a:extLst>
+          </a:blip>
+          <a:stretch>
+            <a:fillRect/>
+          </a:stretch>
+        </p:blipFill>
+        <p:spPr>
+          <a:xfrm>
+            <a:off x="5333986" y="914388"/>
+            <a:ext cx="6858014" cy="5943612"/>
+          </a:xfrm>
+          <a:prstGeom prst="rect">
+            <a:avLst/>
+          </a:prstGeom>
+        </p:spPr>
+      </p:pic>
     </p:spTree>
     <p:extLst>
       <p:ext uri="{BB962C8B-B14F-4D97-AF65-F5344CB8AC3E}">
@@ -18285,11 +18283,7 @@
             </a:r>
             <a:r>
               <a:rPr lang="en-US" dirty="0" smtClean="0"/>
-              <a:t> </a:t>
-            </a:r>
-            <a:r>
-              <a:rPr lang="en-US" dirty="0" smtClean="0"/>
-              <a:t>December 2021</a:t>
+              <a:t> December 2021</a:t>
             </a:r>
             <a:endParaRPr lang="en-US" dirty="0"/>
           </a:p>
@@ -18697,6 +18691,36 @@
           <a:chExt cx="0" cy="0"/>
         </a:xfrm>
       </p:grpSpPr>
+      <p:pic>
+        <p:nvPicPr>
+          <p:cNvPr id="6" name="Picture 5"/>
+          <p:cNvPicPr>
+            <a:picLocks noChangeAspect="1"/>
+          </p:cNvPicPr>
+          <p:nvPr/>
+        </p:nvPicPr>
+        <p:blipFill>
+          <a:blip r:embed="rId2" cstate="print">
+            <a:extLst>
+              <a:ext uri="{28A0092B-C50C-407E-A947-70E740481C1C}">
+                <a14:useLocalDpi xmlns:a14="http://schemas.microsoft.com/office/drawing/2010/main" val="0"/>
+              </a:ext>
+            </a:extLst>
+          </a:blip>
+          <a:stretch>
+            <a:fillRect/>
+          </a:stretch>
+        </p:blipFill>
+        <p:spPr>
+          <a:xfrm>
+            <a:off x="5195040" y="457194"/>
+            <a:ext cx="6858014" cy="5943612"/>
+          </a:xfrm>
+          <a:prstGeom prst="rect">
+            <a:avLst/>
+          </a:prstGeom>
+        </p:spPr>
+      </p:pic>
       <p:sp>
         <p:nvSpPr>
           <p:cNvPr id="2" name="Title 1"/>
@@ -18904,239 +18928,9 @@
                 <a:ext cx="5181600" cy="4906875"/>
               </a:xfrm>
               <a:blipFill>
-                <a:blip r:embed="rId2"/>
+                <a:blip r:embed="rId3"/>
                 <a:stretch>
                   <a:fillRect l="-2118" t="-2857" r="-3765"/>
-                </a:stretch>
-              </a:blipFill>
-            </p:spPr>
-            <p:txBody>
-              <a:bodyPr/>
-              <a:lstStyle/>
-              <a:p>
-                <a:r>
-                  <a:rPr lang="en-US">
-                    <a:noFill/>
-                  </a:rPr>
-                  <a:t> </a:t>
-                </a:r>
-              </a:p>
-            </p:txBody>
-          </p:sp>
-        </mc:Fallback>
-      </mc:AlternateContent>
-      <p:pic>
-        <p:nvPicPr>
-          <p:cNvPr id="4" name="Picture 3"/>
-          <p:cNvPicPr>
-            <a:picLocks noChangeAspect="1"/>
-          </p:cNvPicPr>
-          <p:nvPr/>
-        </p:nvPicPr>
-        <p:blipFill>
-          <a:blip r:embed="rId3" cstate="print">
-            <a:extLst>
-              <a:ext uri="{28A0092B-C50C-407E-A947-70E740481C1C}">
-                <a14:useLocalDpi xmlns:a14="http://schemas.microsoft.com/office/drawing/2010/main" val="0"/>
-              </a:ext>
-            </a:extLst>
-          </a:blip>
-          <a:stretch>
-            <a:fillRect/>
-          </a:stretch>
-        </p:blipFill>
-        <p:spPr>
-          <a:xfrm>
-            <a:off x="5320546" y="1459753"/>
-            <a:ext cx="5804654" cy="5030700"/>
-          </a:xfrm>
-          <a:prstGeom prst="rect">
-            <a:avLst/>
-          </a:prstGeom>
-        </p:spPr>
-      </p:pic>
-      <mc:AlternateContent xmlns:mc="http://schemas.openxmlformats.org/markup-compatibility/2006" xmlns:a14="http://schemas.microsoft.com/office/drawing/2010/main">
-        <mc:Choice Requires="a14">
-          <p:sp>
-            <p:nvSpPr>
-              <p:cNvPr id="5" name="TextBox 4"/>
-              <p:cNvSpPr txBox="1"/>
-              <p:nvPr/>
-            </p:nvSpPr>
-            <p:spPr>
-              <a:xfrm>
-                <a:off x="9070769" y="3489636"/>
-                <a:ext cx="732123" cy="646331"/>
-              </a:xfrm>
-              <a:prstGeom prst="rect">
-                <a:avLst/>
-              </a:prstGeom>
-              <a:noFill/>
-            </p:spPr>
-            <p:txBody>
-              <a:bodyPr wrap="none" rtlCol="0">
-                <a:spAutoFit/>
-              </a:bodyPr>
-              <a:lstStyle/>
-              <a:p>
-                <a14:m>
-                  <m:oMath xmlns:m="http://schemas.openxmlformats.org/officeDocument/2006/math">
-                    <m:r>
-                      <a:rPr lang="en-US" i="1" smtClean="0">
-                        <a:latin typeface="Cambria Math" panose="02040503050406030204" pitchFamily="18" charset="0"/>
-                        <a:ea typeface="Cambria Math" panose="02040503050406030204" pitchFamily="18" charset="0"/>
-                      </a:rPr>
-                      <m:t>𝜇</m:t>
-                    </m:r>
-                  </m:oMath>
-                </a14:m>
-                <a:r>
-                  <a:rPr lang="en-US" dirty="0" smtClean="0"/>
-                  <a:t>=3</a:t>
-                </a:r>
-              </a:p>
-              <a:p>
-                <a14:m>
-                  <m:oMath xmlns:m="http://schemas.openxmlformats.org/officeDocument/2006/math">
-                    <m:r>
-                      <a:rPr lang="en-US" i="1" dirty="0" smtClean="0">
-                        <a:latin typeface="Cambria Math" panose="02040503050406030204" pitchFamily="18" charset="0"/>
-                        <a:ea typeface="Cambria Math" panose="02040503050406030204" pitchFamily="18" charset="0"/>
-                      </a:rPr>
-                      <m:t>𝜎</m:t>
-                    </m:r>
-                  </m:oMath>
-                </a14:m>
-                <a:r>
-                  <a:rPr lang="en-US" dirty="0" smtClean="0"/>
-                  <a:t>=0.6</a:t>
-                </a:r>
-                <a:endParaRPr lang="en-US" dirty="0"/>
-              </a:p>
-            </p:txBody>
-          </p:sp>
-        </mc:Choice>
-        <mc:Fallback xmlns="">
-          <p:sp>
-            <p:nvSpPr>
-              <p:cNvPr id="5" name="TextBox 4"/>
-              <p:cNvSpPr txBox="1">
-                <a:spLocks noRot="1" noChangeAspect="1" noMove="1" noResize="1" noEditPoints="1" noAdjustHandles="1" noChangeArrowheads="1" noChangeShapeType="1" noTextEdit="1"/>
-              </p:cNvSpPr>
-              <p:nvPr/>
-            </p:nvSpPr>
-            <p:spPr>
-              <a:xfrm>
-                <a:off x="9070769" y="3489636"/>
-                <a:ext cx="732123" cy="646331"/>
-              </a:xfrm>
-              <a:prstGeom prst="rect">
-                <a:avLst/>
-              </a:prstGeom>
-              <a:blipFill>
-                <a:blip r:embed="rId4"/>
-                <a:stretch>
-                  <a:fillRect t="-4717" r="-6667" b="-14151"/>
-                </a:stretch>
-              </a:blipFill>
-            </p:spPr>
-            <p:txBody>
-              <a:bodyPr/>
-              <a:lstStyle/>
-              <a:p>
-                <a:r>
-                  <a:rPr lang="en-US">
-                    <a:noFill/>
-                  </a:rPr>
-                  <a:t> </a:t>
-                </a:r>
-              </a:p>
-            </p:txBody>
-          </p:sp>
-        </mc:Fallback>
-      </mc:AlternateContent>
-      <mc:AlternateContent xmlns:mc="http://schemas.openxmlformats.org/markup-compatibility/2006" xmlns:a14="http://schemas.microsoft.com/office/drawing/2010/main">
-        <mc:Choice Requires="a14">
-          <p:sp>
-            <p:nvSpPr>
-              <p:cNvPr id="9" name="TextBox 8"/>
-              <p:cNvSpPr txBox="1"/>
-              <p:nvPr/>
-            </p:nvSpPr>
-            <p:spPr>
-              <a:xfrm>
-                <a:off x="7562467" y="3847166"/>
-                <a:ext cx="732123" cy="646331"/>
-              </a:xfrm>
-              <a:prstGeom prst="rect">
-                <a:avLst/>
-              </a:prstGeom>
-              <a:noFill/>
-            </p:spPr>
-            <p:txBody>
-              <a:bodyPr wrap="none" rtlCol="0">
-                <a:spAutoFit/>
-              </a:bodyPr>
-              <a:lstStyle/>
-              <a:p>
-                <a14:m>
-                  <m:oMath xmlns:m="http://schemas.openxmlformats.org/officeDocument/2006/math">
-                    <m:r>
-                      <a:rPr lang="en-US" i="1" smtClean="0">
-                        <a:latin typeface="Cambria Math" panose="02040503050406030204" pitchFamily="18" charset="0"/>
-                        <a:ea typeface="Cambria Math" panose="02040503050406030204" pitchFamily="18" charset="0"/>
-                      </a:rPr>
-                      <m:t>𝜇</m:t>
-                    </m:r>
-                  </m:oMath>
-                </a14:m>
-                <a:r>
-                  <a:rPr lang="en-US" dirty="0" smtClean="0"/>
-                  <a:t>=0</a:t>
-                </a:r>
-              </a:p>
-              <a:p>
-                <a14:m>
-                  <m:oMath xmlns:m="http://schemas.openxmlformats.org/officeDocument/2006/math">
-                    <m:r>
-                      <a:rPr lang="en-US" i="1" dirty="0" smtClean="0">
-                        <a:latin typeface="Cambria Math" panose="02040503050406030204" pitchFamily="18" charset="0"/>
-                        <a:ea typeface="Cambria Math" panose="02040503050406030204" pitchFamily="18" charset="0"/>
-                      </a:rPr>
-                      <m:t>𝜎</m:t>
-                    </m:r>
-                  </m:oMath>
-                </a14:m>
-                <a:r>
-                  <a:rPr lang="en-US" dirty="0" smtClean="0"/>
-                  <a:t>=1.0</a:t>
-                </a:r>
-                <a:endParaRPr lang="en-US" dirty="0"/>
-              </a:p>
-            </p:txBody>
-          </p:sp>
-        </mc:Choice>
-        <mc:Fallback xmlns="">
-          <p:sp>
-            <p:nvSpPr>
-              <p:cNvPr id="9" name="TextBox 8"/>
-              <p:cNvSpPr txBox="1">
-                <a:spLocks noRot="1" noChangeAspect="1" noMove="1" noResize="1" noEditPoints="1" noAdjustHandles="1" noChangeArrowheads="1" noChangeShapeType="1" noTextEdit="1"/>
-              </p:cNvSpPr>
-              <p:nvPr/>
-            </p:nvSpPr>
-            <p:spPr>
-              <a:xfrm>
-                <a:off x="7562467" y="3847166"/>
-                <a:ext cx="732123" cy="646331"/>
-              </a:xfrm>
-              <a:prstGeom prst="rect">
-                <a:avLst/>
-              </a:prstGeom>
-              <a:blipFill>
-                <a:blip r:embed="rId5"/>
-                <a:stretch>
-                  <a:fillRect t="-4717" r="-6667" b="-14151"/>
                 </a:stretch>
               </a:blipFill>
             </p:spPr>

</xml_diff>

<commit_message>
Added logistic GAM example from mgcv.pdf to RegressionModelOverview.r script.
</commit_message>
<xml_diff>
--- a/Notes/RegressionModelOverview.pptx
+++ b/Notes/RegressionModelOverview.pptx
@@ -237,7 +237,7 @@
           <a:p>
             <a:fld id="{0082532B-AEE1-4521-BED8-FA67A45A1A20}" type="datetimeFigureOut">
               <a:rPr lang="en-US" smtClean="0"/>
-              <a:t>12/7/2021</a:t>
+              <a:t>12/8/2021</a:t>
             </a:fld>
             <a:endParaRPr lang="en-US"/>
           </a:p>
@@ -820,7 +820,7 @@
           <a:p>
             <a:fld id="{DBB772DE-1C71-4C15-94E7-A563D3B8A110}" type="datetimeFigureOut">
               <a:rPr lang="en-US" smtClean="0"/>
-              <a:t>12/7/2021</a:t>
+              <a:t>12/8/2021</a:t>
             </a:fld>
             <a:endParaRPr lang="en-US"/>
           </a:p>
@@ -990,7 +990,7 @@
           <a:p>
             <a:fld id="{DBB772DE-1C71-4C15-94E7-A563D3B8A110}" type="datetimeFigureOut">
               <a:rPr lang="en-US" smtClean="0"/>
-              <a:t>12/7/2021</a:t>
+              <a:t>12/8/2021</a:t>
             </a:fld>
             <a:endParaRPr lang="en-US"/>
           </a:p>
@@ -1170,7 +1170,7 @@
           <a:p>
             <a:fld id="{DBB772DE-1C71-4C15-94E7-A563D3B8A110}" type="datetimeFigureOut">
               <a:rPr lang="en-US" smtClean="0"/>
-              <a:t>12/7/2021</a:t>
+              <a:t>12/8/2021</a:t>
             </a:fld>
             <a:endParaRPr lang="en-US"/>
           </a:p>
@@ -1340,7 +1340,7 @@
           <a:p>
             <a:fld id="{DBB772DE-1C71-4C15-94E7-A563D3B8A110}" type="datetimeFigureOut">
               <a:rPr lang="en-US" smtClean="0"/>
-              <a:t>12/7/2021</a:t>
+              <a:t>12/8/2021</a:t>
             </a:fld>
             <a:endParaRPr lang="en-US"/>
           </a:p>
@@ -1586,7 +1586,7 @@
           <a:p>
             <a:fld id="{DBB772DE-1C71-4C15-94E7-A563D3B8A110}" type="datetimeFigureOut">
               <a:rPr lang="en-US" smtClean="0"/>
-              <a:t>12/7/2021</a:t>
+              <a:t>12/8/2021</a:t>
             </a:fld>
             <a:endParaRPr lang="en-US"/>
           </a:p>
@@ -1818,7 +1818,7 @@
           <a:p>
             <a:fld id="{DBB772DE-1C71-4C15-94E7-A563D3B8A110}" type="datetimeFigureOut">
               <a:rPr lang="en-US" smtClean="0"/>
-              <a:t>12/7/2021</a:t>
+              <a:t>12/8/2021</a:t>
             </a:fld>
             <a:endParaRPr lang="en-US"/>
           </a:p>
@@ -2185,7 +2185,7 @@
           <a:p>
             <a:fld id="{DBB772DE-1C71-4C15-94E7-A563D3B8A110}" type="datetimeFigureOut">
               <a:rPr lang="en-US" smtClean="0"/>
-              <a:t>12/7/2021</a:t>
+              <a:t>12/8/2021</a:t>
             </a:fld>
             <a:endParaRPr lang="en-US"/>
           </a:p>
@@ -2303,7 +2303,7 @@
           <a:p>
             <a:fld id="{DBB772DE-1C71-4C15-94E7-A563D3B8A110}" type="datetimeFigureOut">
               <a:rPr lang="en-US" smtClean="0"/>
-              <a:t>12/7/2021</a:t>
+              <a:t>12/8/2021</a:t>
             </a:fld>
             <a:endParaRPr lang="en-US"/>
           </a:p>
@@ -2398,7 +2398,7 @@
           <a:p>
             <a:fld id="{DBB772DE-1C71-4C15-94E7-A563D3B8A110}" type="datetimeFigureOut">
               <a:rPr lang="en-US" smtClean="0"/>
-              <a:t>12/7/2021</a:t>
+              <a:t>12/8/2021</a:t>
             </a:fld>
             <a:endParaRPr lang="en-US"/>
           </a:p>
@@ -2675,7 +2675,7 @@
           <a:p>
             <a:fld id="{DBB772DE-1C71-4C15-94E7-A563D3B8A110}" type="datetimeFigureOut">
               <a:rPr lang="en-US" smtClean="0"/>
-              <a:t>12/7/2021</a:t>
+              <a:t>12/8/2021</a:t>
             </a:fld>
             <a:endParaRPr lang="en-US"/>
           </a:p>
@@ -2928,7 +2928,7 @@
           <a:p>
             <a:fld id="{DBB772DE-1C71-4C15-94E7-A563D3B8A110}" type="datetimeFigureOut">
               <a:rPr lang="en-US" smtClean="0"/>
-              <a:t>12/7/2021</a:t>
+              <a:t>12/8/2021</a:t>
             </a:fld>
             <a:endParaRPr lang="en-US"/>
           </a:p>
@@ -3141,7 +3141,7 @@
           <a:p>
             <a:fld id="{DBB772DE-1C71-4C15-94E7-A563D3B8A110}" type="datetimeFigureOut">
               <a:rPr lang="en-US" smtClean="0"/>
-              <a:t>12/7/2021</a:t>
+              <a:t>12/8/2021</a:t>
             </a:fld>
             <a:endParaRPr lang="en-US"/>
           </a:p>
@@ -3565,15 +3565,7 @@
           <a:p>
             <a:r>
               <a:rPr lang="en-US" dirty="0" smtClean="0"/>
-              <a:t>Applying Regression Analysis to Investigate Spatiotemporal </a:t>
-            </a:r>
-            <a:r>
-              <a:rPr lang="en-US" dirty="0" smtClean="0"/>
-              <a:t>Variability </a:t>
-            </a:r>
-            <a:r>
-              <a:rPr lang="en-US" dirty="0" smtClean="0"/>
-              <a:t>in Bearded Seal Calls</a:t>
+              <a:t>Applying Regression Analysis to Investigate Spatiotemporal Variability in Bearded Seal Calls</a:t>
             </a:r>
             <a:endParaRPr lang="en-US" dirty="0"/>
           </a:p>
@@ -6184,8 +6176,8 @@
         </p:nvSpPr>
         <p:spPr>
           <a:xfrm>
-            <a:off x="6894694" y="1027906"/>
-            <a:ext cx="4495654" cy="369332"/>
+            <a:off x="5576639" y="973960"/>
+            <a:ext cx="6358215" cy="646331"/>
           </a:xfrm>
           <a:prstGeom prst="rect">
             <a:avLst/>
@@ -6199,11 +6191,25 @@
           <a:p>
             <a:r>
               <a:rPr lang="en-US" dirty="0" smtClean="0"/>
-              <a:t>Saved to </a:t>
+              <a:t>Based on example on pg. 200 of</a:t>
+            </a:r>
+            <a:r>
+              <a:rPr lang="en-US" dirty="0" smtClean="0"/>
+              <a:t> mgcv.pdf.</a:t>
+            </a:r>
+          </a:p>
+          <a:p>
+            <a:r>
+              <a:rPr lang="en-US" dirty="0" smtClean="0"/>
+              <a:t>Step-by-step explanation provided in </a:t>
             </a:r>
             <a:r>
               <a:rPr lang="en-US" dirty="0" err="1" smtClean="0"/>
-              <a:t>binomial_example_from_mgcv_pdf.r</a:t>
+              <a:t>RegressionModelOverview.r</a:t>
+            </a:r>
+            <a:r>
+              <a:rPr lang="en-US" dirty="0" smtClean="0"/>
+              <a:t>.</a:t>
             </a:r>
             <a:endParaRPr lang="en-US" dirty="0"/>
           </a:p>
@@ -6218,7 +6224,7 @@
         <p:spPr>
           <a:xfrm>
             <a:off x="238896" y="1811456"/>
-            <a:ext cx="11771871" cy="2554545"/>
+            <a:ext cx="11771871" cy="2523768"/>
           </a:xfrm>
           <a:prstGeom prst="rect">
             <a:avLst/>
@@ -6441,65 +6447,80 @@
           </a:p>
           <a:p>
             <a:r>
-              <a:rPr lang="en-US" sz="1600" dirty="0" err="1">
+              <a:rPr lang="en-US" sz="1400" dirty="0" err="1">
                 <a:latin typeface="Lucida Console" panose="020B0609040504020204" pitchFamily="49" charset="0"/>
               </a:rPr>
               <a:t>lr.fit</a:t>
             </a:r>
             <a:r>
-              <a:rPr lang="en-US" sz="1600" dirty="0">
+              <a:rPr lang="en-US" sz="1400" dirty="0">
                 <a:latin typeface="Lucida Console" panose="020B0609040504020204" pitchFamily="49" charset="0"/>
               </a:rPr>
               <a:t> &lt;- gam(y/</a:t>
             </a:r>
             <a:r>
-              <a:rPr lang="en-US" sz="1600" dirty="0" err="1">
+              <a:rPr lang="en-US" sz="1400" dirty="0" err="1">
                 <a:latin typeface="Lucida Console" panose="020B0609040504020204" pitchFamily="49" charset="0"/>
               </a:rPr>
               <a:t>n~s</a:t>
             </a:r>
             <a:r>
-              <a:rPr lang="en-US" sz="1600" dirty="0">
+              <a:rPr lang="en-US" sz="1400" dirty="0">
                 <a:latin typeface="Lucida Console" panose="020B0609040504020204" pitchFamily="49" charset="0"/>
               </a:rPr>
               <a:t>(x0)+s(x1)+s(x2)+s(x3),family=</a:t>
             </a:r>
             <a:r>
-              <a:rPr lang="en-US" sz="1600" dirty="0" err="1">
+              <a:rPr lang="en-US" sz="1400" dirty="0" err="1">
                 <a:latin typeface="Lucida Console" panose="020B0609040504020204" pitchFamily="49" charset="0"/>
               </a:rPr>
               <a:t>binomial,data</a:t>
             </a:r>
             <a:r>
-              <a:rPr lang="en-US" sz="1600" dirty="0">
+              <a:rPr lang="en-US" sz="1400" dirty="0">
                 <a:latin typeface="Lucida Console" panose="020B0609040504020204" pitchFamily="49" charset="0"/>
               </a:rPr>
               <a:t>=</a:t>
             </a:r>
             <a:r>
-              <a:rPr lang="en-US" sz="1600" dirty="0" err="1">
+              <a:rPr lang="en-US" sz="1400" dirty="0" err="1">
                 <a:latin typeface="Lucida Console" panose="020B0609040504020204" pitchFamily="49" charset="0"/>
               </a:rPr>
               <a:t>dat,weights</a:t>
             </a:r>
             <a:r>
-              <a:rPr lang="en-US" sz="1600" dirty="0">
+              <a:rPr lang="en-US" sz="1400" dirty="0">
                 <a:latin typeface="Lucida Console" panose="020B0609040504020204" pitchFamily="49" charset="0"/>
               </a:rPr>
               <a:t>=</a:t>
             </a:r>
             <a:r>
-              <a:rPr lang="en-US" sz="1600" dirty="0" err="1">
+              <a:rPr lang="en-US" sz="1400" dirty="0" err="1">
                 <a:latin typeface="Lucida Console" panose="020B0609040504020204" pitchFamily="49" charset="0"/>
               </a:rPr>
               <a:t>n,method</a:t>
             </a:r>
             <a:r>
-              <a:rPr lang="en-US" sz="1600" dirty="0">
+              <a:rPr lang="en-US" sz="1400" dirty="0">
                 <a:latin typeface="Lucida Console" panose="020B0609040504020204" pitchFamily="49" charset="0"/>
               </a:rPr>
-              <a:t>="REML")</a:t>
-            </a:r>
+              <a:t>="</a:t>
+            </a:r>
+            <a:r>
+              <a:rPr lang="en-US" sz="1400" dirty="0" err="1" smtClean="0">
+                <a:latin typeface="Lucida Console" panose="020B0609040504020204" pitchFamily="49" charset="0"/>
+              </a:rPr>
+              <a:t>REML“,link</a:t>
+            </a:r>
+            <a:r>
+              <a:rPr lang="en-US" sz="1400" dirty="0" smtClean="0">
+                <a:latin typeface="Lucida Console" panose="020B0609040504020204" pitchFamily="49" charset="0"/>
+              </a:rPr>
+              <a:t>=“logit”)</a:t>
+            </a:r>
+            <a:endParaRPr lang="en-US" sz="1400" dirty="0">
+              <a:latin typeface="Lucida Console" panose="020B0609040504020204" pitchFamily="49" charset="0"/>
+            </a:endParaRPr>
           </a:p>
         </p:txBody>
       </p:sp>
@@ -6511,10 +6532,10 @@
         </p:nvGrpSpPr>
         <p:grpSpPr>
           <a:xfrm>
-            <a:off x="5174797" y="4327385"/>
-            <a:ext cx="1273747" cy="1099165"/>
-            <a:chOff x="5174797" y="4327385"/>
-            <a:chExt cx="1273747" cy="1099165"/>
+            <a:off x="5401777" y="4273603"/>
+            <a:ext cx="1035475" cy="976054"/>
+            <a:chOff x="5293933" y="4327385"/>
+            <a:chExt cx="1035475" cy="976054"/>
           </a:xfrm>
         </p:grpSpPr>
         <p:sp>
@@ -6568,8 +6589,8 @@
           </p:nvSpPr>
           <p:spPr>
             <a:xfrm>
-              <a:off x="5174797" y="4780219"/>
-              <a:ext cx="1273747" cy="646331"/>
+              <a:off x="5293933" y="4780219"/>
+              <a:ext cx="1035475" cy="523220"/>
             </a:xfrm>
             <a:prstGeom prst="rect">
               <a:avLst/>
@@ -6584,7 +6605,7 @@
             <a:p>
               <a:pPr algn="ctr"/>
               <a:r>
-                <a:rPr lang="en-US" dirty="0">
+                <a:rPr lang="en-US" sz="1400" dirty="0">
                   <a:solidFill>
                     <a:srgbClr val="0070C0"/>
                   </a:solidFill>
@@ -6592,7 +6613,7 @@
                 <a:t>p</a:t>
               </a:r>
               <a:r>
-                <a:rPr lang="en-US" dirty="0" smtClean="0">
+                <a:rPr lang="en-US" sz="1400" dirty="0" smtClean="0">
                   <a:solidFill>
                     <a:srgbClr val="0070C0"/>
                   </a:solidFill>
@@ -6603,14 +6624,14 @@
             <a:p>
               <a:pPr algn="ctr"/>
               <a:r>
-                <a:rPr lang="en-US" dirty="0" smtClean="0">
+                <a:rPr lang="en-US" sz="1400" dirty="0" smtClean="0">
                   <a:solidFill>
                     <a:srgbClr val="0070C0"/>
                   </a:solidFill>
                 </a:rPr>
                 <a:t>distribution</a:t>
               </a:r>
-              <a:endParaRPr lang="en-US" dirty="0">
+              <a:endParaRPr lang="en-US" sz="1400" dirty="0">
                 <a:solidFill>
                   <a:srgbClr val="0070C0"/>
                 </a:solidFill>
@@ -6627,10 +6648,10 @@
         </p:nvGrpSpPr>
         <p:grpSpPr>
           <a:xfrm>
-            <a:off x="10274305" y="4327384"/>
-            <a:ext cx="1133131" cy="1376165"/>
-            <a:chOff x="10274305" y="4327384"/>
-            <a:chExt cx="1133131" cy="1376165"/>
+            <a:off x="9061523" y="4283535"/>
+            <a:ext cx="929100" cy="1191499"/>
+            <a:chOff x="10376320" y="4327384"/>
+            <a:chExt cx="929100" cy="1191499"/>
           </a:xfrm>
         </p:grpSpPr>
         <p:sp>
@@ -6684,8 +6705,8 @@
           </p:nvSpPr>
           <p:spPr>
             <a:xfrm>
-              <a:off x="10274305" y="4780219"/>
-              <a:ext cx="1133131" cy="923330"/>
+              <a:off x="10376320" y="4780219"/>
+              <a:ext cx="929100" cy="738664"/>
             </a:xfrm>
             <a:prstGeom prst="rect">
               <a:avLst/>
@@ -6700,14 +6721,14 @@
             <a:p>
               <a:pPr algn="ctr"/>
               <a:r>
-                <a:rPr lang="en-US" dirty="0" err="1" smtClean="0">
+                <a:rPr lang="en-US" sz="1400" dirty="0" err="1" smtClean="0">
                   <a:solidFill>
                     <a:srgbClr val="0070C0"/>
                   </a:solidFill>
                 </a:rPr>
                 <a:t>REstricted</a:t>
               </a:r>
-              <a:endParaRPr lang="en-US" dirty="0" smtClean="0">
+              <a:endParaRPr lang="en-US" sz="1400" dirty="0" smtClean="0">
                 <a:solidFill>
                   <a:srgbClr val="0070C0"/>
                 </a:solidFill>
@@ -6716,7 +6737,7 @@
             <a:p>
               <a:pPr algn="ctr"/>
               <a:r>
-                <a:rPr lang="en-US" dirty="0" smtClean="0">
+                <a:rPr lang="en-US" sz="1400" dirty="0" smtClean="0">
                   <a:solidFill>
                     <a:srgbClr val="0070C0"/>
                   </a:solidFill>
@@ -6727,14 +6748,14 @@
             <a:p>
               <a:pPr algn="ctr"/>
               <a:r>
-                <a:rPr lang="en-US" dirty="0" smtClean="0">
+                <a:rPr lang="en-US" sz="1400" dirty="0" smtClean="0">
                   <a:solidFill>
                     <a:srgbClr val="0070C0"/>
                   </a:solidFill>
                 </a:rPr>
                 <a:t>Likelihood</a:t>
               </a:r>
-              <a:endParaRPr lang="en-US" dirty="0">
+              <a:endParaRPr lang="en-US" sz="1400" dirty="0">
                 <a:solidFill>
                   <a:srgbClr val="0070C0"/>
                 </a:solidFill>
@@ -6751,10 +6772,10 @@
         </p:nvGrpSpPr>
         <p:grpSpPr>
           <a:xfrm>
-            <a:off x="1402475" y="4321957"/>
-            <a:ext cx="1653851" cy="1811642"/>
-            <a:chOff x="1402475" y="4321957"/>
-            <a:chExt cx="1653851" cy="1811642"/>
+            <a:off x="1303452" y="4267973"/>
+            <a:ext cx="1326773" cy="1565420"/>
+            <a:chOff x="1566014" y="4321957"/>
+            <a:chExt cx="1326773" cy="1565420"/>
           </a:xfrm>
         </p:grpSpPr>
         <p:sp>
@@ -6855,8 +6876,8 @@
           </p:nvSpPr>
           <p:spPr>
             <a:xfrm>
-              <a:off x="1402475" y="4933270"/>
-              <a:ext cx="1653851" cy="1200329"/>
+              <a:off x="1566014" y="4933270"/>
+              <a:ext cx="1326773" cy="954107"/>
             </a:xfrm>
             <a:prstGeom prst="rect">
               <a:avLst/>
@@ -6871,7 +6892,7 @@
             <a:p>
               <a:pPr algn="ctr"/>
               <a:r>
-                <a:rPr lang="en-US" dirty="0" smtClean="0">
+                <a:rPr lang="en-US" sz="1400" dirty="0" smtClean="0">
                   <a:solidFill>
                     <a:srgbClr val="0070C0"/>
                   </a:solidFill>
@@ -6882,7 +6903,7 @@
             <a:p>
               <a:pPr algn="ctr"/>
               <a:r>
-                <a:rPr lang="en-US" dirty="0" smtClean="0">
+                <a:rPr lang="en-US" sz="1400" dirty="0" smtClean="0">
                   <a:solidFill>
                     <a:srgbClr val="0070C0"/>
                   </a:solidFill>
@@ -6893,7 +6914,7 @@
             <a:p>
               <a:pPr algn="ctr"/>
               <a:r>
-                <a:rPr lang="en-US" dirty="0" smtClean="0">
+                <a:rPr lang="en-US" sz="1400" dirty="0" smtClean="0">
                   <a:solidFill>
                     <a:srgbClr val="0070C0"/>
                   </a:solidFill>
@@ -6904,14 +6925,14 @@
             <a:p>
               <a:pPr algn="ctr"/>
               <a:r>
-                <a:rPr lang="en-US" dirty="0" smtClean="0">
+                <a:rPr lang="en-US" sz="1400" dirty="0" smtClean="0">
                   <a:solidFill>
                     <a:srgbClr val="0070C0"/>
                   </a:solidFill>
                 </a:rPr>
                 <a:t>were successful</a:t>
               </a:r>
-              <a:endParaRPr lang="en-US" dirty="0">
+              <a:endParaRPr lang="en-US" sz="1400" dirty="0">
                 <a:solidFill>
                   <a:srgbClr val="0070C0"/>
                 </a:solidFill>
@@ -7235,10 +7256,10 @@
         </p:nvGrpSpPr>
         <p:grpSpPr>
           <a:xfrm>
-            <a:off x="2687551" y="4305611"/>
-            <a:ext cx="2665968" cy="1737696"/>
-            <a:chOff x="2687551" y="4305611"/>
-            <a:chExt cx="2665968" cy="1737696"/>
+            <a:off x="2268857" y="4275112"/>
+            <a:ext cx="2403761" cy="1214475"/>
+            <a:chOff x="2687552" y="4305611"/>
+            <a:chExt cx="2403761" cy="1214475"/>
           </a:xfrm>
         </p:grpSpPr>
         <p:sp>
@@ -7249,8 +7270,8 @@
           </p:nvSpPr>
           <p:spPr>
             <a:xfrm rot="16200000">
-              <a:off x="3867604" y="3125558"/>
-              <a:ext cx="305861" cy="2665968"/>
+              <a:off x="3736502" y="3256661"/>
+              <a:ext cx="305861" cy="2403761"/>
             </a:xfrm>
             <a:prstGeom prst="leftBrace">
               <a:avLst/>
@@ -7296,8 +7317,8 @@
           </p:nvSpPr>
           <p:spPr>
             <a:xfrm>
-              <a:off x="3091732" y="4565979"/>
-              <a:ext cx="1999579" cy="1477328"/>
+              <a:off x="2889643" y="4565979"/>
+              <a:ext cx="1999579" cy="954107"/>
             </a:xfrm>
             <a:prstGeom prst="rect">
               <a:avLst/>
@@ -7312,14 +7333,14 @@
             <a:p>
               <a:pPr algn="ctr"/>
               <a:r>
-                <a:rPr lang="en-US" dirty="0" smtClean="0">
+                <a:rPr lang="en-US" sz="1400" dirty="0" smtClean="0">
                   <a:solidFill>
                     <a:srgbClr val="0070C0"/>
                   </a:solidFill>
                 </a:rPr>
                 <a:t>Additive predictor with smooth functions s( ) of predictor variables x0, x1, x2, x3</a:t>
               </a:r>
-              <a:endParaRPr lang="en-US" dirty="0">
+              <a:endParaRPr lang="en-US" sz="1400" dirty="0">
                 <a:solidFill>
                   <a:srgbClr val="0070C0"/>
                 </a:solidFill>
@@ -7328,78 +7349,122 @@
           </p:txBody>
         </p:sp>
       </p:grpSp>
-      <p:sp>
-        <p:nvSpPr>
-          <p:cNvPr id="20" name="TextBox 19"/>
-          <p:cNvSpPr txBox="1"/>
+      <p:grpSp>
+        <p:nvGrpSpPr>
+          <p:cNvPr id="21" name="Group 20"/>
+          <p:cNvGrpSpPr/>
           <p:nvPr/>
-        </p:nvSpPr>
-        <p:spPr>
+        </p:nvGrpSpPr>
+        <p:grpSpPr>
           <a:xfrm>
-            <a:off x="2495796" y="6132230"/>
-            <a:ext cx="9628666" cy="646331"/>
+            <a:off x="10661211" y="4273602"/>
+            <a:ext cx="795411" cy="1000705"/>
+            <a:chOff x="10661211" y="4273602"/>
+            <a:chExt cx="795411" cy="1000705"/>
           </a:xfrm>
-          <a:prstGeom prst="rect">
-            <a:avLst/>
-          </a:prstGeom>
-          <a:solidFill>
-            <a:srgbClr val="0070C0"/>
-          </a:solidFill>
-        </p:spPr>
-        <p:txBody>
-          <a:bodyPr wrap="square" rtlCol="0">
-            <a:spAutoFit/>
-          </a:bodyPr>
-          <a:lstStyle/>
-          <a:p>
-            <a:r>
-              <a:rPr lang="en-US" dirty="0" smtClean="0">
+        </p:grpSpPr>
+        <p:sp>
+          <p:nvSpPr>
+            <p:cNvPr id="30" name="Right Arrow 29"/>
+            <p:cNvSpPr/>
+            <p:nvPr/>
+          </p:nvSpPr>
+          <p:spPr>
+            <a:xfrm rot="16200000">
+              <a:off x="10832500" y="4413398"/>
+              <a:ext cx="452834" cy="173242"/>
+            </a:xfrm>
+            <a:prstGeom prst="rightArrow">
+              <a:avLst/>
+            </a:prstGeom>
+            <a:ln>
+              <a:noFill/>
+            </a:ln>
+          </p:spPr>
+          <p:style>
+            <a:lnRef idx="2">
+              <a:schemeClr val="accent1">
+                <a:shade val="50000"/>
+              </a:schemeClr>
+            </a:lnRef>
+            <a:fillRef idx="1">
+              <a:schemeClr val="accent1"/>
+            </a:fillRef>
+            <a:effectRef idx="0">
+              <a:schemeClr val="accent1"/>
+            </a:effectRef>
+            <a:fontRef idx="minor">
+              <a:schemeClr val="lt1"/>
+            </a:fontRef>
+          </p:style>
+          <p:txBody>
+            <a:bodyPr rtlCol="0" anchor="ctr"/>
+            <a:lstStyle/>
+            <a:p>
+              <a:pPr algn="ctr"/>
+              <a:endParaRPr lang="en-US"/>
+            </a:p>
+          </p:txBody>
+        </p:sp>
+        <p:sp>
+          <p:nvSpPr>
+            <p:cNvPr id="31" name="TextBox 30"/>
+            <p:cNvSpPr txBox="1"/>
+            <p:nvPr/>
+          </p:nvSpPr>
+          <p:spPr>
+            <a:xfrm>
+              <a:off x="10661211" y="4751087"/>
+              <a:ext cx="795411" cy="523220"/>
+            </a:xfrm>
+            <a:prstGeom prst="rect">
+              <a:avLst/>
+            </a:prstGeom>
+            <a:noFill/>
+          </p:spPr>
+          <p:txBody>
+            <a:bodyPr wrap="none" rtlCol="0">
+              <a:spAutoFit/>
+            </a:bodyPr>
+            <a:lstStyle/>
+            <a:p>
+              <a:pPr algn="ctr"/>
+              <a:r>
+                <a:rPr lang="en-US" sz="1400" dirty="0">
+                  <a:solidFill>
+                    <a:srgbClr val="0070C0"/>
+                  </a:solidFill>
+                </a:rPr>
+                <a:t>l</a:t>
+              </a:r>
+              <a:r>
+                <a:rPr lang="en-US" sz="1400" dirty="0" smtClean="0">
+                  <a:solidFill>
+                    <a:srgbClr val="0070C0"/>
+                  </a:solidFill>
+                </a:rPr>
+                <a:t>ink</a:t>
+              </a:r>
+            </a:p>
+            <a:p>
+              <a:pPr algn="ctr"/>
+              <a:r>
+                <a:rPr lang="en-US" sz="1400" dirty="0" smtClean="0">
+                  <a:solidFill>
+                    <a:srgbClr val="0070C0"/>
+                  </a:solidFill>
+                </a:rPr>
+                <a:t>function</a:t>
+              </a:r>
+              <a:endParaRPr lang="en-US" sz="1400" dirty="0">
                 <a:solidFill>
-                  <a:schemeClr val="bg1"/>
+                  <a:srgbClr val="0070C0"/>
                 </a:solidFill>
-              </a:rPr>
-              <a:t>Note: In </a:t>
-            </a:r>
-            <a:r>
-              <a:rPr lang="en-US" dirty="0" err="1" smtClean="0">
-                <a:solidFill>
-                  <a:schemeClr val="bg1"/>
-                </a:solidFill>
-              </a:rPr>
-              <a:t>glm</a:t>
-            </a:r>
-            <a:r>
-              <a:rPr lang="en-US" dirty="0" smtClean="0">
-                <a:solidFill>
-                  <a:schemeClr val="bg1"/>
-                </a:solidFill>
-              </a:rPr>
-              <a:t>() and gam(), the default link function for the binomial family is </a:t>
-            </a:r>
-            <a:r>
-              <a:rPr lang="en-US" dirty="0">
-                <a:solidFill>
-                  <a:schemeClr val="bg1"/>
-                </a:solidFill>
-              </a:rPr>
-              <a:t>the logit (link = "</a:t>
-            </a:r>
-            <a:r>
-              <a:rPr lang="en-US" dirty="0" smtClean="0">
-                <a:solidFill>
-                  <a:schemeClr val="bg1"/>
-                </a:solidFill>
-              </a:rPr>
-              <a:t>logit“). To see other families and their defaults, type ?stats::family in the R console.</a:t>
-            </a:r>
-            <a:endParaRPr lang="en-US" dirty="0">
-              <a:solidFill>
-                <a:schemeClr val="bg1"/>
-              </a:solidFill>
-            </a:endParaRPr>
-          </a:p>
-        </p:txBody>
-      </p:sp>
+              </a:endParaRPr>
+            </a:p>
+          </p:txBody>
+        </p:sp>
+      </p:grpSp>
     </p:spTree>
     <p:extLst>
       <p:ext uri="{BB962C8B-B14F-4D97-AF65-F5344CB8AC3E}">
@@ -7563,7 +7628,15 @@
                   <a:schemeClr val="bg1"/>
                 </a:solidFill>
               </a:rPr>
-              <a:t>binomial_example_from_mgcv_pdf.r</a:t>
+              <a:t>RegressionModelOverview</a:t>
+            </a:r>
+            <a:r>
+              <a:rPr lang="en-US" dirty="0" err="1" smtClean="0">
+                <a:solidFill>
+                  <a:schemeClr val="bg1"/>
+                </a:solidFill>
+              </a:rPr>
+              <a:t>.r</a:t>
             </a:r>
             <a:r>
               <a:rPr lang="en-US" dirty="0" smtClean="0">
@@ -16460,8 +16533,8 @@
           </a:p>
         </p:txBody>
       </p:sp>
-      <mc:AlternateContent xmlns:mc="http://schemas.openxmlformats.org/markup-compatibility/2006">
-        <mc:Choice xmlns:a14="http://schemas.microsoft.com/office/drawing/2010/main" Requires="a14">
+      <mc:AlternateContent xmlns:mc="http://schemas.openxmlformats.org/markup-compatibility/2006" xmlns:a14="http://schemas.microsoft.com/office/drawing/2010/main">
+        <mc:Choice Requires="a14">
           <p:sp>
             <p:nvSpPr>
               <p:cNvPr id="3" name="TextBox 2"/>
@@ -16606,7 +16679,7 @@
             </p:txBody>
           </p:sp>
         </mc:Choice>
-        <mc:Fallback>
+        <mc:Fallback xmlns="">
           <p:sp>
             <p:nvSpPr>
               <p:cNvPr id="3" name="TextBox 2"/>
@@ -17123,8 +17196,8 @@
           </p:sp>
         </mc:Fallback>
       </mc:AlternateContent>
-      <mc:AlternateContent xmlns:mc="http://schemas.openxmlformats.org/markup-compatibility/2006">
-        <mc:Choice xmlns:a14="http://schemas.microsoft.com/office/drawing/2010/main" Requires="a14">
+      <mc:AlternateContent xmlns:mc="http://schemas.openxmlformats.org/markup-compatibility/2006" xmlns:a14="http://schemas.microsoft.com/office/drawing/2010/main">
+        <mc:Choice Requires="a14">
           <p:sp>
             <p:nvSpPr>
               <p:cNvPr id="12" name="TextBox 11"/>
@@ -17188,18 +17261,14 @@
                 </a14:m>
                 <a:r>
                   <a:rPr lang="en-US" dirty="0" smtClean="0"/>
-                  <a:t> may be any set of pairs like: </a:t>
-                </a:r>
-                <a:r>
-                  <a:rPr lang="en-US" dirty="0" smtClean="0"/>
-                  <a:t>{+,-}, {calls present, calls absent}, {success, failure}, {1, 0}. </a:t>
+                  <a:t> may be any set of pairs like: {+,-}, {calls present, calls absent}, {success, failure}, {1, 0}. </a:t>
                 </a:r>
                 <a:endParaRPr lang="en-US" dirty="0"/>
               </a:p>
             </p:txBody>
           </p:sp>
         </mc:Choice>
-        <mc:Fallback>
+        <mc:Fallback xmlns="">
           <p:sp>
             <p:nvSpPr>
               <p:cNvPr id="12" name="TextBox 11"/>
@@ -21204,15 +21273,7 @@
           <a:p>
             <a:r>
               <a:rPr lang="en-US" dirty="0" smtClean="0"/>
-              <a:t>Fixed </a:t>
-            </a:r>
-            <a:r>
-              <a:rPr lang="en-US" dirty="0" smtClean="0"/>
-              <a:t>Effects vs</a:t>
-            </a:r>
-            <a:r>
-              <a:rPr lang="en-US" dirty="0" smtClean="0"/>
-              <a:t>. Random Effects</a:t>
+              <a:t>Fixed Effects vs. Random Effects</a:t>
             </a:r>
             <a:endParaRPr lang="en-US" dirty="0"/>
           </a:p>
@@ -22851,8 +22912,8 @@
           </a:p>
         </p:txBody>
       </p:sp>
-      <mc:AlternateContent xmlns:mc="http://schemas.openxmlformats.org/markup-compatibility/2006">
-        <mc:Choice xmlns:a14="http://schemas.microsoft.com/office/drawing/2010/main" Requires="a14">
+      <mc:AlternateContent xmlns:mc="http://schemas.openxmlformats.org/markup-compatibility/2006" xmlns:a14="http://schemas.microsoft.com/office/drawing/2010/main">
+        <mc:Choice Requires="a14">
           <p:sp>
             <p:nvSpPr>
               <p:cNvPr id="4" name="Content Placeholder 3"/>
@@ -23685,7 +23746,7 @@
             </p:txBody>
           </p:sp>
         </mc:Choice>
-        <mc:Fallback>
+        <mc:Fallback xmlns="">
           <p:sp>
             <p:nvSpPr>
               <p:cNvPr id="4" name="Content Placeholder 3"/>
@@ -24107,8 +24168,8 @@
           </a:p>
         </p:txBody>
       </p:sp>
-      <mc:AlternateContent xmlns:mc="http://schemas.openxmlformats.org/markup-compatibility/2006">
-        <mc:Choice xmlns:a14="http://schemas.microsoft.com/office/drawing/2010/main" Requires="a14">
+      <mc:AlternateContent xmlns:mc="http://schemas.openxmlformats.org/markup-compatibility/2006" xmlns:a14="http://schemas.microsoft.com/office/drawing/2010/main">
+        <mc:Choice Requires="a14">
           <p:sp>
             <p:nvSpPr>
               <p:cNvPr id="5" name="Content Placeholder 4"/>
@@ -24430,7 +24491,7 @@
             </p:txBody>
           </p:sp>
         </mc:Choice>
-        <mc:Fallback>
+        <mc:Fallback xmlns="">
           <p:sp>
             <p:nvSpPr>
               <p:cNvPr id="5" name="Content Placeholder 4"/>
@@ -24517,8 +24578,8 @@
           </a:p>
         </p:txBody>
       </p:sp>
-      <mc:AlternateContent xmlns:mc="http://schemas.openxmlformats.org/markup-compatibility/2006">
-        <mc:Choice xmlns:a14="http://schemas.microsoft.com/office/drawing/2010/main" Requires="a14">
+      <mc:AlternateContent xmlns:mc="http://schemas.openxmlformats.org/markup-compatibility/2006" xmlns:a14="http://schemas.microsoft.com/office/drawing/2010/main">
+        <mc:Choice Requires="a14">
           <p:sp>
             <p:nvSpPr>
               <p:cNvPr id="4" name="TextBox 3"/>
@@ -24620,7 +24681,7 @@
             </p:txBody>
           </p:sp>
         </mc:Choice>
-        <mc:Fallback>
+        <mc:Fallback xmlns="">
           <p:sp>
             <p:nvSpPr>
               <p:cNvPr id="4" name="TextBox 3"/>
@@ -24659,8 +24720,8 @@
           </p:sp>
         </mc:Fallback>
       </mc:AlternateContent>
-      <mc:AlternateContent xmlns:mc="http://schemas.openxmlformats.org/markup-compatibility/2006">
-        <mc:Choice xmlns:a14="http://schemas.microsoft.com/office/drawing/2010/main" Requires="a14">
+      <mc:AlternateContent xmlns:mc="http://schemas.openxmlformats.org/markup-compatibility/2006" xmlns:a14="http://schemas.microsoft.com/office/drawing/2010/main">
+        <mc:Choice Requires="a14">
           <p:sp>
             <p:nvSpPr>
               <p:cNvPr id="5" name="TextBox 4"/>
@@ -24697,6 +24758,7 @@
                 <a:endParaRPr lang="en-US" sz="1400" dirty="0" smtClean="0"/>
               </a:p>
               <a:p>
+                <a:pPr/>
                 <a14:m>
                   <m:oMathPara xmlns:m="http://schemas.openxmlformats.org/officeDocument/2006/math">
                     <m:oMathParaPr>
@@ -24830,7 +24892,7 @@
             </p:txBody>
           </p:sp>
         </mc:Choice>
-        <mc:Fallback>
+        <mc:Fallback xmlns="">
           <p:sp>
             <p:nvSpPr>
               <p:cNvPr id="5" name="TextBox 4"/>

</xml_diff>

<commit_message>
Started building logistic gams with bearded seal data. Univariate gams ran fine. Problem creating global gam.
</commit_message>
<xml_diff>
--- a/Notes/RegressionModelOverview.pptx
+++ b/Notes/RegressionModelOverview.pptx
@@ -6191,11 +6191,7 @@
           <a:p>
             <a:r>
               <a:rPr lang="en-US" dirty="0" smtClean="0"/>
-              <a:t>Based on example on pg. 200 of</a:t>
-            </a:r>
-            <a:r>
-              <a:rPr lang="en-US" dirty="0" smtClean="0"/>
-              <a:t> mgcv.pdf.</a:t>
+              <a:t>Based on example on pg. 200 of mgcv.pdf.</a:t>
             </a:r>
           </a:p>
           <a:p>
@@ -6468,34 +6464,34 @@
               <a:rPr lang="en-US" sz="1400" dirty="0">
                 <a:latin typeface="Lucida Console" panose="020B0609040504020204" pitchFamily="49" charset="0"/>
               </a:rPr>
-              <a:t>(x0)+s(x1)+s(x2)+s(x3),family=</a:t>
-            </a:r>
-            <a:r>
-              <a:rPr lang="en-US" sz="1400" dirty="0" err="1">
-                <a:latin typeface="Lucida Console" panose="020B0609040504020204" pitchFamily="49" charset="0"/>
-              </a:rPr>
-              <a:t>binomial,data</a:t>
+              <a:t>(x0)+s(x1)+s(x2)+s(x3),</a:t>
             </a:r>
             <a:r>
               <a:rPr lang="en-US" sz="1400" dirty="0">
                 <a:latin typeface="Lucida Console" panose="020B0609040504020204" pitchFamily="49" charset="0"/>
               </a:rPr>
-              <a:t>=</a:t>
-            </a:r>
-            <a:r>
-              <a:rPr lang="en-US" sz="1400" dirty="0" err="1">
+              <a:t>family=binomial(link=“</a:t>
+            </a:r>
+            <a:r>
+              <a:rPr lang="en-US" sz="1400" dirty="0" smtClean="0">
+                <a:latin typeface="Lucida Console" panose="020B0609040504020204" pitchFamily="49" charset="0"/>
+              </a:rPr>
+              <a:t>logit),data=</a:t>
+            </a:r>
+            <a:r>
+              <a:rPr lang="en-US" sz="1400" dirty="0" err="1" smtClean="0">
                 <a:latin typeface="Lucida Console" panose="020B0609040504020204" pitchFamily="49" charset="0"/>
               </a:rPr>
               <a:t>dat,weights</a:t>
             </a:r>
             <a:r>
-              <a:rPr lang="en-US" sz="1400" dirty="0">
+              <a:rPr lang="en-US" sz="1400" dirty="0" smtClean="0">
                 <a:latin typeface="Lucida Console" panose="020B0609040504020204" pitchFamily="49" charset="0"/>
               </a:rPr>
               <a:t>=</a:t>
             </a:r>
             <a:r>
-              <a:rPr lang="en-US" sz="1400" dirty="0" err="1">
+              <a:rPr lang="en-US" sz="1400" dirty="0" err="1" smtClean="0">
                 <a:latin typeface="Lucida Console" panose="020B0609040504020204" pitchFamily="49" charset="0"/>
               </a:rPr>
               <a:t>n,method</a:t>
@@ -6507,16 +6503,16 @@
               <a:t>="</a:t>
             </a:r>
             <a:r>
-              <a:rPr lang="en-US" sz="1400" dirty="0" err="1" smtClean="0">
-                <a:latin typeface="Lucida Console" panose="020B0609040504020204" pitchFamily="49" charset="0"/>
-              </a:rPr>
-              <a:t>REML“,link</a:t>
-            </a:r>
-            <a:r>
               <a:rPr lang="en-US" sz="1400" dirty="0" smtClean="0">
                 <a:latin typeface="Lucida Console" panose="020B0609040504020204" pitchFamily="49" charset="0"/>
               </a:rPr>
-              <a:t>=“logit”)</a:t>
+              <a:t>REML</a:t>
+            </a:r>
+            <a:r>
+              <a:rPr lang="en-US" sz="1400" dirty="0" smtClean="0">
+                <a:latin typeface="Lucida Console" panose="020B0609040504020204" pitchFamily="49" charset="0"/>
+              </a:rPr>
+              <a:t>“)</a:t>
             </a:r>
             <a:endParaRPr lang="en-US" sz="1400" dirty="0">
               <a:latin typeface="Lucida Console" panose="020B0609040504020204" pitchFamily="49" charset="0"/>
@@ -7357,7 +7353,7 @@
         </p:nvGrpSpPr>
         <p:grpSpPr>
           <a:xfrm>
-            <a:off x="10661211" y="4273602"/>
+            <a:off x="6912423" y="4275112"/>
             <a:ext cx="795411" cy="1000705"/>
             <a:chOff x="10661211" y="4273602"/>
             <a:chExt cx="795411" cy="1000705"/>
@@ -7598,8 +7594,8 @@
         </p:nvSpPr>
         <p:spPr>
           <a:xfrm>
-            <a:off x="1116913" y="1065981"/>
-            <a:ext cx="9958175" cy="584775"/>
+            <a:off x="472505" y="1189549"/>
+            <a:ext cx="11246990" cy="584775"/>
           </a:xfrm>
           <a:prstGeom prst="rect">
             <a:avLst/>
@@ -7628,15 +7624,7 @@
                   <a:schemeClr val="bg1"/>
                 </a:solidFill>
               </a:rPr>
-              <a:t>RegressionModelOverview</a:t>
-            </a:r>
-            <a:r>
-              <a:rPr lang="en-US" dirty="0" err="1" smtClean="0">
-                <a:solidFill>
-                  <a:schemeClr val="bg1"/>
-                </a:solidFill>
-              </a:rPr>
-              <a:t>.r</a:t>
+              <a:t>RegressionModelOverview.r</a:t>
             </a:r>
             <a:r>
               <a:rPr lang="en-US" dirty="0" smtClean="0">
@@ -7682,7 +7670,34 @@
                 </a:solidFill>
                 <a:latin typeface="Lucida Console" panose="020B0609040504020204" pitchFamily="49" charset="0"/>
               </a:rPr>
-              <a:t>(x0)+s(x1)+s(x2)+s(x3),family=</a:t>
+              <a:t>(x0)+s(x1)+s(x2)+s(x3),</a:t>
+            </a:r>
+            <a:r>
+              <a:rPr lang="en-US" sz="1400" dirty="0">
+                <a:solidFill>
+                  <a:schemeClr val="bg1"/>
+                </a:solidFill>
+                <a:latin typeface="Lucida Console" panose="020B0609040504020204" pitchFamily="49" charset="0"/>
+              </a:rPr>
+              <a:t>family=binomial(link=“</a:t>
+            </a:r>
+            <a:r>
+              <a:rPr lang="en-US" sz="1400" dirty="0" smtClean="0">
+                <a:solidFill>
+                  <a:schemeClr val="bg1"/>
+                </a:solidFill>
+                <a:latin typeface="Lucida Console" panose="020B0609040504020204" pitchFamily="49" charset="0"/>
+              </a:rPr>
+              <a:t>logit),</a:t>
+            </a:r>
+            <a:r>
+              <a:rPr lang="en-US" sz="1400" dirty="0">
+                <a:solidFill>
+                  <a:schemeClr val="bg1"/>
+                </a:solidFill>
+                <a:latin typeface="Lucida Console" panose="020B0609040504020204" pitchFamily="49" charset="0"/>
+              </a:rPr>
+              <a:t>data=</a:t>
             </a:r>
             <a:r>
               <a:rPr lang="en-US" sz="1400" dirty="0" err="1">
@@ -7691,7 +7706,7 @@
                 </a:solidFill>
                 <a:latin typeface="Lucida Console" panose="020B0609040504020204" pitchFamily="49" charset="0"/>
               </a:rPr>
-              <a:t>binomial,data</a:t>
+              <a:t>dat,weights</a:t>
             </a:r>
             <a:r>
               <a:rPr lang="en-US" sz="1400" dirty="0">
@@ -7709,7 +7724,7 @@
                 </a:solidFill>
                 <a:latin typeface="Lucida Console" panose="020B0609040504020204" pitchFamily="49" charset="0"/>
               </a:rPr>
-              <a:t>dat,weights</a:t>
+              <a:t>n,method</a:t>
             </a:r>
             <a:r>
               <a:rPr lang="en-US" sz="1400" dirty="0">
@@ -7718,25 +7733,7 @@
                 </a:solidFill>
                 <a:latin typeface="Lucida Console" panose="020B0609040504020204" pitchFamily="49" charset="0"/>
               </a:rPr>
-              <a:t>=</a:t>
-            </a:r>
-            <a:r>
-              <a:rPr lang="en-US" sz="1400" dirty="0" err="1">
-                <a:solidFill>
-                  <a:schemeClr val="bg1"/>
-                </a:solidFill>
-                <a:latin typeface="Lucida Console" panose="020B0609040504020204" pitchFamily="49" charset="0"/>
-              </a:rPr>
-              <a:t>n,method</a:t>
-            </a:r>
-            <a:r>
-              <a:rPr lang="en-US" sz="1400" dirty="0">
-                <a:solidFill>
-                  <a:schemeClr val="bg1"/>
-                </a:solidFill>
-                <a:latin typeface="Lucida Console" panose="020B0609040504020204" pitchFamily="49" charset="0"/>
-              </a:rPr>
-              <a:t>="REML</a:t>
+              <a:t>="</a:t>
             </a:r>
             <a:r>
               <a:rPr lang="en-US" sz="1400" dirty="0" smtClean="0">
@@ -7745,7 +7742,16 @@
                 </a:solidFill>
                 <a:latin typeface="Lucida Console" panose="020B0609040504020204" pitchFamily="49" charset="0"/>
               </a:rPr>
-              <a:t>")</a:t>
+              <a:t>REML</a:t>
+            </a:r>
+            <a:r>
+              <a:rPr lang="en-US" sz="1400" dirty="0" smtClean="0">
+                <a:solidFill>
+                  <a:schemeClr val="bg1"/>
+                </a:solidFill>
+                <a:latin typeface="Lucida Console" panose="020B0609040504020204" pitchFamily="49" charset="0"/>
+              </a:rPr>
+              <a:t>“)</a:t>
             </a:r>
             <a:endParaRPr lang="en-US" sz="1400" dirty="0">
               <a:solidFill>

</xml_diff>

<commit_message>
Complete .pptx (minus animation) and RegressionModelingOverview.r code.
</commit_message>
<xml_diff>
--- a/Notes/RegressionModelOverview.pptx
+++ b/Notes/RegressionModelOverview.pptx
@@ -6464,13 +6464,7 @@
               <a:rPr lang="en-US" sz="1400" dirty="0">
                 <a:latin typeface="Lucida Console" panose="020B0609040504020204" pitchFamily="49" charset="0"/>
               </a:rPr>
-              <a:t>(x0)+s(x1)+s(x2)+s(x3),</a:t>
-            </a:r>
-            <a:r>
-              <a:rPr lang="en-US" sz="1400" dirty="0">
-                <a:latin typeface="Lucida Console" panose="020B0609040504020204" pitchFamily="49" charset="0"/>
-              </a:rPr>
-              <a:t>family=binomial(link=“</a:t>
+              <a:t>(x0)+s(x1)+s(x2)+s(x3),family=binomial(link=“</a:t>
             </a:r>
             <a:r>
               <a:rPr lang="en-US" sz="1400" dirty="0" smtClean="0">
@@ -6506,13 +6500,7 @@
               <a:rPr lang="en-US" sz="1400" dirty="0" smtClean="0">
                 <a:latin typeface="Lucida Console" panose="020B0609040504020204" pitchFamily="49" charset="0"/>
               </a:rPr>
-              <a:t>REML</a:t>
-            </a:r>
-            <a:r>
-              <a:rPr lang="en-US" sz="1400" dirty="0" smtClean="0">
-                <a:latin typeface="Lucida Console" panose="020B0609040504020204" pitchFamily="49" charset="0"/>
-              </a:rPr>
-              <a:t>“)</a:t>
+              <a:t>REML“)</a:t>
             </a:r>
             <a:endParaRPr lang="en-US" sz="1400" dirty="0">
               <a:latin typeface="Lucida Console" panose="020B0609040504020204" pitchFamily="49" charset="0"/>
@@ -7580,7 +7568,11 @@
           <a:p>
             <a:r>
               <a:rPr lang="en-US" dirty="0" smtClean="0"/>
-              <a:t>For Starters: Candidate Model Structures</a:t>
+              <a:t>For </a:t>
+            </a:r>
+            <a:r>
+              <a:rPr lang="en-US" dirty="0" smtClean="0"/>
+              <a:t>Starters</a:t>
             </a:r>
             <a:endParaRPr lang="en-US" dirty="0"/>
           </a:p>
@@ -7588,177 +7580,170 @@
       </p:sp>
       <p:sp>
         <p:nvSpPr>
-          <p:cNvPr id="8" name="TextBox 7"/>
-          <p:cNvSpPr txBox="1"/>
+          <p:cNvPr id="2" name="Content Placeholder 1"/>
+          <p:cNvSpPr>
+            <a:spLocks noGrp="1"/>
+          </p:cNvSpPr>
+          <p:nvPr>
+            <p:ph sz="half" idx="1"/>
+          </p:nvPr>
+        </p:nvSpPr>
+        <p:spPr>
+          <a:xfrm>
+            <a:off x="838200" y="1062681"/>
+            <a:ext cx="5181600" cy="5114282"/>
+          </a:xfrm>
+        </p:spPr>
+        <p:txBody>
+          <a:bodyPr>
+            <a:normAutofit fontScale="85000" lnSpcReduction="10000"/>
+          </a:bodyPr>
+          <a:lstStyle/>
+          <a:p>
+            <a:r>
+              <a:rPr lang="en-US" dirty="0" smtClean="0"/>
+              <a:t>Run through code in </a:t>
+            </a:r>
+            <a:r>
+              <a:rPr lang="en-US" dirty="0" err="1" smtClean="0"/>
+              <a:t>RegressionModelOverview.r</a:t>
+            </a:r>
+            <a:r>
+              <a:rPr lang="en-US" dirty="0" smtClean="0"/>
+              <a:t> to see how to build different types of GAM and hierarchical GAM models. </a:t>
+            </a:r>
+          </a:p>
+          <a:p>
+            <a:r>
+              <a:rPr lang="en-US" dirty="0"/>
+              <a:t>The figure to the right is from Pedersen et al. (2019). It is helpful for understanding various types of hierarchical GAMs</a:t>
+            </a:r>
+            <a:r>
+              <a:rPr lang="en-US" dirty="0" smtClean="0"/>
+              <a:t>.</a:t>
+            </a:r>
+          </a:p>
+          <a:p>
+            <a:r>
+              <a:rPr lang="en-US" dirty="0" smtClean="0"/>
+              <a:t>At the bottom of the script, there are ideas for a couple of new variables and model structures to try. </a:t>
+            </a:r>
+          </a:p>
+          <a:p>
+            <a:r>
+              <a:rPr lang="en-US" dirty="0" smtClean="0"/>
+              <a:t>Also need to examine model fit, especially related to appropriate choice of a sampling distribution (“family” argument) and link function.</a:t>
+            </a:r>
+          </a:p>
+        </p:txBody>
+      </p:sp>
+      <p:pic>
+        <p:nvPicPr>
+          <p:cNvPr id="6" name="Picture 5"/>
+          <p:cNvPicPr>
+            <a:picLocks noChangeAspect="1"/>
+          </p:cNvPicPr>
+          <p:nvPr/>
+        </p:nvPicPr>
+        <p:blipFill>
+          <a:blip r:embed="rId2" cstate="print">
+            <a:extLst>
+              <a:ext uri="{28A0092B-C50C-407E-A947-70E740481C1C}">
+                <a14:useLocalDpi xmlns:a14="http://schemas.microsoft.com/office/drawing/2010/main" val="0"/>
+              </a:ext>
+            </a:extLst>
+          </a:blip>
+          <a:stretch>
+            <a:fillRect/>
+          </a:stretch>
+        </p:blipFill>
+        <p:spPr>
+          <a:xfrm>
+            <a:off x="6932137" y="262569"/>
+            <a:ext cx="4269263" cy="5736181"/>
+          </a:xfrm>
+          <a:prstGeom prst="rect">
+            <a:avLst/>
+          </a:prstGeom>
+        </p:spPr>
+      </p:pic>
+      <p:sp>
+        <p:nvSpPr>
+          <p:cNvPr id="7" name="Rectangle 6"/>
+          <p:cNvSpPr/>
           <p:nvPr/>
         </p:nvSpPr>
         <p:spPr>
           <a:xfrm>
-            <a:off x="472505" y="1189549"/>
-            <a:ext cx="11246990" cy="584775"/>
+            <a:off x="6932137" y="5998750"/>
+            <a:ext cx="4887097" cy="646331"/>
           </a:xfrm>
           <a:prstGeom prst="rect">
             <a:avLst/>
           </a:prstGeom>
-          <a:solidFill>
-            <a:srgbClr val="0070C0"/>
-          </a:solidFill>
         </p:spPr>
         <p:txBody>
-          <a:bodyPr wrap="none" rtlCol="0">
+          <a:bodyPr wrap="square">
             <a:spAutoFit/>
           </a:bodyPr>
           <a:lstStyle/>
           <a:p>
             <a:r>
-              <a:rPr lang="en-US" dirty="0" smtClean="0">
+              <a:rPr lang="en-US" sz="1200" dirty="0">
                 <a:solidFill>
-                  <a:schemeClr val="bg1"/>
+                  <a:srgbClr val="3A87AD"/>
                 </a:solidFill>
+                <a:latin typeface="Helvetica Neue"/>
               </a:rPr>
-              <a:t>Previous example from </a:t>
-            </a:r>
-            <a:r>
-              <a:rPr lang="en-US" dirty="0" err="1" smtClean="0">
+              <a:t>Pedersen EJ, Miller DL, Simpson GL, Ross N. 2019. Hierarchical generalized additive models in ecology: an introduction with </a:t>
+            </a:r>
+            <a:r>
+              <a:rPr lang="en-US" sz="1200" dirty="0" err="1">
                 <a:solidFill>
-                  <a:schemeClr val="bg1"/>
+                  <a:srgbClr val="3A87AD"/>
                 </a:solidFill>
+                <a:latin typeface="Helvetica Neue"/>
               </a:rPr>
-              <a:t>RegressionModelOverview.r</a:t>
-            </a:r>
-            <a:r>
-              <a:rPr lang="en-US" dirty="0" smtClean="0">
+              <a:t>mgcv</a:t>
+            </a:r>
+            <a:r>
+              <a:rPr lang="en-US" sz="1200" dirty="0">
                 <a:solidFill>
-                  <a:schemeClr val="bg1"/>
+                  <a:srgbClr val="3A87AD"/>
                 </a:solidFill>
+                <a:latin typeface="Helvetica Neue"/>
               </a:rPr>
-              <a:t>:</a:t>
-            </a:r>
-          </a:p>
-          <a:p>
-            <a:r>
-              <a:rPr lang="en-US" sz="1400" dirty="0" err="1">
+              <a:t>. </a:t>
+            </a:r>
+            <a:r>
+              <a:rPr lang="en-US" sz="1200" i="1" dirty="0" err="1">
                 <a:solidFill>
-                  <a:schemeClr val="bg1"/>
+                  <a:srgbClr val="3A87AD"/>
                 </a:solidFill>
-                <a:latin typeface="Lucida Console" panose="020B0609040504020204" pitchFamily="49" charset="0"/>
+                <a:latin typeface="Helvetica Neue"/>
               </a:rPr>
-              <a:t>lr.fit</a:t>
-            </a:r>
-            <a:r>
-              <a:rPr lang="en-US" sz="1400" dirty="0">
+              <a:t>PeerJ</a:t>
+            </a:r>
+            <a:r>
+              <a:rPr lang="en-US" sz="1200" dirty="0">
                 <a:solidFill>
-                  <a:schemeClr val="bg1"/>
+                  <a:srgbClr val="3A87AD"/>
                 </a:solidFill>
-                <a:latin typeface="Lucida Console" panose="020B0609040504020204" pitchFamily="49" charset="0"/>
+                <a:latin typeface="Helvetica Neue"/>
               </a:rPr>
-              <a:t> &lt;- gam(y/</a:t>
-            </a:r>
-            <a:r>
-              <a:rPr lang="en-US" sz="1400" dirty="0" err="1">
+              <a:t> 7:e6876 </a:t>
+            </a:r>
+            <a:r>
+              <a:rPr lang="en-US" sz="1200" dirty="0">
                 <a:solidFill>
-                  <a:schemeClr val="bg1"/>
+                  <a:srgbClr val="2A85E8"/>
                 </a:solidFill>
-                <a:latin typeface="Lucida Console" panose="020B0609040504020204" pitchFamily="49" charset="0"/>
+                <a:latin typeface="Helvetica Neue"/>
+                <a:hlinkClick r:id="rId3"/>
               </a:rPr>
-              <a:t>n~s</a:t>
-            </a:r>
-            <a:r>
-              <a:rPr lang="en-US" sz="1400" dirty="0">
-                <a:solidFill>
-                  <a:schemeClr val="bg1"/>
-                </a:solidFill>
-                <a:latin typeface="Lucida Console" panose="020B0609040504020204" pitchFamily="49" charset="0"/>
-              </a:rPr>
-              <a:t>(x0)+s(x1)+s(x2)+s(x3),</a:t>
-            </a:r>
-            <a:r>
-              <a:rPr lang="en-US" sz="1400" dirty="0">
-                <a:solidFill>
-                  <a:schemeClr val="bg1"/>
-                </a:solidFill>
-                <a:latin typeface="Lucida Console" panose="020B0609040504020204" pitchFamily="49" charset="0"/>
-              </a:rPr>
-              <a:t>family=binomial(link=“</a:t>
-            </a:r>
-            <a:r>
-              <a:rPr lang="en-US" sz="1400" dirty="0" smtClean="0">
-                <a:solidFill>
-                  <a:schemeClr val="bg1"/>
-                </a:solidFill>
-                <a:latin typeface="Lucida Console" panose="020B0609040504020204" pitchFamily="49" charset="0"/>
-              </a:rPr>
-              <a:t>logit),</a:t>
-            </a:r>
-            <a:r>
-              <a:rPr lang="en-US" sz="1400" dirty="0">
-                <a:solidFill>
-                  <a:schemeClr val="bg1"/>
-                </a:solidFill>
-                <a:latin typeface="Lucida Console" panose="020B0609040504020204" pitchFamily="49" charset="0"/>
-              </a:rPr>
-              <a:t>data=</a:t>
-            </a:r>
-            <a:r>
-              <a:rPr lang="en-US" sz="1400" dirty="0" err="1">
-                <a:solidFill>
-                  <a:schemeClr val="bg1"/>
-                </a:solidFill>
-                <a:latin typeface="Lucida Console" panose="020B0609040504020204" pitchFamily="49" charset="0"/>
-              </a:rPr>
-              <a:t>dat,weights</a:t>
-            </a:r>
-            <a:r>
-              <a:rPr lang="en-US" sz="1400" dirty="0">
-                <a:solidFill>
-                  <a:schemeClr val="bg1"/>
-                </a:solidFill>
-                <a:latin typeface="Lucida Console" panose="020B0609040504020204" pitchFamily="49" charset="0"/>
-              </a:rPr>
-              <a:t>=</a:t>
-            </a:r>
-            <a:r>
-              <a:rPr lang="en-US" sz="1400" dirty="0" err="1">
-                <a:solidFill>
-                  <a:schemeClr val="bg1"/>
-                </a:solidFill>
-                <a:latin typeface="Lucida Console" panose="020B0609040504020204" pitchFamily="49" charset="0"/>
-              </a:rPr>
-              <a:t>n,method</a:t>
-            </a:r>
-            <a:r>
-              <a:rPr lang="en-US" sz="1400" dirty="0">
-                <a:solidFill>
-                  <a:schemeClr val="bg1"/>
-                </a:solidFill>
-                <a:latin typeface="Lucida Console" panose="020B0609040504020204" pitchFamily="49" charset="0"/>
-              </a:rPr>
-              <a:t>="</a:t>
-            </a:r>
-            <a:r>
-              <a:rPr lang="en-US" sz="1400" dirty="0" smtClean="0">
-                <a:solidFill>
-                  <a:schemeClr val="bg1"/>
-                </a:solidFill>
-                <a:latin typeface="Lucida Console" panose="020B0609040504020204" pitchFamily="49" charset="0"/>
-              </a:rPr>
-              <a:t>REML</a:t>
-            </a:r>
-            <a:r>
-              <a:rPr lang="en-US" sz="1400" dirty="0" smtClean="0">
-                <a:solidFill>
-                  <a:schemeClr val="bg1"/>
-                </a:solidFill>
-                <a:latin typeface="Lucida Console" panose="020B0609040504020204" pitchFamily="49" charset="0"/>
-              </a:rPr>
-              <a:t>“)</a:t>
-            </a:r>
-            <a:endParaRPr lang="en-US" sz="1400" dirty="0">
-              <a:solidFill>
-                <a:schemeClr val="bg1"/>
-              </a:solidFill>
-              <a:latin typeface="Lucida Console" panose="020B0609040504020204" pitchFamily="49" charset="0"/>
-            </a:endParaRPr>
+              <a:t>https://doi.org/10.7717/peerj.6876</a:t>
+            </a:r>
+            <a:endParaRPr lang="en-US" sz="1200" dirty="0"/>
           </a:p>
         </p:txBody>
       </p:sp>
@@ -24094,9 +24079,18 @@
           <a:bodyPr/>
           <a:lstStyle/>
           <a:p>
+            <a:pPr algn="r"/>
             <a:r>
               <a:rPr lang="en-US" dirty="0" smtClean="0"/>
-              <a:t>To be continued….</a:t>
+              <a:t>To be </a:t>
+            </a:r>
+            <a:r>
+              <a:rPr lang="en-US" dirty="0" smtClean="0"/>
+              <a:t>continued</a:t>
+            </a:r>
+            <a:r>
+              <a:rPr lang="en-US" dirty="0"/>
+              <a:t>.</a:t>
             </a:r>
             <a:endParaRPr lang="en-US" dirty="0"/>
           </a:p>

</xml_diff>

<commit_message>
Fixed error about Binomial distribution always being symmetric.
</commit_message>
<xml_diff>
--- a/Notes/RegressionModelOverview.pptx
+++ b/Notes/RegressionModelOverview.pptx
@@ -237,7 +237,7 @@
           <a:p>
             <a:fld id="{0082532B-AEE1-4521-BED8-FA67A45A1A20}" type="datetimeFigureOut">
               <a:rPr lang="en-US" smtClean="0"/>
-              <a:t>12/9/2021</a:t>
+              <a:t>12/10/2021</a:t>
             </a:fld>
             <a:endParaRPr lang="en-US"/>
           </a:p>
@@ -820,7 +820,7 @@
           <a:p>
             <a:fld id="{DBB772DE-1C71-4C15-94E7-A563D3B8A110}" type="datetimeFigureOut">
               <a:rPr lang="en-US" smtClean="0"/>
-              <a:t>12/9/2021</a:t>
+              <a:t>12/10/2021</a:t>
             </a:fld>
             <a:endParaRPr lang="en-US"/>
           </a:p>
@@ -990,7 +990,7 @@
           <a:p>
             <a:fld id="{DBB772DE-1C71-4C15-94E7-A563D3B8A110}" type="datetimeFigureOut">
               <a:rPr lang="en-US" smtClean="0"/>
-              <a:t>12/9/2021</a:t>
+              <a:t>12/10/2021</a:t>
             </a:fld>
             <a:endParaRPr lang="en-US"/>
           </a:p>
@@ -1170,7 +1170,7 @@
           <a:p>
             <a:fld id="{DBB772DE-1C71-4C15-94E7-A563D3B8A110}" type="datetimeFigureOut">
               <a:rPr lang="en-US" smtClean="0"/>
-              <a:t>12/9/2021</a:t>
+              <a:t>12/10/2021</a:t>
             </a:fld>
             <a:endParaRPr lang="en-US"/>
           </a:p>
@@ -1340,7 +1340,7 @@
           <a:p>
             <a:fld id="{DBB772DE-1C71-4C15-94E7-A563D3B8A110}" type="datetimeFigureOut">
               <a:rPr lang="en-US" smtClean="0"/>
-              <a:t>12/9/2021</a:t>
+              <a:t>12/10/2021</a:t>
             </a:fld>
             <a:endParaRPr lang="en-US"/>
           </a:p>
@@ -1586,7 +1586,7 @@
           <a:p>
             <a:fld id="{DBB772DE-1C71-4C15-94E7-A563D3B8A110}" type="datetimeFigureOut">
               <a:rPr lang="en-US" smtClean="0"/>
-              <a:t>12/9/2021</a:t>
+              <a:t>12/10/2021</a:t>
             </a:fld>
             <a:endParaRPr lang="en-US"/>
           </a:p>
@@ -1818,7 +1818,7 @@
           <a:p>
             <a:fld id="{DBB772DE-1C71-4C15-94E7-A563D3B8A110}" type="datetimeFigureOut">
               <a:rPr lang="en-US" smtClean="0"/>
-              <a:t>12/9/2021</a:t>
+              <a:t>12/10/2021</a:t>
             </a:fld>
             <a:endParaRPr lang="en-US"/>
           </a:p>
@@ -2185,7 +2185,7 @@
           <a:p>
             <a:fld id="{DBB772DE-1C71-4C15-94E7-A563D3B8A110}" type="datetimeFigureOut">
               <a:rPr lang="en-US" smtClean="0"/>
-              <a:t>12/9/2021</a:t>
+              <a:t>12/10/2021</a:t>
             </a:fld>
             <a:endParaRPr lang="en-US"/>
           </a:p>
@@ -2303,7 +2303,7 @@
           <a:p>
             <a:fld id="{DBB772DE-1C71-4C15-94E7-A563D3B8A110}" type="datetimeFigureOut">
               <a:rPr lang="en-US" smtClean="0"/>
-              <a:t>12/9/2021</a:t>
+              <a:t>12/10/2021</a:t>
             </a:fld>
             <a:endParaRPr lang="en-US"/>
           </a:p>
@@ -2398,7 +2398,7 @@
           <a:p>
             <a:fld id="{DBB772DE-1C71-4C15-94E7-A563D3B8A110}" type="datetimeFigureOut">
               <a:rPr lang="en-US" smtClean="0"/>
-              <a:t>12/9/2021</a:t>
+              <a:t>12/10/2021</a:t>
             </a:fld>
             <a:endParaRPr lang="en-US"/>
           </a:p>
@@ -2675,7 +2675,7 @@
           <a:p>
             <a:fld id="{DBB772DE-1C71-4C15-94E7-A563D3B8A110}" type="datetimeFigureOut">
               <a:rPr lang="en-US" smtClean="0"/>
-              <a:t>12/9/2021</a:t>
+              <a:t>12/10/2021</a:t>
             </a:fld>
             <a:endParaRPr lang="en-US"/>
           </a:p>
@@ -2928,7 +2928,7 @@
           <a:p>
             <a:fld id="{DBB772DE-1C71-4C15-94E7-A563D3B8A110}" type="datetimeFigureOut">
               <a:rPr lang="en-US" smtClean="0"/>
-              <a:t>12/9/2021</a:t>
+              <a:t>12/10/2021</a:t>
             </a:fld>
             <a:endParaRPr lang="en-US"/>
           </a:p>
@@ -3141,7 +3141,7 @@
           <a:p>
             <a:fld id="{DBB772DE-1C71-4C15-94E7-A563D3B8A110}" type="datetimeFigureOut">
               <a:rPr lang="en-US" smtClean="0"/>
-              <a:t>12/9/2021</a:t>
+              <a:t>12/10/2021</a:t>
             </a:fld>
             <a:endParaRPr lang="en-US"/>
           </a:p>
@@ -18841,11 +18841,7 @@
           <a:p>
             <a:r>
               <a:rPr lang="en-US" dirty="0" smtClean="0"/>
-              <a:t>However, because there are multiple trials per </a:t>
-            </a:r>
-            <a:r>
-              <a:rPr lang="en-US" dirty="0" smtClean="0"/>
-              <a:t>day </a:t>
+              <a:t>However, because there are multiple trials per day </a:t>
             </a:r>
             <a:r>
               <a:rPr lang="en-US" smtClean="0"/>
@@ -28716,7 +28712,7 @@
       </p:sp>
       <p:pic>
         <p:nvPicPr>
-          <p:cNvPr id="7" name="Picture 6"/>
+          <p:cNvPr id="8" name="Picture 7"/>
           <p:cNvPicPr>
             <a:picLocks noChangeAspect="1"/>
           </p:cNvPicPr>
@@ -28724,35 +28720,6 @@
         </p:nvPicPr>
         <p:blipFill>
           <a:blip r:embed="rId2"/>
-          <a:stretch>
-            <a:fillRect/>
-          </a:stretch>
-        </p:blipFill>
-        <p:spPr>
-          <a:xfrm>
-            <a:off x="6450187" y="1497946"/>
-            <a:ext cx="3237186" cy="2514600"/>
-          </a:xfrm>
-          <a:prstGeom prst="rect">
-            <a:avLst/>
-          </a:prstGeom>
-          <a:ln>
-            <a:solidFill>
-              <a:schemeClr val="tx1"/>
-            </a:solidFill>
-          </a:ln>
-        </p:spPr>
-      </p:pic>
-      <p:pic>
-        <p:nvPicPr>
-          <p:cNvPr id="8" name="Picture 7"/>
-          <p:cNvPicPr>
-            <a:picLocks noChangeAspect="1"/>
-          </p:cNvPicPr>
-          <p:nvPr/>
-        </p:nvPicPr>
-        <p:blipFill>
-          <a:blip r:embed="rId3"/>
           <a:stretch>
             <a:fillRect/>
           </a:stretch>
@@ -28781,7 +28748,7 @@
           <p:nvPr/>
         </p:nvPicPr>
         <p:blipFill>
-          <a:blip r:embed="rId4"/>
+          <a:blip r:embed="rId3"/>
           <a:stretch>
             <a:fillRect/>
           </a:stretch>
@@ -28810,7 +28777,7 @@
           <p:nvPr/>
         </p:nvPicPr>
         <p:blipFill>
-          <a:blip r:embed="rId5"/>
+          <a:blip r:embed="rId4"/>
           <a:stretch>
             <a:fillRect/>
           </a:stretch>
@@ -28945,6 +28912,73 @@
             <a:r>
               <a:rPr lang="en-US" dirty="0" smtClean="0"/>
               <a:t>Asymmetric</a:t>
+            </a:r>
+            <a:endParaRPr lang="en-US" dirty="0"/>
+          </a:p>
+        </p:txBody>
+      </p:sp>
+      <p:pic>
+        <p:nvPicPr>
+          <p:cNvPr id="11" name="Picture 10"/>
+          <p:cNvPicPr>
+            <a:picLocks noChangeAspect="1"/>
+          </p:cNvPicPr>
+          <p:nvPr/>
+        </p:nvPicPr>
+        <p:blipFill>
+          <a:blip r:embed="rId5" cstate="print">
+            <a:extLst>
+              <a:ext uri="{28A0092B-C50C-407E-A947-70E740481C1C}">
+                <a14:useLocalDpi xmlns:a14="http://schemas.microsoft.com/office/drawing/2010/main" val="0"/>
+              </a:ext>
+            </a:extLst>
+          </a:blip>
+          <a:stretch>
+            <a:fillRect/>
+          </a:stretch>
+        </p:blipFill>
+        <p:spPr>
+          <a:xfrm>
+            <a:off x="6702830" y="1386756"/>
+            <a:ext cx="2731900" cy="2367647"/>
+          </a:xfrm>
+          <a:prstGeom prst="rect">
+            <a:avLst/>
+          </a:prstGeom>
+        </p:spPr>
+      </p:pic>
+      <p:sp>
+        <p:nvSpPr>
+          <p:cNvPr id="4" name="TextBox 3"/>
+          <p:cNvSpPr txBox="1"/>
+          <p:nvPr/>
+        </p:nvSpPr>
+        <p:spPr>
+          <a:xfrm>
+            <a:off x="8340623" y="1730588"/>
+            <a:ext cx="2053642" cy="1200329"/>
+          </a:xfrm>
+          <a:prstGeom prst="rect">
+            <a:avLst/>
+          </a:prstGeom>
+          <a:noFill/>
+        </p:spPr>
+        <p:txBody>
+          <a:bodyPr wrap="square" rtlCol="0">
+            <a:spAutoFit/>
+          </a:bodyPr>
+          <a:lstStyle/>
+          <a:p>
+            <a:r>
+              <a:rPr lang="en-US" dirty="0" smtClean="0"/>
+              <a:t>Binomial p=0.5</a:t>
+            </a:r>
+          </a:p>
+          <a:p>
+            <a:pPr algn="ctr"/>
+            <a:r>
+              <a:rPr lang="en-US" dirty="0" smtClean="0"/>
+              <a:t>is symmetric; other values of p are asymmetric</a:t>
             </a:r>
             <a:endParaRPr lang="en-US" dirty="0"/>
           </a:p>
@@ -28994,7 +29028,7 @@
                                           </p:stCondLst>
                                         </p:cTn>
                                         <p:tgtEl>
-                                          <p:spTgt spid="7"/>
+                                          <p:spTgt spid="9"/>
                                         </p:tgtEl>
                                         <p:attrNameLst>
                                           <p:attrName>style.visibility</p:attrName>
@@ -29034,51 +29068,6 @@
                                     <p:set>
                                       <p:cBhvr>
                                         <p:cTn id="10" dur="1" fill="hold">
-                                          <p:stCondLst>
-                                            <p:cond delay="0"/>
-                                          </p:stCondLst>
-                                        </p:cTn>
-                                        <p:tgtEl>
-                                          <p:spTgt spid="9"/>
-                                        </p:tgtEl>
-                                        <p:attrNameLst>
-                                          <p:attrName>style.visibility</p:attrName>
-                                        </p:attrNameLst>
-                                      </p:cBhvr>
-                                      <p:to>
-                                        <p:strVal val="visible"/>
-                                      </p:to>
-                                    </p:set>
-                                  </p:childTnLst>
-                                </p:cTn>
-                              </p:par>
-                            </p:childTnLst>
-                          </p:cTn>
-                        </p:par>
-                      </p:childTnLst>
-                    </p:cTn>
-                  </p:par>
-                  <p:par>
-                    <p:cTn id="11" fill="hold">
-                      <p:stCondLst>
-                        <p:cond delay="indefinite"/>
-                      </p:stCondLst>
-                      <p:childTnLst>
-                        <p:par>
-                          <p:cTn id="12" fill="hold">
-                            <p:stCondLst>
-                              <p:cond delay="0"/>
-                            </p:stCondLst>
-                            <p:childTnLst>
-                              <p:par>
-                                <p:cTn id="13" presetID="1" presetClass="entr" presetSubtype="0" fill="hold" nodeType="clickEffect">
-                                  <p:stCondLst>
-                                    <p:cond delay="0"/>
-                                  </p:stCondLst>
-                                  <p:childTnLst>
-                                    <p:set>
-                                      <p:cBhvr>
-                                        <p:cTn id="14" dur="1" fill="hold">
                                           <p:stCondLst>
                                             <p:cond delay="0"/>
                                           </p:stCondLst>

</xml_diff>